<commit_message>
LH und Präsi ergänzt
Signed-off-by: Alexander Benölken <a.benoelken@googlemail.com>
</commit_message>
<xml_diff>
--- a/Dokumente/Abschlusspr�si/Abschlusspr�sentation.pptx
+++ b/Dokumente/Abschlusspr�si/Abschlusspr�sentation.pptx
@@ -5,26 +5,27 @@
     <p:sldMasterId id="2147483744" r:id="rId1"/>
   </p:sldMasterIdLst>
   <p:notesMasterIdLst>
-    <p:notesMasterId r:id="rId19"/>
+    <p:notesMasterId r:id="rId20"/>
   </p:notesMasterIdLst>
   <p:sldIdLst>
     <p:sldId id="256" r:id="rId2"/>
     <p:sldId id="259" r:id="rId3"/>
     <p:sldId id="295" r:id="rId4"/>
-    <p:sldId id="304" r:id="rId5"/>
-    <p:sldId id="293" r:id="rId6"/>
-    <p:sldId id="260" r:id="rId7"/>
-    <p:sldId id="294" r:id="rId8"/>
-    <p:sldId id="298" r:id="rId9"/>
-    <p:sldId id="305" r:id="rId10"/>
-    <p:sldId id="297" r:id="rId11"/>
-    <p:sldId id="306" r:id="rId12"/>
-    <p:sldId id="296" r:id="rId13"/>
-    <p:sldId id="307" r:id="rId14"/>
-    <p:sldId id="301" r:id="rId15"/>
-    <p:sldId id="300" r:id="rId16"/>
-    <p:sldId id="303" r:id="rId17"/>
-    <p:sldId id="290" r:id="rId18"/>
+    <p:sldId id="308" r:id="rId5"/>
+    <p:sldId id="304" r:id="rId6"/>
+    <p:sldId id="293" r:id="rId7"/>
+    <p:sldId id="260" r:id="rId8"/>
+    <p:sldId id="294" r:id="rId9"/>
+    <p:sldId id="298" r:id="rId10"/>
+    <p:sldId id="305" r:id="rId11"/>
+    <p:sldId id="297" r:id="rId12"/>
+    <p:sldId id="306" r:id="rId13"/>
+    <p:sldId id="296" r:id="rId14"/>
+    <p:sldId id="307" r:id="rId15"/>
+    <p:sldId id="301" r:id="rId16"/>
+    <p:sldId id="300" r:id="rId17"/>
+    <p:sldId id="303" r:id="rId18"/>
+    <p:sldId id="290" r:id="rId19"/>
   </p:sldIdLst>
   <p:sldSz cx="9144000" cy="6858000" type="screen4x3"/>
   <p:notesSz cx="6858000" cy="9144000"/>
@@ -399,7 +400,7 @@
     </p:spTree>
     <p:extLst>
       <p:ext uri="{BB962C8B-B14F-4D97-AF65-F5344CB8AC3E}">
-        <p14:creationId xmlns:p14="http://schemas.microsoft.com/office/powerpoint/2010/main" val="2610097957"/>
+        <p14:creationId xmlns:p14="http://schemas.microsoft.com/office/powerpoint/2010/main" xmlns="" val="2610097957"/>
       </p:ext>
     </p:extLst>
   </p:cSld>
@@ -574,7 +575,7 @@
     </p:spTree>
     <p:extLst>
       <p:ext uri="{BB962C8B-B14F-4D97-AF65-F5344CB8AC3E}">
-        <p14:creationId xmlns:p14="http://schemas.microsoft.com/office/powerpoint/2010/main" val="2116472317"/>
+        <p14:creationId xmlns:p14="http://schemas.microsoft.com/office/powerpoint/2010/main" xmlns="" val="2116472317"/>
       </p:ext>
     </p:extLst>
   </p:cSld>
@@ -630,43 +631,51 @@
           <a:p>
             <a:r>
               <a:rPr lang="de-DE" dirty="0" smtClean="0"/>
-              <a:t>Zeitplan</a:t>
-            </a:r>
-          </a:p>
-          <a:p>
-            <a:r>
-              <a:rPr lang="de-DE" dirty="0" smtClean="0"/>
-              <a:t>Fokus aus </a:t>
+              <a:t>Blau: Event </a:t>
             </a:r>
             <a:r>
               <a:rPr lang="de-DE" dirty="0" err="1" smtClean="0"/>
-              <a:t>Inception</a:t>
-            </a:r>
-            <a:r>
-              <a:rPr lang="de-DE" dirty="0" smtClean="0"/>
-              <a:t> / Elaboration</a:t>
-            </a:r>
-          </a:p>
-          <a:p>
-            <a:r>
-              <a:rPr lang="de-DE" dirty="0" smtClean="0"/>
-              <a:t>Aufgrund der Enge des Zeitplans jeweils zwei Iterationen mit</a:t>
+              <a:t>anlage</a:t>
+            </a:r>
+            <a:endParaRPr lang="de-DE" dirty="0" smtClean="0"/>
+          </a:p>
+          <a:p>
+            <a:r>
+              <a:rPr lang="de-DE" dirty="0" smtClean="0"/>
+              <a:t>DB Table Event, </a:t>
+            </a:r>
+            <a:r>
+              <a:rPr lang="de-DE" dirty="0" err="1" smtClean="0"/>
+              <a:t>normaliserte</a:t>
             </a:r>
             <a:r>
               <a:rPr lang="de-DE" baseline="0" dirty="0" smtClean="0"/>
-              <a:t> festen Reviews der Ergebnisse etc.</a:t>
-            </a:r>
+              <a:t> Teilnehmerliste und Ort</a:t>
+            </a:r>
+          </a:p>
+          <a:p>
+            <a:endParaRPr lang="de-DE" baseline="0" dirty="0" smtClean="0"/>
           </a:p>
           <a:p>
             <a:r>
               <a:rPr lang="de-DE" baseline="0" dirty="0" smtClean="0"/>
-              <a:t>Aber auch: RUP! Jederzeit auch bei kleineren Änderungen/Feststellungen usw. Überarbeitung.</a:t>
-            </a:r>
-          </a:p>
-          <a:p>
+              <a:t>Rot: Login Verknüpfung Session ID aus </a:t>
+            </a:r>
+            <a:r>
+              <a:rPr lang="de-DE" baseline="0" dirty="0" err="1" smtClean="0"/>
+              <a:t>oAuth</a:t>
+            </a:r>
             <a:r>
               <a:rPr lang="de-DE" baseline="0" dirty="0" smtClean="0"/>
-              <a:t>Ziel: 11.06. eine prototypische Implementierung der Plattform fertigstellen</a:t>
+              <a:t>, Grunddaten (</a:t>
+            </a:r>
+            <a:r>
+              <a:rPr lang="de-DE" baseline="0" dirty="0" err="1" smtClean="0"/>
+              <a:t>name</a:t>
+            </a:r>
+            <a:r>
+              <a:rPr lang="de-DE" baseline="0" dirty="0" smtClean="0"/>
+              <a:t>, E-Mail-Adresse etc.) werden ausgelesen und persistent gespeichert.</a:t>
             </a:r>
             <a:endParaRPr lang="de-DE" dirty="0"/>
           </a:p>
@@ -690,7 +699,7 @@
             <a:fld id="{F7EBFB8C-BBFF-4397-A51C-1E92596422A9}" type="slidenum">
               <a:rPr lang="en-US" smtClean="0"/>
               <a:pPr/>
-              <a:t>14</a:t>
+              <a:t>13</a:t>
             </a:fld>
             <a:endParaRPr lang="en-US" dirty="0"/>
           </a:p>
@@ -699,7 +708,7 @@
     </p:spTree>
     <p:extLst>
       <p:ext uri="{BB962C8B-B14F-4D97-AF65-F5344CB8AC3E}">
-        <p14:creationId xmlns:p14="http://schemas.microsoft.com/office/powerpoint/2010/main" val="3931682397"/>
+        <p14:creationId xmlns:p14="http://schemas.microsoft.com/office/powerpoint/2010/main" xmlns="" val="802076649"/>
       </p:ext>
     </p:extLst>
   </p:cSld>
@@ -750,11 +759,49 @@
         </p:nvSpPr>
         <p:spPr/>
         <p:txBody>
-          <a:bodyPr>
-            <a:normAutofit/>
-          </a:bodyPr>
+          <a:bodyPr/>
           <a:lstStyle/>
           <a:p>
+            <a:r>
+              <a:rPr lang="de-DE" dirty="0" smtClean="0"/>
+              <a:t>Zeitplan</a:t>
+            </a:r>
+          </a:p>
+          <a:p>
+            <a:r>
+              <a:rPr lang="de-DE" dirty="0" smtClean="0"/>
+              <a:t>Fokus aus </a:t>
+            </a:r>
+            <a:r>
+              <a:rPr lang="de-DE" dirty="0" err="1" smtClean="0"/>
+              <a:t>Inception</a:t>
+            </a:r>
+            <a:r>
+              <a:rPr lang="de-DE" dirty="0" smtClean="0"/>
+              <a:t> / Elaboration</a:t>
+            </a:r>
+          </a:p>
+          <a:p>
+            <a:r>
+              <a:rPr lang="de-DE" dirty="0" smtClean="0"/>
+              <a:t>Aufgrund der Enge des Zeitplans jeweils zwei Iterationen mit</a:t>
+            </a:r>
+            <a:r>
+              <a:rPr lang="de-DE" baseline="0" dirty="0" smtClean="0"/>
+              <a:t> festen Reviews der Ergebnisse etc.</a:t>
+            </a:r>
+          </a:p>
+          <a:p>
+            <a:r>
+              <a:rPr lang="de-DE" baseline="0" dirty="0" smtClean="0"/>
+              <a:t>Aber auch: RUP! Jederzeit auch bei kleineren Änderungen/Feststellungen usw. Überarbeitung.</a:t>
+            </a:r>
+          </a:p>
+          <a:p>
+            <a:r>
+              <a:rPr lang="de-DE" baseline="0" dirty="0" smtClean="0"/>
+              <a:t>Ziel: 11.06. eine prototypische Implementierung der Plattform fertigstellen</a:t>
+            </a:r>
             <a:endParaRPr lang="de-DE" dirty="0"/>
           </a:p>
         </p:txBody>
@@ -774,16 +821,21 @@
           <a:bodyPr/>
           <a:lstStyle/>
           <a:p>
-            <a:fld id="{1EBFF01C-F984-4A51-AF10-254043F7C542}" type="slidenum">
-              <a:rPr lang="de-DE" smtClean="0"/>
+            <a:fld id="{F7EBFB8C-BBFF-4397-A51C-1E92596422A9}" type="slidenum">
+              <a:rPr lang="en-US" smtClean="0"/>
               <a:pPr/>
-              <a:t>16</a:t>
+              <a:t>15</a:t>
             </a:fld>
-            <a:endParaRPr lang="de-DE"/>
+            <a:endParaRPr lang="en-US" dirty="0"/>
           </a:p>
         </p:txBody>
       </p:sp>
     </p:spTree>
+    <p:extLst>
+      <p:ext uri="{BB962C8B-B14F-4D97-AF65-F5344CB8AC3E}">
+        <p14:creationId xmlns:p14="http://schemas.microsoft.com/office/powerpoint/2010/main" xmlns="" val="3931682397"/>
+      </p:ext>
+    </p:extLst>
   </p:cSld>
   <p:clrMapOvr>
     <a:masterClrMapping/>
@@ -832,6 +884,88 @@
         </p:nvSpPr>
         <p:spPr/>
         <p:txBody>
+          <a:bodyPr>
+            <a:normAutofit/>
+          </a:bodyPr>
+          <a:lstStyle/>
+          <a:p>
+            <a:endParaRPr lang="de-DE" dirty="0"/>
+          </a:p>
+        </p:txBody>
+      </p:sp>
+      <p:sp>
+        <p:nvSpPr>
+          <p:cNvPr id="4" name="Foliennummernplatzhalter 3"/>
+          <p:cNvSpPr>
+            <a:spLocks noGrp="1"/>
+          </p:cNvSpPr>
+          <p:nvPr>
+            <p:ph type="sldNum" sz="quarter" idx="10"/>
+          </p:nvPr>
+        </p:nvSpPr>
+        <p:spPr/>
+        <p:txBody>
+          <a:bodyPr/>
+          <a:lstStyle/>
+          <a:p>
+            <a:fld id="{1EBFF01C-F984-4A51-AF10-254043F7C542}" type="slidenum">
+              <a:rPr lang="de-DE" smtClean="0"/>
+              <a:pPr/>
+              <a:t>17</a:t>
+            </a:fld>
+            <a:endParaRPr lang="de-DE"/>
+          </a:p>
+        </p:txBody>
+      </p:sp>
+    </p:spTree>
+  </p:cSld>
+  <p:clrMapOvr>
+    <a:masterClrMapping/>
+  </p:clrMapOvr>
+</p:notes>
+</file>
+
+<file path=ppt/notesSlides/notesSlide13.xml><?xml version="1.0" encoding="utf-8"?>
+<p:notes xmlns:a="http://schemas.openxmlformats.org/drawingml/2006/main" xmlns:r="http://schemas.openxmlformats.org/officeDocument/2006/relationships" xmlns:p="http://schemas.openxmlformats.org/presentationml/2006/main">
+  <p:cSld>
+    <p:spTree>
+      <p:nvGrpSpPr>
+        <p:cNvPr id="1" name=""/>
+        <p:cNvGrpSpPr/>
+        <p:nvPr/>
+      </p:nvGrpSpPr>
+      <p:grpSpPr>
+        <a:xfrm>
+          <a:off x="0" y="0"/>
+          <a:ext cx="0" cy="0"/>
+          <a:chOff x="0" y="0"/>
+          <a:chExt cx="0" cy="0"/>
+        </a:xfrm>
+      </p:grpSpPr>
+      <p:sp>
+        <p:nvSpPr>
+          <p:cNvPr id="2" name="Folienbildplatzhalter 1"/>
+          <p:cNvSpPr>
+            <a:spLocks noGrp="1" noRot="1" noChangeAspect="1"/>
+          </p:cNvSpPr>
+          <p:nvPr>
+            <p:ph type="sldImg"/>
+          </p:nvPr>
+        </p:nvSpPr>
+        <p:spPr/>
+      </p:sp>
+      <p:sp>
+        <p:nvSpPr>
+          <p:cNvPr id="3" name="Notizenplatzhalter 2"/>
+          <p:cNvSpPr>
+            <a:spLocks noGrp="1"/>
+          </p:cNvSpPr>
+          <p:nvPr>
+            <p:ph type="body" idx="1"/>
+          </p:nvPr>
+        </p:nvSpPr>
+        <p:spPr/>
+        <p:txBody>
           <a:bodyPr/>
           <a:lstStyle/>
           <a:p>
@@ -857,7 +991,7 @@
             <a:fld id="{F7EBFB8C-BBFF-4397-A51C-1E92596422A9}" type="slidenum">
               <a:rPr lang="en-US" smtClean="0"/>
               <a:pPr/>
-              <a:t>17</a:t>
+              <a:t>18</a:t>
             </a:fld>
             <a:endParaRPr lang="en-US" dirty="0"/>
           </a:p>
@@ -866,7 +1000,7 @@
     </p:spTree>
     <p:extLst>
       <p:ext uri="{BB962C8B-B14F-4D97-AF65-F5344CB8AC3E}">
-        <p14:creationId xmlns:p14="http://schemas.microsoft.com/office/powerpoint/2010/main" val="2116472317"/>
+        <p14:creationId xmlns:p14="http://schemas.microsoft.com/office/powerpoint/2010/main" xmlns="" val="2116472317"/>
       </p:ext>
     </p:extLst>
   </p:cSld>
@@ -1192,7 +1326,7 @@
     </p:spTree>
     <p:extLst>
       <p:ext uri="{BB962C8B-B14F-4D97-AF65-F5344CB8AC3E}">
-        <p14:creationId xmlns:p14="http://schemas.microsoft.com/office/powerpoint/2010/main" val="517533983"/>
+        <p14:creationId xmlns:p14="http://schemas.microsoft.com/office/powerpoint/2010/main" xmlns="" val="517533983"/>
       </p:ext>
     </p:extLst>
   </p:cSld>
@@ -1602,7 +1736,7 @@
     </p:spTree>
     <p:extLst>
       <p:ext uri="{BB962C8B-B14F-4D97-AF65-F5344CB8AC3E}">
-        <p14:creationId xmlns:p14="http://schemas.microsoft.com/office/powerpoint/2010/main" val="2934279750"/>
+        <p14:creationId xmlns:p14="http://schemas.microsoft.com/office/powerpoint/2010/main" xmlns="" val="2934279750"/>
       </p:ext>
     </p:extLst>
   </p:cSld>
@@ -2012,7 +2146,7 @@
     </p:spTree>
     <p:extLst>
       <p:ext uri="{BB962C8B-B14F-4D97-AF65-F5344CB8AC3E}">
-        <p14:creationId xmlns:p14="http://schemas.microsoft.com/office/powerpoint/2010/main" val="2934279750"/>
+        <p14:creationId xmlns:p14="http://schemas.microsoft.com/office/powerpoint/2010/main" xmlns="" val="2934279750"/>
       </p:ext>
     </p:extLst>
   </p:cSld>
@@ -2422,7 +2556,7 @@
     </p:spTree>
     <p:extLst>
       <p:ext uri="{BB962C8B-B14F-4D97-AF65-F5344CB8AC3E}">
-        <p14:creationId xmlns:p14="http://schemas.microsoft.com/office/powerpoint/2010/main" val="2934279750"/>
+        <p14:creationId xmlns:p14="http://schemas.microsoft.com/office/powerpoint/2010/main" xmlns="" val="2934279750"/>
       </p:ext>
     </p:extLst>
   </p:cSld>
@@ -2476,6 +2610,331 @@
           <a:bodyPr/>
           <a:lstStyle/>
           <a:p>
+            <a:r>
+              <a:rPr lang="de-DE" dirty="0" smtClean="0"/>
+              <a:t>Funktionale Anforderung per </a:t>
+            </a:r>
+            <a:r>
+              <a:rPr lang="de-DE" dirty="0" err="1" smtClean="0"/>
+              <a:t>Mockup</a:t>
+            </a:r>
+            <a:r>
+              <a:rPr lang="de-DE" dirty="0" smtClean="0"/>
+              <a:t> dargestellt und textuell ergänzt:</a:t>
+            </a:r>
+          </a:p>
+          <a:p>
+            <a:r>
+              <a:rPr lang="de-DE" sz="1200" kern="1200" dirty="0" smtClean="0">
+                <a:solidFill>
+                  <a:schemeClr val="tx1"/>
+                </a:solidFill>
+                <a:effectLst/>
+                <a:latin typeface="+mn-lt"/>
+                <a:ea typeface="+mn-ea"/>
+                <a:cs typeface="+mn-cs"/>
+              </a:rPr>
+              <a:t>Der beliebiger Internetnutzer kann sich über </a:t>
+            </a:r>
+            <a:r>
+              <a:rPr lang="de-DE" sz="1200" kern="1200" dirty="0" err="1" smtClean="0">
+                <a:solidFill>
+                  <a:schemeClr val="tx1"/>
+                </a:solidFill>
+                <a:effectLst/>
+                <a:latin typeface="+mn-lt"/>
+                <a:ea typeface="+mn-ea"/>
+                <a:cs typeface="+mn-cs"/>
+              </a:rPr>
+              <a:t>oAuth</a:t>
+            </a:r>
+            <a:r>
+              <a:rPr lang="de-DE" sz="1200" kern="1200" dirty="0" smtClean="0">
+                <a:solidFill>
+                  <a:schemeClr val="tx1"/>
+                </a:solidFill>
+                <a:effectLst/>
+                <a:latin typeface="+mn-lt"/>
+                <a:ea typeface="+mn-ea"/>
+                <a:cs typeface="+mn-cs"/>
+              </a:rPr>
+              <a:t> (Google oder Facebook-Account) auf der folgenden Eingabemaske an der Internetplattform </a:t>
+            </a:r>
+            <a:r>
+              <a:rPr lang="de-DE" sz="1200" kern="1200" dirty="0" err="1" smtClean="0">
+                <a:solidFill>
+                  <a:schemeClr val="tx1"/>
+                </a:solidFill>
+                <a:effectLst/>
+                <a:latin typeface="+mn-lt"/>
+                <a:ea typeface="+mn-ea"/>
+                <a:cs typeface="+mn-cs"/>
+              </a:rPr>
+              <a:t>Eventalizer</a:t>
+            </a:r>
+            <a:r>
+              <a:rPr lang="de-DE" sz="1200" kern="1200" dirty="0" smtClean="0">
+                <a:solidFill>
+                  <a:schemeClr val="tx1"/>
+                </a:solidFill>
+                <a:effectLst/>
+                <a:latin typeface="+mn-lt"/>
+                <a:ea typeface="+mn-ea"/>
+                <a:cs typeface="+mn-cs"/>
+              </a:rPr>
+              <a:t> anmelden:</a:t>
+            </a:r>
+            <a:br>
+              <a:rPr lang="de-DE" sz="1200" kern="1200" dirty="0" smtClean="0">
+                <a:solidFill>
+                  <a:schemeClr val="tx1"/>
+                </a:solidFill>
+                <a:effectLst/>
+                <a:latin typeface="+mn-lt"/>
+                <a:ea typeface="+mn-ea"/>
+                <a:cs typeface="+mn-cs"/>
+              </a:rPr>
+            </a:br>
+            <a:r>
+              <a:rPr lang="de-DE" sz="1200" kern="1200" dirty="0" smtClean="0">
+                <a:solidFill>
+                  <a:schemeClr val="tx1"/>
+                </a:solidFill>
+                <a:effectLst/>
+                <a:latin typeface="+mn-lt"/>
+                <a:ea typeface="+mn-ea"/>
+                <a:cs typeface="+mn-cs"/>
+              </a:rPr>
+              <a:t> </a:t>
+            </a:r>
+            <a:br>
+              <a:rPr lang="de-DE" sz="1200" kern="1200" dirty="0" smtClean="0">
+                <a:solidFill>
+                  <a:schemeClr val="tx1"/>
+                </a:solidFill>
+                <a:effectLst/>
+                <a:latin typeface="+mn-lt"/>
+                <a:ea typeface="+mn-ea"/>
+                <a:cs typeface="+mn-cs"/>
+              </a:rPr>
+            </a:br>
+            <a:r>
+              <a:rPr lang="de-DE" sz="1200" kern="1200" dirty="0" smtClean="0">
+                <a:solidFill>
+                  <a:schemeClr val="tx1"/>
+                </a:solidFill>
+                <a:effectLst/>
+                <a:latin typeface="+mn-lt"/>
+                <a:ea typeface="+mn-ea"/>
+                <a:cs typeface="+mn-cs"/>
+              </a:rPr>
+              <a:t>Für eine erfolgreiche Anmeldung ist die Angabe der folgenden Informationen notwendig:</a:t>
+            </a:r>
+          </a:p>
+          <a:p>
+            <a:pPr lvl="0"/>
+            <a:r>
+              <a:rPr lang="de-DE" sz="1200" kern="1200" dirty="0" err="1" smtClean="0">
+                <a:solidFill>
+                  <a:schemeClr val="tx1"/>
+                </a:solidFill>
+                <a:effectLst/>
+                <a:latin typeface="+mn-lt"/>
+                <a:ea typeface="+mn-ea"/>
+                <a:cs typeface="+mn-cs"/>
+              </a:rPr>
+              <a:t>Social</a:t>
+            </a:r>
+            <a:r>
+              <a:rPr lang="de-DE" sz="1200" kern="1200" dirty="0" smtClean="0">
+                <a:solidFill>
+                  <a:schemeClr val="tx1"/>
+                </a:solidFill>
+                <a:effectLst/>
+                <a:latin typeface="+mn-lt"/>
+                <a:ea typeface="+mn-ea"/>
+                <a:cs typeface="+mn-cs"/>
+              </a:rPr>
+              <a:t>-Network-Anbieter</a:t>
+            </a:r>
+          </a:p>
+          <a:p>
+            <a:pPr lvl="0"/>
+            <a:r>
+              <a:rPr lang="de-DE" sz="1200" kern="1200" dirty="0" smtClean="0">
+                <a:solidFill>
+                  <a:schemeClr val="tx1"/>
+                </a:solidFill>
+                <a:effectLst/>
+                <a:latin typeface="+mn-lt"/>
+                <a:ea typeface="+mn-ea"/>
+                <a:cs typeface="+mn-cs"/>
+              </a:rPr>
+              <a:t>Der dort verwendete Benutzername</a:t>
+            </a:r>
+          </a:p>
+          <a:p>
+            <a:pPr lvl="0"/>
+            <a:r>
+              <a:rPr lang="de-DE" sz="1200" kern="1200" dirty="0" smtClean="0">
+                <a:solidFill>
+                  <a:schemeClr val="tx1"/>
+                </a:solidFill>
+                <a:effectLst/>
+                <a:latin typeface="+mn-lt"/>
+                <a:ea typeface="+mn-ea"/>
+                <a:cs typeface="+mn-cs"/>
+              </a:rPr>
+              <a:t>Das dort verwendete persönliche Passwort</a:t>
+            </a:r>
+          </a:p>
+          <a:p>
+            <a:r>
+              <a:rPr lang="de-DE" sz="1200" kern="1200" dirty="0" smtClean="0">
+                <a:solidFill>
+                  <a:schemeClr val="tx1"/>
+                </a:solidFill>
+                <a:effectLst/>
+                <a:latin typeface="+mn-lt"/>
+                <a:ea typeface="+mn-ea"/>
+                <a:cs typeface="+mn-cs"/>
+              </a:rPr>
+              <a:t>Die möglichen </a:t>
+            </a:r>
+            <a:r>
+              <a:rPr lang="de-DE" sz="1200" kern="1200" dirty="0" err="1" smtClean="0">
+                <a:solidFill>
+                  <a:schemeClr val="tx1"/>
+                </a:solidFill>
+                <a:effectLst/>
+                <a:latin typeface="+mn-lt"/>
+                <a:ea typeface="+mn-ea"/>
+                <a:cs typeface="+mn-cs"/>
+              </a:rPr>
+              <a:t>Social</a:t>
+            </a:r>
+            <a:r>
+              <a:rPr lang="de-DE" sz="1200" kern="1200" dirty="0" smtClean="0">
+                <a:solidFill>
+                  <a:schemeClr val="tx1"/>
+                </a:solidFill>
+                <a:effectLst/>
+                <a:latin typeface="+mn-lt"/>
+                <a:ea typeface="+mn-ea"/>
+                <a:cs typeface="+mn-cs"/>
+              </a:rPr>
+              <a:t>-Network-Anbieter werden auf der Eingabemaske aufgeführt. </a:t>
+            </a:r>
+            <a:br>
+              <a:rPr lang="de-DE" sz="1200" kern="1200" dirty="0" smtClean="0">
+                <a:solidFill>
+                  <a:schemeClr val="tx1"/>
+                </a:solidFill>
+                <a:effectLst/>
+                <a:latin typeface="+mn-lt"/>
+                <a:ea typeface="+mn-ea"/>
+                <a:cs typeface="+mn-cs"/>
+              </a:rPr>
+            </a:br>
+            <a:r>
+              <a:rPr lang="de-DE" sz="1200" kern="1200" dirty="0" smtClean="0">
+                <a:solidFill>
+                  <a:schemeClr val="tx1"/>
+                </a:solidFill>
+                <a:effectLst/>
+                <a:latin typeface="+mn-lt"/>
+                <a:ea typeface="+mn-ea"/>
+                <a:cs typeface="+mn-cs"/>
+              </a:rPr>
+              <a:t>Die Anmeldung an der Internetplattform ist erfolgreich, wenn die Antwort des </a:t>
+            </a:r>
+            <a:r>
+              <a:rPr lang="de-DE" sz="1200" kern="1200" dirty="0" err="1" smtClean="0">
+                <a:solidFill>
+                  <a:schemeClr val="tx1"/>
+                </a:solidFill>
+                <a:effectLst/>
+                <a:latin typeface="+mn-lt"/>
+                <a:ea typeface="+mn-ea"/>
+                <a:cs typeface="+mn-cs"/>
+              </a:rPr>
+              <a:t>Social</a:t>
+            </a:r>
+            <a:r>
+              <a:rPr lang="de-DE" sz="1200" kern="1200" dirty="0" smtClean="0">
+                <a:solidFill>
+                  <a:schemeClr val="tx1"/>
+                </a:solidFill>
+                <a:effectLst/>
+                <a:latin typeface="+mn-lt"/>
+                <a:ea typeface="+mn-ea"/>
+                <a:cs typeface="+mn-cs"/>
+              </a:rPr>
+              <a:t>-Network-Anbieters positiv ist, d.h. ist der Benutzer dort authentifiziert wurde und die Benutzerdaten übermittelt worden sind. Kann der Benutzer nicht über den </a:t>
+            </a:r>
+            <a:r>
+              <a:rPr lang="de-DE" sz="1200" kern="1200" dirty="0" err="1" smtClean="0">
+                <a:solidFill>
+                  <a:schemeClr val="tx1"/>
+                </a:solidFill>
+                <a:effectLst/>
+                <a:latin typeface="+mn-lt"/>
+                <a:ea typeface="+mn-ea"/>
+                <a:cs typeface="+mn-cs"/>
+              </a:rPr>
+              <a:t>Social</a:t>
+            </a:r>
+            <a:r>
+              <a:rPr lang="de-DE" sz="1200" kern="1200" dirty="0" smtClean="0">
+                <a:solidFill>
+                  <a:schemeClr val="tx1"/>
+                </a:solidFill>
+                <a:effectLst/>
+                <a:latin typeface="+mn-lt"/>
+                <a:ea typeface="+mn-ea"/>
+                <a:cs typeface="+mn-cs"/>
+              </a:rPr>
+              <a:t>-Network-Anbieter authentifiziert werden, erfolgt auch keine Anmeldung.</a:t>
+            </a:r>
+          </a:p>
+          <a:p>
+            <a:r>
+              <a:rPr lang="de-DE" sz="1200" kern="1200" dirty="0" smtClean="0">
+                <a:solidFill>
+                  <a:schemeClr val="tx1"/>
+                </a:solidFill>
+                <a:effectLst/>
+                <a:latin typeface="+mn-lt"/>
+                <a:ea typeface="+mn-ea"/>
+                <a:cs typeface="+mn-cs"/>
+              </a:rPr>
+              <a:t/>
+            </a:r>
+            <a:br>
+              <a:rPr lang="de-DE" sz="1200" kern="1200" dirty="0" smtClean="0">
+                <a:solidFill>
+                  <a:schemeClr val="tx1"/>
+                </a:solidFill>
+                <a:effectLst/>
+                <a:latin typeface="+mn-lt"/>
+                <a:ea typeface="+mn-ea"/>
+                <a:cs typeface="+mn-cs"/>
+              </a:rPr>
+            </a:br>
+            <a:r>
+              <a:rPr lang="de-DE" sz="1200" kern="1200" dirty="0" smtClean="0">
+                <a:solidFill>
+                  <a:schemeClr val="tx1"/>
+                </a:solidFill>
+                <a:effectLst/>
+                <a:latin typeface="+mn-lt"/>
+                <a:ea typeface="+mn-ea"/>
+                <a:cs typeface="+mn-cs"/>
+              </a:rPr>
+              <a:t>@FSM:  Updaten</a:t>
+            </a:r>
+          </a:p>
+          <a:p>
             <a:endParaRPr lang="de-DE" dirty="0"/>
           </a:p>
         </p:txBody>
@@ -2495,19 +2954,19 @@
           <a:bodyPr/>
           <a:lstStyle/>
           <a:p>
-            <a:fld id="{1EBFF01C-F984-4A51-AF10-254043F7C542}" type="slidenum">
-              <a:rPr lang="de-DE" smtClean="0"/>
+            <a:fld id="{F7EBFB8C-BBFF-4397-A51C-1E92596422A9}" type="slidenum">
+              <a:rPr lang="en-US" smtClean="0"/>
               <a:pPr/>
               <a:t>6</a:t>
             </a:fld>
-            <a:endParaRPr lang="de-DE"/>
+            <a:endParaRPr lang="en-US" dirty="0"/>
           </a:p>
         </p:txBody>
       </p:sp>
     </p:spTree>
     <p:extLst>
       <p:ext uri="{BB962C8B-B14F-4D97-AF65-F5344CB8AC3E}">
-        <p14:creationId xmlns:p14="http://schemas.microsoft.com/office/powerpoint/2010/main" val="3860513045"/>
+        <p14:creationId xmlns:p14="http://schemas.microsoft.com/office/powerpoint/2010/main" xmlns="" val="2934279750"/>
       </p:ext>
     </p:extLst>
   </p:cSld>
@@ -2561,40 +3020,6 @@
           <a:bodyPr/>
           <a:lstStyle/>
           <a:p>
-            <a:r>
-              <a:rPr lang="de-DE" dirty="0" smtClean="0"/>
-              <a:t>Ist evtl. überflüssig, da grob in </a:t>
-            </a:r>
-            <a:r>
-              <a:rPr lang="de-DE" dirty="0" err="1" smtClean="0"/>
-              <a:t>Zwischenpräsi</a:t>
-            </a:r>
-            <a:r>
-              <a:rPr lang="de-DE" dirty="0" smtClean="0"/>
-              <a:t> erwähnt?</a:t>
-            </a:r>
-          </a:p>
-          <a:p>
-            <a:r>
-              <a:rPr lang="de-DE" dirty="0" smtClean="0"/>
-              <a:t>Können wir </a:t>
-            </a:r>
-            <a:r>
-              <a:rPr lang="de-DE" dirty="0" err="1" smtClean="0"/>
-              <a:t>Roo</a:t>
-            </a:r>
-            <a:r>
-              <a:rPr lang="de-DE" baseline="0" dirty="0" smtClean="0"/>
-              <a:t> als Vorlage für die Agenda nehmen? Oder doch eher die technische Umsetzungsfolge </a:t>
-            </a:r>
-            <a:r>
-              <a:rPr lang="de-DE" baseline="0" dirty="0" err="1" smtClean="0"/>
-              <a:t>alá</a:t>
-            </a:r>
-            <a:r>
-              <a:rPr lang="de-DE" baseline="0" dirty="0" smtClean="0"/>
-              <a:t> RUP?</a:t>
-            </a:r>
             <a:endParaRPr lang="de-DE" dirty="0"/>
           </a:p>
         </p:txBody>
@@ -2614,19 +3039,19 @@
           <a:bodyPr/>
           <a:lstStyle/>
           <a:p>
-            <a:fld id="{F7EBFB8C-BBFF-4397-A51C-1E92596422A9}" type="slidenum">
-              <a:rPr lang="en-US" smtClean="0"/>
+            <a:fld id="{1EBFF01C-F984-4A51-AF10-254043F7C542}" type="slidenum">
+              <a:rPr lang="de-DE" smtClean="0"/>
               <a:pPr/>
-              <a:t>8</a:t>
+              <a:t>7</a:t>
             </a:fld>
-            <a:endParaRPr lang="en-US" dirty="0"/>
+            <a:endParaRPr lang="de-DE"/>
           </a:p>
         </p:txBody>
       </p:sp>
     </p:spTree>
     <p:extLst>
       <p:ext uri="{BB962C8B-B14F-4D97-AF65-F5344CB8AC3E}">
-        <p14:creationId xmlns:p14="http://schemas.microsoft.com/office/powerpoint/2010/main" val="135288531"/>
+        <p14:creationId xmlns:p14="http://schemas.microsoft.com/office/powerpoint/2010/main" xmlns="" val="3860513045"/>
       </p:ext>
     </p:extLst>
   </p:cSld>
@@ -2682,51 +3107,37 @@
           <a:p>
             <a:r>
               <a:rPr lang="de-DE" dirty="0" smtClean="0"/>
-              <a:t>Blau: Event </a:t>
+              <a:t>Ist evtl. überflüssig, da grob in </a:t>
             </a:r>
             <a:r>
               <a:rPr lang="de-DE" dirty="0" err="1" smtClean="0"/>
-              <a:t>anlage</a:t>
-            </a:r>
-            <a:endParaRPr lang="de-DE" dirty="0" smtClean="0"/>
-          </a:p>
-          <a:p>
-            <a:r>
-              <a:rPr lang="de-DE" dirty="0" smtClean="0"/>
-              <a:t>DB Table Event, </a:t>
+              <a:t>Zwischenpräsi</a:t>
+            </a:r>
+            <a:r>
+              <a:rPr lang="de-DE" dirty="0" smtClean="0"/>
+              <a:t> erwähnt?</a:t>
+            </a:r>
+          </a:p>
+          <a:p>
+            <a:r>
+              <a:rPr lang="de-DE" dirty="0" smtClean="0"/>
+              <a:t>Können wir </a:t>
             </a:r>
             <a:r>
               <a:rPr lang="de-DE" dirty="0" err="1" smtClean="0"/>
-              <a:t>normaliserte</a:t>
+              <a:t>Roo</a:t>
             </a:r>
             <a:r>
               <a:rPr lang="de-DE" baseline="0" dirty="0" smtClean="0"/>
-              <a:t> Teilnehmerliste und Ort</a:t>
-            </a:r>
-          </a:p>
-          <a:p>
-            <a:endParaRPr lang="de-DE" baseline="0" dirty="0" smtClean="0"/>
-          </a:p>
-          <a:p>
+              <a:t> als Vorlage für die Agenda nehmen? Oder doch eher die technische Umsetzungsfolge </a:t>
+            </a:r>
+            <a:r>
+              <a:rPr lang="de-DE" baseline="0" dirty="0" err="1" smtClean="0"/>
+              <a:t>alá</a:t>
+            </a:r>
             <a:r>
               <a:rPr lang="de-DE" baseline="0" dirty="0" smtClean="0"/>
-              <a:t>Rot: Login Verknüpfung Session ID aus </a:t>
-            </a:r>
-            <a:r>
-              <a:rPr lang="de-DE" baseline="0" dirty="0" err="1" smtClean="0"/>
-              <a:t>oAuth</a:t>
-            </a:r>
-            <a:r>
-              <a:rPr lang="de-DE" baseline="0" dirty="0" smtClean="0"/>
-              <a:t>, Grunddaten (</a:t>
-            </a:r>
-            <a:r>
-              <a:rPr lang="de-DE" baseline="0" dirty="0" err="1" smtClean="0"/>
-              <a:t>name</a:t>
-            </a:r>
-            <a:r>
-              <a:rPr lang="de-DE" baseline="0" dirty="0" smtClean="0"/>
-              <a:t>, E-Mail-Adresse etc.) werden ausgelesen und persistent gespeichert.</a:t>
+              <a:t> RUP?</a:t>
             </a:r>
             <a:endParaRPr lang="de-DE" dirty="0"/>
           </a:p>
@@ -2750,7 +3161,7 @@
             <a:fld id="{F7EBFB8C-BBFF-4397-A51C-1E92596422A9}" type="slidenum">
               <a:rPr lang="en-US" smtClean="0"/>
               <a:pPr/>
-              <a:t>11</a:t>
+              <a:t>9</a:t>
             </a:fld>
             <a:endParaRPr lang="en-US" dirty="0"/>
           </a:p>
@@ -2759,7 +3170,7 @@
     </p:spTree>
     <p:extLst>
       <p:ext uri="{BB962C8B-B14F-4D97-AF65-F5344CB8AC3E}">
-        <p14:creationId xmlns:p14="http://schemas.microsoft.com/office/powerpoint/2010/main" val="802076649"/>
+        <p14:creationId xmlns:p14="http://schemas.microsoft.com/office/powerpoint/2010/main" xmlns="" val="135288531"/>
       </p:ext>
     </p:extLst>
   </p:cSld>
@@ -2892,7 +3303,7 @@
     </p:spTree>
     <p:extLst>
       <p:ext uri="{BB962C8B-B14F-4D97-AF65-F5344CB8AC3E}">
-        <p14:creationId xmlns:p14="http://schemas.microsoft.com/office/powerpoint/2010/main" val="802076649"/>
+        <p14:creationId xmlns:p14="http://schemas.microsoft.com/office/powerpoint/2010/main" xmlns="" val="802076649"/>
       </p:ext>
     </p:extLst>
   </p:cSld>
@@ -7132,7 +7543,7 @@
           <a:blip r:embed="rId13" cstate="print">
             <a:extLst>
               <a:ext uri="{28A0092B-C50C-407E-A947-70E740481C1C}">
-                <a14:useLocalDpi xmlns:a14="http://schemas.microsoft.com/office/drawing/2010/main" val="0"/>
+                <a14:useLocalDpi xmlns:a14="http://schemas.microsoft.com/office/drawing/2010/main" xmlns="" val="0"/>
               </a:ext>
             </a:extLst>
           </a:blip>
@@ -7630,7 +8041,7 @@
           <a:blip r:embed="rId3" cstate="print">
             <a:extLst>
               <a:ext uri="{28A0092B-C50C-407E-A947-70E740481C1C}">
-                <a14:useLocalDpi xmlns:a14="http://schemas.microsoft.com/office/drawing/2010/main" val="0"/>
+                <a14:useLocalDpi xmlns:a14="http://schemas.microsoft.com/office/drawing/2010/main" xmlns="" val="0"/>
               </a:ext>
             </a:extLst>
           </a:blip>
@@ -7660,7 +8071,7 @@
           <a:blip r:embed="rId4" cstate="print">
             <a:extLst>
               <a:ext uri="{28A0092B-C50C-407E-A947-70E740481C1C}">
-                <a14:useLocalDpi xmlns:a14="http://schemas.microsoft.com/office/drawing/2010/main" val="0"/>
+                <a14:useLocalDpi xmlns:a14="http://schemas.microsoft.com/office/drawing/2010/main" xmlns="" val="0"/>
               </a:ext>
             </a:extLst>
           </a:blip>
@@ -7712,7 +8123,7 @@
       </p:grpSpPr>
       <p:sp>
         <p:nvSpPr>
-          <p:cNvPr id="10" name="Titel 9"/>
+          <p:cNvPr id="2" name="Titel 1"/>
           <p:cNvSpPr>
             <a:spLocks noGrp="1"/>
           </p:cNvSpPr>
@@ -7722,12 +8133,18 @@
         </p:nvSpPr>
         <p:spPr/>
         <p:txBody>
-          <a:bodyPr/>
+          <a:bodyPr>
+            <a:normAutofit/>
+          </a:bodyPr>
           <a:lstStyle/>
           <a:p>
             <a:r>
+              <a:rPr lang="de-DE" dirty="0" smtClean="0"/>
+              <a:t>Sequenzdiagramm Spring </a:t>
+            </a:r>
+            <a:r>
               <a:rPr lang="de-DE" dirty="0" err="1" smtClean="0"/>
-              <a:t>LiveDemo</a:t>
+              <a:t>Roo</a:t>
             </a:r>
             <a:endParaRPr lang="de-DE" dirty="0"/>
           </a:p>
@@ -7735,12 +8152,12 @@
       </p:sp>
       <p:sp>
         <p:nvSpPr>
-          <p:cNvPr id="11" name="Textplatzhalter 10"/>
-          <p:cNvSpPr>
-            <a:spLocks noGrp="1"/>
-          </p:cNvSpPr>
-          <p:nvPr>
-            <p:ph type="body" idx="1"/>
+          <p:cNvPr id="10" name="Inhaltsplatzhalter 9"/>
+          <p:cNvSpPr>
+            <a:spLocks noGrp="1"/>
+          </p:cNvSpPr>
+          <p:nvPr>
+            <p:ph idx="1"/>
           </p:nvPr>
         </p:nvSpPr>
         <p:spPr/>
@@ -7748,7 +8165,7 @@
           <a:bodyPr/>
           <a:lstStyle/>
           <a:p>
-            <a:endParaRPr lang="de-DE" dirty="0"/>
+            <a:endParaRPr lang="de-DE"/>
           </a:p>
         </p:txBody>
       </p:sp>
@@ -7823,11 +8240,6 @@
         </p:txBody>
       </p:sp>
     </p:spTree>
-    <p:extLst>
-      <p:ext uri="{BB962C8B-B14F-4D97-AF65-F5344CB8AC3E}">
-        <p14:creationId xmlns:p14="http://schemas.microsoft.com/office/powerpoint/2010/main" val="2634211947"/>
-      </p:ext>
-    </p:extLst>
   </p:cSld>
   <p:clrMapOvr>
     <a:masterClrMapping/>
@@ -7854,7 +8266,7 @@
       </p:grpSpPr>
       <p:sp>
         <p:nvSpPr>
-          <p:cNvPr id="2" name="Titel 1"/>
+          <p:cNvPr id="10" name="Titel 9"/>
           <p:cNvSpPr>
             <a:spLocks noGrp="1"/>
           </p:cNvSpPr>
@@ -7864,14 +8276,12 @@
         </p:nvSpPr>
         <p:spPr/>
         <p:txBody>
-          <a:bodyPr>
-            <a:normAutofit fontScale="90000"/>
-          </a:bodyPr>
+          <a:bodyPr/>
           <a:lstStyle/>
           <a:p>
             <a:r>
-              <a:rPr lang="de-DE" dirty="0" smtClean="0"/>
-              <a:t>Domänenklassendiagramm - Event</a:t>
+              <a:rPr lang="de-DE" dirty="0" err="1" smtClean="0"/>
+              <a:t>LiveDemo</a:t>
             </a:r>
             <a:endParaRPr lang="de-DE" dirty="0"/>
           </a:p>
@@ -7879,12 +8289,12 @@
       </p:sp>
       <p:sp>
         <p:nvSpPr>
-          <p:cNvPr id="3" name="Inhaltsplatzhalter 2"/>
-          <p:cNvSpPr>
-            <a:spLocks noGrp="1"/>
-          </p:cNvSpPr>
-          <p:nvPr>
-            <p:ph idx="1"/>
+          <p:cNvPr id="11" name="Textplatzhalter 10"/>
+          <p:cNvSpPr>
+            <a:spLocks noGrp="1"/>
+          </p:cNvSpPr>
+          <p:nvPr>
+            <p:ph type="body" idx="1"/>
           </p:nvPr>
         </p:nvSpPr>
         <p:spPr/>
@@ -7892,17 +8302,13 @@
           <a:bodyPr/>
           <a:lstStyle/>
           <a:p>
-            <a:r>
-              <a:rPr lang="de-DE" dirty="0" smtClean="0"/>
-              <a:t>TODO</a:t>
-            </a:r>
             <a:endParaRPr lang="de-DE" dirty="0"/>
           </a:p>
         </p:txBody>
       </p:sp>
       <p:sp>
         <p:nvSpPr>
-          <p:cNvPr id="4" name="Datumsplatzhalter 3"/>
+          <p:cNvPr id="7" name="Datumsplatzhalter 6"/>
           <p:cNvSpPr>
             <a:spLocks noGrp="1"/>
           </p:cNvSpPr>
@@ -7925,7 +8331,7 @@
       </p:sp>
       <p:sp>
         <p:nvSpPr>
-          <p:cNvPr id="5" name="Fußzeilenplatzhalter 4"/>
+          <p:cNvPr id="8" name="Fußzeilenplatzhalter 7"/>
           <p:cNvSpPr>
             <a:spLocks noGrp="1"/>
           </p:cNvSpPr>
@@ -7948,7 +8354,7 @@
       </p:sp>
       <p:sp>
         <p:nvSpPr>
-          <p:cNvPr id="6" name="Foliennummernplatzhalter 5"/>
+          <p:cNvPr id="9" name="Foliennummernplatzhalter 8"/>
           <p:cNvSpPr>
             <a:spLocks noGrp="1"/>
           </p:cNvSpPr>
@@ -7973,7 +8379,7 @@
     </p:spTree>
     <p:extLst>
       <p:ext uri="{BB962C8B-B14F-4D97-AF65-F5344CB8AC3E}">
-        <p14:creationId xmlns:p14="http://schemas.microsoft.com/office/powerpoint/2010/main" val="3243626544"/>
+        <p14:creationId xmlns:p14="http://schemas.microsoft.com/office/powerpoint/2010/main" xmlns="" val="2634211947"/>
       </p:ext>
     </p:extLst>
   </p:cSld>
@@ -8019,14 +8425,7 @@
           <a:p>
             <a:r>
               <a:rPr lang="de-DE" dirty="0" smtClean="0"/>
-              <a:t>Detailkonzept</a:t>
-            </a:r>
-            <a:br>
-              <a:rPr lang="de-DE" dirty="0" smtClean="0"/>
-            </a:br>
-            <a:r>
-              <a:rPr lang="de-DE" dirty="0" smtClean="0"/>
-              <a:t>Datenbankschema - Event</a:t>
+              <a:t>Domänenklassendiagramm - Event</a:t>
             </a:r>
             <a:endParaRPr lang="de-DE" dirty="0"/>
           </a:p>
@@ -8047,6 +8446,10 @@
           <a:bodyPr/>
           <a:lstStyle/>
           <a:p>
+            <a:r>
+              <a:rPr lang="de-DE" dirty="0" smtClean="0"/>
+              <a:t>TODO</a:t>
+            </a:r>
             <a:endParaRPr lang="de-DE" dirty="0"/>
           </a:p>
         </p:txBody>
@@ -8116,6 +8519,157 @@
               <a:rPr lang="en-US" smtClean="0"/>
               <a:pPr/>
               <a:t>12</a:t>
+            </a:fld>
+            <a:endParaRPr lang="en-US"/>
+          </a:p>
+        </p:txBody>
+      </p:sp>
+    </p:spTree>
+    <p:extLst>
+      <p:ext uri="{BB962C8B-B14F-4D97-AF65-F5344CB8AC3E}">
+        <p14:creationId xmlns:p14="http://schemas.microsoft.com/office/powerpoint/2010/main" xmlns="" val="3243626544"/>
+      </p:ext>
+    </p:extLst>
+  </p:cSld>
+  <p:clrMapOvr>
+    <a:masterClrMapping/>
+  </p:clrMapOvr>
+</p:sld>
+</file>
+
+<file path=ppt/slides/slide13.xml><?xml version="1.0" encoding="utf-8"?>
+<p:sld xmlns:a="http://schemas.openxmlformats.org/drawingml/2006/main" xmlns:r="http://schemas.openxmlformats.org/officeDocument/2006/relationships" xmlns:p="http://schemas.openxmlformats.org/presentationml/2006/main">
+  <p:cSld>
+    <p:spTree>
+      <p:nvGrpSpPr>
+        <p:cNvPr id="1" name=""/>
+        <p:cNvGrpSpPr/>
+        <p:nvPr/>
+      </p:nvGrpSpPr>
+      <p:grpSpPr>
+        <a:xfrm>
+          <a:off x="0" y="0"/>
+          <a:ext cx="0" cy="0"/>
+          <a:chOff x="0" y="0"/>
+          <a:chExt cx="0" cy="0"/>
+        </a:xfrm>
+      </p:grpSpPr>
+      <p:sp>
+        <p:nvSpPr>
+          <p:cNvPr id="2" name="Titel 1"/>
+          <p:cNvSpPr>
+            <a:spLocks noGrp="1"/>
+          </p:cNvSpPr>
+          <p:nvPr>
+            <p:ph type="title"/>
+          </p:nvPr>
+        </p:nvSpPr>
+        <p:spPr/>
+        <p:txBody>
+          <a:bodyPr>
+            <a:normAutofit fontScale="90000"/>
+          </a:bodyPr>
+          <a:lstStyle/>
+          <a:p>
+            <a:r>
+              <a:rPr lang="de-DE" dirty="0" smtClean="0"/>
+              <a:t>Detailkonzept</a:t>
+            </a:r>
+            <a:br>
+              <a:rPr lang="de-DE" dirty="0" smtClean="0"/>
+            </a:br>
+            <a:r>
+              <a:rPr lang="de-DE" dirty="0" smtClean="0"/>
+              <a:t>Datenbankschema - Event</a:t>
+            </a:r>
+            <a:endParaRPr lang="de-DE" dirty="0"/>
+          </a:p>
+        </p:txBody>
+      </p:sp>
+      <p:sp>
+        <p:nvSpPr>
+          <p:cNvPr id="3" name="Inhaltsplatzhalter 2"/>
+          <p:cNvSpPr>
+            <a:spLocks noGrp="1"/>
+          </p:cNvSpPr>
+          <p:nvPr>
+            <p:ph idx="1"/>
+          </p:nvPr>
+        </p:nvSpPr>
+        <p:spPr/>
+        <p:txBody>
+          <a:bodyPr/>
+          <a:lstStyle/>
+          <a:p>
+            <a:endParaRPr lang="de-DE" dirty="0"/>
+          </a:p>
+        </p:txBody>
+      </p:sp>
+      <p:sp>
+        <p:nvSpPr>
+          <p:cNvPr id="4" name="Datumsplatzhalter 3"/>
+          <p:cNvSpPr>
+            <a:spLocks noGrp="1"/>
+          </p:cNvSpPr>
+          <p:nvPr>
+            <p:ph type="dt" sz="half" idx="10"/>
+          </p:nvPr>
+        </p:nvSpPr>
+        <p:spPr/>
+        <p:txBody>
+          <a:bodyPr/>
+          <a:lstStyle/>
+          <a:p>
+            <a:r>
+              <a:rPr lang="de-DE" smtClean="0"/>
+              <a:t>21.04.2012</a:t>
+            </a:r>
+            <a:endParaRPr lang="en-US"/>
+          </a:p>
+        </p:txBody>
+      </p:sp>
+      <p:sp>
+        <p:nvSpPr>
+          <p:cNvPr id="5" name="Fußzeilenplatzhalter 4"/>
+          <p:cNvSpPr>
+            <a:spLocks noGrp="1"/>
+          </p:cNvSpPr>
+          <p:nvPr>
+            <p:ph type="ftr" sz="quarter" idx="11"/>
+          </p:nvPr>
+        </p:nvSpPr>
+        <p:spPr/>
+        <p:txBody>
+          <a:bodyPr/>
+          <a:lstStyle/>
+          <a:p>
+            <a:r>
+              <a:rPr lang="de-DE" smtClean="0"/>
+              <a:t>FST Projekt "Eventalizer" (SS 2012) Team 5</a:t>
+            </a:r>
+            <a:endParaRPr lang="de-DE" dirty="0"/>
+          </a:p>
+        </p:txBody>
+      </p:sp>
+      <p:sp>
+        <p:nvSpPr>
+          <p:cNvPr id="6" name="Foliennummernplatzhalter 5"/>
+          <p:cNvSpPr>
+            <a:spLocks noGrp="1"/>
+          </p:cNvSpPr>
+          <p:nvPr>
+            <p:ph type="sldNum" sz="quarter" idx="12"/>
+          </p:nvPr>
+        </p:nvSpPr>
+        <p:spPr/>
+        <p:txBody>
+          <a:bodyPr/>
+          <a:lstStyle/>
+          <a:p>
+            <a:fld id="{990B41CA-569D-40E7-8E58-026C0338B2C8}" type="slidenum">
+              <a:rPr lang="en-US" smtClean="0"/>
+              <a:pPr/>
+              <a:t>13</a:t>
             </a:fld>
             <a:endParaRPr lang="en-US"/>
           </a:p>
@@ -8133,7 +8687,7 @@
           <a:blip r:embed="rId3" cstate="print">
             <a:extLst>
               <a:ext uri="{28A0092B-C50C-407E-A947-70E740481C1C}">
-                <a14:useLocalDpi xmlns:a14="http://schemas.microsoft.com/office/drawing/2010/main" val="0"/>
+                <a14:useLocalDpi xmlns:a14="http://schemas.microsoft.com/office/drawing/2010/main" xmlns="" val="0"/>
               </a:ext>
             </a:extLst>
           </a:blip>
@@ -8157,14 +8711,14 @@
           <a:effectLst/>
           <a:extLst>
             <a:ext uri="{909E8E84-426E-40DD-AFC4-6F175D3DCCD1}">
-              <a14:hiddenFill xmlns:a14="http://schemas.microsoft.com/office/drawing/2010/main">
+              <a14:hiddenFill xmlns:a14="http://schemas.microsoft.com/office/drawing/2010/main" xmlns="">
                 <a:solidFill>
                   <a:schemeClr val="accent1"/>
                 </a:solidFill>
               </a14:hiddenFill>
             </a:ext>
             <a:ext uri="{91240B29-F687-4F45-9708-019B960494DF}">
-              <a14:hiddenLine xmlns:a14="http://schemas.microsoft.com/office/drawing/2010/main" w="9525">
+              <a14:hiddenLine xmlns:a14="http://schemas.microsoft.com/office/drawing/2010/main" xmlns="" w="9525">
                 <a:solidFill>
                   <a:schemeClr val="tx1"/>
                 </a:solidFill>
@@ -8174,7 +8728,7 @@
               </a14:hiddenLine>
             </a:ext>
             <a:ext uri="{AF507438-7753-43E0-B8FC-AC1667EBCBE1}">
-              <a14:hiddenEffects xmlns:a14="http://schemas.microsoft.com/office/drawing/2010/main">
+              <a14:hiddenEffects xmlns:a14="http://schemas.microsoft.com/office/drawing/2010/main" xmlns="">
                 <a:effectLst>
                   <a:outerShdw dist="35921" dir="2700000" algn="ctr" rotWithShape="0">
                     <a:schemeClr val="bg2"/>
@@ -8309,211 +8863,9 @@
     </p:spTree>
     <p:extLst>
       <p:ext uri="{BB962C8B-B14F-4D97-AF65-F5344CB8AC3E}">
-        <p14:creationId xmlns:p14="http://schemas.microsoft.com/office/powerpoint/2010/main" val="3243626544"/>
+        <p14:creationId xmlns:p14="http://schemas.microsoft.com/office/powerpoint/2010/main" xmlns="" val="3243626544"/>
       </p:ext>
     </p:extLst>
-  </p:cSld>
-  <p:clrMapOvr>
-    <a:masterClrMapping/>
-  </p:clrMapOvr>
-</p:sld>
-</file>
-
-<file path=ppt/slides/slide13.xml><?xml version="1.0" encoding="utf-8"?>
-<p:sld xmlns:a="http://schemas.openxmlformats.org/drawingml/2006/main" xmlns:r="http://schemas.openxmlformats.org/officeDocument/2006/relationships" xmlns:p="http://schemas.openxmlformats.org/presentationml/2006/main">
-  <p:cSld>
-    <p:spTree>
-      <p:nvGrpSpPr>
-        <p:cNvPr id="1" name=""/>
-        <p:cNvGrpSpPr/>
-        <p:nvPr/>
-      </p:nvGrpSpPr>
-      <p:grpSpPr>
-        <a:xfrm>
-          <a:off x="0" y="0"/>
-          <a:ext cx="0" cy="0"/>
-          <a:chOff x="0" y="0"/>
-          <a:chExt cx="0" cy="0"/>
-        </a:xfrm>
-      </p:grpSpPr>
-      <p:sp>
-        <p:nvSpPr>
-          <p:cNvPr id="2" name="Titel 1"/>
-          <p:cNvSpPr>
-            <a:spLocks noGrp="1"/>
-          </p:cNvSpPr>
-          <p:nvPr>
-            <p:ph type="title"/>
-          </p:nvPr>
-        </p:nvSpPr>
-        <p:spPr/>
-        <p:txBody>
-          <a:bodyPr/>
-          <a:lstStyle/>
-          <a:p>
-            <a:r>
-              <a:rPr lang="de-DE" dirty="0" smtClean="0"/>
-              <a:t>Zusätzlich</a:t>
-            </a:r>
-            <a:endParaRPr lang="de-DE" dirty="0"/>
-          </a:p>
-        </p:txBody>
-      </p:sp>
-      <p:sp>
-        <p:nvSpPr>
-          <p:cNvPr id="3" name="Inhaltsplatzhalter 2"/>
-          <p:cNvSpPr>
-            <a:spLocks noGrp="1"/>
-          </p:cNvSpPr>
-          <p:nvPr>
-            <p:ph idx="1"/>
-          </p:nvPr>
-        </p:nvSpPr>
-        <p:spPr/>
-        <p:txBody>
-          <a:bodyPr/>
-          <a:lstStyle/>
-          <a:p>
-            <a:r>
-              <a:rPr lang="de-DE" dirty="0" smtClean="0"/>
-              <a:t>Nicht funktionale Anforderungen = Qualitätsanforderungen</a:t>
-            </a:r>
-          </a:p>
-          <a:p>
-            <a:endParaRPr lang="de-DE" dirty="0" smtClean="0"/>
-          </a:p>
-          <a:p>
-            <a:r>
-              <a:rPr lang="de-DE" dirty="0" smtClean="0"/>
-              <a:t>Abnahmekriterien </a:t>
-            </a:r>
-            <a:r>
-              <a:rPr lang="de-DE" dirty="0" smtClean="0"/>
-              <a:t>-&gt; </a:t>
-            </a:r>
-            <a:r>
-              <a:rPr lang="de-DE" dirty="0" smtClean="0"/>
-              <a:t>PAW </a:t>
-            </a:r>
-            <a:r>
-              <a:rPr lang="de-DE" dirty="0" smtClean="0">
-                <a:sym typeface="Wingdings" pitchFamily="2" charset="2"/>
-              </a:rPr>
-              <a:t></a:t>
-            </a:r>
-          </a:p>
-          <a:p>
-            <a:endParaRPr lang="de-DE" dirty="0">
-              <a:sym typeface="Wingdings" pitchFamily="2" charset="2"/>
-            </a:endParaRPr>
-          </a:p>
-          <a:p>
-            <a:endParaRPr lang="de-DE" dirty="0" smtClean="0">
-              <a:sym typeface="Wingdings" pitchFamily="2" charset="2"/>
-            </a:endParaRPr>
-          </a:p>
-          <a:p>
-            <a:r>
-              <a:rPr lang="de-DE" dirty="0" err="1" smtClean="0">
-                <a:sym typeface="Wingdings" pitchFamily="2" charset="2"/>
-              </a:rPr>
-              <a:t>ToDo</a:t>
-            </a:r>
-            <a:r>
-              <a:rPr lang="de-DE" dirty="0" smtClean="0">
-                <a:sym typeface="Wingdings" pitchFamily="2" charset="2"/>
-              </a:rPr>
-              <a:t>:</a:t>
-            </a:r>
-          </a:p>
-          <a:p>
-            <a:r>
-              <a:rPr lang="de-DE" dirty="0" smtClean="0">
-                <a:sym typeface="Wingdings" pitchFamily="2" charset="2"/>
-              </a:rPr>
-              <a:t>Topics aus unsere LH/PH für Qualitätsanforderungen </a:t>
-            </a:r>
-            <a:r>
-              <a:rPr lang="de-DE" dirty="0" err="1" smtClean="0">
-                <a:sym typeface="Wingdings" pitchFamily="2" charset="2"/>
-              </a:rPr>
-              <a:t>copy&amp;pasten</a:t>
-            </a:r>
-            <a:endParaRPr lang="de-DE" dirty="0"/>
-          </a:p>
-        </p:txBody>
-      </p:sp>
-      <p:sp>
-        <p:nvSpPr>
-          <p:cNvPr id="4" name="Datumsplatzhalter 3"/>
-          <p:cNvSpPr>
-            <a:spLocks noGrp="1"/>
-          </p:cNvSpPr>
-          <p:nvPr>
-            <p:ph type="dt" sz="half" idx="10"/>
-          </p:nvPr>
-        </p:nvSpPr>
-        <p:spPr/>
-        <p:txBody>
-          <a:bodyPr/>
-          <a:lstStyle/>
-          <a:p>
-            <a:r>
-              <a:rPr lang="de-DE" smtClean="0"/>
-              <a:t>21.04.2012</a:t>
-            </a:r>
-            <a:endParaRPr lang="en-US"/>
-          </a:p>
-        </p:txBody>
-      </p:sp>
-      <p:sp>
-        <p:nvSpPr>
-          <p:cNvPr id="5" name="Fußzeilenplatzhalter 4"/>
-          <p:cNvSpPr>
-            <a:spLocks noGrp="1"/>
-          </p:cNvSpPr>
-          <p:nvPr>
-            <p:ph type="ftr" sz="quarter" idx="11"/>
-          </p:nvPr>
-        </p:nvSpPr>
-        <p:spPr/>
-        <p:txBody>
-          <a:bodyPr/>
-          <a:lstStyle/>
-          <a:p>
-            <a:r>
-              <a:rPr lang="de-DE" smtClean="0"/>
-              <a:t>FST Projekt "Eventalizer" (SS 2012) Team 5</a:t>
-            </a:r>
-            <a:endParaRPr lang="de-DE" dirty="0"/>
-          </a:p>
-        </p:txBody>
-      </p:sp>
-      <p:sp>
-        <p:nvSpPr>
-          <p:cNvPr id="6" name="Foliennummernplatzhalter 5"/>
-          <p:cNvSpPr>
-            <a:spLocks noGrp="1"/>
-          </p:cNvSpPr>
-          <p:nvPr>
-            <p:ph type="sldNum" sz="quarter" idx="12"/>
-          </p:nvPr>
-        </p:nvSpPr>
-        <p:spPr/>
-        <p:txBody>
-          <a:bodyPr/>
-          <a:lstStyle/>
-          <a:p>
-            <a:fld id="{990B41CA-569D-40E7-8E58-026C0338B2C8}" type="slidenum">
-              <a:rPr lang="en-US" smtClean="0"/>
-              <a:pPr/>
-              <a:t>13</a:t>
-            </a:fld>
-            <a:endParaRPr lang="en-US"/>
-          </a:p>
-        </p:txBody>
-      </p:sp>
-    </p:spTree>
   </p:cSld>
   <p:clrMapOvr>
     <a:masterClrMapping/>
@@ -8555,6 +8907,200 @@
           <a:p>
             <a:r>
               <a:rPr lang="de-DE" dirty="0" smtClean="0"/>
+              <a:t>Zusätzlich</a:t>
+            </a:r>
+            <a:endParaRPr lang="de-DE" dirty="0"/>
+          </a:p>
+        </p:txBody>
+      </p:sp>
+      <p:sp>
+        <p:nvSpPr>
+          <p:cNvPr id="3" name="Inhaltsplatzhalter 2"/>
+          <p:cNvSpPr>
+            <a:spLocks noGrp="1"/>
+          </p:cNvSpPr>
+          <p:nvPr>
+            <p:ph idx="1"/>
+          </p:nvPr>
+        </p:nvSpPr>
+        <p:spPr/>
+        <p:txBody>
+          <a:bodyPr/>
+          <a:lstStyle/>
+          <a:p>
+            <a:r>
+              <a:rPr lang="de-DE" dirty="0" smtClean="0"/>
+              <a:t>Nicht funktionale Anforderungen = Qualitätsanforderungen</a:t>
+            </a:r>
+          </a:p>
+          <a:p>
+            <a:endParaRPr lang="de-DE" dirty="0" smtClean="0"/>
+          </a:p>
+          <a:p>
+            <a:r>
+              <a:rPr lang="de-DE" dirty="0" smtClean="0"/>
+              <a:t>Abnahmekriterien -&gt; PAW </a:t>
+            </a:r>
+            <a:r>
+              <a:rPr lang="de-DE" dirty="0" smtClean="0">
+                <a:sym typeface="Wingdings" pitchFamily="2" charset="2"/>
+              </a:rPr>
+              <a:t></a:t>
+            </a:r>
+          </a:p>
+          <a:p>
+            <a:endParaRPr lang="de-DE" dirty="0">
+              <a:sym typeface="Wingdings" pitchFamily="2" charset="2"/>
+            </a:endParaRPr>
+          </a:p>
+          <a:p>
+            <a:endParaRPr lang="de-DE" dirty="0" smtClean="0">
+              <a:sym typeface="Wingdings" pitchFamily="2" charset="2"/>
+            </a:endParaRPr>
+          </a:p>
+          <a:p>
+            <a:r>
+              <a:rPr lang="de-DE" dirty="0" err="1" smtClean="0">
+                <a:sym typeface="Wingdings" pitchFamily="2" charset="2"/>
+              </a:rPr>
+              <a:t>ToDo</a:t>
+            </a:r>
+            <a:r>
+              <a:rPr lang="de-DE" dirty="0" smtClean="0">
+                <a:sym typeface="Wingdings" pitchFamily="2" charset="2"/>
+              </a:rPr>
+              <a:t>:</a:t>
+            </a:r>
+          </a:p>
+          <a:p>
+            <a:r>
+              <a:rPr lang="de-DE" dirty="0" smtClean="0">
+                <a:sym typeface="Wingdings" pitchFamily="2" charset="2"/>
+              </a:rPr>
+              <a:t>Topics aus unsere LH/PH für Qualitätsanforderungen </a:t>
+            </a:r>
+            <a:r>
+              <a:rPr lang="de-DE" dirty="0" err="1" smtClean="0">
+                <a:sym typeface="Wingdings" pitchFamily="2" charset="2"/>
+              </a:rPr>
+              <a:t>copy&amp;pasten</a:t>
+            </a:r>
+            <a:endParaRPr lang="de-DE" dirty="0"/>
+          </a:p>
+        </p:txBody>
+      </p:sp>
+      <p:sp>
+        <p:nvSpPr>
+          <p:cNvPr id="4" name="Datumsplatzhalter 3"/>
+          <p:cNvSpPr>
+            <a:spLocks noGrp="1"/>
+          </p:cNvSpPr>
+          <p:nvPr>
+            <p:ph type="dt" sz="half" idx="10"/>
+          </p:nvPr>
+        </p:nvSpPr>
+        <p:spPr/>
+        <p:txBody>
+          <a:bodyPr/>
+          <a:lstStyle/>
+          <a:p>
+            <a:r>
+              <a:rPr lang="de-DE" smtClean="0"/>
+              <a:t>21.04.2012</a:t>
+            </a:r>
+            <a:endParaRPr lang="en-US"/>
+          </a:p>
+        </p:txBody>
+      </p:sp>
+      <p:sp>
+        <p:nvSpPr>
+          <p:cNvPr id="5" name="Fußzeilenplatzhalter 4"/>
+          <p:cNvSpPr>
+            <a:spLocks noGrp="1"/>
+          </p:cNvSpPr>
+          <p:nvPr>
+            <p:ph type="ftr" sz="quarter" idx="11"/>
+          </p:nvPr>
+        </p:nvSpPr>
+        <p:spPr/>
+        <p:txBody>
+          <a:bodyPr/>
+          <a:lstStyle/>
+          <a:p>
+            <a:r>
+              <a:rPr lang="de-DE" smtClean="0"/>
+              <a:t>FST Projekt "Eventalizer" (SS 2012) Team 5</a:t>
+            </a:r>
+            <a:endParaRPr lang="de-DE" dirty="0"/>
+          </a:p>
+        </p:txBody>
+      </p:sp>
+      <p:sp>
+        <p:nvSpPr>
+          <p:cNvPr id="6" name="Foliennummernplatzhalter 5"/>
+          <p:cNvSpPr>
+            <a:spLocks noGrp="1"/>
+          </p:cNvSpPr>
+          <p:nvPr>
+            <p:ph type="sldNum" sz="quarter" idx="12"/>
+          </p:nvPr>
+        </p:nvSpPr>
+        <p:spPr/>
+        <p:txBody>
+          <a:bodyPr/>
+          <a:lstStyle/>
+          <a:p>
+            <a:fld id="{990B41CA-569D-40E7-8E58-026C0338B2C8}" type="slidenum">
+              <a:rPr lang="en-US" smtClean="0"/>
+              <a:pPr/>
+              <a:t>14</a:t>
+            </a:fld>
+            <a:endParaRPr lang="en-US"/>
+          </a:p>
+        </p:txBody>
+      </p:sp>
+    </p:spTree>
+  </p:cSld>
+  <p:clrMapOvr>
+    <a:masterClrMapping/>
+  </p:clrMapOvr>
+</p:sld>
+</file>
+
+<file path=ppt/slides/slide15.xml><?xml version="1.0" encoding="utf-8"?>
+<p:sld xmlns:a="http://schemas.openxmlformats.org/drawingml/2006/main" xmlns:r="http://schemas.openxmlformats.org/officeDocument/2006/relationships" xmlns:p="http://schemas.openxmlformats.org/presentationml/2006/main">
+  <p:cSld>
+    <p:spTree>
+      <p:nvGrpSpPr>
+        <p:cNvPr id="1" name=""/>
+        <p:cNvGrpSpPr/>
+        <p:nvPr/>
+      </p:nvGrpSpPr>
+      <p:grpSpPr>
+        <a:xfrm>
+          <a:off x="0" y="0"/>
+          <a:ext cx="0" cy="0"/>
+          <a:chOff x="0" y="0"/>
+          <a:chExt cx="0" cy="0"/>
+        </a:xfrm>
+      </p:grpSpPr>
+      <p:sp>
+        <p:nvSpPr>
+          <p:cNvPr id="2" name="Titel 1"/>
+          <p:cNvSpPr>
+            <a:spLocks noGrp="1"/>
+          </p:cNvSpPr>
+          <p:nvPr>
+            <p:ph type="title"/>
+          </p:nvPr>
+        </p:nvSpPr>
+        <p:spPr/>
+        <p:txBody>
+          <a:bodyPr/>
+          <a:lstStyle/>
+          <a:p>
+            <a:r>
+              <a:rPr lang="de-DE" dirty="0" smtClean="0"/>
               <a:t>Projektplan</a:t>
             </a:r>
             <a:endParaRPr lang="de-DE" dirty="0"/>
@@ -8659,7 +9205,7 @@
             <a:fld id="{6C6AE60A-B69C-4790-82F7-3882EDF23186}" type="slidenum">
               <a:rPr lang="de-DE" smtClean="0"/>
               <a:pPr/>
-              <a:t>14</a:t>
+              <a:t>15</a:t>
             </a:fld>
             <a:endParaRPr lang="de-DE" dirty="0"/>
           </a:p>
@@ -8703,7 +9249,7 @@
     </p:spTree>
     <p:extLst>
       <p:ext uri="{BB962C8B-B14F-4D97-AF65-F5344CB8AC3E}">
-        <p14:creationId xmlns:p14="http://schemas.microsoft.com/office/powerpoint/2010/main" val="1012322072"/>
+        <p14:creationId xmlns:p14="http://schemas.microsoft.com/office/powerpoint/2010/main" xmlns="" val="1012322072"/>
       </p:ext>
     </p:extLst>
   </p:cSld>
@@ -8720,7 +9266,7 @@
 </p:sld>
 </file>
 
-<file path=ppt/slides/slide15.xml><?xml version="1.0" encoding="utf-8"?>
+<file path=ppt/slides/slide16.xml><?xml version="1.0" encoding="utf-8"?>
 <p:sld xmlns:a="http://schemas.openxmlformats.org/drawingml/2006/main" xmlns:r="http://schemas.openxmlformats.org/officeDocument/2006/relationships" xmlns:p="http://schemas.openxmlformats.org/presentationml/2006/main">
   <p:cSld>
     <p:spTree>
@@ -8904,7 +9450,7 @@
             <a:fld id="{990B41CA-569D-40E7-8E58-026C0338B2C8}" type="slidenum">
               <a:rPr lang="en-US" smtClean="0"/>
               <a:pPr/>
-              <a:t>15</a:t>
+              <a:t>16</a:t>
             </a:fld>
             <a:endParaRPr lang="en-US"/>
           </a:p>
@@ -8922,7 +9468,7 @@
           <a:blip r:embed="rId2" cstate="print">
             <a:extLst>
               <a:ext uri="{BEBA8EAE-BF5A-486C-A8C5-ECC9F3942E4B}">
-                <a14:imgProps xmlns:a14="http://schemas.microsoft.com/office/drawing/2010/main">
+                <a14:imgProps xmlns:a14="http://schemas.microsoft.com/office/drawing/2010/main" xmlns="">
                   <a14:imgLayer r:embed="rId3">
                     <a14:imgEffect>
                       <a14:backgroundRemoval t="6057" b="22942" l="7000" r="29162"/>
@@ -8931,7 +9477,7 @@
                 </a14:imgProps>
               </a:ext>
               <a:ext uri="{28A0092B-C50C-407E-A947-70E740481C1C}">
-                <a14:useLocalDpi xmlns:a14="http://schemas.microsoft.com/office/drawing/2010/main" val="0"/>
+                <a14:useLocalDpi xmlns:a14="http://schemas.microsoft.com/office/drawing/2010/main" xmlns="" val="0"/>
               </a:ext>
             </a:extLst>
           </a:blip>
@@ -8949,7 +9495,7 @@
           <a:noFill/>
           <a:extLst>
             <a:ext uri="{909E8E84-426E-40DD-AFC4-6F175D3DCCD1}">
-              <a14:hiddenFill xmlns:a14="http://schemas.microsoft.com/office/drawing/2010/main">
+              <a14:hiddenFill xmlns:a14="http://schemas.microsoft.com/office/drawing/2010/main" xmlns="">
                 <a:solidFill>
                   <a:srgbClr val="FFFFFF"/>
                 </a:solidFill>
@@ -8970,7 +9516,7 @@
           <a:blip r:embed="rId2" cstate="print">
             <a:extLst>
               <a:ext uri="{BEBA8EAE-BF5A-486C-A8C5-ECC9F3942E4B}">
-                <a14:imgProps xmlns:a14="http://schemas.microsoft.com/office/drawing/2010/main">
+                <a14:imgProps xmlns:a14="http://schemas.microsoft.com/office/drawing/2010/main" xmlns="">
                   <a14:imgLayer r:embed="rId3">
                     <a14:imgEffect>
                       <a14:backgroundRemoval t="6057" b="22942" l="7000" r="29162"/>
@@ -8979,7 +9525,7 @@
                 </a14:imgProps>
               </a:ext>
               <a:ext uri="{28A0092B-C50C-407E-A947-70E740481C1C}">
-                <a14:useLocalDpi xmlns:a14="http://schemas.microsoft.com/office/drawing/2010/main" val="0"/>
+                <a14:useLocalDpi xmlns:a14="http://schemas.microsoft.com/office/drawing/2010/main" xmlns="" val="0"/>
               </a:ext>
             </a:extLst>
           </a:blip>
@@ -8997,7 +9543,7 @@
           <a:noFill/>
           <a:extLst>
             <a:ext uri="{909E8E84-426E-40DD-AFC4-6F175D3DCCD1}">
-              <a14:hiddenFill xmlns:a14="http://schemas.microsoft.com/office/drawing/2010/main">
+              <a14:hiddenFill xmlns:a14="http://schemas.microsoft.com/office/drawing/2010/main" xmlns="">
                 <a:solidFill>
                   <a:srgbClr val="FFFFFF"/>
                 </a:solidFill>
@@ -9009,7 +9555,7 @@
     </p:spTree>
     <p:extLst>
       <p:ext uri="{BB962C8B-B14F-4D97-AF65-F5344CB8AC3E}">
-        <p14:creationId xmlns:p14="http://schemas.microsoft.com/office/powerpoint/2010/main" val="2645794681"/>
+        <p14:creationId xmlns:p14="http://schemas.microsoft.com/office/powerpoint/2010/main" xmlns="" val="2645794681"/>
       </p:ext>
     </p:extLst>
   </p:cSld>
@@ -9019,7 +9565,7 @@
 </p:sld>
 </file>
 
-<file path=ppt/slides/slide16.xml><?xml version="1.0" encoding="utf-8"?>
+<file path=ppt/slides/slide17.xml><?xml version="1.0" encoding="utf-8"?>
 <p:sld xmlns:a="http://schemas.openxmlformats.org/drawingml/2006/main" xmlns:r="http://schemas.openxmlformats.org/officeDocument/2006/relationships" xmlns:p="http://schemas.openxmlformats.org/presentationml/2006/main">
   <p:cSld>
     <p:spTree>
@@ -9226,7 +9772,7 @@
             <a:fld id="{6C6AE60A-B69C-4790-82F7-3882EDF23186}" type="slidenum">
               <a:rPr lang="de-DE" smtClean="0"/>
               <a:pPr/>
-              <a:t>16</a:t>
+              <a:t>17</a:t>
             </a:fld>
             <a:endParaRPr lang="de-DE" dirty="0"/>
           </a:p>
@@ -9244,7 +9790,7 @@
           <a:blip r:embed="rId3" cstate="print">
             <a:extLst>
               <a:ext uri="{28A0092B-C50C-407E-A947-70E740481C1C}">
-                <a14:useLocalDpi xmlns:a14="http://schemas.microsoft.com/office/drawing/2010/main" val="0"/>
+                <a14:useLocalDpi xmlns:a14="http://schemas.microsoft.com/office/drawing/2010/main" xmlns="" val="0"/>
               </a:ext>
             </a:extLst>
           </a:blip>
@@ -9276,7 +9822,7 @@
           </a:effectLst>
           <a:extLst>
             <a:ext uri="{91240B29-F687-4F45-9708-019B960494DF}">
-              <a14:hiddenLine xmlns:a14="http://schemas.microsoft.com/office/drawing/2010/main" w="9525">
+              <a14:hiddenLine xmlns:a14="http://schemas.microsoft.com/office/drawing/2010/main" xmlns="" w="9525">
                 <a:solidFill>
                   <a:schemeClr val="tx1"/>
                 </a:solidFill>
@@ -9291,7 +9837,7 @@
     </p:spTree>
     <p:extLst>
       <p:ext uri="{BB962C8B-B14F-4D97-AF65-F5344CB8AC3E}">
-        <p14:creationId xmlns:p14="http://schemas.microsoft.com/office/powerpoint/2010/main" val="313312729"/>
+        <p14:creationId xmlns:p14="http://schemas.microsoft.com/office/powerpoint/2010/main" xmlns="" val="313312729"/>
       </p:ext>
     </p:extLst>
   </p:cSld>
@@ -9308,7 +9854,7 @@
 </p:sld>
 </file>
 
-<file path=ppt/slides/slide17.xml><?xml version="1.0" encoding="utf-8"?>
+<file path=ppt/slides/slide18.xml><?xml version="1.0" encoding="utf-8"?>
 <p:sld xmlns:a="http://schemas.openxmlformats.org/drawingml/2006/main" xmlns:r="http://schemas.openxmlformats.org/officeDocument/2006/relationships" xmlns:p="http://schemas.openxmlformats.org/presentationml/2006/main">
   <p:cSld>
     <p:spTree>
@@ -9392,7 +9938,7 @@
           <a:blip r:embed="rId3" cstate="print">
             <a:extLst>
               <a:ext uri="{28A0092B-C50C-407E-A947-70E740481C1C}">
-                <a14:useLocalDpi xmlns:a14="http://schemas.microsoft.com/office/drawing/2010/main" val="0"/>
+                <a14:useLocalDpi xmlns:a14="http://schemas.microsoft.com/office/drawing/2010/main" xmlns="" val="0"/>
               </a:ext>
             </a:extLst>
           </a:blip>
@@ -9422,7 +9968,7 @@
           <a:blip r:embed="rId4" cstate="print">
             <a:extLst>
               <a:ext uri="{28A0092B-C50C-407E-A947-70E740481C1C}">
-                <a14:useLocalDpi xmlns:a14="http://schemas.microsoft.com/office/drawing/2010/main" val="0"/>
+                <a14:useLocalDpi xmlns:a14="http://schemas.microsoft.com/office/drawing/2010/main" xmlns="" val="0"/>
               </a:ext>
             </a:extLst>
           </a:blip>
@@ -9443,7 +9989,7 @@
     </p:spTree>
     <p:extLst>
       <p:ext uri="{BB962C8B-B14F-4D97-AF65-F5344CB8AC3E}">
-        <p14:creationId xmlns:p14="http://schemas.microsoft.com/office/powerpoint/2010/main" val="2565098391"/>
+        <p14:creationId xmlns:p14="http://schemas.microsoft.com/office/powerpoint/2010/main" xmlns="" val="2565098391"/>
       </p:ext>
     </p:extLst>
   </p:cSld>
@@ -9546,11 +10092,7 @@
             <a:pPr lvl="3"/>
             <a:r>
               <a:rPr lang="de-DE" dirty="0" smtClean="0"/>
-              <a:t>LH -&gt; </a:t>
-            </a:r>
-            <a:r>
-              <a:rPr lang="de-DE" dirty="0" smtClean="0"/>
-              <a:t>PH (</a:t>
+              <a:t>LH -&gt; PH (</a:t>
             </a:r>
             <a:r>
               <a:rPr lang="de-DE" dirty="0" err="1" smtClean="0"/>
@@ -9558,11 +10100,7 @@
             </a:r>
             <a:r>
               <a:rPr lang="de-DE" dirty="0" smtClean="0"/>
-              <a:t>, Aktivitätsdiagramm, </a:t>
-            </a:r>
-            <a:r>
-              <a:rPr lang="de-DE" dirty="0" smtClean="0"/>
-              <a:t>Sequenz) -&gt; Live</a:t>
+              <a:t>, Aktivitätsdiagramm, Sequenz) -&gt; Live</a:t>
             </a:r>
           </a:p>
           <a:p>
@@ -9744,7 +10282,7 @@
     </p:spTree>
     <p:extLst>
       <p:ext uri="{BB962C8B-B14F-4D97-AF65-F5344CB8AC3E}">
-        <p14:creationId xmlns:p14="http://schemas.microsoft.com/office/powerpoint/2010/main" val="3616670450"/>
+        <p14:creationId xmlns:p14="http://schemas.microsoft.com/office/powerpoint/2010/main" xmlns="" val="3616670450"/>
       </p:ext>
     </p:extLst>
   </p:cSld>
@@ -9778,6 +10316,32 @@
           <a:chExt cx="0" cy="0"/>
         </a:xfrm>
       </p:grpSpPr>
+      <p:pic>
+        <p:nvPicPr>
+          <p:cNvPr id="1027" name="Picture 3" descr="C:\Users\Alexander\Desktop\Anwendungsfalldiagramm Benutzer und Eventfunktionen.png"/>
+          <p:cNvPicPr>
+            <a:picLocks noChangeAspect="1" noChangeArrowheads="1"/>
+          </p:cNvPicPr>
+          <p:nvPr/>
+        </p:nvPicPr>
+        <p:blipFill>
+          <a:blip r:embed="rId3" cstate="print"/>
+          <a:srcRect/>
+          <a:stretch>
+            <a:fillRect/>
+          </a:stretch>
+        </p:blipFill>
+        <p:spPr bwMode="auto">
+          <a:xfrm>
+            <a:off x="1475656" y="1268760"/>
+            <a:ext cx="5508000" cy="5173026"/>
+          </a:xfrm>
+          <a:prstGeom prst="rect">
+            <a:avLst/>
+          </a:prstGeom>
+          <a:noFill/>
+        </p:spPr>
+      </p:pic>
       <p:sp>
         <p:nvSpPr>
           <p:cNvPr id="2" name="Titel 1"/>
@@ -9796,46 +10360,13 @@
           <a:lstStyle/>
           <a:p>
             <a:r>
-              <a:rPr lang="de-DE" dirty="0" err="1" smtClean="0"/>
-              <a:t>Use</a:t>
-            </a:r>
-            <a:r>
-              <a:rPr lang="de-DE" dirty="0" smtClean="0"/>
-              <a:t>-Case</a:t>
+              <a:rPr lang="de-DE" dirty="0" smtClean="0"/>
+              <a:t>Anwendungsfalldiagramm</a:t>
             </a:r>
             <a:endParaRPr lang="de-DE" dirty="0"/>
           </a:p>
         </p:txBody>
       </p:sp>
-      <p:pic>
-        <p:nvPicPr>
-          <p:cNvPr id="9" name="Inhaltsplatzhalter 8"/>
-          <p:cNvPicPr>
-            <a:picLocks noGrp="1" noChangeAspect="1"/>
-          </p:cNvPicPr>
-          <p:nvPr>
-            <p:ph idx="1"/>
-          </p:nvPr>
-        </p:nvPicPr>
-        <p:blipFill>
-          <a:blip r:embed="rId3" cstate="print">
-            <a:extLst>
-              <a:ext uri="{28A0092B-C50C-407E-A947-70E740481C1C}">
-                <a14:useLocalDpi xmlns:a14="http://schemas.microsoft.com/office/drawing/2010/main" val="0"/>
-              </a:ext>
-            </a:extLst>
-          </a:blip>
-          <a:stretch>
-            <a:fillRect/>
-          </a:stretch>
-        </p:blipFill>
-        <p:spPr>
-          <a:xfrm>
-            <a:off x="1977015" y="1447800"/>
-            <a:ext cx="6415519" cy="4800600"/>
-          </a:xfrm>
-        </p:spPr>
-      </p:pic>
       <p:sp>
         <p:nvSpPr>
           <p:cNvPr id="4" name="Datumsplatzhalter 3"/>
@@ -9909,17 +10440,99 @@
     </p:spTree>
     <p:extLst>
       <p:ext uri="{BB962C8B-B14F-4D97-AF65-F5344CB8AC3E}">
-        <p14:creationId xmlns:p14="http://schemas.microsoft.com/office/powerpoint/2010/main" val="351671181"/>
+        <p14:creationId xmlns:p14="http://schemas.microsoft.com/office/powerpoint/2010/main" xmlns="" val="351671181"/>
       </p:ext>
     </p:extLst>
   </p:cSld>
   <p:clrMapOvr>
     <a:masterClrMapping/>
   </p:clrMapOvr>
+  <p:transition advClick="0" advTm="2000"/>
   <p:timing>
     <p:tnLst>
       <p:par>
-        <p:cTn id="1" dur="indefinite" restart="never" nodeType="tmRoot"/>
+        <p:cTn id="1" dur="indefinite" restart="never" nodeType="tmRoot">
+          <p:childTnLst>
+            <p:seq concurrent="1" nextAc="seek">
+              <p:cTn id="2" dur="indefinite" nodeType="mainSeq">
+                <p:childTnLst>
+                  <p:par>
+                    <p:cTn id="3" fill="hold">
+                      <p:stCondLst>
+                        <p:cond delay="indefinite"/>
+                      </p:stCondLst>
+                      <p:childTnLst>
+                        <p:par>
+                          <p:cTn id="4" fill="hold">
+                            <p:stCondLst>
+                              <p:cond delay="0"/>
+                            </p:stCondLst>
+                            <p:childTnLst>
+                              <p:par>
+                                <p:cTn id="5" presetID="6" presetClass="emph" presetSubtype="0" fill="hold" nodeType="clickEffect">
+                                  <p:stCondLst>
+                                    <p:cond delay="0"/>
+                                  </p:stCondLst>
+                                  <p:childTnLst>
+                                    <p:animScale>
+                                      <p:cBhvr>
+                                        <p:cTn id="6" dur="1000" fill="hold"/>
+                                        <p:tgtEl>
+                                          <p:spTgt spid="1027"/>
+                                        </p:tgtEl>
+                                      </p:cBhvr>
+                                      <p:by x="50000" y="50000"/>
+                                    </p:animScale>
+                                  </p:childTnLst>
+                                </p:cTn>
+                              </p:par>
+                              <p:par>
+                                <p:cTn id="7" presetID="0" presetClass="path" presetSubtype="0" accel="50000" decel="50000" fill="hold" nodeType="withEffect">
+                                  <p:stCondLst>
+                                    <p:cond delay="0"/>
+                                  </p:stCondLst>
+                                  <p:childTnLst>
+                                    <p:animMotion origin="layout" path="M 0 2.96296E-6 L -0.14358 -0.18797 " pathEditMode="relative" rAng="0" ptsTypes="AA">
+                                      <p:cBhvr>
+                                        <p:cTn id="8" dur="1000" fill="hold"/>
+                                        <p:tgtEl>
+                                          <p:spTgt spid="1027"/>
+                                        </p:tgtEl>
+                                        <p:attrNameLst>
+                                          <p:attrName>ppt_x</p:attrName>
+                                          <p:attrName>ppt_y</p:attrName>
+                                        </p:attrNameLst>
+                                      </p:cBhvr>
+                                      <p:rCtr x="-72" y="-94"/>
+                                    </p:animMotion>
+                                  </p:childTnLst>
+                                </p:cTn>
+                              </p:par>
+                            </p:childTnLst>
+                          </p:cTn>
+                        </p:par>
+                      </p:childTnLst>
+                    </p:cTn>
+                  </p:par>
+                </p:childTnLst>
+              </p:cTn>
+              <p:prevCondLst>
+                <p:cond evt="onPrev" delay="0">
+                  <p:tgtEl>
+                    <p:sldTgt/>
+                  </p:tgtEl>
+                </p:cond>
+              </p:prevCondLst>
+              <p:nextCondLst>
+                <p:cond evt="onNext" delay="0">
+                  <p:tgtEl>
+                    <p:sldTgt/>
+                  </p:tgtEl>
+                </p:cond>
+              </p:nextCondLst>
+            </p:seq>
+          </p:childTnLst>
+        </p:cTn>
       </p:par>
     </p:tnLst>
   </p:timing>
@@ -9943,6 +10556,32 @@
           <a:chExt cx="0" cy="0"/>
         </a:xfrm>
       </p:grpSpPr>
+      <p:pic>
+        <p:nvPicPr>
+          <p:cNvPr id="1027" name="Picture 3" descr="C:\Users\Alexander\Desktop\Anwendungsfalldiagramm Benutzer und Eventfunktionen.png"/>
+          <p:cNvPicPr>
+            <a:picLocks noChangeAspect="1" noChangeArrowheads="1"/>
+          </p:cNvPicPr>
+          <p:nvPr/>
+        </p:nvPicPr>
+        <p:blipFill>
+          <a:blip r:embed="rId3" cstate="print"/>
+          <a:srcRect/>
+          <a:stretch>
+            <a:fillRect/>
+          </a:stretch>
+        </p:blipFill>
+        <p:spPr bwMode="auto">
+          <a:xfrm>
+            <a:off x="1475656" y="1268765"/>
+            <a:ext cx="2628000" cy="2468173"/>
+          </a:xfrm>
+          <a:prstGeom prst="rect">
+            <a:avLst/>
+          </a:prstGeom>
+          <a:noFill/>
+        </p:spPr>
+      </p:pic>
       <p:sp>
         <p:nvSpPr>
           <p:cNvPr id="2" name="Titel 1"/>
@@ -9956,20 +10595,59 @@
         <p:spPr/>
         <p:txBody>
           <a:bodyPr>
-            <a:normAutofit fontScale="90000"/>
+            <a:normAutofit/>
           </a:bodyPr>
           <a:lstStyle/>
           <a:p>
             <a:r>
               <a:rPr lang="de-DE" dirty="0" smtClean="0"/>
-              <a:t>Lastenheft</a:t>
-            </a:r>
-            <a:br>
-              <a:rPr lang="de-DE" dirty="0" smtClean="0"/>
-            </a:br>
-            <a:r>
-              <a:rPr lang="de-DE" dirty="0" smtClean="0"/>
-              <a:t>funktionale Anforderungen</a:t>
+              <a:t>Anwendungsfalldiagramm</a:t>
+            </a:r>
+            <a:endParaRPr lang="de-DE" dirty="0"/>
+          </a:p>
+        </p:txBody>
+      </p:sp>
+      <p:sp>
+        <p:nvSpPr>
+          <p:cNvPr id="4" name="Datumsplatzhalter 3"/>
+          <p:cNvSpPr>
+            <a:spLocks noGrp="1"/>
+          </p:cNvSpPr>
+          <p:nvPr>
+            <p:ph type="dt" sz="half" idx="10"/>
+          </p:nvPr>
+        </p:nvSpPr>
+        <p:spPr/>
+        <p:txBody>
+          <a:bodyPr/>
+          <a:lstStyle/>
+          <a:p>
+            <a:r>
+              <a:rPr lang="de-DE" smtClean="0"/>
+              <a:t>21.04.2012</a:t>
+            </a:r>
+            <a:endParaRPr lang="en-US"/>
+          </a:p>
+        </p:txBody>
+      </p:sp>
+      <p:sp>
+        <p:nvSpPr>
+          <p:cNvPr id="5" name="Fußzeilenplatzhalter 4"/>
+          <p:cNvSpPr>
+            <a:spLocks noGrp="1"/>
+          </p:cNvSpPr>
+          <p:nvPr>
+            <p:ph type="ftr" sz="quarter" idx="11"/>
+          </p:nvPr>
+        </p:nvSpPr>
+        <p:spPr/>
+        <p:txBody>
+          <a:bodyPr/>
+          <a:lstStyle/>
+          <a:p>
+            <a:r>
+              <a:rPr lang="de-DE" smtClean="0"/>
+              <a:t>FST Projekt "Eventalizer" (SS 2012) Team 5</a:t>
             </a:r>
             <a:endParaRPr lang="de-DE" dirty="0"/>
           </a:p>
@@ -9999,21 +10677,220 @@
           </a:p>
         </p:txBody>
       </p:sp>
-      <p:sp>
-        <p:nvSpPr>
-          <p:cNvPr id="9" name="Inhaltsplatzhalter 8"/>
-          <p:cNvSpPr>
-            <a:spLocks noGrp="1"/>
-          </p:cNvSpPr>
-          <p:nvPr>
-            <p:ph idx="1"/>
-          </p:nvPr>
-        </p:nvSpPr>
-        <p:spPr/>
-        <p:txBody>
-          <a:bodyPr/>
+      <p:pic>
+        <p:nvPicPr>
+          <p:cNvPr id="2050" name="Picture 2" descr="C:\Users\Alexander\Desktop\Anwendungsfalldiagramm Benutzer und Eventfunktionen.png"/>
+          <p:cNvPicPr>
+            <a:picLocks noChangeAspect="1" noChangeArrowheads="1"/>
+          </p:cNvPicPr>
+          <p:nvPr/>
+        </p:nvPicPr>
+        <p:blipFill>
+          <a:blip r:embed="rId3" cstate="print"/>
+          <a:srcRect l="37173" t="41284" b="9873"/>
+          <a:stretch>
+            <a:fillRect/>
+          </a:stretch>
+        </p:blipFill>
+        <p:spPr bwMode="auto">
+          <a:xfrm>
+            <a:off x="4499992" y="2924944"/>
+            <a:ext cx="4536504" cy="3312368"/>
+          </a:xfrm>
+          <a:prstGeom prst="rect">
+            <a:avLst/>
+          </a:prstGeom>
+          <a:noFill/>
+          <a:ln w="25400">
+            <a:solidFill>
+              <a:schemeClr val="accent6"/>
+            </a:solidFill>
+          </a:ln>
+        </p:spPr>
+      </p:pic>
+      <p:sp>
+        <p:nvSpPr>
+          <p:cNvPr id="8" name="Rechteck 7"/>
+          <p:cNvSpPr/>
+          <p:nvPr/>
+        </p:nvSpPr>
+        <p:spPr>
+          <a:xfrm>
+            <a:off x="2411760" y="2276872"/>
+            <a:ext cx="1728192" cy="1224136"/>
+          </a:xfrm>
+          <a:prstGeom prst="rect">
+            <a:avLst/>
+          </a:prstGeom>
+          <a:noFill/>
+        </p:spPr>
+        <p:style>
+          <a:lnRef idx="2">
+            <a:schemeClr val="accent6"/>
+          </a:lnRef>
+          <a:fillRef idx="1">
+            <a:schemeClr val="lt1"/>
+          </a:fillRef>
+          <a:effectRef idx="0">
+            <a:schemeClr val="accent6"/>
+          </a:effectRef>
+          <a:fontRef idx="minor">
+            <a:schemeClr val="dk1"/>
+          </a:fontRef>
+        </p:style>
+        <p:txBody>
+          <a:bodyPr rtlCol="0" anchor="ctr"/>
           <a:lstStyle/>
           <a:p>
+            <a:pPr algn="ctr"/>
+            <a:endParaRPr lang="de-DE">
+              <a:solidFill>
+                <a:schemeClr val="dk1"/>
+              </a:solidFill>
+            </a:endParaRPr>
+          </a:p>
+        </p:txBody>
+      </p:sp>
+      <p:cxnSp>
+        <p:nvCxnSpPr>
+          <p:cNvPr id="11" name="Gerade Verbindung 10"/>
+          <p:cNvCxnSpPr/>
+          <p:nvPr/>
+        </p:nvCxnSpPr>
+        <p:spPr>
+          <a:xfrm>
+            <a:off x="4139952" y="2276872"/>
+            <a:ext cx="360040" cy="648072"/>
+          </a:xfrm>
+          <a:prstGeom prst="line">
+            <a:avLst/>
+          </a:prstGeom>
+          <a:noFill/>
+        </p:spPr>
+        <p:style>
+          <a:lnRef idx="2">
+            <a:schemeClr val="accent6"/>
+          </a:lnRef>
+          <a:fillRef idx="1">
+            <a:schemeClr val="lt1"/>
+          </a:fillRef>
+          <a:effectRef idx="0">
+            <a:schemeClr val="accent6"/>
+          </a:effectRef>
+          <a:fontRef idx="minor">
+            <a:schemeClr val="dk1"/>
+          </a:fontRef>
+        </p:style>
+      </p:cxnSp>
+      <p:cxnSp>
+        <p:nvCxnSpPr>
+          <p:cNvPr id="12" name="Gerade Verbindung 11"/>
+          <p:cNvCxnSpPr/>
+          <p:nvPr/>
+        </p:nvCxnSpPr>
+        <p:spPr>
+          <a:xfrm>
+            <a:off x="4139952" y="3501008"/>
+            <a:ext cx="360040" cy="2736304"/>
+          </a:xfrm>
+          <a:prstGeom prst="line">
+            <a:avLst/>
+          </a:prstGeom>
+          <a:noFill/>
+        </p:spPr>
+        <p:style>
+          <a:lnRef idx="2">
+            <a:schemeClr val="accent6"/>
+          </a:lnRef>
+          <a:fillRef idx="1">
+            <a:schemeClr val="lt1"/>
+          </a:fillRef>
+          <a:effectRef idx="0">
+            <a:schemeClr val="accent6"/>
+          </a:effectRef>
+          <a:fontRef idx="minor">
+            <a:schemeClr val="dk1"/>
+          </a:fontRef>
+        </p:style>
+      </p:cxnSp>
+      <p:sp>
+        <p:nvSpPr>
+          <p:cNvPr id="15" name="Rechteck 14"/>
+          <p:cNvSpPr/>
+          <p:nvPr/>
+        </p:nvSpPr>
+        <p:spPr>
+          <a:xfrm>
+            <a:off x="5220072" y="3861048"/>
+            <a:ext cx="1368152" cy="648072"/>
+          </a:xfrm>
+          <a:prstGeom prst="rect">
+            <a:avLst/>
+          </a:prstGeom>
+          <a:noFill/>
+        </p:spPr>
+        <p:style>
+          <a:lnRef idx="2">
+            <a:schemeClr val="accent1">
+              <a:shade val="50000"/>
+            </a:schemeClr>
+          </a:lnRef>
+          <a:fillRef idx="1">
+            <a:schemeClr val="accent1"/>
+          </a:fillRef>
+          <a:effectRef idx="0">
+            <a:schemeClr val="accent1"/>
+          </a:effectRef>
+          <a:fontRef idx="minor">
+            <a:schemeClr val="lt1"/>
+          </a:fontRef>
+        </p:style>
+        <p:txBody>
+          <a:bodyPr rtlCol="0" anchor="ctr"/>
+          <a:lstStyle/>
+          <a:p>
+            <a:pPr algn="ctr"/>
+            <a:endParaRPr lang="de-DE"/>
+          </a:p>
+        </p:txBody>
+      </p:sp>
+      <p:sp>
+        <p:nvSpPr>
+          <p:cNvPr id="25" name="Rechteck 24"/>
+          <p:cNvSpPr/>
+          <p:nvPr/>
+        </p:nvSpPr>
+        <p:spPr>
+          <a:xfrm>
+            <a:off x="4572000" y="5517232"/>
+            <a:ext cx="1368152" cy="648072"/>
+          </a:xfrm>
+          <a:prstGeom prst="rect">
+            <a:avLst/>
+          </a:prstGeom>
+          <a:noFill/>
+        </p:spPr>
+        <p:style>
+          <a:lnRef idx="2">
+            <a:schemeClr val="accent1">
+              <a:shade val="50000"/>
+            </a:schemeClr>
+          </a:lnRef>
+          <a:fillRef idx="1">
+            <a:schemeClr val="accent1"/>
+          </a:fillRef>
+          <a:effectRef idx="0">
+            <a:schemeClr val="accent1"/>
+          </a:effectRef>
+          <a:fontRef idx="minor">
+            <a:schemeClr val="lt1"/>
+          </a:fontRef>
+        </p:style>
+        <p:txBody>
+          <a:bodyPr rtlCol="0" anchor="ctr"/>
+          <a:lstStyle/>
+          <a:p>
+            <a:pPr algn="ctr"/>
             <a:endParaRPr lang="de-DE"/>
           </a:p>
         </p:txBody>
@@ -10021,13 +10898,20 @@
     </p:spTree>
     <p:extLst>
       <p:ext uri="{BB962C8B-B14F-4D97-AF65-F5344CB8AC3E}">
-        <p14:creationId xmlns:p14="http://schemas.microsoft.com/office/powerpoint/2010/main" val="2681693288"/>
+        <p14:creationId xmlns:p14="http://schemas.microsoft.com/office/powerpoint/2010/main" xmlns="" val="351671181"/>
       </p:ext>
     </p:extLst>
   </p:cSld>
   <p:clrMapOvr>
     <a:masterClrMapping/>
   </p:clrMapOvr>
+  <p:timing>
+    <p:tnLst>
+      <p:par>
+        <p:cTn id="1" dur="indefinite" restart="never" nodeType="tmRoot"/>
+      </p:par>
+    </p:tnLst>
+  </p:timing>
 </p:sld>
 </file>
 
@@ -10067,7 +10951,7 @@
           <a:p>
             <a:r>
               <a:rPr lang="de-DE" dirty="0" smtClean="0"/>
-              <a:t>Pflichtenheft</a:t>
+              <a:t>Lastenheft</a:t>
             </a:r>
             <a:br>
               <a:rPr lang="de-DE" dirty="0" smtClean="0"/>
@@ -10075,95 +10959,6 @@
             <a:r>
               <a:rPr lang="de-DE" dirty="0" smtClean="0"/>
               <a:t>funktionale Anforderungen</a:t>
-            </a:r>
-            <a:endParaRPr lang="de-DE" dirty="0"/>
-          </a:p>
-        </p:txBody>
-      </p:sp>
-      <p:sp>
-        <p:nvSpPr>
-          <p:cNvPr id="3" name="Inhaltsplatzhalter 2"/>
-          <p:cNvSpPr>
-            <a:spLocks noGrp="1"/>
-          </p:cNvSpPr>
-          <p:nvPr>
-            <p:ph idx="1"/>
-          </p:nvPr>
-        </p:nvSpPr>
-        <p:spPr/>
-        <p:txBody>
-          <a:bodyPr/>
-          <a:lstStyle/>
-          <a:p>
-            <a:r>
-              <a:rPr lang="de-DE" dirty="0" smtClean="0"/>
-              <a:t>F10 – Benutzerfunktionen:  Anmeldung</a:t>
-            </a:r>
-          </a:p>
-          <a:p>
-            <a:endParaRPr lang="de-DE" dirty="0"/>
-          </a:p>
-          <a:p>
-            <a:endParaRPr lang="de-DE" dirty="0" smtClean="0"/>
-          </a:p>
-          <a:p>
-            <a:endParaRPr lang="de-DE" dirty="0"/>
-          </a:p>
-          <a:p>
-            <a:r>
-              <a:rPr lang="de-DE" dirty="0" smtClean="0"/>
-              <a:t>F60 – Eventfunktionen: Event erstellen</a:t>
-            </a:r>
-          </a:p>
-          <a:p>
-            <a:endParaRPr lang="de-DE" dirty="0" smtClean="0"/>
-          </a:p>
-          <a:p>
-            <a:endParaRPr lang="de-DE" dirty="0"/>
-          </a:p>
-        </p:txBody>
-      </p:sp>
-      <p:sp>
-        <p:nvSpPr>
-          <p:cNvPr id="4" name="Datumsplatzhalter 3"/>
-          <p:cNvSpPr>
-            <a:spLocks noGrp="1"/>
-          </p:cNvSpPr>
-          <p:nvPr>
-            <p:ph type="dt" sz="half" idx="10"/>
-          </p:nvPr>
-        </p:nvSpPr>
-        <p:spPr/>
-        <p:txBody>
-          <a:bodyPr/>
-          <a:lstStyle/>
-          <a:p>
-            <a:r>
-              <a:rPr lang="de-DE" smtClean="0"/>
-              <a:t>21.04.2012</a:t>
-            </a:r>
-            <a:endParaRPr lang="en-US"/>
-          </a:p>
-        </p:txBody>
-      </p:sp>
-      <p:sp>
-        <p:nvSpPr>
-          <p:cNvPr id="5" name="Fußzeilenplatzhalter 4"/>
-          <p:cNvSpPr>
-            <a:spLocks noGrp="1"/>
-          </p:cNvSpPr>
-          <p:nvPr>
-            <p:ph type="ftr" sz="quarter" idx="11"/>
-          </p:nvPr>
-        </p:nvSpPr>
-        <p:spPr/>
-        <p:txBody>
-          <a:bodyPr/>
-          <a:lstStyle/>
-          <a:p>
-            <a:r>
-              <a:rPr lang="de-DE" smtClean="0"/>
-              <a:t>FST Projekt "Eventalizer" (SS 2012) Team 5</a:t>
             </a:r>
             <a:endParaRPr lang="de-DE" dirty="0"/>
           </a:p>
@@ -10188,6 +10983,207 @@
               <a:rPr lang="en-US" smtClean="0"/>
               <a:pPr/>
               <a:t>5</a:t>
+            </a:fld>
+            <a:endParaRPr lang="en-US"/>
+          </a:p>
+        </p:txBody>
+      </p:sp>
+      <p:sp>
+        <p:nvSpPr>
+          <p:cNvPr id="9" name="Inhaltsplatzhalter 8"/>
+          <p:cNvSpPr>
+            <a:spLocks noGrp="1"/>
+          </p:cNvSpPr>
+          <p:nvPr>
+            <p:ph idx="1"/>
+          </p:nvPr>
+        </p:nvSpPr>
+        <p:spPr/>
+        <p:txBody>
+          <a:bodyPr/>
+          <a:lstStyle/>
+          <a:p>
+            <a:endParaRPr lang="de-DE"/>
+          </a:p>
+        </p:txBody>
+      </p:sp>
+    </p:spTree>
+    <p:extLst>
+      <p:ext uri="{BB962C8B-B14F-4D97-AF65-F5344CB8AC3E}">
+        <p14:creationId xmlns:p14="http://schemas.microsoft.com/office/powerpoint/2010/main" xmlns="" val="2681693288"/>
+      </p:ext>
+    </p:extLst>
+  </p:cSld>
+  <p:clrMapOvr>
+    <a:masterClrMapping/>
+  </p:clrMapOvr>
+  <p:timing>
+    <p:tnLst>
+      <p:par>
+        <p:cTn id="1" dur="indefinite" restart="never" nodeType="tmRoot"/>
+      </p:par>
+    </p:tnLst>
+  </p:timing>
+</p:sld>
+</file>
+
+<file path=ppt/slides/slide6.xml><?xml version="1.0" encoding="utf-8"?>
+<p:sld xmlns:a="http://schemas.openxmlformats.org/drawingml/2006/main" xmlns:r="http://schemas.openxmlformats.org/officeDocument/2006/relationships" xmlns:p="http://schemas.openxmlformats.org/presentationml/2006/main">
+  <p:cSld>
+    <p:spTree>
+      <p:nvGrpSpPr>
+        <p:cNvPr id="1" name=""/>
+        <p:cNvGrpSpPr/>
+        <p:nvPr/>
+      </p:nvGrpSpPr>
+      <p:grpSpPr>
+        <a:xfrm>
+          <a:off x="0" y="0"/>
+          <a:ext cx="0" cy="0"/>
+          <a:chOff x="0" y="0"/>
+          <a:chExt cx="0" cy="0"/>
+        </a:xfrm>
+      </p:grpSpPr>
+      <p:sp>
+        <p:nvSpPr>
+          <p:cNvPr id="2" name="Titel 1"/>
+          <p:cNvSpPr>
+            <a:spLocks noGrp="1"/>
+          </p:cNvSpPr>
+          <p:nvPr>
+            <p:ph type="title"/>
+          </p:nvPr>
+        </p:nvSpPr>
+        <p:spPr/>
+        <p:txBody>
+          <a:bodyPr>
+            <a:normAutofit fontScale="90000"/>
+          </a:bodyPr>
+          <a:lstStyle/>
+          <a:p>
+            <a:r>
+              <a:rPr lang="de-DE" dirty="0" smtClean="0"/>
+              <a:t>Pflichtenheft</a:t>
+            </a:r>
+            <a:br>
+              <a:rPr lang="de-DE" dirty="0" smtClean="0"/>
+            </a:br>
+            <a:r>
+              <a:rPr lang="de-DE" dirty="0" smtClean="0"/>
+              <a:t>funktionale Anforderungen</a:t>
+            </a:r>
+            <a:endParaRPr lang="de-DE" dirty="0"/>
+          </a:p>
+        </p:txBody>
+      </p:sp>
+      <p:sp>
+        <p:nvSpPr>
+          <p:cNvPr id="3" name="Inhaltsplatzhalter 2"/>
+          <p:cNvSpPr>
+            <a:spLocks noGrp="1"/>
+          </p:cNvSpPr>
+          <p:nvPr>
+            <p:ph idx="1"/>
+          </p:nvPr>
+        </p:nvSpPr>
+        <p:spPr/>
+        <p:txBody>
+          <a:bodyPr/>
+          <a:lstStyle/>
+          <a:p>
+            <a:r>
+              <a:rPr lang="de-DE" dirty="0" smtClean="0"/>
+              <a:t>F10 – Benutzerfunktionen:  Anmeldung</a:t>
+            </a:r>
+          </a:p>
+          <a:p>
+            <a:endParaRPr lang="de-DE" dirty="0"/>
+          </a:p>
+          <a:p>
+            <a:endParaRPr lang="de-DE" dirty="0" smtClean="0"/>
+          </a:p>
+          <a:p>
+            <a:endParaRPr lang="de-DE" dirty="0"/>
+          </a:p>
+          <a:p>
+            <a:r>
+              <a:rPr lang="de-DE" dirty="0" smtClean="0"/>
+              <a:t>F60 – Eventfunktionen: Event erstellen</a:t>
+            </a:r>
+          </a:p>
+          <a:p>
+            <a:endParaRPr lang="de-DE" dirty="0" smtClean="0"/>
+          </a:p>
+          <a:p>
+            <a:endParaRPr lang="de-DE" dirty="0"/>
+          </a:p>
+        </p:txBody>
+      </p:sp>
+      <p:sp>
+        <p:nvSpPr>
+          <p:cNvPr id="4" name="Datumsplatzhalter 3"/>
+          <p:cNvSpPr>
+            <a:spLocks noGrp="1"/>
+          </p:cNvSpPr>
+          <p:nvPr>
+            <p:ph type="dt" sz="half" idx="10"/>
+          </p:nvPr>
+        </p:nvSpPr>
+        <p:spPr/>
+        <p:txBody>
+          <a:bodyPr/>
+          <a:lstStyle/>
+          <a:p>
+            <a:r>
+              <a:rPr lang="de-DE" smtClean="0"/>
+              <a:t>21.04.2012</a:t>
+            </a:r>
+            <a:endParaRPr lang="en-US"/>
+          </a:p>
+        </p:txBody>
+      </p:sp>
+      <p:sp>
+        <p:nvSpPr>
+          <p:cNvPr id="5" name="Fußzeilenplatzhalter 4"/>
+          <p:cNvSpPr>
+            <a:spLocks noGrp="1"/>
+          </p:cNvSpPr>
+          <p:nvPr>
+            <p:ph type="ftr" sz="quarter" idx="11"/>
+          </p:nvPr>
+        </p:nvSpPr>
+        <p:spPr/>
+        <p:txBody>
+          <a:bodyPr/>
+          <a:lstStyle/>
+          <a:p>
+            <a:r>
+              <a:rPr lang="de-DE" smtClean="0"/>
+              <a:t>FST Projekt "Eventalizer" (SS 2012) Team 5</a:t>
+            </a:r>
+            <a:endParaRPr lang="de-DE" dirty="0"/>
+          </a:p>
+        </p:txBody>
+      </p:sp>
+      <p:sp>
+        <p:nvSpPr>
+          <p:cNvPr id="6" name="Foliennummernplatzhalter 5"/>
+          <p:cNvSpPr>
+            <a:spLocks noGrp="1"/>
+          </p:cNvSpPr>
+          <p:nvPr>
+            <p:ph type="sldNum" sz="quarter" idx="12"/>
+          </p:nvPr>
+        </p:nvSpPr>
+        <p:spPr/>
+        <p:txBody>
+          <a:bodyPr/>
+          <a:lstStyle/>
+          <a:p>
+            <a:fld id="{990B41CA-569D-40E7-8E58-026C0338B2C8}" type="slidenum">
+              <a:rPr lang="en-US" smtClean="0"/>
+              <a:pPr/>
+              <a:t>6</a:t>
             </a:fld>
             <a:endParaRPr lang="en-US"/>
           </a:p>
@@ -10244,17 +11240,24 @@
     </p:spTree>
     <p:extLst>
       <p:ext uri="{BB962C8B-B14F-4D97-AF65-F5344CB8AC3E}">
-        <p14:creationId xmlns:p14="http://schemas.microsoft.com/office/powerpoint/2010/main" val="2681693288"/>
+        <p14:creationId xmlns:p14="http://schemas.microsoft.com/office/powerpoint/2010/main" xmlns="" val="2681693288"/>
       </p:ext>
     </p:extLst>
   </p:cSld>
   <p:clrMapOvr>
     <a:masterClrMapping/>
   </p:clrMapOvr>
+  <p:timing>
+    <p:tnLst>
+      <p:par>
+        <p:cTn id="1" dur="indefinite" restart="never" nodeType="tmRoot"/>
+      </p:par>
+    </p:tnLst>
+  </p:timing>
 </p:sld>
 </file>
 
-<file path=ppt/slides/slide6.xml><?xml version="1.0" encoding="utf-8"?>
+<file path=ppt/slides/slide7.xml><?xml version="1.0" encoding="utf-8"?>
 <p:sld xmlns:a="http://schemas.openxmlformats.org/drawingml/2006/main" xmlns:r="http://schemas.openxmlformats.org/officeDocument/2006/relationships" xmlns:p="http://schemas.openxmlformats.org/presentationml/2006/main">
   <p:cSld>
     <p:spTree>
@@ -10344,7 +11347,7 @@
             <a:fld id="{6C6AE60A-B69C-4790-82F7-3882EDF23186}" type="slidenum">
               <a:rPr lang="de-DE" smtClean="0"/>
               <a:pPr/>
-              <a:t>6</a:t>
+              <a:t>7</a:t>
             </a:fld>
             <a:endParaRPr lang="de-DE" dirty="0"/>
           </a:p>
@@ -10700,7 +11703,7 @@
     </p:spTree>
     <p:extLst>
       <p:ext uri="{BB962C8B-B14F-4D97-AF65-F5344CB8AC3E}">
-        <p14:creationId xmlns:p14="http://schemas.microsoft.com/office/powerpoint/2010/main" val="2857272158"/>
+        <p14:creationId xmlns:p14="http://schemas.microsoft.com/office/powerpoint/2010/main" xmlns="" val="2857272158"/>
       </p:ext>
     </p:extLst>
   </p:cSld>
@@ -10717,7 +11720,7 @@
 </p:sld>
 </file>
 
-<file path=ppt/slides/slide7.xml><?xml version="1.0" encoding="utf-8"?>
+<file path=ppt/slides/slide8.xml><?xml version="1.0" encoding="utf-8"?>
 <p:sld xmlns:a="http://schemas.openxmlformats.org/drawingml/2006/main" xmlns:r="http://schemas.openxmlformats.org/officeDocument/2006/relationships" xmlns:p="http://schemas.openxmlformats.org/presentationml/2006/main">
   <p:cSld>
     <p:spTree>
@@ -10875,7 +11878,7 @@
             <a:fld id="{990B41CA-569D-40E7-8E58-026C0338B2C8}" type="slidenum">
               <a:rPr lang="en-US" smtClean="0"/>
               <a:pPr/>
-              <a:t>7</a:t>
+              <a:t>8</a:t>
             </a:fld>
             <a:endParaRPr lang="en-US"/>
           </a:p>
@@ -10895,7 +11898,7 @@
           <a:blip r:embed="rId2" cstate="print">
             <a:extLst>
               <a:ext uri="{28A0092B-C50C-407E-A947-70E740481C1C}">
-                <a14:useLocalDpi xmlns:a14="http://schemas.microsoft.com/office/drawing/2010/main" val="0"/>
+                <a14:useLocalDpi xmlns:a14="http://schemas.microsoft.com/office/drawing/2010/main" xmlns="" val="0"/>
               </a:ext>
             </a:extLst>
           </a:blip>
@@ -10919,14 +11922,14 @@
           <a:effectLst/>
           <a:extLst>
             <a:ext uri="{909E8E84-426E-40DD-AFC4-6F175D3DCCD1}">
-              <a14:hiddenFill xmlns:a14="http://schemas.microsoft.com/office/drawing/2010/main">
+              <a14:hiddenFill xmlns:a14="http://schemas.microsoft.com/office/drawing/2010/main" xmlns="">
                 <a:solidFill>
                   <a:schemeClr val="accent1"/>
                 </a:solidFill>
               </a14:hiddenFill>
             </a:ext>
             <a:ext uri="{91240B29-F687-4F45-9708-019B960494DF}">
-              <a14:hiddenLine xmlns:a14="http://schemas.microsoft.com/office/drawing/2010/main" w="9525">
+              <a14:hiddenLine xmlns:a14="http://schemas.microsoft.com/office/drawing/2010/main" xmlns="" w="9525">
                 <a:solidFill>
                   <a:schemeClr val="tx1"/>
                 </a:solidFill>
@@ -10936,7 +11939,7 @@
               </a14:hiddenLine>
             </a:ext>
             <a:ext uri="{AF507438-7753-43E0-B8FC-AC1667EBCBE1}">
-              <a14:hiddenEffects xmlns:a14="http://schemas.microsoft.com/office/drawing/2010/main">
+              <a14:hiddenEffects xmlns:a14="http://schemas.microsoft.com/office/drawing/2010/main" xmlns="">
                 <a:effectLst>
                   <a:outerShdw dist="35921" dir="2700000" algn="ctr" rotWithShape="0">
                     <a:schemeClr val="bg2"/>
@@ -10961,7 +11964,7 @@
           <a:blip r:embed="rId3" cstate="print">
             <a:extLst>
               <a:ext uri="{28A0092B-C50C-407E-A947-70E740481C1C}">
-                <a14:useLocalDpi xmlns:a14="http://schemas.microsoft.com/office/drawing/2010/main" val="0"/>
+                <a14:useLocalDpi xmlns:a14="http://schemas.microsoft.com/office/drawing/2010/main" xmlns="" val="0"/>
               </a:ext>
             </a:extLst>
           </a:blip>
@@ -10985,14 +11988,14 @@
           <a:effectLst/>
           <a:extLst>
             <a:ext uri="{909E8E84-426E-40DD-AFC4-6F175D3DCCD1}">
-              <a14:hiddenFill xmlns:a14="http://schemas.microsoft.com/office/drawing/2010/main">
+              <a14:hiddenFill xmlns:a14="http://schemas.microsoft.com/office/drawing/2010/main" xmlns="">
                 <a:solidFill>
                   <a:schemeClr val="accent1"/>
                 </a:solidFill>
               </a14:hiddenFill>
             </a:ext>
             <a:ext uri="{91240B29-F687-4F45-9708-019B960494DF}">
-              <a14:hiddenLine xmlns:a14="http://schemas.microsoft.com/office/drawing/2010/main" w="9525">
+              <a14:hiddenLine xmlns:a14="http://schemas.microsoft.com/office/drawing/2010/main" xmlns="" w="9525">
                 <a:solidFill>
                   <a:schemeClr val="tx1"/>
                 </a:solidFill>
@@ -11002,7 +12005,7 @@
               </a14:hiddenLine>
             </a:ext>
             <a:ext uri="{AF507438-7753-43E0-B8FC-AC1667EBCBE1}">
-              <a14:hiddenEffects xmlns:a14="http://schemas.microsoft.com/office/drawing/2010/main">
+              <a14:hiddenEffects xmlns:a14="http://schemas.microsoft.com/office/drawing/2010/main" xmlns="">
                 <a:effectLst>
                   <a:outerShdw dist="35921" dir="2700000" algn="ctr" rotWithShape="0">
                     <a:schemeClr val="bg2"/>
@@ -11016,7 +12019,7 @@
     </p:spTree>
     <p:extLst>
       <p:ext uri="{BB962C8B-B14F-4D97-AF65-F5344CB8AC3E}">
-        <p14:creationId xmlns:p14="http://schemas.microsoft.com/office/powerpoint/2010/main" val="3542583579"/>
+        <p14:creationId xmlns:p14="http://schemas.microsoft.com/office/powerpoint/2010/main" xmlns="" val="3542583579"/>
       </p:ext>
     </p:extLst>
   </p:cSld>
@@ -11026,7 +12029,7 @@
 </p:sld>
 </file>
 
-<file path=ppt/slides/slide8.xml><?xml version="1.0" encoding="utf-8"?>
+<file path=ppt/slides/slide9.xml><?xml version="1.0" encoding="utf-8"?>
 <p:sld xmlns:a="http://schemas.openxmlformats.org/drawingml/2006/main" xmlns:r="http://schemas.openxmlformats.org/officeDocument/2006/relationships" xmlns:p="http://schemas.openxmlformats.org/presentationml/2006/main">
   <p:cSld>
     <p:spTree>
@@ -11130,7 +12133,7 @@
             <a:fld id="{990B41CA-569D-40E7-8E58-026C0338B2C8}" type="slidenum">
               <a:rPr lang="en-US" smtClean="0"/>
               <a:pPr/>
-              <a:t>8</a:t>
+              <a:t>9</a:t>
             </a:fld>
             <a:endParaRPr lang="en-US"/>
           </a:p>
@@ -11173,152 +12176,9 @@
     </p:spTree>
     <p:extLst>
       <p:ext uri="{BB962C8B-B14F-4D97-AF65-F5344CB8AC3E}">
-        <p14:creationId xmlns:p14="http://schemas.microsoft.com/office/powerpoint/2010/main" val="141785747"/>
+        <p14:creationId xmlns:p14="http://schemas.microsoft.com/office/powerpoint/2010/main" xmlns="" val="141785747"/>
       </p:ext>
     </p:extLst>
-  </p:cSld>
-  <p:clrMapOvr>
-    <a:masterClrMapping/>
-  </p:clrMapOvr>
-</p:sld>
-</file>
-
-<file path=ppt/slides/slide9.xml><?xml version="1.0" encoding="utf-8"?>
-<p:sld xmlns:a="http://schemas.openxmlformats.org/drawingml/2006/main" xmlns:r="http://schemas.openxmlformats.org/officeDocument/2006/relationships" xmlns:p="http://schemas.openxmlformats.org/presentationml/2006/main">
-  <p:cSld>
-    <p:spTree>
-      <p:nvGrpSpPr>
-        <p:cNvPr id="1" name=""/>
-        <p:cNvGrpSpPr/>
-        <p:nvPr/>
-      </p:nvGrpSpPr>
-      <p:grpSpPr>
-        <a:xfrm>
-          <a:off x="0" y="0"/>
-          <a:ext cx="0" cy="0"/>
-          <a:chOff x="0" y="0"/>
-          <a:chExt cx="0" cy="0"/>
-        </a:xfrm>
-      </p:grpSpPr>
-      <p:sp>
-        <p:nvSpPr>
-          <p:cNvPr id="2" name="Titel 1"/>
-          <p:cNvSpPr>
-            <a:spLocks noGrp="1"/>
-          </p:cNvSpPr>
-          <p:nvPr>
-            <p:ph type="title"/>
-          </p:nvPr>
-        </p:nvSpPr>
-        <p:spPr/>
-        <p:txBody>
-          <a:bodyPr>
-            <a:normAutofit/>
-          </a:bodyPr>
-          <a:lstStyle/>
-          <a:p>
-            <a:r>
-              <a:rPr lang="de-DE" dirty="0" smtClean="0"/>
-              <a:t>Sequenzdiagramm Spring </a:t>
-            </a:r>
-            <a:r>
-              <a:rPr lang="de-DE" dirty="0" err="1" smtClean="0"/>
-              <a:t>Roo</a:t>
-            </a:r>
-            <a:endParaRPr lang="de-DE" dirty="0"/>
-          </a:p>
-        </p:txBody>
-      </p:sp>
-      <p:sp>
-        <p:nvSpPr>
-          <p:cNvPr id="10" name="Inhaltsplatzhalter 9"/>
-          <p:cNvSpPr>
-            <a:spLocks noGrp="1"/>
-          </p:cNvSpPr>
-          <p:nvPr>
-            <p:ph idx="1"/>
-          </p:nvPr>
-        </p:nvSpPr>
-        <p:spPr/>
-        <p:txBody>
-          <a:bodyPr/>
-          <a:lstStyle/>
-          <a:p>
-            <a:endParaRPr lang="de-DE"/>
-          </a:p>
-        </p:txBody>
-      </p:sp>
-      <p:sp>
-        <p:nvSpPr>
-          <p:cNvPr id="7" name="Datumsplatzhalter 6"/>
-          <p:cNvSpPr>
-            <a:spLocks noGrp="1"/>
-          </p:cNvSpPr>
-          <p:nvPr>
-            <p:ph type="dt" sz="half" idx="10"/>
-          </p:nvPr>
-        </p:nvSpPr>
-        <p:spPr/>
-        <p:txBody>
-          <a:bodyPr/>
-          <a:lstStyle/>
-          <a:p>
-            <a:r>
-              <a:rPr lang="de-DE" smtClean="0"/>
-              <a:t>21.04.2012</a:t>
-            </a:r>
-            <a:endParaRPr lang="en-US"/>
-          </a:p>
-        </p:txBody>
-      </p:sp>
-      <p:sp>
-        <p:nvSpPr>
-          <p:cNvPr id="8" name="Fußzeilenplatzhalter 7"/>
-          <p:cNvSpPr>
-            <a:spLocks noGrp="1"/>
-          </p:cNvSpPr>
-          <p:nvPr>
-            <p:ph type="ftr" sz="quarter" idx="11"/>
-          </p:nvPr>
-        </p:nvSpPr>
-        <p:spPr/>
-        <p:txBody>
-          <a:bodyPr/>
-          <a:lstStyle/>
-          <a:p>
-            <a:r>
-              <a:rPr lang="de-DE" smtClean="0"/>
-              <a:t>FST Projekt "Eventalizer" (SS 2012) Team 5</a:t>
-            </a:r>
-            <a:endParaRPr lang="de-DE" dirty="0"/>
-          </a:p>
-        </p:txBody>
-      </p:sp>
-      <p:sp>
-        <p:nvSpPr>
-          <p:cNvPr id="9" name="Foliennummernplatzhalter 8"/>
-          <p:cNvSpPr>
-            <a:spLocks noGrp="1"/>
-          </p:cNvSpPr>
-          <p:nvPr>
-            <p:ph type="sldNum" sz="quarter" idx="12"/>
-          </p:nvPr>
-        </p:nvSpPr>
-        <p:spPr/>
-        <p:txBody>
-          <a:bodyPr/>
-          <a:lstStyle/>
-          <a:p>
-            <a:fld id="{990B41CA-569D-40E7-8E58-026C0338B2C8}" type="slidenum">
-              <a:rPr lang="en-US" smtClean="0"/>
-              <a:pPr/>
-              <a:t>9</a:t>
-            </a:fld>
-            <a:endParaRPr lang="en-US"/>
-          </a:p>
-        </p:txBody>
-      </p:sp>
-    </p:spTree>
   </p:cSld>
   <p:clrMapOvr>
     <a:masterClrMapping/>

</xml_diff>

<commit_message>
Vorbereitung Abgabe Winter, Quellen hinzugefügt. Regie und Inhaltsanweisungen (grob)
Signed-off-by: MAG <mxthammel@gmail.com>
</commit_message>
<xml_diff>
--- a/Dokumente/Abschlusspr�si/Abschlusspr�sentation.pptx
+++ b/Dokumente/Abschlusspr�si/Abschlusspr�sentation.pptx
@@ -402,7 +402,7 @@
     </p:spTree>
     <p:extLst>
       <p:ext uri="{BB962C8B-B14F-4D97-AF65-F5344CB8AC3E}">
-        <p14:creationId xmlns:p14="http://schemas.microsoft.com/office/powerpoint/2010/main" xmlns="" val="2610097957"/>
+        <p14:creationId xmlns:p14="http://schemas.microsoft.com/office/powerpoint/2010/main" val="2610097957"/>
       </p:ext>
     </p:extLst>
   </p:cSld>
@@ -577,7 +577,7 @@
     </p:spTree>
     <p:extLst>
       <p:ext uri="{BB962C8B-B14F-4D97-AF65-F5344CB8AC3E}">
-        <p14:creationId xmlns:p14="http://schemas.microsoft.com/office/powerpoint/2010/main" xmlns="" val="2116472317"/>
+        <p14:creationId xmlns:p14="http://schemas.microsoft.com/office/powerpoint/2010/main" val="2116472317"/>
       </p:ext>
     </p:extLst>
   </p:cSld>
@@ -631,331 +631,6 @@
           <a:bodyPr/>
           <a:lstStyle/>
           <a:p>
-            <a:r>
-              <a:rPr lang="de-DE" dirty="0" smtClean="0"/>
-              <a:t>Funktionale Anforderung per </a:t>
-            </a:r>
-            <a:r>
-              <a:rPr lang="de-DE" dirty="0" err="1" smtClean="0"/>
-              <a:t>Mockup</a:t>
-            </a:r>
-            <a:r>
-              <a:rPr lang="de-DE" dirty="0" smtClean="0"/>
-              <a:t> dargestellt und textuell ergänzt:</a:t>
-            </a:r>
-          </a:p>
-          <a:p>
-            <a:r>
-              <a:rPr lang="de-DE" sz="1200" kern="1200" dirty="0" smtClean="0">
-                <a:solidFill>
-                  <a:schemeClr val="tx1"/>
-                </a:solidFill>
-                <a:effectLst/>
-                <a:latin typeface="+mn-lt"/>
-                <a:ea typeface="+mn-ea"/>
-                <a:cs typeface="+mn-cs"/>
-              </a:rPr>
-              <a:t>Der beliebiger Internetnutzer kann sich über </a:t>
-            </a:r>
-            <a:r>
-              <a:rPr lang="de-DE" sz="1200" kern="1200" dirty="0" err="1" smtClean="0">
-                <a:solidFill>
-                  <a:schemeClr val="tx1"/>
-                </a:solidFill>
-                <a:effectLst/>
-                <a:latin typeface="+mn-lt"/>
-                <a:ea typeface="+mn-ea"/>
-                <a:cs typeface="+mn-cs"/>
-              </a:rPr>
-              <a:t>oAuth</a:t>
-            </a:r>
-            <a:r>
-              <a:rPr lang="de-DE" sz="1200" kern="1200" dirty="0" smtClean="0">
-                <a:solidFill>
-                  <a:schemeClr val="tx1"/>
-                </a:solidFill>
-                <a:effectLst/>
-                <a:latin typeface="+mn-lt"/>
-                <a:ea typeface="+mn-ea"/>
-                <a:cs typeface="+mn-cs"/>
-              </a:rPr>
-              <a:t> (Google oder Facebook-Account) auf der folgenden Eingabemaske an der Internetplattform </a:t>
-            </a:r>
-            <a:r>
-              <a:rPr lang="de-DE" sz="1200" kern="1200" dirty="0" err="1" smtClean="0">
-                <a:solidFill>
-                  <a:schemeClr val="tx1"/>
-                </a:solidFill>
-                <a:effectLst/>
-                <a:latin typeface="+mn-lt"/>
-                <a:ea typeface="+mn-ea"/>
-                <a:cs typeface="+mn-cs"/>
-              </a:rPr>
-              <a:t>Eventalizer</a:t>
-            </a:r>
-            <a:r>
-              <a:rPr lang="de-DE" sz="1200" kern="1200" dirty="0" smtClean="0">
-                <a:solidFill>
-                  <a:schemeClr val="tx1"/>
-                </a:solidFill>
-                <a:effectLst/>
-                <a:latin typeface="+mn-lt"/>
-                <a:ea typeface="+mn-ea"/>
-                <a:cs typeface="+mn-cs"/>
-              </a:rPr>
-              <a:t> anmelden:</a:t>
-            </a:r>
-            <a:br>
-              <a:rPr lang="de-DE" sz="1200" kern="1200" dirty="0" smtClean="0">
-                <a:solidFill>
-                  <a:schemeClr val="tx1"/>
-                </a:solidFill>
-                <a:effectLst/>
-                <a:latin typeface="+mn-lt"/>
-                <a:ea typeface="+mn-ea"/>
-                <a:cs typeface="+mn-cs"/>
-              </a:rPr>
-            </a:br>
-            <a:r>
-              <a:rPr lang="de-DE" sz="1200" kern="1200" dirty="0" smtClean="0">
-                <a:solidFill>
-                  <a:schemeClr val="tx1"/>
-                </a:solidFill>
-                <a:effectLst/>
-                <a:latin typeface="+mn-lt"/>
-                <a:ea typeface="+mn-ea"/>
-                <a:cs typeface="+mn-cs"/>
-              </a:rPr>
-              <a:t> </a:t>
-            </a:r>
-            <a:br>
-              <a:rPr lang="de-DE" sz="1200" kern="1200" dirty="0" smtClean="0">
-                <a:solidFill>
-                  <a:schemeClr val="tx1"/>
-                </a:solidFill>
-                <a:effectLst/>
-                <a:latin typeface="+mn-lt"/>
-                <a:ea typeface="+mn-ea"/>
-                <a:cs typeface="+mn-cs"/>
-              </a:rPr>
-            </a:br>
-            <a:r>
-              <a:rPr lang="de-DE" sz="1200" kern="1200" dirty="0" smtClean="0">
-                <a:solidFill>
-                  <a:schemeClr val="tx1"/>
-                </a:solidFill>
-                <a:effectLst/>
-                <a:latin typeface="+mn-lt"/>
-                <a:ea typeface="+mn-ea"/>
-                <a:cs typeface="+mn-cs"/>
-              </a:rPr>
-              <a:t>Für eine erfolgreiche Anmeldung ist die Angabe der folgenden Informationen notwendig:</a:t>
-            </a:r>
-          </a:p>
-          <a:p>
-            <a:pPr lvl="0"/>
-            <a:r>
-              <a:rPr lang="de-DE" sz="1200" kern="1200" dirty="0" err="1" smtClean="0">
-                <a:solidFill>
-                  <a:schemeClr val="tx1"/>
-                </a:solidFill>
-                <a:effectLst/>
-                <a:latin typeface="+mn-lt"/>
-                <a:ea typeface="+mn-ea"/>
-                <a:cs typeface="+mn-cs"/>
-              </a:rPr>
-              <a:t>Social</a:t>
-            </a:r>
-            <a:r>
-              <a:rPr lang="de-DE" sz="1200" kern="1200" dirty="0" smtClean="0">
-                <a:solidFill>
-                  <a:schemeClr val="tx1"/>
-                </a:solidFill>
-                <a:effectLst/>
-                <a:latin typeface="+mn-lt"/>
-                <a:ea typeface="+mn-ea"/>
-                <a:cs typeface="+mn-cs"/>
-              </a:rPr>
-              <a:t>-Network-Anbieter</a:t>
-            </a:r>
-          </a:p>
-          <a:p>
-            <a:pPr lvl="0"/>
-            <a:r>
-              <a:rPr lang="de-DE" sz="1200" kern="1200" dirty="0" smtClean="0">
-                <a:solidFill>
-                  <a:schemeClr val="tx1"/>
-                </a:solidFill>
-                <a:effectLst/>
-                <a:latin typeface="+mn-lt"/>
-                <a:ea typeface="+mn-ea"/>
-                <a:cs typeface="+mn-cs"/>
-              </a:rPr>
-              <a:t>Der dort verwendete Benutzername</a:t>
-            </a:r>
-          </a:p>
-          <a:p>
-            <a:pPr lvl="0"/>
-            <a:r>
-              <a:rPr lang="de-DE" sz="1200" kern="1200" dirty="0" smtClean="0">
-                <a:solidFill>
-                  <a:schemeClr val="tx1"/>
-                </a:solidFill>
-                <a:effectLst/>
-                <a:latin typeface="+mn-lt"/>
-                <a:ea typeface="+mn-ea"/>
-                <a:cs typeface="+mn-cs"/>
-              </a:rPr>
-              <a:t>Das dort verwendete persönliche Passwort</a:t>
-            </a:r>
-          </a:p>
-          <a:p>
-            <a:r>
-              <a:rPr lang="de-DE" sz="1200" kern="1200" dirty="0" smtClean="0">
-                <a:solidFill>
-                  <a:schemeClr val="tx1"/>
-                </a:solidFill>
-                <a:effectLst/>
-                <a:latin typeface="+mn-lt"/>
-                <a:ea typeface="+mn-ea"/>
-                <a:cs typeface="+mn-cs"/>
-              </a:rPr>
-              <a:t>Die möglichen </a:t>
-            </a:r>
-            <a:r>
-              <a:rPr lang="de-DE" sz="1200" kern="1200" dirty="0" err="1" smtClean="0">
-                <a:solidFill>
-                  <a:schemeClr val="tx1"/>
-                </a:solidFill>
-                <a:effectLst/>
-                <a:latin typeface="+mn-lt"/>
-                <a:ea typeface="+mn-ea"/>
-                <a:cs typeface="+mn-cs"/>
-              </a:rPr>
-              <a:t>Social</a:t>
-            </a:r>
-            <a:r>
-              <a:rPr lang="de-DE" sz="1200" kern="1200" dirty="0" smtClean="0">
-                <a:solidFill>
-                  <a:schemeClr val="tx1"/>
-                </a:solidFill>
-                <a:effectLst/>
-                <a:latin typeface="+mn-lt"/>
-                <a:ea typeface="+mn-ea"/>
-                <a:cs typeface="+mn-cs"/>
-              </a:rPr>
-              <a:t>-Network-Anbieter werden auf der Eingabemaske aufgeführt. </a:t>
-            </a:r>
-            <a:br>
-              <a:rPr lang="de-DE" sz="1200" kern="1200" dirty="0" smtClean="0">
-                <a:solidFill>
-                  <a:schemeClr val="tx1"/>
-                </a:solidFill>
-                <a:effectLst/>
-                <a:latin typeface="+mn-lt"/>
-                <a:ea typeface="+mn-ea"/>
-                <a:cs typeface="+mn-cs"/>
-              </a:rPr>
-            </a:br>
-            <a:r>
-              <a:rPr lang="de-DE" sz="1200" kern="1200" dirty="0" smtClean="0">
-                <a:solidFill>
-                  <a:schemeClr val="tx1"/>
-                </a:solidFill>
-                <a:effectLst/>
-                <a:latin typeface="+mn-lt"/>
-                <a:ea typeface="+mn-ea"/>
-                <a:cs typeface="+mn-cs"/>
-              </a:rPr>
-              <a:t>Die Anmeldung an der Internetplattform ist erfolgreich, wenn die Antwort des </a:t>
-            </a:r>
-            <a:r>
-              <a:rPr lang="de-DE" sz="1200" kern="1200" dirty="0" err="1" smtClean="0">
-                <a:solidFill>
-                  <a:schemeClr val="tx1"/>
-                </a:solidFill>
-                <a:effectLst/>
-                <a:latin typeface="+mn-lt"/>
-                <a:ea typeface="+mn-ea"/>
-                <a:cs typeface="+mn-cs"/>
-              </a:rPr>
-              <a:t>Social</a:t>
-            </a:r>
-            <a:r>
-              <a:rPr lang="de-DE" sz="1200" kern="1200" dirty="0" smtClean="0">
-                <a:solidFill>
-                  <a:schemeClr val="tx1"/>
-                </a:solidFill>
-                <a:effectLst/>
-                <a:latin typeface="+mn-lt"/>
-                <a:ea typeface="+mn-ea"/>
-                <a:cs typeface="+mn-cs"/>
-              </a:rPr>
-              <a:t>-Network-Anbieters positiv ist, d.h. ist der Benutzer dort authentifiziert wurde und die Benutzerdaten übermittelt worden sind. Kann der Benutzer nicht über den </a:t>
-            </a:r>
-            <a:r>
-              <a:rPr lang="de-DE" sz="1200" kern="1200" dirty="0" err="1" smtClean="0">
-                <a:solidFill>
-                  <a:schemeClr val="tx1"/>
-                </a:solidFill>
-                <a:effectLst/>
-                <a:latin typeface="+mn-lt"/>
-                <a:ea typeface="+mn-ea"/>
-                <a:cs typeface="+mn-cs"/>
-              </a:rPr>
-              <a:t>Social</a:t>
-            </a:r>
-            <a:r>
-              <a:rPr lang="de-DE" sz="1200" kern="1200" dirty="0" smtClean="0">
-                <a:solidFill>
-                  <a:schemeClr val="tx1"/>
-                </a:solidFill>
-                <a:effectLst/>
-                <a:latin typeface="+mn-lt"/>
-                <a:ea typeface="+mn-ea"/>
-                <a:cs typeface="+mn-cs"/>
-              </a:rPr>
-              <a:t>-Network-Anbieter authentifiziert werden, erfolgt auch keine Anmeldung.</a:t>
-            </a:r>
-          </a:p>
-          <a:p>
-            <a:r>
-              <a:rPr lang="de-DE" sz="1200" kern="1200" dirty="0" smtClean="0">
-                <a:solidFill>
-                  <a:schemeClr val="tx1"/>
-                </a:solidFill>
-                <a:effectLst/>
-                <a:latin typeface="+mn-lt"/>
-                <a:ea typeface="+mn-ea"/>
-                <a:cs typeface="+mn-cs"/>
-              </a:rPr>
-              <a:t/>
-            </a:r>
-            <a:br>
-              <a:rPr lang="de-DE" sz="1200" kern="1200" dirty="0" smtClean="0">
-                <a:solidFill>
-                  <a:schemeClr val="tx1"/>
-                </a:solidFill>
-                <a:effectLst/>
-                <a:latin typeface="+mn-lt"/>
-                <a:ea typeface="+mn-ea"/>
-                <a:cs typeface="+mn-cs"/>
-              </a:rPr>
-            </a:br>
-            <a:r>
-              <a:rPr lang="de-DE" sz="1200" kern="1200" dirty="0" smtClean="0">
-                <a:solidFill>
-                  <a:schemeClr val="tx1"/>
-                </a:solidFill>
-                <a:effectLst/>
-                <a:latin typeface="+mn-lt"/>
-                <a:ea typeface="+mn-ea"/>
-                <a:cs typeface="+mn-cs"/>
-              </a:rPr>
-              <a:t>@FSM:  Updaten</a:t>
-            </a:r>
-          </a:p>
-          <a:p>
             <a:endParaRPr lang="de-DE" dirty="0"/>
           </a:p>
         </p:txBody>
@@ -987,7 +662,7 @@
     </p:spTree>
     <p:extLst>
       <p:ext uri="{BB962C8B-B14F-4D97-AF65-F5344CB8AC3E}">
-        <p14:creationId xmlns:p14="http://schemas.microsoft.com/office/powerpoint/2010/main" xmlns="" val="2934279750"/>
+        <p14:creationId xmlns:p14="http://schemas.microsoft.com/office/powerpoint/2010/main" val="2934279750"/>
       </p:ext>
     </p:extLst>
   </p:cSld>
@@ -1041,331 +716,6 @@
           <a:bodyPr/>
           <a:lstStyle/>
           <a:p>
-            <a:r>
-              <a:rPr lang="de-DE" dirty="0" smtClean="0"/>
-              <a:t>Funktionale Anforderung per </a:t>
-            </a:r>
-            <a:r>
-              <a:rPr lang="de-DE" dirty="0" err="1" smtClean="0"/>
-              <a:t>Mockup</a:t>
-            </a:r>
-            <a:r>
-              <a:rPr lang="de-DE" dirty="0" smtClean="0"/>
-              <a:t> dargestellt und textuell ergänzt:</a:t>
-            </a:r>
-          </a:p>
-          <a:p>
-            <a:r>
-              <a:rPr lang="de-DE" sz="1200" kern="1200" dirty="0" smtClean="0">
-                <a:solidFill>
-                  <a:schemeClr val="tx1"/>
-                </a:solidFill>
-                <a:effectLst/>
-                <a:latin typeface="+mn-lt"/>
-                <a:ea typeface="+mn-ea"/>
-                <a:cs typeface="+mn-cs"/>
-              </a:rPr>
-              <a:t>Der beliebiger Internetnutzer kann sich über </a:t>
-            </a:r>
-            <a:r>
-              <a:rPr lang="de-DE" sz="1200" kern="1200" dirty="0" err="1" smtClean="0">
-                <a:solidFill>
-                  <a:schemeClr val="tx1"/>
-                </a:solidFill>
-                <a:effectLst/>
-                <a:latin typeface="+mn-lt"/>
-                <a:ea typeface="+mn-ea"/>
-                <a:cs typeface="+mn-cs"/>
-              </a:rPr>
-              <a:t>oAuth</a:t>
-            </a:r>
-            <a:r>
-              <a:rPr lang="de-DE" sz="1200" kern="1200" dirty="0" smtClean="0">
-                <a:solidFill>
-                  <a:schemeClr val="tx1"/>
-                </a:solidFill>
-                <a:effectLst/>
-                <a:latin typeface="+mn-lt"/>
-                <a:ea typeface="+mn-ea"/>
-                <a:cs typeface="+mn-cs"/>
-              </a:rPr>
-              <a:t> (Google oder Facebook-Account) auf der folgenden Eingabemaske an der Internetplattform </a:t>
-            </a:r>
-            <a:r>
-              <a:rPr lang="de-DE" sz="1200" kern="1200" dirty="0" err="1" smtClean="0">
-                <a:solidFill>
-                  <a:schemeClr val="tx1"/>
-                </a:solidFill>
-                <a:effectLst/>
-                <a:latin typeface="+mn-lt"/>
-                <a:ea typeface="+mn-ea"/>
-                <a:cs typeface="+mn-cs"/>
-              </a:rPr>
-              <a:t>Eventalizer</a:t>
-            </a:r>
-            <a:r>
-              <a:rPr lang="de-DE" sz="1200" kern="1200" dirty="0" smtClean="0">
-                <a:solidFill>
-                  <a:schemeClr val="tx1"/>
-                </a:solidFill>
-                <a:effectLst/>
-                <a:latin typeface="+mn-lt"/>
-                <a:ea typeface="+mn-ea"/>
-                <a:cs typeface="+mn-cs"/>
-              </a:rPr>
-              <a:t> anmelden:</a:t>
-            </a:r>
-            <a:br>
-              <a:rPr lang="de-DE" sz="1200" kern="1200" dirty="0" smtClean="0">
-                <a:solidFill>
-                  <a:schemeClr val="tx1"/>
-                </a:solidFill>
-                <a:effectLst/>
-                <a:latin typeface="+mn-lt"/>
-                <a:ea typeface="+mn-ea"/>
-                <a:cs typeface="+mn-cs"/>
-              </a:rPr>
-            </a:br>
-            <a:r>
-              <a:rPr lang="de-DE" sz="1200" kern="1200" dirty="0" smtClean="0">
-                <a:solidFill>
-                  <a:schemeClr val="tx1"/>
-                </a:solidFill>
-                <a:effectLst/>
-                <a:latin typeface="+mn-lt"/>
-                <a:ea typeface="+mn-ea"/>
-                <a:cs typeface="+mn-cs"/>
-              </a:rPr>
-              <a:t> </a:t>
-            </a:r>
-            <a:br>
-              <a:rPr lang="de-DE" sz="1200" kern="1200" dirty="0" smtClean="0">
-                <a:solidFill>
-                  <a:schemeClr val="tx1"/>
-                </a:solidFill>
-                <a:effectLst/>
-                <a:latin typeface="+mn-lt"/>
-                <a:ea typeface="+mn-ea"/>
-                <a:cs typeface="+mn-cs"/>
-              </a:rPr>
-            </a:br>
-            <a:r>
-              <a:rPr lang="de-DE" sz="1200" kern="1200" dirty="0" smtClean="0">
-                <a:solidFill>
-                  <a:schemeClr val="tx1"/>
-                </a:solidFill>
-                <a:effectLst/>
-                <a:latin typeface="+mn-lt"/>
-                <a:ea typeface="+mn-ea"/>
-                <a:cs typeface="+mn-cs"/>
-              </a:rPr>
-              <a:t>Für eine erfolgreiche Anmeldung ist die Angabe der folgenden Informationen notwendig:</a:t>
-            </a:r>
-          </a:p>
-          <a:p>
-            <a:pPr lvl="0"/>
-            <a:r>
-              <a:rPr lang="de-DE" sz="1200" kern="1200" dirty="0" err="1" smtClean="0">
-                <a:solidFill>
-                  <a:schemeClr val="tx1"/>
-                </a:solidFill>
-                <a:effectLst/>
-                <a:latin typeface="+mn-lt"/>
-                <a:ea typeface="+mn-ea"/>
-                <a:cs typeface="+mn-cs"/>
-              </a:rPr>
-              <a:t>Social</a:t>
-            </a:r>
-            <a:r>
-              <a:rPr lang="de-DE" sz="1200" kern="1200" dirty="0" smtClean="0">
-                <a:solidFill>
-                  <a:schemeClr val="tx1"/>
-                </a:solidFill>
-                <a:effectLst/>
-                <a:latin typeface="+mn-lt"/>
-                <a:ea typeface="+mn-ea"/>
-                <a:cs typeface="+mn-cs"/>
-              </a:rPr>
-              <a:t>-Network-Anbieter</a:t>
-            </a:r>
-          </a:p>
-          <a:p>
-            <a:pPr lvl="0"/>
-            <a:r>
-              <a:rPr lang="de-DE" sz="1200" kern="1200" dirty="0" smtClean="0">
-                <a:solidFill>
-                  <a:schemeClr val="tx1"/>
-                </a:solidFill>
-                <a:effectLst/>
-                <a:latin typeface="+mn-lt"/>
-                <a:ea typeface="+mn-ea"/>
-                <a:cs typeface="+mn-cs"/>
-              </a:rPr>
-              <a:t>Der dort verwendete Benutzername</a:t>
-            </a:r>
-          </a:p>
-          <a:p>
-            <a:pPr lvl="0"/>
-            <a:r>
-              <a:rPr lang="de-DE" sz="1200" kern="1200" dirty="0" smtClean="0">
-                <a:solidFill>
-                  <a:schemeClr val="tx1"/>
-                </a:solidFill>
-                <a:effectLst/>
-                <a:latin typeface="+mn-lt"/>
-                <a:ea typeface="+mn-ea"/>
-                <a:cs typeface="+mn-cs"/>
-              </a:rPr>
-              <a:t>Das dort verwendete persönliche Passwort</a:t>
-            </a:r>
-          </a:p>
-          <a:p>
-            <a:r>
-              <a:rPr lang="de-DE" sz="1200" kern="1200" dirty="0" smtClean="0">
-                <a:solidFill>
-                  <a:schemeClr val="tx1"/>
-                </a:solidFill>
-                <a:effectLst/>
-                <a:latin typeface="+mn-lt"/>
-                <a:ea typeface="+mn-ea"/>
-                <a:cs typeface="+mn-cs"/>
-              </a:rPr>
-              <a:t>Die möglichen </a:t>
-            </a:r>
-            <a:r>
-              <a:rPr lang="de-DE" sz="1200" kern="1200" dirty="0" err="1" smtClean="0">
-                <a:solidFill>
-                  <a:schemeClr val="tx1"/>
-                </a:solidFill>
-                <a:effectLst/>
-                <a:latin typeface="+mn-lt"/>
-                <a:ea typeface="+mn-ea"/>
-                <a:cs typeface="+mn-cs"/>
-              </a:rPr>
-              <a:t>Social</a:t>
-            </a:r>
-            <a:r>
-              <a:rPr lang="de-DE" sz="1200" kern="1200" dirty="0" smtClean="0">
-                <a:solidFill>
-                  <a:schemeClr val="tx1"/>
-                </a:solidFill>
-                <a:effectLst/>
-                <a:latin typeface="+mn-lt"/>
-                <a:ea typeface="+mn-ea"/>
-                <a:cs typeface="+mn-cs"/>
-              </a:rPr>
-              <a:t>-Network-Anbieter werden auf der Eingabemaske aufgeführt. </a:t>
-            </a:r>
-            <a:br>
-              <a:rPr lang="de-DE" sz="1200" kern="1200" dirty="0" smtClean="0">
-                <a:solidFill>
-                  <a:schemeClr val="tx1"/>
-                </a:solidFill>
-                <a:effectLst/>
-                <a:latin typeface="+mn-lt"/>
-                <a:ea typeface="+mn-ea"/>
-                <a:cs typeface="+mn-cs"/>
-              </a:rPr>
-            </a:br>
-            <a:r>
-              <a:rPr lang="de-DE" sz="1200" kern="1200" dirty="0" smtClean="0">
-                <a:solidFill>
-                  <a:schemeClr val="tx1"/>
-                </a:solidFill>
-                <a:effectLst/>
-                <a:latin typeface="+mn-lt"/>
-                <a:ea typeface="+mn-ea"/>
-                <a:cs typeface="+mn-cs"/>
-              </a:rPr>
-              <a:t>Die Anmeldung an der Internetplattform ist erfolgreich, wenn die Antwort des </a:t>
-            </a:r>
-            <a:r>
-              <a:rPr lang="de-DE" sz="1200" kern="1200" dirty="0" err="1" smtClean="0">
-                <a:solidFill>
-                  <a:schemeClr val="tx1"/>
-                </a:solidFill>
-                <a:effectLst/>
-                <a:latin typeface="+mn-lt"/>
-                <a:ea typeface="+mn-ea"/>
-                <a:cs typeface="+mn-cs"/>
-              </a:rPr>
-              <a:t>Social</a:t>
-            </a:r>
-            <a:r>
-              <a:rPr lang="de-DE" sz="1200" kern="1200" dirty="0" smtClean="0">
-                <a:solidFill>
-                  <a:schemeClr val="tx1"/>
-                </a:solidFill>
-                <a:effectLst/>
-                <a:latin typeface="+mn-lt"/>
-                <a:ea typeface="+mn-ea"/>
-                <a:cs typeface="+mn-cs"/>
-              </a:rPr>
-              <a:t>-Network-Anbieters positiv ist, d.h. ist der Benutzer dort authentifiziert wurde und die Benutzerdaten übermittelt worden sind. Kann der Benutzer nicht über den </a:t>
-            </a:r>
-            <a:r>
-              <a:rPr lang="de-DE" sz="1200" kern="1200" dirty="0" err="1" smtClean="0">
-                <a:solidFill>
-                  <a:schemeClr val="tx1"/>
-                </a:solidFill>
-                <a:effectLst/>
-                <a:latin typeface="+mn-lt"/>
-                <a:ea typeface="+mn-ea"/>
-                <a:cs typeface="+mn-cs"/>
-              </a:rPr>
-              <a:t>Social</a:t>
-            </a:r>
-            <a:r>
-              <a:rPr lang="de-DE" sz="1200" kern="1200" dirty="0" smtClean="0">
-                <a:solidFill>
-                  <a:schemeClr val="tx1"/>
-                </a:solidFill>
-                <a:effectLst/>
-                <a:latin typeface="+mn-lt"/>
-                <a:ea typeface="+mn-ea"/>
-                <a:cs typeface="+mn-cs"/>
-              </a:rPr>
-              <a:t>-Network-Anbieter authentifiziert werden, erfolgt auch keine Anmeldung.</a:t>
-            </a:r>
-          </a:p>
-          <a:p>
-            <a:r>
-              <a:rPr lang="de-DE" sz="1200" kern="1200" dirty="0" smtClean="0">
-                <a:solidFill>
-                  <a:schemeClr val="tx1"/>
-                </a:solidFill>
-                <a:effectLst/>
-                <a:latin typeface="+mn-lt"/>
-                <a:ea typeface="+mn-ea"/>
-                <a:cs typeface="+mn-cs"/>
-              </a:rPr>
-              <a:t/>
-            </a:r>
-            <a:br>
-              <a:rPr lang="de-DE" sz="1200" kern="1200" dirty="0" smtClean="0">
-                <a:solidFill>
-                  <a:schemeClr val="tx1"/>
-                </a:solidFill>
-                <a:effectLst/>
-                <a:latin typeface="+mn-lt"/>
-                <a:ea typeface="+mn-ea"/>
-                <a:cs typeface="+mn-cs"/>
-              </a:rPr>
-            </a:br>
-            <a:r>
-              <a:rPr lang="de-DE" sz="1200" kern="1200" dirty="0" smtClean="0">
-                <a:solidFill>
-                  <a:schemeClr val="tx1"/>
-                </a:solidFill>
-                <a:effectLst/>
-                <a:latin typeface="+mn-lt"/>
-                <a:ea typeface="+mn-ea"/>
-                <a:cs typeface="+mn-cs"/>
-              </a:rPr>
-              <a:t>@FSM:  Updaten</a:t>
-            </a:r>
-          </a:p>
-          <a:p>
             <a:endParaRPr lang="de-DE" dirty="0"/>
           </a:p>
         </p:txBody>
@@ -1397,7 +747,7 @@
     </p:spTree>
     <p:extLst>
       <p:ext uri="{BB962C8B-B14F-4D97-AF65-F5344CB8AC3E}">
-        <p14:creationId xmlns:p14="http://schemas.microsoft.com/office/powerpoint/2010/main" xmlns="" val="2934279750"/>
+        <p14:creationId xmlns:p14="http://schemas.microsoft.com/office/powerpoint/2010/main" val="2934279750"/>
       </p:ext>
     </p:extLst>
   </p:cSld>
@@ -1453,37 +803,7 @@
           <a:p>
             <a:r>
               <a:rPr lang="de-DE" dirty="0" smtClean="0"/>
-              <a:t>Ist evtl. überflüssig, da grob in </a:t>
-            </a:r>
-            <a:r>
-              <a:rPr lang="de-DE" dirty="0" err="1" smtClean="0"/>
-              <a:t>Zwischenpräsi</a:t>
-            </a:r>
-            <a:r>
-              <a:rPr lang="de-DE" dirty="0" smtClean="0"/>
-              <a:t> erwähnt?</a:t>
-            </a:r>
-          </a:p>
-          <a:p>
-            <a:r>
-              <a:rPr lang="de-DE" dirty="0" smtClean="0"/>
-              <a:t>Können wir </a:t>
-            </a:r>
-            <a:r>
-              <a:rPr lang="de-DE" dirty="0" err="1" smtClean="0"/>
-              <a:t>Roo</a:t>
-            </a:r>
-            <a:r>
-              <a:rPr lang="de-DE" baseline="0" dirty="0" smtClean="0"/>
-              <a:t> als Vorlage für die Agenda nehmen? Oder doch eher die technische Umsetzungsfolge </a:t>
-            </a:r>
-            <a:r>
-              <a:rPr lang="de-DE" baseline="0" dirty="0" err="1" smtClean="0"/>
-              <a:t>alá</a:t>
-            </a:r>
-            <a:r>
-              <a:rPr lang="de-DE" baseline="0" dirty="0" smtClean="0"/>
-              <a:t> RUP?</a:t>
+              <a:t>Grobe Architektur/Interaktion</a:t>
             </a:r>
             <a:endParaRPr lang="de-DE" dirty="0"/>
           </a:p>
@@ -1516,7 +836,7 @@
     </p:spTree>
     <p:extLst>
       <p:ext uri="{BB962C8B-B14F-4D97-AF65-F5344CB8AC3E}">
-        <p14:creationId xmlns:p14="http://schemas.microsoft.com/office/powerpoint/2010/main" xmlns="" val="135288531"/>
+        <p14:creationId xmlns:p14="http://schemas.microsoft.com/office/powerpoint/2010/main" val="135288531"/>
       </p:ext>
     </p:extLst>
   </p:cSld>
@@ -1572,51 +892,11 @@
           <a:p>
             <a:r>
               <a:rPr lang="de-DE" dirty="0" smtClean="0"/>
-              <a:t>Blau: Event </a:t>
-            </a:r>
-            <a:r>
-              <a:rPr lang="de-DE" dirty="0" err="1" smtClean="0"/>
-              <a:t>anlage</a:t>
-            </a:r>
-            <a:endParaRPr lang="de-DE" dirty="0" smtClean="0"/>
-          </a:p>
-          <a:p>
-            <a:r>
-              <a:rPr lang="de-DE" dirty="0" smtClean="0"/>
-              <a:t>DB Table Event, </a:t>
-            </a:r>
-            <a:r>
-              <a:rPr lang="de-DE" dirty="0" err="1" smtClean="0"/>
-              <a:t>normaliserte</a:t>
+              <a:t>Konkretes Beispiel zur vorherigen</a:t>
             </a:r>
             <a:r>
               <a:rPr lang="de-DE" baseline="0" dirty="0" smtClean="0"/>
-              <a:t> Teilnehmerliste und Ort</a:t>
-            </a:r>
-          </a:p>
-          <a:p>
-            <a:endParaRPr lang="de-DE" baseline="0" dirty="0" smtClean="0"/>
-          </a:p>
-          <a:p>
-            <a:r>
-              <a:rPr lang="de-DE" baseline="0" dirty="0" smtClean="0"/>
-              <a:t>Rot: Login Verknüpfung Session ID aus </a:t>
-            </a:r>
-            <a:r>
-              <a:rPr lang="de-DE" baseline="0" dirty="0" err="1" smtClean="0"/>
-              <a:t>oAuth</a:t>
-            </a:r>
-            <a:r>
-              <a:rPr lang="de-DE" baseline="0" dirty="0" smtClean="0"/>
-              <a:t>, Grunddaten (</a:t>
-            </a:r>
-            <a:r>
-              <a:rPr lang="de-DE" baseline="0" dirty="0" err="1" smtClean="0"/>
-              <a:t>name</a:t>
-            </a:r>
-            <a:r>
-              <a:rPr lang="de-DE" baseline="0" dirty="0" smtClean="0"/>
-              <a:t>, E-Mail-Adresse etc.) werden ausgelesen und persistent gespeichert.</a:t>
+              <a:t> Darstellung</a:t>
             </a:r>
             <a:endParaRPr lang="de-DE" dirty="0"/>
           </a:p>
@@ -1640,7 +920,7 @@
             <a:fld id="{F7EBFB8C-BBFF-4397-A51C-1E92596422A9}" type="slidenum">
               <a:rPr lang="en-US" smtClean="0"/>
               <a:pPr/>
-              <a:t>18</a:t>
+              <a:t>16</a:t>
             </a:fld>
             <a:endParaRPr lang="en-US" dirty="0"/>
           </a:p>
@@ -1649,7 +929,7 @@
     </p:spTree>
     <p:extLst>
       <p:ext uri="{BB962C8B-B14F-4D97-AF65-F5344CB8AC3E}">
-        <p14:creationId xmlns:p14="http://schemas.microsoft.com/office/powerpoint/2010/main" xmlns="" val="802076649"/>
+        <p14:creationId xmlns:p14="http://schemas.microsoft.com/office/powerpoint/2010/main" val="2825845930"/>
       </p:ext>
     </p:extLst>
   </p:cSld>
@@ -1705,52 +985,20 @@
           <a:p>
             <a:r>
               <a:rPr lang="de-DE" dirty="0" smtClean="0"/>
-              <a:t>Blau: Event </a:t>
-            </a:r>
-            <a:r>
-              <a:rPr lang="de-DE" dirty="0" err="1" smtClean="0"/>
-              <a:t>anlage</a:t>
-            </a:r>
-            <a:endParaRPr lang="de-DE" dirty="0" smtClean="0"/>
-          </a:p>
-          <a:p>
-            <a:r>
-              <a:rPr lang="de-DE" dirty="0" smtClean="0"/>
-              <a:t>DB Table Event, </a:t>
-            </a:r>
-            <a:r>
-              <a:rPr lang="de-DE" dirty="0" err="1" smtClean="0"/>
-              <a:t>normaliserte</a:t>
+              <a:t>Vorstellen:</a:t>
+            </a:r>
+          </a:p>
+          <a:p>
+            <a:r>
+              <a:rPr lang="de-DE" dirty="0" smtClean="0"/>
+              <a:t>Login</a:t>
             </a:r>
             <a:r>
               <a:rPr lang="de-DE" baseline="0" dirty="0" smtClean="0"/>
-              <a:t> Teilnehmerliste und Ort</a:t>
-            </a:r>
-          </a:p>
-          <a:p>
-            <a:endParaRPr lang="de-DE" baseline="0" dirty="0" smtClean="0"/>
-          </a:p>
-          <a:p>
-            <a:r>
-              <a:rPr lang="de-DE" baseline="0" dirty="0" smtClean="0"/>
-              <a:t>Rot: Login Verknüpfung Session ID aus </a:t>
-            </a:r>
-            <a:r>
-              <a:rPr lang="de-DE" baseline="0" dirty="0" err="1" smtClean="0"/>
-              <a:t>oAuth</a:t>
-            </a:r>
-            <a:r>
-              <a:rPr lang="de-DE" baseline="0" dirty="0" smtClean="0"/>
-              <a:t>, Grunddaten (</a:t>
-            </a:r>
-            <a:r>
-              <a:rPr lang="de-DE" baseline="0" dirty="0" err="1" smtClean="0"/>
-              <a:t>name</a:t>
-            </a:r>
-            <a:r>
-              <a:rPr lang="de-DE" baseline="0" dirty="0" smtClean="0"/>
-              <a:t>, E-Mail-Adresse etc.) werden ausgelesen und persistent gespeichert.</a:t>
-            </a:r>
+              <a:t> -&gt; Ablauf Sequenzdiagramm praktisch zeigen</a:t>
+            </a:r>
+          </a:p>
+          <a:p>
             <a:endParaRPr lang="de-DE" dirty="0"/>
           </a:p>
         </p:txBody>
@@ -1773,7 +1021,7 @@
             <a:fld id="{F7EBFB8C-BBFF-4397-A51C-1E92596422A9}" type="slidenum">
               <a:rPr lang="en-US" smtClean="0"/>
               <a:pPr/>
-              <a:t>19</a:t>
+              <a:t>17</a:t>
             </a:fld>
             <a:endParaRPr lang="en-US" dirty="0"/>
           </a:p>
@@ -1782,7 +1030,7 @@
     </p:spTree>
     <p:extLst>
       <p:ext uri="{BB962C8B-B14F-4D97-AF65-F5344CB8AC3E}">
-        <p14:creationId xmlns="" xmlns:p14="http://schemas.microsoft.com/office/powerpoint/2010/main" val="802076649"/>
+        <p14:creationId xmlns:p14="http://schemas.microsoft.com/office/powerpoint/2010/main" val="3912581999"/>
       </p:ext>
     </p:extLst>
   </p:cSld>
@@ -1906,7 +1154,7 @@
             <a:fld id="{F7EBFB8C-BBFF-4397-A51C-1E92596422A9}" type="slidenum">
               <a:rPr lang="en-US" smtClean="0"/>
               <a:pPr/>
-              <a:t>20</a:t>
+              <a:t>18</a:t>
             </a:fld>
             <a:endParaRPr lang="en-US" dirty="0"/>
           </a:p>
@@ -1915,7 +1163,7 @@
     </p:spTree>
     <p:extLst>
       <p:ext uri="{BB962C8B-B14F-4D97-AF65-F5344CB8AC3E}">
-        <p14:creationId xmlns="" xmlns:p14="http://schemas.microsoft.com/office/powerpoint/2010/main" val="802076649"/>
+        <p14:creationId xmlns:p14="http://schemas.microsoft.com/office/powerpoint/2010/main" val="802076649"/>
       </p:ext>
     </p:extLst>
   </p:cSld>
@@ -2039,7 +1287,7 @@
             <a:fld id="{F7EBFB8C-BBFF-4397-A51C-1E92596422A9}" type="slidenum">
               <a:rPr lang="en-US" smtClean="0"/>
               <a:pPr/>
-              <a:t>21</a:t>
+              <a:t>19</a:t>
             </a:fld>
             <a:endParaRPr lang="en-US" dirty="0"/>
           </a:p>
@@ -2048,7 +1296,7 @@
     </p:spTree>
     <p:extLst>
       <p:ext uri="{BB962C8B-B14F-4D97-AF65-F5344CB8AC3E}">
-        <p14:creationId xmlns="" xmlns:p14="http://schemas.microsoft.com/office/powerpoint/2010/main" val="802076649"/>
+        <p14:creationId xmlns:p14="http://schemas.microsoft.com/office/powerpoint/2010/main" val="802076649"/>
       </p:ext>
     </p:extLst>
   </p:cSld>
@@ -2172,7 +1420,7 @@
             <a:fld id="{F7EBFB8C-BBFF-4397-A51C-1E92596422A9}" type="slidenum">
               <a:rPr lang="en-US" smtClean="0"/>
               <a:pPr/>
-              <a:t>22</a:t>
+              <a:t>20</a:t>
             </a:fld>
             <a:endParaRPr lang="en-US" dirty="0"/>
           </a:p>
@@ -2181,7 +1429,7 @@
     </p:spTree>
     <p:extLst>
       <p:ext uri="{BB962C8B-B14F-4D97-AF65-F5344CB8AC3E}">
-        <p14:creationId xmlns="" xmlns:p14="http://schemas.microsoft.com/office/powerpoint/2010/main" val="802076649"/>
+        <p14:creationId xmlns:p14="http://schemas.microsoft.com/office/powerpoint/2010/main" val="802076649"/>
       </p:ext>
     </p:extLst>
   </p:cSld>
@@ -2305,7 +1553,7 @@
             <a:fld id="{F7EBFB8C-BBFF-4397-A51C-1E92596422A9}" type="slidenum">
               <a:rPr lang="en-US" smtClean="0"/>
               <a:pPr/>
-              <a:t>23</a:t>
+              <a:t>21</a:t>
             </a:fld>
             <a:endParaRPr lang="en-US" dirty="0"/>
           </a:p>
@@ -2314,7 +1562,7 @@
     </p:spTree>
     <p:extLst>
       <p:ext uri="{BB962C8B-B14F-4D97-AF65-F5344CB8AC3E}">
-        <p14:creationId xmlns="" xmlns:p14="http://schemas.microsoft.com/office/powerpoint/2010/main" val="802076649"/>
+        <p14:creationId xmlns:p14="http://schemas.microsoft.com/office/powerpoint/2010/main" val="802076649"/>
       </p:ext>
     </p:extLst>
   </p:cSld>
@@ -2438,7 +1686,7 @@
             <a:fld id="{F7EBFB8C-BBFF-4397-A51C-1E92596422A9}" type="slidenum">
               <a:rPr lang="en-US" smtClean="0"/>
               <a:pPr/>
-              <a:t>24</a:t>
+              <a:t>22</a:t>
             </a:fld>
             <a:endParaRPr lang="en-US" dirty="0"/>
           </a:p>
@@ -2447,7 +1695,7 @@
     </p:spTree>
     <p:extLst>
       <p:ext uri="{BB962C8B-B14F-4D97-AF65-F5344CB8AC3E}">
-        <p14:creationId xmlns="" xmlns:p14="http://schemas.microsoft.com/office/powerpoint/2010/main" val="802076649"/>
+        <p14:creationId xmlns:p14="http://schemas.microsoft.com/office/powerpoint/2010/main" val="802076649"/>
       </p:ext>
     </p:extLst>
   </p:cSld>
@@ -2772,7 +2020,7 @@
     </p:spTree>
     <p:extLst>
       <p:ext uri="{BB962C8B-B14F-4D97-AF65-F5344CB8AC3E}">
-        <p14:creationId xmlns:p14="http://schemas.microsoft.com/office/powerpoint/2010/main" xmlns="" val="517533983"/>
+        <p14:creationId xmlns:p14="http://schemas.microsoft.com/office/powerpoint/2010/main" val="517533983"/>
       </p:ext>
     </p:extLst>
   </p:cSld>
@@ -2823,135 +2071,57 @@
         </p:nvSpPr>
         <p:spPr/>
         <p:txBody>
-          <a:bodyPr>
-            <a:normAutofit fontScale="70000" lnSpcReduction="20000"/>
-          </a:bodyPr>
-          <a:lstStyle/>
-          <a:p>
+          <a:bodyPr/>
+          <a:lstStyle/>
+          <a:p>
+            <a:r>
+              <a:rPr lang="de-DE" dirty="0" smtClean="0"/>
+              <a:t>Blau: Event </a:t>
+            </a:r>
             <a:r>
               <a:rPr lang="de-DE" dirty="0" err="1" smtClean="0"/>
-              <a:t>ÄUßERE</a:t>
-            </a:r>
-            <a:r>
-              <a:rPr lang="de-DE" dirty="0" smtClean="0"/>
-              <a:t> UND INNERE QUALITÄT	</a:t>
-            </a:r>
-          </a:p>
-          <a:p>
-            <a:r>
-              <a:rPr lang="de-DE" dirty="0" smtClean="0"/>
-              <a:t>	Funktionalität	</a:t>
-            </a:r>
-          </a:p>
-          <a:p>
-            <a:r>
-              <a:rPr lang="de-DE" dirty="0" smtClean="0"/>
-              <a:t>	Zuverlässigkeit	</a:t>
-            </a:r>
-          </a:p>
-          <a:p>
-            <a:r>
-              <a:rPr lang="de-DE" dirty="0" smtClean="0"/>
-              <a:t>	Benutzbarkeit	</a:t>
-            </a:r>
-          </a:p>
-          <a:p>
-            <a:r>
-              <a:rPr lang="de-DE" dirty="0" smtClean="0"/>
-              <a:t>	Effizienz	</a:t>
-            </a:r>
-          </a:p>
-          <a:p>
-            <a:r>
-              <a:rPr lang="de-DE" dirty="0" smtClean="0"/>
-              <a:t>	Wartbarkeit	</a:t>
-            </a:r>
-          </a:p>
-          <a:p>
-            <a:r>
-              <a:rPr lang="de-DE" dirty="0" smtClean="0"/>
-              <a:t>	Portabilität	</a:t>
-            </a:r>
-          </a:p>
-          <a:p>
-            <a:r>
-              <a:rPr lang="de-DE" dirty="0" smtClean="0"/>
-              <a:t>GEBRAUCHSTAUGLICHKEIT	</a:t>
-            </a:r>
-          </a:p>
-          <a:p>
-            <a:r>
-              <a:rPr lang="de-DE" dirty="0" smtClean="0"/>
-              <a:t>	Effektivität	</a:t>
-            </a:r>
-          </a:p>
-          <a:p>
-            <a:r>
-              <a:rPr lang="de-DE" dirty="0" smtClean="0"/>
-              <a:t>	Produktivität	</a:t>
-            </a:r>
-          </a:p>
-          <a:p>
-            <a:r>
-              <a:rPr lang="de-DE" dirty="0" smtClean="0"/>
-              <a:t>	Sicherheit	</a:t>
-            </a:r>
-          </a:p>
-          <a:p>
-            <a:r>
-              <a:rPr lang="de-DE" dirty="0" smtClean="0"/>
-              <a:t>	Zufriedenheit	</a:t>
-            </a:r>
-          </a:p>
-          <a:p>
-            <a:r>
-              <a:rPr lang="de-DE" dirty="0" smtClean="0"/>
-              <a:t>TECHNISCHE ANFORDERUNGEN	</a:t>
-            </a:r>
-          </a:p>
-          <a:p>
-            <a:r>
-              <a:rPr lang="de-DE" dirty="0" smtClean="0"/>
-              <a:t>	Einsatzumgebung	</a:t>
-            </a:r>
-          </a:p>
-          <a:p>
-            <a:r>
-              <a:rPr lang="de-DE" dirty="0" smtClean="0"/>
-              <a:t>	Entwicklungsumgebung	</a:t>
-            </a:r>
-          </a:p>
-          <a:p>
-            <a:r>
-              <a:rPr lang="de-DE" dirty="0" smtClean="0"/>
-              <a:t>LIEFERUMFANG	</a:t>
-            </a:r>
-          </a:p>
-          <a:p>
-            <a:r>
-              <a:rPr lang="de-DE" dirty="0" smtClean="0"/>
-              <a:t>	Ausführbare Programme	</a:t>
-            </a:r>
-          </a:p>
-          <a:p>
-            <a:r>
-              <a:rPr lang="de-DE" dirty="0" smtClean="0"/>
-              <a:t>	Quellcode	</a:t>
-            </a:r>
-          </a:p>
-          <a:p>
-            <a:r>
-              <a:rPr lang="de-DE" dirty="0" smtClean="0"/>
-              <a:t>	Dokumentation	</a:t>
-            </a:r>
-          </a:p>
-          <a:p>
-            <a:r>
-              <a:rPr lang="de-DE" dirty="0" smtClean="0"/>
-              <a:t>	Daten	</a:t>
-            </a:r>
-          </a:p>
-          <a:p>
+              <a:t>anlage</a:t>
+            </a:r>
+            <a:endParaRPr lang="de-DE" dirty="0" smtClean="0"/>
+          </a:p>
+          <a:p>
+            <a:r>
+              <a:rPr lang="de-DE" dirty="0" smtClean="0"/>
+              <a:t>DB Table Event, </a:t>
+            </a:r>
+            <a:r>
+              <a:rPr lang="de-DE" dirty="0" err="1" smtClean="0"/>
+              <a:t>normaliserte</a:t>
+            </a:r>
+            <a:r>
+              <a:rPr lang="de-DE" baseline="0" dirty="0" smtClean="0"/>
+              <a:t> Teilnehmerliste und Ort</a:t>
+            </a:r>
+          </a:p>
+          <a:p>
+            <a:endParaRPr lang="de-DE" baseline="0" dirty="0" smtClean="0"/>
+          </a:p>
+          <a:p>
+            <a:r>
+              <a:rPr lang="de-DE" baseline="0" dirty="0" smtClean="0"/>
+              <a:t>Rot: Login Verknüpfung Session ID aus </a:t>
+            </a:r>
+            <a:r>
+              <a:rPr lang="de-DE" baseline="0" dirty="0" err="1" smtClean="0"/>
+              <a:t>oAuth</a:t>
+            </a:r>
+            <a:r>
+              <a:rPr lang="de-DE" baseline="0" dirty="0" smtClean="0"/>
+              <a:t>, Grunddaten (</a:t>
+            </a:r>
+            <a:r>
+              <a:rPr lang="de-DE" baseline="0" dirty="0" err="1" smtClean="0"/>
+              <a:t>name</a:t>
+            </a:r>
+            <a:r>
+              <a:rPr lang="de-DE" baseline="0" dirty="0" smtClean="0"/>
+              <a:t>, E-Mail-Adresse etc.) werden ausgelesen und persistent gespeichert.</a:t>
+            </a:r>
             <a:endParaRPr lang="de-DE" dirty="0"/>
           </a:p>
         </p:txBody>
@@ -2974,7 +2144,7 @@
             <a:fld id="{F7EBFB8C-BBFF-4397-A51C-1E92596422A9}" type="slidenum">
               <a:rPr lang="en-US" smtClean="0"/>
               <a:pPr/>
-              <a:t>25</a:t>
+              <a:t>23</a:t>
             </a:fld>
             <a:endParaRPr lang="en-US" dirty="0"/>
           </a:p>
@@ -2983,7 +2153,7 @@
     </p:spTree>
     <p:extLst>
       <p:ext uri="{BB962C8B-B14F-4D97-AF65-F5344CB8AC3E}">
-        <p14:creationId xmlns:p14="http://schemas.microsoft.com/office/powerpoint/2010/main" xmlns="" val="1629754142"/>
+        <p14:creationId xmlns:p14="http://schemas.microsoft.com/office/powerpoint/2010/main" val="802076649"/>
       </p:ext>
     </p:extLst>
   </p:cSld>
@@ -3039,43 +2209,51 @@
           <a:p>
             <a:r>
               <a:rPr lang="de-DE" dirty="0" smtClean="0"/>
-              <a:t>Zeitplan</a:t>
-            </a:r>
-          </a:p>
-          <a:p>
-            <a:r>
-              <a:rPr lang="de-DE" dirty="0" smtClean="0"/>
-              <a:t>Fokus aus </a:t>
+              <a:t>Blau: Event </a:t>
             </a:r>
             <a:r>
               <a:rPr lang="de-DE" dirty="0" err="1" smtClean="0"/>
-              <a:t>Inception</a:t>
-            </a:r>
-            <a:r>
-              <a:rPr lang="de-DE" dirty="0" smtClean="0"/>
-              <a:t> / Elaboration</a:t>
-            </a:r>
-          </a:p>
-          <a:p>
-            <a:r>
-              <a:rPr lang="de-DE" dirty="0" smtClean="0"/>
-              <a:t>Aufgrund der Enge des Zeitplans jeweils zwei Iterationen mit</a:t>
+              <a:t>anlage</a:t>
+            </a:r>
+            <a:endParaRPr lang="de-DE" dirty="0" smtClean="0"/>
+          </a:p>
+          <a:p>
+            <a:r>
+              <a:rPr lang="de-DE" dirty="0" smtClean="0"/>
+              <a:t>DB Table Event, </a:t>
+            </a:r>
+            <a:r>
+              <a:rPr lang="de-DE" dirty="0" err="1" smtClean="0"/>
+              <a:t>normaliserte</a:t>
             </a:r>
             <a:r>
               <a:rPr lang="de-DE" baseline="0" dirty="0" smtClean="0"/>
-              <a:t> festen Reviews der Ergebnisse etc.</a:t>
-            </a:r>
+              <a:t> Teilnehmerliste und Ort</a:t>
+            </a:r>
+          </a:p>
+          <a:p>
+            <a:endParaRPr lang="de-DE" baseline="0" dirty="0" smtClean="0"/>
           </a:p>
           <a:p>
             <a:r>
               <a:rPr lang="de-DE" baseline="0" dirty="0" smtClean="0"/>
-              <a:t>Aber auch: RUP! Jederzeit auch bei kleineren Änderungen/Feststellungen usw. Überarbeitung.</a:t>
-            </a:r>
-          </a:p>
-          <a:p>
+              <a:t>Rot: Login Verknüpfung Session ID aus </a:t>
+            </a:r>
+            <a:r>
+              <a:rPr lang="de-DE" baseline="0" dirty="0" err="1" smtClean="0"/>
+              <a:t>oAuth</a:t>
+            </a:r>
             <a:r>
               <a:rPr lang="de-DE" baseline="0" dirty="0" smtClean="0"/>
-              <a:t>Ziel: 11.06. eine prototypische Implementierung der Plattform fertigstellen</a:t>
+              <a:t>, Grunddaten (</a:t>
+            </a:r>
+            <a:r>
+              <a:rPr lang="de-DE" baseline="0" dirty="0" err="1" smtClean="0"/>
+              <a:t>name</a:t>
+            </a:r>
+            <a:r>
+              <a:rPr lang="de-DE" baseline="0" dirty="0" smtClean="0"/>
+              <a:t>, E-Mail-Adresse etc.) werden ausgelesen und persistent gespeichert.</a:t>
             </a:r>
             <a:endParaRPr lang="de-DE" dirty="0"/>
           </a:p>
@@ -3099,7 +2277,7 @@
             <a:fld id="{F7EBFB8C-BBFF-4397-A51C-1E92596422A9}" type="slidenum">
               <a:rPr lang="en-US" smtClean="0"/>
               <a:pPr/>
-              <a:t>27</a:t>
+              <a:t>24</a:t>
             </a:fld>
             <a:endParaRPr lang="en-US" dirty="0"/>
           </a:p>
@@ -3108,7 +2286,7 @@
     </p:spTree>
     <p:extLst>
       <p:ext uri="{BB962C8B-B14F-4D97-AF65-F5344CB8AC3E}">
-        <p14:creationId xmlns:p14="http://schemas.microsoft.com/office/powerpoint/2010/main" xmlns="" val="3931682397"/>
+        <p14:creationId xmlns:p14="http://schemas.microsoft.com/office/powerpoint/2010/main" val="802076649"/>
       </p:ext>
     </p:extLst>
   </p:cSld>
@@ -3159,49 +2337,135 @@
         </p:nvSpPr>
         <p:spPr/>
         <p:txBody>
-          <a:bodyPr/>
-          <a:lstStyle/>
-          <a:p>
-            <a:r>
-              <a:rPr lang="de-DE" dirty="0" smtClean="0"/>
-              <a:t>Zeitplan</a:t>
-            </a:r>
-          </a:p>
-          <a:p>
-            <a:r>
-              <a:rPr lang="de-DE" dirty="0" smtClean="0"/>
-              <a:t>Fokus aus </a:t>
-            </a:r>
+          <a:bodyPr>
+            <a:normAutofit fontScale="70000" lnSpcReduction="20000"/>
+          </a:bodyPr>
+          <a:lstStyle/>
+          <a:p>
             <a:r>
               <a:rPr lang="de-DE" dirty="0" err="1" smtClean="0"/>
-              <a:t>Inception</a:t>
-            </a:r>
-            <a:r>
-              <a:rPr lang="de-DE" dirty="0" smtClean="0"/>
-              <a:t> / Elaboration</a:t>
-            </a:r>
-          </a:p>
-          <a:p>
-            <a:r>
-              <a:rPr lang="de-DE" dirty="0" smtClean="0"/>
-              <a:t>Aufgrund der Enge des Zeitplans jeweils zwei Iterationen mit</a:t>
-            </a:r>
-            <a:r>
-              <a:rPr lang="de-DE" baseline="0" dirty="0" smtClean="0"/>
-              <a:t> festen Reviews der Ergebnisse etc.</a:t>
-            </a:r>
-          </a:p>
-          <a:p>
-            <a:r>
-              <a:rPr lang="de-DE" baseline="0" dirty="0" smtClean="0"/>
-              <a:t>Aber auch: RUP! Jederzeit auch bei kleineren Änderungen/Feststellungen usw. Überarbeitung.</a:t>
-            </a:r>
-          </a:p>
-          <a:p>
-            <a:r>
-              <a:rPr lang="de-DE" baseline="0" dirty="0" smtClean="0"/>
-              <a:t>Ziel: 11.06. eine prototypische Implementierung der Plattform fertigstellen</a:t>
-            </a:r>
+              <a:t>ÄUßERE</a:t>
+            </a:r>
+            <a:r>
+              <a:rPr lang="de-DE" dirty="0" smtClean="0"/>
+              <a:t> UND INNERE QUALITÄT	</a:t>
+            </a:r>
+          </a:p>
+          <a:p>
+            <a:r>
+              <a:rPr lang="de-DE" dirty="0" smtClean="0"/>
+              <a:t>	Funktionalität	</a:t>
+            </a:r>
+          </a:p>
+          <a:p>
+            <a:r>
+              <a:rPr lang="de-DE" dirty="0" smtClean="0"/>
+              <a:t>	Zuverlässigkeit	</a:t>
+            </a:r>
+          </a:p>
+          <a:p>
+            <a:r>
+              <a:rPr lang="de-DE" dirty="0" smtClean="0"/>
+              <a:t>	Benutzbarkeit	</a:t>
+            </a:r>
+          </a:p>
+          <a:p>
+            <a:r>
+              <a:rPr lang="de-DE" dirty="0" smtClean="0"/>
+              <a:t>	Effizienz	</a:t>
+            </a:r>
+          </a:p>
+          <a:p>
+            <a:r>
+              <a:rPr lang="de-DE" dirty="0" smtClean="0"/>
+              <a:t>	Wartbarkeit	</a:t>
+            </a:r>
+          </a:p>
+          <a:p>
+            <a:r>
+              <a:rPr lang="de-DE" dirty="0" smtClean="0"/>
+              <a:t>	Portabilität	</a:t>
+            </a:r>
+          </a:p>
+          <a:p>
+            <a:r>
+              <a:rPr lang="de-DE" dirty="0" smtClean="0"/>
+              <a:t>GEBRAUCHSTAUGLICHKEIT	</a:t>
+            </a:r>
+          </a:p>
+          <a:p>
+            <a:r>
+              <a:rPr lang="de-DE" dirty="0" smtClean="0"/>
+              <a:t>	Effektivität	</a:t>
+            </a:r>
+          </a:p>
+          <a:p>
+            <a:r>
+              <a:rPr lang="de-DE" dirty="0" smtClean="0"/>
+              <a:t>	Produktivität	</a:t>
+            </a:r>
+          </a:p>
+          <a:p>
+            <a:r>
+              <a:rPr lang="de-DE" dirty="0" smtClean="0"/>
+              <a:t>	Sicherheit	</a:t>
+            </a:r>
+          </a:p>
+          <a:p>
+            <a:r>
+              <a:rPr lang="de-DE" dirty="0" smtClean="0"/>
+              <a:t>	Zufriedenheit	</a:t>
+            </a:r>
+          </a:p>
+          <a:p>
+            <a:r>
+              <a:rPr lang="de-DE" dirty="0" smtClean="0"/>
+              <a:t>TECHNISCHE ANFORDERUNGEN	</a:t>
+            </a:r>
+          </a:p>
+          <a:p>
+            <a:r>
+              <a:rPr lang="de-DE" dirty="0" smtClean="0"/>
+              <a:t>	Einsatzumgebung	</a:t>
+            </a:r>
+          </a:p>
+          <a:p>
+            <a:r>
+              <a:rPr lang="de-DE" dirty="0" smtClean="0"/>
+              <a:t>	Entwicklungsumgebung	</a:t>
+            </a:r>
+          </a:p>
+          <a:p>
+            <a:r>
+              <a:rPr lang="de-DE" dirty="0" smtClean="0"/>
+              <a:t>LIEFERUMFANG	</a:t>
+            </a:r>
+          </a:p>
+          <a:p>
+            <a:r>
+              <a:rPr lang="de-DE" dirty="0" smtClean="0"/>
+              <a:t>	Ausführbare Programme	</a:t>
+            </a:r>
+          </a:p>
+          <a:p>
+            <a:r>
+              <a:rPr lang="de-DE" dirty="0" smtClean="0"/>
+              <a:t>	Quellcode	</a:t>
+            </a:r>
+          </a:p>
+          <a:p>
+            <a:r>
+              <a:rPr lang="de-DE" dirty="0" smtClean="0"/>
+              <a:t>	Dokumentation	</a:t>
+            </a:r>
+          </a:p>
+          <a:p>
+            <a:r>
+              <a:rPr lang="de-DE" dirty="0" smtClean="0"/>
+              <a:t>	Daten	</a:t>
+            </a:r>
+          </a:p>
+          <a:p>
             <a:endParaRPr lang="de-DE" dirty="0"/>
           </a:p>
         </p:txBody>
@@ -3224,7 +2488,7 @@
             <a:fld id="{F7EBFB8C-BBFF-4397-A51C-1E92596422A9}" type="slidenum">
               <a:rPr lang="en-US" smtClean="0"/>
               <a:pPr/>
-              <a:t>28</a:t>
+              <a:t>25</a:t>
             </a:fld>
             <a:endParaRPr lang="en-US" dirty="0"/>
           </a:p>
@@ -3233,7 +2497,7 @@
     </p:spTree>
     <p:extLst>
       <p:ext uri="{BB962C8B-B14F-4D97-AF65-F5344CB8AC3E}">
-        <p14:creationId xmlns:p14="http://schemas.microsoft.com/office/powerpoint/2010/main" xmlns="" val="3931682397"/>
+        <p14:creationId xmlns:p14="http://schemas.microsoft.com/office/powerpoint/2010/main" val="1629754142"/>
       </p:ext>
     </p:extLst>
   </p:cSld>
@@ -3284,11 +2548,49 @@
         </p:nvSpPr>
         <p:spPr/>
         <p:txBody>
-          <a:bodyPr>
-            <a:normAutofit/>
-          </a:bodyPr>
-          <a:lstStyle/>
-          <a:p>
+          <a:bodyPr/>
+          <a:lstStyle/>
+          <a:p>
+            <a:r>
+              <a:rPr lang="de-DE" dirty="0" smtClean="0"/>
+              <a:t>Zeitplan</a:t>
+            </a:r>
+          </a:p>
+          <a:p>
+            <a:r>
+              <a:rPr lang="de-DE" dirty="0" smtClean="0"/>
+              <a:t>Fokus aus </a:t>
+            </a:r>
+            <a:r>
+              <a:rPr lang="de-DE" dirty="0" err="1" smtClean="0"/>
+              <a:t>Inception</a:t>
+            </a:r>
+            <a:r>
+              <a:rPr lang="de-DE" dirty="0" smtClean="0"/>
+              <a:t> / Elaboration</a:t>
+            </a:r>
+          </a:p>
+          <a:p>
+            <a:r>
+              <a:rPr lang="de-DE" dirty="0" smtClean="0"/>
+              <a:t>Aufgrund der Enge des Zeitplans jeweils zwei Iterationen mit</a:t>
+            </a:r>
+            <a:r>
+              <a:rPr lang="de-DE" baseline="0" dirty="0" smtClean="0"/>
+              <a:t> festen Reviews der Ergebnisse etc.</a:t>
+            </a:r>
+          </a:p>
+          <a:p>
+            <a:r>
+              <a:rPr lang="de-DE" baseline="0" dirty="0" smtClean="0"/>
+              <a:t>Aber auch: RUP! Jederzeit auch bei kleineren Änderungen/Feststellungen usw. Überarbeitung.</a:t>
+            </a:r>
+          </a:p>
+          <a:p>
+            <a:r>
+              <a:rPr lang="de-DE" baseline="0" dirty="0" smtClean="0"/>
+              <a:t>Ziel: 11.06. eine prototypische Implementierung der Plattform fertigstellen</a:t>
+            </a:r>
             <a:endParaRPr lang="de-DE" dirty="0"/>
           </a:p>
         </p:txBody>
@@ -3308,16 +2610,21 @@
           <a:bodyPr/>
           <a:lstStyle/>
           <a:p>
-            <a:fld id="{1EBFF01C-F984-4A51-AF10-254043F7C542}" type="slidenum">
-              <a:rPr lang="de-DE" smtClean="0"/>
+            <a:fld id="{F7EBFB8C-BBFF-4397-A51C-1E92596422A9}" type="slidenum">
+              <a:rPr lang="en-US" smtClean="0"/>
               <a:pPr/>
-              <a:t>30</a:t>
+              <a:t>27</a:t>
             </a:fld>
-            <a:endParaRPr lang="de-DE"/>
+            <a:endParaRPr lang="en-US" dirty="0"/>
           </a:p>
         </p:txBody>
       </p:sp>
     </p:spTree>
+    <p:extLst>
+      <p:ext uri="{BB962C8B-B14F-4D97-AF65-F5344CB8AC3E}">
+        <p14:creationId xmlns:p14="http://schemas.microsoft.com/office/powerpoint/2010/main" val="3931682397"/>
+      </p:ext>
+    </p:extLst>
   </p:cSld>
   <p:clrMapOvr>
     <a:masterClrMapping/>
@@ -3371,209 +2678,43 @@
           <a:p>
             <a:r>
               <a:rPr lang="de-DE" dirty="0" smtClean="0"/>
-              <a:t>Zu </a:t>
+              <a:t>Zeitplan</a:t>
+            </a:r>
+          </a:p>
+          <a:p>
+            <a:r>
+              <a:rPr lang="de-DE" dirty="0" smtClean="0"/>
+              <a:t>Fokus aus </a:t>
             </a:r>
             <a:r>
               <a:rPr lang="de-DE" dirty="0" err="1" smtClean="0"/>
-              <a:t>git</a:t>
-            </a:r>
-            <a:r>
-              <a:rPr lang="de-DE" dirty="0" smtClean="0"/>
-              <a:t>:</a:t>
-            </a:r>
-          </a:p>
-          <a:p>
-            <a:r>
-              <a:rPr lang="de-DE" dirty="0" smtClean="0"/>
-              <a:t>	Dateikonflikte aufwändiges</a:t>
+              <a:t>Inception</a:t>
+            </a:r>
+            <a:r>
+              <a:rPr lang="de-DE" dirty="0" smtClean="0"/>
+              <a:t> / Elaboration</a:t>
+            </a:r>
+          </a:p>
+          <a:p>
+            <a:r>
+              <a:rPr lang="de-DE" dirty="0" smtClean="0"/>
+              <a:t>Aufgrund der Enge des Zeitplans jeweils zwei Iterationen mit</a:t>
             </a:r>
             <a:r>
               <a:rPr lang="de-DE" baseline="0" dirty="0" smtClean="0"/>
-              <a:t> ein-/auschecken, mit </a:t>
-            </a:r>
-            <a:r>
-              <a:rPr lang="de-DE" baseline="0" dirty="0" err="1" smtClean="0"/>
-              <a:t>dropbox</a:t>
-            </a:r>
+              <a:t> festen Reviews der Ergebnisse etc.</a:t>
+            </a:r>
+          </a:p>
+          <a:p>
             <a:r>
               <a:rPr lang="de-DE" baseline="0" dirty="0" smtClean="0"/>
-              <a:t> und </a:t>
-            </a:r>
-            <a:r>
-              <a:rPr lang="de-DE" baseline="0" dirty="0" err="1" smtClean="0"/>
-              <a:t>co</a:t>
-            </a:r>
+              <a:t>Aber auch: RUP! Jederzeit auch bei kleineren Änderungen/Feststellungen usw. Überarbeitung.</a:t>
+            </a:r>
+          </a:p>
+          <a:p>
             <a:r>
               <a:rPr lang="de-DE" baseline="0" dirty="0" smtClean="0"/>
-              <a:t> on </a:t>
-            </a:r>
-            <a:r>
-              <a:rPr lang="de-DE" baseline="0" dirty="0" err="1" smtClean="0"/>
-              <a:t>the</a:t>
-            </a:r>
-            <a:r>
-              <a:rPr lang="de-DE" baseline="0" dirty="0" smtClean="0"/>
-              <a:t> </a:t>
-            </a:r>
-            <a:r>
-              <a:rPr lang="de-DE" baseline="0" dirty="0" err="1" smtClean="0"/>
-              <a:t>fly</a:t>
-            </a:r>
-            <a:r>
-              <a:rPr lang="de-DE" baseline="0" dirty="0" smtClean="0"/>
-              <a:t>, automatisch im Hintergrund.</a:t>
-            </a:r>
-          </a:p>
-          <a:p>
-            <a:r>
-              <a:rPr lang="de-DE" baseline="0" dirty="0" smtClean="0"/>
-              <a:t>	evtl. zu früh auf ein Tool festgelegt, oder besser zwei? (</a:t>
-            </a:r>
-            <a:r>
-              <a:rPr lang="de-DE" baseline="0" dirty="0" err="1" smtClean="0"/>
-              <a:t>dropbox</a:t>
-            </a:r>
-            <a:r>
-              <a:rPr lang="de-DE" baseline="0" dirty="0" smtClean="0"/>
-              <a:t> für Dokumente, </a:t>
-            </a:r>
-            <a:r>
-              <a:rPr lang="de-DE" baseline="0" dirty="0" err="1" smtClean="0"/>
-              <a:t>gitHub</a:t>
-            </a:r>
-            <a:r>
-              <a:rPr lang="de-DE" baseline="0" dirty="0" smtClean="0"/>
-              <a:t> für </a:t>
-            </a:r>
-            <a:r>
-              <a:rPr lang="de-DE" baseline="0" dirty="0" err="1" smtClean="0"/>
-              <a:t>Sourcen</a:t>
-            </a:r>
-            <a:r>
-              <a:rPr lang="de-DE" baseline="0" dirty="0" smtClean="0"/>
-              <a:t>)</a:t>
-            </a:r>
-          </a:p>
-          <a:p>
-            <a:r>
-              <a:rPr lang="de-DE" baseline="0" dirty="0" err="1" smtClean="0"/>
-              <a:t>Projektmgm</a:t>
-            </a:r>
-            <a:endParaRPr lang="de-DE" baseline="0" dirty="0" smtClean="0"/>
-          </a:p>
-          <a:p>
-            <a:r>
-              <a:rPr lang="de-DE" baseline="0" dirty="0" smtClean="0"/>
-              <a:t>	Aufgaben stärker </a:t>
-            </a:r>
-            <a:r>
-              <a:rPr lang="de-DE" baseline="0" dirty="0" err="1" smtClean="0"/>
-              <a:t>tracken</a:t>
-            </a:r>
-            <a:r>
-              <a:rPr lang="de-DE" baseline="0" dirty="0" smtClean="0"/>
-              <a:t>, ggf. „</a:t>
-            </a:r>
-            <a:r>
-              <a:rPr lang="de-DE" baseline="0" dirty="0" err="1" smtClean="0"/>
-              <a:t>cut</a:t>
-            </a:r>
-            <a:r>
-              <a:rPr lang="de-DE" baseline="0" dirty="0" smtClean="0"/>
-              <a:t>“ (bei Vertiefung in nicht notwendigen Details (z.B. Risikoanalyse, Wirtschaftlichkeitsbetrachtung)</a:t>
-            </a:r>
-          </a:p>
-          <a:p>
-            <a:endParaRPr lang="de-DE" dirty="0" smtClean="0"/>
-          </a:p>
-          <a:p>
-            <a:r>
-              <a:rPr lang="de-DE" dirty="0" err="1" smtClean="0"/>
-              <a:t>Workload</a:t>
-            </a:r>
-            <a:endParaRPr lang="de-DE" dirty="0" smtClean="0"/>
-          </a:p>
-          <a:p>
-            <a:r>
-              <a:rPr lang="de-DE" dirty="0" smtClean="0"/>
-              <a:t>	</a:t>
-            </a:r>
-            <a:r>
-              <a:rPr lang="de-DE" dirty="0" err="1" smtClean="0"/>
-              <a:t>Höhrer</a:t>
-            </a:r>
-            <a:r>
-              <a:rPr lang="de-DE" dirty="0" smtClean="0"/>
-              <a:t> Aufwand als erwartet, zusätzlicher stress neben der Arbeit. Risikofaktor,</a:t>
-            </a:r>
-            <a:r>
-              <a:rPr lang="de-DE" baseline="0" dirty="0" smtClean="0"/>
-              <a:t> da alle beim gleichen Unternehmen arbeiten (viel zu tun (</a:t>
-            </a:r>
-            <a:r>
-              <a:rPr lang="de-DE" baseline="0" dirty="0" err="1" smtClean="0"/>
-              <a:t>arbeit</a:t>
-            </a:r>
-            <a:r>
-              <a:rPr lang="de-DE" baseline="0" dirty="0" smtClean="0"/>
-              <a:t>) </a:t>
-            </a:r>
-            <a:r>
-              <a:rPr lang="de-DE" baseline="0" dirty="0" smtClean="0">
-                <a:sym typeface="Wingdings" pitchFamily="2" charset="2"/>
-              </a:rPr>
-              <a:t> weniger Zeit </a:t>
-            </a:r>
-            <a:r>
-              <a:rPr lang="de-DE" baseline="0" smtClean="0">
-                <a:sym typeface="Wingdings" pitchFamily="2" charset="2"/>
-              </a:rPr>
-              <a:t>(Projekt))</a:t>
-            </a:r>
-            <a:endParaRPr lang="de-DE" dirty="0" smtClean="0"/>
-          </a:p>
-          <a:p>
-            <a:r>
-              <a:rPr lang="de-DE" dirty="0" err="1" smtClean="0"/>
-              <a:t>PeerReview</a:t>
-            </a:r>
-            <a:r>
-              <a:rPr lang="de-DE" dirty="0" smtClean="0"/>
-              <a:t>:</a:t>
-            </a:r>
-          </a:p>
-          <a:p>
-            <a:r>
-              <a:rPr lang="de-DE" dirty="0" smtClean="0"/>
-              <a:t>	Hilfreich eine zweite unabhängige</a:t>
-            </a:r>
-            <a:r>
-              <a:rPr lang="de-DE" baseline="0" dirty="0" smtClean="0"/>
-              <a:t> Meinung; Lücken wurden identifiziert und behoben</a:t>
-            </a:r>
-          </a:p>
-          <a:p>
-            <a:r>
-              <a:rPr lang="de-DE" dirty="0" smtClean="0"/>
-              <a:t>Teamwork:</a:t>
-            </a:r>
-          </a:p>
-          <a:p>
-            <a:r>
-              <a:rPr lang="de-DE" dirty="0" smtClean="0"/>
-              <a:t>	Abstimmungen, Konstruktive </a:t>
-            </a:r>
-            <a:r>
-              <a:rPr lang="de-DE" dirty="0" err="1" smtClean="0"/>
-              <a:t>diskussionen</a:t>
-            </a:r>
-            <a:r>
-              <a:rPr lang="de-DE" dirty="0" smtClean="0"/>
-              <a:t>, Mitglieder</a:t>
-            </a:r>
-            <a:r>
-              <a:rPr lang="de-DE" baseline="0" dirty="0" smtClean="0"/>
-              <a:t> haben sich durch Fach/Spezialwissen gut ergänzt</a:t>
+              <a:t>Ziel: 11.06. eine prototypische Implementierung der Plattform fertigstellen</a:t>
             </a:r>
             <a:endParaRPr lang="de-DE" dirty="0"/>
           </a:p>
@@ -3597,7 +2738,7 @@
             <a:fld id="{F7EBFB8C-BBFF-4397-A51C-1E92596422A9}" type="slidenum">
               <a:rPr lang="en-US" smtClean="0"/>
               <a:pPr/>
-              <a:t>31</a:t>
+              <a:t>28</a:t>
             </a:fld>
             <a:endParaRPr lang="en-US" dirty="0"/>
           </a:p>
@@ -3606,7 +2747,7 @@
     </p:spTree>
     <p:extLst>
       <p:ext uri="{BB962C8B-B14F-4D97-AF65-F5344CB8AC3E}">
-        <p14:creationId xmlns:p14="http://schemas.microsoft.com/office/powerpoint/2010/main" xmlns="" val="1616458392"/>
+        <p14:creationId xmlns:p14="http://schemas.microsoft.com/office/powerpoint/2010/main" val="3931682397"/>
       </p:ext>
     </p:extLst>
   </p:cSld>
@@ -3657,6 +2798,373 @@
         </p:nvSpPr>
         <p:spPr/>
         <p:txBody>
+          <a:bodyPr>
+            <a:normAutofit/>
+          </a:bodyPr>
+          <a:lstStyle/>
+          <a:p>
+            <a:endParaRPr lang="de-DE" dirty="0"/>
+          </a:p>
+        </p:txBody>
+      </p:sp>
+      <p:sp>
+        <p:nvSpPr>
+          <p:cNvPr id="4" name="Foliennummernplatzhalter 3"/>
+          <p:cNvSpPr>
+            <a:spLocks noGrp="1"/>
+          </p:cNvSpPr>
+          <p:nvPr>
+            <p:ph type="sldNum" sz="quarter" idx="10"/>
+          </p:nvPr>
+        </p:nvSpPr>
+        <p:spPr/>
+        <p:txBody>
+          <a:bodyPr/>
+          <a:lstStyle/>
+          <a:p>
+            <a:fld id="{1EBFF01C-F984-4A51-AF10-254043F7C542}" type="slidenum">
+              <a:rPr lang="de-DE" smtClean="0"/>
+              <a:pPr/>
+              <a:t>30</a:t>
+            </a:fld>
+            <a:endParaRPr lang="de-DE"/>
+          </a:p>
+        </p:txBody>
+      </p:sp>
+    </p:spTree>
+  </p:cSld>
+  <p:clrMapOvr>
+    <a:masterClrMapping/>
+  </p:clrMapOvr>
+</p:notes>
+</file>
+
+<file path=ppt/notesSlides/notesSlide26.xml><?xml version="1.0" encoding="utf-8"?>
+<p:notes xmlns:a="http://schemas.openxmlformats.org/drawingml/2006/main" xmlns:r="http://schemas.openxmlformats.org/officeDocument/2006/relationships" xmlns:p="http://schemas.openxmlformats.org/presentationml/2006/main">
+  <p:cSld>
+    <p:spTree>
+      <p:nvGrpSpPr>
+        <p:cNvPr id="1" name=""/>
+        <p:cNvGrpSpPr/>
+        <p:nvPr/>
+      </p:nvGrpSpPr>
+      <p:grpSpPr>
+        <a:xfrm>
+          <a:off x="0" y="0"/>
+          <a:ext cx="0" cy="0"/>
+          <a:chOff x="0" y="0"/>
+          <a:chExt cx="0" cy="0"/>
+        </a:xfrm>
+      </p:grpSpPr>
+      <p:sp>
+        <p:nvSpPr>
+          <p:cNvPr id="2" name="Folienbildplatzhalter 1"/>
+          <p:cNvSpPr>
+            <a:spLocks noGrp="1" noRot="1" noChangeAspect="1"/>
+          </p:cNvSpPr>
+          <p:nvPr>
+            <p:ph type="sldImg"/>
+          </p:nvPr>
+        </p:nvSpPr>
+        <p:spPr/>
+      </p:sp>
+      <p:sp>
+        <p:nvSpPr>
+          <p:cNvPr id="3" name="Notizenplatzhalter 2"/>
+          <p:cNvSpPr>
+            <a:spLocks noGrp="1"/>
+          </p:cNvSpPr>
+          <p:nvPr>
+            <p:ph type="body" idx="1"/>
+          </p:nvPr>
+        </p:nvSpPr>
+        <p:spPr/>
+        <p:txBody>
+          <a:bodyPr/>
+          <a:lstStyle/>
+          <a:p>
+            <a:r>
+              <a:rPr lang="de-DE" dirty="0" smtClean="0"/>
+              <a:t>Zu </a:t>
+            </a:r>
+            <a:r>
+              <a:rPr lang="de-DE" dirty="0" err="1" smtClean="0"/>
+              <a:t>git</a:t>
+            </a:r>
+            <a:r>
+              <a:rPr lang="de-DE" dirty="0" smtClean="0"/>
+              <a:t>:</a:t>
+            </a:r>
+          </a:p>
+          <a:p>
+            <a:r>
+              <a:rPr lang="de-DE" dirty="0" smtClean="0"/>
+              <a:t>	Dateikonflikte aufwändiges</a:t>
+            </a:r>
+            <a:r>
+              <a:rPr lang="de-DE" baseline="0" dirty="0" smtClean="0"/>
+              <a:t> ein-/auschecken, mit </a:t>
+            </a:r>
+            <a:r>
+              <a:rPr lang="de-DE" baseline="0" dirty="0" err="1" smtClean="0"/>
+              <a:t>dropbox</a:t>
+            </a:r>
+            <a:r>
+              <a:rPr lang="de-DE" baseline="0" dirty="0" smtClean="0"/>
+              <a:t> und </a:t>
+            </a:r>
+            <a:r>
+              <a:rPr lang="de-DE" baseline="0" dirty="0" err="1" smtClean="0"/>
+              <a:t>co</a:t>
+            </a:r>
+            <a:r>
+              <a:rPr lang="de-DE" baseline="0" dirty="0" smtClean="0"/>
+              <a:t> on </a:t>
+            </a:r>
+            <a:r>
+              <a:rPr lang="de-DE" baseline="0" dirty="0" err="1" smtClean="0"/>
+              <a:t>the</a:t>
+            </a:r>
+            <a:r>
+              <a:rPr lang="de-DE" baseline="0" dirty="0" smtClean="0"/>
+              <a:t> </a:t>
+            </a:r>
+            <a:r>
+              <a:rPr lang="de-DE" baseline="0" dirty="0" err="1" smtClean="0"/>
+              <a:t>fly</a:t>
+            </a:r>
+            <a:r>
+              <a:rPr lang="de-DE" baseline="0" dirty="0" smtClean="0"/>
+              <a:t>, automatisch im Hintergrund.</a:t>
+            </a:r>
+          </a:p>
+          <a:p>
+            <a:r>
+              <a:rPr lang="de-DE" baseline="0" dirty="0" smtClean="0"/>
+              <a:t>	evtl. zu früh auf ein Tool festgelegt, oder besser zwei? (</a:t>
+            </a:r>
+            <a:r>
+              <a:rPr lang="de-DE" baseline="0" dirty="0" err="1" smtClean="0"/>
+              <a:t>dropbox</a:t>
+            </a:r>
+            <a:r>
+              <a:rPr lang="de-DE" baseline="0" dirty="0" smtClean="0"/>
+              <a:t> für Dokumente, </a:t>
+            </a:r>
+            <a:r>
+              <a:rPr lang="de-DE" baseline="0" dirty="0" err="1" smtClean="0"/>
+              <a:t>gitHub</a:t>
+            </a:r>
+            <a:r>
+              <a:rPr lang="de-DE" baseline="0" dirty="0" smtClean="0"/>
+              <a:t> für </a:t>
+            </a:r>
+            <a:r>
+              <a:rPr lang="de-DE" baseline="0" dirty="0" err="1" smtClean="0"/>
+              <a:t>Sourcen</a:t>
+            </a:r>
+            <a:r>
+              <a:rPr lang="de-DE" baseline="0" dirty="0" smtClean="0"/>
+              <a:t>)</a:t>
+            </a:r>
+          </a:p>
+          <a:p>
+            <a:r>
+              <a:rPr lang="de-DE" baseline="0" dirty="0" err="1" smtClean="0"/>
+              <a:t>Projektmgm</a:t>
+            </a:r>
+            <a:endParaRPr lang="de-DE" baseline="0" dirty="0" smtClean="0"/>
+          </a:p>
+          <a:p>
+            <a:r>
+              <a:rPr lang="de-DE" baseline="0" dirty="0" smtClean="0"/>
+              <a:t>	Aufgaben stärker </a:t>
+            </a:r>
+            <a:r>
+              <a:rPr lang="de-DE" baseline="0" dirty="0" err="1" smtClean="0"/>
+              <a:t>tracken</a:t>
+            </a:r>
+            <a:r>
+              <a:rPr lang="de-DE" baseline="0" dirty="0" smtClean="0"/>
+              <a:t>, ggf. „</a:t>
+            </a:r>
+            <a:r>
+              <a:rPr lang="de-DE" baseline="0" dirty="0" err="1" smtClean="0"/>
+              <a:t>cut</a:t>
+            </a:r>
+            <a:r>
+              <a:rPr lang="de-DE" baseline="0" dirty="0" smtClean="0"/>
+              <a:t>“ (bei Vertiefung in nicht notwendigen Details (z.B. Risikoanalyse, Wirtschaftlichkeitsbetrachtung)</a:t>
+            </a:r>
+          </a:p>
+          <a:p>
+            <a:endParaRPr lang="de-DE" dirty="0" smtClean="0"/>
+          </a:p>
+          <a:p>
+            <a:r>
+              <a:rPr lang="de-DE" dirty="0" err="1" smtClean="0"/>
+              <a:t>Workload</a:t>
+            </a:r>
+            <a:endParaRPr lang="de-DE" dirty="0" smtClean="0"/>
+          </a:p>
+          <a:p>
+            <a:r>
+              <a:rPr lang="de-DE" dirty="0" smtClean="0"/>
+              <a:t>	</a:t>
+            </a:r>
+            <a:r>
+              <a:rPr lang="de-DE" dirty="0" err="1" smtClean="0"/>
+              <a:t>Höhrer</a:t>
+            </a:r>
+            <a:r>
+              <a:rPr lang="de-DE" dirty="0" smtClean="0"/>
+              <a:t> Aufwand als erwartet, zusätzlicher stress neben der Arbeit. Risikofaktor,</a:t>
+            </a:r>
+            <a:r>
+              <a:rPr lang="de-DE" baseline="0" dirty="0" smtClean="0"/>
+              <a:t> da alle beim gleichen Unternehmen arbeiten (viel zu tun (</a:t>
+            </a:r>
+            <a:r>
+              <a:rPr lang="de-DE" baseline="0" dirty="0" err="1" smtClean="0"/>
+              <a:t>arbeit</a:t>
+            </a:r>
+            <a:r>
+              <a:rPr lang="de-DE" baseline="0" dirty="0" smtClean="0"/>
+              <a:t>) </a:t>
+            </a:r>
+            <a:r>
+              <a:rPr lang="de-DE" baseline="0" dirty="0" smtClean="0">
+                <a:sym typeface="Wingdings" pitchFamily="2" charset="2"/>
+              </a:rPr>
+              <a:t> weniger Zeit (Projekt))</a:t>
+            </a:r>
+            <a:endParaRPr lang="de-DE" dirty="0" smtClean="0"/>
+          </a:p>
+          <a:p>
+            <a:r>
+              <a:rPr lang="de-DE" dirty="0" err="1" smtClean="0"/>
+              <a:t>PeerReview</a:t>
+            </a:r>
+            <a:r>
+              <a:rPr lang="de-DE" dirty="0" smtClean="0"/>
+              <a:t>:</a:t>
+            </a:r>
+          </a:p>
+          <a:p>
+            <a:r>
+              <a:rPr lang="de-DE" dirty="0" smtClean="0"/>
+              <a:t>	Hilfreich eine zweite unabhängige</a:t>
+            </a:r>
+            <a:r>
+              <a:rPr lang="de-DE" baseline="0" dirty="0" smtClean="0"/>
+              <a:t> Meinung; Lücken wurden identifiziert und behoben</a:t>
+            </a:r>
+          </a:p>
+          <a:p>
+            <a:r>
+              <a:rPr lang="de-DE" dirty="0" smtClean="0"/>
+              <a:t>Teamwork:</a:t>
+            </a:r>
+          </a:p>
+          <a:p>
+            <a:r>
+              <a:rPr lang="de-DE" dirty="0" smtClean="0"/>
+              <a:t>	Abstimmungen, Konstruktive </a:t>
+            </a:r>
+            <a:r>
+              <a:rPr lang="de-DE" dirty="0" err="1" smtClean="0"/>
+              <a:t>diskussionen</a:t>
+            </a:r>
+            <a:r>
+              <a:rPr lang="de-DE" dirty="0" smtClean="0"/>
+              <a:t>, Mitglieder</a:t>
+            </a:r>
+            <a:r>
+              <a:rPr lang="de-DE" baseline="0" dirty="0" smtClean="0"/>
+              <a:t> haben sich durch Fach/Spezialwissen gut ergänzt</a:t>
+            </a:r>
+            <a:endParaRPr lang="de-DE" dirty="0"/>
+          </a:p>
+        </p:txBody>
+      </p:sp>
+      <p:sp>
+        <p:nvSpPr>
+          <p:cNvPr id="4" name="Foliennummernplatzhalter 3"/>
+          <p:cNvSpPr>
+            <a:spLocks noGrp="1"/>
+          </p:cNvSpPr>
+          <p:nvPr>
+            <p:ph type="sldNum" sz="quarter" idx="10"/>
+          </p:nvPr>
+        </p:nvSpPr>
+        <p:spPr/>
+        <p:txBody>
+          <a:bodyPr/>
+          <a:lstStyle/>
+          <a:p>
+            <a:fld id="{F7EBFB8C-BBFF-4397-A51C-1E92596422A9}" type="slidenum">
+              <a:rPr lang="en-US" smtClean="0"/>
+              <a:pPr/>
+              <a:t>31</a:t>
+            </a:fld>
+            <a:endParaRPr lang="en-US" dirty="0"/>
+          </a:p>
+        </p:txBody>
+      </p:sp>
+    </p:spTree>
+    <p:extLst>
+      <p:ext uri="{BB962C8B-B14F-4D97-AF65-F5344CB8AC3E}">
+        <p14:creationId xmlns:p14="http://schemas.microsoft.com/office/powerpoint/2010/main" val="1616458392"/>
+      </p:ext>
+    </p:extLst>
+  </p:cSld>
+  <p:clrMapOvr>
+    <a:masterClrMapping/>
+  </p:clrMapOvr>
+</p:notes>
+</file>
+
+<file path=ppt/notesSlides/notesSlide27.xml><?xml version="1.0" encoding="utf-8"?>
+<p:notes xmlns:a="http://schemas.openxmlformats.org/drawingml/2006/main" xmlns:r="http://schemas.openxmlformats.org/officeDocument/2006/relationships" xmlns:p="http://schemas.openxmlformats.org/presentationml/2006/main">
+  <p:cSld>
+    <p:spTree>
+      <p:nvGrpSpPr>
+        <p:cNvPr id="1" name=""/>
+        <p:cNvGrpSpPr/>
+        <p:nvPr/>
+      </p:nvGrpSpPr>
+      <p:grpSpPr>
+        <a:xfrm>
+          <a:off x="0" y="0"/>
+          <a:ext cx="0" cy="0"/>
+          <a:chOff x="0" y="0"/>
+          <a:chExt cx="0" cy="0"/>
+        </a:xfrm>
+      </p:grpSpPr>
+      <p:sp>
+        <p:nvSpPr>
+          <p:cNvPr id="2" name="Folienbildplatzhalter 1"/>
+          <p:cNvSpPr>
+            <a:spLocks noGrp="1" noRot="1" noChangeAspect="1"/>
+          </p:cNvSpPr>
+          <p:nvPr>
+            <p:ph type="sldImg"/>
+          </p:nvPr>
+        </p:nvSpPr>
+        <p:spPr/>
+      </p:sp>
+      <p:sp>
+        <p:nvSpPr>
+          <p:cNvPr id="3" name="Notizenplatzhalter 2"/>
+          <p:cNvSpPr>
+            <a:spLocks noGrp="1"/>
+          </p:cNvSpPr>
+          <p:nvPr>
+            <p:ph type="body" idx="1"/>
+          </p:nvPr>
+        </p:nvSpPr>
+        <p:spPr/>
+        <p:txBody>
           <a:bodyPr/>
           <a:lstStyle/>
           <a:p>
@@ -3691,7 +3199,7 @@
     </p:spTree>
     <p:extLst>
       <p:ext uri="{BB962C8B-B14F-4D97-AF65-F5344CB8AC3E}">
-        <p14:creationId xmlns:p14="http://schemas.microsoft.com/office/powerpoint/2010/main" xmlns="" val="2116472317"/>
+        <p14:creationId xmlns:p14="http://schemas.microsoft.com/office/powerpoint/2010/main" val="2116472317"/>
       </p:ext>
     </p:extLst>
   </p:cSld>
@@ -3810,8 +3318,13 @@
             <a:pPr lvl="2"/>
             <a:r>
               <a:rPr lang="de-DE" dirty="0" smtClean="0"/>
-              <a:t>Event erstellen</a:t>
-            </a:r>
+              <a:t>Event </a:t>
+            </a:r>
+            <a:r>
+              <a:rPr lang="de-DE" dirty="0" smtClean="0"/>
+              <a:t>organisieren</a:t>
+            </a:r>
+            <a:endParaRPr lang="de-DE" dirty="0" smtClean="0"/>
           </a:p>
           <a:p>
             <a:pPr lvl="2"/>
@@ -4016,7 +3529,7 @@
     </p:spTree>
     <p:extLst>
       <p:ext uri="{BB962C8B-B14F-4D97-AF65-F5344CB8AC3E}">
-        <p14:creationId xmlns:p14="http://schemas.microsoft.com/office/powerpoint/2010/main" xmlns="" val="517533983"/>
+        <p14:creationId xmlns:p14="http://schemas.microsoft.com/office/powerpoint/2010/main" val="517533983"/>
       </p:ext>
     </p:extLst>
   </p:cSld>
@@ -4072,329 +3585,12 @@
           <a:p>
             <a:r>
               <a:rPr lang="de-DE" dirty="0" smtClean="0"/>
-              <a:t>Funktionale Anforderung per </a:t>
-            </a:r>
-            <a:r>
-              <a:rPr lang="de-DE" dirty="0" err="1" smtClean="0"/>
-              <a:t>Mockup</a:t>
-            </a:r>
-            <a:r>
-              <a:rPr lang="de-DE" dirty="0" smtClean="0"/>
-              <a:t> dargestellt und textuell ergänzt:</a:t>
-            </a:r>
-          </a:p>
-          <a:p>
-            <a:r>
-              <a:rPr lang="de-DE" sz="1200" kern="1200" dirty="0" smtClean="0">
-                <a:solidFill>
-                  <a:schemeClr val="tx1"/>
-                </a:solidFill>
-                <a:effectLst/>
-                <a:latin typeface="+mn-lt"/>
-                <a:ea typeface="+mn-ea"/>
-                <a:cs typeface="+mn-cs"/>
-              </a:rPr>
-              <a:t>Der beliebiger Internetnutzer kann sich über </a:t>
-            </a:r>
-            <a:r>
-              <a:rPr lang="de-DE" sz="1200" kern="1200" dirty="0" err="1" smtClean="0">
-                <a:solidFill>
-                  <a:schemeClr val="tx1"/>
-                </a:solidFill>
-                <a:effectLst/>
-                <a:latin typeface="+mn-lt"/>
-                <a:ea typeface="+mn-ea"/>
-                <a:cs typeface="+mn-cs"/>
-              </a:rPr>
-              <a:t>oAuth</a:t>
-            </a:r>
-            <a:r>
-              <a:rPr lang="de-DE" sz="1200" kern="1200" dirty="0" smtClean="0">
-                <a:solidFill>
-                  <a:schemeClr val="tx1"/>
-                </a:solidFill>
-                <a:effectLst/>
-                <a:latin typeface="+mn-lt"/>
-                <a:ea typeface="+mn-ea"/>
-                <a:cs typeface="+mn-cs"/>
-              </a:rPr>
-              <a:t> (Google oder Facebook-Account) auf der folgenden Eingabemaske an der Internetplattform </a:t>
-            </a:r>
-            <a:r>
-              <a:rPr lang="de-DE" sz="1200" kern="1200" dirty="0" err="1" smtClean="0">
-                <a:solidFill>
-                  <a:schemeClr val="tx1"/>
-                </a:solidFill>
-                <a:effectLst/>
-                <a:latin typeface="+mn-lt"/>
-                <a:ea typeface="+mn-ea"/>
-                <a:cs typeface="+mn-cs"/>
-              </a:rPr>
-              <a:t>Eventalizer</a:t>
-            </a:r>
-            <a:r>
-              <a:rPr lang="de-DE" sz="1200" kern="1200" dirty="0" smtClean="0">
-                <a:solidFill>
-                  <a:schemeClr val="tx1"/>
-                </a:solidFill>
-                <a:effectLst/>
-                <a:latin typeface="+mn-lt"/>
-                <a:ea typeface="+mn-ea"/>
-                <a:cs typeface="+mn-cs"/>
-              </a:rPr>
-              <a:t> anmelden:</a:t>
-            </a:r>
-            <a:br>
-              <a:rPr lang="de-DE" sz="1200" kern="1200" dirty="0" smtClean="0">
-                <a:solidFill>
-                  <a:schemeClr val="tx1"/>
-                </a:solidFill>
-                <a:effectLst/>
-                <a:latin typeface="+mn-lt"/>
-                <a:ea typeface="+mn-ea"/>
-                <a:cs typeface="+mn-cs"/>
-              </a:rPr>
-            </a:br>
-            <a:r>
-              <a:rPr lang="de-DE" sz="1200" kern="1200" dirty="0" smtClean="0">
-                <a:solidFill>
-                  <a:schemeClr val="tx1"/>
-                </a:solidFill>
-                <a:effectLst/>
-                <a:latin typeface="+mn-lt"/>
-                <a:ea typeface="+mn-ea"/>
-                <a:cs typeface="+mn-cs"/>
-              </a:rPr>
-              <a:t> </a:t>
-            </a:r>
-            <a:br>
-              <a:rPr lang="de-DE" sz="1200" kern="1200" dirty="0" smtClean="0">
-                <a:solidFill>
-                  <a:schemeClr val="tx1"/>
-                </a:solidFill>
-                <a:effectLst/>
-                <a:latin typeface="+mn-lt"/>
-                <a:ea typeface="+mn-ea"/>
-                <a:cs typeface="+mn-cs"/>
-              </a:rPr>
-            </a:br>
-            <a:r>
-              <a:rPr lang="de-DE" sz="1200" kern="1200" dirty="0" smtClean="0">
-                <a:solidFill>
-                  <a:schemeClr val="tx1"/>
-                </a:solidFill>
-                <a:effectLst/>
-                <a:latin typeface="+mn-lt"/>
-                <a:ea typeface="+mn-ea"/>
-                <a:cs typeface="+mn-cs"/>
-              </a:rPr>
-              <a:t>Für eine erfolgreiche Anmeldung ist die Angabe der folgenden Informationen notwendig:</a:t>
-            </a:r>
-          </a:p>
-          <a:p>
-            <a:pPr lvl="0"/>
-            <a:r>
-              <a:rPr lang="de-DE" sz="1200" kern="1200" dirty="0" err="1" smtClean="0">
-                <a:solidFill>
-                  <a:schemeClr val="tx1"/>
-                </a:solidFill>
-                <a:effectLst/>
-                <a:latin typeface="+mn-lt"/>
-                <a:ea typeface="+mn-ea"/>
-                <a:cs typeface="+mn-cs"/>
-              </a:rPr>
-              <a:t>Social</a:t>
-            </a:r>
-            <a:r>
-              <a:rPr lang="de-DE" sz="1200" kern="1200" dirty="0" smtClean="0">
-                <a:solidFill>
-                  <a:schemeClr val="tx1"/>
-                </a:solidFill>
-                <a:effectLst/>
-                <a:latin typeface="+mn-lt"/>
-                <a:ea typeface="+mn-ea"/>
-                <a:cs typeface="+mn-cs"/>
-              </a:rPr>
-              <a:t>-Network-Anbieter</a:t>
-            </a:r>
-          </a:p>
-          <a:p>
-            <a:pPr lvl="0"/>
-            <a:r>
-              <a:rPr lang="de-DE" sz="1200" kern="1200" dirty="0" smtClean="0">
-                <a:solidFill>
-                  <a:schemeClr val="tx1"/>
-                </a:solidFill>
-                <a:effectLst/>
-                <a:latin typeface="+mn-lt"/>
-                <a:ea typeface="+mn-ea"/>
-                <a:cs typeface="+mn-cs"/>
-              </a:rPr>
-              <a:t>Der dort verwendete Benutzername</a:t>
-            </a:r>
-          </a:p>
-          <a:p>
-            <a:pPr lvl="0"/>
-            <a:r>
-              <a:rPr lang="de-DE" sz="1200" kern="1200" dirty="0" smtClean="0">
-                <a:solidFill>
-                  <a:schemeClr val="tx1"/>
-                </a:solidFill>
-                <a:effectLst/>
-                <a:latin typeface="+mn-lt"/>
-                <a:ea typeface="+mn-ea"/>
-                <a:cs typeface="+mn-cs"/>
-              </a:rPr>
-              <a:t>Das dort verwendete persönliche Passwort</a:t>
-            </a:r>
-          </a:p>
-          <a:p>
-            <a:r>
-              <a:rPr lang="de-DE" sz="1200" kern="1200" dirty="0" smtClean="0">
-                <a:solidFill>
-                  <a:schemeClr val="tx1"/>
-                </a:solidFill>
-                <a:effectLst/>
-                <a:latin typeface="+mn-lt"/>
-                <a:ea typeface="+mn-ea"/>
-                <a:cs typeface="+mn-cs"/>
-              </a:rPr>
-              <a:t>Die möglichen </a:t>
-            </a:r>
-            <a:r>
-              <a:rPr lang="de-DE" sz="1200" kern="1200" dirty="0" err="1" smtClean="0">
-                <a:solidFill>
-                  <a:schemeClr val="tx1"/>
-                </a:solidFill>
-                <a:effectLst/>
-                <a:latin typeface="+mn-lt"/>
-                <a:ea typeface="+mn-ea"/>
-                <a:cs typeface="+mn-cs"/>
-              </a:rPr>
-              <a:t>Social</a:t>
-            </a:r>
-            <a:r>
-              <a:rPr lang="de-DE" sz="1200" kern="1200" dirty="0" smtClean="0">
-                <a:solidFill>
-                  <a:schemeClr val="tx1"/>
-                </a:solidFill>
-                <a:effectLst/>
-                <a:latin typeface="+mn-lt"/>
-                <a:ea typeface="+mn-ea"/>
-                <a:cs typeface="+mn-cs"/>
-              </a:rPr>
-              <a:t>-Network-Anbieter werden auf der Eingabemaske aufgeführt. </a:t>
-            </a:r>
-            <a:br>
-              <a:rPr lang="de-DE" sz="1200" kern="1200" dirty="0" smtClean="0">
-                <a:solidFill>
-                  <a:schemeClr val="tx1"/>
-                </a:solidFill>
-                <a:effectLst/>
-                <a:latin typeface="+mn-lt"/>
-                <a:ea typeface="+mn-ea"/>
-                <a:cs typeface="+mn-cs"/>
-              </a:rPr>
-            </a:br>
-            <a:r>
-              <a:rPr lang="de-DE" sz="1200" kern="1200" dirty="0" smtClean="0">
-                <a:solidFill>
-                  <a:schemeClr val="tx1"/>
-                </a:solidFill>
-                <a:effectLst/>
-                <a:latin typeface="+mn-lt"/>
-                <a:ea typeface="+mn-ea"/>
-                <a:cs typeface="+mn-cs"/>
-              </a:rPr>
-              <a:t>Die Anmeldung an der Internetplattform ist erfolgreich, wenn die Antwort des </a:t>
-            </a:r>
-            <a:r>
-              <a:rPr lang="de-DE" sz="1200" kern="1200" dirty="0" err="1" smtClean="0">
-                <a:solidFill>
-                  <a:schemeClr val="tx1"/>
-                </a:solidFill>
-                <a:effectLst/>
-                <a:latin typeface="+mn-lt"/>
-                <a:ea typeface="+mn-ea"/>
-                <a:cs typeface="+mn-cs"/>
-              </a:rPr>
-              <a:t>Social</a:t>
-            </a:r>
-            <a:r>
-              <a:rPr lang="de-DE" sz="1200" kern="1200" dirty="0" smtClean="0">
-                <a:solidFill>
-                  <a:schemeClr val="tx1"/>
-                </a:solidFill>
-                <a:effectLst/>
-                <a:latin typeface="+mn-lt"/>
-                <a:ea typeface="+mn-ea"/>
-                <a:cs typeface="+mn-cs"/>
-              </a:rPr>
-              <a:t>-Network-Anbieters positiv ist, d.h. ist der Benutzer dort authentifiziert wurde und die Benutzerdaten übermittelt worden sind. Kann der Benutzer nicht über den </a:t>
-            </a:r>
-            <a:r>
-              <a:rPr lang="de-DE" sz="1200" kern="1200" dirty="0" err="1" smtClean="0">
-                <a:solidFill>
-                  <a:schemeClr val="tx1"/>
-                </a:solidFill>
-                <a:effectLst/>
-                <a:latin typeface="+mn-lt"/>
-                <a:ea typeface="+mn-ea"/>
-                <a:cs typeface="+mn-cs"/>
-              </a:rPr>
-              <a:t>Social</a:t>
-            </a:r>
-            <a:r>
-              <a:rPr lang="de-DE" sz="1200" kern="1200" dirty="0" smtClean="0">
-                <a:solidFill>
-                  <a:schemeClr val="tx1"/>
-                </a:solidFill>
-                <a:effectLst/>
-                <a:latin typeface="+mn-lt"/>
-                <a:ea typeface="+mn-ea"/>
-                <a:cs typeface="+mn-cs"/>
-              </a:rPr>
-              <a:t>-Network-Anbieter authentifiziert werden, erfolgt auch keine Anmeldung.</a:t>
-            </a:r>
-          </a:p>
-          <a:p>
-            <a:r>
-              <a:rPr lang="de-DE" sz="1200" kern="1200" dirty="0" smtClean="0">
-                <a:solidFill>
-                  <a:schemeClr val="tx1"/>
-                </a:solidFill>
-                <a:effectLst/>
-                <a:latin typeface="+mn-lt"/>
-                <a:ea typeface="+mn-ea"/>
-                <a:cs typeface="+mn-cs"/>
-              </a:rPr>
-              <a:t/>
-            </a:r>
-            <a:br>
-              <a:rPr lang="de-DE" sz="1200" kern="1200" dirty="0" smtClean="0">
-                <a:solidFill>
-                  <a:schemeClr val="tx1"/>
-                </a:solidFill>
-                <a:effectLst/>
-                <a:latin typeface="+mn-lt"/>
-                <a:ea typeface="+mn-ea"/>
-                <a:cs typeface="+mn-cs"/>
-              </a:rPr>
-            </a:br>
-            <a:r>
-              <a:rPr lang="de-DE" sz="1200" kern="1200" dirty="0" smtClean="0">
-                <a:solidFill>
-                  <a:schemeClr val="tx1"/>
-                </a:solidFill>
-                <a:effectLst/>
-                <a:latin typeface="+mn-lt"/>
-                <a:ea typeface="+mn-ea"/>
-                <a:cs typeface="+mn-cs"/>
-              </a:rPr>
-              <a:t>@FSM:  Updaten</a:t>
-            </a:r>
-          </a:p>
-          <a:p>
+              <a:t>Kurze Anwendungsfalldiagramm darstellen als Überleitung</a:t>
+            </a:r>
+            <a:r>
+              <a:rPr lang="de-DE" baseline="0" dirty="0" smtClean="0"/>
+              <a:t> von Zwischenpräsentation zur jetzigen Abschlusspräsentation</a:t>
+            </a:r>
             <a:endParaRPr lang="de-DE" dirty="0"/>
           </a:p>
         </p:txBody>
@@ -4426,7 +3622,7 @@
     </p:spTree>
     <p:extLst>
       <p:ext uri="{BB962C8B-B14F-4D97-AF65-F5344CB8AC3E}">
-        <p14:creationId xmlns:p14="http://schemas.microsoft.com/office/powerpoint/2010/main" xmlns="" val="2934279750"/>
+        <p14:creationId xmlns:p14="http://schemas.microsoft.com/office/powerpoint/2010/main" val="2934279750"/>
       </p:ext>
     </p:extLst>
   </p:cSld>
@@ -4482,329 +3678,16 @@
           <a:p>
             <a:r>
               <a:rPr lang="de-DE" dirty="0" smtClean="0"/>
-              <a:t>Funktionale Anforderung per </a:t>
+              <a:t>Schwerpunkt der </a:t>
             </a:r>
             <a:r>
               <a:rPr lang="de-DE" dirty="0" err="1" smtClean="0"/>
-              <a:t>Mockup</a:t>
-            </a:r>
-            <a:r>
-              <a:rPr lang="de-DE" dirty="0" smtClean="0"/>
-              <a:t> dargestellt und textuell ergänzt:</a:t>
-            </a:r>
-          </a:p>
-          <a:p>
-            <a:r>
-              <a:rPr lang="de-DE" sz="1200" kern="1200" dirty="0" smtClean="0">
-                <a:solidFill>
-                  <a:schemeClr val="tx1"/>
-                </a:solidFill>
-                <a:effectLst/>
-                <a:latin typeface="+mn-lt"/>
-                <a:ea typeface="+mn-ea"/>
-                <a:cs typeface="+mn-cs"/>
-              </a:rPr>
-              <a:t>Der beliebiger Internetnutzer kann sich über </a:t>
-            </a:r>
-            <a:r>
-              <a:rPr lang="de-DE" sz="1200" kern="1200" dirty="0" err="1" smtClean="0">
-                <a:solidFill>
-                  <a:schemeClr val="tx1"/>
-                </a:solidFill>
-                <a:effectLst/>
-                <a:latin typeface="+mn-lt"/>
-                <a:ea typeface="+mn-ea"/>
-                <a:cs typeface="+mn-cs"/>
-              </a:rPr>
-              <a:t>oAuth</a:t>
-            </a:r>
-            <a:r>
-              <a:rPr lang="de-DE" sz="1200" kern="1200" dirty="0" smtClean="0">
-                <a:solidFill>
-                  <a:schemeClr val="tx1"/>
-                </a:solidFill>
-                <a:effectLst/>
-                <a:latin typeface="+mn-lt"/>
-                <a:ea typeface="+mn-ea"/>
-                <a:cs typeface="+mn-cs"/>
-              </a:rPr>
-              <a:t> (Google oder Facebook-Account) auf der folgenden Eingabemaske an der Internetplattform </a:t>
-            </a:r>
-            <a:r>
-              <a:rPr lang="de-DE" sz="1200" kern="1200" dirty="0" err="1" smtClean="0">
-                <a:solidFill>
-                  <a:schemeClr val="tx1"/>
-                </a:solidFill>
-                <a:effectLst/>
-                <a:latin typeface="+mn-lt"/>
-                <a:ea typeface="+mn-ea"/>
-                <a:cs typeface="+mn-cs"/>
-              </a:rPr>
-              <a:t>Eventalizer</a:t>
-            </a:r>
-            <a:r>
-              <a:rPr lang="de-DE" sz="1200" kern="1200" dirty="0" smtClean="0">
-                <a:solidFill>
-                  <a:schemeClr val="tx1"/>
-                </a:solidFill>
-                <a:effectLst/>
-                <a:latin typeface="+mn-lt"/>
-                <a:ea typeface="+mn-ea"/>
-                <a:cs typeface="+mn-cs"/>
-              </a:rPr>
-              <a:t> anmelden:</a:t>
-            </a:r>
-            <a:br>
-              <a:rPr lang="de-DE" sz="1200" kern="1200" dirty="0" smtClean="0">
-                <a:solidFill>
-                  <a:schemeClr val="tx1"/>
-                </a:solidFill>
-                <a:effectLst/>
-                <a:latin typeface="+mn-lt"/>
-                <a:ea typeface="+mn-ea"/>
-                <a:cs typeface="+mn-cs"/>
-              </a:rPr>
-            </a:br>
-            <a:r>
-              <a:rPr lang="de-DE" sz="1200" kern="1200" dirty="0" smtClean="0">
-                <a:solidFill>
-                  <a:schemeClr val="tx1"/>
-                </a:solidFill>
-                <a:effectLst/>
-                <a:latin typeface="+mn-lt"/>
-                <a:ea typeface="+mn-ea"/>
-                <a:cs typeface="+mn-cs"/>
-              </a:rPr>
-              <a:t> </a:t>
-            </a:r>
-            <a:br>
-              <a:rPr lang="de-DE" sz="1200" kern="1200" dirty="0" smtClean="0">
-                <a:solidFill>
-                  <a:schemeClr val="tx1"/>
-                </a:solidFill>
-                <a:effectLst/>
-                <a:latin typeface="+mn-lt"/>
-                <a:ea typeface="+mn-ea"/>
-                <a:cs typeface="+mn-cs"/>
-              </a:rPr>
-            </a:br>
-            <a:r>
-              <a:rPr lang="de-DE" sz="1200" kern="1200" dirty="0" smtClean="0">
-                <a:solidFill>
-                  <a:schemeClr val="tx1"/>
-                </a:solidFill>
-                <a:effectLst/>
-                <a:latin typeface="+mn-lt"/>
-                <a:ea typeface="+mn-ea"/>
-                <a:cs typeface="+mn-cs"/>
-              </a:rPr>
-              <a:t>Für eine erfolgreiche Anmeldung ist die Angabe der folgenden Informationen notwendig:</a:t>
-            </a:r>
-          </a:p>
-          <a:p>
-            <a:pPr lvl="0"/>
-            <a:r>
-              <a:rPr lang="de-DE" sz="1200" kern="1200" dirty="0" err="1" smtClean="0">
-                <a:solidFill>
-                  <a:schemeClr val="tx1"/>
-                </a:solidFill>
-                <a:effectLst/>
-                <a:latin typeface="+mn-lt"/>
-                <a:ea typeface="+mn-ea"/>
-                <a:cs typeface="+mn-cs"/>
-              </a:rPr>
-              <a:t>Social</a:t>
-            </a:r>
-            <a:r>
-              <a:rPr lang="de-DE" sz="1200" kern="1200" dirty="0" smtClean="0">
-                <a:solidFill>
-                  <a:schemeClr val="tx1"/>
-                </a:solidFill>
-                <a:effectLst/>
-                <a:latin typeface="+mn-lt"/>
-                <a:ea typeface="+mn-ea"/>
-                <a:cs typeface="+mn-cs"/>
-              </a:rPr>
-              <a:t>-Network-Anbieter</a:t>
-            </a:r>
-          </a:p>
-          <a:p>
-            <a:pPr lvl="0"/>
-            <a:r>
-              <a:rPr lang="de-DE" sz="1200" kern="1200" dirty="0" smtClean="0">
-                <a:solidFill>
-                  <a:schemeClr val="tx1"/>
-                </a:solidFill>
-                <a:effectLst/>
-                <a:latin typeface="+mn-lt"/>
-                <a:ea typeface="+mn-ea"/>
-                <a:cs typeface="+mn-cs"/>
-              </a:rPr>
-              <a:t>Der dort verwendete Benutzername</a:t>
-            </a:r>
-          </a:p>
-          <a:p>
-            <a:pPr lvl="0"/>
-            <a:r>
-              <a:rPr lang="de-DE" sz="1200" kern="1200" dirty="0" smtClean="0">
-                <a:solidFill>
-                  <a:schemeClr val="tx1"/>
-                </a:solidFill>
-                <a:effectLst/>
-                <a:latin typeface="+mn-lt"/>
-                <a:ea typeface="+mn-ea"/>
-                <a:cs typeface="+mn-cs"/>
-              </a:rPr>
-              <a:t>Das dort verwendete persönliche Passwort</a:t>
-            </a:r>
-          </a:p>
-          <a:p>
-            <a:r>
-              <a:rPr lang="de-DE" sz="1200" kern="1200" dirty="0" smtClean="0">
-                <a:solidFill>
-                  <a:schemeClr val="tx1"/>
-                </a:solidFill>
-                <a:effectLst/>
-                <a:latin typeface="+mn-lt"/>
-                <a:ea typeface="+mn-ea"/>
-                <a:cs typeface="+mn-cs"/>
-              </a:rPr>
-              <a:t>Die möglichen </a:t>
-            </a:r>
-            <a:r>
-              <a:rPr lang="de-DE" sz="1200" kern="1200" dirty="0" err="1" smtClean="0">
-                <a:solidFill>
-                  <a:schemeClr val="tx1"/>
-                </a:solidFill>
-                <a:effectLst/>
-                <a:latin typeface="+mn-lt"/>
-                <a:ea typeface="+mn-ea"/>
-                <a:cs typeface="+mn-cs"/>
-              </a:rPr>
-              <a:t>Social</a:t>
-            </a:r>
-            <a:r>
-              <a:rPr lang="de-DE" sz="1200" kern="1200" dirty="0" smtClean="0">
-                <a:solidFill>
-                  <a:schemeClr val="tx1"/>
-                </a:solidFill>
-                <a:effectLst/>
-                <a:latin typeface="+mn-lt"/>
-                <a:ea typeface="+mn-ea"/>
-                <a:cs typeface="+mn-cs"/>
-              </a:rPr>
-              <a:t>-Network-Anbieter werden auf der Eingabemaske aufgeführt. </a:t>
-            </a:r>
-            <a:br>
-              <a:rPr lang="de-DE" sz="1200" kern="1200" dirty="0" smtClean="0">
-                <a:solidFill>
-                  <a:schemeClr val="tx1"/>
-                </a:solidFill>
-                <a:effectLst/>
-                <a:latin typeface="+mn-lt"/>
-                <a:ea typeface="+mn-ea"/>
-                <a:cs typeface="+mn-cs"/>
-              </a:rPr>
-            </a:br>
-            <a:r>
-              <a:rPr lang="de-DE" sz="1200" kern="1200" dirty="0" smtClean="0">
-                <a:solidFill>
-                  <a:schemeClr val="tx1"/>
-                </a:solidFill>
-                <a:effectLst/>
-                <a:latin typeface="+mn-lt"/>
-                <a:ea typeface="+mn-ea"/>
-                <a:cs typeface="+mn-cs"/>
-              </a:rPr>
-              <a:t>Die Anmeldung an der Internetplattform ist erfolgreich, wenn die Antwort des </a:t>
-            </a:r>
-            <a:r>
-              <a:rPr lang="de-DE" sz="1200" kern="1200" dirty="0" err="1" smtClean="0">
-                <a:solidFill>
-                  <a:schemeClr val="tx1"/>
-                </a:solidFill>
-                <a:effectLst/>
-                <a:latin typeface="+mn-lt"/>
-                <a:ea typeface="+mn-ea"/>
-                <a:cs typeface="+mn-cs"/>
-              </a:rPr>
-              <a:t>Social</a:t>
-            </a:r>
-            <a:r>
-              <a:rPr lang="de-DE" sz="1200" kern="1200" dirty="0" smtClean="0">
-                <a:solidFill>
-                  <a:schemeClr val="tx1"/>
-                </a:solidFill>
-                <a:effectLst/>
-                <a:latin typeface="+mn-lt"/>
-                <a:ea typeface="+mn-ea"/>
-                <a:cs typeface="+mn-cs"/>
-              </a:rPr>
-              <a:t>-Network-Anbieters positiv ist, d.h. ist der Benutzer dort authentifiziert wurde und die Benutzerdaten übermittelt worden sind. Kann der Benutzer nicht über den </a:t>
-            </a:r>
-            <a:r>
-              <a:rPr lang="de-DE" sz="1200" kern="1200" dirty="0" err="1" smtClean="0">
-                <a:solidFill>
-                  <a:schemeClr val="tx1"/>
-                </a:solidFill>
-                <a:effectLst/>
-                <a:latin typeface="+mn-lt"/>
-                <a:ea typeface="+mn-ea"/>
-                <a:cs typeface="+mn-cs"/>
-              </a:rPr>
-              <a:t>Social</a:t>
-            </a:r>
-            <a:r>
-              <a:rPr lang="de-DE" sz="1200" kern="1200" dirty="0" smtClean="0">
-                <a:solidFill>
-                  <a:schemeClr val="tx1"/>
-                </a:solidFill>
-                <a:effectLst/>
-                <a:latin typeface="+mn-lt"/>
-                <a:ea typeface="+mn-ea"/>
-                <a:cs typeface="+mn-cs"/>
-              </a:rPr>
-              <a:t>-Network-Anbieter authentifiziert werden, erfolgt auch keine Anmeldung.</a:t>
-            </a:r>
-          </a:p>
-          <a:p>
-            <a:r>
-              <a:rPr lang="de-DE" sz="1200" kern="1200" dirty="0" smtClean="0">
-                <a:solidFill>
-                  <a:schemeClr val="tx1"/>
-                </a:solidFill>
-                <a:effectLst/>
-                <a:latin typeface="+mn-lt"/>
-                <a:ea typeface="+mn-ea"/>
-                <a:cs typeface="+mn-cs"/>
-              </a:rPr>
-              <a:t/>
-            </a:r>
-            <a:br>
-              <a:rPr lang="de-DE" sz="1200" kern="1200" dirty="0" smtClean="0">
-                <a:solidFill>
-                  <a:schemeClr val="tx1"/>
-                </a:solidFill>
-                <a:effectLst/>
-                <a:latin typeface="+mn-lt"/>
-                <a:ea typeface="+mn-ea"/>
-                <a:cs typeface="+mn-cs"/>
-              </a:rPr>
-            </a:br>
-            <a:r>
-              <a:rPr lang="de-DE" sz="1200" kern="1200" dirty="0" smtClean="0">
-                <a:solidFill>
-                  <a:schemeClr val="tx1"/>
-                </a:solidFill>
-                <a:effectLst/>
-                <a:latin typeface="+mn-lt"/>
-                <a:ea typeface="+mn-ea"/>
-                <a:cs typeface="+mn-cs"/>
-              </a:rPr>
-              <a:t>@FSM:  Updaten</a:t>
-            </a:r>
-          </a:p>
-          <a:p>
+              <a:t>Präsi</a:t>
+            </a:r>
+            <a:r>
+              <a:rPr lang="de-DE" baseline="0" dirty="0" smtClean="0"/>
+              <a:t> auf Anmelden und Event organisieren legen!</a:t>
+            </a:r>
             <a:endParaRPr lang="de-DE" dirty="0"/>
           </a:p>
         </p:txBody>
@@ -4836,7 +3719,7 @@
     </p:spTree>
     <p:extLst>
       <p:ext uri="{BB962C8B-B14F-4D97-AF65-F5344CB8AC3E}">
-        <p14:creationId xmlns:p14="http://schemas.microsoft.com/office/powerpoint/2010/main" xmlns="" val="2934279750"/>
+        <p14:creationId xmlns:p14="http://schemas.microsoft.com/office/powerpoint/2010/main" val="2934279750"/>
       </p:ext>
     </p:extLst>
   </p:cSld>
@@ -5246,7 +4129,7 @@
     </p:spTree>
     <p:extLst>
       <p:ext uri="{BB962C8B-B14F-4D97-AF65-F5344CB8AC3E}">
-        <p14:creationId xmlns:p14="http://schemas.microsoft.com/office/powerpoint/2010/main" xmlns="" val="2934279750"/>
+        <p14:creationId xmlns:p14="http://schemas.microsoft.com/office/powerpoint/2010/main" val="2934279750"/>
       </p:ext>
     </p:extLst>
   </p:cSld>
@@ -5656,7 +4539,7 @@
     </p:spTree>
     <p:extLst>
       <p:ext uri="{BB962C8B-B14F-4D97-AF65-F5344CB8AC3E}">
-        <p14:creationId xmlns:p14="http://schemas.microsoft.com/office/powerpoint/2010/main" xmlns="" val="2934279750"/>
+        <p14:creationId xmlns:p14="http://schemas.microsoft.com/office/powerpoint/2010/main" val="2934279750"/>
       </p:ext>
     </p:extLst>
   </p:cSld>
@@ -5741,7 +4624,7 @@
     </p:spTree>
     <p:extLst>
       <p:ext uri="{BB962C8B-B14F-4D97-AF65-F5344CB8AC3E}">
-        <p14:creationId xmlns:p14="http://schemas.microsoft.com/office/powerpoint/2010/main" xmlns="" val="3860513045"/>
+        <p14:creationId xmlns:p14="http://schemas.microsoft.com/office/powerpoint/2010/main" val="3860513045"/>
       </p:ext>
     </p:extLst>
   </p:cSld>
@@ -5795,331 +4678,6 @@
           <a:bodyPr/>
           <a:lstStyle/>
           <a:p>
-            <a:r>
-              <a:rPr lang="de-DE" dirty="0" smtClean="0"/>
-              <a:t>Funktionale Anforderung per </a:t>
-            </a:r>
-            <a:r>
-              <a:rPr lang="de-DE" dirty="0" err="1" smtClean="0"/>
-              <a:t>Mockup</a:t>
-            </a:r>
-            <a:r>
-              <a:rPr lang="de-DE" dirty="0" smtClean="0"/>
-              <a:t> dargestellt und textuell ergänzt:</a:t>
-            </a:r>
-          </a:p>
-          <a:p>
-            <a:r>
-              <a:rPr lang="de-DE" sz="1200" kern="1200" dirty="0" smtClean="0">
-                <a:solidFill>
-                  <a:schemeClr val="tx1"/>
-                </a:solidFill>
-                <a:effectLst/>
-                <a:latin typeface="+mn-lt"/>
-                <a:ea typeface="+mn-ea"/>
-                <a:cs typeface="+mn-cs"/>
-              </a:rPr>
-              <a:t>Der beliebiger Internetnutzer kann sich über </a:t>
-            </a:r>
-            <a:r>
-              <a:rPr lang="de-DE" sz="1200" kern="1200" dirty="0" err="1" smtClean="0">
-                <a:solidFill>
-                  <a:schemeClr val="tx1"/>
-                </a:solidFill>
-                <a:effectLst/>
-                <a:latin typeface="+mn-lt"/>
-                <a:ea typeface="+mn-ea"/>
-                <a:cs typeface="+mn-cs"/>
-              </a:rPr>
-              <a:t>oAuth</a:t>
-            </a:r>
-            <a:r>
-              <a:rPr lang="de-DE" sz="1200" kern="1200" dirty="0" smtClean="0">
-                <a:solidFill>
-                  <a:schemeClr val="tx1"/>
-                </a:solidFill>
-                <a:effectLst/>
-                <a:latin typeface="+mn-lt"/>
-                <a:ea typeface="+mn-ea"/>
-                <a:cs typeface="+mn-cs"/>
-              </a:rPr>
-              <a:t> (Google oder Facebook-Account) auf der folgenden Eingabemaske an der Internetplattform </a:t>
-            </a:r>
-            <a:r>
-              <a:rPr lang="de-DE" sz="1200" kern="1200" dirty="0" err="1" smtClean="0">
-                <a:solidFill>
-                  <a:schemeClr val="tx1"/>
-                </a:solidFill>
-                <a:effectLst/>
-                <a:latin typeface="+mn-lt"/>
-                <a:ea typeface="+mn-ea"/>
-                <a:cs typeface="+mn-cs"/>
-              </a:rPr>
-              <a:t>Eventalizer</a:t>
-            </a:r>
-            <a:r>
-              <a:rPr lang="de-DE" sz="1200" kern="1200" dirty="0" smtClean="0">
-                <a:solidFill>
-                  <a:schemeClr val="tx1"/>
-                </a:solidFill>
-                <a:effectLst/>
-                <a:latin typeface="+mn-lt"/>
-                <a:ea typeface="+mn-ea"/>
-                <a:cs typeface="+mn-cs"/>
-              </a:rPr>
-              <a:t> anmelden:</a:t>
-            </a:r>
-            <a:br>
-              <a:rPr lang="de-DE" sz="1200" kern="1200" dirty="0" smtClean="0">
-                <a:solidFill>
-                  <a:schemeClr val="tx1"/>
-                </a:solidFill>
-                <a:effectLst/>
-                <a:latin typeface="+mn-lt"/>
-                <a:ea typeface="+mn-ea"/>
-                <a:cs typeface="+mn-cs"/>
-              </a:rPr>
-            </a:br>
-            <a:r>
-              <a:rPr lang="de-DE" sz="1200" kern="1200" dirty="0" smtClean="0">
-                <a:solidFill>
-                  <a:schemeClr val="tx1"/>
-                </a:solidFill>
-                <a:effectLst/>
-                <a:latin typeface="+mn-lt"/>
-                <a:ea typeface="+mn-ea"/>
-                <a:cs typeface="+mn-cs"/>
-              </a:rPr>
-              <a:t> </a:t>
-            </a:r>
-            <a:br>
-              <a:rPr lang="de-DE" sz="1200" kern="1200" dirty="0" smtClean="0">
-                <a:solidFill>
-                  <a:schemeClr val="tx1"/>
-                </a:solidFill>
-                <a:effectLst/>
-                <a:latin typeface="+mn-lt"/>
-                <a:ea typeface="+mn-ea"/>
-                <a:cs typeface="+mn-cs"/>
-              </a:rPr>
-            </a:br>
-            <a:r>
-              <a:rPr lang="de-DE" sz="1200" kern="1200" dirty="0" smtClean="0">
-                <a:solidFill>
-                  <a:schemeClr val="tx1"/>
-                </a:solidFill>
-                <a:effectLst/>
-                <a:latin typeface="+mn-lt"/>
-                <a:ea typeface="+mn-ea"/>
-                <a:cs typeface="+mn-cs"/>
-              </a:rPr>
-              <a:t>Für eine erfolgreiche Anmeldung ist die Angabe der folgenden Informationen notwendig:</a:t>
-            </a:r>
-          </a:p>
-          <a:p>
-            <a:pPr lvl="0"/>
-            <a:r>
-              <a:rPr lang="de-DE" sz="1200" kern="1200" dirty="0" err="1" smtClean="0">
-                <a:solidFill>
-                  <a:schemeClr val="tx1"/>
-                </a:solidFill>
-                <a:effectLst/>
-                <a:latin typeface="+mn-lt"/>
-                <a:ea typeface="+mn-ea"/>
-                <a:cs typeface="+mn-cs"/>
-              </a:rPr>
-              <a:t>Social</a:t>
-            </a:r>
-            <a:r>
-              <a:rPr lang="de-DE" sz="1200" kern="1200" dirty="0" smtClean="0">
-                <a:solidFill>
-                  <a:schemeClr val="tx1"/>
-                </a:solidFill>
-                <a:effectLst/>
-                <a:latin typeface="+mn-lt"/>
-                <a:ea typeface="+mn-ea"/>
-                <a:cs typeface="+mn-cs"/>
-              </a:rPr>
-              <a:t>-Network-Anbieter</a:t>
-            </a:r>
-          </a:p>
-          <a:p>
-            <a:pPr lvl="0"/>
-            <a:r>
-              <a:rPr lang="de-DE" sz="1200" kern="1200" dirty="0" smtClean="0">
-                <a:solidFill>
-                  <a:schemeClr val="tx1"/>
-                </a:solidFill>
-                <a:effectLst/>
-                <a:latin typeface="+mn-lt"/>
-                <a:ea typeface="+mn-ea"/>
-                <a:cs typeface="+mn-cs"/>
-              </a:rPr>
-              <a:t>Der dort verwendete Benutzername</a:t>
-            </a:r>
-          </a:p>
-          <a:p>
-            <a:pPr lvl="0"/>
-            <a:r>
-              <a:rPr lang="de-DE" sz="1200" kern="1200" dirty="0" smtClean="0">
-                <a:solidFill>
-                  <a:schemeClr val="tx1"/>
-                </a:solidFill>
-                <a:effectLst/>
-                <a:latin typeface="+mn-lt"/>
-                <a:ea typeface="+mn-ea"/>
-                <a:cs typeface="+mn-cs"/>
-              </a:rPr>
-              <a:t>Das dort verwendete persönliche Passwort</a:t>
-            </a:r>
-          </a:p>
-          <a:p>
-            <a:r>
-              <a:rPr lang="de-DE" sz="1200" kern="1200" dirty="0" smtClean="0">
-                <a:solidFill>
-                  <a:schemeClr val="tx1"/>
-                </a:solidFill>
-                <a:effectLst/>
-                <a:latin typeface="+mn-lt"/>
-                <a:ea typeface="+mn-ea"/>
-                <a:cs typeface="+mn-cs"/>
-              </a:rPr>
-              <a:t>Die möglichen </a:t>
-            </a:r>
-            <a:r>
-              <a:rPr lang="de-DE" sz="1200" kern="1200" dirty="0" err="1" smtClean="0">
-                <a:solidFill>
-                  <a:schemeClr val="tx1"/>
-                </a:solidFill>
-                <a:effectLst/>
-                <a:latin typeface="+mn-lt"/>
-                <a:ea typeface="+mn-ea"/>
-                <a:cs typeface="+mn-cs"/>
-              </a:rPr>
-              <a:t>Social</a:t>
-            </a:r>
-            <a:r>
-              <a:rPr lang="de-DE" sz="1200" kern="1200" dirty="0" smtClean="0">
-                <a:solidFill>
-                  <a:schemeClr val="tx1"/>
-                </a:solidFill>
-                <a:effectLst/>
-                <a:latin typeface="+mn-lt"/>
-                <a:ea typeface="+mn-ea"/>
-                <a:cs typeface="+mn-cs"/>
-              </a:rPr>
-              <a:t>-Network-Anbieter werden auf der Eingabemaske aufgeführt. </a:t>
-            </a:r>
-            <a:br>
-              <a:rPr lang="de-DE" sz="1200" kern="1200" dirty="0" smtClean="0">
-                <a:solidFill>
-                  <a:schemeClr val="tx1"/>
-                </a:solidFill>
-                <a:effectLst/>
-                <a:latin typeface="+mn-lt"/>
-                <a:ea typeface="+mn-ea"/>
-                <a:cs typeface="+mn-cs"/>
-              </a:rPr>
-            </a:br>
-            <a:r>
-              <a:rPr lang="de-DE" sz="1200" kern="1200" dirty="0" smtClean="0">
-                <a:solidFill>
-                  <a:schemeClr val="tx1"/>
-                </a:solidFill>
-                <a:effectLst/>
-                <a:latin typeface="+mn-lt"/>
-                <a:ea typeface="+mn-ea"/>
-                <a:cs typeface="+mn-cs"/>
-              </a:rPr>
-              <a:t>Die Anmeldung an der Internetplattform ist erfolgreich, wenn die Antwort des </a:t>
-            </a:r>
-            <a:r>
-              <a:rPr lang="de-DE" sz="1200" kern="1200" dirty="0" err="1" smtClean="0">
-                <a:solidFill>
-                  <a:schemeClr val="tx1"/>
-                </a:solidFill>
-                <a:effectLst/>
-                <a:latin typeface="+mn-lt"/>
-                <a:ea typeface="+mn-ea"/>
-                <a:cs typeface="+mn-cs"/>
-              </a:rPr>
-              <a:t>Social</a:t>
-            </a:r>
-            <a:r>
-              <a:rPr lang="de-DE" sz="1200" kern="1200" dirty="0" smtClean="0">
-                <a:solidFill>
-                  <a:schemeClr val="tx1"/>
-                </a:solidFill>
-                <a:effectLst/>
-                <a:latin typeface="+mn-lt"/>
-                <a:ea typeface="+mn-ea"/>
-                <a:cs typeface="+mn-cs"/>
-              </a:rPr>
-              <a:t>-Network-Anbieters positiv ist, d.h. ist der Benutzer dort authentifiziert wurde und die Benutzerdaten übermittelt worden sind. Kann der Benutzer nicht über den </a:t>
-            </a:r>
-            <a:r>
-              <a:rPr lang="de-DE" sz="1200" kern="1200" dirty="0" err="1" smtClean="0">
-                <a:solidFill>
-                  <a:schemeClr val="tx1"/>
-                </a:solidFill>
-                <a:effectLst/>
-                <a:latin typeface="+mn-lt"/>
-                <a:ea typeface="+mn-ea"/>
-                <a:cs typeface="+mn-cs"/>
-              </a:rPr>
-              <a:t>Social</a:t>
-            </a:r>
-            <a:r>
-              <a:rPr lang="de-DE" sz="1200" kern="1200" dirty="0" smtClean="0">
-                <a:solidFill>
-                  <a:schemeClr val="tx1"/>
-                </a:solidFill>
-                <a:effectLst/>
-                <a:latin typeface="+mn-lt"/>
-                <a:ea typeface="+mn-ea"/>
-                <a:cs typeface="+mn-cs"/>
-              </a:rPr>
-              <a:t>-Network-Anbieter authentifiziert werden, erfolgt auch keine Anmeldung.</a:t>
-            </a:r>
-          </a:p>
-          <a:p>
-            <a:r>
-              <a:rPr lang="de-DE" sz="1200" kern="1200" dirty="0" smtClean="0">
-                <a:solidFill>
-                  <a:schemeClr val="tx1"/>
-                </a:solidFill>
-                <a:effectLst/>
-                <a:latin typeface="+mn-lt"/>
-                <a:ea typeface="+mn-ea"/>
-                <a:cs typeface="+mn-cs"/>
-              </a:rPr>
-              <a:t/>
-            </a:r>
-            <a:br>
-              <a:rPr lang="de-DE" sz="1200" kern="1200" dirty="0" smtClean="0">
-                <a:solidFill>
-                  <a:schemeClr val="tx1"/>
-                </a:solidFill>
-                <a:effectLst/>
-                <a:latin typeface="+mn-lt"/>
-                <a:ea typeface="+mn-ea"/>
-                <a:cs typeface="+mn-cs"/>
-              </a:rPr>
-            </a:br>
-            <a:r>
-              <a:rPr lang="de-DE" sz="1200" kern="1200" dirty="0" smtClean="0">
-                <a:solidFill>
-                  <a:schemeClr val="tx1"/>
-                </a:solidFill>
-                <a:effectLst/>
-                <a:latin typeface="+mn-lt"/>
-                <a:ea typeface="+mn-ea"/>
-                <a:cs typeface="+mn-cs"/>
-              </a:rPr>
-              <a:t>@FSM:  Updaten</a:t>
-            </a:r>
-          </a:p>
-          <a:p>
             <a:endParaRPr lang="de-DE" dirty="0"/>
           </a:p>
         </p:txBody>
@@ -6151,7 +4709,7 @@
     </p:spTree>
     <p:extLst>
       <p:ext uri="{BB962C8B-B14F-4D97-AF65-F5344CB8AC3E}">
-        <p14:creationId xmlns:p14="http://schemas.microsoft.com/office/powerpoint/2010/main" xmlns="" val="2934279750"/>
+        <p14:creationId xmlns:p14="http://schemas.microsoft.com/office/powerpoint/2010/main" val="2934279750"/>
       </p:ext>
     </p:extLst>
   </p:cSld>
@@ -10391,7 +8949,7 @@
           <a:blip r:embed="rId13" cstate="print">
             <a:extLst>
               <a:ext uri="{28A0092B-C50C-407E-A947-70E740481C1C}">
-                <a14:useLocalDpi xmlns:a14="http://schemas.microsoft.com/office/drawing/2010/main" xmlns="" val="0"/>
+                <a14:useLocalDpi xmlns:a14="http://schemas.microsoft.com/office/drawing/2010/main" val="0"/>
               </a:ext>
             </a:extLst>
           </a:blip>
@@ -10889,7 +9447,7 @@
           <a:blip r:embed="rId3" cstate="print">
             <a:extLst>
               <a:ext uri="{28A0092B-C50C-407E-A947-70E740481C1C}">
-                <a14:useLocalDpi xmlns:a14="http://schemas.microsoft.com/office/drawing/2010/main" xmlns="" val="0"/>
+                <a14:useLocalDpi xmlns:a14="http://schemas.microsoft.com/office/drawing/2010/main" val="0"/>
               </a:ext>
             </a:extLst>
           </a:blip>
@@ -10919,7 +9477,7 @@
           <a:blip r:embed="rId4" cstate="print">
             <a:extLst>
               <a:ext uri="{28A0092B-C50C-407E-A947-70E740481C1C}">
-                <a14:useLocalDpi xmlns:a14="http://schemas.microsoft.com/office/drawing/2010/main" xmlns="" val="0"/>
+                <a14:useLocalDpi xmlns:a14="http://schemas.microsoft.com/office/drawing/2010/main" val="0"/>
               </a:ext>
             </a:extLst>
           </a:blip>
@@ -10986,7 +9544,11 @@
           <a:p>
             <a:r>
               <a:rPr lang="de-DE" dirty="0" smtClean="0"/>
-              <a:t>Event erstellen</a:t>
+              <a:t>Event </a:t>
+            </a:r>
+            <a:r>
+              <a:rPr lang="de-DE" dirty="0" smtClean="0"/>
+              <a:t>Organisieren</a:t>
             </a:r>
             <a:endParaRPr lang="de-DE" dirty="0"/>
           </a:p>
@@ -11091,18 +9653,18 @@
     </p:spTree>
     <p:extLst>
       <p:ext uri="{BB962C8B-B14F-4D97-AF65-F5344CB8AC3E}">
-        <p14:creationId xmlns:p14="http://schemas.microsoft.com/office/powerpoint/2010/main" xmlns="" val="1358210935"/>
+        <p14:creationId xmlns:p14="http://schemas.microsoft.com/office/powerpoint/2010/main" val="1358210935"/>
       </p:ext>
     </p:extLst>
   </p:cSld>
   <p:clrMapOvr>
     <a:masterClrMapping/>
   </p:clrMapOvr>
-  <mc:AlternateContent xmlns:mc="http://schemas.openxmlformats.org/markup-compatibility/2006">
-    <mc:Choice xmlns:p14="http://schemas.microsoft.com/office/powerpoint/2010/main" xmlns="" Requires="p14">
+  <mc:AlternateContent xmlns:mc="http://schemas.openxmlformats.org/markup-compatibility/2006" xmlns:p14="http://schemas.microsoft.com/office/powerpoint/2010/main">
+    <mc:Choice Requires="p14">
       <p:transition spd="slow" p14:dur="2000"/>
     </mc:Choice>
-    <mc:Fallback>
+    <mc:Fallback xmlns="">
       <p:transition spd="slow"/>
     </mc:Fallback>
   </mc:AlternateContent>
@@ -11487,7 +10049,7 @@
     </p:spTree>
     <p:extLst>
       <p:ext uri="{BB962C8B-B14F-4D97-AF65-F5344CB8AC3E}">
-        <p14:creationId xmlns:p14="http://schemas.microsoft.com/office/powerpoint/2010/main" xmlns="" val="1084121422"/>
+        <p14:creationId xmlns:p14="http://schemas.microsoft.com/office/powerpoint/2010/main" val="1084121422"/>
       </p:ext>
     </p:extLst>
   </p:cSld>
@@ -11594,15 +10156,23 @@
           <a:p>
             <a:r>
               <a:rPr lang="de-DE" dirty="0" smtClean="0"/>
-              <a:t>Login</a:t>
-            </a:r>
+              <a:t>Event organisieren</a:t>
+            </a:r>
+          </a:p>
+          <a:p>
+            <a:pPr lvl="1"/>
+            <a:r>
+              <a:rPr lang="de-DE" dirty="0" smtClean="0"/>
+              <a:t>Wie Login</a:t>
+            </a:r>
+            <a:endParaRPr lang="de-DE" dirty="0" smtClean="0"/>
           </a:p>
         </p:txBody>
       </p:sp>
     </p:spTree>
     <p:extLst>
       <p:ext uri="{BB962C8B-B14F-4D97-AF65-F5344CB8AC3E}">
-        <p14:creationId xmlns:p14="http://schemas.microsoft.com/office/powerpoint/2010/main" xmlns="" val="3549245410"/>
+        <p14:creationId xmlns:p14="http://schemas.microsoft.com/office/powerpoint/2010/main" val="3549245410"/>
       </p:ext>
     </p:extLst>
   </p:cSld>
@@ -11802,7 +10372,7 @@
     </p:spTree>
     <p:extLst>
       <p:ext uri="{BB962C8B-B14F-4D97-AF65-F5344CB8AC3E}">
-        <p14:creationId xmlns:p14="http://schemas.microsoft.com/office/powerpoint/2010/main" xmlns="" val="1793566570"/>
+        <p14:creationId xmlns:p14="http://schemas.microsoft.com/office/powerpoint/2010/main" val="1793566570"/>
       </p:ext>
     </p:extLst>
   </p:cSld>
@@ -11952,7 +10522,7 @@
           <a:blip r:embed="rId2" cstate="print">
             <a:extLst>
               <a:ext uri="{28A0092B-C50C-407E-A947-70E740481C1C}">
-                <a14:useLocalDpi xmlns:a14="http://schemas.microsoft.com/office/drawing/2010/main" xmlns="" val="0"/>
+                <a14:useLocalDpi xmlns:a14="http://schemas.microsoft.com/office/drawing/2010/main" val="0"/>
               </a:ext>
             </a:extLst>
           </a:blip>
@@ -11976,14 +10546,14 @@
           <a:effectLst/>
           <a:extLst>
             <a:ext uri="{909E8E84-426E-40DD-AFC4-6F175D3DCCD1}">
-              <a14:hiddenFill xmlns:a14="http://schemas.microsoft.com/office/drawing/2010/main" xmlns="">
+              <a14:hiddenFill xmlns:a14="http://schemas.microsoft.com/office/drawing/2010/main">
                 <a:solidFill>
                   <a:schemeClr val="accent1"/>
                 </a:solidFill>
               </a14:hiddenFill>
             </a:ext>
             <a:ext uri="{91240B29-F687-4F45-9708-019B960494DF}">
-              <a14:hiddenLine xmlns:a14="http://schemas.microsoft.com/office/drawing/2010/main" xmlns="" w="9525">
+              <a14:hiddenLine xmlns:a14="http://schemas.microsoft.com/office/drawing/2010/main" w="9525">
                 <a:solidFill>
                   <a:schemeClr val="tx1"/>
                 </a:solidFill>
@@ -11993,7 +10563,7 @@
               </a14:hiddenLine>
             </a:ext>
             <a:ext uri="{AF507438-7753-43E0-B8FC-AC1667EBCBE1}">
-              <a14:hiddenEffects xmlns:a14="http://schemas.microsoft.com/office/drawing/2010/main" xmlns="">
+              <a14:hiddenEffects xmlns:a14="http://schemas.microsoft.com/office/drawing/2010/main">
                 <a:effectLst>
                   <a:outerShdw dist="35921" dir="2700000" algn="ctr" rotWithShape="0">
                     <a:schemeClr val="bg2"/>
@@ -12021,8 +10591,13 @@
           <a:p>
             <a:r>
               <a:rPr lang="de-DE" dirty="0"/>
-              <a:t>Event anlegen</a:t>
-            </a:r>
+              <a:t>Event </a:t>
+            </a:r>
+            <a:r>
+              <a:rPr lang="de-DE" dirty="0" smtClean="0"/>
+              <a:t>organisieren</a:t>
+            </a:r>
+            <a:endParaRPr lang="de-DE" dirty="0"/>
           </a:p>
           <a:p>
             <a:endParaRPr lang="de-DE" dirty="0"/>
@@ -12032,7 +10607,7 @@
     </p:spTree>
     <p:extLst>
       <p:ext uri="{BB962C8B-B14F-4D97-AF65-F5344CB8AC3E}">
-        <p14:creationId xmlns:p14="http://schemas.microsoft.com/office/powerpoint/2010/main" xmlns="" val="3640051399"/>
+        <p14:creationId xmlns:p14="http://schemas.microsoft.com/office/powerpoint/2010/main" val="3640051399"/>
       </p:ext>
     </p:extLst>
   </p:cSld>
@@ -12189,7 +10764,7 @@
     </p:spTree>
     <p:extLst>
       <p:ext uri="{BB962C8B-B14F-4D97-AF65-F5344CB8AC3E}">
-        <p14:creationId xmlns:p14="http://schemas.microsoft.com/office/powerpoint/2010/main" xmlns="" val="141785747"/>
+        <p14:creationId xmlns:p14="http://schemas.microsoft.com/office/powerpoint/2010/main" val="141785747"/>
       </p:ext>
     </p:extLst>
   </p:cSld>
@@ -12229,7 +10804,7 @@
         <p:spPr/>
         <p:txBody>
           <a:bodyPr>
-            <a:normAutofit fontScale="90000"/>
+            <a:normAutofit/>
           </a:bodyPr>
           <a:lstStyle/>
           <a:p>
@@ -12260,7 +10835,22 @@
           <a:bodyPr/>
           <a:lstStyle/>
           <a:p>
-            <a:endParaRPr lang="de-DE"/>
+            <a:r>
+              <a:rPr lang="de-DE" dirty="0" smtClean="0"/>
+              <a:t>Für den Login</a:t>
+            </a:r>
+          </a:p>
+          <a:p>
+            <a:pPr lvl="1"/>
+            <a:r>
+              <a:rPr lang="de-DE" dirty="0" smtClean="0"/>
+              <a:t>Durchgriff auf </a:t>
+            </a:r>
+            <a:r>
+              <a:rPr lang="de-DE" dirty="0" err="1" smtClean="0"/>
+              <a:t>Twitter</a:t>
+            </a:r>
+            <a:endParaRPr lang="de-DE" dirty="0"/>
           </a:p>
         </p:txBody>
       </p:sp>
@@ -12397,6 +10987,21 @@
           <a:bodyPr/>
           <a:lstStyle/>
           <a:p>
+            <a:r>
+              <a:rPr lang="de-DE" dirty="0" smtClean="0"/>
+              <a:t>Anmelden (Login) via </a:t>
+            </a:r>
+            <a:r>
+              <a:rPr lang="de-DE" dirty="0" err="1" smtClean="0"/>
+              <a:t>Twitter</a:t>
+            </a:r>
+            <a:endParaRPr lang="de-DE" dirty="0"/>
+          </a:p>
+          <a:p>
+            <a:r>
+              <a:rPr lang="de-DE" dirty="0" smtClean="0"/>
+              <a:t>Event erstellen</a:t>
+            </a:r>
             <a:endParaRPr lang="de-DE" dirty="0"/>
           </a:p>
         </p:txBody>
@@ -12474,7 +11079,7 @@
     </p:spTree>
     <p:extLst>
       <p:ext uri="{BB962C8B-B14F-4D97-AF65-F5344CB8AC3E}">
-        <p14:creationId xmlns:p14="http://schemas.microsoft.com/office/powerpoint/2010/main" xmlns="" val="2634211947"/>
+        <p14:creationId xmlns:p14="http://schemas.microsoft.com/office/powerpoint/2010/main" val="2634211947"/>
       </p:ext>
     </p:extLst>
   </p:cSld>
@@ -12543,7 +11148,13 @@
           <a:p>
             <a:r>
               <a:rPr lang="de-DE" dirty="0" smtClean="0"/>
-              <a:t>TODO</a:t>
+              <a:t>Kurz: Domänenklassendiagramm vorstellen</a:t>
+            </a:r>
+          </a:p>
+          <a:p>
+            <a:r>
+              <a:rPr lang="de-DE" dirty="0" smtClean="0"/>
+              <a:t>Danach DB Schema als Ableitung davon</a:t>
             </a:r>
             <a:endParaRPr lang="de-DE" dirty="0"/>
           </a:p>
@@ -12622,7 +11233,7 @@
     </p:spTree>
     <p:extLst>
       <p:ext uri="{BB962C8B-B14F-4D97-AF65-F5344CB8AC3E}">
-        <p14:creationId xmlns:p14="http://schemas.microsoft.com/office/powerpoint/2010/main" xmlns="" val="3243626544"/>
+        <p14:creationId xmlns:p14="http://schemas.microsoft.com/office/powerpoint/2010/main" val="3243626544"/>
       </p:ext>
     </p:extLst>
   </p:cSld>
@@ -12778,7 +11389,7 @@
     </p:spTree>
     <p:extLst>
       <p:ext uri="{BB962C8B-B14F-4D97-AF65-F5344CB8AC3E}">
-        <p14:creationId xmlns="" xmlns:p14="http://schemas.microsoft.com/office/powerpoint/2010/main" val="3243626544"/>
+        <p14:creationId xmlns:p14="http://schemas.microsoft.com/office/powerpoint/2010/main" val="3243626544"/>
       </p:ext>
     </p:extLst>
   </p:cSld>
@@ -12862,8 +11473,13 @@
             <a:pPr lvl="1"/>
             <a:r>
               <a:rPr lang="de-DE" dirty="0" smtClean="0"/>
-              <a:t>Event erstellen</a:t>
-            </a:r>
+              <a:t>Event </a:t>
+            </a:r>
+            <a:r>
+              <a:rPr lang="de-DE" dirty="0" smtClean="0"/>
+              <a:t>organisieren</a:t>
+            </a:r>
+            <a:endParaRPr lang="de-DE" dirty="0" smtClean="0"/>
           </a:p>
           <a:p>
             <a:pPr lvl="1"/>
@@ -13019,7 +11635,7 @@
         </p:blipFill>
         <p:spPr bwMode="auto">
           <a:xfrm>
-            <a:off x="6249101" y="-315416"/>
+            <a:off x="6804248" y="2780928"/>
             <a:ext cx="1643074" cy="1825638"/>
           </a:xfrm>
           <a:prstGeom prst="roundRect">
@@ -13047,7 +11663,7 @@
     </p:spTree>
     <p:extLst>
       <p:ext uri="{BB962C8B-B14F-4D97-AF65-F5344CB8AC3E}">
-        <p14:creationId xmlns:p14="http://schemas.microsoft.com/office/powerpoint/2010/main" xmlns="" val="3616670450"/>
+        <p14:creationId xmlns:p14="http://schemas.microsoft.com/office/powerpoint/2010/main" val="3616670450"/>
       </p:ext>
     </p:extLst>
   </p:cSld>
@@ -13561,7 +12177,7 @@
     </p:spTree>
     <p:extLst>
       <p:ext uri="{BB962C8B-B14F-4D97-AF65-F5344CB8AC3E}">
-        <p14:creationId xmlns="" xmlns:p14="http://schemas.microsoft.com/office/powerpoint/2010/main" val="3243626544"/>
+        <p14:creationId xmlns:p14="http://schemas.microsoft.com/office/powerpoint/2010/main" val="3243626544"/>
       </p:ext>
     </p:extLst>
   </p:cSld>
@@ -14075,7 +12691,7 @@
     </p:spTree>
     <p:extLst>
       <p:ext uri="{BB962C8B-B14F-4D97-AF65-F5344CB8AC3E}">
-        <p14:creationId xmlns="" xmlns:p14="http://schemas.microsoft.com/office/powerpoint/2010/main" val="3243626544"/>
+        <p14:creationId xmlns:p14="http://schemas.microsoft.com/office/powerpoint/2010/main" val="3243626544"/>
       </p:ext>
     </p:extLst>
   </p:cSld>
@@ -14543,7 +13159,7 @@
     </p:spTree>
     <p:extLst>
       <p:ext uri="{BB962C8B-B14F-4D97-AF65-F5344CB8AC3E}">
-        <p14:creationId xmlns="" xmlns:p14="http://schemas.microsoft.com/office/powerpoint/2010/main" val="3243626544"/>
+        <p14:creationId xmlns:p14="http://schemas.microsoft.com/office/powerpoint/2010/main" val="3243626544"/>
       </p:ext>
     </p:extLst>
   </p:cSld>
@@ -15372,7 +13988,7 @@
     </p:spTree>
     <p:extLst>
       <p:ext uri="{BB962C8B-B14F-4D97-AF65-F5344CB8AC3E}">
-        <p14:creationId xmlns="" xmlns:p14="http://schemas.microsoft.com/office/powerpoint/2010/main" val="3243626544"/>
+        <p14:creationId xmlns:p14="http://schemas.microsoft.com/office/powerpoint/2010/main" val="3243626544"/>
       </p:ext>
     </p:extLst>
   </p:cSld>
@@ -15975,7 +14591,7 @@
     </p:spTree>
     <p:extLst>
       <p:ext uri="{BB962C8B-B14F-4D97-AF65-F5344CB8AC3E}">
-        <p14:creationId xmlns="" xmlns:p14="http://schemas.microsoft.com/office/powerpoint/2010/main" val="3243626544"/>
+        <p14:creationId xmlns:p14="http://schemas.microsoft.com/office/powerpoint/2010/main" val="3243626544"/>
       </p:ext>
     </p:extLst>
   </p:cSld>
@@ -16295,7 +14911,7 @@
     </p:spTree>
     <p:extLst>
       <p:ext uri="{BB962C8B-B14F-4D97-AF65-F5344CB8AC3E}">
-        <p14:creationId xmlns:p14="http://schemas.microsoft.com/office/powerpoint/2010/main" xmlns="" val="3309636493"/>
+        <p14:creationId xmlns:p14="http://schemas.microsoft.com/office/powerpoint/2010/main" val="3309636493"/>
       </p:ext>
     </p:extLst>
   </p:cSld>
@@ -16506,7 +15122,7 @@
     </p:spTree>
     <p:extLst>
       <p:ext uri="{BB962C8B-B14F-4D97-AF65-F5344CB8AC3E}">
-        <p14:creationId xmlns:p14="http://schemas.microsoft.com/office/powerpoint/2010/main" xmlns="" val="1012322072"/>
+        <p14:creationId xmlns:p14="http://schemas.microsoft.com/office/powerpoint/2010/main" val="1012322072"/>
       </p:ext>
     </p:extLst>
   </p:cSld>
@@ -16724,7 +15340,7 @@
     </p:spTree>
     <p:extLst>
       <p:ext uri="{BB962C8B-B14F-4D97-AF65-F5344CB8AC3E}">
-        <p14:creationId xmlns:p14="http://schemas.microsoft.com/office/powerpoint/2010/main" xmlns="" val="1012322072"/>
+        <p14:creationId xmlns:p14="http://schemas.microsoft.com/office/powerpoint/2010/main" val="1012322072"/>
       </p:ext>
     </p:extLst>
   </p:cSld>
@@ -16943,7 +15559,7 @@
           <a:blip r:embed="rId2" cstate="print">
             <a:extLst>
               <a:ext uri="{BEBA8EAE-BF5A-486C-A8C5-ECC9F3942E4B}">
-                <a14:imgProps xmlns:a14="http://schemas.microsoft.com/office/drawing/2010/main" xmlns="">
+                <a14:imgProps xmlns:a14="http://schemas.microsoft.com/office/drawing/2010/main">
                   <a14:imgLayer r:embed="rId3">
                     <a14:imgEffect>
                       <a14:backgroundRemoval t="6057" b="22942" l="7000" r="29162"/>
@@ -16952,7 +15568,7 @@
                 </a14:imgProps>
               </a:ext>
               <a:ext uri="{28A0092B-C50C-407E-A947-70E740481C1C}">
-                <a14:useLocalDpi xmlns:a14="http://schemas.microsoft.com/office/drawing/2010/main" xmlns="" val="0"/>
+                <a14:useLocalDpi xmlns:a14="http://schemas.microsoft.com/office/drawing/2010/main" val="0"/>
               </a:ext>
             </a:extLst>
           </a:blip>
@@ -16970,7 +15586,7 @@
           <a:noFill/>
           <a:extLst>
             <a:ext uri="{909E8E84-426E-40DD-AFC4-6F175D3DCCD1}">
-              <a14:hiddenFill xmlns:a14="http://schemas.microsoft.com/office/drawing/2010/main" xmlns="">
+              <a14:hiddenFill xmlns:a14="http://schemas.microsoft.com/office/drawing/2010/main">
                 <a:solidFill>
                   <a:srgbClr val="FFFFFF"/>
                 </a:solidFill>
@@ -16991,7 +15607,7 @@
           <a:blip r:embed="rId2" cstate="print">
             <a:extLst>
               <a:ext uri="{BEBA8EAE-BF5A-486C-A8C5-ECC9F3942E4B}">
-                <a14:imgProps xmlns:a14="http://schemas.microsoft.com/office/drawing/2010/main" xmlns="">
+                <a14:imgProps xmlns:a14="http://schemas.microsoft.com/office/drawing/2010/main">
                   <a14:imgLayer r:embed="rId3">
                     <a14:imgEffect>
                       <a14:backgroundRemoval t="6057" b="22942" l="7000" r="29162"/>
@@ -17000,7 +15616,7 @@
                 </a14:imgProps>
               </a:ext>
               <a:ext uri="{28A0092B-C50C-407E-A947-70E740481C1C}">
-                <a14:useLocalDpi xmlns:a14="http://schemas.microsoft.com/office/drawing/2010/main" xmlns="" val="0"/>
+                <a14:useLocalDpi xmlns:a14="http://schemas.microsoft.com/office/drawing/2010/main" val="0"/>
               </a:ext>
             </a:extLst>
           </a:blip>
@@ -17018,7 +15634,7 @@
           <a:noFill/>
           <a:extLst>
             <a:ext uri="{909E8E84-426E-40DD-AFC4-6F175D3DCCD1}">
-              <a14:hiddenFill xmlns:a14="http://schemas.microsoft.com/office/drawing/2010/main" xmlns="">
+              <a14:hiddenFill xmlns:a14="http://schemas.microsoft.com/office/drawing/2010/main">
                 <a:solidFill>
                   <a:srgbClr val="FFFFFF"/>
                 </a:solidFill>
@@ -17030,7 +15646,7 @@
     </p:spTree>
     <p:extLst>
       <p:ext uri="{BB962C8B-B14F-4D97-AF65-F5344CB8AC3E}">
-        <p14:creationId xmlns:p14="http://schemas.microsoft.com/office/powerpoint/2010/main" xmlns="" val="2645794681"/>
+        <p14:creationId xmlns:p14="http://schemas.microsoft.com/office/powerpoint/2010/main" val="2645794681"/>
       </p:ext>
     </p:extLst>
   </p:cSld>
@@ -17141,8 +15757,13 @@
             <a:pPr lvl="2"/>
             <a:r>
               <a:rPr lang="de-DE" dirty="0" smtClean="0"/>
-              <a:t>Event erstellen</a:t>
-            </a:r>
+              <a:t>Event </a:t>
+            </a:r>
+            <a:r>
+              <a:rPr lang="de-DE" dirty="0" smtClean="0"/>
+              <a:t>organisieren</a:t>
+            </a:r>
+            <a:endParaRPr lang="de-DE" dirty="0" smtClean="0"/>
           </a:p>
           <a:p>
             <a:pPr lvl="2"/>
@@ -17309,18 +15930,18 @@
     </p:spTree>
     <p:extLst>
       <p:ext uri="{BB962C8B-B14F-4D97-AF65-F5344CB8AC3E}">
-        <p14:creationId xmlns:p14="http://schemas.microsoft.com/office/powerpoint/2010/main" xmlns="" val="2988266106"/>
+        <p14:creationId xmlns:p14="http://schemas.microsoft.com/office/powerpoint/2010/main" val="2988266106"/>
       </p:ext>
     </p:extLst>
   </p:cSld>
   <p:clrMapOvr>
     <a:masterClrMapping/>
   </p:clrMapOvr>
-  <mc:AlternateContent xmlns:mc="http://schemas.openxmlformats.org/markup-compatibility/2006">
-    <mc:Choice xmlns:p14="http://schemas.microsoft.com/office/powerpoint/2010/main" xmlns="" Requires="p14">
+  <mc:AlternateContent xmlns:mc="http://schemas.openxmlformats.org/markup-compatibility/2006" xmlns:p14="http://schemas.microsoft.com/office/powerpoint/2010/main">
+    <mc:Choice Requires="p14">
       <p:transition spd="slow" p14:dur="2000"/>
     </mc:Choice>
-    <mc:Fallback>
+    <mc:Fallback xmlns="">
       <p:transition spd="slow"/>
     </mc:Fallback>
   </mc:AlternateContent>
@@ -17553,7 +16174,7 @@
           <a:blip r:embed="rId3" cstate="print">
             <a:extLst>
               <a:ext uri="{28A0092B-C50C-407E-A947-70E740481C1C}">
-                <a14:useLocalDpi xmlns:a14="http://schemas.microsoft.com/office/drawing/2010/main" xmlns="" val="0"/>
+                <a14:useLocalDpi xmlns:a14="http://schemas.microsoft.com/office/drawing/2010/main" val="0"/>
               </a:ext>
             </a:extLst>
           </a:blip>
@@ -17585,7 +16206,7 @@
           </a:effectLst>
           <a:extLst>
             <a:ext uri="{91240B29-F687-4F45-9708-019B960494DF}">
-              <a14:hiddenLine xmlns:a14="http://schemas.microsoft.com/office/drawing/2010/main" xmlns="" w="9525">
+              <a14:hiddenLine xmlns:a14="http://schemas.microsoft.com/office/drawing/2010/main" w="9525">
                 <a:solidFill>
                   <a:schemeClr val="tx1"/>
                 </a:solidFill>
@@ -17600,7 +16221,7 @@
     </p:spTree>
     <p:extLst>
       <p:ext uri="{BB962C8B-B14F-4D97-AF65-F5344CB8AC3E}">
-        <p14:creationId xmlns:p14="http://schemas.microsoft.com/office/powerpoint/2010/main" xmlns="" val="313312729"/>
+        <p14:creationId xmlns:p14="http://schemas.microsoft.com/office/powerpoint/2010/main" val="313312729"/>
       </p:ext>
     </p:extLst>
   </p:cSld>
@@ -17811,7 +16432,7 @@
     </p:spTree>
     <p:extLst>
       <p:ext uri="{BB962C8B-B14F-4D97-AF65-F5344CB8AC3E}">
-        <p14:creationId xmlns:p14="http://schemas.microsoft.com/office/powerpoint/2010/main" xmlns="" val="1344880779"/>
+        <p14:creationId xmlns:p14="http://schemas.microsoft.com/office/powerpoint/2010/main" val="1344880779"/>
       </p:ext>
     </p:extLst>
   </p:cSld>
@@ -17856,17 +16477,10 @@
           <a:lstStyle/>
           <a:p>
             <a:r>
-              <a:rPr lang="de-DE" dirty="0" smtClean="0"/>
-              <a:t>Projekt: „</a:t>
-            </a:r>
-            <a:r>
               <a:rPr lang="de-DE" dirty="0" err="1" smtClean="0"/>
               <a:t>Eventalizer</a:t>
             </a:r>
-            <a:r>
-              <a:rPr lang="de-DE" dirty="0" smtClean="0"/>
-              <a:t>“</a:t>
-            </a:r>
+            <a:endParaRPr lang="de-DE" dirty="0" smtClean="0"/>
           </a:p>
         </p:txBody>
       </p:sp>
@@ -17887,7 +16501,17 @@
           <a:p>
             <a:r>
               <a:rPr lang="de-DE" dirty="0" smtClean="0"/>
-              <a:t>Vielen Dank für Ihre Aufmerksamkeit</a:t>
+              <a:t>Vielen Dank für Ihre </a:t>
+            </a:r>
+            <a:r>
+              <a:rPr lang="de-DE" dirty="0" smtClean="0"/>
+              <a:t>Aufmerksamkeit</a:t>
+            </a:r>
+          </a:p>
+          <a:p>
+            <a:r>
+              <a:rPr lang="de-DE" dirty="0" smtClean="0"/>
+              <a:t>Gibt es noch Fragen?</a:t>
             </a:r>
             <a:endParaRPr lang="de-DE" dirty="0"/>
           </a:p>
@@ -17905,7 +16529,7 @@
           <a:blip r:embed="rId3" cstate="print">
             <a:extLst>
               <a:ext uri="{28A0092B-C50C-407E-A947-70E740481C1C}">
-                <a14:useLocalDpi xmlns:a14="http://schemas.microsoft.com/office/drawing/2010/main" xmlns="" val="0"/>
+                <a14:useLocalDpi xmlns:a14="http://schemas.microsoft.com/office/drawing/2010/main" val="0"/>
               </a:ext>
             </a:extLst>
           </a:blip>
@@ -17935,7 +16559,7 @@
           <a:blip r:embed="rId4" cstate="print">
             <a:extLst>
               <a:ext uri="{28A0092B-C50C-407E-A947-70E740481C1C}">
-                <a14:useLocalDpi xmlns:a14="http://schemas.microsoft.com/office/drawing/2010/main" xmlns="" val="0"/>
+                <a14:useLocalDpi xmlns:a14="http://schemas.microsoft.com/office/drawing/2010/main" val="0"/>
               </a:ext>
             </a:extLst>
           </a:blip>
@@ -17956,7 +16580,7 @@
     </p:spTree>
     <p:extLst>
       <p:ext uri="{BB962C8B-B14F-4D97-AF65-F5344CB8AC3E}">
-        <p14:creationId xmlns:p14="http://schemas.microsoft.com/office/powerpoint/2010/main" xmlns="" val="2565098391"/>
+        <p14:creationId xmlns:p14="http://schemas.microsoft.com/office/powerpoint/2010/main" val="2565098391"/>
       </p:ext>
     </p:extLst>
   </p:cSld>
@@ -18025,31 +16649,113 @@
         </p:nvSpPr>
         <p:spPr/>
         <p:txBody>
-          <a:bodyPr/>
-          <a:lstStyle/>
-          <a:p>
-            <a:r>
-              <a:rPr lang="de-DE" dirty="0" smtClean="0"/>
-              <a:t>Dekorative Abbildungen</a:t>
+          <a:bodyPr>
+            <a:normAutofit/>
+          </a:bodyPr>
+          <a:lstStyle/>
+          <a:p>
+            <a:r>
+              <a:rPr lang="de-DE" sz="2000" dirty="0" err="1" smtClean="0"/>
+              <a:t>o.V</a:t>
+            </a:r>
+            <a:r>
+              <a:rPr lang="de-DE" sz="2000" dirty="0" smtClean="0"/>
+              <a:t>.: Spring </a:t>
+            </a:r>
+            <a:r>
+              <a:rPr lang="de-DE" sz="2000" dirty="0" err="1"/>
+              <a:t>Roo</a:t>
+            </a:r>
+            <a:r>
+              <a:rPr lang="de-DE" sz="2000" dirty="0"/>
+              <a:t> - Reference </a:t>
+            </a:r>
+            <a:r>
+              <a:rPr lang="de-DE" sz="2000" dirty="0" err="1" smtClean="0"/>
+              <a:t>Documentation</a:t>
+            </a:r>
+            <a:r>
+              <a:rPr lang="de-DE" sz="2000" dirty="0" smtClean="0"/>
+              <a:t>. http</a:t>
+            </a:r>
+            <a:r>
+              <a:rPr lang="de-DE" sz="2000" dirty="0"/>
+              <a:t>://</a:t>
+            </a:r>
+            <a:r>
+              <a:rPr lang="de-DE" sz="2000" dirty="0" smtClean="0"/>
+              <a:t>www.springsource.org/spring-roo#documentation,  Abgerufen am 14.03.2012</a:t>
+            </a:r>
+            <a:endParaRPr lang="de-DE" sz="2000" dirty="0"/>
+          </a:p>
+          <a:p>
+            <a:r>
+              <a:rPr lang="de-DE" sz="2000" dirty="0" err="1"/>
+              <a:t>Shekhar</a:t>
+            </a:r>
+            <a:r>
+              <a:rPr lang="de-DE" sz="2000" dirty="0"/>
+              <a:t> </a:t>
+            </a:r>
+            <a:r>
+              <a:rPr lang="de-DE" sz="2000" dirty="0" err="1"/>
+              <a:t>Gulati</a:t>
+            </a:r>
+            <a:r>
+              <a:rPr lang="de-DE" sz="2000" dirty="0"/>
+              <a:t>: </a:t>
+            </a:r>
+            <a:r>
+              <a:rPr lang="de-DE" sz="2000" dirty="0" err="1"/>
+              <a:t>Introducing</a:t>
+            </a:r>
+            <a:r>
+              <a:rPr lang="de-DE" sz="2000" dirty="0"/>
+              <a:t> Spring </a:t>
+            </a:r>
+            <a:r>
+              <a:rPr lang="de-DE" sz="2000" dirty="0" err="1" smtClean="0"/>
+              <a:t>Roo</a:t>
+            </a:r>
+            <a:r>
+              <a:rPr lang="de-DE" sz="2000" dirty="0"/>
+              <a:t>. http://www.ibm.com/developerworks/library/os-springroo2</a:t>
+            </a:r>
+            <a:r>
+              <a:rPr lang="de-DE" sz="2000" dirty="0" smtClean="0"/>
+              <a:t>/,  Abgerufen 23.04.2012</a:t>
+            </a:r>
+          </a:p>
+          <a:p>
+            <a:endParaRPr lang="de-DE" dirty="0"/>
+          </a:p>
+          <a:p>
+            <a:r>
+              <a:rPr lang="de-DE" sz="2400" dirty="0" smtClean="0"/>
+              <a:t>Dekorative </a:t>
+            </a:r>
+            <a:r>
+              <a:rPr lang="de-DE" sz="2400" dirty="0" smtClean="0"/>
+              <a:t>Abbildungen</a:t>
             </a:r>
           </a:p>
           <a:p>
             <a:pPr lvl="1"/>
             <a:r>
-              <a:rPr lang="de-DE" dirty="0" smtClean="0"/>
+              <a:rPr lang="de-DE" sz="2000" dirty="0" smtClean="0"/>
               <a:t>www.FreeDigitalPhotos.net</a:t>
             </a:r>
           </a:p>
           <a:p>
             <a:pPr lvl="1"/>
             <a:r>
-              <a:rPr lang="de-DE" dirty="0"/>
+              <a:rPr lang="de-DE" sz="2000" dirty="0"/>
               <a:t>www.animationfactory.com</a:t>
             </a:r>
           </a:p>
           <a:p>
             <a:pPr lvl="1"/>
-            <a:endParaRPr lang="de-DE" dirty="0"/>
+            <a:endParaRPr lang="de-DE" sz="2000" dirty="0"/>
           </a:p>
         </p:txBody>
       </p:sp>
@@ -18126,7 +16832,7 @@
     </p:spTree>
     <p:extLst>
       <p:ext uri="{BB962C8B-B14F-4D97-AF65-F5344CB8AC3E}">
-        <p14:creationId xmlns:p14="http://schemas.microsoft.com/office/powerpoint/2010/main" xmlns="" val="3661383713"/>
+        <p14:creationId xmlns:p14="http://schemas.microsoft.com/office/powerpoint/2010/main" val="3661383713"/>
       </p:ext>
     </p:extLst>
   </p:cSld>
@@ -18277,7 +16983,7 @@
     </p:spTree>
     <p:extLst>
       <p:ext uri="{BB962C8B-B14F-4D97-AF65-F5344CB8AC3E}">
-        <p14:creationId xmlns:p14="http://schemas.microsoft.com/office/powerpoint/2010/main" xmlns="" val="351671181"/>
+        <p14:creationId xmlns:p14="http://schemas.microsoft.com/office/powerpoint/2010/main" val="351671181"/>
       </p:ext>
     </p:extLst>
   </p:cSld>
@@ -18735,7 +17441,7 @@
     </p:spTree>
     <p:extLst>
       <p:ext uri="{BB962C8B-B14F-4D97-AF65-F5344CB8AC3E}">
-        <p14:creationId xmlns:p14="http://schemas.microsoft.com/office/powerpoint/2010/main" xmlns="" val="351671181"/>
+        <p14:creationId xmlns:p14="http://schemas.microsoft.com/office/powerpoint/2010/main" val="351671181"/>
       </p:ext>
     </p:extLst>
   </p:cSld>
@@ -18846,9 +17552,12 @@
             </a:r>
           </a:p>
           <a:p>
-            <a:r>
-              <a:rPr lang="de-DE" dirty="0" err="1" smtClean="0"/>
-              <a:t>blablabla</a:t>
+            <a:endParaRPr lang="de-DE" dirty="0" smtClean="0"/>
+          </a:p>
+          <a:p>
+            <a:r>
+              <a:rPr lang="de-DE" dirty="0" smtClean="0"/>
+              <a:t>Funktionalen Anforderungen zum Login vorstellen</a:t>
             </a:r>
             <a:endParaRPr lang="de-DE" dirty="0"/>
           </a:p>
@@ -18857,7 +17566,7 @@
     </p:spTree>
     <p:extLst>
       <p:ext uri="{BB962C8B-B14F-4D97-AF65-F5344CB8AC3E}">
-        <p14:creationId xmlns:p14="http://schemas.microsoft.com/office/powerpoint/2010/main" xmlns="" val="2681693288"/>
+        <p14:creationId xmlns:p14="http://schemas.microsoft.com/office/powerpoint/2010/main" val="2681693288"/>
       </p:ext>
     </p:extLst>
   </p:cSld>
@@ -19060,7 +17769,7 @@
     </p:spTree>
     <p:extLst>
       <p:ext uri="{BB962C8B-B14F-4D97-AF65-F5344CB8AC3E}">
-        <p14:creationId xmlns:p14="http://schemas.microsoft.com/office/powerpoint/2010/main" xmlns="" val="2681693288"/>
+        <p14:creationId xmlns:p14="http://schemas.microsoft.com/office/powerpoint/2010/main" val="2681693288"/>
       </p:ext>
     </p:extLst>
   </p:cSld>
@@ -19523,7 +18232,7 @@
     </p:spTree>
     <p:extLst>
       <p:ext uri="{BB962C8B-B14F-4D97-AF65-F5344CB8AC3E}">
-        <p14:creationId xmlns:p14="http://schemas.microsoft.com/office/powerpoint/2010/main" xmlns="" val="2857272158"/>
+        <p14:creationId xmlns:p14="http://schemas.microsoft.com/office/powerpoint/2010/main" val="2857272158"/>
       </p:ext>
     </p:extLst>
   </p:cSld>
@@ -19603,7 +18312,7 @@
           <a:blip r:embed="rId2" cstate="print">
             <a:extLst>
               <a:ext uri="{28A0092B-C50C-407E-A947-70E740481C1C}">
-                <a14:useLocalDpi xmlns:a14="http://schemas.microsoft.com/office/drawing/2010/main" xmlns="" val="0"/>
+                <a14:useLocalDpi xmlns:a14="http://schemas.microsoft.com/office/drawing/2010/main" val="0"/>
               </a:ext>
             </a:extLst>
           </a:blip>
@@ -19626,14 +18335,14 @@
           <a:effectLst/>
           <a:extLst>
             <a:ext uri="{909E8E84-426E-40DD-AFC4-6F175D3DCCD1}">
-              <a14:hiddenFill xmlns:a14="http://schemas.microsoft.com/office/drawing/2010/main" xmlns="">
+              <a14:hiddenFill xmlns:a14="http://schemas.microsoft.com/office/drawing/2010/main">
                 <a:solidFill>
                   <a:schemeClr val="accent1"/>
                 </a:solidFill>
               </a14:hiddenFill>
             </a:ext>
             <a:ext uri="{91240B29-F687-4F45-9708-019B960494DF}">
-              <a14:hiddenLine xmlns:a14="http://schemas.microsoft.com/office/drawing/2010/main" xmlns="" w="9525">
+              <a14:hiddenLine xmlns:a14="http://schemas.microsoft.com/office/drawing/2010/main" w="9525">
                 <a:solidFill>
                   <a:schemeClr val="tx1"/>
                 </a:solidFill>
@@ -19643,7 +18352,7 @@
               </a14:hiddenLine>
             </a:ext>
             <a:ext uri="{AF507438-7753-43E0-B8FC-AC1667EBCBE1}">
-              <a14:hiddenEffects xmlns:a14="http://schemas.microsoft.com/office/drawing/2010/main" xmlns="">
+              <a14:hiddenEffects xmlns:a14="http://schemas.microsoft.com/office/drawing/2010/main">
                 <a:effectLst>
                   <a:outerShdw dist="35921" dir="2700000" algn="ctr" rotWithShape="0">
                     <a:schemeClr val="bg2"/>
@@ -19934,7 +18643,7 @@
     </p:spTree>
     <p:extLst>
       <p:ext uri="{BB962C8B-B14F-4D97-AF65-F5344CB8AC3E}">
-        <p14:creationId xmlns:p14="http://schemas.microsoft.com/office/powerpoint/2010/main" xmlns="" val="3542583579"/>
+        <p14:creationId xmlns:p14="http://schemas.microsoft.com/office/powerpoint/2010/main" val="3542583579"/>
       </p:ext>
     </p:extLst>
   </p:cSld>

</xml_diff>

<commit_message>
Abschlusspräsentation - Mockup aktualisiert
Signed-off-by: Alexander Benölken <a.benoelken@googlemail.com>
</commit_message>
<xml_diff>
--- a/Dokumente/Abschlusspr�si/Abschlusspr�sentation.pptx
+++ b/Dokumente/Abschlusspr�si/Abschlusspr�sentation.pptx
@@ -154,15 +154,6 @@
 </p:cmAuthorLst>
 </file>
 
-<file path=ppt/comments/comment1.xml><?xml version="1.0" encoding="utf-8"?>
-<p:cmLst xmlns:a="http://schemas.openxmlformats.org/drawingml/2006/main" xmlns:r="http://schemas.openxmlformats.org/officeDocument/2006/relationships" xmlns:p="http://schemas.openxmlformats.org/presentationml/2006/main">
-  <p:cm authorId="1" dt="2012-05-10T23:26:08.797" idx="1">
-    <p:pos x="4377" y="1207"/>
-    <p:text>@ABK: Updaten mit FSM neuestem Mock-Up</p:text>
-  </p:cm>
-</p:cmLst>
-</file>
-
 <file path=ppt/notesMasters/notesMaster1.xml><?xml version="1.0" encoding="utf-8"?>
 <p:notesMaster xmlns:a="http://schemas.openxmlformats.org/drawingml/2006/main" xmlns:r="http://schemas.openxmlformats.org/officeDocument/2006/relationships" xmlns:p="http://schemas.openxmlformats.org/presentationml/2006/main">
   <p:cSld>
@@ -417,7 +408,7 @@
     </p:spTree>
     <p:extLst>
       <p:ext uri="{BB962C8B-B14F-4D97-AF65-F5344CB8AC3E}">
-        <p14:creationId xmlns:p14="http://schemas.microsoft.com/office/powerpoint/2010/main" xmlns="" val="2610097957"/>
+        <p14:creationId xmlns="" xmlns:p14="http://schemas.microsoft.com/office/powerpoint/2010/main" val="2610097957"/>
       </p:ext>
     </p:extLst>
   </p:cSld>
@@ -592,7 +583,7 @@
     </p:spTree>
     <p:extLst>
       <p:ext uri="{BB962C8B-B14F-4D97-AF65-F5344CB8AC3E}">
-        <p14:creationId xmlns:p14="http://schemas.microsoft.com/office/powerpoint/2010/main" xmlns="" val="2116472317"/>
+        <p14:creationId xmlns="" xmlns:p14="http://schemas.microsoft.com/office/powerpoint/2010/main" val="2116472317"/>
       </p:ext>
     </p:extLst>
   </p:cSld>
@@ -689,7 +680,7 @@
     </p:spTree>
     <p:extLst>
       <p:ext uri="{BB962C8B-B14F-4D97-AF65-F5344CB8AC3E}">
-        <p14:creationId xmlns:p14="http://schemas.microsoft.com/office/powerpoint/2010/main" xmlns="" val="2934279750"/>
+        <p14:creationId xmlns="" xmlns:p14="http://schemas.microsoft.com/office/powerpoint/2010/main" val="2934279750"/>
       </p:ext>
     </p:extLst>
   </p:cSld>
@@ -786,7 +777,7 @@
     </p:spTree>
     <p:extLst>
       <p:ext uri="{BB962C8B-B14F-4D97-AF65-F5344CB8AC3E}">
-        <p14:creationId xmlns:p14="http://schemas.microsoft.com/office/powerpoint/2010/main" xmlns="" val="2934279750"/>
+        <p14:creationId xmlns="" xmlns:p14="http://schemas.microsoft.com/office/powerpoint/2010/main" val="2934279750"/>
       </p:ext>
     </p:extLst>
   </p:cSld>
@@ -883,7 +874,7 @@
     </p:spTree>
     <p:extLst>
       <p:ext uri="{BB962C8B-B14F-4D97-AF65-F5344CB8AC3E}">
-        <p14:creationId xmlns:p14="http://schemas.microsoft.com/office/powerpoint/2010/main" xmlns="" val="2934279750"/>
+        <p14:creationId xmlns="" xmlns:p14="http://schemas.microsoft.com/office/powerpoint/2010/main" val="2934279750"/>
       </p:ext>
     </p:extLst>
   </p:cSld>
@@ -972,7 +963,7 @@
     </p:spTree>
     <p:extLst>
       <p:ext uri="{BB962C8B-B14F-4D97-AF65-F5344CB8AC3E}">
-        <p14:creationId xmlns:p14="http://schemas.microsoft.com/office/powerpoint/2010/main" xmlns="" val="135288531"/>
+        <p14:creationId xmlns="" xmlns:p14="http://schemas.microsoft.com/office/powerpoint/2010/main" val="135288531"/>
       </p:ext>
     </p:extLst>
   </p:cSld>
@@ -1065,7 +1056,7 @@
     </p:spTree>
     <p:extLst>
       <p:ext uri="{BB962C8B-B14F-4D97-AF65-F5344CB8AC3E}">
-        <p14:creationId xmlns:p14="http://schemas.microsoft.com/office/powerpoint/2010/main" xmlns="" val="2825845930"/>
+        <p14:creationId xmlns="" xmlns:p14="http://schemas.microsoft.com/office/powerpoint/2010/main" val="2825845930"/>
       </p:ext>
     </p:extLst>
   </p:cSld>
@@ -1166,7 +1157,7 @@
     </p:spTree>
     <p:extLst>
       <p:ext uri="{BB962C8B-B14F-4D97-AF65-F5344CB8AC3E}">
-        <p14:creationId xmlns:p14="http://schemas.microsoft.com/office/powerpoint/2010/main" xmlns="" val="3912581999"/>
+        <p14:creationId xmlns="" xmlns:p14="http://schemas.microsoft.com/office/powerpoint/2010/main" val="3912581999"/>
       </p:ext>
     </p:extLst>
   </p:cSld>
@@ -1299,7 +1290,7 @@
     </p:spTree>
     <p:extLst>
       <p:ext uri="{BB962C8B-B14F-4D97-AF65-F5344CB8AC3E}">
-        <p14:creationId xmlns:p14="http://schemas.microsoft.com/office/powerpoint/2010/main" xmlns="" val="802076649"/>
+        <p14:creationId xmlns="" xmlns:p14="http://schemas.microsoft.com/office/powerpoint/2010/main" val="802076649"/>
       </p:ext>
     </p:extLst>
   </p:cSld>
@@ -1432,7 +1423,7 @@
     </p:spTree>
     <p:extLst>
       <p:ext uri="{BB962C8B-B14F-4D97-AF65-F5344CB8AC3E}">
-        <p14:creationId xmlns:p14="http://schemas.microsoft.com/office/powerpoint/2010/main" xmlns="" val="802076649"/>
+        <p14:creationId xmlns="" xmlns:p14="http://schemas.microsoft.com/office/powerpoint/2010/main" val="802076649"/>
       </p:ext>
     </p:extLst>
   </p:cSld>
@@ -1565,7 +1556,7 @@
     </p:spTree>
     <p:extLst>
       <p:ext uri="{BB962C8B-B14F-4D97-AF65-F5344CB8AC3E}">
-        <p14:creationId xmlns:p14="http://schemas.microsoft.com/office/powerpoint/2010/main" xmlns="" val="802076649"/>
+        <p14:creationId xmlns="" xmlns:p14="http://schemas.microsoft.com/office/powerpoint/2010/main" val="802076649"/>
       </p:ext>
     </p:extLst>
   </p:cSld>
@@ -1698,7 +1689,7 @@
     </p:spTree>
     <p:extLst>
       <p:ext uri="{BB962C8B-B14F-4D97-AF65-F5344CB8AC3E}">
-        <p14:creationId xmlns:p14="http://schemas.microsoft.com/office/powerpoint/2010/main" xmlns="" val="802076649"/>
+        <p14:creationId xmlns="" xmlns:p14="http://schemas.microsoft.com/office/powerpoint/2010/main" val="802076649"/>
       </p:ext>
     </p:extLst>
   </p:cSld>
@@ -2023,7 +2014,7 @@
     </p:spTree>
     <p:extLst>
       <p:ext uri="{BB962C8B-B14F-4D97-AF65-F5344CB8AC3E}">
-        <p14:creationId xmlns:p14="http://schemas.microsoft.com/office/powerpoint/2010/main" xmlns="" val="517533983"/>
+        <p14:creationId xmlns="" xmlns:p14="http://schemas.microsoft.com/office/powerpoint/2010/main" val="517533983"/>
       </p:ext>
     </p:extLst>
   </p:cSld>
@@ -2156,7 +2147,7 @@
     </p:spTree>
     <p:extLst>
       <p:ext uri="{BB962C8B-B14F-4D97-AF65-F5344CB8AC3E}">
-        <p14:creationId xmlns:p14="http://schemas.microsoft.com/office/powerpoint/2010/main" xmlns="" val="802076649"/>
+        <p14:creationId xmlns="" xmlns:p14="http://schemas.microsoft.com/office/powerpoint/2010/main" val="802076649"/>
       </p:ext>
     </p:extLst>
   </p:cSld>
@@ -2289,7 +2280,7 @@
     </p:spTree>
     <p:extLst>
       <p:ext uri="{BB962C8B-B14F-4D97-AF65-F5344CB8AC3E}">
-        <p14:creationId xmlns:p14="http://schemas.microsoft.com/office/powerpoint/2010/main" xmlns="" val="802076649"/>
+        <p14:creationId xmlns="" xmlns:p14="http://schemas.microsoft.com/office/powerpoint/2010/main" val="802076649"/>
       </p:ext>
     </p:extLst>
   </p:cSld>
@@ -2422,7 +2413,7 @@
     </p:spTree>
     <p:extLst>
       <p:ext uri="{BB962C8B-B14F-4D97-AF65-F5344CB8AC3E}">
-        <p14:creationId xmlns:p14="http://schemas.microsoft.com/office/powerpoint/2010/main" xmlns="" val="802076649"/>
+        <p14:creationId xmlns="" xmlns:p14="http://schemas.microsoft.com/office/powerpoint/2010/main" val="802076649"/>
       </p:ext>
     </p:extLst>
   </p:cSld>
@@ -2633,7 +2624,7 @@
     </p:spTree>
     <p:extLst>
       <p:ext uri="{BB962C8B-B14F-4D97-AF65-F5344CB8AC3E}">
-        <p14:creationId xmlns:p14="http://schemas.microsoft.com/office/powerpoint/2010/main" xmlns="" val="1629754142"/>
+        <p14:creationId xmlns="" xmlns:p14="http://schemas.microsoft.com/office/powerpoint/2010/main" val="1629754142"/>
       </p:ext>
     </p:extLst>
   </p:cSld>
@@ -2758,7 +2749,7 @@
     </p:spTree>
     <p:extLst>
       <p:ext uri="{BB962C8B-B14F-4D97-AF65-F5344CB8AC3E}">
-        <p14:creationId xmlns:p14="http://schemas.microsoft.com/office/powerpoint/2010/main" xmlns="" val="3931682397"/>
+        <p14:creationId xmlns="" xmlns:p14="http://schemas.microsoft.com/office/powerpoint/2010/main" val="3931682397"/>
       </p:ext>
     </p:extLst>
   </p:cSld>
@@ -2883,7 +2874,7 @@
     </p:spTree>
     <p:extLst>
       <p:ext uri="{BB962C8B-B14F-4D97-AF65-F5344CB8AC3E}">
-        <p14:creationId xmlns:p14="http://schemas.microsoft.com/office/powerpoint/2010/main" xmlns="" val="3931682397"/>
+        <p14:creationId xmlns="" xmlns:p14="http://schemas.microsoft.com/office/powerpoint/2010/main" val="3931682397"/>
       </p:ext>
     </p:extLst>
   </p:cSld>
@@ -3250,7 +3241,7 @@
     </p:spTree>
     <p:extLst>
       <p:ext uri="{BB962C8B-B14F-4D97-AF65-F5344CB8AC3E}">
-        <p14:creationId xmlns:p14="http://schemas.microsoft.com/office/powerpoint/2010/main" xmlns="" val="1616458392"/>
+        <p14:creationId xmlns="" xmlns:p14="http://schemas.microsoft.com/office/powerpoint/2010/main" val="1616458392"/>
       </p:ext>
     </p:extLst>
   </p:cSld>
@@ -3335,7 +3326,7 @@
     </p:spTree>
     <p:extLst>
       <p:ext uri="{BB962C8B-B14F-4D97-AF65-F5344CB8AC3E}">
-        <p14:creationId xmlns:p14="http://schemas.microsoft.com/office/powerpoint/2010/main" xmlns="" val="2116472317"/>
+        <p14:creationId xmlns="" xmlns:p14="http://schemas.microsoft.com/office/powerpoint/2010/main" val="2116472317"/>
       </p:ext>
     </p:extLst>
   </p:cSld>
@@ -3660,7 +3651,7 @@
     </p:spTree>
     <p:extLst>
       <p:ext uri="{BB962C8B-B14F-4D97-AF65-F5344CB8AC3E}">
-        <p14:creationId xmlns:p14="http://schemas.microsoft.com/office/powerpoint/2010/main" xmlns="" val="517533983"/>
+        <p14:creationId xmlns="" xmlns:p14="http://schemas.microsoft.com/office/powerpoint/2010/main" val="517533983"/>
       </p:ext>
     </p:extLst>
   </p:cSld>
@@ -3753,7 +3744,7 @@
     </p:spTree>
     <p:extLst>
       <p:ext uri="{BB962C8B-B14F-4D97-AF65-F5344CB8AC3E}">
-        <p14:creationId xmlns:p14="http://schemas.microsoft.com/office/powerpoint/2010/main" xmlns="" val="2934279750"/>
+        <p14:creationId xmlns="" xmlns:p14="http://schemas.microsoft.com/office/powerpoint/2010/main" val="2934279750"/>
       </p:ext>
     </p:extLst>
   </p:cSld>
@@ -3850,7 +3841,7 @@
     </p:spTree>
     <p:extLst>
       <p:ext uri="{BB962C8B-B14F-4D97-AF65-F5344CB8AC3E}">
-        <p14:creationId xmlns:p14="http://schemas.microsoft.com/office/powerpoint/2010/main" xmlns="" val="2934279750"/>
+        <p14:creationId xmlns="" xmlns:p14="http://schemas.microsoft.com/office/powerpoint/2010/main" val="2934279750"/>
       </p:ext>
     </p:extLst>
   </p:cSld>
@@ -3935,7 +3926,7 @@
     </p:spTree>
     <p:extLst>
       <p:ext uri="{BB962C8B-B14F-4D97-AF65-F5344CB8AC3E}">
-        <p14:creationId xmlns:p14="http://schemas.microsoft.com/office/powerpoint/2010/main" xmlns="" val="2934279750"/>
+        <p14:creationId xmlns="" xmlns:p14="http://schemas.microsoft.com/office/powerpoint/2010/main" val="2934279750"/>
       </p:ext>
     </p:extLst>
   </p:cSld>
@@ -4345,7 +4336,7 @@
     </p:spTree>
     <p:extLst>
       <p:ext uri="{BB962C8B-B14F-4D97-AF65-F5344CB8AC3E}">
-        <p14:creationId xmlns:p14="http://schemas.microsoft.com/office/powerpoint/2010/main" xmlns="" val="2934279750"/>
+        <p14:creationId xmlns="" xmlns:p14="http://schemas.microsoft.com/office/powerpoint/2010/main" val="2934279750"/>
       </p:ext>
     </p:extLst>
   </p:cSld>
@@ -4430,7 +4421,7 @@
     </p:spTree>
     <p:extLst>
       <p:ext uri="{BB962C8B-B14F-4D97-AF65-F5344CB8AC3E}">
-        <p14:creationId xmlns:p14="http://schemas.microsoft.com/office/powerpoint/2010/main" xmlns="" val="3860513045"/>
+        <p14:creationId xmlns="" xmlns:p14="http://schemas.microsoft.com/office/powerpoint/2010/main" val="3860513045"/>
       </p:ext>
     </p:extLst>
   </p:cSld>
@@ -4527,7 +4518,7 @@
     </p:spTree>
     <p:extLst>
       <p:ext uri="{BB962C8B-B14F-4D97-AF65-F5344CB8AC3E}">
-        <p14:creationId xmlns:p14="http://schemas.microsoft.com/office/powerpoint/2010/main" xmlns="" val="2934279750"/>
+        <p14:creationId xmlns="" xmlns:p14="http://schemas.microsoft.com/office/powerpoint/2010/main" val="2934279750"/>
       </p:ext>
     </p:extLst>
   </p:cSld>
@@ -8767,7 +8758,7 @@
           <a:blip r:embed="rId13" cstate="print">
             <a:extLst>
               <a:ext uri="{28A0092B-C50C-407E-A947-70E740481C1C}">
-                <a14:useLocalDpi xmlns:a14="http://schemas.microsoft.com/office/drawing/2010/main" xmlns="" val="0"/>
+                <a14:useLocalDpi xmlns="" xmlns:a14="http://schemas.microsoft.com/office/drawing/2010/main" val="0"/>
               </a:ext>
             </a:extLst>
           </a:blip>
@@ -9265,7 +9256,7 @@
           <a:blip r:embed="rId3" cstate="print">
             <a:extLst>
               <a:ext uri="{28A0092B-C50C-407E-A947-70E740481C1C}">
-                <a14:useLocalDpi xmlns:a14="http://schemas.microsoft.com/office/drawing/2010/main" xmlns="" val="0"/>
+                <a14:useLocalDpi xmlns="" xmlns:a14="http://schemas.microsoft.com/office/drawing/2010/main" val="0"/>
               </a:ext>
             </a:extLst>
           </a:blip>
@@ -9295,7 +9286,7 @@
           <a:blip r:embed="rId4" cstate="print">
             <a:extLst>
               <a:ext uri="{28A0092B-C50C-407E-A947-70E740481C1C}">
-                <a14:useLocalDpi xmlns:a14="http://schemas.microsoft.com/office/drawing/2010/main" xmlns="" val="0"/>
+                <a14:useLocalDpi xmlns="" xmlns:a14="http://schemas.microsoft.com/office/drawing/2010/main" val="0"/>
               </a:ext>
             </a:extLst>
           </a:blip>
@@ -9646,7 +9637,7 @@
     </p:spTree>
     <p:extLst>
       <p:ext uri="{BB962C8B-B14F-4D97-AF65-F5344CB8AC3E}">
-        <p14:creationId xmlns:p14="http://schemas.microsoft.com/office/powerpoint/2010/main" xmlns="" val="351671181"/>
+        <p14:creationId xmlns="" xmlns:p14="http://schemas.microsoft.com/office/powerpoint/2010/main" val="351671181"/>
       </p:ext>
     </p:extLst>
   </p:cSld>
@@ -9700,10 +9691,6 @@
             <a:r>
               <a:rPr lang="de-DE" dirty="0" smtClean="0"/>
               <a:t>„Event organisieren“</a:t>
-            </a:r>
-            <a:r>
-              <a:rPr lang="de-DE" dirty="0" smtClean="0"/>
-              <a:t/>
             </a:r>
             <a:br>
               <a:rPr lang="de-DE" dirty="0" smtClean="0"/>
@@ -9953,10 +9940,6 @@
               <a:rPr lang="de-DE" dirty="0" smtClean="0"/>
               <a:t>„Event organisieren“</a:t>
             </a:r>
-            <a:r>
-              <a:rPr lang="de-DE" dirty="0" smtClean="0"/>
-              <a:t/>
-            </a:r>
             <a:br>
               <a:rPr lang="de-DE" dirty="0" smtClean="0"/>
             </a:br>
@@ -10205,10 +10188,6 @@
               <a:rPr lang="de-DE" dirty="0" smtClean="0"/>
               <a:t>„Event organisieren“</a:t>
             </a:r>
-            <a:r>
-              <a:rPr lang="de-DE" dirty="0" smtClean="0"/>
-              <a:t/>
-            </a:r>
             <a:br>
               <a:rPr lang="de-DE" dirty="0" smtClean="0"/>
             </a:br>
@@ -11006,8 +10985,10 @@
       </p:sp>
       <p:pic>
         <p:nvPicPr>
-          <p:cNvPr id="8" name="Grafik 7"/>
-          <p:cNvPicPr/>
+          <p:cNvPr id="1026" name="Picture 2" descr="C:\Users\Alexander\Desktop\eventalizer\Eventalizer\Dokumente\Mock Ups\Mockup - Event organisieren.png"/>
+          <p:cNvPicPr>
+            <a:picLocks noChangeAspect="1" noChangeArrowheads="1"/>
+          </p:cNvPicPr>
           <p:nvPr/>
         </p:nvPicPr>
         <p:blipFill>
@@ -11019,8 +11000,8 @@
         </p:blipFill>
         <p:spPr bwMode="auto">
           <a:xfrm>
-            <a:off x="1907704" y="1916832"/>
-            <a:ext cx="5040000" cy="2694934"/>
+            <a:off x="1763688" y="1922493"/>
+            <a:ext cx="5400000" cy="4098795"/>
           </a:xfrm>
           <a:prstGeom prst="rect">
             <a:avLst/>
@@ -11503,7 +11484,7 @@
     </p:spTree>
     <p:extLst>
       <p:ext uri="{BB962C8B-B14F-4D97-AF65-F5344CB8AC3E}">
-        <p14:creationId xmlns:p14="http://schemas.microsoft.com/office/powerpoint/2010/main" xmlns="" val="351671181"/>
+        <p14:creationId xmlns="" xmlns:p14="http://schemas.microsoft.com/office/powerpoint/2010/main" val="351671181"/>
       </p:ext>
     </p:extLst>
   </p:cSld>
@@ -11812,7 +11793,7 @@
     </p:spTree>
     <p:extLst>
       <p:ext uri="{BB962C8B-B14F-4D97-AF65-F5344CB8AC3E}">
-        <p14:creationId xmlns:p14="http://schemas.microsoft.com/office/powerpoint/2010/main" xmlns="" val="351671181"/>
+        <p14:creationId xmlns="" xmlns:p14="http://schemas.microsoft.com/office/powerpoint/2010/main" val="351671181"/>
       </p:ext>
     </p:extLst>
   </p:cSld>
@@ -12088,7 +12069,7 @@
     </p:spTree>
     <p:extLst>
       <p:ext uri="{BB962C8B-B14F-4D97-AF65-F5344CB8AC3E}">
-        <p14:creationId xmlns:p14="http://schemas.microsoft.com/office/powerpoint/2010/main" xmlns="" val="3616670450"/>
+        <p14:creationId xmlns="" xmlns:p14="http://schemas.microsoft.com/office/powerpoint/2010/main" val="3616670450"/>
       </p:ext>
     </p:extLst>
   </p:cSld>
@@ -12397,7 +12378,7 @@
     </p:spTree>
     <p:extLst>
       <p:ext uri="{BB962C8B-B14F-4D97-AF65-F5344CB8AC3E}">
-        <p14:creationId xmlns:p14="http://schemas.microsoft.com/office/powerpoint/2010/main" xmlns="" val="351671181"/>
+        <p14:creationId xmlns="" xmlns:p14="http://schemas.microsoft.com/office/powerpoint/2010/main" val="351671181"/>
       </p:ext>
     </p:extLst>
   </p:cSld>
@@ -12561,7 +12542,7 @@
     </p:spTree>
     <p:extLst>
       <p:ext uri="{BB962C8B-B14F-4D97-AF65-F5344CB8AC3E}">
-        <p14:creationId xmlns:p14="http://schemas.microsoft.com/office/powerpoint/2010/main" xmlns="" val="141785747"/>
+        <p14:creationId xmlns="" xmlns:p14="http://schemas.microsoft.com/office/powerpoint/2010/main" val="141785747"/>
       </p:ext>
     </p:extLst>
   </p:cSld>
@@ -12876,7 +12857,7 @@
     </p:spTree>
     <p:extLst>
       <p:ext uri="{BB962C8B-B14F-4D97-AF65-F5344CB8AC3E}">
-        <p14:creationId xmlns:p14="http://schemas.microsoft.com/office/powerpoint/2010/main" xmlns="" val="2634211947"/>
+        <p14:creationId xmlns="" xmlns:p14="http://schemas.microsoft.com/office/powerpoint/2010/main" val="2634211947"/>
       </p:ext>
     </p:extLst>
   </p:cSld>
@@ -13030,7 +13011,7 @@
     </p:spTree>
     <p:extLst>
       <p:ext uri="{BB962C8B-B14F-4D97-AF65-F5344CB8AC3E}">
-        <p14:creationId xmlns:p14="http://schemas.microsoft.com/office/powerpoint/2010/main" xmlns="" val="3243626544"/>
+        <p14:creationId xmlns="" xmlns:p14="http://schemas.microsoft.com/office/powerpoint/2010/main" val="3243626544"/>
       </p:ext>
     </p:extLst>
   </p:cSld>
@@ -13186,7 +13167,7 @@
     </p:spTree>
     <p:extLst>
       <p:ext uri="{BB962C8B-B14F-4D97-AF65-F5344CB8AC3E}">
-        <p14:creationId xmlns:p14="http://schemas.microsoft.com/office/powerpoint/2010/main" xmlns="" val="3243626544"/>
+        <p14:creationId xmlns="" xmlns:p14="http://schemas.microsoft.com/office/powerpoint/2010/main" val="3243626544"/>
       </p:ext>
     </p:extLst>
   </p:cSld>
@@ -13693,7 +13674,7 @@
     </p:spTree>
     <p:extLst>
       <p:ext uri="{BB962C8B-B14F-4D97-AF65-F5344CB8AC3E}">
-        <p14:creationId xmlns:p14="http://schemas.microsoft.com/office/powerpoint/2010/main" xmlns="" val="3243626544"/>
+        <p14:creationId xmlns="" xmlns:p14="http://schemas.microsoft.com/office/powerpoint/2010/main" val="3243626544"/>
       </p:ext>
     </p:extLst>
   </p:cSld>
@@ -14207,7 +14188,7 @@
     </p:spTree>
     <p:extLst>
       <p:ext uri="{BB962C8B-B14F-4D97-AF65-F5344CB8AC3E}">
-        <p14:creationId xmlns:p14="http://schemas.microsoft.com/office/powerpoint/2010/main" xmlns="" val="3243626544"/>
+        <p14:creationId xmlns="" xmlns:p14="http://schemas.microsoft.com/office/powerpoint/2010/main" val="3243626544"/>
       </p:ext>
     </p:extLst>
   </p:cSld>
@@ -14675,7 +14656,7 @@
     </p:spTree>
     <p:extLst>
       <p:ext uri="{BB962C8B-B14F-4D97-AF65-F5344CB8AC3E}">
-        <p14:creationId xmlns:p14="http://schemas.microsoft.com/office/powerpoint/2010/main" xmlns="" val="3243626544"/>
+        <p14:creationId xmlns="" xmlns:p14="http://schemas.microsoft.com/office/powerpoint/2010/main" val="3243626544"/>
       </p:ext>
     </p:extLst>
   </p:cSld>
@@ -15504,7 +15485,7 @@
     </p:spTree>
     <p:extLst>
       <p:ext uri="{BB962C8B-B14F-4D97-AF65-F5344CB8AC3E}">
-        <p14:creationId xmlns:p14="http://schemas.microsoft.com/office/powerpoint/2010/main" xmlns="" val="3243626544"/>
+        <p14:creationId xmlns="" xmlns:p14="http://schemas.microsoft.com/office/powerpoint/2010/main" val="3243626544"/>
       </p:ext>
     </p:extLst>
   </p:cSld>
@@ -15790,7 +15771,7 @@
     </p:spTree>
     <p:extLst>
       <p:ext uri="{BB962C8B-B14F-4D97-AF65-F5344CB8AC3E}">
-        <p14:creationId xmlns:p14="http://schemas.microsoft.com/office/powerpoint/2010/main" xmlns="" val="2988266106"/>
+        <p14:creationId xmlns="" xmlns:p14="http://schemas.microsoft.com/office/powerpoint/2010/main" val="2988266106"/>
       </p:ext>
     </p:extLst>
   </p:cSld>
@@ -15798,7 +15779,7 @@
     <a:masterClrMapping/>
   </p:clrMapOvr>
   <mc:AlternateContent xmlns:mc="http://schemas.openxmlformats.org/markup-compatibility/2006">
-    <mc:Choice xmlns:p14="http://schemas.microsoft.com/office/powerpoint/2010/main" xmlns="" Requires="p14">
+    <mc:Choice xmlns="" xmlns:p14="http://schemas.microsoft.com/office/powerpoint/2010/main" Requires="p14">
       <p:transition spd="slow" p14:dur="2000"/>
     </mc:Choice>
     <mc:Fallback>
@@ -16401,7 +16382,7 @@
     </p:spTree>
     <p:extLst>
       <p:ext uri="{BB962C8B-B14F-4D97-AF65-F5344CB8AC3E}">
-        <p14:creationId xmlns:p14="http://schemas.microsoft.com/office/powerpoint/2010/main" xmlns="" val="3243626544"/>
+        <p14:creationId xmlns="" xmlns:p14="http://schemas.microsoft.com/office/powerpoint/2010/main" val="3243626544"/>
       </p:ext>
     </p:extLst>
   </p:cSld>
@@ -16721,7 +16702,7 @@
     </p:spTree>
     <p:extLst>
       <p:ext uri="{BB962C8B-B14F-4D97-AF65-F5344CB8AC3E}">
-        <p14:creationId xmlns:p14="http://schemas.microsoft.com/office/powerpoint/2010/main" xmlns="" val="3309636493"/>
+        <p14:creationId xmlns="" xmlns:p14="http://schemas.microsoft.com/office/powerpoint/2010/main" val="3309636493"/>
       </p:ext>
     </p:extLst>
   </p:cSld>
@@ -16932,7 +16913,7 @@
     </p:spTree>
     <p:extLst>
       <p:ext uri="{BB962C8B-B14F-4D97-AF65-F5344CB8AC3E}">
-        <p14:creationId xmlns:p14="http://schemas.microsoft.com/office/powerpoint/2010/main" xmlns="" val="1012322072"/>
+        <p14:creationId xmlns="" xmlns:p14="http://schemas.microsoft.com/office/powerpoint/2010/main" val="1012322072"/>
       </p:ext>
     </p:extLst>
   </p:cSld>
@@ -17150,7 +17131,7 @@
     </p:spTree>
     <p:extLst>
       <p:ext uri="{BB962C8B-B14F-4D97-AF65-F5344CB8AC3E}">
-        <p14:creationId xmlns:p14="http://schemas.microsoft.com/office/powerpoint/2010/main" xmlns="" val="1012322072"/>
+        <p14:creationId xmlns="" xmlns:p14="http://schemas.microsoft.com/office/powerpoint/2010/main" val="1012322072"/>
       </p:ext>
     </p:extLst>
   </p:cSld>
@@ -17369,7 +17350,7 @@
           <a:blip r:embed="rId2" cstate="print">
             <a:extLst>
               <a:ext uri="{BEBA8EAE-BF5A-486C-A8C5-ECC9F3942E4B}">
-                <a14:imgProps xmlns:a14="http://schemas.microsoft.com/office/drawing/2010/main" xmlns="">
+                <a14:imgProps xmlns="" xmlns:a14="http://schemas.microsoft.com/office/drawing/2010/main">
                   <a14:imgLayer r:embed="rId3">
                     <a14:imgEffect>
                       <a14:backgroundRemoval t="6057" b="22942" l="7000" r="29162"/>
@@ -17378,7 +17359,7 @@
                 </a14:imgProps>
               </a:ext>
               <a:ext uri="{28A0092B-C50C-407E-A947-70E740481C1C}">
-                <a14:useLocalDpi xmlns:a14="http://schemas.microsoft.com/office/drawing/2010/main" xmlns="" val="0"/>
+                <a14:useLocalDpi xmlns="" xmlns:a14="http://schemas.microsoft.com/office/drawing/2010/main" val="0"/>
               </a:ext>
             </a:extLst>
           </a:blip>
@@ -17396,7 +17377,7 @@
           <a:noFill/>
           <a:extLst>
             <a:ext uri="{909E8E84-426E-40DD-AFC4-6F175D3DCCD1}">
-              <a14:hiddenFill xmlns:a14="http://schemas.microsoft.com/office/drawing/2010/main" xmlns="">
+              <a14:hiddenFill xmlns="" xmlns:a14="http://schemas.microsoft.com/office/drawing/2010/main">
                 <a:solidFill>
                   <a:srgbClr val="FFFFFF"/>
                 </a:solidFill>
@@ -17417,7 +17398,7 @@
           <a:blip r:embed="rId2" cstate="print">
             <a:extLst>
               <a:ext uri="{BEBA8EAE-BF5A-486C-A8C5-ECC9F3942E4B}">
-                <a14:imgProps xmlns:a14="http://schemas.microsoft.com/office/drawing/2010/main" xmlns="">
+                <a14:imgProps xmlns="" xmlns:a14="http://schemas.microsoft.com/office/drawing/2010/main">
                   <a14:imgLayer r:embed="rId3">
                     <a14:imgEffect>
                       <a14:backgroundRemoval t="6057" b="22942" l="7000" r="29162"/>
@@ -17426,7 +17407,7 @@
                 </a14:imgProps>
               </a:ext>
               <a:ext uri="{28A0092B-C50C-407E-A947-70E740481C1C}">
-                <a14:useLocalDpi xmlns:a14="http://schemas.microsoft.com/office/drawing/2010/main" xmlns="" val="0"/>
+                <a14:useLocalDpi xmlns="" xmlns:a14="http://schemas.microsoft.com/office/drawing/2010/main" val="0"/>
               </a:ext>
             </a:extLst>
           </a:blip>
@@ -17444,7 +17425,7 @@
           <a:noFill/>
           <a:extLst>
             <a:ext uri="{909E8E84-426E-40DD-AFC4-6F175D3DCCD1}">
-              <a14:hiddenFill xmlns:a14="http://schemas.microsoft.com/office/drawing/2010/main" xmlns="">
+              <a14:hiddenFill xmlns="" xmlns:a14="http://schemas.microsoft.com/office/drawing/2010/main">
                 <a:solidFill>
                   <a:srgbClr val="FFFFFF"/>
                 </a:solidFill>
@@ -17456,7 +17437,7 @@
     </p:spTree>
     <p:extLst>
       <p:ext uri="{BB962C8B-B14F-4D97-AF65-F5344CB8AC3E}">
-        <p14:creationId xmlns:p14="http://schemas.microsoft.com/office/powerpoint/2010/main" xmlns="" val="2645794681"/>
+        <p14:creationId xmlns="" xmlns:p14="http://schemas.microsoft.com/office/powerpoint/2010/main" val="2645794681"/>
       </p:ext>
     </p:extLst>
   </p:cSld>
@@ -17685,7 +17666,7 @@
           <a:blip r:embed="rId3" cstate="print">
             <a:extLst>
               <a:ext uri="{28A0092B-C50C-407E-A947-70E740481C1C}">
-                <a14:useLocalDpi xmlns:a14="http://schemas.microsoft.com/office/drawing/2010/main" xmlns="" val="0"/>
+                <a14:useLocalDpi xmlns="" xmlns:a14="http://schemas.microsoft.com/office/drawing/2010/main" val="0"/>
               </a:ext>
             </a:extLst>
           </a:blip>
@@ -17717,7 +17698,7 @@
           </a:effectLst>
           <a:extLst>
             <a:ext uri="{91240B29-F687-4F45-9708-019B960494DF}">
-              <a14:hiddenLine xmlns:a14="http://schemas.microsoft.com/office/drawing/2010/main" xmlns="" w="9525">
+              <a14:hiddenLine xmlns="" xmlns:a14="http://schemas.microsoft.com/office/drawing/2010/main" w="9525">
                 <a:solidFill>
                   <a:schemeClr val="tx1"/>
                 </a:solidFill>
@@ -17732,7 +17713,7 @@
     </p:spTree>
     <p:extLst>
       <p:ext uri="{BB962C8B-B14F-4D97-AF65-F5344CB8AC3E}">
-        <p14:creationId xmlns:p14="http://schemas.microsoft.com/office/powerpoint/2010/main" xmlns="" val="313312729"/>
+        <p14:creationId xmlns="" xmlns:p14="http://schemas.microsoft.com/office/powerpoint/2010/main" val="313312729"/>
       </p:ext>
     </p:extLst>
   </p:cSld>
@@ -17943,7 +17924,7 @@
     </p:spTree>
     <p:extLst>
       <p:ext uri="{BB962C8B-B14F-4D97-AF65-F5344CB8AC3E}">
-        <p14:creationId xmlns:p14="http://schemas.microsoft.com/office/powerpoint/2010/main" xmlns="" val="1344880779"/>
+        <p14:creationId xmlns="" xmlns:p14="http://schemas.microsoft.com/office/powerpoint/2010/main" val="1344880779"/>
       </p:ext>
     </p:extLst>
   </p:cSld>
@@ -18036,7 +18017,7 @@
           <a:blip r:embed="rId3" cstate="print">
             <a:extLst>
               <a:ext uri="{28A0092B-C50C-407E-A947-70E740481C1C}">
-                <a14:useLocalDpi xmlns:a14="http://schemas.microsoft.com/office/drawing/2010/main" xmlns="" val="0"/>
+                <a14:useLocalDpi xmlns="" xmlns:a14="http://schemas.microsoft.com/office/drawing/2010/main" val="0"/>
               </a:ext>
             </a:extLst>
           </a:blip>
@@ -18066,7 +18047,7 @@
           <a:blip r:embed="rId4" cstate="print">
             <a:extLst>
               <a:ext uri="{28A0092B-C50C-407E-A947-70E740481C1C}">
-                <a14:useLocalDpi xmlns:a14="http://schemas.microsoft.com/office/drawing/2010/main" xmlns="" val="0"/>
+                <a14:useLocalDpi xmlns="" xmlns:a14="http://schemas.microsoft.com/office/drawing/2010/main" val="0"/>
               </a:ext>
             </a:extLst>
           </a:blip>
@@ -18087,7 +18068,7 @@
     </p:spTree>
     <p:extLst>
       <p:ext uri="{BB962C8B-B14F-4D97-AF65-F5344CB8AC3E}">
-        <p14:creationId xmlns:p14="http://schemas.microsoft.com/office/powerpoint/2010/main" xmlns="" val="2565098391"/>
+        <p14:creationId xmlns="" xmlns:p14="http://schemas.microsoft.com/office/powerpoint/2010/main" val="2565098391"/>
       </p:ext>
     </p:extLst>
   </p:cSld>
@@ -18335,7 +18316,7 @@
     </p:spTree>
     <p:extLst>
       <p:ext uri="{BB962C8B-B14F-4D97-AF65-F5344CB8AC3E}">
-        <p14:creationId xmlns:p14="http://schemas.microsoft.com/office/powerpoint/2010/main" xmlns="" val="3661383713"/>
+        <p14:creationId xmlns="" xmlns:p14="http://schemas.microsoft.com/office/powerpoint/2010/main" val="3661383713"/>
       </p:ext>
     </p:extLst>
   </p:cSld>
@@ -18486,7 +18467,7 @@
     </p:spTree>
     <p:extLst>
       <p:ext uri="{BB962C8B-B14F-4D97-AF65-F5344CB8AC3E}">
-        <p14:creationId xmlns:p14="http://schemas.microsoft.com/office/powerpoint/2010/main" xmlns="" val="351671181"/>
+        <p14:creationId xmlns="" xmlns:p14="http://schemas.microsoft.com/office/powerpoint/2010/main" val="351671181"/>
       </p:ext>
     </p:extLst>
   </p:cSld>
@@ -18888,7 +18869,7 @@
     </p:spTree>
     <p:extLst>
       <p:ext uri="{BB962C8B-B14F-4D97-AF65-F5344CB8AC3E}">
-        <p14:creationId xmlns:p14="http://schemas.microsoft.com/office/powerpoint/2010/main" xmlns="" val="351671181"/>
+        <p14:creationId xmlns="" xmlns:p14="http://schemas.microsoft.com/office/powerpoint/2010/main" val="351671181"/>
       </p:ext>
     </p:extLst>
   </p:cSld>
@@ -18941,15 +18922,7 @@
           <a:p>
             <a:r>
               <a:rPr lang="de-DE" dirty="0" smtClean="0"/>
-              <a:t>„Anmelden </a:t>
-            </a:r>
-            <a:r>
-              <a:rPr lang="de-DE" dirty="0" smtClean="0"/>
-              <a:t>(Login</a:t>
-            </a:r>
-            <a:r>
-              <a:rPr lang="de-DE" dirty="0" smtClean="0"/>
-              <a:t>)“</a:t>
+              <a:t>„Anmelden (Login)“</a:t>
             </a:r>
             <a:br>
               <a:rPr lang="de-DE" dirty="0" smtClean="0"/>
@@ -19017,7 +18990,7 @@
           <a:blip r:embed="rId3" cstate="print">
             <a:extLst>
               <a:ext uri="{28A0092B-C50C-407E-A947-70E740481C1C}">
-                <a14:useLocalDpi xmlns:a14="http://schemas.microsoft.com/office/drawing/2010/main" xmlns="" val="0"/>
+                <a14:useLocalDpi xmlns="" xmlns:a14="http://schemas.microsoft.com/office/drawing/2010/main" val="0"/>
               </a:ext>
             </a:extLst>
           </a:blip>
@@ -19068,14 +19041,14 @@
           </a:sp3d>
           <a:extLst>
             <a:ext uri="{909E8E84-426E-40DD-AFC4-6F175D3DCCD1}">
-              <a14:hiddenFill xmlns:a14="http://schemas.microsoft.com/office/drawing/2010/main" xmlns="">
+              <a14:hiddenFill xmlns="" xmlns:a14="http://schemas.microsoft.com/office/drawing/2010/main">
                 <a:solidFill>
                   <a:schemeClr val="accent1"/>
                 </a:solidFill>
               </a14:hiddenFill>
             </a:ext>
             <a:ext uri="{91240B29-F687-4F45-9708-019B960494DF}">
-              <a14:hiddenLine xmlns:a14="http://schemas.microsoft.com/office/drawing/2010/main" xmlns="" w="9525">
+              <a14:hiddenLine xmlns="" xmlns:a14="http://schemas.microsoft.com/office/drawing/2010/main" w="9525">
                 <a:solidFill>
                   <a:schemeClr val="tx1"/>
                 </a:solidFill>
@@ -19085,7 +19058,7 @@
               </a14:hiddenLine>
             </a:ext>
             <a:ext uri="{AF507438-7753-43E0-B8FC-AC1667EBCBE1}">
-              <a14:hiddenEffects xmlns:a14="http://schemas.microsoft.com/office/drawing/2010/main" xmlns="">
+              <a14:hiddenEffects xmlns="" xmlns:a14="http://schemas.microsoft.com/office/drawing/2010/main">
                 <a:effectLst>
                   <a:outerShdw dist="35921" dir="2700000" algn="ctr" rotWithShape="0">
                     <a:schemeClr val="bg2"/>
@@ -19099,7 +19072,7 @@
     </p:spTree>
     <p:extLst>
       <p:ext uri="{BB962C8B-B14F-4D97-AF65-F5344CB8AC3E}">
-        <p14:creationId xmlns:p14="http://schemas.microsoft.com/office/powerpoint/2010/main" xmlns="" val="2681693288"/>
+        <p14:creationId xmlns="" xmlns:p14="http://schemas.microsoft.com/office/powerpoint/2010/main" val="2681693288"/>
       </p:ext>
     </p:extLst>
   </p:cSld>
@@ -19154,10 +19127,6 @@
               <a:rPr lang="de-DE" dirty="0" smtClean="0"/>
               <a:t>„Anmelden (Login)“ </a:t>
             </a:r>
-            <a:r>
-              <a:rPr lang="de-DE" dirty="0" smtClean="0"/>
-              <a:t/>
-            </a:r>
             <a:br>
               <a:rPr lang="de-DE" dirty="0" smtClean="0"/>
             </a:br>
@@ -19306,7 +19275,7 @@
     </p:spTree>
     <p:extLst>
       <p:ext uri="{BB962C8B-B14F-4D97-AF65-F5344CB8AC3E}">
-        <p14:creationId xmlns:p14="http://schemas.microsoft.com/office/powerpoint/2010/main" xmlns="" val="2681693288"/>
+        <p14:creationId xmlns="" xmlns:p14="http://schemas.microsoft.com/office/powerpoint/2010/main" val="2681693288"/>
       </p:ext>
     </p:extLst>
   </p:cSld>
@@ -19769,7 +19738,7 @@
     </p:spTree>
     <p:extLst>
       <p:ext uri="{BB962C8B-B14F-4D97-AF65-F5344CB8AC3E}">
-        <p14:creationId xmlns:p14="http://schemas.microsoft.com/office/powerpoint/2010/main" xmlns="" val="2857272158"/>
+        <p14:creationId xmlns="" xmlns:p14="http://schemas.microsoft.com/office/powerpoint/2010/main" val="2857272158"/>
       </p:ext>
     </p:extLst>
   </p:cSld>
@@ -19849,7 +19818,7 @@
           <a:blip r:embed="rId2" cstate="print">
             <a:extLst>
               <a:ext uri="{28A0092B-C50C-407E-A947-70E740481C1C}">
-                <a14:useLocalDpi xmlns:a14="http://schemas.microsoft.com/office/drawing/2010/main" xmlns="" val="0"/>
+                <a14:useLocalDpi xmlns="" xmlns:a14="http://schemas.microsoft.com/office/drawing/2010/main" val="0"/>
               </a:ext>
             </a:extLst>
           </a:blip>
@@ -19872,14 +19841,14 @@
           <a:effectLst/>
           <a:extLst>
             <a:ext uri="{909E8E84-426E-40DD-AFC4-6F175D3DCCD1}">
-              <a14:hiddenFill xmlns:a14="http://schemas.microsoft.com/office/drawing/2010/main" xmlns="">
+              <a14:hiddenFill xmlns="" xmlns:a14="http://schemas.microsoft.com/office/drawing/2010/main">
                 <a:solidFill>
                   <a:schemeClr val="accent1"/>
                 </a:solidFill>
               </a14:hiddenFill>
             </a:ext>
             <a:ext uri="{91240B29-F687-4F45-9708-019B960494DF}">
-              <a14:hiddenLine xmlns:a14="http://schemas.microsoft.com/office/drawing/2010/main" xmlns="" w="9525">
+              <a14:hiddenLine xmlns="" xmlns:a14="http://schemas.microsoft.com/office/drawing/2010/main" w="9525">
                 <a:solidFill>
                   <a:schemeClr val="tx1"/>
                 </a:solidFill>
@@ -19889,7 +19858,7 @@
               </a14:hiddenLine>
             </a:ext>
             <a:ext uri="{AF507438-7753-43E0-B8FC-AC1667EBCBE1}">
-              <a14:hiddenEffects xmlns:a14="http://schemas.microsoft.com/office/drawing/2010/main" xmlns="">
+              <a14:hiddenEffects xmlns="" xmlns:a14="http://schemas.microsoft.com/office/drawing/2010/main">
                 <a:effectLst>
                   <a:outerShdw dist="35921" dir="2700000" algn="ctr" rotWithShape="0">
                     <a:schemeClr val="bg2"/>
@@ -20174,7 +20143,7 @@
     </p:spTree>
     <p:extLst>
       <p:ext uri="{BB962C8B-B14F-4D97-AF65-F5344CB8AC3E}">
-        <p14:creationId xmlns:p14="http://schemas.microsoft.com/office/powerpoint/2010/main" xmlns="" val="3542583579"/>
+        <p14:creationId xmlns="" xmlns:p14="http://schemas.microsoft.com/office/powerpoint/2010/main" val="3542583579"/>
       </p:ext>
     </p:extLst>
   </p:cSld>

</xml_diff>

<commit_message>
Fix Db Schema Präsi
Signed-off-by: Matthias Beer <silkslostsoul@hotmail.com>
</commit_message>
<xml_diff>
--- a/Dokumente/Abschlusspr�si/Abschlusspr�sentation.pptx
+++ b/Dokumente/Abschlusspr�si/Abschlusspr�sentation.pptx
@@ -406,7 +406,7 @@
     </p:spTree>
     <p:extLst>
       <p:ext uri="{BB962C8B-B14F-4D97-AF65-F5344CB8AC3E}">
-        <p14:creationId xmlns:p14="http://schemas.microsoft.com/office/powerpoint/2010/main" xmlns="" val="2610097957"/>
+        <p14:creationId xmlns="" xmlns:p14="http://schemas.microsoft.com/office/powerpoint/2010/main" val="2610097957"/>
       </p:ext>
     </p:extLst>
   </p:cSld>
@@ -581,7 +581,7 @@
     </p:spTree>
     <p:extLst>
       <p:ext uri="{BB962C8B-B14F-4D97-AF65-F5344CB8AC3E}">
-        <p14:creationId xmlns:p14="http://schemas.microsoft.com/office/powerpoint/2010/main" xmlns="" val="2116472317"/>
+        <p14:creationId xmlns="" xmlns:p14="http://schemas.microsoft.com/office/powerpoint/2010/main" val="2116472317"/>
       </p:ext>
     </p:extLst>
   </p:cSld>
@@ -678,7 +678,7 @@
     </p:spTree>
     <p:extLst>
       <p:ext uri="{BB962C8B-B14F-4D97-AF65-F5344CB8AC3E}">
-        <p14:creationId xmlns:p14="http://schemas.microsoft.com/office/powerpoint/2010/main" xmlns="" val="2934279750"/>
+        <p14:creationId xmlns="" xmlns:p14="http://schemas.microsoft.com/office/powerpoint/2010/main" val="2934279750"/>
       </p:ext>
     </p:extLst>
   </p:cSld>
@@ -775,7 +775,7 @@
     </p:spTree>
     <p:extLst>
       <p:ext uri="{BB962C8B-B14F-4D97-AF65-F5344CB8AC3E}">
-        <p14:creationId xmlns:p14="http://schemas.microsoft.com/office/powerpoint/2010/main" xmlns="" val="2934279750"/>
+        <p14:creationId xmlns="" xmlns:p14="http://schemas.microsoft.com/office/powerpoint/2010/main" val="2934279750"/>
       </p:ext>
     </p:extLst>
   </p:cSld>
@@ -864,7 +864,7 @@
     </p:spTree>
     <p:extLst>
       <p:ext uri="{BB962C8B-B14F-4D97-AF65-F5344CB8AC3E}">
-        <p14:creationId xmlns:p14="http://schemas.microsoft.com/office/powerpoint/2010/main" xmlns="" val="135288531"/>
+        <p14:creationId xmlns="" xmlns:p14="http://schemas.microsoft.com/office/powerpoint/2010/main" val="135288531"/>
       </p:ext>
     </p:extLst>
   </p:cSld>
@@ -957,7 +957,7 @@
     </p:spTree>
     <p:extLst>
       <p:ext uri="{BB962C8B-B14F-4D97-AF65-F5344CB8AC3E}">
-        <p14:creationId xmlns:p14="http://schemas.microsoft.com/office/powerpoint/2010/main" xmlns="" val="2825845930"/>
+        <p14:creationId xmlns="" xmlns:p14="http://schemas.microsoft.com/office/powerpoint/2010/main" val="2825845930"/>
       </p:ext>
     </p:extLst>
   </p:cSld>
@@ -1058,7 +1058,7 @@
     </p:spTree>
     <p:extLst>
       <p:ext uri="{BB962C8B-B14F-4D97-AF65-F5344CB8AC3E}">
-        <p14:creationId xmlns:p14="http://schemas.microsoft.com/office/powerpoint/2010/main" xmlns="" val="3912581999"/>
+        <p14:creationId xmlns="" xmlns:p14="http://schemas.microsoft.com/office/powerpoint/2010/main" val="3912581999"/>
       </p:ext>
     </p:extLst>
   </p:cSld>
@@ -1191,7 +1191,7 @@
     </p:spTree>
     <p:extLst>
       <p:ext uri="{BB962C8B-B14F-4D97-AF65-F5344CB8AC3E}">
-        <p14:creationId xmlns:p14="http://schemas.microsoft.com/office/powerpoint/2010/main" xmlns="" val="802076649"/>
+        <p14:creationId xmlns="" xmlns:p14="http://schemas.microsoft.com/office/powerpoint/2010/main" val="802076649"/>
       </p:ext>
     </p:extLst>
   </p:cSld>
@@ -1324,7 +1324,7 @@
     </p:spTree>
     <p:extLst>
       <p:ext uri="{BB962C8B-B14F-4D97-AF65-F5344CB8AC3E}">
-        <p14:creationId xmlns="" xmlns:p14="http://schemas.microsoft.com/office/powerpoint/2010/main" val="802076649"/>
+        <p14:creationId xmlns:p14="http://schemas.microsoft.com/office/powerpoint/2010/main" xmlns="" val="802076649"/>
       </p:ext>
     </p:extLst>
   </p:cSld>
@@ -1457,7 +1457,7 @@
     </p:spTree>
     <p:extLst>
       <p:ext uri="{BB962C8B-B14F-4D97-AF65-F5344CB8AC3E}">
-        <p14:creationId xmlns="" xmlns:p14="http://schemas.microsoft.com/office/powerpoint/2010/main" val="802076649"/>
+        <p14:creationId xmlns:p14="http://schemas.microsoft.com/office/powerpoint/2010/main" xmlns="" val="802076649"/>
       </p:ext>
     </p:extLst>
   </p:cSld>
@@ -1590,7 +1590,7 @@
     </p:spTree>
     <p:extLst>
       <p:ext uri="{BB962C8B-B14F-4D97-AF65-F5344CB8AC3E}">
-        <p14:creationId xmlns="" xmlns:p14="http://schemas.microsoft.com/office/powerpoint/2010/main" val="802076649"/>
+        <p14:creationId xmlns:p14="http://schemas.microsoft.com/office/powerpoint/2010/main" xmlns="" val="802076649"/>
       </p:ext>
     </p:extLst>
   </p:cSld>
@@ -1801,7 +1801,7 @@
     </p:spTree>
     <p:extLst>
       <p:ext uri="{BB962C8B-B14F-4D97-AF65-F5344CB8AC3E}">
-        <p14:creationId xmlns:p14="http://schemas.microsoft.com/office/powerpoint/2010/main" xmlns="" val="1629754142"/>
+        <p14:creationId xmlns="" xmlns:p14="http://schemas.microsoft.com/office/powerpoint/2010/main" val="1629754142"/>
       </p:ext>
     </p:extLst>
   </p:cSld>
@@ -2126,7 +2126,7 @@
     </p:spTree>
     <p:extLst>
       <p:ext uri="{BB962C8B-B14F-4D97-AF65-F5344CB8AC3E}">
-        <p14:creationId xmlns:p14="http://schemas.microsoft.com/office/powerpoint/2010/main" xmlns="" val="517533983"/>
+        <p14:creationId xmlns="" xmlns:p14="http://schemas.microsoft.com/office/powerpoint/2010/main" val="517533983"/>
       </p:ext>
     </p:extLst>
   </p:cSld>
@@ -2251,7 +2251,7 @@
     </p:spTree>
     <p:extLst>
       <p:ext uri="{BB962C8B-B14F-4D97-AF65-F5344CB8AC3E}">
-        <p14:creationId xmlns:p14="http://schemas.microsoft.com/office/powerpoint/2010/main" xmlns="" val="3931682397"/>
+        <p14:creationId xmlns="" xmlns:p14="http://schemas.microsoft.com/office/powerpoint/2010/main" val="3931682397"/>
       </p:ext>
     </p:extLst>
   </p:cSld>
@@ -2376,7 +2376,7 @@
     </p:spTree>
     <p:extLst>
       <p:ext uri="{BB962C8B-B14F-4D97-AF65-F5344CB8AC3E}">
-        <p14:creationId xmlns:p14="http://schemas.microsoft.com/office/powerpoint/2010/main" xmlns="" val="3931682397"/>
+        <p14:creationId xmlns="" xmlns:p14="http://schemas.microsoft.com/office/powerpoint/2010/main" val="3931682397"/>
       </p:ext>
     </p:extLst>
   </p:cSld>
@@ -2743,7 +2743,7 @@
     </p:spTree>
     <p:extLst>
       <p:ext uri="{BB962C8B-B14F-4D97-AF65-F5344CB8AC3E}">
-        <p14:creationId xmlns:p14="http://schemas.microsoft.com/office/powerpoint/2010/main" xmlns="" val="1616458392"/>
+        <p14:creationId xmlns="" xmlns:p14="http://schemas.microsoft.com/office/powerpoint/2010/main" val="1616458392"/>
       </p:ext>
     </p:extLst>
   </p:cSld>
@@ -2828,7 +2828,7 @@
     </p:spTree>
     <p:extLst>
       <p:ext uri="{BB962C8B-B14F-4D97-AF65-F5344CB8AC3E}">
-        <p14:creationId xmlns:p14="http://schemas.microsoft.com/office/powerpoint/2010/main" xmlns="" val="2116472317"/>
+        <p14:creationId xmlns="" xmlns:p14="http://schemas.microsoft.com/office/powerpoint/2010/main" val="2116472317"/>
       </p:ext>
     </p:extLst>
   </p:cSld>
@@ -2921,7 +2921,7 @@
     </p:spTree>
     <p:extLst>
       <p:ext uri="{BB962C8B-B14F-4D97-AF65-F5344CB8AC3E}">
-        <p14:creationId xmlns:p14="http://schemas.microsoft.com/office/powerpoint/2010/main" xmlns="" val="2934279750"/>
+        <p14:creationId xmlns="" xmlns:p14="http://schemas.microsoft.com/office/powerpoint/2010/main" val="2934279750"/>
       </p:ext>
     </p:extLst>
   </p:cSld>
@@ -3018,7 +3018,7 @@
     </p:spTree>
     <p:extLst>
       <p:ext uri="{BB962C8B-B14F-4D97-AF65-F5344CB8AC3E}">
-        <p14:creationId xmlns:p14="http://schemas.microsoft.com/office/powerpoint/2010/main" xmlns="" val="2934279750"/>
+        <p14:creationId xmlns="" xmlns:p14="http://schemas.microsoft.com/office/powerpoint/2010/main" val="2934279750"/>
       </p:ext>
     </p:extLst>
   </p:cSld>
@@ -3103,7 +3103,7 @@
     </p:spTree>
     <p:extLst>
       <p:ext uri="{BB962C8B-B14F-4D97-AF65-F5344CB8AC3E}">
-        <p14:creationId xmlns:p14="http://schemas.microsoft.com/office/powerpoint/2010/main" xmlns="" val="2934279750"/>
+        <p14:creationId xmlns="" xmlns:p14="http://schemas.microsoft.com/office/powerpoint/2010/main" val="2934279750"/>
       </p:ext>
     </p:extLst>
   </p:cSld>
@@ -3513,7 +3513,7 @@
     </p:spTree>
     <p:extLst>
       <p:ext uri="{BB962C8B-B14F-4D97-AF65-F5344CB8AC3E}">
-        <p14:creationId xmlns:p14="http://schemas.microsoft.com/office/powerpoint/2010/main" xmlns="" val="2934279750"/>
+        <p14:creationId xmlns="" xmlns:p14="http://schemas.microsoft.com/office/powerpoint/2010/main" val="2934279750"/>
       </p:ext>
     </p:extLst>
   </p:cSld>
@@ -3598,7 +3598,7 @@
     </p:spTree>
     <p:extLst>
       <p:ext uri="{BB962C8B-B14F-4D97-AF65-F5344CB8AC3E}">
-        <p14:creationId xmlns:p14="http://schemas.microsoft.com/office/powerpoint/2010/main" xmlns="" val="3860513045"/>
+        <p14:creationId xmlns="" xmlns:p14="http://schemas.microsoft.com/office/powerpoint/2010/main" val="3860513045"/>
       </p:ext>
     </p:extLst>
   </p:cSld>
@@ -3695,7 +3695,7 @@
     </p:spTree>
     <p:extLst>
       <p:ext uri="{BB962C8B-B14F-4D97-AF65-F5344CB8AC3E}">
-        <p14:creationId xmlns:p14="http://schemas.microsoft.com/office/powerpoint/2010/main" xmlns="" val="2934279750"/>
+        <p14:creationId xmlns="" xmlns:p14="http://schemas.microsoft.com/office/powerpoint/2010/main" val="2934279750"/>
       </p:ext>
     </p:extLst>
   </p:cSld>
@@ -3792,7 +3792,7 @@
     </p:spTree>
     <p:extLst>
       <p:ext uri="{BB962C8B-B14F-4D97-AF65-F5344CB8AC3E}">
-        <p14:creationId xmlns:p14="http://schemas.microsoft.com/office/powerpoint/2010/main" xmlns="" val="2934279750"/>
+        <p14:creationId xmlns="" xmlns:p14="http://schemas.microsoft.com/office/powerpoint/2010/main" val="2934279750"/>
       </p:ext>
     </p:extLst>
   </p:cSld>
@@ -8065,7 +8065,7 @@
           <a:blip r:embed="rId13" cstate="print">
             <a:extLst>
               <a:ext uri="{28A0092B-C50C-407E-A947-70E740481C1C}">
-                <a14:useLocalDpi xmlns:a14="http://schemas.microsoft.com/office/drawing/2010/main" xmlns="" val="0"/>
+                <a14:useLocalDpi xmlns="" xmlns:a14="http://schemas.microsoft.com/office/drawing/2010/main" val="0"/>
               </a:ext>
             </a:extLst>
           </a:blip>
@@ -8566,7 +8566,7 @@
           <a:blip r:embed="rId3" cstate="print">
             <a:extLst>
               <a:ext uri="{28A0092B-C50C-407E-A947-70E740481C1C}">
-                <a14:useLocalDpi xmlns:a14="http://schemas.microsoft.com/office/drawing/2010/main" xmlns="" val="0"/>
+                <a14:useLocalDpi xmlns="" xmlns:a14="http://schemas.microsoft.com/office/drawing/2010/main" val="0"/>
               </a:ext>
             </a:extLst>
           </a:blip>
@@ -8596,7 +8596,7 @@
           <a:blip r:embed="rId4" cstate="print">
             <a:extLst>
               <a:ext uri="{28A0092B-C50C-407E-A947-70E740481C1C}">
-                <a14:useLocalDpi xmlns:a14="http://schemas.microsoft.com/office/drawing/2010/main" xmlns="" val="0"/>
+                <a14:useLocalDpi xmlns="" xmlns:a14="http://schemas.microsoft.com/office/drawing/2010/main" val="0"/>
               </a:ext>
             </a:extLst>
           </a:blip>
@@ -10627,7 +10627,7 @@
     </p:spTree>
     <p:extLst>
       <p:ext uri="{BB962C8B-B14F-4D97-AF65-F5344CB8AC3E}">
-        <p14:creationId xmlns:p14="http://schemas.microsoft.com/office/powerpoint/2010/main" xmlns="" val="351671181"/>
+        <p14:creationId xmlns="" xmlns:p14="http://schemas.microsoft.com/office/powerpoint/2010/main" val="351671181"/>
       </p:ext>
     </p:extLst>
   </p:cSld>
@@ -10877,7 +10877,7 @@
     </p:spTree>
     <p:extLst>
       <p:ext uri="{BB962C8B-B14F-4D97-AF65-F5344CB8AC3E}">
-        <p14:creationId xmlns:p14="http://schemas.microsoft.com/office/powerpoint/2010/main" xmlns="" val="351671181"/>
+        <p14:creationId xmlns="" xmlns:p14="http://schemas.microsoft.com/office/powerpoint/2010/main" val="351671181"/>
       </p:ext>
     </p:extLst>
   </p:cSld>
@@ -11156,7 +11156,7 @@
     </p:spTree>
     <p:extLst>
       <p:ext uri="{BB962C8B-B14F-4D97-AF65-F5344CB8AC3E}">
-        <p14:creationId xmlns:p14="http://schemas.microsoft.com/office/powerpoint/2010/main" xmlns="" val="3616670450"/>
+        <p14:creationId xmlns="" xmlns:p14="http://schemas.microsoft.com/office/powerpoint/2010/main" val="3616670450"/>
       </p:ext>
     </p:extLst>
   </p:cSld>
@@ -11406,7 +11406,7 @@
     </p:spTree>
     <p:extLst>
       <p:ext uri="{BB962C8B-B14F-4D97-AF65-F5344CB8AC3E}">
-        <p14:creationId xmlns:p14="http://schemas.microsoft.com/office/powerpoint/2010/main" xmlns="" val="351671181"/>
+        <p14:creationId xmlns="" xmlns:p14="http://schemas.microsoft.com/office/powerpoint/2010/main" val="351671181"/>
       </p:ext>
     </p:extLst>
   </p:cSld>
@@ -11573,7 +11573,7 @@
     </p:spTree>
     <p:extLst>
       <p:ext uri="{BB962C8B-B14F-4D97-AF65-F5344CB8AC3E}">
-        <p14:creationId xmlns:p14="http://schemas.microsoft.com/office/powerpoint/2010/main" xmlns="" val="141785747"/>
+        <p14:creationId xmlns="" xmlns:p14="http://schemas.microsoft.com/office/powerpoint/2010/main" val="141785747"/>
       </p:ext>
     </p:extLst>
   </p:cSld>
@@ -11908,7 +11908,7 @@
     </p:spTree>
     <p:extLst>
       <p:ext uri="{BB962C8B-B14F-4D97-AF65-F5344CB8AC3E}">
-        <p14:creationId xmlns:p14="http://schemas.microsoft.com/office/powerpoint/2010/main" xmlns="" val="2634211947"/>
+        <p14:creationId xmlns="" xmlns:p14="http://schemas.microsoft.com/office/powerpoint/2010/main" val="2634211947"/>
       </p:ext>
     </p:extLst>
   </p:cSld>
@@ -12079,7 +12079,7 @@
     </p:spTree>
     <p:extLst>
       <p:ext uri="{BB962C8B-B14F-4D97-AF65-F5344CB8AC3E}">
-        <p14:creationId xmlns:p14="http://schemas.microsoft.com/office/powerpoint/2010/main" xmlns="" val="3243626544"/>
+        <p14:creationId xmlns="" xmlns:p14="http://schemas.microsoft.com/office/powerpoint/2010/main" val="3243626544"/>
       </p:ext>
     </p:extLst>
   </p:cSld>
@@ -13033,7 +13033,7 @@
     </p:spTree>
     <p:extLst>
       <p:ext uri="{BB962C8B-B14F-4D97-AF65-F5344CB8AC3E}">
-        <p14:creationId xmlns="" xmlns:p14="http://schemas.microsoft.com/office/powerpoint/2010/main" val="3243626544"/>
+        <p14:creationId xmlns:p14="http://schemas.microsoft.com/office/powerpoint/2010/main" xmlns="" val="3243626544"/>
       </p:ext>
     </p:extLst>
   </p:cSld>
@@ -14327,7 +14327,7 @@
       </p:sp>
       <p:pic>
         <p:nvPicPr>
-          <p:cNvPr id="46" name="Grafik 45" descr="Event.png"/>
+          <p:cNvPr id="47" name="Grafik 46" descr="Benutzer.png"/>
           <p:cNvPicPr>
             <a:picLocks noChangeAspect="1"/>
           </p:cNvPicPr>
@@ -14335,30 +14335,6 @@
         </p:nvPicPr>
         <p:blipFill>
           <a:blip r:embed="rId8" cstate="print"/>
-          <a:stretch>
-            <a:fillRect/>
-          </a:stretch>
-        </p:blipFill>
-        <p:spPr>
-          <a:xfrm>
-            <a:off x="1475656" y="1628800"/>
-            <a:ext cx="1486108" cy="3267531"/>
-          </a:xfrm>
-          <a:prstGeom prst="rect">
-            <a:avLst/>
-          </a:prstGeom>
-        </p:spPr>
-      </p:pic>
-      <p:pic>
-        <p:nvPicPr>
-          <p:cNvPr id="47" name="Grafik 46" descr="Benutzer.png"/>
-          <p:cNvPicPr>
-            <a:picLocks noChangeAspect="1"/>
-          </p:cNvPicPr>
-          <p:nvPr/>
-        </p:nvPicPr>
-        <p:blipFill>
-          <a:blip r:embed="rId9" cstate="print"/>
           <a:stretch>
             <a:fillRect/>
           </a:stretch>
@@ -14615,10 +14591,34 @@
           </p:style>
         </p:cxnSp>
       </p:grpSp>
+      <p:pic>
+        <p:nvPicPr>
+          <p:cNvPr id="40" name="Grafik 39" descr="Event.png"/>
+          <p:cNvPicPr>
+            <a:picLocks noChangeAspect="1"/>
+          </p:cNvPicPr>
+          <p:nvPr/>
+        </p:nvPicPr>
+        <p:blipFill>
+          <a:blip r:embed="rId9" cstate="print"/>
+          <a:stretch>
+            <a:fillRect/>
+          </a:stretch>
+        </p:blipFill>
+        <p:spPr>
+          <a:xfrm>
+            <a:off x="1475656" y="1628800"/>
+            <a:ext cx="1486108" cy="3115110"/>
+          </a:xfrm>
+          <a:prstGeom prst="rect">
+            <a:avLst/>
+          </a:prstGeom>
+        </p:spPr>
+      </p:pic>
     </p:spTree>
     <p:extLst>
       <p:ext uri="{BB962C8B-B14F-4D97-AF65-F5344CB8AC3E}">
-        <p14:creationId xmlns="" xmlns:p14="http://schemas.microsoft.com/office/powerpoint/2010/main" val="3243626544"/>
+        <p14:creationId xmlns:p14="http://schemas.microsoft.com/office/powerpoint/2010/main" xmlns="" val="3243626544"/>
       </p:ext>
     </p:extLst>
   </p:cSld>
@@ -14675,6 +14675,41 @@
                                         <p:strVal val="visible"/>
                                       </p:to>
                                     </p:set>
+                                  </p:childTnLst>
+                                </p:cTn>
+                              </p:par>
+                              <p:par>
+                                <p:cTn id="7" presetID="3" presetClass="entr" presetSubtype="10" fill="hold" nodeType="withEffect">
+                                  <p:stCondLst>
+                                    <p:cond delay="0"/>
+                                  </p:stCondLst>
+                                  <p:childTnLst>
+                                    <p:set>
+                                      <p:cBhvr>
+                                        <p:cTn id="8" dur="1" fill="hold">
+                                          <p:stCondLst>
+                                            <p:cond delay="0"/>
+                                          </p:stCondLst>
+                                        </p:cTn>
+                                        <p:tgtEl>
+                                          <p:spTgt spid="40"/>
+                                        </p:tgtEl>
+                                        <p:attrNameLst>
+                                          <p:attrName>style.visibility</p:attrName>
+                                        </p:attrNameLst>
+                                      </p:cBhvr>
+                                      <p:to>
+                                        <p:strVal val="visible"/>
+                                      </p:to>
+                                    </p:set>
+                                    <p:animEffect transition="in" filter="blinds(horizontal)">
+                                      <p:cBhvr>
+                                        <p:cTn id="9" dur="500"/>
+                                        <p:tgtEl>
+                                          <p:spTgt spid="40"/>
+                                        </p:tgtEl>
+                                      </p:cBhvr>
+                                    </p:animEffect>
                                   </p:childTnLst>
                                 </p:cTn>
                               </p:par>
@@ -15222,7 +15257,7 @@
       </p:sp>
       <p:pic>
         <p:nvPicPr>
-          <p:cNvPr id="46" name="Grafik 45" descr="Event.png"/>
+          <p:cNvPr id="47" name="Grafik 46" descr="Bewertung Teilnehmer.png"/>
           <p:cNvPicPr>
             <a:picLocks noChangeAspect="1"/>
           </p:cNvPicPr>
@@ -15230,30 +15265,6 @@
         </p:nvPicPr>
         <p:blipFill>
           <a:blip r:embed="rId5" cstate="print"/>
-          <a:stretch>
-            <a:fillRect/>
-          </a:stretch>
-        </p:blipFill>
-        <p:spPr>
-          <a:xfrm>
-            <a:off x="1475656" y="1628800"/>
-            <a:ext cx="1486108" cy="3267531"/>
-          </a:xfrm>
-          <a:prstGeom prst="rect">
-            <a:avLst/>
-          </a:prstGeom>
-        </p:spPr>
-      </p:pic>
-      <p:pic>
-        <p:nvPicPr>
-          <p:cNvPr id="47" name="Grafik 46" descr="Bewertung Teilnehmer.png"/>
-          <p:cNvPicPr>
-            <a:picLocks noChangeAspect="1"/>
-          </p:cNvPicPr>
-          <p:nvPr/>
-        </p:nvPicPr>
-        <p:blipFill>
-          <a:blip r:embed="rId6" cstate="print"/>
           <a:stretch>
             <a:fillRect/>
           </a:stretch>
@@ -15277,7 +15288,7 @@
           <p:nvPr/>
         </p:nvPicPr>
         <p:blipFill>
-          <a:blip r:embed="rId7" cstate="print"/>
+          <a:blip r:embed="rId6" cstate="print"/>
           <a:stretch>
             <a:fillRect/>
           </a:stretch>
@@ -15301,7 +15312,7 @@
           <p:nvPr/>
         </p:nvPicPr>
         <p:blipFill>
-          <a:blip r:embed="rId8" cstate="print"/>
+          <a:blip r:embed="rId7" cstate="print"/>
           <a:stretch>
             <a:fillRect/>
           </a:stretch>
@@ -15516,10 +15527,34 @@
           </a:p>
         </p:txBody>
       </p:sp>
+      <p:pic>
+        <p:nvPicPr>
+          <p:cNvPr id="28" name="Grafik 27" descr="Event.png"/>
+          <p:cNvPicPr>
+            <a:picLocks noChangeAspect="1"/>
+          </p:cNvPicPr>
+          <p:nvPr/>
+        </p:nvPicPr>
+        <p:blipFill>
+          <a:blip r:embed="rId8" cstate="print"/>
+          <a:stretch>
+            <a:fillRect/>
+          </a:stretch>
+        </p:blipFill>
+        <p:spPr>
+          <a:xfrm>
+            <a:off x="1475656" y="1628800"/>
+            <a:ext cx="1486108" cy="3115110"/>
+          </a:xfrm>
+          <a:prstGeom prst="rect">
+            <a:avLst/>
+          </a:prstGeom>
+        </p:spPr>
+      </p:pic>
     </p:spTree>
     <p:extLst>
       <p:ext uri="{BB962C8B-B14F-4D97-AF65-F5344CB8AC3E}">
-        <p14:creationId xmlns="" xmlns:p14="http://schemas.microsoft.com/office/powerpoint/2010/main" val="3243626544"/>
+        <p14:creationId xmlns:p14="http://schemas.microsoft.com/office/powerpoint/2010/main" xmlns="" val="3243626544"/>
       </p:ext>
     </p:extLst>
   </p:cSld>
@@ -15576,6 +15611,41 @@
                                         <p:strVal val="visible"/>
                                       </p:to>
                                     </p:set>
+                                  </p:childTnLst>
+                                </p:cTn>
+                              </p:par>
+                              <p:par>
+                                <p:cTn id="7" presetID="3" presetClass="entr" presetSubtype="10" fill="hold" nodeType="withEffect">
+                                  <p:stCondLst>
+                                    <p:cond delay="0"/>
+                                  </p:stCondLst>
+                                  <p:childTnLst>
+                                    <p:set>
+                                      <p:cBhvr>
+                                        <p:cTn id="8" dur="1" fill="hold">
+                                          <p:stCondLst>
+                                            <p:cond delay="0"/>
+                                          </p:stCondLst>
+                                        </p:cTn>
+                                        <p:tgtEl>
+                                          <p:spTgt spid="28"/>
+                                        </p:tgtEl>
+                                        <p:attrNameLst>
+                                          <p:attrName>style.visibility</p:attrName>
+                                        </p:attrNameLst>
+                                      </p:cBhvr>
+                                      <p:to>
+                                        <p:strVal val="visible"/>
+                                      </p:to>
+                                    </p:set>
+                                    <p:animEffect transition="in" filter="blinds(horizontal)">
+                                      <p:cBhvr>
+                                        <p:cTn id="9" dur="500"/>
+                                        <p:tgtEl>
+                                          <p:spTgt spid="28"/>
+                                        </p:tgtEl>
+                                      </p:cBhvr>
+                                    </p:animEffect>
                                   </p:childTnLst>
                                 </p:cTn>
                               </p:par>
@@ -15932,7 +16002,7 @@
     </p:spTree>
     <p:extLst>
       <p:ext uri="{BB962C8B-B14F-4D97-AF65-F5344CB8AC3E}">
-        <p14:creationId xmlns:p14="http://schemas.microsoft.com/office/powerpoint/2010/main" xmlns="" val="351671181"/>
+        <p14:creationId xmlns="" xmlns:p14="http://schemas.microsoft.com/office/powerpoint/2010/main" val="351671181"/>
       </p:ext>
     </p:extLst>
   </p:cSld>
@@ -16084,7 +16154,7 @@
     </p:spTree>
     <p:extLst>
       <p:ext uri="{BB962C8B-B14F-4D97-AF65-F5344CB8AC3E}">
-        <p14:creationId xmlns:p14="http://schemas.microsoft.com/office/powerpoint/2010/main" xmlns="" val="3309636493"/>
+        <p14:creationId xmlns="" xmlns:p14="http://schemas.microsoft.com/office/powerpoint/2010/main" val="3309636493"/>
       </p:ext>
     </p:extLst>
   </p:cSld>
@@ -16303,7 +16373,7 @@
     </p:spTree>
     <p:extLst>
       <p:ext uri="{BB962C8B-B14F-4D97-AF65-F5344CB8AC3E}">
-        <p14:creationId xmlns:p14="http://schemas.microsoft.com/office/powerpoint/2010/main" xmlns="" val="1012322072"/>
+        <p14:creationId xmlns="" xmlns:p14="http://schemas.microsoft.com/office/powerpoint/2010/main" val="1012322072"/>
       </p:ext>
     </p:extLst>
   </p:cSld>
@@ -16522,7 +16592,7 @@
     </p:spTree>
     <p:extLst>
       <p:ext uri="{BB962C8B-B14F-4D97-AF65-F5344CB8AC3E}">
-        <p14:creationId xmlns:p14="http://schemas.microsoft.com/office/powerpoint/2010/main" xmlns="" val="1012322072"/>
+        <p14:creationId xmlns="" xmlns:p14="http://schemas.microsoft.com/office/powerpoint/2010/main" val="1012322072"/>
       </p:ext>
     </p:extLst>
   </p:cSld>
@@ -16730,7 +16800,7 @@
           <a:blip r:embed="rId2" cstate="print">
             <a:extLst>
               <a:ext uri="{BEBA8EAE-BF5A-486C-A8C5-ECC9F3942E4B}">
-                <a14:imgProps xmlns:a14="http://schemas.microsoft.com/office/drawing/2010/main" xmlns="">
+                <a14:imgProps xmlns="" xmlns:a14="http://schemas.microsoft.com/office/drawing/2010/main">
                   <a14:imgLayer r:embed="rId3">
                     <a14:imgEffect>
                       <a14:backgroundRemoval t="6057" b="22942" l="7000" r="29162"/>
@@ -16739,7 +16809,7 @@
                 </a14:imgProps>
               </a:ext>
               <a:ext uri="{28A0092B-C50C-407E-A947-70E740481C1C}">
-                <a14:useLocalDpi xmlns:a14="http://schemas.microsoft.com/office/drawing/2010/main" xmlns="" val="0"/>
+                <a14:useLocalDpi xmlns="" xmlns:a14="http://schemas.microsoft.com/office/drawing/2010/main" val="0"/>
               </a:ext>
             </a:extLst>
           </a:blip>
@@ -16757,7 +16827,7 @@
           <a:noFill/>
           <a:extLst>
             <a:ext uri="{909E8E84-426E-40DD-AFC4-6F175D3DCCD1}">
-              <a14:hiddenFill xmlns:a14="http://schemas.microsoft.com/office/drawing/2010/main" xmlns="">
+              <a14:hiddenFill xmlns="" xmlns:a14="http://schemas.microsoft.com/office/drawing/2010/main">
                 <a:solidFill>
                   <a:srgbClr val="FFFFFF"/>
                 </a:solidFill>
@@ -16778,7 +16848,7 @@
           <a:blip r:embed="rId2" cstate="print">
             <a:extLst>
               <a:ext uri="{BEBA8EAE-BF5A-486C-A8C5-ECC9F3942E4B}">
-                <a14:imgProps xmlns:a14="http://schemas.microsoft.com/office/drawing/2010/main" xmlns="">
+                <a14:imgProps xmlns="" xmlns:a14="http://schemas.microsoft.com/office/drawing/2010/main">
                   <a14:imgLayer r:embed="rId3">
                     <a14:imgEffect>
                       <a14:backgroundRemoval t="6057" b="22942" l="7000" r="29162"/>
@@ -16787,7 +16857,7 @@
                 </a14:imgProps>
               </a:ext>
               <a:ext uri="{28A0092B-C50C-407E-A947-70E740481C1C}">
-                <a14:useLocalDpi xmlns:a14="http://schemas.microsoft.com/office/drawing/2010/main" xmlns="" val="0"/>
+                <a14:useLocalDpi xmlns="" xmlns:a14="http://schemas.microsoft.com/office/drawing/2010/main" val="0"/>
               </a:ext>
             </a:extLst>
           </a:blip>
@@ -16805,7 +16875,7 @@
           <a:noFill/>
           <a:extLst>
             <a:ext uri="{909E8E84-426E-40DD-AFC4-6F175D3DCCD1}">
-              <a14:hiddenFill xmlns:a14="http://schemas.microsoft.com/office/drawing/2010/main" xmlns="">
+              <a14:hiddenFill xmlns="" xmlns:a14="http://schemas.microsoft.com/office/drawing/2010/main">
                 <a:solidFill>
                   <a:srgbClr val="FFFFFF"/>
                 </a:solidFill>
@@ -16863,7 +16933,7 @@
     </p:spTree>
     <p:extLst>
       <p:ext uri="{BB962C8B-B14F-4D97-AF65-F5344CB8AC3E}">
-        <p14:creationId xmlns:p14="http://schemas.microsoft.com/office/powerpoint/2010/main" xmlns="" val="2645794681"/>
+        <p14:creationId xmlns="" xmlns:p14="http://schemas.microsoft.com/office/powerpoint/2010/main" val="2645794681"/>
       </p:ext>
     </p:extLst>
   </p:cSld>
@@ -17102,7 +17172,7 @@
           <a:blip r:embed="rId3" cstate="print">
             <a:extLst>
               <a:ext uri="{28A0092B-C50C-407E-A947-70E740481C1C}">
-                <a14:useLocalDpi xmlns:a14="http://schemas.microsoft.com/office/drawing/2010/main" xmlns="" val="0"/>
+                <a14:useLocalDpi xmlns="" xmlns:a14="http://schemas.microsoft.com/office/drawing/2010/main" val="0"/>
               </a:ext>
             </a:extLst>
           </a:blip>
@@ -17134,7 +17204,7 @@
           </a:effectLst>
           <a:extLst>
             <a:ext uri="{91240B29-F687-4F45-9708-019B960494DF}">
-              <a14:hiddenLine xmlns:a14="http://schemas.microsoft.com/office/drawing/2010/main" xmlns="" w="9525">
+              <a14:hiddenLine xmlns="" xmlns:a14="http://schemas.microsoft.com/office/drawing/2010/main" w="9525">
                 <a:solidFill>
                   <a:schemeClr val="tx1"/>
                 </a:solidFill>
@@ -17149,7 +17219,7 @@
     </p:spTree>
     <p:extLst>
       <p:ext uri="{BB962C8B-B14F-4D97-AF65-F5344CB8AC3E}">
-        <p14:creationId xmlns:p14="http://schemas.microsoft.com/office/powerpoint/2010/main" xmlns="" val="313312729"/>
+        <p14:creationId xmlns="" xmlns:p14="http://schemas.microsoft.com/office/powerpoint/2010/main" val="313312729"/>
       </p:ext>
     </p:extLst>
   </p:cSld>
@@ -17372,7 +17442,7 @@
     </p:spTree>
     <p:extLst>
       <p:ext uri="{BB962C8B-B14F-4D97-AF65-F5344CB8AC3E}">
-        <p14:creationId xmlns:p14="http://schemas.microsoft.com/office/powerpoint/2010/main" xmlns="" val="1344880779"/>
+        <p14:creationId xmlns="" xmlns:p14="http://schemas.microsoft.com/office/powerpoint/2010/main" val="1344880779"/>
       </p:ext>
     </p:extLst>
   </p:cSld>
@@ -17475,7 +17545,7 @@
           <a:blip r:embed="rId3" cstate="print">
             <a:extLst>
               <a:ext uri="{28A0092B-C50C-407E-A947-70E740481C1C}">
-                <a14:useLocalDpi xmlns:a14="http://schemas.microsoft.com/office/drawing/2010/main" xmlns="" val="0"/>
+                <a14:useLocalDpi xmlns="" xmlns:a14="http://schemas.microsoft.com/office/drawing/2010/main" val="0"/>
               </a:ext>
             </a:extLst>
           </a:blip>
@@ -17505,7 +17575,7 @@
           <a:blip r:embed="rId4" cstate="print">
             <a:extLst>
               <a:ext uri="{28A0092B-C50C-407E-A947-70E740481C1C}">
-                <a14:useLocalDpi xmlns:a14="http://schemas.microsoft.com/office/drawing/2010/main" xmlns="" val="0"/>
+                <a14:useLocalDpi xmlns="" xmlns:a14="http://schemas.microsoft.com/office/drawing/2010/main" val="0"/>
               </a:ext>
             </a:extLst>
           </a:blip>
@@ -17526,7 +17596,7 @@
     </p:spTree>
     <p:extLst>
       <p:ext uri="{BB962C8B-B14F-4D97-AF65-F5344CB8AC3E}">
-        <p14:creationId xmlns:p14="http://schemas.microsoft.com/office/powerpoint/2010/main" xmlns="" val="2565098391"/>
+        <p14:creationId xmlns="" xmlns:p14="http://schemas.microsoft.com/office/powerpoint/2010/main" val="2565098391"/>
       </p:ext>
     </p:extLst>
   </p:cSld>
@@ -17777,7 +17847,7 @@
     </p:spTree>
     <p:extLst>
       <p:ext uri="{BB962C8B-B14F-4D97-AF65-F5344CB8AC3E}">
-        <p14:creationId xmlns:p14="http://schemas.microsoft.com/office/powerpoint/2010/main" xmlns="" val="3661383713"/>
+        <p14:creationId xmlns="" xmlns:p14="http://schemas.microsoft.com/office/powerpoint/2010/main" val="3661383713"/>
       </p:ext>
     </p:extLst>
   </p:cSld>
@@ -18135,7 +18205,7 @@
     </p:spTree>
     <p:extLst>
       <p:ext uri="{BB962C8B-B14F-4D97-AF65-F5344CB8AC3E}">
-        <p14:creationId xmlns:p14="http://schemas.microsoft.com/office/powerpoint/2010/main" xmlns="" val="351671181"/>
+        <p14:creationId xmlns="" xmlns:p14="http://schemas.microsoft.com/office/powerpoint/2010/main" val="351671181"/>
       </p:ext>
     </p:extLst>
   </p:cSld>
@@ -18259,7 +18329,7 @@
           <a:blip r:embed="rId3" cstate="print">
             <a:extLst>
               <a:ext uri="{28A0092B-C50C-407E-A947-70E740481C1C}">
-                <a14:useLocalDpi xmlns:a14="http://schemas.microsoft.com/office/drawing/2010/main" xmlns="" val="0"/>
+                <a14:useLocalDpi xmlns="" xmlns:a14="http://schemas.microsoft.com/office/drawing/2010/main" val="0"/>
               </a:ext>
             </a:extLst>
           </a:blip>
@@ -18314,7 +18384,7 @@
     </p:spTree>
     <p:extLst>
       <p:ext uri="{BB962C8B-B14F-4D97-AF65-F5344CB8AC3E}">
-        <p14:creationId xmlns:p14="http://schemas.microsoft.com/office/powerpoint/2010/main" xmlns="" val="2681693288"/>
+        <p14:creationId xmlns="" xmlns:p14="http://schemas.microsoft.com/office/powerpoint/2010/main" val="2681693288"/>
       </p:ext>
     </p:extLst>
   </p:cSld>
@@ -18516,7 +18586,7 @@
     </p:spTree>
     <p:extLst>
       <p:ext uri="{BB962C8B-B14F-4D97-AF65-F5344CB8AC3E}">
-        <p14:creationId xmlns:p14="http://schemas.microsoft.com/office/powerpoint/2010/main" xmlns="" val="2681693288"/>
+        <p14:creationId xmlns="" xmlns:p14="http://schemas.microsoft.com/office/powerpoint/2010/main" val="2681693288"/>
       </p:ext>
     </p:extLst>
   </p:cSld>
@@ -19016,7 +19086,7 @@
     </p:spTree>
     <p:extLst>
       <p:ext uri="{BB962C8B-B14F-4D97-AF65-F5344CB8AC3E}">
-        <p14:creationId xmlns:p14="http://schemas.microsoft.com/office/powerpoint/2010/main" xmlns="" val="2857272158"/>
+        <p14:creationId xmlns="" xmlns:p14="http://schemas.microsoft.com/office/powerpoint/2010/main" val="2857272158"/>
       </p:ext>
     </p:extLst>
   </p:cSld>
@@ -19099,7 +19169,7 @@
           <a:blip r:embed="rId2" cstate="print">
             <a:extLst>
               <a:ext uri="{28A0092B-C50C-407E-A947-70E740481C1C}">
-                <a14:useLocalDpi xmlns:a14="http://schemas.microsoft.com/office/drawing/2010/main" xmlns="" val="0"/>
+                <a14:useLocalDpi xmlns="" xmlns:a14="http://schemas.microsoft.com/office/drawing/2010/main" val="0"/>
               </a:ext>
             </a:extLst>
           </a:blip>
@@ -19122,14 +19192,14 @@
           <a:effectLst/>
           <a:extLst>
             <a:ext uri="{909E8E84-426E-40DD-AFC4-6F175D3DCCD1}">
-              <a14:hiddenFill xmlns:a14="http://schemas.microsoft.com/office/drawing/2010/main" xmlns="">
+              <a14:hiddenFill xmlns="" xmlns:a14="http://schemas.microsoft.com/office/drawing/2010/main">
                 <a:solidFill>
                   <a:schemeClr val="accent1"/>
                 </a:solidFill>
               </a14:hiddenFill>
             </a:ext>
             <a:ext uri="{91240B29-F687-4F45-9708-019B960494DF}">
-              <a14:hiddenLine xmlns:a14="http://schemas.microsoft.com/office/drawing/2010/main" xmlns="" w="9525">
+              <a14:hiddenLine xmlns="" xmlns:a14="http://schemas.microsoft.com/office/drawing/2010/main" w="9525">
                 <a:solidFill>
                   <a:schemeClr val="tx1"/>
                 </a:solidFill>
@@ -19139,7 +19209,7 @@
               </a14:hiddenLine>
             </a:ext>
             <a:ext uri="{AF507438-7753-43E0-B8FC-AC1667EBCBE1}">
-              <a14:hiddenEffects xmlns:a14="http://schemas.microsoft.com/office/drawing/2010/main" xmlns="">
+              <a14:hiddenEffects xmlns="" xmlns:a14="http://schemas.microsoft.com/office/drawing/2010/main">
                 <a:effectLst>
                   <a:outerShdw dist="35921" dir="2700000" algn="ctr" rotWithShape="0">
                     <a:schemeClr val="bg2"/>
@@ -19424,7 +19494,7 @@
     </p:spTree>
     <p:extLst>
       <p:ext uri="{BB962C8B-B14F-4D97-AF65-F5344CB8AC3E}">
-        <p14:creationId xmlns:p14="http://schemas.microsoft.com/office/powerpoint/2010/main" xmlns="" val="3542583579"/>
+        <p14:creationId xmlns="" xmlns:p14="http://schemas.microsoft.com/office/powerpoint/2010/main" val="3542583579"/>
       </p:ext>
     </p:extLst>
   </p:cSld>
@@ -19777,7 +19847,7 @@
     </p:spTree>
     <p:extLst>
       <p:ext uri="{BB962C8B-B14F-4D97-AF65-F5344CB8AC3E}">
-        <p14:creationId xmlns:p14="http://schemas.microsoft.com/office/powerpoint/2010/main" xmlns="" val="351671181"/>
+        <p14:creationId xmlns="" xmlns:p14="http://schemas.microsoft.com/office/powerpoint/2010/main" val="351671181"/>
       </p:ext>
     </p:extLst>
   </p:cSld>

</xml_diff>

<commit_message>
Bitte nicht wieder die Animationen aus der Präsi löschen
Signed-off-by: Alexander Benölken <a.benoelken@googlemail.com>
</commit_message>
<xml_diff>
--- a/Dokumente/Abschlusspr�si/Abschlusspr�sentation.pptx
+++ b/Dokumente/Abschlusspr�si/Abschlusspr�sentation.pptx
@@ -11,13 +11,13 @@
     <p:sldId id="256" r:id="rId2"/>
     <p:sldId id="259" r:id="rId3"/>
     <p:sldId id="295" r:id="rId4"/>
-    <p:sldId id="308" r:id="rId5"/>
+    <p:sldId id="356" r:id="rId5"/>
     <p:sldId id="304" r:id="rId6"/>
     <p:sldId id="293" r:id="rId7"/>
     <p:sldId id="260" r:id="rId8"/>
     <p:sldId id="349" r:id="rId9"/>
     <p:sldId id="350" r:id="rId10"/>
-    <p:sldId id="326" r:id="rId11"/>
+    <p:sldId id="357" r:id="rId11"/>
     <p:sldId id="351" r:id="rId12"/>
     <p:sldId id="353" r:id="rId13"/>
     <p:sldId id="354" r:id="rId14"/>
@@ -403,7 +403,7 @@
     </p:spTree>
     <p:extLst>
       <p:ext uri="{BB962C8B-B14F-4D97-AF65-F5344CB8AC3E}">
-        <p14:creationId xmlns="" xmlns:p14="http://schemas.microsoft.com/office/powerpoint/2010/main" val="2610097957"/>
+        <p14:creationId xmlns:p14="http://schemas.microsoft.com/office/powerpoint/2010/main" xmlns="" val="2610097957"/>
       </p:ext>
     </p:extLst>
   </p:cSld>
@@ -578,7 +578,7 @@
     </p:spTree>
     <p:extLst>
       <p:ext uri="{BB962C8B-B14F-4D97-AF65-F5344CB8AC3E}">
-        <p14:creationId xmlns="" xmlns:p14="http://schemas.microsoft.com/office/powerpoint/2010/main" val="2116472317"/>
+        <p14:creationId xmlns:p14="http://schemas.microsoft.com/office/powerpoint/2010/main" xmlns="" val="2116472317"/>
       </p:ext>
     </p:extLst>
   </p:cSld>
@@ -671,7 +671,7 @@
     </p:spTree>
     <p:extLst>
       <p:ext uri="{BB962C8B-B14F-4D97-AF65-F5344CB8AC3E}">
-        <p14:creationId xmlns="" xmlns:p14="http://schemas.microsoft.com/office/powerpoint/2010/main" val="2825845930"/>
+        <p14:creationId xmlns:p14="http://schemas.microsoft.com/office/powerpoint/2010/main" xmlns="" val="2825845930"/>
       </p:ext>
     </p:extLst>
   </p:cSld>
@@ -772,7 +772,7 @@
     </p:spTree>
     <p:extLst>
       <p:ext uri="{BB962C8B-B14F-4D97-AF65-F5344CB8AC3E}">
-        <p14:creationId xmlns="" xmlns:p14="http://schemas.microsoft.com/office/powerpoint/2010/main" val="3912581999"/>
+        <p14:creationId xmlns:p14="http://schemas.microsoft.com/office/powerpoint/2010/main" xmlns="" val="3912581999"/>
       </p:ext>
     </p:extLst>
   </p:cSld>
@@ -905,7 +905,7 @@
     </p:spTree>
     <p:extLst>
       <p:ext uri="{BB962C8B-B14F-4D97-AF65-F5344CB8AC3E}">
-        <p14:creationId xmlns="" xmlns:p14="http://schemas.microsoft.com/office/powerpoint/2010/main" val="802076649"/>
+        <p14:creationId xmlns:p14="http://schemas.microsoft.com/office/powerpoint/2010/main" xmlns="" val="802076649"/>
       </p:ext>
     </p:extLst>
   </p:cSld>
@@ -1038,7 +1038,7 @@
     </p:spTree>
     <p:extLst>
       <p:ext uri="{BB962C8B-B14F-4D97-AF65-F5344CB8AC3E}">
-        <p14:creationId xmlns:p14="http://schemas.microsoft.com/office/powerpoint/2010/main" xmlns="" val="802076649"/>
+        <p14:creationId xmlns="" xmlns:p14="http://schemas.microsoft.com/office/powerpoint/2010/main" val="802076649"/>
       </p:ext>
     </p:extLst>
   </p:cSld>
@@ -1171,7 +1171,7 @@
     </p:spTree>
     <p:extLst>
       <p:ext uri="{BB962C8B-B14F-4D97-AF65-F5344CB8AC3E}">
-        <p14:creationId xmlns:p14="http://schemas.microsoft.com/office/powerpoint/2010/main" xmlns="" val="802076649"/>
+        <p14:creationId xmlns="" xmlns:p14="http://schemas.microsoft.com/office/powerpoint/2010/main" val="802076649"/>
       </p:ext>
     </p:extLst>
   </p:cSld>
@@ -1304,7 +1304,7 @@
     </p:spTree>
     <p:extLst>
       <p:ext uri="{BB962C8B-B14F-4D97-AF65-F5344CB8AC3E}">
-        <p14:creationId xmlns:p14="http://schemas.microsoft.com/office/powerpoint/2010/main" xmlns="" val="802076649"/>
+        <p14:creationId xmlns="" xmlns:p14="http://schemas.microsoft.com/office/powerpoint/2010/main" val="802076649"/>
       </p:ext>
     </p:extLst>
   </p:cSld>
@@ -1515,7 +1515,7 @@
     </p:spTree>
     <p:extLst>
       <p:ext uri="{BB962C8B-B14F-4D97-AF65-F5344CB8AC3E}">
-        <p14:creationId xmlns="" xmlns:p14="http://schemas.microsoft.com/office/powerpoint/2010/main" val="1629754142"/>
+        <p14:creationId xmlns:p14="http://schemas.microsoft.com/office/powerpoint/2010/main" xmlns="" val="1629754142"/>
       </p:ext>
     </p:extLst>
   </p:cSld>
@@ -1640,7 +1640,7 @@
     </p:spTree>
     <p:extLst>
       <p:ext uri="{BB962C8B-B14F-4D97-AF65-F5344CB8AC3E}">
-        <p14:creationId xmlns="" xmlns:p14="http://schemas.microsoft.com/office/powerpoint/2010/main" val="3931682397"/>
+        <p14:creationId xmlns:p14="http://schemas.microsoft.com/office/powerpoint/2010/main" xmlns="" val="3931682397"/>
       </p:ext>
     </p:extLst>
   </p:cSld>
@@ -1765,7 +1765,7 @@
     </p:spTree>
     <p:extLst>
       <p:ext uri="{BB962C8B-B14F-4D97-AF65-F5344CB8AC3E}">
-        <p14:creationId xmlns="" xmlns:p14="http://schemas.microsoft.com/office/powerpoint/2010/main" val="3931682397"/>
+        <p14:creationId xmlns:p14="http://schemas.microsoft.com/office/powerpoint/2010/main" xmlns="" val="3931682397"/>
       </p:ext>
     </p:extLst>
   </p:cSld>
@@ -2172,7 +2172,7 @@
     </p:spTree>
     <p:extLst>
       <p:ext uri="{BB962C8B-B14F-4D97-AF65-F5344CB8AC3E}">
-        <p14:creationId xmlns="" xmlns:p14="http://schemas.microsoft.com/office/powerpoint/2010/main" val="517533983"/>
+        <p14:creationId xmlns:p14="http://schemas.microsoft.com/office/powerpoint/2010/main" xmlns="" val="517533983"/>
       </p:ext>
     </p:extLst>
   </p:cSld>
@@ -2449,7 +2449,7 @@
     </p:spTree>
     <p:extLst>
       <p:ext uri="{BB962C8B-B14F-4D97-AF65-F5344CB8AC3E}">
-        <p14:creationId xmlns="" xmlns:p14="http://schemas.microsoft.com/office/powerpoint/2010/main" val="1616458392"/>
+        <p14:creationId xmlns:p14="http://schemas.microsoft.com/office/powerpoint/2010/main" xmlns="" val="1616458392"/>
       </p:ext>
     </p:extLst>
   </p:cSld>
@@ -2534,7 +2534,7 @@
     </p:spTree>
     <p:extLst>
       <p:ext uri="{BB962C8B-B14F-4D97-AF65-F5344CB8AC3E}">
-        <p14:creationId xmlns="" xmlns:p14="http://schemas.microsoft.com/office/powerpoint/2010/main" val="2116472317"/>
+        <p14:creationId xmlns:p14="http://schemas.microsoft.com/office/powerpoint/2010/main" xmlns="" val="2116472317"/>
       </p:ext>
     </p:extLst>
   </p:cSld>
@@ -2627,7 +2627,7 @@
     </p:spTree>
     <p:extLst>
       <p:ext uri="{BB962C8B-B14F-4D97-AF65-F5344CB8AC3E}">
-        <p14:creationId xmlns="" xmlns:p14="http://schemas.microsoft.com/office/powerpoint/2010/main" val="2934279750"/>
+        <p14:creationId xmlns:p14="http://schemas.microsoft.com/office/powerpoint/2010/main" xmlns="" val="2934279750"/>
       </p:ext>
     </p:extLst>
   </p:cSld>
@@ -2809,7 +2809,7 @@
     </p:spTree>
     <p:extLst>
       <p:ext uri="{BB962C8B-B14F-4D97-AF65-F5344CB8AC3E}">
-        <p14:creationId xmlns="" xmlns:p14="http://schemas.microsoft.com/office/powerpoint/2010/main" val="2934279750"/>
+        <p14:creationId xmlns:p14="http://schemas.microsoft.com/office/powerpoint/2010/main" xmlns="" val="2934279750"/>
       </p:ext>
     </p:extLst>
   </p:cSld>
@@ -3219,7 +3219,7 @@
     </p:spTree>
     <p:extLst>
       <p:ext uri="{BB962C8B-B14F-4D97-AF65-F5344CB8AC3E}">
-        <p14:creationId xmlns="" xmlns:p14="http://schemas.microsoft.com/office/powerpoint/2010/main" val="2934279750"/>
+        <p14:creationId xmlns:p14="http://schemas.microsoft.com/office/powerpoint/2010/main" xmlns="" val="2934279750"/>
       </p:ext>
     </p:extLst>
   </p:cSld>
@@ -3304,7 +3304,7 @@
     </p:spTree>
     <p:extLst>
       <p:ext uri="{BB962C8B-B14F-4D97-AF65-F5344CB8AC3E}">
-        <p14:creationId xmlns="" xmlns:p14="http://schemas.microsoft.com/office/powerpoint/2010/main" val="3860513045"/>
+        <p14:creationId xmlns:p14="http://schemas.microsoft.com/office/powerpoint/2010/main" xmlns="" val="3860513045"/>
       </p:ext>
     </p:extLst>
   </p:cSld>
@@ -3490,7 +3490,7 @@
     </p:spTree>
     <p:extLst>
       <p:ext uri="{BB962C8B-B14F-4D97-AF65-F5344CB8AC3E}">
-        <p14:creationId xmlns="" xmlns:p14="http://schemas.microsoft.com/office/powerpoint/2010/main" val="135288531"/>
+        <p14:creationId xmlns:p14="http://schemas.microsoft.com/office/powerpoint/2010/main" xmlns="" val="135288531"/>
       </p:ext>
     </p:extLst>
   </p:cSld>
@@ -7763,7 +7763,7 @@
           <a:blip r:embed="rId13" cstate="print">
             <a:extLst>
               <a:ext uri="{28A0092B-C50C-407E-A947-70E740481C1C}">
-                <a14:useLocalDpi xmlns="" xmlns:a14="http://schemas.microsoft.com/office/drawing/2010/main" val="0"/>
+                <a14:useLocalDpi xmlns:a14="http://schemas.microsoft.com/office/drawing/2010/main" xmlns="" val="0"/>
               </a:ext>
             </a:extLst>
           </a:blip>
@@ -8264,7 +8264,7 @@
           <a:blip r:embed="rId3" cstate="print">
             <a:extLst>
               <a:ext uri="{28A0092B-C50C-407E-A947-70E740481C1C}">
-                <a14:useLocalDpi xmlns="" xmlns:a14="http://schemas.microsoft.com/office/drawing/2010/main" val="0"/>
+                <a14:useLocalDpi xmlns:a14="http://schemas.microsoft.com/office/drawing/2010/main" xmlns="" val="0"/>
               </a:ext>
             </a:extLst>
           </a:blip>
@@ -8294,7 +8294,7 @@
           <a:blip r:embed="rId4" cstate="print">
             <a:extLst>
               <a:ext uri="{28A0092B-C50C-407E-A947-70E740481C1C}">
-                <a14:useLocalDpi xmlns="" xmlns:a14="http://schemas.microsoft.com/office/drawing/2010/main" val="0"/>
+                <a14:useLocalDpi xmlns:a14="http://schemas.microsoft.com/office/drawing/2010/main" xmlns="" val="0"/>
               </a:ext>
             </a:extLst>
           </a:blip>
@@ -8349,7 +8349,33 @@
       </p:grpSpPr>
       <p:pic>
         <p:nvPicPr>
-          <p:cNvPr id="13" name="Picture 3" descr="C:\Users\Alexander\Desktop\Anwendungsfalldiagramm Benutzer und Eventfunktionen.png"/>
+          <p:cNvPr id="16" name="Picture 3" descr="C:\Users\Alexander\Desktop\Anwendungsfalldiagramm Benutzer und Eventfunktionen.png"/>
+          <p:cNvPicPr>
+            <a:picLocks noChangeAspect="1" noChangeArrowheads="1"/>
+          </p:cNvPicPr>
+          <p:nvPr/>
+        </p:nvPicPr>
+        <p:blipFill>
+          <a:blip r:embed="rId3" cstate="print"/>
+          <a:srcRect/>
+          <a:stretch>
+            <a:fillRect/>
+          </a:stretch>
+        </p:blipFill>
+        <p:spPr bwMode="auto">
+          <a:xfrm>
+            <a:off x="1475656" y="1453751"/>
+            <a:ext cx="5400000" cy="5071593"/>
+          </a:xfrm>
+          <a:prstGeom prst="rect">
+            <a:avLst/>
+          </a:prstGeom>
+          <a:noFill/>
+        </p:spPr>
+      </p:pic>
+      <p:pic>
+        <p:nvPicPr>
+          <p:cNvPr id="1027" name="Picture 3" descr="C:\Users\Alexander\Desktop\Anwendungsfalldiagramm Benutzer und Eventfunktionen.png"/>
           <p:cNvPicPr>
             <a:picLocks noChangeAspect="1" noChangeArrowheads="1"/>
           </p:cNvPicPr>
@@ -8373,6 +8399,132 @@
           <a:noFill/>
         </p:spPr>
       </p:pic>
+      <p:pic>
+        <p:nvPicPr>
+          <p:cNvPr id="2050" name="Picture 2" descr="C:\Users\Alexander\Desktop\Anwendungsfalldiagramm Benutzer und Eventfunktionen.png"/>
+          <p:cNvPicPr>
+            <a:picLocks noChangeAspect="1" noChangeArrowheads="1"/>
+          </p:cNvPicPr>
+          <p:nvPr/>
+        </p:nvPicPr>
+        <p:blipFill>
+          <a:blip r:embed="rId3" cstate="print"/>
+          <a:srcRect l="37173" t="41284" b="9873"/>
+          <a:stretch>
+            <a:fillRect/>
+          </a:stretch>
+        </p:blipFill>
+        <p:spPr bwMode="auto">
+          <a:xfrm>
+            <a:off x="1979712" y="2420888"/>
+            <a:ext cx="1577914" cy="1152128"/>
+          </a:xfrm>
+          <a:prstGeom prst="rect">
+            <a:avLst/>
+          </a:prstGeom>
+          <a:noFill/>
+          <a:ln w="25400">
+            <a:solidFill>
+              <a:schemeClr val="accent6"/>
+            </a:solidFill>
+          </a:ln>
+        </p:spPr>
+      </p:pic>
+      <p:sp>
+        <p:nvSpPr>
+          <p:cNvPr id="2" name="Titel 1"/>
+          <p:cNvSpPr>
+            <a:spLocks noGrp="1"/>
+          </p:cNvSpPr>
+          <p:nvPr>
+            <p:ph type="title"/>
+          </p:nvPr>
+        </p:nvSpPr>
+        <p:spPr/>
+        <p:txBody>
+          <a:bodyPr>
+            <a:normAutofit fontScale="90000"/>
+          </a:bodyPr>
+          <a:lstStyle/>
+          <a:p>
+            <a:r>
+              <a:rPr lang="de-DE" dirty="0" smtClean="0"/>
+              <a:t>Funktionale Anforderungen Anwendungsfalldiagramm</a:t>
+            </a:r>
+            <a:endParaRPr lang="de-DE" dirty="0"/>
+          </a:p>
+        </p:txBody>
+      </p:sp>
+      <p:sp>
+        <p:nvSpPr>
+          <p:cNvPr id="4" name="Datumsplatzhalter 3"/>
+          <p:cNvSpPr>
+            <a:spLocks noGrp="1"/>
+          </p:cNvSpPr>
+          <p:nvPr>
+            <p:ph type="dt" sz="half" idx="10"/>
+          </p:nvPr>
+        </p:nvSpPr>
+        <p:spPr/>
+        <p:txBody>
+          <a:bodyPr/>
+          <a:lstStyle/>
+          <a:p>
+            <a:r>
+              <a:rPr lang="de-DE" smtClean="0"/>
+              <a:t>21.04.2012</a:t>
+            </a:r>
+            <a:endParaRPr lang="en-US"/>
+          </a:p>
+        </p:txBody>
+      </p:sp>
+      <p:sp>
+        <p:nvSpPr>
+          <p:cNvPr id="5" name="Fußzeilenplatzhalter 4"/>
+          <p:cNvSpPr>
+            <a:spLocks noGrp="1"/>
+          </p:cNvSpPr>
+          <p:nvPr>
+            <p:ph type="ftr" sz="quarter" idx="11"/>
+          </p:nvPr>
+        </p:nvSpPr>
+        <p:spPr/>
+        <p:txBody>
+          <a:bodyPr/>
+          <a:lstStyle/>
+          <a:p>
+            <a:r>
+              <a:rPr lang="de-DE" smtClean="0"/>
+              <a:t>FST Projekt "Eventalizer" (SS 2012) Team 5</a:t>
+            </a:r>
+            <a:endParaRPr lang="de-DE" dirty="0"/>
+          </a:p>
+        </p:txBody>
+      </p:sp>
+      <p:sp>
+        <p:nvSpPr>
+          <p:cNvPr id="6" name="Foliennummernplatzhalter 5"/>
+          <p:cNvSpPr>
+            <a:spLocks noGrp="1"/>
+          </p:cNvSpPr>
+          <p:nvPr>
+            <p:ph type="sldNum" sz="quarter" idx="12"/>
+          </p:nvPr>
+        </p:nvSpPr>
+        <p:spPr/>
+        <p:txBody>
+          <a:bodyPr/>
+          <a:lstStyle/>
+          <a:p>
+            <a:fld id="{990B41CA-569D-40E7-8E58-026C0338B2C8}" type="slidenum">
+              <a:rPr lang="en-US" smtClean="0"/>
+              <a:pPr/>
+              <a:t>10</a:t>
+            </a:fld>
+            <a:endParaRPr lang="en-US"/>
+          </a:p>
+        </p:txBody>
+      </p:sp>
       <p:pic>
         <p:nvPicPr>
           <p:cNvPr id="14" name="Picture 2" descr="C:\Users\Alexander\Desktop\Anwendungsfalldiagramm Benutzer und Eventfunktionen.png"/>
@@ -8406,7 +8558,7 @@
       </p:pic>
       <p:sp>
         <p:nvSpPr>
-          <p:cNvPr id="16" name="Rechteck 15"/>
+          <p:cNvPr id="15" name="Rechteck 14"/>
           <p:cNvSpPr/>
           <p:nvPr/>
         </p:nvSpPr>
@@ -8454,7 +8606,7 @@
       </p:sp>
       <p:cxnSp>
         <p:nvCxnSpPr>
-          <p:cNvPr id="17" name="Gerade Verbindung 16"/>
+          <p:cNvPr id="18" name="Gerade Verbindung 17"/>
           <p:cNvCxnSpPr/>
           <p:nvPr/>
         </p:nvCxnSpPr>
@@ -8490,7 +8642,7 @@
       </p:cxnSp>
       <p:cxnSp>
         <p:nvCxnSpPr>
-          <p:cNvPr id="18" name="Gerade Verbindung 17"/>
+          <p:cNvPr id="19" name="Gerade Verbindung 18"/>
           <p:cNvCxnSpPr/>
           <p:nvPr/>
         </p:nvCxnSpPr>
@@ -8526,114 +8678,24 @@
       </p:cxnSp>
       <p:sp>
         <p:nvSpPr>
-          <p:cNvPr id="2" name="Titel 1"/>
-          <p:cNvSpPr>
-            <a:spLocks noGrp="1"/>
-          </p:cNvSpPr>
-          <p:nvPr>
-            <p:ph type="title"/>
-          </p:nvPr>
-        </p:nvSpPr>
-        <p:spPr/>
-        <p:txBody>
-          <a:bodyPr>
-            <a:normAutofit fontScale="90000"/>
-          </a:bodyPr>
-          <a:lstStyle/>
-          <a:p>
-            <a:r>
-              <a:rPr lang="de-DE" dirty="0" smtClean="0"/>
-              <a:t>Funktionale Anforderungen Anwendungsfalldiagramm</a:t>
-            </a:r>
-            <a:endParaRPr lang="de-DE" dirty="0"/>
-          </a:p>
-        </p:txBody>
-      </p:sp>
-      <p:sp>
-        <p:nvSpPr>
-          <p:cNvPr id="4" name="Datumsplatzhalter 3"/>
-          <p:cNvSpPr>
-            <a:spLocks noGrp="1"/>
-          </p:cNvSpPr>
-          <p:nvPr>
-            <p:ph type="dt" sz="half" idx="10"/>
-          </p:nvPr>
-        </p:nvSpPr>
-        <p:spPr/>
-        <p:txBody>
-          <a:bodyPr/>
-          <a:lstStyle/>
-          <a:p>
-            <a:r>
-              <a:rPr lang="de-DE" smtClean="0"/>
-              <a:t>21.04.2012</a:t>
-            </a:r>
-            <a:endParaRPr lang="en-US"/>
-          </a:p>
-        </p:txBody>
-      </p:sp>
-      <p:sp>
-        <p:nvSpPr>
-          <p:cNvPr id="5" name="Fußzeilenplatzhalter 4"/>
-          <p:cNvSpPr>
-            <a:spLocks noGrp="1"/>
-          </p:cNvSpPr>
-          <p:nvPr>
-            <p:ph type="ftr" sz="quarter" idx="11"/>
-          </p:nvPr>
-        </p:nvSpPr>
-        <p:spPr/>
-        <p:txBody>
-          <a:bodyPr/>
-          <a:lstStyle/>
-          <a:p>
-            <a:r>
-              <a:rPr lang="de-DE" smtClean="0"/>
-              <a:t>FST Projekt "Eventalizer" (SS 2012) Team 5</a:t>
-            </a:r>
-            <a:endParaRPr lang="de-DE" dirty="0"/>
-          </a:p>
-        </p:txBody>
-      </p:sp>
-      <p:sp>
-        <p:nvSpPr>
-          <p:cNvPr id="6" name="Foliennummernplatzhalter 5"/>
-          <p:cNvSpPr>
-            <a:spLocks noGrp="1"/>
-          </p:cNvSpPr>
-          <p:nvPr>
-            <p:ph type="sldNum" sz="quarter" idx="12"/>
-          </p:nvPr>
-        </p:nvSpPr>
-        <p:spPr/>
-        <p:txBody>
-          <a:bodyPr/>
-          <a:lstStyle/>
-          <a:p>
-            <a:fld id="{990B41CA-569D-40E7-8E58-026C0338B2C8}" type="slidenum">
-              <a:rPr lang="en-US" smtClean="0"/>
-              <a:pPr/>
-              <a:t>10</a:t>
-            </a:fld>
-            <a:endParaRPr lang="en-US"/>
-          </a:p>
-        </p:txBody>
-      </p:sp>
-      <p:sp>
-        <p:nvSpPr>
-          <p:cNvPr id="15" name="Rechteck 14"/>
+          <p:cNvPr id="20" name="Rechteck 19"/>
           <p:cNvSpPr/>
           <p:nvPr/>
         </p:nvSpPr>
         <p:spPr>
           <a:xfrm>
-            <a:off x="4615433" y="3736082"/>
-            <a:ext cx="1512168" cy="648072"/>
+            <a:off x="4572000" y="3717032"/>
+            <a:ext cx="1584176" cy="720080"/>
           </a:xfrm>
           <a:prstGeom prst="rect">
             <a:avLst/>
           </a:prstGeom>
           <a:noFill/>
+          <a:ln>
+            <a:solidFill>
+              <a:schemeClr val="tx2"/>
+            </a:solidFill>
+          </a:ln>
         </p:spPr>
         <p:style>
           <a:lnRef idx="2">
@@ -8676,9 +8738,413 @@
   <p:timing>
     <p:tnLst>
       <p:par>
-        <p:cTn id="1" dur="indefinite" restart="never" nodeType="tmRoot"/>
+        <p:cTn id="1" dur="indefinite" restart="never" nodeType="tmRoot">
+          <p:childTnLst>
+            <p:seq concurrent="1" nextAc="seek">
+              <p:cTn id="2" dur="indefinite" nodeType="mainSeq">
+                <p:childTnLst>
+                  <p:par>
+                    <p:cTn id="3" fill="hold">
+                      <p:stCondLst>
+                        <p:cond delay="indefinite"/>
+                      </p:stCondLst>
+                      <p:childTnLst>
+                        <p:par>
+                          <p:cTn id="4" fill="hold">
+                            <p:stCondLst>
+                              <p:cond delay="0"/>
+                            </p:stCondLst>
+                            <p:childTnLst>
+                              <p:par>
+                                <p:cTn id="5" presetID="6" presetClass="emph" presetSubtype="0" fill="hold" nodeType="clickEffect">
+                                  <p:stCondLst>
+                                    <p:cond delay="0"/>
+                                  </p:stCondLst>
+                                  <p:childTnLst>
+                                    <p:animScale>
+                                      <p:cBhvr>
+                                        <p:cTn id="6" dur="3000" fill="hold"/>
+                                        <p:tgtEl>
+                                          <p:spTgt spid="16"/>
+                                        </p:tgtEl>
+                                      </p:cBhvr>
+                                      <p:by x="40000" y="40000"/>
+                                    </p:animScale>
+                                  </p:childTnLst>
+                                </p:cTn>
+                              </p:par>
+                              <p:par>
+                                <p:cTn id="7" presetID="35" presetClass="path" presetSubtype="0" accel="50000" decel="50000" fill="hold" nodeType="withEffect">
+                                  <p:stCondLst>
+                                    <p:cond delay="0"/>
+                                  </p:stCondLst>
+                                  <p:childTnLst>
+                                    <p:animMotion origin="layout" path="M 2.77778E-6 -2.96296E-6 L -0.20851 -0.21828 " pathEditMode="relative" rAng="0" ptsTypes="AA">
+                                      <p:cBhvr>
+                                        <p:cTn id="8" dur="3000" fill="hold"/>
+                                        <p:tgtEl>
+                                          <p:spTgt spid="16"/>
+                                        </p:tgtEl>
+                                        <p:attrNameLst>
+                                          <p:attrName>ppt_x</p:attrName>
+                                          <p:attrName>ppt_y</p:attrName>
+                                        </p:attrNameLst>
+                                      </p:cBhvr>
+                                      <p:rCtr x="-104" y="-109"/>
+                                    </p:animMotion>
+                                  </p:childTnLst>
+                                </p:cTn>
+                              </p:par>
+                            </p:childTnLst>
+                          </p:cTn>
+                        </p:par>
+                        <p:par>
+                          <p:cTn id="9" fill="hold">
+                            <p:stCondLst>
+                              <p:cond delay="3000"/>
+                            </p:stCondLst>
+                            <p:childTnLst>
+                              <p:par>
+                                <p:cTn id="10" presetID="1" presetClass="exit" presetSubtype="0" fill="hold" nodeType="afterEffect">
+                                  <p:stCondLst>
+                                    <p:cond delay="0"/>
+                                  </p:stCondLst>
+                                  <p:childTnLst>
+                                    <p:set>
+                                      <p:cBhvr>
+                                        <p:cTn id="11" dur="1" fill="hold">
+                                          <p:stCondLst>
+                                            <p:cond delay="0"/>
+                                          </p:stCondLst>
+                                        </p:cTn>
+                                        <p:tgtEl>
+                                          <p:spTgt spid="16"/>
+                                        </p:tgtEl>
+                                        <p:attrNameLst>
+                                          <p:attrName>style.visibility</p:attrName>
+                                        </p:attrNameLst>
+                                      </p:cBhvr>
+                                      <p:to>
+                                        <p:strVal val="hidden"/>
+                                      </p:to>
+                                    </p:set>
+                                  </p:childTnLst>
+                                </p:cTn>
+                              </p:par>
+                            </p:childTnLst>
+                          </p:cTn>
+                        </p:par>
+                        <p:par>
+                          <p:cTn id="12" fill="hold">
+                            <p:stCondLst>
+                              <p:cond delay="3000"/>
+                            </p:stCondLst>
+                            <p:childTnLst>
+                              <p:par>
+                                <p:cTn id="13" presetID="1" presetClass="entr" presetSubtype="0" fill="hold" nodeType="afterEffect">
+                                  <p:stCondLst>
+                                    <p:cond delay="0"/>
+                                  </p:stCondLst>
+                                  <p:childTnLst>
+                                    <p:set>
+                                      <p:cBhvr>
+                                        <p:cTn id="14" dur="1" fill="hold">
+                                          <p:stCondLst>
+                                            <p:cond delay="0"/>
+                                          </p:stCondLst>
+                                        </p:cTn>
+                                        <p:tgtEl>
+                                          <p:spTgt spid="1027"/>
+                                        </p:tgtEl>
+                                        <p:attrNameLst>
+                                          <p:attrName>style.visibility</p:attrName>
+                                        </p:attrNameLst>
+                                      </p:cBhvr>
+                                      <p:to>
+                                        <p:strVal val="visible"/>
+                                      </p:to>
+                                    </p:set>
+                                  </p:childTnLst>
+                                </p:cTn>
+                              </p:par>
+                              <p:par>
+                                <p:cTn id="15" presetID="1" presetClass="entr" presetSubtype="0" fill="hold" nodeType="withEffect">
+                                  <p:stCondLst>
+                                    <p:cond delay="0"/>
+                                  </p:stCondLst>
+                                  <p:childTnLst>
+                                    <p:set>
+                                      <p:cBhvr>
+                                        <p:cTn id="16" dur="1" fill="hold">
+                                          <p:stCondLst>
+                                            <p:cond delay="0"/>
+                                          </p:stCondLst>
+                                        </p:cTn>
+                                        <p:tgtEl>
+                                          <p:spTgt spid="2050"/>
+                                        </p:tgtEl>
+                                        <p:attrNameLst>
+                                          <p:attrName>style.visibility</p:attrName>
+                                        </p:attrNameLst>
+                                      </p:cBhvr>
+                                      <p:to>
+                                        <p:strVal val="visible"/>
+                                      </p:to>
+                                    </p:set>
+                                  </p:childTnLst>
+                                </p:cTn>
+                              </p:par>
+                              <p:par>
+                                <p:cTn id="17" presetID="6" presetClass="emph" presetSubtype="0" fill="hold" nodeType="withEffect">
+                                  <p:stCondLst>
+                                    <p:cond delay="0"/>
+                                  </p:stCondLst>
+                                  <p:childTnLst>
+                                    <p:animScale>
+                                      <p:cBhvr>
+                                        <p:cTn id="18" dur="3000" fill="hold"/>
+                                        <p:tgtEl>
+                                          <p:spTgt spid="2050"/>
+                                        </p:tgtEl>
+                                      </p:cBhvr>
+                                      <p:by x="350000" y="350000"/>
+                                    </p:animScale>
+                                  </p:childTnLst>
+                                </p:cTn>
+                              </p:par>
+                              <p:par>
+                                <p:cTn id="19" presetID="49" presetClass="path" presetSubtype="0" accel="50000" decel="50000" fill="hold" nodeType="withEffect">
+                                  <p:stCondLst>
+                                    <p:cond delay="0"/>
+                                  </p:stCondLst>
+                                  <p:childTnLst>
+                                    <p:animMotion origin="layout" path="M 2.22222E-6 2.96296E-6 L 0.40191 0.22037 " pathEditMode="relative" rAng="0" ptsTypes="AA">
+                                      <p:cBhvr>
+                                        <p:cTn id="20" dur="3000" fill="hold"/>
+                                        <p:tgtEl>
+                                          <p:spTgt spid="2050"/>
+                                        </p:tgtEl>
+                                        <p:attrNameLst>
+                                          <p:attrName>ppt_x</p:attrName>
+                                          <p:attrName>ppt_y</p:attrName>
+                                        </p:attrNameLst>
+                                      </p:cBhvr>
+                                      <p:rCtr x="201" y="110"/>
+                                    </p:animMotion>
+                                  </p:childTnLst>
+                                </p:cTn>
+                              </p:par>
+                              <p:par>
+                                <p:cTn id="21" presetID="1" presetClass="entr" presetSubtype="0" fill="hold" grpId="0" nodeType="withEffect">
+                                  <p:stCondLst>
+                                    <p:cond delay="0"/>
+                                  </p:stCondLst>
+                                  <p:childTnLst>
+                                    <p:set>
+                                      <p:cBhvr>
+                                        <p:cTn id="22" dur="1" fill="hold">
+                                          <p:stCondLst>
+                                            <p:cond delay="0"/>
+                                          </p:stCondLst>
+                                        </p:cTn>
+                                        <p:tgtEl>
+                                          <p:spTgt spid="15"/>
+                                        </p:tgtEl>
+                                        <p:attrNameLst>
+                                          <p:attrName>style.visibility</p:attrName>
+                                        </p:attrNameLst>
+                                      </p:cBhvr>
+                                      <p:to>
+                                        <p:strVal val="visible"/>
+                                      </p:to>
+                                    </p:set>
+                                  </p:childTnLst>
+                                </p:cTn>
+                              </p:par>
+                            </p:childTnLst>
+                          </p:cTn>
+                        </p:par>
+                        <p:par>
+                          <p:cTn id="23" fill="hold">
+                            <p:stCondLst>
+                              <p:cond delay="6000"/>
+                            </p:stCondLst>
+                            <p:childTnLst>
+                              <p:par>
+                                <p:cTn id="24" presetID="1" presetClass="exit" presetSubtype="0" fill="hold" nodeType="afterEffect">
+                                  <p:stCondLst>
+                                    <p:cond delay="0"/>
+                                  </p:stCondLst>
+                                  <p:childTnLst>
+                                    <p:set>
+                                      <p:cBhvr>
+                                        <p:cTn id="25" dur="1" fill="hold">
+                                          <p:stCondLst>
+                                            <p:cond delay="0"/>
+                                          </p:stCondLst>
+                                        </p:cTn>
+                                        <p:tgtEl>
+                                          <p:spTgt spid="2050"/>
+                                        </p:tgtEl>
+                                        <p:attrNameLst>
+                                          <p:attrName>style.visibility</p:attrName>
+                                        </p:attrNameLst>
+                                      </p:cBhvr>
+                                      <p:to>
+                                        <p:strVal val="hidden"/>
+                                      </p:to>
+                                    </p:set>
+                                  </p:childTnLst>
+                                </p:cTn>
+                              </p:par>
+                              <p:par>
+                                <p:cTn id="26" presetID="1" presetClass="entr" presetSubtype="0" fill="hold" nodeType="withEffect">
+                                  <p:stCondLst>
+                                    <p:cond delay="0"/>
+                                  </p:stCondLst>
+                                  <p:childTnLst>
+                                    <p:set>
+                                      <p:cBhvr>
+                                        <p:cTn id="27" dur="1" fill="hold">
+                                          <p:stCondLst>
+                                            <p:cond delay="0"/>
+                                          </p:stCondLst>
+                                        </p:cTn>
+                                        <p:tgtEl>
+                                          <p:spTgt spid="14"/>
+                                        </p:tgtEl>
+                                        <p:attrNameLst>
+                                          <p:attrName>style.visibility</p:attrName>
+                                        </p:attrNameLst>
+                                      </p:cBhvr>
+                                      <p:to>
+                                        <p:strVal val="visible"/>
+                                      </p:to>
+                                    </p:set>
+                                  </p:childTnLst>
+                                </p:cTn>
+                              </p:par>
+                              <p:par>
+                                <p:cTn id="28" presetID="1" presetClass="entr" presetSubtype="0" fill="hold" nodeType="withEffect">
+                                  <p:stCondLst>
+                                    <p:cond delay="0"/>
+                                  </p:stCondLst>
+                                  <p:childTnLst>
+                                    <p:set>
+                                      <p:cBhvr>
+                                        <p:cTn id="29" dur="1" fill="hold">
+                                          <p:stCondLst>
+                                            <p:cond delay="0"/>
+                                          </p:stCondLst>
+                                        </p:cTn>
+                                        <p:tgtEl>
+                                          <p:spTgt spid="18"/>
+                                        </p:tgtEl>
+                                        <p:attrNameLst>
+                                          <p:attrName>style.visibility</p:attrName>
+                                        </p:attrNameLst>
+                                      </p:cBhvr>
+                                      <p:to>
+                                        <p:strVal val="visible"/>
+                                      </p:to>
+                                    </p:set>
+                                  </p:childTnLst>
+                                </p:cTn>
+                              </p:par>
+                              <p:par>
+                                <p:cTn id="30" presetID="1" presetClass="entr" presetSubtype="0" fill="hold" nodeType="withEffect">
+                                  <p:stCondLst>
+                                    <p:cond delay="0"/>
+                                  </p:stCondLst>
+                                  <p:childTnLst>
+                                    <p:set>
+                                      <p:cBhvr>
+                                        <p:cTn id="31" dur="1" fill="hold">
+                                          <p:stCondLst>
+                                            <p:cond delay="0"/>
+                                          </p:stCondLst>
+                                        </p:cTn>
+                                        <p:tgtEl>
+                                          <p:spTgt spid="19"/>
+                                        </p:tgtEl>
+                                        <p:attrNameLst>
+                                          <p:attrName>style.visibility</p:attrName>
+                                        </p:attrNameLst>
+                                      </p:cBhvr>
+                                      <p:to>
+                                        <p:strVal val="visible"/>
+                                      </p:to>
+                                    </p:set>
+                                  </p:childTnLst>
+                                </p:cTn>
+                              </p:par>
+                            </p:childTnLst>
+                          </p:cTn>
+                        </p:par>
+                        <p:par>
+                          <p:cTn id="32" fill="hold">
+                            <p:stCondLst>
+                              <p:cond delay="6000"/>
+                            </p:stCondLst>
+                            <p:childTnLst>
+                              <p:par>
+                                <p:cTn id="33" presetID="1" presetClass="entr" presetSubtype="0" fill="hold" grpId="0" nodeType="afterEffect">
+                                  <p:stCondLst>
+                                    <p:cond delay="0"/>
+                                  </p:stCondLst>
+                                  <p:childTnLst>
+                                    <p:set>
+                                      <p:cBhvr>
+                                        <p:cTn id="34" dur="1" fill="hold">
+                                          <p:stCondLst>
+                                            <p:cond delay="0"/>
+                                          </p:stCondLst>
+                                        </p:cTn>
+                                        <p:tgtEl>
+                                          <p:spTgt spid="20"/>
+                                        </p:tgtEl>
+                                        <p:attrNameLst>
+                                          <p:attrName>style.visibility</p:attrName>
+                                        </p:attrNameLst>
+                                      </p:cBhvr>
+                                      <p:to>
+                                        <p:strVal val="visible"/>
+                                      </p:to>
+                                    </p:set>
+                                  </p:childTnLst>
+                                </p:cTn>
+                              </p:par>
+                            </p:childTnLst>
+                          </p:cTn>
+                        </p:par>
+                      </p:childTnLst>
+                    </p:cTn>
+                  </p:par>
+                </p:childTnLst>
+              </p:cTn>
+              <p:prevCondLst>
+                <p:cond evt="onPrev" delay="0">
+                  <p:tgtEl>
+                    <p:sldTgt/>
+                  </p:tgtEl>
+                </p:cond>
+              </p:prevCondLst>
+              <p:nextCondLst>
+                <p:cond evt="onNext" delay="0">
+                  <p:tgtEl>
+                    <p:sldTgt/>
+                  </p:tgtEl>
+                </p:cond>
+              </p:nextCondLst>
+            </p:seq>
+          </p:childTnLst>
+        </p:cTn>
       </p:par>
     </p:tnLst>
+    <p:bldLst>
+      <p:bldP spid="15" grpId="0" animBg="1"/>
+      <p:bldP spid="20" grpId="0" animBg="1"/>
+    </p:bldLst>
   </p:timing>
 </p:sld>
 </file>
@@ -10892,7 +11358,7 @@
   <p:clrMapOvr>
     <a:masterClrMapping/>
   </p:clrMapOvr>
-  <p:transition spd="slow" advTm="0">
+  <p:transition spd="slow">
     <p:strips dir="ru"/>
   </p:transition>
   <p:timing>
@@ -11165,7 +11631,7 @@
           <a:blip r:embed="rId4" cstate="print">
             <a:extLst>
               <a:ext uri="{28A0092B-C50C-407E-A947-70E740481C1C}">
-                <a14:useLocalDpi xmlns="" xmlns:a14="http://schemas.microsoft.com/office/drawing/2010/main" val="0"/>
+                <a14:useLocalDpi xmlns:a14="http://schemas.microsoft.com/office/drawing/2010/main" xmlns="" val="0"/>
               </a:ext>
             </a:extLst>
           </a:blip>
@@ -11443,7 +11909,7 @@
     </p:spTree>
     <p:extLst>
       <p:ext uri="{BB962C8B-B14F-4D97-AF65-F5344CB8AC3E}">
-        <p14:creationId xmlns="" xmlns:p14="http://schemas.microsoft.com/office/powerpoint/2010/main" val="141785747"/>
+        <p14:creationId xmlns:p14="http://schemas.microsoft.com/office/powerpoint/2010/main" xmlns="" val="141785747"/>
       </p:ext>
     </p:extLst>
   </p:cSld>
@@ -11890,7 +12356,7 @@
     </p:spTree>
     <p:extLst>
       <p:ext uri="{BB962C8B-B14F-4D97-AF65-F5344CB8AC3E}">
-        <p14:creationId xmlns="" xmlns:p14="http://schemas.microsoft.com/office/powerpoint/2010/main" val="3616670450"/>
+        <p14:creationId xmlns:p14="http://schemas.microsoft.com/office/powerpoint/2010/main" xmlns="" val="3616670450"/>
       </p:ext>
     </p:extLst>
   </p:cSld>
@@ -12057,7 +12523,7 @@
     </p:spTree>
     <p:extLst>
       <p:ext uri="{BB962C8B-B14F-4D97-AF65-F5344CB8AC3E}">
-        <p14:creationId xmlns="" xmlns:p14="http://schemas.microsoft.com/office/powerpoint/2010/main" val="2634211947"/>
+        <p14:creationId xmlns:p14="http://schemas.microsoft.com/office/powerpoint/2010/main" xmlns="" val="2634211947"/>
       </p:ext>
     </p:extLst>
   </p:cSld>
@@ -12228,7 +12694,7 @@
     </p:spTree>
     <p:extLst>
       <p:ext uri="{BB962C8B-B14F-4D97-AF65-F5344CB8AC3E}">
-        <p14:creationId xmlns="" xmlns:p14="http://schemas.microsoft.com/office/powerpoint/2010/main" val="3243626544"/>
+        <p14:creationId xmlns:p14="http://schemas.microsoft.com/office/powerpoint/2010/main" xmlns="" val="3243626544"/>
       </p:ext>
     </p:extLst>
   </p:cSld>
@@ -13182,7 +13648,7 @@
     </p:spTree>
     <p:extLst>
       <p:ext uri="{BB962C8B-B14F-4D97-AF65-F5344CB8AC3E}">
-        <p14:creationId xmlns:p14="http://schemas.microsoft.com/office/powerpoint/2010/main" xmlns="" val="3243626544"/>
+        <p14:creationId xmlns="" xmlns:p14="http://schemas.microsoft.com/office/powerpoint/2010/main" val="3243626544"/>
       </p:ext>
     </p:extLst>
   </p:cSld>
@@ -14581,7 +15047,7 @@
     </p:spTree>
     <p:extLst>
       <p:ext uri="{BB962C8B-B14F-4D97-AF65-F5344CB8AC3E}">
-        <p14:creationId xmlns:p14="http://schemas.microsoft.com/office/powerpoint/2010/main" xmlns="" val="3243626544"/>
+        <p14:creationId xmlns="" xmlns:p14="http://schemas.microsoft.com/office/powerpoint/2010/main" val="3243626544"/>
       </p:ext>
     </p:extLst>
   </p:cSld>
@@ -15411,7 +15877,7 @@
     </p:spTree>
     <p:extLst>
       <p:ext uri="{BB962C8B-B14F-4D97-AF65-F5344CB8AC3E}">
-        <p14:creationId xmlns:p14="http://schemas.microsoft.com/office/powerpoint/2010/main" xmlns="" val="3243626544"/>
+        <p14:creationId xmlns="" xmlns:p14="http://schemas.microsoft.com/office/powerpoint/2010/main" val="3243626544"/>
       </p:ext>
     </p:extLst>
   </p:cSld>
@@ -15744,7 +16210,7 @@
     </p:spTree>
     <p:extLst>
       <p:ext uri="{BB962C8B-B14F-4D97-AF65-F5344CB8AC3E}">
-        <p14:creationId xmlns="" xmlns:p14="http://schemas.microsoft.com/office/powerpoint/2010/main" val="3309636493"/>
+        <p14:creationId xmlns:p14="http://schemas.microsoft.com/office/powerpoint/2010/main" xmlns="" val="3309636493"/>
       </p:ext>
     </p:extLst>
   </p:cSld>
@@ -15963,7 +16429,7 @@
     </p:spTree>
     <p:extLst>
       <p:ext uri="{BB962C8B-B14F-4D97-AF65-F5344CB8AC3E}">
-        <p14:creationId xmlns="" xmlns:p14="http://schemas.microsoft.com/office/powerpoint/2010/main" val="1012322072"/>
+        <p14:creationId xmlns:p14="http://schemas.microsoft.com/office/powerpoint/2010/main" xmlns="" val="1012322072"/>
       </p:ext>
     </p:extLst>
   </p:cSld>
@@ -16182,7 +16648,7 @@
     </p:spTree>
     <p:extLst>
       <p:ext uri="{BB962C8B-B14F-4D97-AF65-F5344CB8AC3E}">
-        <p14:creationId xmlns="" xmlns:p14="http://schemas.microsoft.com/office/powerpoint/2010/main" val="1012322072"/>
+        <p14:creationId xmlns:p14="http://schemas.microsoft.com/office/powerpoint/2010/main" xmlns="" val="1012322072"/>
       </p:ext>
     </p:extLst>
   </p:cSld>
@@ -16343,7 +16809,7 @@
     </p:spTree>
     <p:extLst>
       <p:ext uri="{BB962C8B-B14F-4D97-AF65-F5344CB8AC3E}">
-        <p14:creationId xmlns="" xmlns:p14="http://schemas.microsoft.com/office/powerpoint/2010/main" val="351671181"/>
+        <p14:creationId xmlns:p14="http://schemas.microsoft.com/office/powerpoint/2010/main" xmlns="" val="351671181"/>
       </p:ext>
     </p:extLst>
   </p:cSld>
@@ -16551,7 +17017,7 @@
           <a:blip r:embed="rId2" cstate="print">
             <a:extLst>
               <a:ext uri="{BEBA8EAE-BF5A-486C-A8C5-ECC9F3942E4B}">
-                <a14:imgProps xmlns="" xmlns:a14="http://schemas.microsoft.com/office/drawing/2010/main">
+                <a14:imgProps xmlns:a14="http://schemas.microsoft.com/office/drawing/2010/main" xmlns="">
                   <a14:imgLayer r:embed="rId3">
                     <a14:imgEffect>
                       <a14:backgroundRemoval t="6057" b="22942" l="7000" r="29162"/>
@@ -16560,7 +17026,7 @@
                 </a14:imgProps>
               </a:ext>
               <a:ext uri="{28A0092B-C50C-407E-A947-70E740481C1C}">
-                <a14:useLocalDpi xmlns="" xmlns:a14="http://schemas.microsoft.com/office/drawing/2010/main" val="0"/>
+                <a14:useLocalDpi xmlns:a14="http://schemas.microsoft.com/office/drawing/2010/main" xmlns="" val="0"/>
               </a:ext>
             </a:extLst>
           </a:blip>
@@ -16578,7 +17044,7 @@
           <a:noFill/>
           <a:extLst>
             <a:ext uri="{909E8E84-426E-40DD-AFC4-6F175D3DCCD1}">
-              <a14:hiddenFill xmlns="" xmlns:a14="http://schemas.microsoft.com/office/drawing/2010/main">
+              <a14:hiddenFill xmlns:a14="http://schemas.microsoft.com/office/drawing/2010/main" xmlns="">
                 <a:solidFill>
                   <a:srgbClr val="FFFFFF"/>
                 </a:solidFill>
@@ -16599,7 +17065,7 @@
           <a:blip r:embed="rId2" cstate="print">
             <a:extLst>
               <a:ext uri="{BEBA8EAE-BF5A-486C-A8C5-ECC9F3942E4B}">
-                <a14:imgProps xmlns="" xmlns:a14="http://schemas.microsoft.com/office/drawing/2010/main">
+                <a14:imgProps xmlns:a14="http://schemas.microsoft.com/office/drawing/2010/main" xmlns="">
                   <a14:imgLayer r:embed="rId3">
                     <a14:imgEffect>
                       <a14:backgroundRemoval t="6057" b="22942" l="7000" r="29162"/>
@@ -16608,7 +17074,7 @@
                 </a14:imgProps>
               </a:ext>
               <a:ext uri="{28A0092B-C50C-407E-A947-70E740481C1C}">
-                <a14:useLocalDpi xmlns="" xmlns:a14="http://schemas.microsoft.com/office/drawing/2010/main" val="0"/>
+                <a14:useLocalDpi xmlns:a14="http://schemas.microsoft.com/office/drawing/2010/main" xmlns="" val="0"/>
               </a:ext>
             </a:extLst>
           </a:blip>
@@ -16626,7 +17092,7 @@
           <a:noFill/>
           <a:extLst>
             <a:ext uri="{909E8E84-426E-40DD-AFC4-6F175D3DCCD1}">
-              <a14:hiddenFill xmlns="" xmlns:a14="http://schemas.microsoft.com/office/drawing/2010/main">
+              <a14:hiddenFill xmlns:a14="http://schemas.microsoft.com/office/drawing/2010/main" xmlns="">
                 <a:solidFill>
                   <a:srgbClr val="FFFFFF"/>
                 </a:solidFill>
@@ -16684,7 +17150,7 @@
     </p:spTree>
     <p:extLst>
       <p:ext uri="{BB962C8B-B14F-4D97-AF65-F5344CB8AC3E}">
-        <p14:creationId xmlns="" xmlns:p14="http://schemas.microsoft.com/office/powerpoint/2010/main" val="2645794681"/>
+        <p14:creationId xmlns:p14="http://schemas.microsoft.com/office/powerpoint/2010/main" xmlns="" val="2645794681"/>
       </p:ext>
     </p:extLst>
   </p:cSld>
@@ -16923,7 +17389,7 @@
           <a:blip r:embed="rId3" cstate="print">
             <a:extLst>
               <a:ext uri="{28A0092B-C50C-407E-A947-70E740481C1C}">
-                <a14:useLocalDpi xmlns="" xmlns:a14="http://schemas.microsoft.com/office/drawing/2010/main" val="0"/>
+                <a14:useLocalDpi xmlns:a14="http://schemas.microsoft.com/office/drawing/2010/main" xmlns="" val="0"/>
               </a:ext>
             </a:extLst>
           </a:blip>
@@ -16955,7 +17421,7 @@
           </a:effectLst>
           <a:extLst>
             <a:ext uri="{91240B29-F687-4F45-9708-019B960494DF}">
-              <a14:hiddenLine xmlns="" xmlns:a14="http://schemas.microsoft.com/office/drawing/2010/main" w="9525">
+              <a14:hiddenLine xmlns:a14="http://schemas.microsoft.com/office/drawing/2010/main" xmlns="" w="9525">
                 <a:solidFill>
                   <a:schemeClr val="tx1"/>
                 </a:solidFill>
@@ -16970,7 +17436,7 @@
     </p:spTree>
     <p:extLst>
       <p:ext uri="{BB962C8B-B14F-4D97-AF65-F5344CB8AC3E}">
-        <p14:creationId xmlns="" xmlns:p14="http://schemas.microsoft.com/office/powerpoint/2010/main" val="313312729"/>
+        <p14:creationId xmlns:p14="http://schemas.microsoft.com/office/powerpoint/2010/main" xmlns="" val="313312729"/>
       </p:ext>
     </p:extLst>
   </p:cSld>
@@ -17193,7 +17659,7 @@
     </p:spTree>
     <p:extLst>
       <p:ext uri="{BB962C8B-B14F-4D97-AF65-F5344CB8AC3E}">
-        <p14:creationId xmlns="" xmlns:p14="http://schemas.microsoft.com/office/powerpoint/2010/main" val="1344880779"/>
+        <p14:creationId xmlns:p14="http://schemas.microsoft.com/office/powerpoint/2010/main" xmlns="" val="1344880779"/>
       </p:ext>
     </p:extLst>
   </p:cSld>
@@ -17296,7 +17762,7 @@
           <a:blip r:embed="rId3" cstate="print">
             <a:extLst>
               <a:ext uri="{28A0092B-C50C-407E-A947-70E740481C1C}">
-                <a14:useLocalDpi xmlns="" xmlns:a14="http://schemas.microsoft.com/office/drawing/2010/main" val="0"/>
+                <a14:useLocalDpi xmlns:a14="http://schemas.microsoft.com/office/drawing/2010/main" xmlns="" val="0"/>
               </a:ext>
             </a:extLst>
           </a:blip>
@@ -17326,7 +17792,7 @@
           <a:blip r:embed="rId4" cstate="print">
             <a:extLst>
               <a:ext uri="{28A0092B-C50C-407E-A947-70E740481C1C}">
-                <a14:useLocalDpi xmlns="" xmlns:a14="http://schemas.microsoft.com/office/drawing/2010/main" val="0"/>
+                <a14:useLocalDpi xmlns:a14="http://schemas.microsoft.com/office/drawing/2010/main" xmlns="" val="0"/>
               </a:ext>
             </a:extLst>
           </a:blip>
@@ -17347,7 +17813,7 @@
     </p:spTree>
     <p:extLst>
       <p:ext uri="{BB962C8B-B14F-4D97-AF65-F5344CB8AC3E}">
-        <p14:creationId xmlns="" xmlns:p14="http://schemas.microsoft.com/office/powerpoint/2010/main" val="2565098391"/>
+        <p14:creationId xmlns:p14="http://schemas.microsoft.com/office/powerpoint/2010/main" xmlns="" val="2565098391"/>
       </p:ext>
     </p:extLst>
   </p:cSld>
@@ -17598,7 +18064,7 @@
     </p:spTree>
     <p:extLst>
       <p:ext uri="{BB962C8B-B14F-4D97-AF65-F5344CB8AC3E}">
-        <p14:creationId xmlns="" xmlns:p14="http://schemas.microsoft.com/office/powerpoint/2010/main" val="3661383713"/>
+        <p14:creationId xmlns:p14="http://schemas.microsoft.com/office/powerpoint/2010/main" xmlns="" val="3661383713"/>
       </p:ext>
     </p:extLst>
   </p:cSld>
@@ -17637,6 +18103,32 @@
       </p:grpSpPr>
       <p:pic>
         <p:nvPicPr>
+          <p:cNvPr id="16" name="Picture 3" descr="C:\Users\Alexander\Desktop\Anwendungsfalldiagramm Benutzer und Eventfunktionen.png"/>
+          <p:cNvPicPr>
+            <a:picLocks noChangeAspect="1" noChangeArrowheads="1"/>
+          </p:cNvPicPr>
+          <p:nvPr/>
+        </p:nvPicPr>
+        <p:blipFill>
+          <a:blip r:embed="rId3" cstate="print"/>
+          <a:srcRect/>
+          <a:stretch>
+            <a:fillRect/>
+          </a:stretch>
+        </p:blipFill>
+        <p:spPr bwMode="auto">
+          <a:xfrm>
+            <a:off x="1475656" y="1453751"/>
+            <a:ext cx="5400000" cy="5071593"/>
+          </a:xfrm>
+          <a:prstGeom prst="rect">
+            <a:avLst/>
+          </a:prstGeom>
+          <a:noFill/>
+        </p:spPr>
+      </p:pic>
+      <p:pic>
+        <p:nvPicPr>
           <p:cNvPr id="1027" name="Picture 3" descr="C:\Users\Alexander\Desktop\Anwendungsfalldiagramm Benutzer und Eventfunktionen.png"/>
           <p:cNvPicPr>
             <a:picLocks noChangeAspect="1" noChangeArrowheads="1"/>
@@ -17661,6 +18153,37 @@
           <a:noFill/>
         </p:spPr>
       </p:pic>
+      <p:pic>
+        <p:nvPicPr>
+          <p:cNvPr id="2050" name="Picture 2" descr="C:\Users\Alexander\Desktop\Anwendungsfalldiagramm Benutzer und Eventfunktionen.png"/>
+          <p:cNvPicPr>
+            <a:picLocks noChangeAspect="1" noChangeArrowheads="1"/>
+          </p:cNvPicPr>
+          <p:nvPr/>
+        </p:nvPicPr>
+        <p:blipFill>
+          <a:blip r:embed="rId3" cstate="print"/>
+          <a:srcRect l="37173" t="41284" b="9873"/>
+          <a:stretch>
+            <a:fillRect/>
+          </a:stretch>
+        </p:blipFill>
+        <p:spPr bwMode="auto">
+          <a:xfrm>
+            <a:off x="1979712" y="2420888"/>
+            <a:ext cx="1577914" cy="1152128"/>
+          </a:xfrm>
+          <a:prstGeom prst="rect">
+            <a:avLst/>
+          </a:prstGeom>
+          <a:noFill/>
+          <a:ln w="25400">
+            <a:solidFill>
+              <a:schemeClr val="accent6"/>
+            </a:solidFill>
+          </a:ln>
+        </p:spPr>
+      </p:pic>
       <p:sp>
         <p:nvSpPr>
           <p:cNvPr id="2" name="Titel 1"/>
@@ -17758,7 +18281,7 @@
       </p:sp>
       <p:pic>
         <p:nvPicPr>
-          <p:cNvPr id="2050" name="Picture 2" descr="C:\Users\Alexander\Desktop\Anwendungsfalldiagramm Benutzer und Eventfunktionen.png"/>
+          <p:cNvPr id="14" name="Picture 2" descr="C:\Users\Alexander\Desktop\Anwendungsfalldiagramm Benutzer und Eventfunktionen.png"/>
           <p:cNvPicPr>
             <a:picLocks noChangeAspect="1" noChangeArrowheads="1"/>
           </p:cNvPicPr>
@@ -17789,7 +18312,7 @@
       </p:pic>
       <p:sp>
         <p:nvSpPr>
-          <p:cNvPr id="8" name="Rechteck 7"/>
+          <p:cNvPr id="15" name="Rechteck 14"/>
           <p:cNvSpPr/>
           <p:nvPr/>
         </p:nvSpPr>
@@ -17837,7 +18360,7 @@
       </p:sp>
       <p:cxnSp>
         <p:nvCxnSpPr>
-          <p:cNvPr id="11" name="Gerade Verbindung 10"/>
+          <p:cNvPr id="18" name="Gerade Verbindung 17"/>
           <p:cNvCxnSpPr/>
           <p:nvPr/>
         </p:nvCxnSpPr>
@@ -17873,7 +18396,7 @@
       </p:cxnSp>
       <p:cxnSp>
         <p:nvCxnSpPr>
-          <p:cNvPr id="12" name="Gerade Verbindung 11"/>
+          <p:cNvPr id="19" name="Gerade Verbindung 18"/>
           <p:cNvCxnSpPr/>
           <p:nvPr/>
         </p:nvCxnSpPr>
@@ -17909,7 +18432,7 @@
       </p:cxnSp>
       <p:sp>
         <p:nvSpPr>
-          <p:cNvPr id="25" name="Rechteck 24"/>
+          <p:cNvPr id="20" name="Rechteck 19"/>
           <p:cNvSpPr/>
           <p:nvPr/>
         </p:nvSpPr>
@@ -17969,9 +18492,413 @@
   <p:timing>
     <p:tnLst>
       <p:par>
-        <p:cTn id="1" dur="indefinite" restart="never" nodeType="tmRoot"/>
+        <p:cTn id="1" dur="indefinite" restart="never" nodeType="tmRoot">
+          <p:childTnLst>
+            <p:seq concurrent="1" nextAc="seek">
+              <p:cTn id="2" dur="indefinite" nodeType="mainSeq">
+                <p:childTnLst>
+                  <p:par>
+                    <p:cTn id="3" fill="hold">
+                      <p:stCondLst>
+                        <p:cond delay="indefinite"/>
+                      </p:stCondLst>
+                      <p:childTnLst>
+                        <p:par>
+                          <p:cTn id="4" fill="hold">
+                            <p:stCondLst>
+                              <p:cond delay="0"/>
+                            </p:stCondLst>
+                            <p:childTnLst>
+                              <p:par>
+                                <p:cTn id="5" presetID="6" presetClass="emph" presetSubtype="0" fill="hold" nodeType="clickEffect">
+                                  <p:stCondLst>
+                                    <p:cond delay="0"/>
+                                  </p:stCondLst>
+                                  <p:childTnLst>
+                                    <p:animScale>
+                                      <p:cBhvr>
+                                        <p:cTn id="6" dur="2000" fill="hold"/>
+                                        <p:tgtEl>
+                                          <p:spTgt spid="16"/>
+                                        </p:tgtEl>
+                                      </p:cBhvr>
+                                      <p:by x="40000" y="40000"/>
+                                    </p:animScale>
+                                  </p:childTnLst>
+                                </p:cTn>
+                              </p:par>
+                              <p:par>
+                                <p:cTn id="7" presetID="35" presetClass="path" presetSubtype="0" accel="50000" decel="50000" fill="hold" nodeType="withEffect">
+                                  <p:stCondLst>
+                                    <p:cond delay="0"/>
+                                  </p:stCondLst>
+                                  <p:childTnLst>
+                                    <p:animMotion origin="layout" path="M 2.77778E-6 -2.96296E-6 L -0.20851 -0.21828 " pathEditMode="relative" rAng="0" ptsTypes="AA">
+                                      <p:cBhvr>
+                                        <p:cTn id="8" dur="2000" fill="hold"/>
+                                        <p:tgtEl>
+                                          <p:spTgt spid="16"/>
+                                        </p:tgtEl>
+                                        <p:attrNameLst>
+                                          <p:attrName>ppt_x</p:attrName>
+                                          <p:attrName>ppt_y</p:attrName>
+                                        </p:attrNameLst>
+                                      </p:cBhvr>
+                                      <p:rCtr x="-104" y="-109"/>
+                                    </p:animMotion>
+                                  </p:childTnLst>
+                                </p:cTn>
+                              </p:par>
+                            </p:childTnLst>
+                          </p:cTn>
+                        </p:par>
+                        <p:par>
+                          <p:cTn id="9" fill="hold">
+                            <p:stCondLst>
+                              <p:cond delay="2000"/>
+                            </p:stCondLst>
+                            <p:childTnLst>
+                              <p:par>
+                                <p:cTn id="10" presetID="1" presetClass="exit" presetSubtype="0" fill="hold" nodeType="afterEffect">
+                                  <p:stCondLst>
+                                    <p:cond delay="0"/>
+                                  </p:stCondLst>
+                                  <p:childTnLst>
+                                    <p:set>
+                                      <p:cBhvr>
+                                        <p:cTn id="11" dur="1" fill="hold">
+                                          <p:stCondLst>
+                                            <p:cond delay="0"/>
+                                          </p:stCondLst>
+                                        </p:cTn>
+                                        <p:tgtEl>
+                                          <p:spTgt spid="16"/>
+                                        </p:tgtEl>
+                                        <p:attrNameLst>
+                                          <p:attrName>style.visibility</p:attrName>
+                                        </p:attrNameLst>
+                                      </p:cBhvr>
+                                      <p:to>
+                                        <p:strVal val="hidden"/>
+                                      </p:to>
+                                    </p:set>
+                                  </p:childTnLst>
+                                </p:cTn>
+                              </p:par>
+                            </p:childTnLst>
+                          </p:cTn>
+                        </p:par>
+                        <p:par>
+                          <p:cTn id="12" fill="hold">
+                            <p:stCondLst>
+                              <p:cond delay="2000"/>
+                            </p:stCondLst>
+                            <p:childTnLst>
+                              <p:par>
+                                <p:cTn id="13" presetID="1" presetClass="entr" presetSubtype="0" fill="hold" nodeType="afterEffect">
+                                  <p:stCondLst>
+                                    <p:cond delay="0"/>
+                                  </p:stCondLst>
+                                  <p:childTnLst>
+                                    <p:set>
+                                      <p:cBhvr>
+                                        <p:cTn id="14" dur="1" fill="hold">
+                                          <p:stCondLst>
+                                            <p:cond delay="0"/>
+                                          </p:stCondLst>
+                                        </p:cTn>
+                                        <p:tgtEl>
+                                          <p:spTgt spid="1027"/>
+                                        </p:tgtEl>
+                                        <p:attrNameLst>
+                                          <p:attrName>style.visibility</p:attrName>
+                                        </p:attrNameLst>
+                                      </p:cBhvr>
+                                      <p:to>
+                                        <p:strVal val="visible"/>
+                                      </p:to>
+                                    </p:set>
+                                  </p:childTnLst>
+                                </p:cTn>
+                              </p:par>
+                              <p:par>
+                                <p:cTn id="15" presetID="1" presetClass="entr" presetSubtype="0" fill="hold" nodeType="withEffect">
+                                  <p:stCondLst>
+                                    <p:cond delay="0"/>
+                                  </p:stCondLst>
+                                  <p:childTnLst>
+                                    <p:set>
+                                      <p:cBhvr>
+                                        <p:cTn id="16" dur="1" fill="hold">
+                                          <p:stCondLst>
+                                            <p:cond delay="0"/>
+                                          </p:stCondLst>
+                                        </p:cTn>
+                                        <p:tgtEl>
+                                          <p:spTgt spid="2050"/>
+                                        </p:tgtEl>
+                                        <p:attrNameLst>
+                                          <p:attrName>style.visibility</p:attrName>
+                                        </p:attrNameLst>
+                                      </p:cBhvr>
+                                      <p:to>
+                                        <p:strVal val="visible"/>
+                                      </p:to>
+                                    </p:set>
+                                  </p:childTnLst>
+                                </p:cTn>
+                              </p:par>
+                              <p:par>
+                                <p:cTn id="17" presetID="6" presetClass="emph" presetSubtype="0" fill="hold" nodeType="withEffect">
+                                  <p:stCondLst>
+                                    <p:cond delay="0"/>
+                                  </p:stCondLst>
+                                  <p:childTnLst>
+                                    <p:animScale>
+                                      <p:cBhvr>
+                                        <p:cTn id="18" dur="2000" fill="hold"/>
+                                        <p:tgtEl>
+                                          <p:spTgt spid="2050"/>
+                                        </p:tgtEl>
+                                      </p:cBhvr>
+                                      <p:by x="350000" y="350000"/>
+                                    </p:animScale>
+                                  </p:childTnLst>
+                                </p:cTn>
+                              </p:par>
+                              <p:par>
+                                <p:cTn id="19" presetID="49" presetClass="path" presetSubtype="0" accel="50000" decel="50000" fill="hold" nodeType="withEffect">
+                                  <p:stCondLst>
+                                    <p:cond delay="0"/>
+                                  </p:stCondLst>
+                                  <p:childTnLst>
+                                    <p:animMotion origin="layout" path="M 2.22222E-6 2.96296E-6 L 0.40191 0.22037 " pathEditMode="relative" rAng="0" ptsTypes="AA">
+                                      <p:cBhvr>
+                                        <p:cTn id="20" dur="2000" fill="hold"/>
+                                        <p:tgtEl>
+                                          <p:spTgt spid="2050"/>
+                                        </p:tgtEl>
+                                        <p:attrNameLst>
+                                          <p:attrName>ppt_x</p:attrName>
+                                          <p:attrName>ppt_y</p:attrName>
+                                        </p:attrNameLst>
+                                      </p:cBhvr>
+                                      <p:rCtr x="201" y="110"/>
+                                    </p:animMotion>
+                                  </p:childTnLst>
+                                </p:cTn>
+                              </p:par>
+                              <p:par>
+                                <p:cTn id="21" presetID="1" presetClass="entr" presetSubtype="0" fill="hold" grpId="0" nodeType="withEffect">
+                                  <p:stCondLst>
+                                    <p:cond delay="0"/>
+                                  </p:stCondLst>
+                                  <p:childTnLst>
+                                    <p:set>
+                                      <p:cBhvr>
+                                        <p:cTn id="22" dur="1" fill="hold">
+                                          <p:stCondLst>
+                                            <p:cond delay="0"/>
+                                          </p:stCondLst>
+                                        </p:cTn>
+                                        <p:tgtEl>
+                                          <p:spTgt spid="15"/>
+                                        </p:tgtEl>
+                                        <p:attrNameLst>
+                                          <p:attrName>style.visibility</p:attrName>
+                                        </p:attrNameLst>
+                                      </p:cBhvr>
+                                      <p:to>
+                                        <p:strVal val="visible"/>
+                                      </p:to>
+                                    </p:set>
+                                  </p:childTnLst>
+                                </p:cTn>
+                              </p:par>
+                            </p:childTnLst>
+                          </p:cTn>
+                        </p:par>
+                        <p:par>
+                          <p:cTn id="23" fill="hold">
+                            <p:stCondLst>
+                              <p:cond delay="4000"/>
+                            </p:stCondLst>
+                            <p:childTnLst>
+                              <p:par>
+                                <p:cTn id="24" presetID="1" presetClass="exit" presetSubtype="0" fill="hold" nodeType="afterEffect">
+                                  <p:stCondLst>
+                                    <p:cond delay="0"/>
+                                  </p:stCondLst>
+                                  <p:childTnLst>
+                                    <p:set>
+                                      <p:cBhvr>
+                                        <p:cTn id="25" dur="1" fill="hold">
+                                          <p:stCondLst>
+                                            <p:cond delay="0"/>
+                                          </p:stCondLst>
+                                        </p:cTn>
+                                        <p:tgtEl>
+                                          <p:spTgt spid="2050"/>
+                                        </p:tgtEl>
+                                        <p:attrNameLst>
+                                          <p:attrName>style.visibility</p:attrName>
+                                        </p:attrNameLst>
+                                      </p:cBhvr>
+                                      <p:to>
+                                        <p:strVal val="hidden"/>
+                                      </p:to>
+                                    </p:set>
+                                  </p:childTnLst>
+                                </p:cTn>
+                              </p:par>
+                              <p:par>
+                                <p:cTn id="26" presetID="1" presetClass="entr" presetSubtype="0" fill="hold" nodeType="withEffect">
+                                  <p:stCondLst>
+                                    <p:cond delay="0"/>
+                                  </p:stCondLst>
+                                  <p:childTnLst>
+                                    <p:set>
+                                      <p:cBhvr>
+                                        <p:cTn id="27" dur="1" fill="hold">
+                                          <p:stCondLst>
+                                            <p:cond delay="0"/>
+                                          </p:stCondLst>
+                                        </p:cTn>
+                                        <p:tgtEl>
+                                          <p:spTgt spid="14"/>
+                                        </p:tgtEl>
+                                        <p:attrNameLst>
+                                          <p:attrName>style.visibility</p:attrName>
+                                        </p:attrNameLst>
+                                      </p:cBhvr>
+                                      <p:to>
+                                        <p:strVal val="visible"/>
+                                      </p:to>
+                                    </p:set>
+                                  </p:childTnLst>
+                                </p:cTn>
+                              </p:par>
+                              <p:par>
+                                <p:cTn id="28" presetID="1" presetClass="entr" presetSubtype="0" fill="hold" nodeType="withEffect">
+                                  <p:stCondLst>
+                                    <p:cond delay="0"/>
+                                  </p:stCondLst>
+                                  <p:childTnLst>
+                                    <p:set>
+                                      <p:cBhvr>
+                                        <p:cTn id="29" dur="1" fill="hold">
+                                          <p:stCondLst>
+                                            <p:cond delay="0"/>
+                                          </p:stCondLst>
+                                        </p:cTn>
+                                        <p:tgtEl>
+                                          <p:spTgt spid="18"/>
+                                        </p:tgtEl>
+                                        <p:attrNameLst>
+                                          <p:attrName>style.visibility</p:attrName>
+                                        </p:attrNameLst>
+                                      </p:cBhvr>
+                                      <p:to>
+                                        <p:strVal val="visible"/>
+                                      </p:to>
+                                    </p:set>
+                                  </p:childTnLst>
+                                </p:cTn>
+                              </p:par>
+                              <p:par>
+                                <p:cTn id="30" presetID="1" presetClass="entr" presetSubtype="0" fill="hold" nodeType="withEffect">
+                                  <p:stCondLst>
+                                    <p:cond delay="0"/>
+                                  </p:stCondLst>
+                                  <p:childTnLst>
+                                    <p:set>
+                                      <p:cBhvr>
+                                        <p:cTn id="31" dur="1" fill="hold">
+                                          <p:stCondLst>
+                                            <p:cond delay="0"/>
+                                          </p:stCondLst>
+                                        </p:cTn>
+                                        <p:tgtEl>
+                                          <p:spTgt spid="19"/>
+                                        </p:tgtEl>
+                                        <p:attrNameLst>
+                                          <p:attrName>style.visibility</p:attrName>
+                                        </p:attrNameLst>
+                                      </p:cBhvr>
+                                      <p:to>
+                                        <p:strVal val="visible"/>
+                                      </p:to>
+                                    </p:set>
+                                  </p:childTnLst>
+                                </p:cTn>
+                              </p:par>
+                            </p:childTnLst>
+                          </p:cTn>
+                        </p:par>
+                        <p:par>
+                          <p:cTn id="32" fill="hold">
+                            <p:stCondLst>
+                              <p:cond delay="4000"/>
+                            </p:stCondLst>
+                            <p:childTnLst>
+                              <p:par>
+                                <p:cTn id="33" presetID="1" presetClass="entr" presetSubtype="0" fill="hold" grpId="0" nodeType="afterEffect">
+                                  <p:stCondLst>
+                                    <p:cond delay="0"/>
+                                  </p:stCondLst>
+                                  <p:childTnLst>
+                                    <p:set>
+                                      <p:cBhvr>
+                                        <p:cTn id="34" dur="1" fill="hold">
+                                          <p:stCondLst>
+                                            <p:cond delay="0"/>
+                                          </p:stCondLst>
+                                        </p:cTn>
+                                        <p:tgtEl>
+                                          <p:spTgt spid="20"/>
+                                        </p:tgtEl>
+                                        <p:attrNameLst>
+                                          <p:attrName>style.visibility</p:attrName>
+                                        </p:attrNameLst>
+                                      </p:cBhvr>
+                                      <p:to>
+                                        <p:strVal val="visible"/>
+                                      </p:to>
+                                    </p:set>
+                                  </p:childTnLst>
+                                </p:cTn>
+                              </p:par>
+                            </p:childTnLst>
+                          </p:cTn>
+                        </p:par>
+                      </p:childTnLst>
+                    </p:cTn>
+                  </p:par>
+                </p:childTnLst>
+              </p:cTn>
+              <p:prevCondLst>
+                <p:cond evt="onPrev" delay="0">
+                  <p:tgtEl>
+                    <p:sldTgt/>
+                  </p:tgtEl>
+                </p:cond>
+              </p:prevCondLst>
+              <p:nextCondLst>
+                <p:cond evt="onNext" delay="0">
+                  <p:tgtEl>
+                    <p:sldTgt/>
+                  </p:tgtEl>
+                </p:cond>
+              </p:nextCondLst>
+            </p:seq>
+          </p:childTnLst>
+        </p:cTn>
       </p:par>
     </p:tnLst>
+    <p:bldLst>
+      <p:bldP spid="15" grpId="0" animBg="1"/>
+      <p:bldP spid="20" grpId="0" animBg="1"/>
+    </p:bldLst>
   </p:timing>
 </p:sld>
 </file>
@@ -18080,7 +19007,7 @@
           <a:blip r:embed="rId3" cstate="print">
             <a:extLst>
               <a:ext uri="{28A0092B-C50C-407E-A947-70E740481C1C}">
-                <a14:useLocalDpi xmlns="" xmlns:a14="http://schemas.microsoft.com/office/drawing/2010/main" val="0"/>
+                <a14:useLocalDpi xmlns:a14="http://schemas.microsoft.com/office/drawing/2010/main" xmlns="" val="0"/>
               </a:ext>
             </a:extLst>
           </a:blip>
@@ -18135,7 +19062,7 @@
     </p:spTree>
     <p:extLst>
       <p:ext uri="{BB962C8B-B14F-4D97-AF65-F5344CB8AC3E}">
-        <p14:creationId xmlns="" xmlns:p14="http://schemas.microsoft.com/office/powerpoint/2010/main" val="2681693288"/>
+        <p14:creationId xmlns:p14="http://schemas.microsoft.com/office/powerpoint/2010/main" xmlns="" val="2681693288"/>
       </p:ext>
     </p:extLst>
   </p:cSld>
@@ -18337,7 +19264,7 @@
     </p:spTree>
     <p:extLst>
       <p:ext uri="{BB962C8B-B14F-4D97-AF65-F5344CB8AC3E}">
-        <p14:creationId xmlns="" xmlns:p14="http://schemas.microsoft.com/office/powerpoint/2010/main" val="2681693288"/>
+        <p14:creationId xmlns:p14="http://schemas.microsoft.com/office/powerpoint/2010/main" xmlns="" val="2681693288"/>
       </p:ext>
     </p:extLst>
   </p:cSld>
@@ -18837,7 +19764,7 @@
     </p:spTree>
     <p:extLst>
       <p:ext uri="{BB962C8B-B14F-4D97-AF65-F5344CB8AC3E}">
-        <p14:creationId xmlns="" xmlns:p14="http://schemas.microsoft.com/office/powerpoint/2010/main" val="2857272158"/>
+        <p14:creationId xmlns:p14="http://schemas.microsoft.com/office/powerpoint/2010/main" xmlns="" val="2857272158"/>
       </p:ext>
     </p:extLst>
   </p:cSld>
@@ -19212,7 +20139,7 @@
     </p:spTree>
     <p:extLst>
       <p:ext uri="{BB962C8B-B14F-4D97-AF65-F5344CB8AC3E}">
-        <p14:creationId xmlns="" xmlns:p14="http://schemas.microsoft.com/office/powerpoint/2010/main" val="3542583579"/>
+        <p14:creationId xmlns:p14="http://schemas.microsoft.com/office/powerpoint/2010/main" xmlns="" val="3542583579"/>
       </p:ext>
     </p:extLst>
   </p:cSld>
@@ -19723,7 +20650,7 @@
           <a:blip r:embed="rId3" cstate="print">
             <a:extLst>
               <a:ext uri="{28A0092B-C50C-407E-A947-70E740481C1C}">
-                <a14:useLocalDpi xmlns="" xmlns:a14="http://schemas.microsoft.com/office/drawing/2010/main" val="0"/>
+                <a14:useLocalDpi xmlns:a14="http://schemas.microsoft.com/office/drawing/2010/main" xmlns="" val="0"/>
               </a:ext>
             </a:extLst>
           </a:blip>
@@ -19744,7 +20671,7 @@
     </p:spTree>
     <p:extLst>
       <p:ext uri="{BB962C8B-B14F-4D97-AF65-F5344CB8AC3E}">
-        <p14:creationId xmlns="" xmlns:p14="http://schemas.microsoft.com/office/powerpoint/2010/main" val="3542583579"/>
+        <p14:creationId xmlns:p14="http://schemas.microsoft.com/office/powerpoint/2010/main" xmlns="" val="3542583579"/>
       </p:ext>
     </p:extLst>
   </p:cSld>

</xml_diff>

<commit_message>
Animation Folie 31 - Planung bis Projektende
Signed-off-by: MAG <mxthammel@gmail.com>
</commit_message>
<xml_diff>
--- a/Dokumente/Abschlusspr�si/Abschlusspr�sentation.pptx
+++ b/Dokumente/Abschlusspr�si/Abschlusspr�sentation.pptx
@@ -18020,54 +18020,190 @@
           </a:p>
         </p:txBody>
       </p:sp>
-      <p:pic>
-        <p:nvPicPr>
-          <p:cNvPr id="3074" name="Picture 2" descr="http://1.1.1.3/bmi/www.stoag.de/uploads/RTEmagicC_Icons_Kontrolle.jpg.jpg"/>
-          <p:cNvPicPr>
-            <a:picLocks noChangeAspect="1" noChangeArrowheads="1"/>
-          </p:cNvPicPr>
+      <p:sp>
+        <p:nvSpPr>
+          <p:cNvPr id="9" name="Ellipse 8"/>
+          <p:cNvSpPr/>
           <p:nvPr/>
-        </p:nvPicPr>
-        <p:blipFill rotWithShape="1">
-          <a:blip r:embed="rId2" cstate="print">
-            <a:extLst>
-              <a:ext uri="{BEBA8EAE-BF5A-486C-A8C5-ECC9F3942E4B}">
-                <a14:imgProps xmlns:a14="http://schemas.microsoft.com/office/drawing/2010/main">
-                  <a14:imgLayer r:embed="rId3">
-                    <a14:imgEffect>
-                      <a14:backgroundRemoval t="6057" b="22942" l="7000" r="29162"/>
-                    </a14:imgEffect>
-                  </a14:imgLayer>
-                </a14:imgProps>
-              </a:ext>
-              <a:ext uri="{28A0092B-C50C-407E-A947-70E740481C1C}">
-                <a14:useLocalDpi xmlns:a14="http://schemas.microsoft.com/office/drawing/2010/main" val="0"/>
-              </a:ext>
-            </a:extLst>
-          </a:blip>
-          <a:srcRect l="4230" t="3946" r="68068" b="74947"/>
-          <a:stretch/>
-        </p:blipFill>
-        <p:spPr bwMode="auto">
+        </p:nvSpPr>
+        <p:spPr>
           <a:xfrm>
-            <a:off x="4967098" y="1844824"/>
-            <a:ext cx="541006" cy="485040"/>
+            <a:off x="5046770" y="1943328"/>
+            <a:ext cx="360040" cy="333544"/>
           </a:xfrm>
-          <a:prstGeom prst="rect">
+          <a:prstGeom prst="ellipse">
             <a:avLst/>
           </a:prstGeom>
           <a:noFill/>
-          <a:extLst>
-            <a:ext uri="{909E8E84-426E-40DD-AFC4-6F175D3DCCD1}">
-              <a14:hiddenFill xmlns:a14="http://schemas.microsoft.com/office/drawing/2010/main">
-                <a:solidFill>
-                  <a:srgbClr val="FFFFFF"/>
-                </a:solidFill>
-              </a14:hiddenFill>
-            </a:ext>
-          </a:extLst>
+          <a:ln w="38100">
+            <a:solidFill>
+              <a:schemeClr val="tx2"/>
+            </a:solidFill>
+          </a:ln>
         </p:spPr>
-      </p:pic>
+        <p:style>
+          <a:lnRef idx="2">
+            <a:schemeClr val="accent1">
+              <a:shade val="50000"/>
+            </a:schemeClr>
+          </a:lnRef>
+          <a:fillRef idx="1">
+            <a:schemeClr val="accent1"/>
+          </a:fillRef>
+          <a:effectRef idx="0">
+            <a:schemeClr val="accent1"/>
+          </a:effectRef>
+          <a:fontRef idx="minor">
+            <a:schemeClr val="lt1"/>
+          </a:fontRef>
+        </p:style>
+        <p:txBody>
+          <a:bodyPr rtlCol="0" anchor="ctr"/>
+          <a:lstStyle/>
+          <a:p>
+            <a:pPr algn="ctr"/>
+            <a:endParaRPr lang="de-DE"/>
+          </a:p>
+        </p:txBody>
+      </p:sp>
+      <p:sp>
+        <p:nvSpPr>
+          <p:cNvPr id="14" name="Ellipse 13"/>
+          <p:cNvSpPr/>
+          <p:nvPr/>
+        </p:nvSpPr>
+        <p:spPr>
+          <a:xfrm>
+            <a:off x="5046770" y="2433012"/>
+            <a:ext cx="360040" cy="333544"/>
+          </a:xfrm>
+          <a:prstGeom prst="ellipse">
+            <a:avLst/>
+          </a:prstGeom>
+          <a:noFill/>
+          <a:ln w="38100">
+            <a:solidFill>
+              <a:schemeClr val="tx2"/>
+            </a:solidFill>
+          </a:ln>
+        </p:spPr>
+        <p:style>
+          <a:lnRef idx="2">
+            <a:schemeClr val="accent1">
+              <a:shade val="50000"/>
+            </a:schemeClr>
+          </a:lnRef>
+          <a:fillRef idx="1">
+            <a:schemeClr val="accent1"/>
+          </a:fillRef>
+          <a:effectRef idx="0">
+            <a:schemeClr val="accent1"/>
+          </a:effectRef>
+          <a:fontRef idx="minor">
+            <a:schemeClr val="lt1"/>
+          </a:fontRef>
+        </p:style>
+        <p:txBody>
+          <a:bodyPr rtlCol="0" anchor="ctr"/>
+          <a:lstStyle/>
+          <a:p>
+            <a:pPr algn="ctr"/>
+            <a:endParaRPr lang="de-DE"/>
+          </a:p>
+        </p:txBody>
+      </p:sp>
+      <p:sp>
+        <p:nvSpPr>
+          <p:cNvPr id="15" name="Ellipse 14"/>
+          <p:cNvSpPr/>
+          <p:nvPr/>
+        </p:nvSpPr>
+        <p:spPr>
+          <a:xfrm>
+            <a:off x="5046770" y="2922857"/>
+            <a:ext cx="360040" cy="333544"/>
+          </a:xfrm>
+          <a:prstGeom prst="ellipse">
+            <a:avLst/>
+          </a:prstGeom>
+          <a:noFill/>
+          <a:ln w="38100">
+            <a:solidFill>
+              <a:schemeClr val="tx2"/>
+            </a:solidFill>
+          </a:ln>
+        </p:spPr>
+        <p:style>
+          <a:lnRef idx="2">
+            <a:schemeClr val="accent1">
+              <a:shade val="50000"/>
+            </a:schemeClr>
+          </a:lnRef>
+          <a:fillRef idx="1">
+            <a:schemeClr val="accent1"/>
+          </a:fillRef>
+          <a:effectRef idx="0">
+            <a:schemeClr val="accent1"/>
+          </a:effectRef>
+          <a:fontRef idx="minor">
+            <a:schemeClr val="lt1"/>
+          </a:fontRef>
+        </p:style>
+        <p:txBody>
+          <a:bodyPr rtlCol="0" anchor="ctr"/>
+          <a:lstStyle/>
+          <a:p>
+            <a:pPr algn="ctr"/>
+            <a:endParaRPr lang="de-DE"/>
+          </a:p>
+        </p:txBody>
+      </p:sp>
+      <p:sp>
+        <p:nvSpPr>
+          <p:cNvPr id="16" name="Ellipse 15"/>
+          <p:cNvSpPr/>
+          <p:nvPr/>
+        </p:nvSpPr>
+        <p:spPr>
+          <a:xfrm>
+            <a:off x="5046770" y="3356992"/>
+            <a:ext cx="360040" cy="333544"/>
+          </a:xfrm>
+          <a:prstGeom prst="ellipse">
+            <a:avLst/>
+          </a:prstGeom>
+          <a:noFill/>
+          <a:ln w="38100">
+            <a:solidFill>
+              <a:schemeClr val="tx2"/>
+            </a:solidFill>
+          </a:ln>
+        </p:spPr>
+        <p:style>
+          <a:lnRef idx="2">
+            <a:schemeClr val="accent1">
+              <a:shade val="50000"/>
+            </a:schemeClr>
+          </a:lnRef>
+          <a:fillRef idx="1">
+            <a:schemeClr val="accent1"/>
+          </a:fillRef>
+          <a:effectRef idx="0">
+            <a:schemeClr val="accent1"/>
+          </a:effectRef>
+          <a:fontRef idx="minor">
+            <a:schemeClr val="lt1"/>
+          </a:fontRef>
+        </p:style>
+        <p:txBody>
+          <a:bodyPr rtlCol="0" anchor="ctr"/>
+          <a:lstStyle/>
+          <a:p>
+            <a:pPr algn="ctr"/>
+            <a:endParaRPr lang="de-DE"/>
+          </a:p>
+        </p:txBody>
+      </p:sp>
       <p:pic>
         <p:nvPicPr>
           <p:cNvPr id="10" name="Picture 2" descr="http://1.1.1.3/bmi/www.stoag.de/uploads/RTEmagicC_Icons_Kontrolle.jpg.jpg"/>
@@ -18098,7 +18234,7 @@
         </p:blipFill>
         <p:spPr bwMode="auto">
           <a:xfrm>
-            <a:off x="4967098" y="2276872"/>
+            <a:off x="5046770" y="1827545"/>
             <a:ext cx="541006" cy="485040"/>
           </a:xfrm>
           <a:prstGeom prst="rect">
@@ -18116,52 +18252,54 @@
           </a:extLst>
         </p:spPr>
       </p:pic>
-      <p:sp>
-        <p:nvSpPr>
-          <p:cNvPr id="9" name="Ellipse 8"/>
-          <p:cNvSpPr/>
+      <p:pic>
+        <p:nvPicPr>
+          <p:cNvPr id="17" name="Picture 2" descr="http://1.1.1.3/bmi/www.stoag.de/uploads/RTEmagicC_Icons_Kontrolle.jpg.jpg"/>
+          <p:cNvPicPr>
+            <a:picLocks noChangeAspect="1" noChangeArrowheads="1"/>
+          </p:cNvPicPr>
           <p:nvPr/>
-        </p:nvSpPr>
-        <p:spPr>
+        </p:nvPicPr>
+        <p:blipFill rotWithShape="1">
+          <a:blip r:embed="rId2" cstate="print">
+            <a:extLst>
+              <a:ext uri="{BEBA8EAE-BF5A-486C-A8C5-ECC9F3942E4B}">
+                <a14:imgProps xmlns:a14="http://schemas.microsoft.com/office/drawing/2010/main">
+                  <a14:imgLayer r:embed="rId3">
+                    <a14:imgEffect>
+                      <a14:backgroundRemoval t="6057" b="22942" l="7000" r="29162"/>
+                    </a14:imgEffect>
+                  </a14:imgLayer>
+                </a14:imgProps>
+              </a:ext>
+              <a:ext uri="{28A0092B-C50C-407E-A947-70E740481C1C}">
+                <a14:useLocalDpi xmlns:a14="http://schemas.microsoft.com/office/drawing/2010/main" val="0"/>
+              </a:ext>
+            </a:extLst>
+          </a:blip>
+          <a:srcRect l="4230" t="3946" r="68068" b="74947"/>
+          <a:stretch/>
+        </p:blipFill>
+        <p:spPr bwMode="auto">
           <a:xfrm>
-            <a:off x="4932040" y="1844824"/>
-            <a:ext cx="576064" cy="504056"/>
+            <a:off x="5049498" y="2321027"/>
+            <a:ext cx="541006" cy="485040"/>
           </a:xfrm>
-          <a:prstGeom prst="ellipse">
+          <a:prstGeom prst="rect">
             <a:avLst/>
           </a:prstGeom>
           <a:noFill/>
-          <a:ln w="38100">
-            <a:solidFill>
-              <a:srgbClr val="FF0000"/>
-            </a:solidFill>
-          </a:ln>
+          <a:extLst>
+            <a:ext uri="{909E8E84-426E-40DD-AFC4-6F175D3DCCD1}">
+              <a14:hiddenFill xmlns:a14="http://schemas.microsoft.com/office/drawing/2010/main">
+                <a:solidFill>
+                  <a:srgbClr val="FFFFFF"/>
+                </a:solidFill>
+              </a14:hiddenFill>
+            </a:ext>
+          </a:extLst>
         </p:spPr>
-        <p:style>
-          <a:lnRef idx="2">
-            <a:schemeClr val="accent1">
-              <a:shade val="50000"/>
-            </a:schemeClr>
-          </a:lnRef>
-          <a:fillRef idx="1">
-            <a:schemeClr val="accent1"/>
-          </a:fillRef>
-          <a:effectRef idx="0">
-            <a:schemeClr val="accent1"/>
-          </a:effectRef>
-          <a:fontRef idx="minor">
-            <a:schemeClr val="lt1"/>
-          </a:fontRef>
-        </p:style>
-        <p:txBody>
-          <a:bodyPr rtlCol="0" anchor="ctr"/>
-          <a:lstStyle/>
-          <a:p>
-            <a:pPr algn="ctr"/>
-            <a:endParaRPr lang="de-DE"/>
-          </a:p>
-        </p:txBody>
-      </p:sp>
+      </p:pic>
     </p:spTree>
     <p:extLst>
       <p:ext uri="{BB962C8B-B14F-4D97-AF65-F5344CB8AC3E}">
@@ -18178,7 +18316,127 @@
   <p:timing>
     <p:tnLst>
       <p:par>
-        <p:cTn id="1" dur="indefinite" restart="never" nodeType="tmRoot"/>
+        <p:cTn id="1" dur="indefinite" restart="never" nodeType="tmRoot">
+          <p:childTnLst>
+            <p:seq concurrent="1" nextAc="seek">
+              <p:cTn id="2" dur="indefinite" nodeType="mainSeq">
+                <p:childTnLst>
+                  <p:par>
+                    <p:cTn id="3" fill="hold">
+                      <p:stCondLst>
+                        <p:cond delay="indefinite"/>
+                      </p:stCondLst>
+                      <p:childTnLst>
+                        <p:par>
+                          <p:cTn id="4" fill="hold">
+                            <p:stCondLst>
+                              <p:cond delay="0"/>
+                            </p:stCondLst>
+                            <p:childTnLst>
+                              <p:par>
+                                <p:cTn id="5" presetID="10" presetClass="entr" presetSubtype="0" fill="hold" nodeType="clickEffect">
+                                  <p:stCondLst>
+                                    <p:cond delay="0"/>
+                                  </p:stCondLst>
+                                  <p:childTnLst>
+                                    <p:set>
+                                      <p:cBhvr>
+                                        <p:cTn id="6" dur="1" fill="hold">
+                                          <p:stCondLst>
+                                            <p:cond delay="0"/>
+                                          </p:stCondLst>
+                                        </p:cTn>
+                                        <p:tgtEl>
+                                          <p:spTgt spid="17"/>
+                                        </p:tgtEl>
+                                        <p:attrNameLst>
+                                          <p:attrName>style.visibility</p:attrName>
+                                        </p:attrNameLst>
+                                      </p:cBhvr>
+                                      <p:to>
+                                        <p:strVal val="visible"/>
+                                      </p:to>
+                                    </p:set>
+                                    <p:animEffect transition="in" filter="fade">
+                                      <p:cBhvr>
+                                        <p:cTn id="7" dur="500"/>
+                                        <p:tgtEl>
+                                          <p:spTgt spid="17"/>
+                                        </p:tgtEl>
+                                      </p:cBhvr>
+                                    </p:animEffect>
+                                  </p:childTnLst>
+                                </p:cTn>
+                              </p:par>
+                            </p:childTnLst>
+                          </p:cTn>
+                        </p:par>
+                        <p:par>
+                          <p:cTn id="8" fill="hold">
+                            <p:stCondLst>
+                              <p:cond delay="500"/>
+                            </p:stCondLst>
+                            <p:childTnLst>
+                              <p:par>
+                                <p:cTn id="9" presetID="10" presetClass="entr" presetSubtype="0" fill="hold" nodeType="afterEffect">
+                                  <p:stCondLst>
+                                    <p:cond delay="0"/>
+                                  </p:stCondLst>
+                                  <p:childTnLst>
+                                    <p:set>
+                                      <p:cBhvr>
+                                        <p:cTn id="10" dur="1" fill="hold">
+                                          <p:stCondLst>
+                                            <p:cond delay="0"/>
+                                          </p:stCondLst>
+                                        </p:cTn>
+                                        <p:tgtEl>
+                                          <p:spTgt spid="10"/>
+                                        </p:tgtEl>
+                                        <p:attrNameLst>
+                                          <p:attrName>style.visibility</p:attrName>
+                                        </p:attrNameLst>
+                                      </p:cBhvr>
+                                      <p:to>
+                                        <p:strVal val="visible"/>
+                                      </p:to>
+                                    </p:set>
+                                    <p:animEffect transition="in" filter="fade">
+                                      <p:cBhvr>
+                                        <p:cTn id="11" dur="500"/>
+                                        <p:tgtEl>
+                                          <p:spTgt spid="10"/>
+                                        </p:tgtEl>
+                                      </p:cBhvr>
+                                    </p:animEffect>
+                                  </p:childTnLst>
+                                </p:cTn>
+                              </p:par>
+                            </p:childTnLst>
+                          </p:cTn>
+                        </p:par>
+                      </p:childTnLst>
+                    </p:cTn>
+                  </p:par>
+                </p:childTnLst>
+              </p:cTn>
+              <p:prevCondLst>
+                <p:cond evt="onPrev" delay="0">
+                  <p:tgtEl>
+                    <p:sldTgt/>
+                  </p:tgtEl>
+                </p:cond>
+              </p:prevCondLst>
+              <p:nextCondLst>
+                <p:cond evt="onNext" delay="0">
+                  <p:tgtEl>
+                    <p:sldTgt/>
+                  </p:tgtEl>
+                </p:cond>
+              </p:nextCondLst>
+            </p:seq>
+          </p:childTnLst>
+        </p:cTn>
       </p:par>
     </p:tnLst>
   </p:timing>

</xml_diff>

<commit_message>
Update Mockups in Präsi
</commit_message>
<xml_diff>
--- a/Dokumente/Abschlusspr�si/Abschlusspr�sentation.pptx
+++ b/Dokumente/Abschlusspr�si/Abschlusspr�sentation.pptx
@@ -403,7 +403,7 @@
     </p:spTree>
     <p:extLst>
       <p:ext uri="{BB962C8B-B14F-4D97-AF65-F5344CB8AC3E}">
-        <p14:creationId xmlns:p14="http://schemas.microsoft.com/office/powerpoint/2010/main" val="2610097957"/>
+        <p14:creationId xmlns:p14="http://schemas.microsoft.com/office/powerpoint/2010/main" xmlns="" val="2610097957"/>
       </p:ext>
     </p:extLst>
   </p:cSld>
@@ -578,7 +578,7 @@
     </p:spTree>
     <p:extLst>
       <p:ext uri="{BB962C8B-B14F-4D97-AF65-F5344CB8AC3E}">
-        <p14:creationId xmlns:p14="http://schemas.microsoft.com/office/powerpoint/2010/main" val="2116472317"/>
+        <p14:creationId xmlns:p14="http://schemas.microsoft.com/office/powerpoint/2010/main" xmlns="" val="2116472317"/>
       </p:ext>
     </p:extLst>
   </p:cSld>
@@ -667,7 +667,7 @@
     </p:spTree>
     <p:extLst>
       <p:ext uri="{BB962C8B-B14F-4D97-AF65-F5344CB8AC3E}">
-        <p14:creationId xmlns:p14="http://schemas.microsoft.com/office/powerpoint/2010/main" val="135288531"/>
+        <p14:creationId xmlns:p14="http://schemas.microsoft.com/office/powerpoint/2010/main" xmlns="" val="135288531"/>
       </p:ext>
     </p:extLst>
   </p:cSld>
@@ -760,7 +760,7 @@
     </p:spTree>
     <p:extLst>
       <p:ext uri="{BB962C8B-B14F-4D97-AF65-F5344CB8AC3E}">
-        <p14:creationId xmlns:p14="http://schemas.microsoft.com/office/powerpoint/2010/main" val="2825845930"/>
+        <p14:creationId xmlns:p14="http://schemas.microsoft.com/office/powerpoint/2010/main" xmlns="" val="2825845930"/>
       </p:ext>
     </p:extLst>
   </p:cSld>
@@ -861,7 +861,7 @@
     </p:spTree>
     <p:extLst>
       <p:ext uri="{BB962C8B-B14F-4D97-AF65-F5344CB8AC3E}">
-        <p14:creationId xmlns:p14="http://schemas.microsoft.com/office/powerpoint/2010/main" val="3912581999"/>
+        <p14:creationId xmlns:p14="http://schemas.microsoft.com/office/powerpoint/2010/main" xmlns="" val="3912581999"/>
       </p:ext>
     </p:extLst>
   </p:cSld>
@@ -994,7 +994,7 @@
     </p:spTree>
     <p:extLst>
       <p:ext uri="{BB962C8B-B14F-4D97-AF65-F5344CB8AC3E}">
-        <p14:creationId xmlns:p14="http://schemas.microsoft.com/office/powerpoint/2010/main" val="802076649"/>
+        <p14:creationId xmlns:p14="http://schemas.microsoft.com/office/powerpoint/2010/main" xmlns="" val="802076649"/>
       </p:ext>
     </p:extLst>
   </p:cSld>
@@ -1127,7 +1127,7 @@
     </p:spTree>
     <p:extLst>
       <p:ext uri="{BB962C8B-B14F-4D97-AF65-F5344CB8AC3E}">
-        <p14:creationId xmlns:p14="http://schemas.microsoft.com/office/powerpoint/2010/main" val="802076649"/>
+        <p14:creationId xmlns:p14="http://schemas.microsoft.com/office/powerpoint/2010/main" xmlns="" val="802076649"/>
       </p:ext>
     </p:extLst>
   </p:cSld>
@@ -1260,7 +1260,7 @@
     </p:spTree>
     <p:extLst>
       <p:ext uri="{BB962C8B-B14F-4D97-AF65-F5344CB8AC3E}">
-        <p14:creationId xmlns:p14="http://schemas.microsoft.com/office/powerpoint/2010/main" val="802076649"/>
+        <p14:creationId xmlns:p14="http://schemas.microsoft.com/office/powerpoint/2010/main" xmlns="" val="802076649"/>
       </p:ext>
     </p:extLst>
   </p:cSld>
@@ -1479,7 +1479,7 @@
     </p:spTree>
     <p:extLst>
       <p:ext uri="{BB962C8B-B14F-4D97-AF65-F5344CB8AC3E}">
-        <p14:creationId xmlns:p14="http://schemas.microsoft.com/office/powerpoint/2010/main" val="1629754142"/>
+        <p14:creationId xmlns:p14="http://schemas.microsoft.com/office/powerpoint/2010/main" xmlns="" val="1629754142"/>
       </p:ext>
     </p:extLst>
   </p:cSld>
@@ -1604,7 +1604,7 @@
     </p:spTree>
     <p:extLst>
       <p:ext uri="{BB962C8B-B14F-4D97-AF65-F5344CB8AC3E}">
-        <p14:creationId xmlns:p14="http://schemas.microsoft.com/office/powerpoint/2010/main" val="3931682397"/>
+        <p14:creationId xmlns:p14="http://schemas.microsoft.com/office/powerpoint/2010/main" xmlns="" val="3931682397"/>
       </p:ext>
     </p:extLst>
   </p:cSld>
@@ -1729,7 +1729,7 @@
     </p:spTree>
     <p:extLst>
       <p:ext uri="{BB962C8B-B14F-4D97-AF65-F5344CB8AC3E}">
-        <p14:creationId xmlns:p14="http://schemas.microsoft.com/office/powerpoint/2010/main" val="3931682397"/>
+        <p14:creationId xmlns:p14="http://schemas.microsoft.com/office/powerpoint/2010/main" xmlns="" val="3931682397"/>
       </p:ext>
     </p:extLst>
   </p:cSld>
@@ -2110,7 +2110,7 @@
     </p:spTree>
     <p:extLst>
       <p:ext uri="{BB962C8B-B14F-4D97-AF65-F5344CB8AC3E}">
-        <p14:creationId xmlns:p14="http://schemas.microsoft.com/office/powerpoint/2010/main" val="517533983"/>
+        <p14:creationId xmlns:p14="http://schemas.microsoft.com/office/powerpoint/2010/main" xmlns="" val="517533983"/>
       </p:ext>
     </p:extLst>
   </p:cSld>
@@ -2387,7 +2387,7 @@
     </p:spTree>
     <p:extLst>
       <p:ext uri="{BB962C8B-B14F-4D97-AF65-F5344CB8AC3E}">
-        <p14:creationId xmlns:p14="http://schemas.microsoft.com/office/powerpoint/2010/main" val="1616458392"/>
+        <p14:creationId xmlns:p14="http://schemas.microsoft.com/office/powerpoint/2010/main" xmlns="" val="1616458392"/>
       </p:ext>
     </p:extLst>
   </p:cSld>
@@ -2472,7 +2472,7 @@
     </p:spTree>
     <p:extLst>
       <p:ext uri="{BB962C8B-B14F-4D97-AF65-F5344CB8AC3E}">
-        <p14:creationId xmlns:p14="http://schemas.microsoft.com/office/powerpoint/2010/main" val="2116472317"/>
+        <p14:creationId xmlns:p14="http://schemas.microsoft.com/office/powerpoint/2010/main" xmlns="" val="2116472317"/>
       </p:ext>
     </p:extLst>
   </p:cSld>
@@ -2797,7 +2797,7 @@
     </p:spTree>
     <p:extLst>
       <p:ext uri="{BB962C8B-B14F-4D97-AF65-F5344CB8AC3E}">
-        <p14:creationId xmlns:p14="http://schemas.microsoft.com/office/powerpoint/2010/main" val="517533983"/>
+        <p14:creationId xmlns:p14="http://schemas.microsoft.com/office/powerpoint/2010/main" xmlns="" val="517533983"/>
       </p:ext>
     </p:extLst>
   </p:cSld>
@@ -2973,7 +2973,7 @@
     </p:spTree>
     <p:extLst>
       <p:ext uri="{BB962C8B-B14F-4D97-AF65-F5344CB8AC3E}">
-        <p14:creationId xmlns:p14="http://schemas.microsoft.com/office/powerpoint/2010/main" val="2934279750"/>
+        <p14:creationId xmlns:p14="http://schemas.microsoft.com/office/powerpoint/2010/main" xmlns="" val="2934279750"/>
       </p:ext>
     </p:extLst>
   </p:cSld>
@@ -3070,7 +3070,7 @@
     </p:spTree>
     <p:extLst>
       <p:ext uri="{BB962C8B-B14F-4D97-AF65-F5344CB8AC3E}">
-        <p14:creationId xmlns:p14="http://schemas.microsoft.com/office/powerpoint/2010/main" val="2934279750"/>
+        <p14:creationId xmlns:p14="http://schemas.microsoft.com/office/powerpoint/2010/main" xmlns="" val="2934279750"/>
       </p:ext>
     </p:extLst>
   </p:cSld>
@@ -3163,7 +3163,7 @@
     </p:spTree>
     <p:extLst>
       <p:ext uri="{BB962C8B-B14F-4D97-AF65-F5344CB8AC3E}">
-        <p14:creationId xmlns:p14="http://schemas.microsoft.com/office/powerpoint/2010/main" val="2934279750"/>
+        <p14:creationId xmlns:p14="http://schemas.microsoft.com/office/powerpoint/2010/main" xmlns="" val="2934279750"/>
       </p:ext>
     </p:extLst>
   </p:cSld>
@@ -3573,7 +3573,7 @@
     </p:spTree>
     <p:extLst>
       <p:ext uri="{BB962C8B-B14F-4D97-AF65-F5344CB8AC3E}">
-        <p14:creationId xmlns:p14="http://schemas.microsoft.com/office/powerpoint/2010/main" val="2934279750"/>
+        <p14:creationId xmlns:p14="http://schemas.microsoft.com/office/powerpoint/2010/main" xmlns="" val="2934279750"/>
       </p:ext>
     </p:extLst>
   </p:cSld>
@@ -3658,7 +3658,7 @@
     </p:spTree>
     <p:extLst>
       <p:ext uri="{BB962C8B-B14F-4D97-AF65-F5344CB8AC3E}">
-        <p14:creationId xmlns:p14="http://schemas.microsoft.com/office/powerpoint/2010/main" val="3860513045"/>
+        <p14:creationId xmlns:p14="http://schemas.microsoft.com/office/powerpoint/2010/main" xmlns="" val="3860513045"/>
       </p:ext>
     </p:extLst>
   </p:cSld>
@@ -3755,7 +3755,7 @@
     </p:spTree>
     <p:extLst>
       <p:ext uri="{BB962C8B-B14F-4D97-AF65-F5344CB8AC3E}">
-        <p14:creationId xmlns:p14="http://schemas.microsoft.com/office/powerpoint/2010/main" val="2934279750"/>
+        <p14:creationId xmlns:p14="http://schemas.microsoft.com/office/powerpoint/2010/main" xmlns="" val="2934279750"/>
       </p:ext>
     </p:extLst>
   </p:cSld>
@@ -8028,7 +8028,7 @@
           <a:blip r:embed="rId13" cstate="print">
             <a:extLst>
               <a:ext uri="{28A0092B-C50C-407E-A947-70E740481C1C}">
-                <a14:useLocalDpi xmlns:a14="http://schemas.microsoft.com/office/drawing/2010/main" val="0"/>
+                <a14:useLocalDpi xmlns:a14="http://schemas.microsoft.com/office/drawing/2010/main" xmlns="" val="0"/>
               </a:ext>
             </a:extLst>
           </a:blip>
@@ -8529,7 +8529,7 @@
           <a:blip r:embed="rId3" cstate="print">
             <a:extLst>
               <a:ext uri="{28A0092B-C50C-407E-A947-70E740481C1C}">
-                <a14:useLocalDpi xmlns:a14="http://schemas.microsoft.com/office/drawing/2010/main" val="0"/>
+                <a14:useLocalDpi xmlns:a14="http://schemas.microsoft.com/office/drawing/2010/main" xmlns="" val="0"/>
               </a:ext>
             </a:extLst>
           </a:blip>
@@ -8559,7 +8559,7 @@
           <a:blip r:embed="rId4" cstate="print">
             <a:extLst>
               <a:ext uri="{28A0092B-C50C-407E-A947-70E740481C1C}">
-                <a14:useLocalDpi xmlns:a14="http://schemas.microsoft.com/office/drawing/2010/main" val="0"/>
+                <a14:useLocalDpi xmlns:a14="http://schemas.microsoft.com/office/drawing/2010/main" xmlns="" val="0"/>
               </a:ext>
             </a:extLst>
           </a:blip>
@@ -9005,7 +9005,7 @@
           <a:blip r:embed="rId3" cstate="print">
             <a:extLst>
               <a:ext uri="{28A0092B-C50C-407E-A947-70E740481C1C}">
-                <a14:useLocalDpi xmlns:a14="http://schemas.microsoft.com/office/drawing/2010/main" val="0"/>
+                <a14:useLocalDpi xmlns:a14="http://schemas.microsoft.com/office/drawing/2010/main" xmlns="" val="0"/>
               </a:ext>
             </a:extLst>
           </a:blip>
@@ -9026,7 +9026,7 @@
     </p:spTree>
     <p:extLst>
       <p:ext uri="{BB962C8B-B14F-4D97-AF65-F5344CB8AC3E}">
-        <p14:creationId xmlns:p14="http://schemas.microsoft.com/office/powerpoint/2010/main" val="3542583579"/>
+        <p14:creationId xmlns:p14="http://schemas.microsoft.com/office/powerpoint/2010/main" xmlns="" val="3542583579"/>
       </p:ext>
     </p:extLst>
   </p:cSld>
@@ -9504,7 +9504,7 @@
     </p:spTree>
     <p:extLst>
       <p:ext uri="{BB962C8B-B14F-4D97-AF65-F5344CB8AC3E}">
-        <p14:creationId xmlns:p14="http://schemas.microsoft.com/office/powerpoint/2010/main" val="351671181"/>
+        <p14:creationId xmlns:p14="http://schemas.microsoft.com/office/powerpoint/2010/main" xmlns="" val="351671181"/>
       </p:ext>
     </p:extLst>
   </p:cSld>
@@ -10858,7 +10858,7 @@
     </p:spTree>
     <p:extLst>
       <p:ext uri="{BB962C8B-B14F-4D97-AF65-F5344CB8AC3E}">
-        <p14:creationId xmlns:p14="http://schemas.microsoft.com/office/powerpoint/2010/main" val="39477268"/>
+        <p14:creationId xmlns:p14="http://schemas.microsoft.com/office/powerpoint/2010/main" xmlns="" val="39477268"/>
       </p:ext>
     </p:extLst>
   </p:cSld>
@@ -12073,7 +12073,6 @@
         </p:nvPicPr>
         <p:blipFill>
           <a:blip r:embed="rId2" cstate="print"/>
-          <a:srcRect/>
           <a:stretch>
             <a:fillRect/>
           </a:stretch>
@@ -12081,7 +12080,7 @@
         <p:spPr bwMode="auto">
           <a:xfrm>
             <a:off x="1403648" y="1412776"/>
-            <a:ext cx="6480000" cy="4918554"/>
+            <a:ext cx="6479999" cy="4918554"/>
           </a:xfrm>
           <a:prstGeom prst="rect">
             <a:avLst/>
@@ -12538,7 +12537,7 @@
           <a:blip r:embed="rId4" cstate="print">
             <a:extLst>
               <a:ext uri="{28A0092B-C50C-407E-A947-70E740481C1C}">
-                <a14:useLocalDpi xmlns:a14="http://schemas.microsoft.com/office/drawing/2010/main" val="0"/>
+                <a14:useLocalDpi xmlns:a14="http://schemas.microsoft.com/office/drawing/2010/main" xmlns="" val="0"/>
               </a:ext>
             </a:extLst>
           </a:blip>
@@ -12816,7 +12815,7 @@
     </p:spTree>
     <p:extLst>
       <p:ext uri="{BB962C8B-B14F-4D97-AF65-F5344CB8AC3E}">
-        <p14:creationId xmlns:p14="http://schemas.microsoft.com/office/powerpoint/2010/main" val="141785747"/>
+        <p14:creationId xmlns:p14="http://schemas.microsoft.com/office/powerpoint/2010/main" xmlns="" val="141785747"/>
       </p:ext>
     </p:extLst>
   </p:cSld>
@@ -13095,7 +13094,7 @@
     </p:spTree>
     <p:extLst>
       <p:ext uri="{BB962C8B-B14F-4D97-AF65-F5344CB8AC3E}">
-        <p14:creationId xmlns:p14="http://schemas.microsoft.com/office/powerpoint/2010/main" val="3630298673"/>
+        <p14:creationId xmlns:p14="http://schemas.microsoft.com/office/powerpoint/2010/main" xmlns="" val="3630298673"/>
       </p:ext>
     </p:extLst>
   </p:cSld>
@@ -13430,7 +13429,7 @@
     </p:spTree>
     <p:extLst>
       <p:ext uri="{BB962C8B-B14F-4D97-AF65-F5344CB8AC3E}">
-        <p14:creationId xmlns:p14="http://schemas.microsoft.com/office/powerpoint/2010/main" val="2634211947"/>
+        <p14:creationId xmlns:p14="http://schemas.microsoft.com/office/powerpoint/2010/main" xmlns="" val="2634211947"/>
       </p:ext>
     </p:extLst>
   </p:cSld>
@@ -16629,7 +16628,7 @@
     </p:spTree>
     <p:extLst>
       <p:ext uri="{BB962C8B-B14F-4D97-AF65-F5344CB8AC3E}">
-        <p14:creationId xmlns:p14="http://schemas.microsoft.com/office/powerpoint/2010/main" val="3243626544"/>
+        <p14:creationId xmlns:p14="http://schemas.microsoft.com/office/powerpoint/2010/main" xmlns="" val="3243626544"/>
       </p:ext>
     </p:extLst>
   </p:cSld>
@@ -18021,7 +18020,7 @@
     </p:spTree>
     <p:extLst>
       <p:ext uri="{BB962C8B-B14F-4D97-AF65-F5344CB8AC3E}">
-        <p14:creationId xmlns:p14="http://schemas.microsoft.com/office/powerpoint/2010/main" val="3243626544"/>
+        <p14:creationId xmlns:p14="http://schemas.microsoft.com/office/powerpoint/2010/main" xmlns="" val="3243626544"/>
       </p:ext>
     </p:extLst>
   </p:cSld>
@@ -19034,7 +19033,7 @@
     </p:spTree>
     <p:extLst>
       <p:ext uri="{BB962C8B-B14F-4D97-AF65-F5344CB8AC3E}">
-        <p14:creationId xmlns:p14="http://schemas.microsoft.com/office/powerpoint/2010/main" val="3243626544"/>
+        <p14:creationId xmlns:p14="http://schemas.microsoft.com/office/powerpoint/2010/main" xmlns="" val="3243626544"/>
       </p:ext>
     </p:extLst>
   </p:cSld>
@@ -19306,10 +19305,10 @@
           <p:nvPr/>
         </p:nvPicPr>
         <p:blipFill>
-          <a:blip r:embed="rId3">
+          <a:blip r:embed="rId3" cstate="print">
             <a:extLst>
               <a:ext uri="{28A0092B-C50C-407E-A947-70E740481C1C}">
-                <a14:useLocalDpi xmlns:a14="http://schemas.microsoft.com/office/drawing/2010/main" val="0"/>
+                <a14:useLocalDpi xmlns:a14="http://schemas.microsoft.com/office/drawing/2010/main" xmlns="" val="0"/>
               </a:ext>
             </a:extLst>
           </a:blip>
@@ -19535,10 +19534,10 @@
           <p:nvPr/>
         </p:nvPicPr>
         <p:blipFill>
-          <a:blip r:embed="rId4">
+          <a:blip r:embed="rId4" cstate="print">
             <a:extLst>
               <a:ext uri="{28A0092B-C50C-407E-A947-70E740481C1C}">
-                <a14:useLocalDpi xmlns:a14="http://schemas.microsoft.com/office/drawing/2010/main" val="0"/>
+                <a14:useLocalDpi xmlns:a14="http://schemas.microsoft.com/office/drawing/2010/main" xmlns="" val="0"/>
               </a:ext>
             </a:extLst>
           </a:blip>
@@ -19599,10 +19598,10 @@
           <p:nvPr/>
         </p:nvPicPr>
         <p:blipFill>
-          <a:blip r:embed="rId5">
+          <a:blip r:embed="rId5" cstate="print">
             <a:extLst>
               <a:ext uri="{28A0092B-C50C-407E-A947-70E740481C1C}">
-                <a14:useLocalDpi xmlns:a14="http://schemas.microsoft.com/office/drawing/2010/main" val="0"/>
+                <a14:useLocalDpi xmlns:a14="http://schemas.microsoft.com/office/drawing/2010/main" xmlns="" val="0"/>
               </a:ext>
             </a:extLst>
           </a:blip>
@@ -19888,10 +19887,10 @@
           <p:nvPr/>
         </p:nvPicPr>
         <p:blipFill>
-          <a:blip r:embed="rId6">
+          <a:blip r:embed="rId6" cstate="print">
             <a:extLst>
               <a:ext uri="{28A0092B-C50C-407E-A947-70E740481C1C}">
-                <a14:useLocalDpi xmlns:a14="http://schemas.microsoft.com/office/drawing/2010/main" val="0"/>
+                <a14:useLocalDpi xmlns:a14="http://schemas.microsoft.com/office/drawing/2010/main" xmlns="" val="0"/>
               </a:ext>
             </a:extLst>
           </a:blip>
@@ -21057,7 +21056,7 @@
     </p:spTree>
     <p:extLst>
       <p:ext uri="{BB962C8B-B14F-4D97-AF65-F5344CB8AC3E}">
-        <p14:creationId xmlns:p14="http://schemas.microsoft.com/office/powerpoint/2010/main" val="2653926061"/>
+        <p14:creationId xmlns:p14="http://schemas.microsoft.com/office/powerpoint/2010/main" xmlns="" val="2653926061"/>
       </p:ext>
     </p:extLst>
   </p:cSld>
@@ -22339,7 +22338,7 @@
     </p:spTree>
     <p:extLst>
       <p:ext uri="{BB962C8B-B14F-4D97-AF65-F5344CB8AC3E}">
-        <p14:creationId xmlns:p14="http://schemas.microsoft.com/office/powerpoint/2010/main" val="3309636493"/>
+        <p14:creationId xmlns:p14="http://schemas.microsoft.com/office/powerpoint/2010/main" xmlns="" val="3309636493"/>
       </p:ext>
     </p:extLst>
   </p:cSld>
@@ -22558,7 +22557,7 @@
     </p:spTree>
     <p:extLst>
       <p:ext uri="{BB962C8B-B14F-4D97-AF65-F5344CB8AC3E}">
-        <p14:creationId xmlns:p14="http://schemas.microsoft.com/office/powerpoint/2010/main" val="1012322072"/>
+        <p14:creationId xmlns:p14="http://schemas.microsoft.com/office/powerpoint/2010/main" xmlns="" val="1012322072"/>
       </p:ext>
     </p:extLst>
   </p:cSld>
@@ -22777,7 +22776,7 @@
     </p:spTree>
     <p:extLst>
       <p:ext uri="{BB962C8B-B14F-4D97-AF65-F5344CB8AC3E}">
-        <p14:creationId xmlns:p14="http://schemas.microsoft.com/office/powerpoint/2010/main" val="1012322072"/>
+        <p14:creationId xmlns:p14="http://schemas.microsoft.com/office/powerpoint/2010/main" xmlns="" val="1012322072"/>
       </p:ext>
     </p:extLst>
   </p:cSld>
@@ -23056,7 +23055,7 @@
     </p:spTree>
     <p:extLst>
       <p:ext uri="{BB962C8B-B14F-4D97-AF65-F5344CB8AC3E}">
-        <p14:creationId xmlns:p14="http://schemas.microsoft.com/office/powerpoint/2010/main" val="2868797759"/>
+        <p14:creationId xmlns:p14="http://schemas.microsoft.com/office/powerpoint/2010/main" xmlns="" val="2868797759"/>
       </p:ext>
     </p:extLst>
   </p:cSld>
@@ -23448,7 +23447,7 @@
           <a:blip r:embed="rId2" cstate="print">
             <a:extLst>
               <a:ext uri="{BEBA8EAE-BF5A-486C-A8C5-ECC9F3942E4B}">
-                <a14:imgProps xmlns:a14="http://schemas.microsoft.com/office/drawing/2010/main">
+                <a14:imgProps xmlns:a14="http://schemas.microsoft.com/office/drawing/2010/main" xmlns="">
                   <a14:imgLayer r:embed="rId3">
                     <a14:imgEffect>
                       <a14:backgroundRemoval t="6057" b="22942" l="7000" r="29162"/>
@@ -23457,7 +23456,7 @@
                 </a14:imgProps>
               </a:ext>
               <a:ext uri="{28A0092B-C50C-407E-A947-70E740481C1C}">
-                <a14:useLocalDpi xmlns:a14="http://schemas.microsoft.com/office/drawing/2010/main" val="0"/>
+                <a14:useLocalDpi xmlns:a14="http://schemas.microsoft.com/office/drawing/2010/main" xmlns="" val="0"/>
               </a:ext>
             </a:extLst>
           </a:blip>
@@ -23475,7 +23474,7 @@
           <a:noFill/>
           <a:extLst>
             <a:ext uri="{909E8E84-426E-40DD-AFC4-6F175D3DCCD1}">
-              <a14:hiddenFill xmlns:a14="http://schemas.microsoft.com/office/drawing/2010/main">
+              <a14:hiddenFill xmlns:a14="http://schemas.microsoft.com/office/drawing/2010/main" xmlns="">
                 <a:solidFill>
                   <a:srgbClr val="FFFFFF"/>
                 </a:solidFill>
@@ -23496,7 +23495,7 @@
           <a:blip r:embed="rId2" cstate="print">
             <a:extLst>
               <a:ext uri="{BEBA8EAE-BF5A-486C-A8C5-ECC9F3942E4B}">
-                <a14:imgProps xmlns:a14="http://schemas.microsoft.com/office/drawing/2010/main">
+                <a14:imgProps xmlns:a14="http://schemas.microsoft.com/office/drawing/2010/main" xmlns="">
                   <a14:imgLayer r:embed="rId3">
                     <a14:imgEffect>
                       <a14:backgroundRemoval t="6057" b="22942" l="7000" r="29162"/>
@@ -23505,7 +23504,7 @@
                 </a14:imgProps>
               </a:ext>
               <a:ext uri="{28A0092B-C50C-407E-A947-70E740481C1C}">
-                <a14:useLocalDpi xmlns:a14="http://schemas.microsoft.com/office/drawing/2010/main" val="0"/>
+                <a14:useLocalDpi xmlns:a14="http://schemas.microsoft.com/office/drawing/2010/main" xmlns="" val="0"/>
               </a:ext>
             </a:extLst>
           </a:blip>
@@ -23523,7 +23522,7 @@
           <a:noFill/>
           <a:extLst>
             <a:ext uri="{909E8E84-426E-40DD-AFC4-6F175D3DCCD1}">
-              <a14:hiddenFill xmlns:a14="http://schemas.microsoft.com/office/drawing/2010/main">
+              <a14:hiddenFill xmlns:a14="http://schemas.microsoft.com/office/drawing/2010/main" xmlns="">
                 <a:solidFill>
                   <a:srgbClr val="FFFFFF"/>
                 </a:solidFill>
@@ -23535,7 +23534,7 @@
     </p:spTree>
     <p:extLst>
       <p:ext uri="{BB962C8B-B14F-4D97-AF65-F5344CB8AC3E}">
-        <p14:creationId xmlns:p14="http://schemas.microsoft.com/office/powerpoint/2010/main" val="2645794681"/>
+        <p14:creationId xmlns:p14="http://schemas.microsoft.com/office/powerpoint/2010/main" xmlns="" val="2645794681"/>
       </p:ext>
     </p:extLst>
   </p:cSld>
@@ -23894,7 +23893,7 @@
           <a:blip r:embed="rId3" cstate="print">
             <a:extLst>
               <a:ext uri="{28A0092B-C50C-407E-A947-70E740481C1C}">
-                <a14:useLocalDpi xmlns:a14="http://schemas.microsoft.com/office/drawing/2010/main" val="0"/>
+                <a14:useLocalDpi xmlns:a14="http://schemas.microsoft.com/office/drawing/2010/main" xmlns="" val="0"/>
               </a:ext>
             </a:extLst>
           </a:blip>
@@ -23926,7 +23925,7 @@
           </a:effectLst>
           <a:extLst>
             <a:ext uri="{91240B29-F687-4F45-9708-019B960494DF}">
-              <a14:hiddenLine xmlns:a14="http://schemas.microsoft.com/office/drawing/2010/main" w="9525">
+              <a14:hiddenLine xmlns:a14="http://schemas.microsoft.com/office/drawing/2010/main" xmlns="" w="9525">
                 <a:solidFill>
                   <a:schemeClr val="tx1"/>
                 </a:solidFill>
@@ -23941,7 +23940,7 @@
     </p:spTree>
     <p:extLst>
       <p:ext uri="{BB962C8B-B14F-4D97-AF65-F5344CB8AC3E}">
-        <p14:creationId xmlns:p14="http://schemas.microsoft.com/office/powerpoint/2010/main" val="313312729"/>
+        <p14:creationId xmlns:p14="http://schemas.microsoft.com/office/powerpoint/2010/main" xmlns="" val="313312729"/>
       </p:ext>
     </p:extLst>
   </p:cSld>
@@ -24164,7 +24163,7 @@
     </p:spTree>
     <p:extLst>
       <p:ext uri="{BB962C8B-B14F-4D97-AF65-F5344CB8AC3E}">
-        <p14:creationId xmlns:p14="http://schemas.microsoft.com/office/powerpoint/2010/main" val="1344880779"/>
+        <p14:creationId xmlns:p14="http://schemas.microsoft.com/office/powerpoint/2010/main" xmlns="" val="1344880779"/>
       </p:ext>
     </p:extLst>
   </p:cSld>
@@ -24267,7 +24266,7 @@
           <a:blip r:embed="rId3" cstate="print">
             <a:extLst>
               <a:ext uri="{28A0092B-C50C-407E-A947-70E740481C1C}">
-                <a14:useLocalDpi xmlns:a14="http://schemas.microsoft.com/office/drawing/2010/main" val="0"/>
+                <a14:useLocalDpi xmlns:a14="http://schemas.microsoft.com/office/drawing/2010/main" xmlns="" val="0"/>
               </a:ext>
             </a:extLst>
           </a:blip>
@@ -24297,7 +24296,7 @@
           <a:blip r:embed="rId4" cstate="print">
             <a:extLst>
               <a:ext uri="{28A0092B-C50C-407E-A947-70E740481C1C}">
-                <a14:useLocalDpi xmlns:a14="http://schemas.microsoft.com/office/drawing/2010/main" val="0"/>
+                <a14:useLocalDpi xmlns:a14="http://schemas.microsoft.com/office/drawing/2010/main" xmlns="" val="0"/>
               </a:ext>
             </a:extLst>
           </a:blip>
@@ -24318,7 +24317,7 @@
     </p:spTree>
     <p:extLst>
       <p:ext uri="{BB962C8B-B14F-4D97-AF65-F5344CB8AC3E}">
-        <p14:creationId xmlns:p14="http://schemas.microsoft.com/office/powerpoint/2010/main" val="2565098391"/>
+        <p14:creationId xmlns:p14="http://schemas.microsoft.com/office/powerpoint/2010/main" xmlns="" val="2565098391"/>
       </p:ext>
     </p:extLst>
   </p:cSld>
@@ -24569,7 +24568,7 @@
     </p:spTree>
     <p:extLst>
       <p:ext uri="{BB962C8B-B14F-4D97-AF65-F5344CB8AC3E}">
-        <p14:creationId xmlns:p14="http://schemas.microsoft.com/office/powerpoint/2010/main" val="3661383713"/>
+        <p14:creationId xmlns:p14="http://schemas.microsoft.com/office/powerpoint/2010/main" xmlns="" val="3661383713"/>
       </p:ext>
     </p:extLst>
   </p:cSld>
@@ -25009,7 +25008,7 @@
     </p:spTree>
     <p:extLst>
       <p:ext uri="{BB962C8B-B14F-4D97-AF65-F5344CB8AC3E}">
-        <p14:creationId xmlns:p14="http://schemas.microsoft.com/office/powerpoint/2010/main" val="3060759240"/>
+        <p14:creationId xmlns:p14="http://schemas.microsoft.com/office/powerpoint/2010/main" xmlns="" val="3060759240"/>
       </p:ext>
     </p:extLst>
   </p:cSld>
@@ -25749,7 +25748,7 @@
     </p:spTree>
     <p:extLst>
       <p:ext uri="{BB962C8B-B14F-4D97-AF65-F5344CB8AC3E}">
-        <p14:creationId xmlns:p14="http://schemas.microsoft.com/office/powerpoint/2010/main" val="351671181"/>
+        <p14:creationId xmlns:p14="http://schemas.microsoft.com/office/powerpoint/2010/main" xmlns="" val="351671181"/>
       </p:ext>
     </p:extLst>
   </p:cSld>
@@ -26277,7 +26276,7 @@
           <a:blip r:embed="rId3" cstate="print">
             <a:extLst>
               <a:ext uri="{28A0092B-C50C-407E-A947-70E740481C1C}">
-                <a14:useLocalDpi xmlns:a14="http://schemas.microsoft.com/office/drawing/2010/main" val="0"/>
+                <a14:useLocalDpi xmlns:a14="http://schemas.microsoft.com/office/drawing/2010/main" xmlns="" val="0"/>
               </a:ext>
             </a:extLst>
           </a:blip>
@@ -26500,7 +26499,7 @@
     </p:spTree>
     <p:extLst>
       <p:ext uri="{BB962C8B-B14F-4D97-AF65-F5344CB8AC3E}">
-        <p14:creationId xmlns:p14="http://schemas.microsoft.com/office/powerpoint/2010/main" val="2372600146"/>
+        <p14:creationId xmlns:p14="http://schemas.microsoft.com/office/powerpoint/2010/main" xmlns="" val="2372600146"/>
       </p:ext>
     </p:extLst>
   </p:cSld>
@@ -26750,7 +26749,6 @@
         </p:nvPicPr>
         <p:blipFill>
           <a:blip r:embed="rId3" cstate="print"/>
-          <a:srcRect/>
           <a:stretch>
             <a:fillRect/>
           </a:stretch>
@@ -26758,7 +26756,7 @@
         <p:spPr bwMode="auto">
           <a:xfrm>
             <a:off x="1403648" y="1390766"/>
-            <a:ext cx="6480000" cy="4918554"/>
+            <a:ext cx="6479999" cy="4918554"/>
           </a:xfrm>
           <a:prstGeom prst="rect">
             <a:avLst/>
@@ -26905,7 +26903,7 @@
     </p:spTree>
     <p:extLst>
       <p:ext uri="{BB962C8B-B14F-4D97-AF65-F5344CB8AC3E}">
-        <p14:creationId xmlns:p14="http://schemas.microsoft.com/office/powerpoint/2010/main" val="2681693288"/>
+        <p14:creationId xmlns:p14="http://schemas.microsoft.com/office/powerpoint/2010/main" xmlns="" val="2681693288"/>
       </p:ext>
     </p:extLst>
   </p:cSld>
@@ -27405,7 +27403,7 @@
     </p:spTree>
     <p:extLst>
       <p:ext uri="{BB962C8B-B14F-4D97-AF65-F5344CB8AC3E}">
-        <p14:creationId xmlns:p14="http://schemas.microsoft.com/office/powerpoint/2010/main" val="2857272158"/>
+        <p14:creationId xmlns:p14="http://schemas.microsoft.com/office/powerpoint/2010/main" xmlns="" val="2857272158"/>
       </p:ext>
     </p:extLst>
   </p:cSld>
@@ -27780,7 +27778,7 @@
     </p:spTree>
     <p:extLst>
       <p:ext uri="{BB962C8B-B14F-4D97-AF65-F5344CB8AC3E}">
-        <p14:creationId xmlns:p14="http://schemas.microsoft.com/office/powerpoint/2010/main" val="3542583579"/>
+        <p14:creationId xmlns:p14="http://schemas.microsoft.com/office/powerpoint/2010/main" xmlns="" val="3542583579"/>
       </p:ext>
     </p:extLst>
   </p:cSld>

</xml_diff>

<commit_message>
kleinkrams - wegen der Optik
Signed-off-by: MAG <mxthammel@gmail.com>
</commit_message>
<xml_diff>
--- a/Dokumente/Abschlusspr�si/Abschlusspr�sentation.pptx
+++ b/Dokumente/Abschlusspr�si/Abschlusspr�sentation.pptx
@@ -403,7 +403,7 @@
     </p:spTree>
     <p:extLst>
       <p:ext uri="{BB962C8B-B14F-4D97-AF65-F5344CB8AC3E}">
-        <p14:creationId xmlns:p14="http://schemas.microsoft.com/office/powerpoint/2010/main" xmlns="" val="2610097957"/>
+        <p14:creationId xmlns:p14="http://schemas.microsoft.com/office/powerpoint/2010/main" val="2610097957"/>
       </p:ext>
     </p:extLst>
   </p:cSld>
@@ -578,7 +578,7 @@
     </p:spTree>
     <p:extLst>
       <p:ext uri="{BB962C8B-B14F-4D97-AF65-F5344CB8AC3E}">
-        <p14:creationId xmlns:p14="http://schemas.microsoft.com/office/powerpoint/2010/main" xmlns="" val="2116472317"/>
+        <p14:creationId xmlns:p14="http://schemas.microsoft.com/office/powerpoint/2010/main" val="2116472317"/>
       </p:ext>
     </p:extLst>
   </p:cSld>
@@ -634,9 +634,32 @@
           <a:p>
             <a:r>
               <a:rPr lang="de-DE" dirty="0" smtClean="0"/>
-              <a:t>Grobe Architektur/Interaktion</a:t>
-            </a:r>
-            <a:endParaRPr lang="de-DE" dirty="0"/>
+              <a:t>Event Organisieren (&lt;klick&gt;</a:t>
+            </a:r>
+          </a:p>
+          <a:p>
+            <a:r>
+              <a:rPr lang="de-DE" dirty="0" smtClean="0"/>
+              <a:t>Informationen</a:t>
+            </a:r>
+            <a:r>
+              <a:rPr lang="de-DE" baseline="0" dirty="0" smtClean="0"/>
+              <a:t> zu dem Event &lt;klick&gt;</a:t>
+            </a:r>
+          </a:p>
+          <a:p>
+            <a:endParaRPr lang="de-DE" baseline="0" dirty="0" smtClean="0"/>
+          </a:p>
+          <a:p>
+            <a:r>
+              <a:rPr lang="de-DE" baseline="0" dirty="0" smtClean="0"/>
+              <a:t>Wechselt der Benutzer in die </a:t>
+            </a:r>
+            <a:r>
+              <a:rPr lang="de-DE" baseline="0" smtClean="0"/>
+              <a:t>Rolle Organisator</a:t>
+            </a:r>
+            <a:endParaRPr lang="de-DE" baseline="0" dirty="0" smtClean="0"/>
           </a:p>
         </p:txBody>
       </p:sp>
@@ -658,7 +681,7 @@
             <a:fld id="{F7EBFB8C-BBFF-4397-A51C-1E92596422A9}" type="slidenum">
               <a:rPr lang="en-US" smtClean="0"/>
               <a:pPr/>
-              <a:t>19</a:t>
+              <a:t>12</a:t>
             </a:fld>
             <a:endParaRPr lang="en-US" dirty="0"/>
           </a:p>
@@ -667,7 +690,7 @@
     </p:spTree>
     <p:extLst>
       <p:ext uri="{BB962C8B-B14F-4D97-AF65-F5344CB8AC3E}">
-        <p14:creationId xmlns:p14="http://schemas.microsoft.com/office/powerpoint/2010/main" xmlns="" val="135288531"/>
+        <p14:creationId xmlns:p14="http://schemas.microsoft.com/office/powerpoint/2010/main" val="2845101111"/>
       </p:ext>
     </p:extLst>
   </p:cSld>
@@ -723,11 +746,7 @@
           <a:p>
             <a:r>
               <a:rPr lang="de-DE" dirty="0" smtClean="0"/>
-              <a:t>Konkretes Beispiel zur vorherigen</a:t>
-            </a:r>
-            <a:r>
-              <a:rPr lang="de-DE" baseline="0" dirty="0" smtClean="0"/>
-              <a:t> Darstellung</a:t>
+              <a:t>Grobe Architektur/Interaktion</a:t>
             </a:r>
             <a:endParaRPr lang="de-DE" dirty="0"/>
           </a:p>
@@ -751,7 +770,7 @@
             <a:fld id="{F7EBFB8C-BBFF-4397-A51C-1E92596422A9}" type="slidenum">
               <a:rPr lang="en-US" smtClean="0"/>
               <a:pPr/>
-              <a:t>20</a:t>
+              <a:t>19</a:t>
             </a:fld>
             <a:endParaRPr lang="en-US" dirty="0"/>
           </a:p>
@@ -760,7 +779,7 @@
     </p:spTree>
     <p:extLst>
       <p:ext uri="{BB962C8B-B14F-4D97-AF65-F5344CB8AC3E}">
-        <p14:creationId xmlns:p14="http://schemas.microsoft.com/office/powerpoint/2010/main" xmlns="" val="2825845930"/>
+        <p14:creationId xmlns:p14="http://schemas.microsoft.com/office/powerpoint/2010/main" val="135288531"/>
       </p:ext>
     </p:extLst>
   </p:cSld>
@@ -816,20 +835,12 @@
           <a:p>
             <a:r>
               <a:rPr lang="de-DE" dirty="0" smtClean="0"/>
-              <a:t>Vorstellen:</a:t>
-            </a:r>
-          </a:p>
-          <a:p>
-            <a:r>
-              <a:rPr lang="de-DE" dirty="0" smtClean="0"/>
-              <a:t>Login</a:t>
+              <a:t>Konkretes Beispiel zur vorherigen</a:t>
             </a:r>
             <a:r>
               <a:rPr lang="de-DE" baseline="0" dirty="0" smtClean="0"/>
-              <a:t> -&gt; Ablauf Sequenzdiagramm praktisch zeigen</a:t>
-            </a:r>
-          </a:p>
-          <a:p>
+              <a:t> Darstellung</a:t>
+            </a:r>
             <a:endParaRPr lang="de-DE" dirty="0"/>
           </a:p>
         </p:txBody>
@@ -852,7 +863,7 @@
             <a:fld id="{F7EBFB8C-BBFF-4397-A51C-1E92596422A9}" type="slidenum">
               <a:rPr lang="en-US" smtClean="0"/>
               <a:pPr/>
-              <a:t>21</a:t>
+              <a:t>20</a:t>
             </a:fld>
             <a:endParaRPr lang="en-US" dirty="0"/>
           </a:p>
@@ -861,7 +872,7 @@
     </p:spTree>
     <p:extLst>
       <p:ext uri="{BB962C8B-B14F-4D97-AF65-F5344CB8AC3E}">
-        <p14:creationId xmlns:p14="http://schemas.microsoft.com/office/powerpoint/2010/main" xmlns="" val="3912581999"/>
+        <p14:creationId xmlns:p14="http://schemas.microsoft.com/office/powerpoint/2010/main" val="2825845930"/>
       </p:ext>
     </p:extLst>
   </p:cSld>
@@ -917,52 +928,20 @@
           <a:p>
             <a:r>
               <a:rPr lang="de-DE" dirty="0" smtClean="0"/>
-              <a:t>Blau: Event </a:t>
-            </a:r>
-            <a:r>
-              <a:rPr lang="de-DE" dirty="0" err="1" smtClean="0"/>
-              <a:t>anlage</a:t>
-            </a:r>
-            <a:endParaRPr lang="de-DE" dirty="0" smtClean="0"/>
+              <a:t>Vorstellen:</a:t>
+            </a:r>
           </a:p>
           <a:p>
             <a:r>
               <a:rPr lang="de-DE" dirty="0" smtClean="0"/>
-              <a:t>DB Table Event, </a:t>
-            </a:r>
-            <a:r>
-              <a:rPr lang="de-DE" dirty="0" err="1" smtClean="0"/>
-              <a:t>normaliserte</a:t>
+              <a:t>Login</a:t>
             </a:r>
             <a:r>
               <a:rPr lang="de-DE" baseline="0" dirty="0" smtClean="0"/>
-              <a:t> Teilnehmerliste und Ort</a:t>
-            </a:r>
-          </a:p>
-          <a:p>
-            <a:endParaRPr lang="de-DE" baseline="0" dirty="0" smtClean="0"/>
-          </a:p>
-          <a:p>
-            <a:r>
-              <a:rPr lang="de-DE" baseline="0" dirty="0" smtClean="0"/>
-              <a:t>Rot: Login Verknüpfung Session ID aus </a:t>
-            </a:r>
-            <a:r>
-              <a:rPr lang="de-DE" baseline="0" dirty="0" err="1" smtClean="0"/>
-              <a:t>oAuth</a:t>
-            </a:r>
-            <a:r>
-              <a:rPr lang="de-DE" baseline="0" dirty="0" smtClean="0"/>
-              <a:t>, Grunddaten (</a:t>
-            </a:r>
-            <a:r>
-              <a:rPr lang="de-DE" baseline="0" dirty="0" err="1" smtClean="0"/>
-              <a:t>name</a:t>
-            </a:r>
-            <a:r>
-              <a:rPr lang="de-DE" baseline="0" dirty="0" smtClean="0"/>
-              <a:t>, E-Mail-Adresse etc.) werden ausgelesen und persistent gespeichert.</a:t>
-            </a:r>
+              <a:t> -&gt; Ablauf Sequenzdiagramm praktisch zeigen</a:t>
+            </a:r>
+          </a:p>
+          <a:p>
             <a:endParaRPr lang="de-DE" dirty="0"/>
           </a:p>
         </p:txBody>
@@ -985,7 +964,7 @@
             <a:fld id="{F7EBFB8C-BBFF-4397-A51C-1E92596422A9}" type="slidenum">
               <a:rPr lang="en-US" smtClean="0"/>
               <a:pPr/>
-              <a:t>23</a:t>
+              <a:t>21</a:t>
             </a:fld>
             <a:endParaRPr lang="en-US" dirty="0"/>
           </a:p>
@@ -994,7 +973,7 @@
     </p:spTree>
     <p:extLst>
       <p:ext uri="{BB962C8B-B14F-4D97-AF65-F5344CB8AC3E}">
-        <p14:creationId xmlns:p14="http://schemas.microsoft.com/office/powerpoint/2010/main" xmlns="" val="802076649"/>
+        <p14:creationId xmlns:p14="http://schemas.microsoft.com/office/powerpoint/2010/main" val="3912581999"/>
       </p:ext>
     </p:extLst>
   </p:cSld>
@@ -1118,7 +1097,7 @@
             <a:fld id="{F7EBFB8C-BBFF-4397-A51C-1E92596422A9}" type="slidenum">
               <a:rPr lang="en-US" smtClean="0"/>
               <a:pPr/>
-              <a:t>24</a:t>
+              <a:t>23</a:t>
             </a:fld>
             <a:endParaRPr lang="en-US" dirty="0"/>
           </a:p>
@@ -1127,7 +1106,7 @@
     </p:spTree>
     <p:extLst>
       <p:ext uri="{BB962C8B-B14F-4D97-AF65-F5344CB8AC3E}">
-        <p14:creationId xmlns:p14="http://schemas.microsoft.com/office/powerpoint/2010/main" xmlns="" val="802076649"/>
+        <p14:creationId xmlns:p14="http://schemas.microsoft.com/office/powerpoint/2010/main" val="802076649"/>
       </p:ext>
     </p:extLst>
   </p:cSld>
@@ -1251,7 +1230,7 @@
             <a:fld id="{F7EBFB8C-BBFF-4397-A51C-1E92596422A9}" type="slidenum">
               <a:rPr lang="en-US" smtClean="0"/>
               <a:pPr/>
-              <a:t>25</a:t>
+              <a:t>24</a:t>
             </a:fld>
             <a:endParaRPr lang="en-US" dirty="0"/>
           </a:p>
@@ -1260,7 +1239,7 @@
     </p:spTree>
     <p:extLst>
       <p:ext uri="{BB962C8B-B14F-4D97-AF65-F5344CB8AC3E}">
-        <p14:creationId xmlns:p14="http://schemas.microsoft.com/office/powerpoint/2010/main" xmlns="" val="802076649"/>
+        <p14:creationId xmlns:p14="http://schemas.microsoft.com/office/powerpoint/2010/main" val="802076649"/>
       </p:ext>
     </p:extLst>
   </p:cSld>
@@ -1311,135 +1290,57 @@
         </p:nvSpPr>
         <p:spPr/>
         <p:txBody>
-          <a:bodyPr>
-            <a:normAutofit fontScale="70000" lnSpcReduction="20000"/>
-          </a:bodyPr>
+          <a:bodyPr/>
           <a:lstStyle/>
           <a:p>
             <a:r>
+              <a:rPr lang="de-DE" dirty="0" smtClean="0"/>
+              <a:t>Blau: Event </a:t>
+            </a:r>
+            <a:r>
               <a:rPr lang="de-DE" dirty="0" err="1" smtClean="0"/>
-              <a:t>ÄUßERE</a:t>
-            </a:r>
+              <a:t>anlage</a:t>
+            </a:r>
+            <a:endParaRPr lang="de-DE" dirty="0" smtClean="0"/>
+          </a:p>
+          <a:p>
             <a:r>
               <a:rPr lang="de-DE" dirty="0" smtClean="0"/>
-              <a:t> UND INNERE QUALITÄT	</a:t>
-            </a:r>
-          </a:p>
-          <a:p>
-            <a:r>
-              <a:rPr lang="de-DE" dirty="0" smtClean="0"/>
-              <a:t>	Funktionalität	</a:t>
-            </a:r>
-          </a:p>
-          <a:p>
-            <a:r>
-              <a:rPr lang="de-DE" dirty="0" smtClean="0"/>
-              <a:t>	Zuverlässigkeit	</a:t>
-            </a:r>
-          </a:p>
-          <a:p>
-            <a:r>
-              <a:rPr lang="de-DE" dirty="0" smtClean="0"/>
-              <a:t>	Benutzbarkeit	</a:t>
-            </a:r>
-          </a:p>
-          <a:p>
-            <a:r>
-              <a:rPr lang="de-DE" dirty="0" smtClean="0"/>
-              <a:t>	Effizienz	</a:t>
-            </a:r>
-          </a:p>
-          <a:p>
-            <a:r>
-              <a:rPr lang="de-DE" dirty="0" smtClean="0"/>
-              <a:t>	Wartbarkeit	</a:t>
-            </a:r>
-          </a:p>
-          <a:p>
-            <a:r>
-              <a:rPr lang="de-DE" dirty="0" smtClean="0"/>
-              <a:t>	Portabilität	</a:t>
-            </a:r>
-          </a:p>
-          <a:p>
-            <a:r>
-              <a:rPr lang="de-DE" dirty="0" smtClean="0"/>
-              <a:t>GEBRAUCHSTAUGLICHKEIT	</a:t>
-            </a:r>
-          </a:p>
-          <a:p>
-            <a:r>
-              <a:rPr lang="de-DE" dirty="0" smtClean="0"/>
-              <a:t>	Effektivität	</a:t>
-            </a:r>
-          </a:p>
-          <a:p>
-            <a:r>
-              <a:rPr lang="de-DE" dirty="0" smtClean="0"/>
-              <a:t>	Produktivität	</a:t>
-            </a:r>
-          </a:p>
-          <a:p>
-            <a:r>
-              <a:rPr lang="de-DE" dirty="0" smtClean="0"/>
-              <a:t>	Sicherheit	</a:t>
-            </a:r>
-          </a:p>
-          <a:p>
-            <a:r>
-              <a:rPr lang="de-DE" dirty="0" smtClean="0"/>
-              <a:t>	Zufriedenheit	</a:t>
-            </a:r>
-          </a:p>
-          <a:p>
-            <a:r>
-              <a:rPr lang="de-DE" dirty="0" smtClean="0"/>
-              <a:t>TECHNISCHE ANFORDERUNGEN	</a:t>
-            </a:r>
-          </a:p>
-          <a:p>
-            <a:r>
-              <a:rPr lang="de-DE" dirty="0" smtClean="0"/>
-              <a:t>	Einsatzumgebung	</a:t>
-            </a:r>
-          </a:p>
-          <a:p>
-            <a:r>
-              <a:rPr lang="de-DE" dirty="0" smtClean="0"/>
-              <a:t>	Entwicklungsumgebung	</a:t>
-            </a:r>
-          </a:p>
-          <a:p>
-            <a:r>
-              <a:rPr lang="de-DE" dirty="0" smtClean="0"/>
-              <a:t>LIEFERUMFANG	</a:t>
-            </a:r>
-          </a:p>
-          <a:p>
-            <a:r>
-              <a:rPr lang="de-DE" dirty="0" smtClean="0"/>
-              <a:t>	Ausführbare Programme	</a:t>
-            </a:r>
-          </a:p>
-          <a:p>
-            <a:r>
-              <a:rPr lang="de-DE" dirty="0" smtClean="0"/>
-              <a:t>	Quellcode	</a:t>
-            </a:r>
-          </a:p>
-          <a:p>
-            <a:r>
-              <a:rPr lang="de-DE" dirty="0" smtClean="0"/>
-              <a:t>	Dokumentation	</a:t>
-            </a:r>
-          </a:p>
-          <a:p>
-            <a:r>
-              <a:rPr lang="de-DE" dirty="0" smtClean="0"/>
-              <a:t>	Daten	</a:t>
-            </a:r>
-          </a:p>
-          <a:p>
+              <a:t>DB Table Event, </a:t>
+            </a:r>
+            <a:r>
+              <a:rPr lang="de-DE" dirty="0" err="1" smtClean="0"/>
+              <a:t>normaliserte</a:t>
+            </a:r>
+            <a:r>
+              <a:rPr lang="de-DE" baseline="0" dirty="0" smtClean="0"/>
+              <a:t> Teilnehmerliste und Ort</a:t>
+            </a:r>
+          </a:p>
+          <a:p>
+            <a:endParaRPr lang="de-DE" baseline="0" dirty="0" smtClean="0"/>
+          </a:p>
+          <a:p>
+            <a:r>
+              <a:rPr lang="de-DE" baseline="0" dirty="0" smtClean="0"/>
+              <a:t>Rot: Login Verknüpfung Session ID aus </a:t>
+            </a:r>
+            <a:r>
+              <a:rPr lang="de-DE" baseline="0" dirty="0" err="1" smtClean="0"/>
+              <a:t>oAuth</a:t>
+            </a:r>
+            <a:r>
+              <a:rPr lang="de-DE" baseline="0" dirty="0" smtClean="0"/>
+              <a:t>, Grunddaten (</a:t>
+            </a:r>
+            <a:r>
+              <a:rPr lang="de-DE" baseline="0" dirty="0" err="1" smtClean="0"/>
+              <a:t>name</a:t>
+            </a:r>
+            <a:r>
+              <a:rPr lang="de-DE" baseline="0" dirty="0" smtClean="0"/>
+              <a:t>, E-Mail-Adresse etc.) werden ausgelesen und persistent gespeichert.</a:t>
+            </a:r>
             <a:endParaRPr lang="de-DE" dirty="0"/>
           </a:p>
         </p:txBody>
@@ -1460,26 +1361,18 @@
           <a:lstStyle/>
           <a:p>
             <a:fld id="{F7EBFB8C-BBFF-4397-A51C-1E92596422A9}" type="slidenum">
-              <a:rPr lang="en-US" smtClean="0">
-                <a:solidFill>
-                  <a:prstClr val="black"/>
-                </a:solidFill>
-              </a:rPr>
+              <a:rPr lang="en-US" smtClean="0"/>
               <a:pPr/>
-              <a:t>26</a:t>
+              <a:t>25</a:t>
             </a:fld>
-            <a:endParaRPr lang="en-US" dirty="0">
-              <a:solidFill>
-                <a:prstClr val="black"/>
-              </a:solidFill>
-            </a:endParaRPr>
+            <a:endParaRPr lang="en-US" dirty="0"/>
           </a:p>
         </p:txBody>
       </p:sp>
     </p:spTree>
     <p:extLst>
       <p:ext uri="{BB962C8B-B14F-4D97-AF65-F5344CB8AC3E}">
-        <p14:creationId xmlns:p14="http://schemas.microsoft.com/office/powerpoint/2010/main" xmlns="" val="1629754142"/>
+        <p14:creationId xmlns:p14="http://schemas.microsoft.com/office/powerpoint/2010/main" val="802076649"/>
       </p:ext>
     </p:extLst>
   </p:cSld>
@@ -1530,49 +1423,135 @@
         </p:nvSpPr>
         <p:spPr/>
         <p:txBody>
-          <a:bodyPr/>
+          <a:bodyPr>
+            <a:normAutofit fontScale="70000" lnSpcReduction="20000"/>
+          </a:bodyPr>
           <a:lstStyle/>
           <a:p>
             <a:r>
+              <a:rPr lang="de-DE" dirty="0" err="1" smtClean="0"/>
+              <a:t>ÄUßERE</a:t>
+            </a:r>
+            <a:r>
               <a:rPr lang="de-DE" dirty="0" smtClean="0"/>
-              <a:t>Zeitplan</a:t>
+              <a:t> UND INNERE QUALITÄT	</a:t>
             </a:r>
           </a:p>
           <a:p>
             <a:r>
               <a:rPr lang="de-DE" dirty="0" smtClean="0"/>
-              <a:t>Fokus aus </a:t>
-            </a:r>
-            <a:r>
-              <a:rPr lang="de-DE" dirty="0" err="1" smtClean="0"/>
-              <a:t>Inception</a:t>
-            </a:r>
+              <a:t>	Funktionalität	</a:t>
+            </a:r>
+          </a:p>
+          <a:p>
             <a:r>
               <a:rPr lang="de-DE" dirty="0" smtClean="0"/>
-              <a:t> / Elaboration</a:t>
+              <a:t>	Zuverlässigkeit	</a:t>
             </a:r>
           </a:p>
           <a:p>
             <a:r>
               <a:rPr lang="de-DE" dirty="0" smtClean="0"/>
-              <a:t>Aufgrund der Enge des Zeitplans jeweils zwei Iterationen mit</a:t>
-            </a:r>
-            <a:r>
-              <a:rPr lang="de-DE" baseline="0" dirty="0" smtClean="0"/>
-              <a:t> festen Reviews der Ergebnisse etc.</a:t>
-            </a:r>
-          </a:p>
-          <a:p>
-            <a:r>
-              <a:rPr lang="de-DE" baseline="0" dirty="0" smtClean="0"/>
-              <a:t>Aber auch: RUP! Jederzeit auch bei kleineren Änderungen/Feststellungen usw. Überarbeitung.</a:t>
-            </a:r>
-          </a:p>
-          <a:p>
-            <a:r>
-              <a:rPr lang="de-DE" baseline="0" dirty="0" smtClean="0"/>
-              <a:t>Ziel: 11.06. eine prototypische Implementierung der Plattform fertigstellen</a:t>
-            </a:r>
+              <a:t>	Benutzbarkeit	</a:t>
+            </a:r>
+          </a:p>
+          <a:p>
+            <a:r>
+              <a:rPr lang="de-DE" dirty="0" smtClean="0"/>
+              <a:t>	Effizienz	</a:t>
+            </a:r>
+          </a:p>
+          <a:p>
+            <a:r>
+              <a:rPr lang="de-DE" dirty="0" smtClean="0"/>
+              <a:t>	Wartbarkeit	</a:t>
+            </a:r>
+          </a:p>
+          <a:p>
+            <a:r>
+              <a:rPr lang="de-DE" dirty="0" smtClean="0"/>
+              <a:t>	Portabilität	</a:t>
+            </a:r>
+          </a:p>
+          <a:p>
+            <a:r>
+              <a:rPr lang="de-DE" dirty="0" smtClean="0"/>
+              <a:t>GEBRAUCHSTAUGLICHKEIT	</a:t>
+            </a:r>
+          </a:p>
+          <a:p>
+            <a:r>
+              <a:rPr lang="de-DE" dirty="0" smtClean="0"/>
+              <a:t>	Effektivität	</a:t>
+            </a:r>
+          </a:p>
+          <a:p>
+            <a:r>
+              <a:rPr lang="de-DE" dirty="0" smtClean="0"/>
+              <a:t>	Produktivität	</a:t>
+            </a:r>
+          </a:p>
+          <a:p>
+            <a:r>
+              <a:rPr lang="de-DE" dirty="0" smtClean="0"/>
+              <a:t>	Sicherheit	</a:t>
+            </a:r>
+          </a:p>
+          <a:p>
+            <a:r>
+              <a:rPr lang="de-DE" dirty="0" smtClean="0"/>
+              <a:t>	Zufriedenheit	</a:t>
+            </a:r>
+          </a:p>
+          <a:p>
+            <a:r>
+              <a:rPr lang="de-DE" dirty="0" smtClean="0"/>
+              <a:t>TECHNISCHE ANFORDERUNGEN	</a:t>
+            </a:r>
+          </a:p>
+          <a:p>
+            <a:r>
+              <a:rPr lang="de-DE" dirty="0" smtClean="0"/>
+              <a:t>	Einsatzumgebung	</a:t>
+            </a:r>
+          </a:p>
+          <a:p>
+            <a:r>
+              <a:rPr lang="de-DE" dirty="0" smtClean="0"/>
+              <a:t>	Entwicklungsumgebung	</a:t>
+            </a:r>
+          </a:p>
+          <a:p>
+            <a:r>
+              <a:rPr lang="de-DE" dirty="0" smtClean="0"/>
+              <a:t>LIEFERUMFANG	</a:t>
+            </a:r>
+          </a:p>
+          <a:p>
+            <a:r>
+              <a:rPr lang="de-DE" dirty="0" smtClean="0"/>
+              <a:t>	Ausführbare Programme	</a:t>
+            </a:r>
+          </a:p>
+          <a:p>
+            <a:r>
+              <a:rPr lang="de-DE" dirty="0" smtClean="0"/>
+              <a:t>	Quellcode	</a:t>
+            </a:r>
+          </a:p>
+          <a:p>
+            <a:r>
+              <a:rPr lang="de-DE" dirty="0" smtClean="0"/>
+              <a:t>	Dokumentation	</a:t>
+            </a:r>
+          </a:p>
+          <a:p>
+            <a:r>
+              <a:rPr lang="de-DE" dirty="0" smtClean="0"/>
+              <a:t>	Daten	</a:t>
+            </a:r>
+          </a:p>
+          <a:p>
             <a:endParaRPr lang="de-DE" dirty="0"/>
           </a:p>
         </p:txBody>
@@ -1593,18 +1572,26 @@
           <a:lstStyle/>
           <a:p>
             <a:fld id="{F7EBFB8C-BBFF-4397-A51C-1E92596422A9}" type="slidenum">
-              <a:rPr lang="en-US" smtClean="0"/>
+              <a:rPr lang="en-US" smtClean="0">
+                <a:solidFill>
+                  <a:prstClr val="black"/>
+                </a:solidFill>
+              </a:rPr>
               <a:pPr/>
-              <a:t>28</a:t>
+              <a:t>26</a:t>
             </a:fld>
-            <a:endParaRPr lang="en-US" dirty="0"/>
+            <a:endParaRPr lang="en-US" dirty="0">
+              <a:solidFill>
+                <a:prstClr val="black"/>
+              </a:solidFill>
+            </a:endParaRPr>
           </a:p>
         </p:txBody>
       </p:sp>
     </p:spTree>
     <p:extLst>
       <p:ext uri="{BB962C8B-B14F-4D97-AF65-F5344CB8AC3E}">
-        <p14:creationId xmlns:p14="http://schemas.microsoft.com/office/powerpoint/2010/main" xmlns="" val="3931682397"/>
+        <p14:creationId xmlns:p14="http://schemas.microsoft.com/office/powerpoint/2010/main" val="1629754142"/>
       </p:ext>
     </p:extLst>
   </p:cSld>
@@ -1720,7 +1707,7 @@
             <a:fld id="{F7EBFB8C-BBFF-4397-A51C-1E92596422A9}" type="slidenum">
               <a:rPr lang="en-US" smtClean="0"/>
               <a:pPr/>
-              <a:t>29</a:t>
+              <a:t>28</a:t>
             </a:fld>
             <a:endParaRPr lang="en-US" dirty="0"/>
           </a:p>
@@ -1729,7 +1716,7 @@
     </p:spTree>
     <p:extLst>
       <p:ext uri="{BB962C8B-B14F-4D97-AF65-F5344CB8AC3E}">
-        <p14:creationId xmlns:p14="http://schemas.microsoft.com/office/powerpoint/2010/main" xmlns="" val="3931682397"/>
+        <p14:creationId xmlns:p14="http://schemas.microsoft.com/office/powerpoint/2010/main" val="3931682397"/>
       </p:ext>
     </p:extLst>
   </p:cSld>
@@ -1780,11 +1767,49 @@
         </p:nvSpPr>
         <p:spPr/>
         <p:txBody>
-          <a:bodyPr>
-            <a:normAutofit/>
-          </a:bodyPr>
+          <a:bodyPr/>
           <a:lstStyle/>
           <a:p>
+            <a:r>
+              <a:rPr lang="de-DE" dirty="0" smtClean="0"/>
+              <a:t>Zeitplan</a:t>
+            </a:r>
+          </a:p>
+          <a:p>
+            <a:r>
+              <a:rPr lang="de-DE" dirty="0" smtClean="0"/>
+              <a:t>Fokus aus </a:t>
+            </a:r>
+            <a:r>
+              <a:rPr lang="de-DE" dirty="0" err="1" smtClean="0"/>
+              <a:t>Inception</a:t>
+            </a:r>
+            <a:r>
+              <a:rPr lang="de-DE" dirty="0" smtClean="0"/>
+              <a:t> / Elaboration</a:t>
+            </a:r>
+          </a:p>
+          <a:p>
+            <a:r>
+              <a:rPr lang="de-DE" dirty="0" smtClean="0"/>
+              <a:t>Aufgrund der Enge des Zeitplans jeweils zwei Iterationen mit</a:t>
+            </a:r>
+            <a:r>
+              <a:rPr lang="de-DE" baseline="0" dirty="0" smtClean="0"/>
+              <a:t> festen Reviews der Ergebnisse etc.</a:t>
+            </a:r>
+          </a:p>
+          <a:p>
+            <a:r>
+              <a:rPr lang="de-DE" baseline="0" dirty="0" smtClean="0"/>
+              <a:t>Aber auch: RUP! Jederzeit auch bei kleineren Änderungen/Feststellungen usw. Überarbeitung.</a:t>
+            </a:r>
+          </a:p>
+          <a:p>
+            <a:r>
+              <a:rPr lang="de-DE" baseline="0" dirty="0" smtClean="0"/>
+              <a:t>Ziel: 11.06. eine prototypische Implementierung der Plattform fertigstellen</a:t>
+            </a:r>
             <a:endParaRPr lang="de-DE" dirty="0"/>
           </a:p>
         </p:txBody>
@@ -1804,16 +1829,21 @@
           <a:bodyPr/>
           <a:lstStyle/>
           <a:p>
-            <a:fld id="{1EBFF01C-F984-4A51-AF10-254043F7C542}" type="slidenum">
-              <a:rPr lang="de-DE" smtClean="0"/>
+            <a:fld id="{F7EBFB8C-BBFF-4397-A51C-1E92596422A9}" type="slidenum">
+              <a:rPr lang="en-US" smtClean="0"/>
               <a:pPr/>
-              <a:t>31</a:t>
+              <a:t>29</a:t>
             </a:fld>
-            <a:endParaRPr lang="de-DE"/>
+            <a:endParaRPr lang="en-US" dirty="0"/>
           </a:p>
         </p:txBody>
       </p:sp>
     </p:spTree>
+    <p:extLst>
+      <p:ext uri="{BB962C8B-B14F-4D97-AF65-F5344CB8AC3E}">
+        <p14:creationId xmlns:p14="http://schemas.microsoft.com/office/powerpoint/2010/main" val="3931682397"/>
+      </p:ext>
+    </p:extLst>
   </p:cSld>
   <p:clrMapOvr>
     <a:masterClrMapping/>
@@ -2110,7 +2140,7 @@
     </p:spTree>
     <p:extLst>
       <p:ext uri="{BB962C8B-B14F-4D97-AF65-F5344CB8AC3E}">
-        <p14:creationId xmlns:p14="http://schemas.microsoft.com/office/powerpoint/2010/main" xmlns="" val="517533983"/>
+        <p14:creationId xmlns:p14="http://schemas.microsoft.com/office/powerpoint/2010/main" val="517533983"/>
       </p:ext>
     </p:extLst>
   </p:cSld>
@@ -2161,201 +2191,11 @@
         </p:nvSpPr>
         <p:spPr/>
         <p:txBody>
-          <a:bodyPr/>
+          <a:bodyPr>
+            <a:normAutofit/>
+          </a:bodyPr>
           <a:lstStyle/>
           <a:p>
-            <a:r>
-              <a:rPr lang="de-DE" dirty="0" smtClean="0"/>
-              <a:t>Zu </a:t>
-            </a:r>
-            <a:r>
-              <a:rPr lang="de-DE" dirty="0" err="1" smtClean="0"/>
-              <a:t>git</a:t>
-            </a:r>
-            <a:r>
-              <a:rPr lang="de-DE" dirty="0" smtClean="0"/>
-              <a:t>:</a:t>
-            </a:r>
-          </a:p>
-          <a:p>
-            <a:r>
-              <a:rPr lang="de-DE" dirty="0" smtClean="0"/>
-              <a:t>	Dateikonflikte aufwändiges</a:t>
-            </a:r>
-            <a:r>
-              <a:rPr lang="de-DE" baseline="0" dirty="0" smtClean="0"/>
-              <a:t> ein-/auschecken, mit </a:t>
-            </a:r>
-            <a:r>
-              <a:rPr lang="de-DE" baseline="0" dirty="0" err="1" smtClean="0"/>
-              <a:t>dropbox</a:t>
-            </a:r>
-            <a:r>
-              <a:rPr lang="de-DE" baseline="0" dirty="0" smtClean="0"/>
-              <a:t> und </a:t>
-            </a:r>
-            <a:r>
-              <a:rPr lang="de-DE" baseline="0" dirty="0" err="1" smtClean="0"/>
-              <a:t>co</a:t>
-            </a:r>
-            <a:r>
-              <a:rPr lang="de-DE" baseline="0" dirty="0" smtClean="0"/>
-              <a:t> on </a:t>
-            </a:r>
-            <a:r>
-              <a:rPr lang="de-DE" baseline="0" dirty="0" err="1" smtClean="0"/>
-              <a:t>the</a:t>
-            </a:r>
-            <a:r>
-              <a:rPr lang="de-DE" baseline="0" dirty="0" smtClean="0"/>
-              <a:t> </a:t>
-            </a:r>
-            <a:r>
-              <a:rPr lang="de-DE" baseline="0" dirty="0" err="1" smtClean="0"/>
-              <a:t>fly</a:t>
-            </a:r>
-            <a:r>
-              <a:rPr lang="de-DE" baseline="0" dirty="0" smtClean="0"/>
-              <a:t>, automatisch im Hintergrund.</a:t>
-            </a:r>
-          </a:p>
-          <a:p>
-            <a:r>
-              <a:rPr lang="de-DE" baseline="0" dirty="0" smtClean="0"/>
-              <a:t>	evtl. zu früh auf ein Tool festgelegt, oder besser zwei? (</a:t>
-            </a:r>
-            <a:r>
-              <a:rPr lang="de-DE" baseline="0" dirty="0" err="1" smtClean="0"/>
-              <a:t>dropbox</a:t>
-            </a:r>
-            <a:r>
-              <a:rPr lang="de-DE" baseline="0" dirty="0" smtClean="0"/>
-              <a:t> für Dokumente, </a:t>
-            </a:r>
-            <a:r>
-              <a:rPr lang="de-DE" baseline="0" dirty="0" err="1" smtClean="0"/>
-              <a:t>gitHub</a:t>
-            </a:r>
-            <a:r>
-              <a:rPr lang="de-DE" baseline="0" dirty="0" smtClean="0"/>
-              <a:t> für </a:t>
-            </a:r>
-            <a:r>
-              <a:rPr lang="de-DE" baseline="0" dirty="0" err="1" smtClean="0"/>
-              <a:t>Sourcen</a:t>
-            </a:r>
-            <a:r>
-              <a:rPr lang="de-DE" baseline="0" dirty="0" smtClean="0"/>
-              <a:t>)</a:t>
-            </a:r>
-          </a:p>
-          <a:p>
-            <a:r>
-              <a:rPr lang="de-DE" baseline="0" dirty="0" err="1" smtClean="0"/>
-              <a:t>Projektmgm</a:t>
-            </a:r>
-            <a:endParaRPr lang="de-DE" baseline="0" dirty="0" smtClean="0"/>
-          </a:p>
-          <a:p>
-            <a:r>
-              <a:rPr lang="de-DE" baseline="0" dirty="0" smtClean="0"/>
-              <a:t>	Aufgaben stärker </a:t>
-            </a:r>
-            <a:r>
-              <a:rPr lang="de-DE" baseline="0" dirty="0" err="1" smtClean="0"/>
-              <a:t>tracken</a:t>
-            </a:r>
-            <a:r>
-              <a:rPr lang="de-DE" baseline="0" dirty="0" smtClean="0"/>
-              <a:t>, ggf. „</a:t>
-            </a:r>
-            <a:r>
-              <a:rPr lang="de-DE" baseline="0" dirty="0" err="1" smtClean="0"/>
-              <a:t>cut</a:t>
-            </a:r>
-            <a:r>
-              <a:rPr lang="de-DE" baseline="0" dirty="0" smtClean="0"/>
-              <a:t>“ (bei Vertiefung in nicht notwendigen Details (z.B. Risikoanalyse, Wirtschaftlichkeitsbetrachtung)</a:t>
-            </a:r>
-          </a:p>
-          <a:p>
-            <a:endParaRPr lang="de-DE" dirty="0" smtClean="0"/>
-          </a:p>
-          <a:p>
-            <a:r>
-              <a:rPr lang="de-DE" dirty="0" err="1" smtClean="0"/>
-              <a:t>Workload</a:t>
-            </a:r>
-            <a:endParaRPr lang="de-DE" dirty="0" smtClean="0"/>
-          </a:p>
-          <a:p>
-            <a:r>
-              <a:rPr lang="de-DE" dirty="0" smtClean="0"/>
-              <a:t>	Höherer Aufwand als erwartet, zusätzlicher stress neben der Arbeit. Risikofaktor,</a:t>
-            </a:r>
-            <a:r>
-              <a:rPr lang="de-DE" baseline="0" dirty="0" smtClean="0"/>
-              <a:t> da alle beim gleichen Unternehmen arbeiten (viel zu tun (</a:t>
-            </a:r>
-            <a:r>
-              <a:rPr lang="de-DE" baseline="0" dirty="0" err="1" smtClean="0"/>
-              <a:t>arbeit</a:t>
-            </a:r>
-            <a:r>
-              <a:rPr lang="de-DE" baseline="0" dirty="0" smtClean="0"/>
-              <a:t>) </a:t>
-            </a:r>
-            <a:r>
-              <a:rPr lang="de-DE" baseline="0" dirty="0" smtClean="0">
-                <a:sym typeface="Wingdings" pitchFamily="2" charset="2"/>
-              </a:rPr>
-              <a:t> weniger Zeit (Projekt))</a:t>
-            </a:r>
-            <a:endParaRPr lang="de-DE" dirty="0" smtClean="0"/>
-          </a:p>
-          <a:p>
-            <a:r>
-              <a:rPr lang="de-DE" dirty="0" err="1" smtClean="0"/>
-              <a:t>PeerReview</a:t>
-            </a:r>
-            <a:r>
-              <a:rPr lang="de-DE" dirty="0" smtClean="0"/>
-              <a:t>:</a:t>
-            </a:r>
-          </a:p>
-          <a:p>
-            <a:r>
-              <a:rPr lang="de-DE" dirty="0" smtClean="0"/>
-              <a:t>	Hilfreich eine zweite unabhängige</a:t>
-            </a:r>
-            <a:r>
-              <a:rPr lang="de-DE" baseline="0" dirty="0" smtClean="0"/>
-              <a:t> Meinung; Lücken wurden identifiziert und behoben</a:t>
-            </a:r>
-          </a:p>
-          <a:p>
-            <a:r>
-              <a:rPr lang="de-DE" dirty="0" smtClean="0"/>
-              <a:t>Teamwork:</a:t>
-            </a:r>
-          </a:p>
-          <a:p>
-            <a:r>
-              <a:rPr lang="de-DE" dirty="0" smtClean="0"/>
-              <a:t>	Abstimmungen, Konstruktive </a:t>
-            </a:r>
-            <a:r>
-              <a:rPr lang="de-DE" dirty="0" err="1" smtClean="0"/>
-              <a:t>diskussionen</a:t>
-            </a:r>
-            <a:r>
-              <a:rPr lang="de-DE" dirty="0" smtClean="0"/>
-              <a:t>, Mitglieder</a:t>
-            </a:r>
-            <a:r>
-              <a:rPr lang="de-DE" baseline="0" dirty="0" smtClean="0"/>
-              <a:t> haben sich durch Fach/Spezialwissen gut ergänzt</a:t>
-            </a:r>
             <a:endParaRPr lang="de-DE" dirty="0"/>
           </a:p>
         </p:txBody>
@@ -2375,21 +2215,16 @@
           <a:bodyPr/>
           <a:lstStyle/>
           <a:p>
-            <a:fld id="{F7EBFB8C-BBFF-4397-A51C-1E92596422A9}" type="slidenum">
-              <a:rPr lang="en-US" smtClean="0"/>
+            <a:fld id="{1EBFF01C-F984-4A51-AF10-254043F7C542}" type="slidenum">
+              <a:rPr lang="de-DE" smtClean="0"/>
               <a:pPr/>
-              <a:t>32</a:t>
+              <a:t>31</a:t>
             </a:fld>
-            <a:endParaRPr lang="en-US" dirty="0"/>
+            <a:endParaRPr lang="de-DE"/>
           </a:p>
         </p:txBody>
       </p:sp>
     </p:spTree>
-    <p:extLst>
-      <p:ext uri="{BB962C8B-B14F-4D97-AF65-F5344CB8AC3E}">
-        <p14:creationId xmlns:p14="http://schemas.microsoft.com/office/powerpoint/2010/main" xmlns="" val="1616458392"/>
-      </p:ext>
-    </p:extLst>
   </p:cSld>
   <p:clrMapOvr>
     <a:masterClrMapping/>
@@ -2441,6 +2276,198 @@
           <a:bodyPr/>
           <a:lstStyle/>
           <a:p>
+            <a:r>
+              <a:rPr lang="de-DE" dirty="0" smtClean="0"/>
+              <a:t>Zu </a:t>
+            </a:r>
+            <a:r>
+              <a:rPr lang="de-DE" dirty="0" err="1" smtClean="0"/>
+              <a:t>git</a:t>
+            </a:r>
+            <a:r>
+              <a:rPr lang="de-DE" dirty="0" smtClean="0"/>
+              <a:t>:</a:t>
+            </a:r>
+          </a:p>
+          <a:p>
+            <a:r>
+              <a:rPr lang="de-DE" dirty="0" smtClean="0"/>
+              <a:t>	Dateikonflikte aufwändiges</a:t>
+            </a:r>
+            <a:r>
+              <a:rPr lang="de-DE" baseline="0" dirty="0" smtClean="0"/>
+              <a:t> ein-/auschecken, mit </a:t>
+            </a:r>
+            <a:r>
+              <a:rPr lang="de-DE" baseline="0" dirty="0" err="1" smtClean="0"/>
+              <a:t>dropbox</a:t>
+            </a:r>
+            <a:r>
+              <a:rPr lang="de-DE" baseline="0" dirty="0" smtClean="0"/>
+              <a:t> und </a:t>
+            </a:r>
+            <a:r>
+              <a:rPr lang="de-DE" baseline="0" dirty="0" err="1" smtClean="0"/>
+              <a:t>co</a:t>
+            </a:r>
+            <a:r>
+              <a:rPr lang="de-DE" baseline="0" dirty="0" smtClean="0"/>
+              <a:t> on </a:t>
+            </a:r>
+            <a:r>
+              <a:rPr lang="de-DE" baseline="0" dirty="0" err="1" smtClean="0"/>
+              <a:t>the</a:t>
+            </a:r>
+            <a:r>
+              <a:rPr lang="de-DE" baseline="0" dirty="0" smtClean="0"/>
+              <a:t> </a:t>
+            </a:r>
+            <a:r>
+              <a:rPr lang="de-DE" baseline="0" dirty="0" err="1" smtClean="0"/>
+              <a:t>fly</a:t>
+            </a:r>
+            <a:r>
+              <a:rPr lang="de-DE" baseline="0" dirty="0" smtClean="0"/>
+              <a:t>, automatisch im Hintergrund.</a:t>
+            </a:r>
+          </a:p>
+          <a:p>
+            <a:r>
+              <a:rPr lang="de-DE" baseline="0" dirty="0" smtClean="0"/>
+              <a:t>	evtl. zu früh auf ein Tool festgelegt, oder besser zwei? (</a:t>
+            </a:r>
+            <a:r>
+              <a:rPr lang="de-DE" baseline="0" dirty="0" err="1" smtClean="0"/>
+              <a:t>dropbox</a:t>
+            </a:r>
+            <a:r>
+              <a:rPr lang="de-DE" baseline="0" dirty="0" smtClean="0"/>
+              <a:t> für Dokumente, </a:t>
+            </a:r>
+            <a:r>
+              <a:rPr lang="de-DE" baseline="0" dirty="0" err="1" smtClean="0"/>
+              <a:t>gitHub</a:t>
+            </a:r>
+            <a:r>
+              <a:rPr lang="de-DE" baseline="0" dirty="0" smtClean="0"/>
+              <a:t> für </a:t>
+            </a:r>
+            <a:r>
+              <a:rPr lang="de-DE" baseline="0" dirty="0" err="1" smtClean="0"/>
+              <a:t>Sourcen</a:t>
+            </a:r>
+            <a:r>
+              <a:rPr lang="de-DE" baseline="0" dirty="0" smtClean="0"/>
+              <a:t>)</a:t>
+            </a:r>
+          </a:p>
+          <a:p>
+            <a:r>
+              <a:rPr lang="de-DE" baseline="0" dirty="0" err="1" smtClean="0"/>
+              <a:t>Projektmgm</a:t>
+            </a:r>
+            <a:endParaRPr lang="de-DE" baseline="0" dirty="0" smtClean="0"/>
+          </a:p>
+          <a:p>
+            <a:r>
+              <a:rPr lang="de-DE" baseline="0" dirty="0" smtClean="0"/>
+              <a:t>	Aufgaben stärker </a:t>
+            </a:r>
+            <a:r>
+              <a:rPr lang="de-DE" baseline="0" dirty="0" err="1" smtClean="0"/>
+              <a:t>tracken</a:t>
+            </a:r>
+            <a:r>
+              <a:rPr lang="de-DE" baseline="0" dirty="0" smtClean="0"/>
+              <a:t>, ggf. „</a:t>
+            </a:r>
+            <a:r>
+              <a:rPr lang="de-DE" baseline="0" dirty="0" err="1" smtClean="0"/>
+              <a:t>cut</a:t>
+            </a:r>
+            <a:r>
+              <a:rPr lang="de-DE" baseline="0" dirty="0" smtClean="0"/>
+              <a:t>“ (bei Vertiefung in nicht notwendigen Details (z.B. Risikoanalyse, Wirtschaftlichkeitsbetrachtung)</a:t>
+            </a:r>
+          </a:p>
+          <a:p>
+            <a:endParaRPr lang="de-DE" dirty="0" smtClean="0"/>
+          </a:p>
+          <a:p>
+            <a:r>
+              <a:rPr lang="de-DE" dirty="0" err="1" smtClean="0"/>
+              <a:t>Workload</a:t>
+            </a:r>
+            <a:endParaRPr lang="de-DE" dirty="0" smtClean="0"/>
+          </a:p>
+          <a:p>
+            <a:r>
+              <a:rPr lang="de-DE" dirty="0" smtClean="0"/>
+              <a:t>	Höherer Aufwand als erwartet, zusätzlicher stress neben der Arbeit. Risikofaktor,</a:t>
+            </a:r>
+            <a:r>
+              <a:rPr lang="de-DE" baseline="0" dirty="0" smtClean="0"/>
+              <a:t> da alle beim gleichen Unternehmen arbeiten (viel zu tun (</a:t>
+            </a:r>
+            <a:r>
+              <a:rPr lang="de-DE" baseline="0" dirty="0" err="1" smtClean="0"/>
+              <a:t>arbeit</a:t>
+            </a:r>
+            <a:r>
+              <a:rPr lang="de-DE" baseline="0" dirty="0" smtClean="0"/>
+              <a:t>) </a:t>
+            </a:r>
+            <a:r>
+              <a:rPr lang="de-DE" baseline="0" dirty="0" smtClean="0">
+                <a:sym typeface="Wingdings" pitchFamily="2" charset="2"/>
+              </a:rPr>
+              <a:t> weniger Zeit (Projekt))</a:t>
+            </a:r>
+            <a:endParaRPr lang="de-DE" dirty="0" smtClean="0"/>
+          </a:p>
+          <a:p>
+            <a:r>
+              <a:rPr lang="de-DE" dirty="0" err="1" smtClean="0"/>
+              <a:t>PeerReview</a:t>
+            </a:r>
+            <a:r>
+              <a:rPr lang="de-DE" dirty="0" smtClean="0"/>
+              <a:t>:</a:t>
+            </a:r>
+          </a:p>
+          <a:p>
+            <a:r>
+              <a:rPr lang="de-DE" dirty="0" smtClean="0"/>
+              <a:t>	Hilfreich eine zweite unabhängige</a:t>
+            </a:r>
+            <a:r>
+              <a:rPr lang="de-DE" baseline="0" dirty="0" smtClean="0"/>
+              <a:t> Meinung; Lücken wurden identifiziert und behoben</a:t>
+            </a:r>
+          </a:p>
+          <a:p>
+            <a:r>
+              <a:rPr lang="de-DE" dirty="0" smtClean="0"/>
+              <a:t>Teamwork:</a:t>
+            </a:r>
+          </a:p>
+          <a:p>
+            <a:r>
+              <a:rPr lang="de-DE" dirty="0" smtClean="0"/>
+              <a:t>	Abstimmungen, Konstruktive </a:t>
+            </a:r>
+            <a:r>
+              <a:rPr lang="de-DE" dirty="0" err="1" smtClean="0"/>
+              <a:t>diskussionen</a:t>
+            </a:r>
+            <a:r>
+              <a:rPr lang="de-DE" dirty="0" smtClean="0"/>
+              <a:t>, Mitglieder</a:t>
+            </a:r>
+            <a:r>
+              <a:rPr lang="de-DE" baseline="0" dirty="0" smtClean="0"/>
+              <a:t> haben sich durch Fach/Spezialwissen gut ergänzt</a:t>
+            </a:r>
             <a:endParaRPr lang="de-DE" dirty="0"/>
           </a:p>
         </p:txBody>
@@ -2463,6 +2490,91 @@
             <a:fld id="{F7EBFB8C-BBFF-4397-A51C-1E92596422A9}" type="slidenum">
               <a:rPr lang="en-US" smtClean="0"/>
               <a:pPr/>
+              <a:t>32</a:t>
+            </a:fld>
+            <a:endParaRPr lang="en-US" dirty="0"/>
+          </a:p>
+        </p:txBody>
+      </p:sp>
+    </p:spTree>
+    <p:extLst>
+      <p:ext uri="{BB962C8B-B14F-4D97-AF65-F5344CB8AC3E}">
+        <p14:creationId xmlns:p14="http://schemas.microsoft.com/office/powerpoint/2010/main" val="1616458392"/>
+      </p:ext>
+    </p:extLst>
+  </p:cSld>
+  <p:clrMapOvr>
+    <a:masterClrMapping/>
+  </p:clrMapOvr>
+</p:notes>
+</file>
+
+<file path=ppt/notesSlides/notesSlide22.xml><?xml version="1.0" encoding="utf-8"?>
+<p:notes xmlns:a="http://schemas.openxmlformats.org/drawingml/2006/main" xmlns:r="http://schemas.openxmlformats.org/officeDocument/2006/relationships" xmlns:p="http://schemas.openxmlformats.org/presentationml/2006/main">
+  <p:cSld>
+    <p:spTree>
+      <p:nvGrpSpPr>
+        <p:cNvPr id="1" name=""/>
+        <p:cNvGrpSpPr/>
+        <p:nvPr/>
+      </p:nvGrpSpPr>
+      <p:grpSpPr>
+        <a:xfrm>
+          <a:off x="0" y="0"/>
+          <a:ext cx="0" cy="0"/>
+          <a:chOff x="0" y="0"/>
+          <a:chExt cx="0" cy="0"/>
+        </a:xfrm>
+      </p:grpSpPr>
+      <p:sp>
+        <p:nvSpPr>
+          <p:cNvPr id="2" name="Folienbildplatzhalter 1"/>
+          <p:cNvSpPr>
+            <a:spLocks noGrp="1" noRot="1" noChangeAspect="1"/>
+          </p:cNvSpPr>
+          <p:nvPr>
+            <p:ph type="sldImg"/>
+          </p:nvPr>
+        </p:nvSpPr>
+        <p:spPr/>
+      </p:sp>
+      <p:sp>
+        <p:nvSpPr>
+          <p:cNvPr id="3" name="Notizenplatzhalter 2"/>
+          <p:cNvSpPr>
+            <a:spLocks noGrp="1"/>
+          </p:cNvSpPr>
+          <p:nvPr>
+            <p:ph type="body" idx="1"/>
+          </p:nvPr>
+        </p:nvSpPr>
+        <p:spPr/>
+        <p:txBody>
+          <a:bodyPr/>
+          <a:lstStyle/>
+          <a:p>
+            <a:endParaRPr lang="de-DE" dirty="0"/>
+          </a:p>
+        </p:txBody>
+      </p:sp>
+      <p:sp>
+        <p:nvSpPr>
+          <p:cNvPr id="4" name="Foliennummernplatzhalter 3"/>
+          <p:cNvSpPr>
+            <a:spLocks noGrp="1"/>
+          </p:cNvSpPr>
+          <p:nvPr>
+            <p:ph type="sldNum" sz="quarter" idx="10"/>
+          </p:nvPr>
+        </p:nvSpPr>
+        <p:spPr/>
+        <p:txBody>
+          <a:bodyPr/>
+          <a:lstStyle/>
+          <a:p>
+            <a:fld id="{F7EBFB8C-BBFF-4397-A51C-1E92596422A9}" type="slidenum">
+              <a:rPr lang="en-US" smtClean="0"/>
+              <a:pPr/>
               <a:t>33</a:t>
             </a:fld>
             <a:endParaRPr lang="en-US" dirty="0"/>
@@ -2472,7 +2584,7 @@
     </p:spTree>
     <p:extLst>
       <p:ext uri="{BB962C8B-B14F-4D97-AF65-F5344CB8AC3E}">
-        <p14:creationId xmlns:p14="http://schemas.microsoft.com/office/powerpoint/2010/main" xmlns="" val="2116472317"/>
+        <p14:creationId xmlns:p14="http://schemas.microsoft.com/office/powerpoint/2010/main" val="2116472317"/>
       </p:ext>
     </p:extLst>
   </p:cSld>
@@ -2797,7 +2909,7 @@
     </p:spTree>
     <p:extLst>
       <p:ext uri="{BB962C8B-B14F-4D97-AF65-F5344CB8AC3E}">
-        <p14:creationId xmlns:p14="http://schemas.microsoft.com/office/powerpoint/2010/main" xmlns="" val="517533983"/>
+        <p14:creationId xmlns:p14="http://schemas.microsoft.com/office/powerpoint/2010/main" val="517533983"/>
       </p:ext>
     </p:extLst>
   </p:cSld>
@@ -2852,12 +2964,8 @@
           <a:lstStyle/>
           <a:p>
             <a:r>
-              <a:rPr lang="de-DE" smtClean="0"/>
-              <a:t>Alte: Groß </a:t>
-            </a:r>
-            <a:r>
               <a:rPr lang="de-DE" dirty="0" smtClean="0"/>
-              <a:t>und</a:t>
+              <a:t>Alte: Groß und</a:t>
             </a:r>
             <a:r>
               <a:rPr lang="de-DE" baseline="0" dirty="0" smtClean="0"/>
@@ -2973,7 +3081,7 @@
     </p:spTree>
     <p:extLst>
       <p:ext uri="{BB962C8B-B14F-4D97-AF65-F5344CB8AC3E}">
-        <p14:creationId xmlns:p14="http://schemas.microsoft.com/office/powerpoint/2010/main" xmlns="" val="2934279750"/>
+        <p14:creationId xmlns:p14="http://schemas.microsoft.com/office/powerpoint/2010/main" val="2934279750"/>
       </p:ext>
     </p:extLst>
   </p:cSld>
@@ -3070,7 +3178,7 @@
     </p:spTree>
     <p:extLst>
       <p:ext uri="{BB962C8B-B14F-4D97-AF65-F5344CB8AC3E}">
-        <p14:creationId xmlns:p14="http://schemas.microsoft.com/office/powerpoint/2010/main" xmlns="" val="2934279750"/>
+        <p14:creationId xmlns:p14="http://schemas.microsoft.com/office/powerpoint/2010/main" val="2934279750"/>
       </p:ext>
     </p:extLst>
   </p:cSld>
@@ -3125,12 +3233,23 @@
           <a:lstStyle/>
           <a:p>
             <a:r>
-              <a:rPr lang="de-DE" dirty="0" smtClean="0"/>
-              <a:t>Wie bei vielen Internetseiten</a:t>
-            </a:r>
-            <a:r>
               <a:rPr lang="de-DE" baseline="0" dirty="0" smtClean="0"/>
-              <a:t> stehen </a:t>
+              <a:t>bestimmte Funktionen erst nach einer Registrierung/Authentifizierung &lt;klick&gt;</a:t>
+            </a:r>
+          </a:p>
+          <a:p>
+            <a:r>
+              <a:rPr lang="de-DE" baseline="0" dirty="0" smtClean="0"/>
+              <a:t>Konkrete Anforderung zum Login zur Authentifizierung: &lt;klick&gt; Diese soll mit einem Benutzernamen und Passwort erfolgen</a:t>
+            </a:r>
+          </a:p>
+          <a:p>
+            <a:endParaRPr lang="de-DE" baseline="0" dirty="0" smtClean="0"/>
+          </a:p>
+          <a:p>
+            <a:r>
+              <a:rPr lang="de-DE" baseline="0" dirty="0" smtClean="0"/>
+              <a:t>&lt;klick&gt; Weiter später in den Produktschnittstellen eine weitere Anforderung über alternative Authentifizierungsmöglichkeiten, wie z.B. Facebook</a:t>
             </a:r>
             <a:endParaRPr lang="de-DE" dirty="0"/>
           </a:p>
@@ -3163,7 +3282,7 @@
     </p:spTree>
     <p:extLst>
       <p:ext uri="{BB962C8B-B14F-4D97-AF65-F5344CB8AC3E}">
-        <p14:creationId xmlns:p14="http://schemas.microsoft.com/office/powerpoint/2010/main" xmlns="" val="2934279750"/>
+        <p14:creationId xmlns:p14="http://schemas.microsoft.com/office/powerpoint/2010/main" val="2934279750"/>
       </p:ext>
     </p:extLst>
   </p:cSld>
@@ -3573,7 +3692,7 @@
     </p:spTree>
     <p:extLst>
       <p:ext uri="{BB962C8B-B14F-4D97-AF65-F5344CB8AC3E}">
-        <p14:creationId xmlns:p14="http://schemas.microsoft.com/office/powerpoint/2010/main" xmlns="" val="2934279750"/>
+        <p14:creationId xmlns:p14="http://schemas.microsoft.com/office/powerpoint/2010/main" val="2934279750"/>
       </p:ext>
     </p:extLst>
   </p:cSld>
@@ -3658,7 +3777,7 @@
     </p:spTree>
     <p:extLst>
       <p:ext uri="{BB962C8B-B14F-4D97-AF65-F5344CB8AC3E}">
-        <p14:creationId xmlns:p14="http://schemas.microsoft.com/office/powerpoint/2010/main" xmlns="" val="3860513045"/>
+        <p14:creationId xmlns:p14="http://schemas.microsoft.com/office/powerpoint/2010/main" val="3860513045"/>
       </p:ext>
     </p:extLst>
   </p:cSld>
@@ -3755,7 +3874,7 @@
     </p:spTree>
     <p:extLst>
       <p:ext uri="{BB962C8B-B14F-4D97-AF65-F5344CB8AC3E}">
-        <p14:creationId xmlns:p14="http://schemas.microsoft.com/office/powerpoint/2010/main" xmlns="" val="2934279750"/>
+        <p14:creationId xmlns:p14="http://schemas.microsoft.com/office/powerpoint/2010/main" val="2934279750"/>
       </p:ext>
     </p:extLst>
   </p:cSld>
@@ -8028,7 +8147,7 @@
           <a:blip r:embed="rId13" cstate="print">
             <a:extLst>
               <a:ext uri="{28A0092B-C50C-407E-A947-70E740481C1C}">
-                <a14:useLocalDpi xmlns:a14="http://schemas.microsoft.com/office/drawing/2010/main" xmlns="" val="0"/>
+                <a14:useLocalDpi xmlns:a14="http://schemas.microsoft.com/office/drawing/2010/main" val="0"/>
               </a:ext>
             </a:extLst>
           </a:blip>
@@ -8529,7 +8648,7 @@
           <a:blip r:embed="rId3" cstate="print">
             <a:extLst>
               <a:ext uri="{28A0092B-C50C-407E-A947-70E740481C1C}">
-                <a14:useLocalDpi xmlns:a14="http://schemas.microsoft.com/office/drawing/2010/main" xmlns="" val="0"/>
+                <a14:useLocalDpi xmlns:a14="http://schemas.microsoft.com/office/drawing/2010/main" val="0"/>
               </a:ext>
             </a:extLst>
           </a:blip>
@@ -8559,7 +8678,7 @@
           <a:blip r:embed="rId4" cstate="print">
             <a:extLst>
               <a:ext uri="{28A0092B-C50C-407E-A947-70E740481C1C}">
-                <a14:useLocalDpi xmlns:a14="http://schemas.microsoft.com/office/drawing/2010/main" xmlns="" val="0"/>
+                <a14:useLocalDpi xmlns:a14="http://schemas.microsoft.com/office/drawing/2010/main" val="0"/>
               </a:ext>
             </a:extLst>
           </a:blip>
@@ -9005,7 +9124,7 @@
           <a:blip r:embed="rId3" cstate="print">
             <a:extLst>
               <a:ext uri="{28A0092B-C50C-407E-A947-70E740481C1C}">
-                <a14:useLocalDpi xmlns:a14="http://schemas.microsoft.com/office/drawing/2010/main" xmlns="" val="0"/>
+                <a14:useLocalDpi xmlns:a14="http://schemas.microsoft.com/office/drawing/2010/main" val="0"/>
               </a:ext>
             </a:extLst>
           </a:blip>
@@ -9026,7 +9145,7 @@
     </p:spTree>
     <p:extLst>
       <p:ext uri="{BB962C8B-B14F-4D97-AF65-F5344CB8AC3E}">
-        <p14:creationId xmlns:p14="http://schemas.microsoft.com/office/powerpoint/2010/main" xmlns="" val="3542583579"/>
+        <p14:creationId xmlns:p14="http://schemas.microsoft.com/office/powerpoint/2010/main" val="3542583579"/>
       </p:ext>
     </p:extLst>
   </p:cSld>
@@ -9504,7 +9623,7 @@
     </p:spTree>
     <p:extLst>
       <p:ext uri="{BB962C8B-B14F-4D97-AF65-F5344CB8AC3E}">
-        <p14:creationId xmlns:p14="http://schemas.microsoft.com/office/powerpoint/2010/main" xmlns="" val="351671181"/>
+        <p14:creationId xmlns:p14="http://schemas.microsoft.com/office/powerpoint/2010/main" val="351671181"/>
       </p:ext>
     </p:extLst>
   </p:cSld>
@@ -10064,7 +10183,7 @@
           <p:nvPr/>
         </p:nvPicPr>
         <p:blipFill>
-          <a:blip r:embed="rId2" cstate="print"/>
+          <a:blip r:embed="rId3" cstate="print"/>
           <a:srcRect l="-1238" t="-2160" r="-1458" b="-3999"/>
           <a:stretch>
             <a:fillRect/>
@@ -10293,15 +10412,33 @@
                                   </p:childTnLst>
                                 </p:cTn>
                               </p:par>
+                            </p:childTnLst>
+                          </p:cTn>
+                        </p:par>
+                      </p:childTnLst>
+                    </p:cTn>
+                  </p:par>
+                  <p:par>
+                    <p:cTn id="7" fill="hold">
+                      <p:stCondLst>
+                        <p:cond delay="indefinite"/>
+                      </p:stCondLst>
+                      <p:childTnLst>
+                        <p:par>
+                          <p:cTn id="8" fill="hold">
+                            <p:stCondLst>
+                              <p:cond delay="0"/>
+                            </p:stCondLst>
+                            <p:childTnLst>
                               <p:par>
-                                <p:cTn id="7" presetID="1" presetClass="entr" presetSubtype="0" fill="hold" nodeType="withEffect">
+                                <p:cTn id="9" presetID="1" presetClass="entr" presetSubtype="0" fill="hold" nodeType="clickEffect">
                                   <p:stCondLst>
                                     <p:cond delay="0"/>
                                   </p:stCondLst>
                                   <p:childTnLst>
                                     <p:set>
                                       <p:cBhvr>
-                                        <p:cTn id="8" dur="1" fill="hold">
+                                        <p:cTn id="10" dur="1" fill="hold">
                                           <p:stCondLst>
                                             <p:cond delay="0"/>
                                           </p:stCondLst>
@@ -10320,15 +10457,33 @@
                                   </p:childTnLst>
                                 </p:cTn>
                               </p:par>
+                            </p:childTnLst>
+                          </p:cTn>
+                        </p:par>
+                      </p:childTnLst>
+                    </p:cTn>
+                  </p:par>
+                  <p:par>
+                    <p:cTn id="11" fill="hold">
+                      <p:stCondLst>
+                        <p:cond delay="indefinite"/>
+                      </p:stCondLst>
+                      <p:childTnLst>
+                        <p:par>
+                          <p:cTn id="12" fill="hold">
+                            <p:stCondLst>
+                              <p:cond delay="0"/>
+                            </p:stCondLst>
+                            <p:childTnLst>
                               <p:par>
-                                <p:cTn id="9" presetID="1" presetClass="entr" presetSubtype="0" fill="hold" nodeType="withEffect">
+                                <p:cTn id="13" presetID="1" presetClass="entr" presetSubtype="0" fill="hold" nodeType="clickEffect">
                                   <p:stCondLst>
                                     <p:cond delay="0"/>
                                   </p:stCondLst>
                                   <p:childTnLst>
                                     <p:set>
                                       <p:cBhvr>
-                                        <p:cTn id="10" dur="1" fill="hold">
+                                        <p:cTn id="14" dur="1" fill="hold">
                                           <p:stCondLst>
                                             <p:cond delay="0"/>
                                           </p:stCondLst>
@@ -10866,7 +11021,7 @@
     </p:spTree>
     <p:extLst>
       <p:ext uri="{BB962C8B-B14F-4D97-AF65-F5344CB8AC3E}">
-        <p14:creationId xmlns:p14="http://schemas.microsoft.com/office/powerpoint/2010/main" xmlns="" val="39477268"/>
+        <p14:creationId xmlns:p14="http://schemas.microsoft.com/office/powerpoint/2010/main" val="39477268"/>
       </p:ext>
     </p:extLst>
   </p:cSld>
@@ -12545,7 +12700,7 @@
           <a:blip r:embed="rId4" cstate="print">
             <a:extLst>
               <a:ext uri="{28A0092B-C50C-407E-A947-70E740481C1C}">
-                <a14:useLocalDpi xmlns:a14="http://schemas.microsoft.com/office/drawing/2010/main" xmlns="" val="0"/>
+                <a14:useLocalDpi xmlns:a14="http://schemas.microsoft.com/office/drawing/2010/main" val="0"/>
               </a:ext>
             </a:extLst>
           </a:blip>
@@ -12823,7 +12978,7 @@
     </p:spTree>
     <p:extLst>
       <p:ext uri="{BB962C8B-B14F-4D97-AF65-F5344CB8AC3E}">
-        <p14:creationId xmlns:p14="http://schemas.microsoft.com/office/powerpoint/2010/main" xmlns="" val="141785747"/>
+        <p14:creationId xmlns:p14="http://schemas.microsoft.com/office/powerpoint/2010/main" val="141785747"/>
       </p:ext>
     </p:extLst>
   </p:cSld>
@@ -13102,7 +13257,7 @@
     </p:spTree>
     <p:extLst>
       <p:ext uri="{BB962C8B-B14F-4D97-AF65-F5344CB8AC3E}">
-        <p14:creationId xmlns:p14="http://schemas.microsoft.com/office/powerpoint/2010/main" xmlns="" val="3630298673"/>
+        <p14:creationId xmlns:p14="http://schemas.microsoft.com/office/powerpoint/2010/main" val="3630298673"/>
       </p:ext>
     </p:extLst>
   </p:cSld>
@@ -13437,7 +13592,7 @@
     </p:spTree>
     <p:extLst>
       <p:ext uri="{BB962C8B-B14F-4D97-AF65-F5344CB8AC3E}">
-        <p14:creationId xmlns:p14="http://schemas.microsoft.com/office/powerpoint/2010/main" xmlns="" val="2634211947"/>
+        <p14:creationId xmlns:p14="http://schemas.microsoft.com/office/powerpoint/2010/main" val="2634211947"/>
       </p:ext>
     </p:extLst>
   </p:cSld>
@@ -16636,7 +16791,7 @@
     </p:spTree>
     <p:extLst>
       <p:ext uri="{BB962C8B-B14F-4D97-AF65-F5344CB8AC3E}">
-        <p14:creationId xmlns:p14="http://schemas.microsoft.com/office/powerpoint/2010/main" xmlns="" val="3243626544"/>
+        <p14:creationId xmlns:p14="http://schemas.microsoft.com/office/powerpoint/2010/main" val="3243626544"/>
       </p:ext>
     </p:extLst>
   </p:cSld>
@@ -18028,7 +18183,7 @@
     </p:spTree>
     <p:extLst>
       <p:ext uri="{BB962C8B-B14F-4D97-AF65-F5344CB8AC3E}">
-        <p14:creationId xmlns:p14="http://schemas.microsoft.com/office/powerpoint/2010/main" xmlns="" val="3243626544"/>
+        <p14:creationId xmlns:p14="http://schemas.microsoft.com/office/powerpoint/2010/main" val="3243626544"/>
       </p:ext>
     </p:extLst>
   </p:cSld>
@@ -19041,7 +19196,7 @@
     </p:spTree>
     <p:extLst>
       <p:ext uri="{BB962C8B-B14F-4D97-AF65-F5344CB8AC3E}">
-        <p14:creationId xmlns:p14="http://schemas.microsoft.com/office/powerpoint/2010/main" xmlns="" val="3243626544"/>
+        <p14:creationId xmlns:p14="http://schemas.microsoft.com/office/powerpoint/2010/main" val="3243626544"/>
       </p:ext>
     </p:extLst>
   </p:cSld>
@@ -19316,7 +19471,7 @@
           <a:blip r:embed="rId3" cstate="print">
             <a:extLst>
               <a:ext uri="{28A0092B-C50C-407E-A947-70E740481C1C}">
-                <a14:useLocalDpi xmlns:a14="http://schemas.microsoft.com/office/drawing/2010/main" xmlns="" val="0"/>
+                <a14:useLocalDpi xmlns:a14="http://schemas.microsoft.com/office/drawing/2010/main" val="0"/>
               </a:ext>
             </a:extLst>
           </a:blip>
@@ -19545,7 +19700,7 @@
           <a:blip r:embed="rId4" cstate="print">
             <a:extLst>
               <a:ext uri="{28A0092B-C50C-407E-A947-70E740481C1C}">
-                <a14:useLocalDpi xmlns:a14="http://schemas.microsoft.com/office/drawing/2010/main" xmlns="" val="0"/>
+                <a14:useLocalDpi xmlns:a14="http://schemas.microsoft.com/office/drawing/2010/main" val="0"/>
               </a:ext>
             </a:extLst>
           </a:blip>
@@ -19609,7 +19764,7 @@
           <a:blip r:embed="rId5" cstate="print">
             <a:extLst>
               <a:ext uri="{28A0092B-C50C-407E-A947-70E740481C1C}">
-                <a14:useLocalDpi xmlns:a14="http://schemas.microsoft.com/office/drawing/2010/main" xmlns="" val="0"/>
+                <a14:useLocalDpi xmlns:a14="http://schemas.microsoft.com/office/drawing/2010/main" val="0"/>
               </a:ext>
             </a:extLst>
           </a:blip>
@@ -19898,7 +20053,7 @@
           <a:blip r:embed="rId6" cstate="print">
             <a:extLst>
               <a:ext uri="{28A0092B-C50C-407E-A947-70E740481C1C}">
-                <a14:useLocalDpi xmlns:a14="http://schemas.microsoft.com/office/drawing/2010/main" xmlns="" val="0"/>
+                <a14:useLocalDpi xmlns:a14="http://schemas.microsoft.com/office/drawing/2010/main" val="0"/>
               </a:ext>
             </a:extLst>
           </a:blip>
@@ -21064,7 +21219,7 @@
     </p:spTree>
     <p:extLst>
       <p:ext uri="{BB962C8B-B14F-4D97-AF65-F5344CB8AC3E}">
-        <p14:creationId xmlns:p14="http://schemas.microsoft.com/office/powerpoint/2010/main" xmlns="" val="2653926061"/>
+        <p14:creationId xmlns:p14="http://schemas.microsoft.com/office/powerpoint/2010/main" val="2653926061"/>
       </p:ext>
     </p:extLst>
   </p:cSld>
@@ -22597,7 +22752,7 @@
           <a:blip r:embed="rId2" cstate="print">
             <a:extLst>
               <a:ext uri="{28A0092B-C50C-407E-A947-70E740481C1C}">
-                <a14:useLocalDpi xmlns:a14="http://schemas.microsoft.com/office/drawing/2010/main" xmlns="" val="0"/>
+                <a14:useLocalDpi xmlns:a14="http://schemas.microsoft.com/office/drawing/2010/main" val="0"/>
               </a:ext>
             </a:extLst>
           </a:blip>
@@ -22646,40 +22801,13 @@
               <a:srgbClr val="969696"/>
             </a:contourClr>
           </a:sp3d>
-          <a:extLst>
-            <a:ext uri="{909E8E84-426E-40DD-AFC4-6F175D3DCCD1}">
-              <a14:hiddenFill xmlns:a14="http://schemas.microsoft.com/office/drawing/2010/main" xmlns="">
-                <a:solidFill>
-                  <a:schemeClr val="accent1"/>
-                </a:solidFill>
-              </a14:hiddenFill>
-            </a:ext>
-            <a:ext uri="{91240B29-F687-4F45-9708-019B960494DF}">
-              <a14:hiddenLine xmlns:a14="http://schemas.microsoft.com/office/drawing/2010/main" xmlns="" w="9525">
-                <a:solidFill>
-                  <a:schemeClr val="tx1"/>
-                </a:solidFill>
-                <a:miter lim="800000"/>
-                <a:headEnd/>
-                <a:tailEnd/>
-              </a14:hiddenLine>
-            </a:ext>
-            <a:ext uri="{AF507438-7753-43E0-B8FC-AC1667EBCBE1}">
-              <a14:hiddenEffects xmlns:a14="http://schemas.microsoft.com/office/drawing/2010/main" xmlns="">
-                <a:effectLst>
-                  <a:outerShdw dist="35921" dir="2700000" algn="ctr" rotWithShape="0">
-                    <a:schemeClr val="bg2"/>
-                  </a:outerShdw>
-                </a:effectLst>
-              </a14:hiddenEffects>
-            </a:ext>
-          </a:extLst>
+          <a:extLst/>
         </p:spPr>
       </p:pic>
     </p:spTree>
     <p:extLst>
       <p:ext uri="{BB962C8B-B14F-4D97-AF65-F5344CB8AC3E}">
-        <p14:creationId xmlns:p14="http://schemas.microsoft.com/office/powerpoint/2010/main" xmlns="" val="3309636493"/>
+        <p14:creationId xmlns:p14="http://schemas.microsoft.com/office/powerpoint/2010/main" val="3309636493"/>
       </p:ext>
     </p:extLst>
   </p:cSld>
@@ -23097,7 +23225,7 @@
     </p:spTree>
     <p:extLst>
       <p:ext uri="{BB962C8B-B14F-4D97-AF65-F5344CB8AC3E}">
-        <p14:creationId xmlns:p14="http://schemas.microsoft.com/office/powerpoint/2010/main" xmlns="" val="1012322072"/>
+        <p14:creationId xmlns:p14="http://schemas.microsoft.com/office/powerpoint/2010/main" val="1012322072"/>
       </p:ext>
     </p:extLst>
   </p:cSld>
@@ -23316,7 +23444,7 @@
     </p:spTree>
     <p:extLst>
       <p:ext uri="{BB962C8B-B14F-4D97-AF65-F5344CB8AC3E}">
-        <p14:creationId xmlns:p14="http://schemas.microsoft.com/office/powerpoint/2010/main" xmlns="" val="1012322072"/>
+        <p14:creationId xmlns:p14="http://schemas.microsoft.com/office/powerpoint/2010/main" val="1012322072"/>
       </p:ext>
     </p:extLst>
   </p:cSld>
@@ -23595,7 +23723,7 @@
     </p:spTree>
     <p:extLst>
       <p:ext uri="{BB962C8B-B14F-4D97-AF65-F5344CB8AC3E}">
-        <p14:creationId xmlns:p14="http://schemas.microsoft.com/office/powerpoint/2010/main" xmlns="" val="2868797759"/>
+        <p14:creationId xmlns:p14="http://schemas.microsoft.com/office/powerpoint/2010/main" val="2868797759"/>
       </p:ext>
     </p:extLst>
   </p:cSld>
@@ -23987,7 +24115,7 @@
           <a:blip r:embed="rId2" cstate="print">
             <a:extLst>
               <a:ext uri="{BEBA8EAE-BF5A-486C-A8C5-ECC9F3942E4B}">
-                <a14:imgProps xmlns:a14="http://schemas.microsoft.com/office/drawing/2010/main" xmlns="">
+                <a14:imgProps xmlns:a14="http://schemas.microsoft.com/office/drawing/2010/main">
                   <a14:imgLayer r:embed="rId3">
                     <a14:imgEffect>
                       <a14:backgroundRemoval t="6057" b="22942" l="7000" r="29162"/>
@@ -23996,7 +24124,7 @@
                 </a14:imgProps>
               </a:ext>
               <a:ext uri="{28A0092B-C50C-407E-A947-70E740481C1C}">
-                <a14:useLocalDpi xmlns:a14="http://schemas.microsoft.com/office/drawing/2010/main" xmlns="" val="0"/>
+                <a14:useLocalDpi xmlns:a14="http://schemas.microsoft.com/office/drawing/2010/main" val="0"/>
               </a:ext>
             </a:extLst>
           </a:blip>
@@ -24014,7 +24142,7 @@
           <a:noFill/>
           <a:extLst>
             <a:ext uri="{909E8E84-426E-40DD-AFC4-6F175D3DCCD1}">
-              <a14:hiddenFill xmlns:a14="http://schemas.microsoft.com/office/drawing/2010/main" xmlns="">
+              <a14:hiddenFill xmlns:a14="http://schemas.microsoft.com/office/drawing/2010/main">
                 <a:solidFill>
                   <a:srgbClr val="FFFFFF"/>
                 </a:solidFill>
@@ -24035,7 +24163,7 @@
           <a:blip r:embed="rId2" cstate="print">
             <a:extLst>
               <a:ext uri="{BEBA8EAE-BF5A-486C-A8C5-ECC9F3942E4B}">
-                <a14:imgProps xmlns:a14="http://schemas.microsoft.com/office/drawing/2010/main" xmlns="">
+                <a14:imgProps xmlns:a14="http://schemas.microsoft.com/office/drawing/2010/main">
                   <a14:imgLayer r:embed="rId3">
                     <a14:imgEffect>
                       <a14:backgroundRemoval t="6057" b="22942" l="7000" r="29162"/>
@@ -24044,7 +24172,7 @@
                 </a14:imgProps>
               </a:ext>
               <a:ext uri="{28A0092B-C50C-407E-A947-70E740481C1C}">
-                <a14:useLocalDpi xmlns:a14="http://schemas.microsoft.com/office/drawing/2010/main" xmlns="" val="0"/>
+                <a14:useLocalDpi xmlns:a14="http://schemas.microsoft.com/office/drawing/2010/main" val="0"/>
               </a:ext>
             </a:extLst>
           </a:blip>
@@ -24062,7 +24190,7 @@
           <a:noFill/>
           <a:extLst>
             <a:ext uri="{909E8E84-426E-40DD-AFC4-6F175D3DCCD1}">
-              <a14:hiddenFill xmlns:a14="http://schemas.microsoft.com/office/drawing/2010/main" xmlns="">
+              <a14:hiddenFill xmlns:a14="http://schemas.microsoft.com/office/drawing/2010/main">
                 <a:solidFill>
                   <a:srgbClr val="FFFFFF"/>
                 </a:solidFill>
@@ -24074,7 +24202,7 @@
     </p:spTree>
     <p:extLst>
       <p:ext uri="{BB962C8B-B14F-4D97-AF65-F5344CB8AC3E}">
-        <p14:creationId xmlns:p14="http://schemas.microsoft.com/office/powerpoint/2010/main" xmlns="" val="2645794681"/>
+        <p14:creationId xmlns:p14="http://schemas.microsoft.com/office/powerpoint/2010/main" val="2645794681"/>
       </p:ext>
     </p:extLst>
   </p:cSld>
@@ -24331,12 +24459,8 @@
           </a:p>
           <a:p>
             <a:r>
-              <a:rPr lang="de-DE" dirty="0" err="1" smtClean="0"/>
-              <a:t>Location</a:t>
-            </a:r>
-            <a:r>
               <a:rPr lang="de-DE" dirty="0" smtClean="0"/>
-              <a:t>-</a:t>
+              <a:t>Location-</a:t>
             </a:r>
             <a:r>
               <a:rPr lang="de-DE" dirty="0" err="1" smtClean="0"/>
@@ -24346,13 +24470,7 @@
               <a:rPr lang="de-DE" dirty="0" smtClean="0"/>
               <a:t>-Services</a:t>
             </a:r>
-          </a:p>
-          <a:p>
-            <a:r>
-              <a:rPr lang="de-DE" dirty="0" smtClean="0"/>
-              <a:t>…</a:t>
-            </a:r>
-            <a:endParaRPr lang="de-DE" dirty="0"/>
+            <a:endParaRPr lang="de-DE" dirty="0" smtClean="0"/>
           </a:p>
         </p:txBody>
       </p:sp>
@@ -24438,7 +24556,7 @@
           <a:blip r:embed="rId3" cstate="print">
             <a:extLst>
               <a:ext uri="{28A0092B-C50C-407E-A947-70E740481C1C}">
-                <a14:useLocalDpi xmlns:a14="http://schemas.microsoft.com/office/drawing/2010/main" xmlns="" val="0"/>
+                <a14:useLocalDpi xmlns:a14="http://schemas.microsoft.com/office/drawing/2010/main" val="0"/>
               </a:ext>
             </a:extLst>
           </a:blip>
@@ -24470,7 +24588,7 @@
           </a:effectLst>
           <a:extLst>
             <a:ext uri="{91240B29-F687-4F45-9708-019B960494DF}">
-              <a14:hiddenLine xmlns:a14="http://schemas.microsoft.com/office/drawing/2010/main" xmlns="" w="9525">
+              <a14:hiddenLine xmlns:a14="http://schemas.microsoft.com/office/drawing/2010/main" w="9525">
                 <a:solidFill>
                   <a:schemeClr val="tx1"/>
                 </a:solidFill>
@@ -24485,7 +24603,7 @@
     </p:spTree>
     <p:extLst>
       <p:ext uri="{BB962C8B-B14F-4D97-AF65-F5344CB8AC3E}">
-        <p14:creationId xmlns:p14="http://schemas.microsoft.com/office/powerpoint/2010/main" xmlns="" val="313312729"/>
+        <p14:creationId xmlns:p14="http://schemas.microsoft.com/office/powerpoint/2010/main" val="313312729"/>
       </p:ext>
     </p:extLst>
   </p:cSld>
@@ -24705,10 +24823,51 @@
           </a:p>
         </p:txBody>
       </p:sp>
+      <p:pic>
+        <p:nvPicPr>
+          <p:cNvPr id="1026" name="Picture 2" descr="http://i298.photobucket.com/albums/mm248/dkingsta/cartoon-headset.png"/>
+          <p:cNvPicPr>
+            <a:picLocks noChangeAspect="1" noChangeArrowheads="1"/>
+          </p:cNvPicPr>
+          <p:nvPr/>
+        </p:nvPicPr>
+        <p:blipFill>
+          <a:blip r:embed="rId3">
+            <a:extLst>
+              <a:ext uri="{28A0092B-C50C-407E-A947-70E740481C1C}">
+                <a14:useLocalDpi xmlns:a14="http://schemas.microsoft.com/office/drawing/2010/main" val="0"/>
+              </a:ext>
+            </a:extLst>
+          </a:blip>
+          <a:srcRect/>
+          <a:stretch>
+            <a:fillRect/>
+          </a:stretch>
+        </p:blipFill>
+        <p:spPr bwMode="auto">
+          <a:xfrm>
+            <a:off x="5652120" y="4293096"/>
+            <a:ext cx="1513056" cy="1656184"/>
+          </a:xfrm>
+          <a:prstGeom prst="rect">
+            <a:avLst/>
+          </a:prstGeom>
+          <a:noFill/>
+          <a:extLst>
+            <a:ext uri="{909E8E84-426E-40DD-AFC4-6F175D3DCCD1}">
+              <a14:hiddenFill xmlns:a14="http://schemas.microsoft.com/office/drawing/2010/main">
+                <a:solidFill>
+                  <a:srgbClr val="FFFFFF"/>
+                </a:solidFill>
+              </a14:hiddenFill>
+            </a:ext>
+          </a:extLst>
+        </p:spPr>
+      </p:pic>
     </p:spTree>
     <p:extLst>
       <p:ext uri="{BB962C8B-B14F-4D97-AF65-F5344CB8AC3E}">
-        <p14:creationId xmlns:p14="http://schemas.microsoft.com/office/powerpoint/2010/main" xmlns="" val="1344880779"/>
+        <p14:creationId xmlns:p14="http://schemas.microsoft.com/office/powerpoint/2010/main" val="1344880779"/>
       </p:ext>
     </p:extLst>
   </p:cSld>
@@ -24811,7 +24970,7 @@
           <a:blip r:embed="rId3" cstate="print">
             <a:extLst>
               <a:ext uri="{28A0092B-C50C-407E-A947-70E740481C1C}">
-                <a14:useLocalDpi xmlns:a14="http://schemas.microsoft.com/office/drawing/2010/main" xmlns="" val="0"/>
+                <a14:useLocalDpi xmlns:a14="http://schemas.microsoft.com/office/drawing/2010/main" val="0"/>
               </a:ext>
             </a:extLst>
           </a:blip>
@@ -24841,7 +25000,7 @@
           <a:blip r:embed="rId4" cstate="print">
             <a:extLst>
               <a:ext uri="{28A0092B-C50C-407E-A947-70E740481C1C}">
-                <a14:useLocalDpi xmlns:a14="http://schemas.microsoft.com/office/drawing/2010/main" xmlns="" val="0"/>
+                <a14:useLocalDpi xmlns:a14="http://schemas.microsoft.com/office/drawing/2010/main" val="0"/>
               </a:ext>
             </a:extLst>
           </a:blip>
@@ -24862,7 +25021,7 @@
     </p:spTree>
     <p:extLst>
       <p:ext uri="{BB962C8B-B14F-4D97-AF65-F5344CB8AC3E}">
-        <p14:creationId xmlns:p14="http://schemas.microsoft.com/office/powerpoint/2010/main" xmlns="" val="2565098391"/>
+        <p14:creationId xmlns:p14="http://schemas.microsoft.com/office/powerpoint/2010/main" val="2565098391"/>
       </p:ext>
     </p:extLst>
   </p:cSld>
@@ -25113,7 +25272,7 @@
     </p:spTree>
     <p:extLst>
       <p:ext uri="{BB962C8B-B14F-4D97-AF65-F5344CB8AC3E}">
-        <p14:creationId xmlns:p14="http://schemas.microsoft.com/office/powerpoint/2010/main" xmlns="" val="3661383713"/>
+        <p14:creationId xmlns:p14="http://schemas.microsoft.com/office/powerpoint/2010/main" val="3661383713"/>
       </p:ext>
     </p:extLst>
   </p:cSld>
@@ -25553,7 +25712,7 @@
     </p:spTree>
     <p:extLst>
       <p:ext uri="{BB962C8B-B14F-4D97-AF65-F5344CB8AC3E}">
-        <p14:creationId xmlns:p14="http://schemas.microsoft.com/office/powerpoint/2010/main" xmlns="" val="3060759240"/>
+        <p14:creationId xmlns:p14="http://schemas.microsoft.com/office/powerpoint/2010/main" val="3060759240"/>
       </p:ext>
     </p:extLst>
   </p:cSld>
@@ -26293,7 +26452,7 @@
     </p:spTree>
     <p:extLst>
       <p:ext uri="{BB962C8B-B14F-4D97-AF65-F5344CB8AC3E}">
-        <p14:creationId xmlns:p14="http://schemas.microsoft.com/office/powerpoint/2010/main" xmlns="" val="351671181"/>
+        <p14:creationId xmlns:p14="http://schemas.microsoft.com/office/powerpoint/2010/main" val="351671181"/>
       </p:ext>
     </p:extLst>
   </p:cSld>
@@ -26821,7 +26980,7 @@
           <a:blip r:embed="rId3" cstate="print">
             <a:extLst>
               <a:ext uri="{28A0092B-C50C-407E-A947-70E740481C1C}">
-                <a14:useLocalDpi xmlns:a14="http://schemas.microsoft.com/office/drawing/2010/main" xmlns="" val="0"/>
+                <a14:useLocalDpi xmlns:a14="http://schemas.microsoft.com/office/drawing/2010/main" val="0"/>
               </a:ext>
             </a:extLst>
           </a:blip>
@@ -27041,10 +27200,94 @@
           </a:fontRef>
         </p:style>
       </p:cxnSp>
+      <p:cxnSp>
+        <p:nvCxnSpPr>
+          <p:cNvPr id="10" name="Gerade Verbindung 9"/>
+          <p:cNvCxnSpPr/>
+          <p:nvPr/>
+        </p:nvCxnSpPr>
+        <p:spPr>
+          <a:xfrm flipV="1">
+            <a:off x="3733490" y="3896741"/>
+            <a:ext cx="910518" cy="108012"/>
+          </a:xfrm>
+          <a:prstGeom prst="line">
+            <a:avLst/>
+          </a:prstGeom>
+          <a:ln>
+            <a:solidFill>
+              <a:srgbClr val="FF0000"/>
+            </a:solidFill>
+          </a:ln>
+          <a:effectLst>
+            <a:outerShdw blurRad="50800" dist="38100" dir="8100000" algn="tr" rotWithShape="0">
+              <a:prstClr val="black">
+                <a:alpha val="40000"/>
+              </a:prstClr>
+            </a:outerShdw>
+          </a:effectLst>
+        </p:spPr>
+        <p:style>
+          <a:lnRef idx="2">
+            <a:schemeClr val="accent1"/>
+          </a:lnRef>
+          <a:fillRef idx="0">
+            <a:schemeClr val="accent1"/>
+          </a:fillRef>
+          <a:effectRef idx="1">
+            <a:schemeClr val="accent1"/>
+          </a:effectRef>
+          <a:fontRef idx="minor">
+            <a:schemeClr val="tx1"/>
+          </a:fontRef>
+        </p:style>
+      </p:cxnSp>
+      <p:cxnSp>
+        <p:nvCxnSpPr>
+          <p:cNvPr id="12" name="Gerade Verbindung 11"/>
+          <p:cNvCxnSpPr/>
+          <p:nvPr/>
+        </p:nvCxnSpPr>
+        <p:spPr>
+          <a:xfrm flipV="1">
+            <a:off x="3733490" y="4103147"/>
+            <a:ext cx="455259" cy="54006"/>
+          </a:xfrm>
+          <a:prstGeom prst="line">
+            <a:avLst/>
+          </a:prstGeom>
+          <a:ln>
+            <a:solidFill>
+              <a:srgbClr val="FF0000"/>
+            </a:solidFill>
+          </a:ln>
+          <a:effectLst>
+            <a:outerShdw blurRad="50800" dist="38100" dir="8100000" algn="tr" rotWithShape="0">
+              <a:prstClr val="black">
+                <a:alpha val="40000"/>
+              </a:prstClr>
+            </a:outerShdw>
+          </a:effectLst>
+        </p:spPr>
+        <p:style>
+          <a:lnRef idx="2">
+            <a:schemeClr val="accent1"/>
+          </a:lnRef>
+          <a:fillRef idx="0">
+            <a:schemeClr val="accent1"/>
+          </a:fillRef>
+          <a:effectRef idx="1">
+            <a:schemeClr val="accent1"/>
+          </a:effectRef>
+          <a:fontRef idx="minor">
+            <a:schemeClr val="tx1"/>
+          </a:fontRef>
+        </p:style>
+      </p:cxnSp>
     </p:spTree>
     <p:extLst>
       <p:ext uri="{BB962C8B-B14F-4D97-AF65-F5344CB8AC3E}">
-        <p14:creationId xmlns:p14="http://schemas.microsoft.com/office/powerpoint/2010/main" xmlns="" val="2372600146"/>
+        <p14:creationId xmlns:p14="http://schemas.microsoft.com/office/powerpoint/2010/main" val="2372600146"/>
       </p:ext>
     </p:extLst>
   </p:cSld>
@@ -27149,30 +27392,102 @@
                             </p:childTnLst>
                           </p:cTn>
                         </p:par>
-                      </p:childTnLst>
-                    </p:cTn>
-                  </p:par>
-                  <p:par>
-                    <p:cTn id="11" fill="hold">
-                      <p:stCondLst>
-                        <p:cond delay="indefinite"/>
-                      </p:stCondLst>
-                      <p:childTnLst>
                         <p:par>
-                          <p:cTn id="12" fill="hold">
+                          <p:cTn id="11" fill="hold">
                             <p:stCondLst>
                               <p:cond delay="0"/>
                             </p:stCondLst>
                             <p:childTnLst>
                               <p:par>
-                                <p:cTn id="13" presetID="1" presetClass="entr" presetSubtype="0" fill="hold" nodeType="clickEffect">
+                                <p:cTn id="12" presetID="1" presetClass="entr" presetSubtype="0" fill="hold" nodeType="afterEffect">
                                   <p:stCondLst>
                                     <p:cond delay="0"/>
                                   </p:stCondLst>
                                   <p:childTnLst>
                                     <p:set>
                                       <p:cBhvr>
-                                        <p:cTn id="14" dur="1" fill="hold">
+                                        <p:cTn id="13" dur="1" fill="hold">
+                                          <p:stCondLst>
+                                            <p:cond delay="0"/>
+                                          </p:stCondLst>
+                                        </p:cTn>
+                                        <p:tgtEl>
+                                          <p:spTgt spid="10"/>
+                                        </p:tgtEl>
+                                        <p:attrNameLst>
+                                          <p:attrName>style.visibility</p:attrName>
+                                        </p:attrNameLst>
+                                      </p:cBhvr>
+                                      <p:to>
+                                        <p:strVal val="visible"/>
+                                      </p:to>
+                                    </p:set>
+                                  </p:childTnLst>
+                                </p:cTn>
+                              </p:par>
+                            </p:childTnLst>
+                          </p:cTn>
+                        </p:par>
+                        <p:par>
+                          <p:cTn id="14" fill="hold">
+                            <p:stCondLst>
+                              <p:cond delay="0"/>
+                            </p:stCondLst>
+                            <p:childTnLst>
+                              <p:par>
+                                <p:cTn id="15" presetID="1" presetClass="entr" presetSubtype="0" fill="hold" nodeType="afterEffect">
+                                  <p:stCondLst>
+                                    <p:cond delay="0"/>
+                                  </p:stCondLst>
+                                  <p:childTnLst>
+                                    <p:set>
+                                      <p:cBhvr>
+                                        <p:cTn id="16" dur="1" fill="hold">
+                                          <p:stCondLst>
+                                            <p:cond delay="0"/>
+                                          </p:stCondLst>
+                                        </p:cTn>
+                                        <p:tgtEl>
+                                          <p:spTgt spid="12"/>
+                                        </p:tgtEl>
+                                        <p:attrNameLst>
+                                          <p:attrName>style.visibility</p:attrName>
+                                        </p:attrNameLst>
+                                      </p:cBhvr>
+                                      <p:to>
+                                        <p:strVal val="visible"/>
+                                      </p:to>
+                                    </p:set>
+                                  </p:childTnLst>
+                                </p:cTn>
+                              </p:par>
+                            </p:childTnLst>
+                          </p:cTn>
+                        </p:par>
+                      </p:childTnLst>
+                    </p:cTn>
+                  </p:par>
+                  <p:par>
+                    <p:cTn id="17" fill="hold">
+                      <p:stCondLst>
+                        <p:cond delay="indefinite"/>
+                      </p:stCondLst>
+                      <p:childTnLst>
+                        <p:par>
+                          <p:cTn id="18" fill="hold">
+                            <p:stCondLst>
+                              <p:cond delay="0"/>
+                            </p:stCondLst>
+                            <p:childTnLst>
+                              <p:par>
+                                <p:cTn id="19" presetID="1" presetClass="entr" presetSubtype="0" fill="hold" nodeType="clickEffect">
+                                  <p:stCondLst>
+                                    <p:cond delay="0"/>
+                                  </p:stCondLst>
+                                  <p:childTnLst>
+                                    <p:set>
+                                      <p:cBhvr>
+                                        <p:cTn id="20" dur="1" fill="hold">
                                           <p:stCondLst>
                                             <p:cond delay="0"/>
                                           </p:stCondLst>
@@ -27194,30 +27509,21 @@
                             </p:childTnLst>
                           </p:cTn>
                         </p:par>
-                      </p:childTnLst>
-                    </p:cTn>
-                  </p:par>
-                  <p:par>
-                    <p:cTn id="15" fill="hold">
-                      <p:stCondLst>
-                        <p:cond delay="indefinite"/>
-                      </p:stCondLst>
-                      <p:childTnLst>
                         <p:par>
-                          <p:cTn id="16" fill="hold">
+                          <p:cTn id="21" fill="hold">
                             <p:stCondLst>
                               <p:cond delay="0"/>
                             </p:stCondLst>
                             <p:childTnLst>
                               <p:par>
-                                <p:cTn id="17" presetID="1" presetClass="entr" presetSubtype="0" fill="hold" nodeType="clickEffect">
+                                <p:cTn id="22" presetID="1" presetClass="entr" presetSubtype="0" fill="hold" nodeType="afterEffect">
                                   <p:stCondLst>
                                     <p:cond delay="0"/>
                                   </p:stCondLst>
                                   <p:childTnLst>
                                     <p:set>
                                       <p:cBhvr>
-                                        <p:cTn id="18" dur="1" fill="hold">
+                                        <p:cTn id="23" dur="1" fill="hold">
                                           <p:stCondLst>
                                             <p:cond delay="0"/>
                                           </p:stCondLst>
@@ -27448,7 +27754,7 @@
     </p:spTree>
     <p:extLst>
       <p:ext uri="{BB962C8B-B14F-4D97-AF65-F5344CB8AC3E}">
-        <p14:creationId xmlns:p14="http://schemas.microsoft.com/office/powerpoint/2010/main" xmlns="" val="2681693288"/>
+        <p14:creationId xmlns:p14="http://schemas.microsoft.com/office/powerpoint/2010/main" val="2681693288"/>
       </p:ext>
     </p:extLst>
   </p:cSld>
@@ -27948,7 +28254,7 @@
     </p:spTree>
     <p:extLst>
       <p:ext uri="{BB962C8B-B14F-4D97-AF65-F5344CB8AC3E}">
-        <p14:creationId xmlns:p14="http://schemas.microsoft.com/office/powerpoint/2010/main" xmlns="" val="2857272158"/>
+        <p14:creationId xmlns:p14="http://schemas.microsoft.com/office/powerpoint/2010/main" val="2857272158"/>
       </p:ext>
     </p:extLst>
   </p:cSld>
@@ -28323,7 +28629,7 @@
     </p:spTree>
     <p:extLst>
       <p:ext uri="{BB962C8B-B14F-4D97-AF65-F5344CB8AC3E}">
-        <p14:creationId xmlns:p14="http://schemas.microsoft.com/office/powerpoint/2010/main" xmlns="" val="3542583579"/>
+        <p14:creationId xmlns:p14="http://schemas.microsoft.com/office/powerpoint/2010/main" val="3542583579"/>
       </p:ext>
     </p:extLst>
   </p:cSld>

</xml_diff>

<commit_message>
Qullen vor'S fazit gezogen und optisch aufgebessert
Signed-off-by: MAG <mxthammel@gmail.com>
</commit_message>
<xml_diff>
--- a/Dokumente/Abschlusspr�si/Abschlusspr�sentation.pptx
+++ b/Dokumente/Abschlusspr�si/Abschlusspr�sentation.pptx
@@ -2603,6 +2603,91 @@
 </file>
 
 <file path=ppt/notesSlides/notesSlide23.xml><?xml version="1.0" encoding="utf-8"?>
+<p:notes xmlns:a="http://schemas.openxmlformats.org/drawingml/2006/main" xmlns:r="http://schemas.openxmlformats.org/officeDocument/2006/relationships" xmlns:p="http://schemas.openxmlformats.org/presentationml/2006/main">
+  <p:cSld>
+    <p:spTree>
+      <p:nvGrpSpPr>
+        <p:cNvPr id="1" name=""/>
+        <p:cNvGrpSpPr/>
+        <p:nvPr/>
+      </p:nvGrpSpPr>
+      <p:grpSpPr>
+        <a:xfrm>
+          <a:off x="0" y="0"/>
+          <a:ext cx="0" cy="0"/>
+          <a:chOff x="0" y="0"/>
+          <a:chExt cx="0" cy="0"/>
+        </a:xfrm>
+      </p:grpSpPr>
+      <p:sp>
+        <p:nvSpPr>
+          <p:cNvPr id="2" name="Folienbildplatzhalter 1"/>
+          <p:cNvSpPr>
+            <a:spLocks noGrp="1" noRot="1" noChangeAspect="1"/>
+          </p:cNvSpPr>
+          <p:nvPr>
+            <p:ph type="sldImg"/>
+          </p:nvPr>
+        </p:nvSpPr>
+        <p:spPr/>
+      </p:sp>
+      <p:sp>
+        <p:nvSpPr>
+          <p:cNvPr id="3" name="Notizenplatzhalter 2"/>
+          <p:cNvSpPr>
+            <a:spLocks noGrp="1"/>
+          </p:cNvSpPr>
+          <p:nvPr>
+            <p:ph type="body" idx="1"/>
+          </p:nvPr>
+        </p:nvSpPr>
+        <p:spPr/>
+        <p:txBody>
+          <a:bodyPr/>
+          <a:lstStyle/>
+          <a:p>
+            <a:endParaRPr lang="de-DE"/>
+          </a:p>
+        </p:txBody>
+      </p:sp>
+      <p:sp>
+        <p:nvSpPr>
+          <p:cNvPr id="4" name="Foliennummernplatzhalter 3"/>
+          <p:cNvSpPr>
+            <a:spLocks noGrp="1"/>
+          </p:cNvSpPr>
+          <p:nvPr>
+            <p:ph type="sldNum" sz="quarter" idx="10"/>
+          </p:nvPr>
+        </p:nvSpPr>
+        <p:spPr/>
+        <p:txBody>
+          <a:bodyPr/>
+          <a:lstStyle/>
+          <a:p>
+            <a:fld id="{F7EBFB8C-BBFF-4397-A51C-1E92596422A9}" type="slidenum">
+              <a:rPr lang="en-US" smtClean="0"/>
+              <a:pPr/>
+              <a:t>34</a:t>
+            </a:fld>
+            <a:endParaRPr lang="en-US" dirty="0"/>
+          </a:p>
+        </p:txBody>
+      </p:sp>
+    </p:spTree>
+    <p:extLst>
+      <p:ext uri="{BB962C8B-B14F-4D97-AF65-F5344CB8AC3E}">
+        <p14:creationId xmlns:p14="http://schemas.microsoft.com/office/powerpoint/2010/main" val="1519036346"/>
+      </p:ext>
+    </p:extLst>
+  </p:cSld>
+  <p:clrMapOvr>
+    <a:masterClrMapping/>
+  </p:clrMapOvr>
+</p:notes>
+</file>
+
+<file path=ppt/notesSlides/notesSlide24.xml><?xml version="1.0" encoding="utf-8"?>
 <p:notes xmlns:a="http://schemas.openxmlformats.org/drawingml/2006/main" xmlns:r="http://schemas.openxmlformats.org/officeDocument/2006/relationships" xmlns:p="http://schemas.openxmlformats.org/presentationml/2006/main">
   <p:cSld>
     <p:spTree>
@@ -25662,9 +25747,17 @@
           <a:p>
             <a:pPr lvl="1"/>
             <a:r>
-              <a:rPr lang="de-DE" sz="2000" dirty="0"/>
+              <a:rPr lang="de-DE" sz="2000" dirty="0" smtClean="0"/>
               <a:t>www.animationfactory.com</a:t>
             </a:r>
+          </a:p>
+          <a:p>
+            <a:pPr lvl="1"/>
+            <a:r>
+              <a:rPr lang="de-DE" sz="2000" dirty="0" smtClean="0"/>
+              <a:t>www.graphicsfactory.com</a:t>
+            </a:r>
+            <a:endParaRPr lang="de-DE" sz="2000" dirty="0"/>
           </a:p>
           <a:p>
             <a:pPr lvl="1"/>
@@ -25751,7 +25844,7 @@
           <p:nvPr/>
         </p:nvPicPr>
         <p:blipFill>
-          <a:blip r:embed="rId2" cstate="print">
+          <a:blip r:embed="rId3" cstate="print">
             <a:extLst>
               <a:ext uri="{28A0092B-C50C-407E-A947-70E740481C1C}">
                 <a14:useLocalDpi xmlns:a14="http://schemas.microsoft.com/office/drawing/2010/main" val="0"/>

</xml_diff>

<commit_message>
Update Sequenzdiagramm Anmeldung Signed-off-by: Felix <felix@coole-files.de>
</commit_message>
<xml_diff>
--- a/Dokumente/Abschlusspr�si/Abschlusspr�sentation.pptx
+++ b/Dokumente/Abschlusspr�si/Abschlusspr�sentation.pptx
@@ -404,7 +404,7 @@
     </p:spTree>
     <p:extLst>
       <p:ext uri="{BB962C8B-B14F-4D97-AF65-F5344CB8AC3E}">
-        <p14:creationId xmlns:p14="http://schemas.microsoft.com/office/powerpoint/2010/main" val="2610097957"/>
+        <p14:creationId xmlns:p14="http://schemas.microsoft.com/office/powerpoint/2010/main" xmlns="" val="2610097957"/>
       </p:ext>
     </p:extLst>
   </p:cSld>
@@ -579,7 +579,7 @@
     </p:spTree>
     <p:extLst>
       <p:ext uri="{BB962C8B-B14F-4D97-AF65-F5344CB8AC3E}">
-        <p14:creationId xmlns:p14="http://schemas.microsoft.com/office/powerpoint/2010/main" val="2116472317"/>
+        <p14:creationId xmlns:p14="http://schemas.microsoft.com/office/powerpoint/2010/main" xmlns="" val="2116472317"/>
       </p:ext>
     </p:extLst>
   </p:cSld>
@@ -690,7 +690,7 @@
     </p:spTree>
     <p:extLst>
       <p:ext uri="{BB962C8B-B14F-4D97-AF65-F5344CB8AC3E}">
-        <p14:creationId xmlns:p14="http://schemas.microsoft.com/office/powerpoint/2010/main" val="2934279750"/>
+        <p14:creationId xmlns:p14="http://schemas.microsoft.com/office/powerpoint/2010/main" xmlns="" val="2934279750"/>
       </p:ext>
     </p:extLst>
   </p:cSld>
@@ -797,7 +797,7 @@
     </p:spTree>
     <p:extLst>
       <p:ext uri="{BB962C8B-B14F-4D97-AF65-F5344CB8AC3E}">
-        <p14:creationId xmlns:p14="http://schemas.microsoft.com/office/powerpoint/2010/main" val="2845101111"/>
+        <p14:creationId xmlns:p14="http://schemas.microsoft.com/office/powerpoint/2010/main" xmlns="" val="2845101111"/>
       </p:ext>
     </p:extLst>
   </p:cSld>
@@ -886,7 +886,7 @@
     </p:spTree>
     <p:extLst>
       <p:ext uri="{BB962C8B-B14F-4D97-AF65-F5344CB8AC3E}">
-        <p14:creationId xmlns:p14="http://schemas.microsoft.com/office/powerpoint/2010/main" val="135288531"/>
+        <p14:creationId xmlns:p14="http://schemas.microsoft.com/office/powerpoint/2010/main" xmlns="" val="135288531"/>
       </p:ext>
     </p:extLst>
   </p:cSld>
@@ -979,7 +979,7 @@
     </p:spTree>
     <p:extLst>
       <p:ext uri="{BB962C8B-B14F-4D97-AF65-F5344CB8AC3E}">
-        <p14:creationId xmlns:p14="http://schemas.microsoft.com/office/powerpoint/2010/main" val="2825845930"/>
+        <p14:creationId xmlns:p14="http://schemas.microsoft.com/office/powerpoint/2010/main" xmlns="" val="2825845930"/>
       </p:ext>
     </p:extLst>
   </p:cSld>
@@ -1080,7 +1080,7 @@
     </p:spTree>
     <p:extLst>
       <p:ext uri="{BB962C8B-B14F-4D97-AF65-F5344CB8AC3E}">
-        <p14:creationId xmlns:p14="http://schemas.microsoft.com/office/powerpoint/2010/main" val="3912581999"/>
+        <p14:creationId xmlns:p14="http://schemas.microsoft.com/office/powerpoint/2010/main" xmlns="" val="3912581999"/>
       </p:ext>
     </p:extLst>
   </p:cSld>
@@ -1213,7 +1213,7 @@
     </p:spTree>
     <p:extLst>
       <p:ext uri="{BB962C8B-B14F-4D97-AF65-F5344CB8AC3E}">
-        <p14:creationId xmlns:p14="http://schemas.microsoft.com/office/powerpoint/2010/main" val="802076649"/>
+        <p14:creationId xmlns:p14="http://schemas.microsoft.com/office/powerpoint/2010/main" xmlns="" val="802076649"/>
       </p:ext>
     </p:extLst>
   </p:cSld>
@@ -1346,7 +1346,7 @@
     </p:spTree>
     <p:extLst>
       <p:ext uri="{BB962C8B-B14F-4D97-AF65-F5344CB8AC3E}">
-        <p14:creationId xmlns:p14="http://schemas.microsoft.com/office/powerpoint/2010/main" val="802076649"/>
+        <p14:creationId xmlns:p14="http://schemas.microsoft.com/office/powerpoint/2010/main" xmlns="" val="802076649"/>
       </p:ext>
     </p:extLst>
   </p:cSld>
@@ -1479,7 +1479,7 @@
     </p:spTree>
     <p:extLst>
       <p:ext uri="{BB962C8B-B14F-4D97-AF65-F5344CB8AC3E}">
-        <p14:creationId xmlns:p14="http://schemas.microsoft.com/office/powerpoint/2010/main" val="802076649"/>
+        <p14:creationId xmlns:p14="http://schemas.microsoft.com/office/powerpoint/2010/main" xmlns="" val="802076649"/>
       </p:ext>
     </p:extLst>
   </p:cSld>
@@ -1698,7 +1698,7 @@
     </p:spTree>
     <p:extLst>
       <p:ext uri="{BB962C8B-B14F-4D97-AF65-F5344CB8AC3E}">
-        <p14:creationId xmlns:p14="http://schemas.microsoft.com/office/powerpoint/2010/main" val="1629754142"/>
+        <p14:creationId xmlns:p14="http://schemas.microsoft.com/office/powerpoint/2010/main" xmlns="" val="1629754142"/>
       </p:ext>
     </p:extLst>
   </p:cSld>
@@ -1823,7 +1823,7 @@
     </p:spTree>
     <p:extLst>
       <p:ext uri="{BB962C8B-B14F-4D97-AF65-F5344CB8AC3E}">
-        <p14:creationId xmlns:p14="http://schemas.microsoft.com/office/powerpoint/2010/main" val="3931682397"/>
+        <p14:creationId xmlns:p14="http://schemas.microsoft.com/office/powerpoint/2010/main" xmlns="" val="3931682397"/>
       </p:ext>
     </p:extLst>
   </p:cSld>
@@ -2122,7 +2122,7 @@
     </p:spTree>
     <p:extLst>
       <p:ext uri="{BB962C8B-B14F-4D97-AF65-F5344CB8AC3E}">
-        <p14:creationId xmlns:p14="http://schemas.microsoft.com/office/powerpoint/2010/main" val="517533983"/>
+        <p14:creationId xmlns:p14="http://schemas.microsoft.com/office/powerpoint/2010/main" xmlns="" val="517533983"/>
       </p:ext>
     </p:extLst>
   </p:cSld>
@@ -2247,7 +2247,7 @@
     </p:spTree>
     <p:extLst>
       <p:ext uri="{BB962C8B-B14F-4D97-AF65-F5344CB8AC3E}">
-        <p14:creationId xmlns:p14="http://schemas.microsoft.com/office/powerpoint/2010/main" val="3931682397"/>
+        <p14:creationId xmlns:p14="http://schemas.microsoft.com/office/powerpoint/2010/main" xmlns="" val="3931682397"/>
       </p:ext>
     </p:extLst>
   </p:cSld>
@@ -2606,7 +2606,7 @@
     </p:spTree>
     <p:extLst>
       <p:ext uri="{BB962C8B-B14F-4D97-AF65-F5344CB8AC3E}">
-        <p14:creationId xmlns:p14="http://schemas.microsoft.com/office/powerpoint/2010/main" val="1616458392"/>
+        <p14:creationId xmlns:p14="http://schemas.microsoft.com/office/powerpoint/2010/main" xmlns="" val="1616458392"/>
       </p:ext>
     </p:extLst>
   </p:cSld>
@@ -2691,7 +2691,7 @@
     </p:spTree>
     <p:extLst>
       <p:ext uri="{BB962C8B-B14F-4D97-AF65-F5344CB8AC3E}">
-        <p14:creationId xmlns:p14="http://schemas.microsoft.com/office/powerpoint/2010/main" val="1519036346"/>
+        <p14:creationId xmlns:p14="http://schemas.microsoft.com/office/powerpoint/2010/main" xmlns="" val="1519036346"/>
       </p:ext>
     </p:extLst>
   </p:cSld>
@@ -2776,7 +2776,7 @@
     </p:spTree>
     <p:extLst>
       <p:ext uri="{BB962C8B-B14F-4D97-AF65-F5344CB8AC3E}">
-        <p14:creationId xmlns:p14="http://schemas.microsoft.com/office/powerpoint/2010/main" val="2116472317"/>
+        <p14:creationId xmlns:p14="http://schemas.microsoft.com/office/powerpoint/2010/main" xmlns="" val="2116472317"/>
       </p:ext>
     </p:extLst>
   </p:cSld>
@@ -3101,7 +3101,7 @@
     </p:spTree>
     <p:extLst>
       <p:ext uri="{BB962C8B-B14F-4D97-AF65-F5344CB8AC3E}">
-        <p14:creationId xmlns:p14="http://schemas.microsoft.com/office/powerpoint/2010/main" val="517533983"/>
+        <p14:creationId xmlns:p14="http://schemas.microsoft.com/office/powerpoint/2010/main" xmlns="" val="517533983"/>
       </p:ext>
     </p:extLst>
   </p:cSld>
@@ -3273,7 +3273,7 @@
     </p:spTree>
     <p:extLst>
       <p:ext uri="{BB962C8B-B14F-4D97-AF65-F5344CB8AC3E}">
-        <p14:creationId xmlns:p14="http://schemas.microsoft.com/office/powerpoint/2010/main" val="2934279750"/>
+        <p14:creationId xmlns:p14="http://schemas.microsoft.com/office/powerpoint/2010/main" xmlns="" val="2934279750"/>
       </p:ext>
     </p:extLst>
   </p:cSld>
@@ -3370,7 +3370,7 @@
     </p:spTree>
     <p:extLst>
       <p:ext uri="{BB962C8B-B14F-4D97-AF65-F5344CB8AC3E}">
-        <p14:creationId xmlns:p14="http://schemas.microsoft.com/office/powerpoint/2010/main" val="2934279750"/>
+        <p14:creationId xmlns:p14="http://schemas.microsoft.com/office/powerpoint/2010/main" xmlns="" val="2934279750"/>
       </p:ext>
     </p:extLst>
   </p:cSld>
@@ -3474,7 +3474,7 @@
     </p:spTree>
     <p:extLst>
       <p:ext uri="{BB962C8B-B14F-4D97-AF65-F5344CB8AC3E}">
-        <p14:creationId xmlns:p14="http://schemas.microsoft.com/office/powerpoint/2010/main" val="2934279750"/>
+        <p14:creationId xmlns:p14="http://schemas.microsoft.com/office/powerpoint/2010/main" xmlns="" val="2934279750"/>
       </p:ext>
     </p:extLst>
   </p:cSld>
@@ -3559,7 +3559,7 @@
     </p:spTree>
     <p:extLst>
       <p:ext uri="{BB962C8B-B14F-4D97-AF65-F5344CB8AC3E}">
-        <p14:creationId xmlns:p14="http://schemas.microsoft.com/office/powerpoint/2010/main" val="3860513045"/>
+        <p14:creationId xmlns:p14="http://schemas.microsoft.com/office/powerpoint/2010/main" xmlns="" val="3860513045"/>
       </p:ext>
     </p:extLst>
   </p:cSld>
@@ -3969,7 +3969,7 @@
     </p:spTree>
     <p:extLst>
       <p:ext uri="{BB962C8B-B14F-4D97-AF65-F5344CB8AC3E}">
-        <p14:creationId xmlns:p14="http://schemas.microsoft.com/office/powerpoint/2010/main" val="2934279750"/>
+        <p14:creationId xmlns:p14="http://schemas.microsoft.com/office/powerpoint/2010/main" xmlns="" val="2934279750"/>
       </p:ext>
     </p:extLst>
   </p:cSld>
@@ -4054,7 +4054,7 @@
     </p:spTree>
     <p:extLst>
       <p:ext uri="{BB962C8B-B14F-4D97-AF65-F5344CB8AC3E}">
-        <p14:creationId xmlns:p14="http://schemas.microsoft.com/office/powerpoint/2010/main" val="3860513045"/>
+        <p14:creationId xmlns:p14="http://schemas.microsoft.com/office/powerpoint/2010/main" xmlns="" val="3860513045"/>
       </p:ext>
     </p:extLst>
   </p:cSld>
@@ -8327,7 +8327,7 @@
           <a:blip r:embed="rId13" cstate="print">
             <a:extLst>
               <a:ext uri="{28A0092B-C50C-407E-A947-70E740481C1C}">
-                <a14:useLocalDpi xmlns:a14="http://schemas.microsoft.com/office/drawing/2010/main" val="0"/>
+                <a14:useLocalDpi xmlns:a14="http://schemas.microsoft.com/office/drawing/2010/main" xmlns="" val="0"/>
               </a:ext>
             </a:extLst>
           </a:blip>
@@ -8828,7 +8828,7 @@
           <a:blip r:embed="rId3" cstate="print">
             <a:extLst>
               <a:ext uri="{28A0092B-C50C-407E-A947-70E740481C1C}">
-                <a14:useLocalDpi xmlns:a14="http://schemas.microsoft.com/office/drawing/2010/main" val="0"/>
+                <a14:useLocalDpi xmlns:a14="http://schemas.microsoft.com/office/drawing/2010/main" xmlns="" val="0"/>
               </a:ext>
             </a:extLst>
           </a:blip>
@@ -8858,7 +8858,7 @@
           <a:blip r:embed="rId4" cstate="print">
             <a:extLst>
               <a:ext uri="{28A0092B-C50C-407E-A947-70E740481C1C}">
-                <a14:useLocalDpi xmlns:a14="http://schemas.microsoft.com/office/drawing/2010/main" val="0"/>
+                <a14:useLocalDpi xmlns:a14="http://schemas.microsoft.com/office/drawing/2010/main" xmlns="" val="0"/>
               </a:ext>
             </a:extLst>
           </a:blip>
@@ -9249,7 +9249,7 @@
     </p:spTree>
     <p:extLst>
       <p:ext uri="{BB962C8B-B14F-4D97-AF65-F5344CB8AC3E}">
-        <p14:creationId xmlns:p14="http://schemas.microsoft.com/office/powerpoint/2010/main" val="3542583579"/>
+        <p14:creationId xmlns:p14="http://schemas.microsoft.com/office/powerpoint/2010/main" xmlns="" val="3542583579"/>
       </p:ext>
     </p:extLst>
   </p:cSld>
@@ -9760,7 +9760,7 @@
           <a:blip r:embed="rId3" cstate="print">
             <a:extLst>
               <a:ext uri="{28A0092B-C50C-407E-A947-70E740481C1C}">
-                <a14:useLocalDpi xmlns:a14="http://schemas.microsoft.com/office/drawing/2010/main" val="0"/>
+                <a14:useLocalDpi xmlns:a14="http://schemas.microsoft.com/office/drawing/2010/main" xmlns="" val="0"/>
               </a:ext>
             </a:extLst>
           </a:blip>
@@ -9781,7 +9781,7 @@
     </p:spTree>
     <p:extLst>
       <p:ext uri="{BB962C8B-B14F-4D97-AF65-F5344CB8AC3E}">
-        <p14:creationId xmlns:p14="http://schemas.microsoft.com/office/powerpoint/2010/main" val="3542583579"/>
+        <p14:creationId xmlns:p14="http://schemas.microsoft.com/office/powerpoint/2010/main" xmlns="" val="3542583579"/>
       </p:ext>
     </p:extLst>
   </p:cSld>
@@ -10202,7 +10202,7 @@
     </p:spTree>
     <p:extLst>
       <p:ext uri="{BB962C8B-B14F-4D97-AF65-F5344CB8AC3E}">
-        <p14:creationId xmlns:p14="http://schemas.microsoft.com/office/powerpoint/2010/main" val="351671181"/>
+        <p14:creationId xmlns:p14="http://schemas.microsoft.com/office/powerpoint/2010/main" xmlns="" val="351671181"/>
       </p:ext>
     </p:extLst>
   </p:cSld>
@@ -11267,7 +11267,7 @@
     </p:spTree>
     <p:extLst>
       <p:ext uri="{BB962C8B-B14F-4D97-AF65-F5344CB8AC3E}">
-        <p14:creationId xmlns:p14="http://schemas.microsoft.com/office/powerpoint/2010/main" val="39477268"/>
+        <p14:creationId xmlns:p14="http://schemas.microsoft.com/office/powerpoint/2010/main" xmlns="" val="39477268"/>
       </p:ext>
     </p:extLst>
   </p:cSld>
@@ -12946,7 +12946,7 @@
           <a:blip r:embed="rId4" cstate="print">
             <a:extLst>
               <a:ext uri="{28A0092B-C50C-407E-A947-70E740481C1C}">
-                <a14:useLocalDpi xmlns:a14="http://schemas.microsoft.com/office/drawing/2010/main" val="0"/>
+                <a14:useLocalDpi xmlns:a14="http://schemas.microsoft.com/office/drawing/2010/main" xmlns="" val="0"/>
               </a:ext>
             </a:extLst>
           </a:blip>
@@ -13336,7 +13336,7 @@
     </p:spTree>
     <p:extLst>
       <p:ext uri="{BB962C8B-B14F-4D97-AF65-F5344CB8AC3E}">
-        <p14:creationId xmlns:p14="http://schemas.microsoft.com/office/powerpoint/2010/main" val="3630298673"/>
+        <p14:creationId xmlns:p14="http://schemas.microsoft.com/office/powerpoint/2010/main" xmlns="" val="3630298673"/>
       </p:ext>
     </p:extLst>
   </p:cSld>
@@ -13503,7 +13503,7 @@
     </p:spTree>
     <p:extLst>
       <p:ext uri="{BB962C8B-B14F-4D97-AF65-F5344CB8AC3E}">
-        <p14:creationId xmlns:p14="http://schemas.microsoft.com/office/powerpoint/2010/main" val="141785747"/>
+        <p14:creationId xmlns:p14="http://schemas.microsoft.com/office/powerpoint/2010/main" xmlns="" val="141785747"/>
       </p:ext>
     </p:extLst>
   </p:cSld>
@@ -13838,7 +13838,7 @@
     </p:spTree>
     <p:extLst>
       <p:ext uri="{BB962C8B-B14F-4D97-AF65-F5344CB8AC3E}">
-        <p14:creationId xmlns:p14="http://schemas.microsoft.com/office/powerpoint/2010/main" val="2634211947"/>
+        <p14:creationId xmlns:p14="http://schemas.microsoft.com/office/powerpoint/2010/main" xmlns="" val="2634211947"/>
       </p:ext>
     </p:extLst>
   </p:cSld>
@@ -16305,10 +16305,10 @@
           <p:nvPr/>
         </p:nvPicPr>
         <p:blipFill>
-          <a:blip r:embed="rId3">
+          <a:blip r:embed="rId3" cstate="print">
             <a:extLst>
               <a:ext uri="{28A0092B-C50C-407E-A947-70E740481C1C}">
-                <a14:useLocalDpi xmlns:a14="http://schemas.microsoft.com/office/drawing/2010/main" val="0"/>
+                <a14:useLocalDpi xmlns:a14="http://schemas.microsoft.com/office/drawing/2010/main" xmlns="" val="0"/>
               </a:ext>
             </a:extLst>
           </a:blip>
@@ -16327,7 +16327,7 @@
           </a:prstGeom>
           <a:extLst>
             <a:ext uri="{909E8E84-426E-40DD-AFC4-6F175D3DCCD1}">
-              <a14:hiddenFill xmlns:a14="http://schemas.microsoft.com/office/drawing/2010/main">
+              <a14:hiddenFill xmlns:a14="http://schemas.microsoft.com/office/drawing/2010/main" xmlns="">
                 <a:solidFill>
                   <a:srgbClr val="FFFFFF"/>
                 </a:solidFill>
@@ -17053,7 +17053,7 @@
     </p:spTree>
     <p:extLst>
       <p:ext uri="{BB962C8B-B14F-4D97-AF65-F5344CB8AC3E}">
-        <p14:creationId xmlns:p14="http://schemas.microsoft.com/office/powerpoint/2010/main" val="3243626544"/>
+        <p14:creationId xmlns:p14="http://schemas.microsoft.com/office/powerpoint/2010/main" xmlns="" val="3243626544"/>
       </p:ext>
     </p:extLst>
   </p:cSld>
@@ -18427,10 +18427,10 @@
           <p:nvPr/>
         </p:nvPicPr>
         <p:blipFill>
-          <a:blip r:embed="rId7">
+          <a:blip r:embed="rId7" cstate="print">
             <a:extLst>
               <a:ext uri="{28A0092B-C50C-407E-A947-70E740481C1C}">
-                <a14:useLocalDpi xmlns:a14="http://schemas.microsoft.com/office/drawing/2010/main" val="0"/>
+                <a14:useLocalDpi xmlns:a14="http://schemas.microsoft.com/office/drawing/2010/main" xmlns="" val="0"/>
               </a:ext>
             </a:extLst>
           </a:blip>
@@ -18449,14 +18449,14 @@
           </a:prstGeom>
           <a:extLst>
             <a:ext uri="{909E8E84-426E-40DD-AFC4-6F175D3DCCD1}">
-              <a14:hiddenFill xmlns:a14="http://schemas.microsoft.com/office/drawing/2010/main">
+              <a14:hiddenFill xmlns:a14="http://schemas.microsoft.com/office/drawing/2010/main" xmlns="">
                 <a:solidFill>
                   <a:schemeClr val="accent1"/>
                 </a:solidFill>
               </a14:hiddenFill>
             </a:ext>
             <a:ext uri="{91240B29-F687-4F45-9708-019B960494DF}">
-              <a14:hiddenLine xmlns:a14="http://schemas.microsoft.com/office/drawing/2010/main" w="9525">
+              <a14:hiddenLine xmlns:a14="http://schemas.microsoft.com/office/drawing/2010/main" xmlns="" w="9525">
                 <a:solidFill>
                   <a:schemeClr val="tx1"/>
                 </a:solidFill>
@@ -18466,7 +18466,7 @@
               </a14:hiddenLine>
             </a:ext>
             <a:ext uri="{AF507438-7753-43E0-B8FC-AC1667EBCBE1}">
-              <a14:hiddenEffects xmlns:a14="http://schemas.microsoft.com/office/drawing/2010/main">
+              <a14:hiddenEffects xmlns:a14="http://schemas.microsoft.com/office/drawing/2010/main" xmlns="">
                 <a:effectLst>
                   <a:outerShdw dist="35921" dir="2700000" algn="ctr" rotWithShape="0">
                     <a:schemeClr val="bg2"/>
@@ -18480,7 +18480,7 @@
     </p:spTree>
     <p:extLst>
       <p:ext uri="{BB962C8B-B14F-4D97-AF65-F5344CB8AC3E}">
-        <p14:creationId xmlns:p14="http://schemas.microsoft.com/office/powerpoint/2010/main" val="3243626544"/>
+        <p14:creationId xmlns:p14="http://schemas.microsoft.com/office/powerpoint/2010/main" xmlns="" val="3243626544"/>
       </p:ext>
     </p:extLst>
   </p:cSld>
@@ -19493,7 +19493,7 @@
     </p:spTree>
     <p:extLst>
       <p:ext uri="{BB962C8B-B14F-4D97-AF65-F5344CB8AC3E}">
-        <p14:creationId xmlns:p14="http://schemas.microsoft.com/office/powerpoint/2010/main" val="3243626544"/>
+        <p14:creationId xmlns:p14="http://schemas.microsoft.com/office/powerpoint/2010/main" xmlns="" val="3243626544"/>
       </p:ext>
     </p:extLst>
   </p:cSld>
@@ -19768,7 +19768,7 @@
           <a:blip r:embed="rId3" cstate="print">
             <a:extLst>
               <a:ext uri="{28A0092B-C50C-407E-A947-70E740481C1C}">
-                <a14:useLocalDpi xmlns:a14="http://schemas.microsoft.com/office/drawing/2010/main" val="0"/>
+                <a14:useLocalDpi xmlns:a14="http://schemas.microsoft.com/office/drawing/2010/main" xmlns="" val="0"/>
               </a:ext>
             </a:extLst>
           </a:blip>
@@ -19997,7 +19997,7 @@
           <a:blip r:embed="rId4" cstate="print">
             <a:extLst>
               <a:ext uri="{28A0092B-C50C-407E-A947-70E740481C1C}">
-                <a14:useLocalDpi xmlns:a14="http://schemas.microsoft.com/office/drawing/2010/main" val="0"/>
+                <a14:useLocalDpi xmlns:a14="http://schemas.microsoft.com/office/drawing/2010/main" xmlns="" val="0"/>
               </a:ext>
             </a:extLst>
           </a:blip>
@@ -20061,7 +20061,7 @@
           <a:blip r:embed="rId5" cstate="print">
             <a:extLst>
               <a:ext uri="{28A0092B-C50C-407E-A947-70E740481C1C}">
-                <a14:useLocalDpi xmlns:a14="http://schemas.microsoft.com/office/drawing/2010/main" val="0"/>
+                <a14:useLocalDpi xmlns:a14="http://schemas.microsoft.com/office/drawing/2010/main" xmlns="" val="0"/>
               </a:ext>
             </a:extLst>
           </a:blip>
@@ -20350,7 +20350,7 @@
           <a:blip r:embed="rId6" cstate="print">
             <a:extLst>
               <a:ext uri="{28A0092B-C50C-407E-A947-70E740481C1C}">
-                <a14:useLocalDpi xmlns:a14="http://schemas.microsoft.com/office/drawing/2010/main" val="0"/>
+                <a14:useLocalDpi xmlns:a14="http://schemas.microsoft.com/office/drawing/2010/main" xmlns="" val="0"/>
               </a:ext>
             </a:extLst>
           </a:blip>
@@ -21516,7 +21516,7 @@
     </p:spTree>
     <p:extLst>
       <p:ext uri="{BB962C8B-B14F-4D97-AF65-F5344CB8AC3E}">
-        <p14:creationId xmlns:p14="http://schemas.microsoft.com/office/powerpoint/2010/main" val="2653926061"/>
+        <p14:creationId xmlns:p14="http://schemas.microsoft.com/office/powerpoint/2010/main" xmlns="" val="2653926061"/>
       </p:ext>
     </p:extLst>
   </p:cSld>
@@ -23049,7 +23049,7 @@
           <a:blip r:embed="rId2" cstate="print">
             <a:extLst>
               <a:ext uri="{28A0092B-C50C-407E-A947-70E740481C1C}">
-                <a14:useLocalDpi xmlns:a14="http://schemas.microsoft.com/office/drawing/2010/main" val="0"/>
+                <a14:useLocalDpi xmlns:a14="http://schemas.microsoft.com/office/drawing/2010/main" xmlns="" val="0"/>
               </a:ext>
             </a:extLst>
           </a:blip>
@@ -23104,7 +23104,7 @@
     </p:spTree>
     <p:extLst>
       <p:ext uri="{BB962C8B-B14F-4D97-AF65-F5344CB8AC3E}">
-        <p14:creationId xmlns:p14="http://schemas.microsoft.com/office/powerpoint/2010/main" val="3309636493"/>
+        <p14:creationId xmlns:p14="http://schemas.microsoft.com/office/powerpoint/2010/main" xmlns="" val="3309636493"/>
       </p:ext>
     </p:extLst>
   </p:cSld>
@@ -23522,7 +23522,7 @@
     </p:spTree>
     <p:extLst>
       <p:ext uri="{BB962C8B-B14F-4D97-AF65-F5344CB8AC3E}">
-        <p14:creationId xmlns:p14="http://schemas.microsoft.com/office/powerpoint/2010/main" val="1012322072"/>
+        <p14:creationId xmlns:p14="http://schemas.microsoft.com/office/powerpoint/2010/main" xmlns="" val="1012322072"/>
       </p:ext>
     </p:extLst>
   </p:cSld>
@@ -23801,7 +23801,7 @@
     </p:spTree>
     <p:extLst>
       <p:ext uri="{BB962C8B-B14F-4D97-AF65-F5344CB8AC3E}">
-        <p14:creationId xmlns:p14="http://schemas.microsoft.com/office/powerpoint/2010/main" val="2868797759"/>
+        <p14:creationId xmlns:p14="http://schemas.microsoft.com/office/powerpoint/2010/main" xmlns="" val="2868797759"/>
       </p:ext>
     </p:extLst>
   </p:cSld>
@@ -24020,7 +24020,7 @@
     </p:spTree>
     <p:extLst>
       <p:ext uri="{BB962C8B-B14F-4D97-AF65-F5344CB8AC3E}">
-        <p14:creationId xmlns:p14="http://schemas.microsoft.com/office/powerpoint/2010/main" val="1012322072"/>
+        <p14:creationId xmlns:p14="http://schemas.microsoft.com/office/powerpoint/2010/main" xmlns="" val="1012322072"/>
       </p:ext>
     </p:extLst>
   </p:cSld>
@@ -24412,7 +24412,7 @@
           <a:blip r:embed="rId2" cstate="print">
             <a:extLst>
               <a:ext uri="{BEBA8EAE-BF5A-486C-A8C5-ECC9F3942E4B}">
-                <a14:imgProps xmlns:a14="http://schemas.microsoft.com/office/drawing/2010/main">
+                <a14:imgProps xmlns:a14="http://schemas.microsoft.com/office/drawing/2010/main" xmlns="">
                   <a14:imgLayer r:embed="rId3">
                     <a14:imgEffect>
                       <a14:backgroundRemoval t="6057" b="22942" l="7000" r="29162"/>
@@ -24421,7 +24421,7 @@
                 </a14:imgProps>
               </a:ext>
               <a:ext uri="{28A0092B-C50C-407E-A947-70E740481C1C}">
-                <a14:useLocalDpi xmlns:a14="http://schemas.microsoft.com/office/drawing/2010/main" val="0"/>
+                <a14:useLocalDpi xmlns:a14="http://schemas.microsoft.com/office/drawing/2010/main" xmlns="" val="0"/>
               </a:ext>
             </a:extLst>
           </a:blip>
@@ -24439,7 +24439,7 @@
           <a:noFill/>
           <a:extLst>
             <a:ext uri="{909E8E84-426E-40DD-AFC4-6F175D3DCCD1}">
-              <a14:hiddenFill xmlns:a14="http://schemas.microsoft.com/office/drawing/2010/main">
+              <a14:hiddenFill xmlns:a14="http://schemas.microsoft.com/office/drawing/2010/main" xmlns="">
                 <a:solidFill>
                   <a:srgbClr val="FFFFFF"/>
                 </a:solidFill>
@@ -24460,7 +24460,7 @@
           <a:blip r:embed="rId2" cstate="print">
             <a:extLst>
               <a:ext uri="{BEBA8EAE-BF5A-486C-A8C5-ECC9F3942E4B}">
-                <a14:imgProps xmlns:a14="http://schemas.microsoft.com/office/drawing/2010/main">
+                <a14:imgProps xmlns:a14="http://schemas.microsoft.com/office/drawing/2010/main" xmlns="">
                   <a14:imgLayer r:embed="rId3">
                     <a14:imgEffect>
                       <a14:backgroundRemoval t="6057" b="22942" l="7000" r="29162"/>
@@ -24469,7 +24469,7 @@
                 </a14:imgProps>
               </a:ext>
               <a:ext uri="{28A0092B-C50C-407E-A947-70E740481C1C}">
-                <a14:useLocalDpi xmlns:a14="http://schemas.microsoft.com/office/drawing/2010/main" val="0"/>
+                <a14:useLocalDpi xmlns:a14="http://schemas.microsoft.com/office/drawing/2010/main" xmlns="" val="0"/>
               </a:ext>
             </a:extLst>
           </a:blip>
@@ -24487,7 +24487,7 @@
           <a:noFill/>
           <a:extLst>
             <a:ext uri="{909E8E84-426E-40DD-AFC4-6F175D3DCCD1}">
-              <a14:hiddenFill xmlns:a14="http://schemas.microsoft.com/office/drawing/2010/main">
+              <a14:hiddenFill xmlns:a14="http://schemas.microsoft.com/office/drawing/2010/main" xmlns="">
                 <a:solidFill>
                   <a:srgbClr val="FFFFFF"/>
                 </a:solidFill>
@@ -24537,7 +24537,7 @@
     </p:spTree>
     <p:extLst>
       <p:ext uri="{BB962C8B-B14F-4D97-AF65-F5344CB8AC3E}">
-        <p14:creationId xmlns:p14="http://schemas.microsoft.com/office/powerpoint/2010/main" val="2645794681"/>
+        <p14:creationId xmlns:p14="http://schemas.microsoft.com/office/powerpoint/2010/main" xmlns="" val="2645794681"/>
       </p:ext>
     </p:extLst>
   </p:cSld>
@@ -24890,7 +24890,7 @@
           <a:blip r:embed="rId3" cstate="print">
             <a:extLst>
               <a:ext uri="{28A0092B-C50C-407E-A947-70E740481C1C}">
-                <a14:useLocalDpi xmlns:a14="http://schemas.microsoft.com/office/drawing/2010/main" val="0"/>
+                <a14:useLocalDpi xmlns:a14="http://schemas.microsoft.com/office/drawing/2010/main" xmlns="" val="0"/>
               </a:ext>
             </a:extLst>
           </a:blip>
@@ -24922,7 +24922,7 @@
           </a:effectLst>
           <a:extLst>
             <a:ext uri="{91240B29-F687-4F45-9708-019B960494DF}">
-              <a14:hiddenLine xmlns:a14="http://schemas.microsoft.com/office/drawing/2010/main" w="9525">
+              <a14:hiddenLine xmlns:a14="http://schemas.microsoft.com/office/drawing/2010/main" xmlns="" w="9525">
                 <a:solidFill>
                   <a:schemeClr val="tx1"/>
                 </a:solidFill>
@@ -24937,7 +24937,7 @@
     </p:spTree>
     <p:extLst>
       <p:ext uri="{BB962C8B-B14F-4D97-AF65-F5344CB8AC3E}">
-        <p14:creationId xmlns:p14="http://schemas.microsoft.com/office/powerpoint/2010/main" val="313312729"/>
+        <p14:creationId xmlns:p14="http://schemas.microsoft.com/office/powerpoint/2010/main" xmlns="" val="313312729"/>
       </p:ext>
     </p:extLst>
   </p:cSld>
@@ -25169,7 +25169,7 @@
           <a:blip r:embed="rId3" cstate="print">
             <a:extLst>
               <a:ext uri="{28A0092B-C50C-407E-A947-70E740481C1C}">
-                <a14:useLocalDpi xmlns:a14="http://schemas.microsoft.com/office/drawing/2010/main" val="0"/>
+                <a14:useLocalDpi xmlns:a14="http://schemas.microsoft.com/office/drawing/2010/main" xmlns="" val="0"/>
               </a:ext>
             </a:extLst>
           </a:blip>
@@ -25203,7 +25203,7 @@
     </p:spTree>
     <p:extLst>
       <p:ext uri="{BB962C8B-B14F-4D97-AF65-F5344CB8AC3E}">
-        <p14:creationId xmlns:p14="http://schemas.microsoft.com/office/powerpoint/2010/main" val="1344880779"/>
+        <p14:creationId xmlns:p14="http://schemas.microsoft.com/office/powerpoint/2010/main" xmlns="" val="1344880779"/>
       </p:ext>
     </p:extLst>
   </p:cSld>
@@ -25471,7 +25471,7 @@
           <a:blip r:embed="rId3" cstate="print">
             <a:extLst>
               <a:ext uri="{28A0092B-C50C-407E-A947-70E740481C1C}">
-                <a14:useLocalDpi xmlns:a14="http://schemas.microsoft.com/office/drawing/2010/main" val="0"/>
+                <a14:useLocalDpi xmlns:a14="http://schemas.microsoft.com/office/drawing/2010/main" xmlns="" val="0"/>
               </a:ext>
             </a:extLst>
           </a:blip>
@@ -25491,7 +25491,7 @@
           <a:noFill/>
           <a:extLst>
             <a:ext uri="{909E8E84-426E-40DD-AFC4-6F175D3DCCD1}">
-              <a14:hiddenFill xmlns:a14="http://schemas.microsoft.com/office/drawing/2010/main">
+              <a14:hiddenFill xmlns:a14="http://schemas.microsoft.com/office/drawing/2010/main" xmlns="">
                 <a:solidFill>
                   <a:srgbClr val="FFFFFF"/>
                 </a:solidFill>
@@ -25503,7 +25503,7 @@
     </p:spTree>
     <p:extLst>
       <p:ext uri="{BB962C8B-B14F-4D97-AF65-F5344CB8AC3E}">
-        <p14:creationId xmlns:p14="http://schemas.microsoft.com/office/powerpoint/2010/main" val="3661383713"/>
+        <p14:creationId xmlns:p14="http://schemas.microsoft.com/office/powerpoint/2010/main" xmlns="" val="3661383713"/>
       </p:ext>
     </p:extLst>
   </p:cSld>
@@ -25606,7 +25606,7 @@
           <a:blip r:embed="rId3" cstate="print">
             <a:extLst>
               <a:ext uri="{28A0092B-C50C-407E-A947-70E740481C1C}">
-                <a14:useLocalDpi xmlns:a14="http://schemas.microsoft.com/office/drawing/2010/main" val="0"/>
+                <a14:useLocalDpi xmlns:a14="http://schemas.microsoft.com/office/drawing/2010/main" xmlns="" val="0"/>
               </a:ext>
             </a:extLst>
           </a:blip>
@@ -25636,7 +25636,7 @@
           <a:blip r:embed="rId4" cstate="print">
             <a:extLst>
               <a:ext uri="{28A0092B-C50C-407E-A947-70E740481C1C}">
-                <a14:useLocalDpi xmlns:a14="http://schemas.microsoft.com/office/drawing/2010/main" val="0"/>
+                <a14:useLocalDpi xmlns:a14="http://schemas.microsoft.com/office/drawing/2010/main" xmlns="" val="0"/>
               </a:ext>
             </a:extLst>
           </a:blip>
@@ -25657,7 +25657,7 @@
     </p:spTree>
     <p:extLst>
       <p:ext uri="{BB962C8B-B14F-4D97-AF65-F5344CB8AC3E}">
-        <p14:creationId xmlns:p14="http://schemas.microsoft.com/office/powerpoint/2010/main" val="2565098391"/>
+        <p14:creationId xmlns:p14="http://schemas.microsoft.com/office/powerpoint/2010/main" xmlns="" val="2565098391"/>
       </p:ext>
     </p:extLst>
   </p:cSld>
@@ -26097,7 +26097,7 @@
     </p:spTree>
     <p:extLst>
       <p:ext uri="{BB962C8B-B14F-4D97-AF65-F5344CB8AC3E}">
-        <p14:creationId xmlns:p14="http://schemas.microsoft.com/office/powerpoint/2010/main" val="3060759240"/>
+        <p14:creationId xmlns:p14="http://schemas.microsoft.com/office/powerpoint/2010/main" xmlns="" val="3060759240"/>
       </p:ext>
     </p:extLst>
   </p:cSld>
@@ -26837,7 +26837,7 @@
     </p:spTree>
     <p:extLst>
       <p:ext uri="{BB962C8B-B14F-4D97-AF65-F5344CB8AC3E}">
-        <p14:creationId xmlns:p14="http://schemas.microsoft.com/office/powerpoint/2010/main" val="351671181"/>
+        <p14:creationId xmlns:p14="http://schemas.microsoft.com/office/powerpoint/2010/main" xmlns="" val="351671181"/>
       </p:ext>
     </p:extLst>
   </p:cSld>
@@ -27365,7 +27365,7 @@
           <a:blip r:embed="rId3" cstate="print">
             <a:extLst>
               <a:ext uri="{28A0092B-C50C-407E-A947-70E740481C1C}">
-                <a14:useLocalDpi xmlns:a14="http://schemas.microsoft.com/office/drawing/2010/main" val="0"/>
+                <a14:useLocalDpi xmlns:a14="http://schemas.microsoft.com/office/drawing/2010/main" xmlns="" val="0"/>
               </a:ext>
             </a:extLst>
           </a:blip>
@@ -27672,7 +27672,7 @@
     </p:spTree>
     <p:extLst>
       <p:ext uri="{BB962C8B-B14F-4D97-AF65-F5344CB8AC3E}">
-        <p14:creationId xmlns:p14="http://schemas.microsoft.com/office/powerpoint/2010/main" val="2372600146"/>
+        <p14:creationId xmlns:p14="http://schemas.microsoft.com/office/powerpoint/2010/main" xmlns="" val="2372600146"/>
       </p:ext>
     </p:extLst>
   </p:cSld>
@@ -28459,7 +28459,7 @@
     </p:spTree>
     <p:extLst>
       <p:ext uri="{BB962C8B-B14F-4D97-AF65-F5344CB8AC3E}">
-        <p14:creationId xmlns:p14="http://schemas.microsoft.com/office/powerpoint/2010/main" val="1976326652"/>
+        <p14:creationId xmlns:p14="http://schemas.microsoft.com/office/powerpoint/2010/main" xmlns="" val="1976326652"/>
       </p:ext>
     </p:extLst>
   </p:cSld>
@@ -28503,7 +28503,7 @@
                                           </p:stCondLst>
                                         </p:cTn>
                                         <p:tgtEl>
-                                          <p:spTgt spid="25"/>
+                                          <p:spTgt spid="31"/>
                                         </p:tgtEl>
                                         <p:attrNameLst>
                                           <p:attrName>style.visibility</p:attrName>
@@ -28516,26 +28516,35 @@
                                   </p:childTnLst>
                                 </p:cTn>
                               </p:par>
-                            </p:childTnLst>
-                          </p:cTn>
-                        </p:par>
-                      </p:childTnLst>
-                    </p:cTn>
-                  </p:par>
-                  <p:par>
-                    <p:cTn id="7" fill="hold">
-                      <p:stCondLst>
-                        <p:cond delay="indefinite"/>
-                      </p:stCondLst>
-                      <p:childTnLst>
-                        <p:par>
-                          <p:cTn id="8" fill="hold">
-                            <p:stCondLst>
-                              <p:cond delay="0"/>
-                            </p:stCondLst>
-                            <p:childTnLst>
                               <p:par>
-                                <p:cTn id="9" presetID="1" presetClass="entr" presetSubtype="0" fill="hold" nodeType="clickEffect">
+                                <p:cTn id="7" presetID="1" presetClass="entr" presetSubtype="0" fill="hold" nodeType="withEffect">
+                                  <p:stCondLst>
+                                    <p:cond delay="0"/>
+                                  </p:stCondLst>
+                                  <p:childTnLst>
+                                    <p:set>
+                                      <p:cBhvr>
+                                        <p:cTn id="8" dur="1" fill="hold">
+                                          <p:stCondLst>
+                                            <p:cond delay="0"/>
+                                          </p:stCondLst>
+                                        </p:cTn>
+                                        <p:tgtEl>
+                                          <p:spTgt spid="28"/>
+                                        </p:tgtEl>
+                                        <p:attrNameLst>
+                                          <p:attrName>style.visibility</p:attrName>
+                                        </p:attrNameLst>
+                                      </p:cBhvr>
+                                      <p:to>
+                                        <p:strVal val="visible"/>
+                                      </p:to>
+                                    </p:set>
+                                  </p:childTnLst>
+                                </p:cTn>
+                              </p:par>
+                              <p:par>
+                                <p:cTn id="9" presetID="1" presetClass="entr" presetSubtype="0" fill="hold" nodeType="withEffect">
                                   <p:stCondLst>
                                     <p:cond delay="0"/>
                                   </p:stCondLst>
@@ -28548,7 +28557,7 @@
                                           </p:stCondLst>
                                         </p:cTn>
                                         <p:tgtEl>
-                                          <p:spTgt spid="28"/>
+                                          <p:spTgt spid="30"/>
                                         </p:tgtEl>
                                         <p:attrNameLst>
                                           <p:attrName>style.visibility</p:attrName>
@@ -28593,7 +28602,7 @@
                                           </p:stCondLst>
                                         </p:cTn>
                                         <p:tgtEl>
-                                          <p:spTgt spid="30"/>
+                                          <p:spTgt spid="34"/>
                                         </p:tgtEl>
                                         <p:attrNameLst>
                                           <p:attrName>style.visibility</p:attrName>
@@ -28625,7 +28634,7 @@
                             </p:stCondLst>
                             <p:childTnLst>
                               <p:par>
-                                <p:cTn id="17" presetID="1" presetClass="entr" presetSubtype="0" fill="hold" nodeType="clickEffect">
+                                <p:cTn id="17" presetID="3" presetClass="entr" presetSubtype="10" fill="hold" nodeType="clickEffect">
                                   <p:stCondLst>
                                     <p:cond delay="0"/>
                                   </p:stCondLst>
@@ -28638,7 +28647,7 @@
                                           </p:stCondLst>
                                         </p:cTn>
                                         <p:tgtEl>
-                                          <p:spTgt spid="31"/>
+                                          <p:spTgt spid="41986"/>
                                         </p:tgtEl>
                                         <p:attrNameLst>
                                           <p:attrName>style.visibility</p:attrName>
@@ -28648,42 +28657,32 @@
                                         <p:strVal val="visible"/>
                                       </p:to>
                                     </p:set>
+                                    <p:animEffect transition="in" filter="blinds(horizontal)">
+                                      <p:cBhvr>
+                                        <p:cTn id="19" dur="500"/>
+                                        <p:tgtEl>
+                                          <p:spTgt spid="41986"/>
+                                        </p:tgtEl>
+                                      </p:cBhvr>
+                                    </p:animEffect>
                                   </p:childTnLst>
                                 </p:cTn>
                               </p:par>
-                            </p:childTnLst>
-                          </p:cTn>
-                        </p:par>
-                      </p:childTnLst>
-                    </p:cTn>
-                  </p:par>
-                  <p:par>
-                    <p:cTn id="19" fill="hold">
-                      <p:stCondLst>
-                        <p:cond delay="indefinite"/>
-                      </p:stCondLst>
-                      <p:childTnLst>
-                        <p:par>
-                          <p:cTn id="20" fill="hold">
-                            <p:stCondLst>
-                              <p:cond delay="0"/>
-                            </p:stCondLst>
-                            <p:childTnLst>
                               <p:par>
-                                <p:cTn id="21" presetID="1" presetClass="entr" presetSubtype="0" fill="hold" nodeType="clickEffect">
+                                <p:cTn id="20" presetID="3" presetClass="entr" presetSubtype="10" fill="hold" nodeType="withEffect">
                                   <p:stCondLst>
                                     <p:cond delay="0"/>
                                   </p:stCondLst>
                                   <p:childTnLst>
                                     <p:set>
                                       <p:cBhvr>
-                                        <p:cTn id="22" dur="1" fill="hold">
+                                        <p:cTn id="21" dur="1" fill="hold">
                                           <p:stCondLst>
                                             <p:cond delay="0"/>
                                           </p:stCondLst>
                                         </p:cTn>
                                         <p:tgtEl>
-                                          <p:spTgt spid="34"/>
+                                          <p:spTgt spid="25"/>
                                         </p:tgtEl>
                                         <p:attrNameLst>
                                           <p:attrName>style.visibility</p:attrName>
@@ -28693,6 +28692,84 @@
                                         <p:strVal val="visible"/>
                                       </p:to>
                                     </p:set>
+                                    <p:animEffect transition="in" filter="blinds(horizontal)">
+                                      <p:cBhvr>
+                                        <p:cTn id="22" dur="500"/>
+                                        <p:tgtEl>
+                                          <p:spTgt spid="25"/>
+                                        </p:tgtEl>
+                                      </p:cBhvr>
+                                    </p:animEffect>
+                                  </p:childTnLst>
+                                </p:cTn>
+                              </p:par>
+                              <p:par>
+                                <p:cTn id="23" presetID="3" presetClass="entr" presetSubtype="10" fill="hold" nodeType="withEffect">
+                                  <p:stCondLst>
+                                    <p:cond delay="0"/>
+                                  </p:stCondLst>
+                                  <p:childTnLst>
+                                    <p:set>
+                                      <p:cBhvr>
+                                        <p:cTn id="24" dur="1" fill="hold">
+                                          <p:stCondLst>
+                                            <p:cond delay="0"/>
+                                          </p:stCondLst>
+                                        </p:cTn>
+                                        <p:tgtEl>
+                                          <p:spTgt spid="21"/>
+                                        </p:tgtEl>
+                                        <p:attrNameLst>
+                                          <p:attrName>style.visibility</p:attrName>
+                                        </p:attrNameLst>
+                                      </p:cBhvr>
+                                      <p:to>
+                                        <p:strVal val="visible"/>
+                                      </p:to>
+                                    </p:set>
+                                    <p:animEffect transition="in" filter="blinds(horizontal)">
+                                      <p:cBhvr>
+                                        <p:cTn id="25" dur="500"/>
+                                        <p:tgtEl>
+                                          <p:spTgt spid="21"/>
+                                        </p:tgtEl>
+                                      </p:cBhvr>
+                                    </p:animEffect>
+                                  </p:childTnLst>
+                                </p:cTn>
+                              </p:par>
+                              <p:par>
+                                <p:cTn id="26" presetID="3" presetClass="entr" presetSubtype="10" fill="hold" nodeType="withEffect">
+                                  <p:stCondLst>
+                                    <p:cond delay="0"/>
+                                  </p:stCondLst>
+                                  <p:childTnLst>
+                                    <p:set>
+                                      <p:cBhvr>
+                                        <p:cTn id="27" dur="1" fill="hold">
+                                          <p:stCondLst>
+                                            <p:cond delay="0"/>
+                                          </p:stCondLst>
+                                        </p:cTn>
+                                        <p:tgtEl>
+                                          <p:spTgt spid="41988"/>
+                                        </p:tgtEl>
+                                        <p:attrNameLst>
+                                          <p:attrName>style.visibility</p:attrName>
+                                        </p:attrNameLst>
+                                      </p:cBhvr>
+                                      <p:to>
+                                        <p:strVal val="visible"/>
+                                      </p:to>
+                                    </p:set>
+                                    <p:animEffect transition="in" filter="blinds(horizontal)">
+                                      <p:cBhvr>
+                                        <p:cTn id="28" dur="500"/>
+                                        <p:tgtEl>
+                                          <p:spTgt spid="41988"/>
+                                        </p:tgtEl>
+                                      </p:cBhvr>
+                                    </p:animEffect>
                                   </p:childTnLst>
                                 </p:cTn>
                               </p:par>
@@ -28908,7 +28985,7 @@
     </p:spTree>
     <p:extLst>
       <p:ext uri="{BB962C8B-B14F-4D97-AF65-F5344CB8AC3E}">
-        <p14:creationId xmlns:p14="http://schemas.microsoft.com/office/powerpoint/2010/main" val="2681693288"/>
+        <p14:creationId xmlns:p14="http://schemas.microsoft.com/office/powerpoint/2010/main" xmlns="" val="2681693288"/>
       </p:ext>
     </p:extLst>
   </p:cSld>
@@ -29064,351 +29141,42 @@
           <a:p>
             <a:r>
               <a:rPr lang="de-DE" dirty="0" smtClean="0"/>
-              <a:t>Benutzungs- und Systemschnittstellen</a:t>
+              <a:t>Grobablauf Anmeldung</a:t>
             </a:r>
             <a:endParaRPr lang="de-DE" dirty="0"/>
           </a:p>
         </p:txBody>
       </p:sp>
-      <p:sp>
-        <p:nvSpPr>
-          <p:cNvPr id="6" name="Textfeld 5"/>
-          <p:cNvSpPr txBox="1"/>
+      <p:pic>
+        <p:nvPicPr>
+          <p:cNvPr id="1026" name="Picture 2" descr="C:\Users\MSGxxxxx\Desktop\Studium FSW\Eventalizer\Dokumente\UML Diagramme\Sequenz-Diagramm oAuth.png"/>
+          <p:cNvPicPr>
+            <a:picLocks noChangeAspect="1" noChangeArrowheads="1"/>
+          </p:cNvPicPr>
           <p:nvPr/>
-        </p:nvSpPr>
-        <p:spPr>
+        </p:nvPicPr>
+        <p:blipFill>
+          <a:blip r:embed="rId3" cstate="print"/>
+          <a:srcRect b="4604"/>
+          <a:stretch>
+            <a:fillRect/>
+          </a:stretch>
+        </p:blipFill>
+        <p:spPr bwMode="auto">
           <a:xfrm>
-            <a:off x="3491880" y="2771636"/>
-            <a:ext cx="2088232" cy="369332"/>
+            <a:off x="1396521" y="1905076"/>
+            <a:ext cx="7135919" cy="4563800"/>
           </a:xfrm>
           <a:prstGeom prst="rect">
             <a:avLst/>
           </a:prstGeom>
           <a:noFill/>
         </p:spPr>
-        <p:txBody>
-          <a:bodyPr wrap="square" rtlCol="0">
-            <a:spAutoFit/>
-          </a:bodyPr>
-          <a:lstStyle/>
-          <a:p>
-            <a:pPr algn="ctr"/>
-            <a:r>
-              <a:rPr lang="de-DE" dirty="0" smtClean="0"/>
-              <a:t>Eventalizer</a:t>
-            </a:r>
-            <a:endParaRPr lang="de-DE" dirty="0"/>
-          </a:p>
-        </p:txBody>
-      </p:sp>
-      <p:cxnSp>
-        <p:nvCxnSpPr>
-          <p:cNvPr id="9" name="Gerade Verbindung 8"/>
-          <p:cNvCxnSpPr/>
-          <p:nvPr/>
-        </p:nvCxnSpPr>
-        <p:spPr>
-          <a:xfrm flipH="1">
-            <a:off x="3635896" y="3148316"/>
-            <a:ext cx="864096" cy="928756"/>
-          </a:xfrm>
-          <a:prstGeom prst="line">
-            <a:avLst/>
-          </a:prstGeom>
-        </p:spPr>
-        <p:style>
-          <a:lnRef idx="1">
-            <a:schemeClr val="accent1"/>
-          </a:lnRef>
-          <a:fillRef idx="0">
-            <a:schemeClr val="accent1"/>
-          </a:fillRef>
-          <a:effectRef idx="0">
-            <a:schemeClr val="accent1"/>
-          </a:effectRef>
-          <a:fontRef idx="minor">
-            <a:schemeClr val="tx1"/>
-          </a:fontRef>
-        </p:style>
-      </p:cxnSp>
-      <p:cxnSp>
-        <p:nvCxnSpPr>
-          <p:cNvPr id="14" name="Gerade Verbindung 13"/>
-          <p:cNvCxnSpPr/>
-          <p:nvPr/>
-        </p:nvCxnSpPr>
-        <p:spPr>
-          <a:xfrm>
-            <a:off x="4499992" y="3148316"/>
-            <a:ext cx="864096" cy="928756"/>
-          </a:xfrm>
-          <a:prstGeom prst="line">
-            <a:avLst/>
-          </a:prstGeom>
-        </p:spPr>
-        <p:style>
-          <a:lnRef idx="1">
-            <a:schemeClr val="accent1"/>
-          </a:lnRef>
-          <a:fillRef idx="0">
-            <a:schemeClr val="accent1"/>
-          </a:fillRef>
-          <a:effectRef idx="0">
-            <a:schemeClr val="accent1"/>
-          </a:effectRef>
-          <a:fontRef idx="minor">
-            <a:schemeClr val="tx1"/>
-          </a:fontRef>
-        </p:style>
-      </p:cxnSp>
-      <p:cxnSp>
-        <p:nvCxnSpPr>
-          <p:cNvPr id="16" name="Gerade Verbindung 15"/>
-          <p:cNvCxnSpPr/>
-          <p:nvPr/>
-        </p:nvCxnSpPr>
-        <p:spPr>
-          <a:xfrm>
-            <a:off x="4499992" y="3148316"/>
-            <a:ext cx="2304256" cy="928756"/>
-          </a:xfrm>
-          <a:prstGeom prst="line">
-            <a:avLst/>
-          </a:prstGeom>
-        </p:spPr>
-        <p:style>
-          <a:lnRef idx="1">
-            <a:schemeClr val="accent1"/>
-          </a:lnRef>
-          <a:fillRef idx="0">
-            <a:schemeClr val="accent1"/>
-          </a:fillRef>
-          <a:effectRef idx="0">
-            <a:schemeClr val="accent1"/>
-          </a:effectRef>
-          <a:fontRef idx="minor">
-            <a:schemeClr val="tx1"/>
-          </a:fontRef>
-        </p:style>
-      </p:cxnSp>
-      <p:cxnSp>
-        <p:nvCxnSpPr>
-          <p:cNvPr id="18" name="Gerade Verbindung 17"/>
-          <p:cNvCxnSpPr/>
-          <p:nvPr/>
-        </p:nvCxnSpPr>
-        <p:spPr>
-          <a:xfrm flipH="1">
-            <a:off x="2123728" y="3148316"/>
-            <a:ext cx="2376264" cy="928756"/>
-          </a:xfrm>
-          <a:prstGeom prst="line">
-            <a:avLst/>
-          </a:prstGeom>
-        </p:spPr>
-        <p:style>
-          <a:lnRef idx="1">
-            <a:schemeClr val="accent1"/>
-          </a:lnRef>
-          <a:fillRef idx="0">
-            <a:schemeClr val="accent1"/>
-          </a:fillRef>
-          <a:effectRef idx="0">
-            <a:schemeClr val="accent1"/>
-          </a:effectRef>
-          <a:fontRef idx="minor">
-            <a:schemeClr val="tx1"/>
-          </a:fontRef>
-        </p:style>
-      </p:cxnSp>
-      <p:sp>
-        <p:nvSpPr>
-          <p:cNvPr id="19" name="Textfeld 18"/>
-          <p:cNvSpPr txBox="1"/>
-          <p:nvPr/>
-        </p:nvSpPr>
-        <p:spPr>
-          <a:xfrm>
-            <a:off x="1691680" y="4221088"/>
-            <a:ext cx="1368152" cy="369332"/>
-          </a:xfrm>
-          <a:prstGeom prst="rect">
-            <a:avLst/>
-          </a:prstGeom>
-          <a:noFill/>
-        </p:spPr>
-        <p:txBody>
-          <a:bodyPr wrap="square" rtlCol="0">
-            <a:spAutoFit/>
-          </a:bodyPr>
-          <a:lstStyle/>
-          <a:p>
-            <a:r>
-              <a:rPr lang="de-DE" dirty="0" err="1" smtClean="0"/>
-              <a:t>facebook</a:t>
-            </a:r>
-            <a:endParaRPr lang="de-DE" dirty="0"/>
-          </a:p>
-        </p:txBody>
-      </p:sp>
-      <p:sp>
-        <p:nvSpPr>
-          <p:cNvPr id="22" name="Textfeld 21"/>
-          <p:cNvSpPr txBox="1"/>
-          <p:nvPr/>
-        </p:nvSpPr>
-        <p:spPr>
-          <a:xfrm>
-            <a:off x="6228184" y="4077072"/>
-            <a:ext cx="1368152" cy="369332"/>
-          </a:xfrm>
-          <a:prstGeom prst="rect">
-            <a:avLst/>
-          </a:prstGeom>
-          <a:noFill/>
-        </p:spPr>
-        <p:txBody>
-          <a:bodyPr wrap="square" rtlCol="0">
-            <a:spAutoFit/>
-          </a:bodyPr>
-          <a:lstStyle/>
-          <a:p>
-            <a:r>
-              <a:rPr lang="de-DE" dirty="0" err="1" smtClean="0"/>
-              <a:t>openID</a:t>
-            </a:r>
-            <a:endParaRPr lang="de-DE" dirty="0"/>
-          </a:p>
-        </p:txBody>
-      </p:sp>
-      <p:sp>
-        <p:nvSpPr>
-          <p:cNvPr id="23" name="Textfeld 22"/>
-          <p:cNvSpPr txBox="1"/>
-          <p:nvPr/>
-        </p:nvSpPr>
-        <p:spPr>
-          <a:xfrm>
-            <a:off x="4562259" y="4130103"/>
-            <a:ext cx="1368152" cy="369332"/>
-          </a:xfrm>
-          <a:prstGeom prst="rect">
-            <a:avLst/>
-          </a:prstGeom>
-          <a:noFill/>
-        </p:spPr>
-        <p:txBody>
-          <a:bodyPr wrap="square" rtlCol="0">
-            <a:spAutoFit/>
-          </a:bodyPr>
-          <a:lstStyle/>
-          <a:p>
-            <a:r>
-              <a:rPr lang="de-DE" dirty="0" err="1" smtClean="0"/>
-              <a:t>google</a:t>
-            </a:r>
-            <a:endParaRPr lang="de-DE" dirty="0"/>
-          </a:p>
-        </p:txBody>
-      </p:sp>
-      <p:sp>
-        <p:nvSpPr>
-          <p:cNvPr id="24" name="Textfeld 23"/>
-          <p:cNvSpPr txBox="1"/>
-          <p:nvPr/>
-        </p:nvSpPr>
-        <p:spPr>
-          <a:xfrm>
-            <a:off x="2951820" y="4092796"/>
-            <a:ext cx="1368152" cy="369332"/>
-          </a:xfrm>
-          <a:prstGeom prst="rect">
-            <a:avLst/>
-          </a:prstGeom>
-          <a:noFill/>
-        </p:spPr>
-        <p:txBody>
-          <a:bodyPr wrap="square" rtlCol="0">
-            <a:spAutoFit/>
-          </a:bodyPr>
-          <a:lstStyle/>
-          <a:p>
-            <a:r>
-              <a:rPr lang="de-DE" dirty="0" err="1" smtClean="0"/>
-              <a:t>twitter</a:t>
-            </a:r>
-            <a:endParaRPr lang="de-DE" dirty="0"/>
-          </a:p>
-        </p:txBody>
-      </p:sp>
-      <p:cxnSp>
-        <p:nvCxnSpPr>
-          <p:cNvPr id="17" name="Gerade Verbindung 16"/>
-          <p:cNvCxnSpPr/>
-          <p:nvPr/>
-        </p:nvCxnSpPr>
-        <p:spPr>
-          <a:xfrm>
-            <a:off x="4499992" y="3148316"/>
-            <a:ext cx="2664296" cy="280684"/>
-          </a:xfrm>
-          <a:prstGeom prst="line">
-            <a:avLst/>
-          </a:prstGeom>
-        </p:spPr>
-        <p:style>
-          <a:lnRef idx="1">
-            <a:schemeClr val="accent1"/>
-          </a:lnRef>
-          <a:fillRef idx="0">
-            <a:schemeClr val="accent1"/>
-          </a:fillRef>
-          <a:effectRef idx="0">
-            <a:schemeClr val="accent1"/>
-          </a:effectRef>
-          <a:fontRef idx="minor">
-            <a:schemeClr val="tx1"/>
-          </a:fontRef>
-        </p:style>
-      </p:cxnSp>
-      <p:sp>
-        <p:nvSpPr>
-          <p:cNvPr id="26" name="Textfeld 25"/>
-          <p:cNvSpPr txBox="1"/>
-          <p:nvPr/>
-        </p:nvSpPr>
-        <p:spPr>
-          <a:xfrm>
-            <a:off x="7236296" y="3284984"/>
-            <a:ext cx="1368152" cy="646331"/>
-          </a:xfrm>
-          <a:prstGeom prst="rect">
-            <a:avLst/>
-          </a:prstGeom>
-          <a:noFill/>
-        </p:spPr>
-        <p:txBody>
-          <a:bodyPr wrap="square" rtlCol="0">
-            <a:spAutoFit/>
-          </a:bodyPr>
-          <a:lstStyle/>
-          <a:p>
-            <a:r>
-              <a:rPr lang="de-DE" dirty="0" smtClean="0"/>
-              <a:t>Google </a:t>
-            </a:r>
-            <a:r>
-              <a:rPr lang="de-DE" dirty="0" err="1" smtClean="0"/>
-              <a:t>maps</a:t>
-            </a:r>
-            <a:endParaRPr lang="de-DE" dirty="0"/>
-          </a:p>
-        </p:txBody>
-      </p:sp>
+      </p:pic>
     </p:spTree>
     <p:extLst>
       <p:ext uri="{BB962C8B-B14F-4D97-AF65-F5344CB8AC3E}">
-        <p14:creationId xmlns:p14="http://schemas.microsoft.com/office/powerpoint/2010/main" val="2857272158"/>
+        <p14:creationId xmlns:p14="http://schemas.microsoft.com/office/powerpoint/2010/main" xmlns="" val="2857272158"/>
       </p:ext>
     </p:extLst>
   </p:cSld>

</xml_diff>

<commit_message>
Update Sequenzdiagramm - Neue Folie Schnittstellenübersicht
Signed-off-by: Felix <felix@coole-files.de>
</commit_message>
<xml_diff>
--- a/Dokumente/Abschlusspr�si/Abschlusspr�sentation.pptx
+++ b/Dokumente/Abschlusspr�si/Abschlusspr�sentation.pptx
@@ -15,8 +15,8 @@
     <p:sldId id="356" r:id="rId6"/>
     <p:sldId id="361" r:id="rId7"/>
     <p:sldId id="368" r:id="rId8"/>
-    <p:sldId id="293" r:id="rId9"/>
-    <p:sldId id="260" r:id="rId10"/>
+    <p:sldId id="369" r:id="rId9"/>
+    <p:sldId id="293" r:id="rId10"/>
     <p:sldId id="349" r:id="rId11"/>
     <p:sldId id="357" r:id="rId12"/>
     <p:sldId id="351" r:id="rId13"/>
@@ -402,7 +402,7 @@
     </p:spTree>
     <p:extLst>
       <p:ext uri="{BB962C8B-B14F-4D97-AF65-F5344CB8AC3E}">
-        <p14:creationId xmlns:p14="http://schemas.microsoft.com/office/powerpoint/2010/main" xmlns="" val="2610097957"/>
+        <p14:creationId xmlns="" xmlns:p14="http://schemas.microsoft.com/office/powerpoint/2010/main" val="2610097957"/>
       </p:ext>
     </p:extLst>
   </p:cSld>
@@ -595,7 +595,7 @@
     </p:spTree>
     <p:extLst>
       <p:ext uri="{BB962C8B-B14F-4D97-AF65-F5344CB8AC3E}">
-        <p14:creationId xmlns:p14="http://schemas.microsoft.com/office/powerpoint/2010/main" xmlns="" val="2116472317"/>
+        <p14:creationId xmlns="" xmlns:p14="http://schemas.microsoft.com/office/powerpoint/2010/main" val="2116472317"/>
       </p:ext>
     </p:extLst>
   </p:cSld>
@@ -706,7 +706,7 @@
     </p:spTree>
     <p:extLst>
       <p:ext uri="{BB962C8B-B14F-4D97-AF65-F5344CB8AC3E}">
-        <p14:creationId xmlns:p14="http://schemas.microsoft.com/office/powerpoint/2010/main" xmlns="" val="2934279750"/>
+        <p14:creationId xmlns="" xmlns:p14="http://schemas.microsoft.com/office/powerpoint/2010/main" val="2934279750"/>
       </p:ext>
     </p:extLst>
   </p:cSld>
@@ -813,7 +813,7 @@
     </p:spTree>
     <p:extLst>
       <p:ext uri="{BB962C8B-B14F-4D97-AF65-F5344CB8AC3E}">
-        <p14:creationId xmlns:p14="http://schemas.microsoft.com/office/powerpoint/2010/main" xmlns="" val="2845101111"/>
+        <p14:creationId xmlns="" xmlns:p14="http://schemas.microsoft.com/office/powerpoint/2010/main" val="2845101111"/>
       </p:ext>
     </p:extLst>
   </p:cSld>
@@ -902,7 +902,7 @@
     </p:spTree>
     <p:extLst>
       <p:ext uri="{BB962C8B-B14F-4D97-AF65-F5344CB8AC3E}">
-        <p14:creationId xmlns:p14="http://schemas.microsoft.com/office/powerpoint/2010/main" xmlns="" val="135288531"/>
+        <p14:creationId xmlns="" xmlns:p14="http://schemas.microsoft.com/office/powerpoint/2010/main" val="135288531"/>
       </p:ext>
     </p:extLst>
   </p:cSld>
@@ -995,7 +995,7 @@
     </p:spTree>
     <p:extLst>
       <p:ext uri="{BB962C8B-B14F-4D97-AF65-F5344CB8AC3E}">
-        <p14:creationId xmlns:p14="http://schemas.microsoft.com/office/powerpoint/2010/main" xmlns="" val="2825845930"/>
+        <p14:creationId xmlns="" xmlns:p14="http://schemas.microsoft.com/office/powerpoint/2010/main" val="2825845930"/>
       </p:ext>
     </p:extLst>
   </p:cSld>
@@ -1096,7 +1096,7 @@
     </p:spTree>
     <p:extLst>
       <p:ext uri="{BB962C8B-B14F-4D97-AF65-F5344CB8AC3E}">
-        <p14:creationId xmlns:p14="http://schemas.microsoft.com/office/powerpoint/2010/main" xmlns="" val="3912581999"/>
+        <p14:creationId xmlns="" xmlns:p14="http://schemas.microsoft.com/office/powerpoint/2010/main" val="3912581999"/>
       </p:ext>
     </p:extLst>
   </p:cSld>
@@ -1229,7 +1229,7 @@
     </p:spTree>
     <p:extLst>
       <p:ext uri="{BB962C8B-B14F-4D97-AF65-F5344CB8AC3E}">
-        <p14:creationId xmlns:p14="http://schemas.microsoft.com/office/powerpoint/2010/main" xmlns="" val="802076649"/>
+        <p14:creationId xmlns="" xmlns:p14="http://schemas.microsoft.com/office/powerpoint/2010/main" val="802076649"/>
       </p:ext>
     </p:extLst>
   </p:cSld>
@@ -1362,7 +1362,7 @@
     </p:spTree>
     <p:extLst>
       <p:ext uri="{BB962C8B-B14F-4D97-AF65-F5344CB8AC3E}">
-        <p14:creationId xmlns:p14="http://schemas.microsoft.com/office/powerpoint/2010/main" xmlns="" val="802076649"/>
+        <p14:creationId xmlns="" xmlns:p14="http://schemas.microsoft.com/office/powerpoint/2010/main" val="802076649"/>
       </p:ext>
     </p:extLst>
   </p:cSld>
@@ -1495,7 +1495,7 @@
     </p:spTree>
     <p:extLst>
       <p:ext uri="{BB962C8B-B14F-4D97-AF65-F5344CB8AC3E}">
-        <p14:creationId xmlns:p14="http://schemas.microsoft.com/office/powerpoint/2010/main" xmlns="" val="802076649"/>
+        <p14:creationId xmlns="" xmlns:p14="http://schemas.microsoft.com/office/powerpoint/2010/main" val="802076649"/>
       </p:ext>
     </p:extLst>
   </p:cSld>
@@ -1714,7 +1714,7 @@
     </p:spTree>
     <p:extLst>
       <p:ext uri="{BB962C8B-B14F-4D97-AF65-F5344CB8AC3E}">
-        <p14:creationId xmlns:p14="http://schemas.microsoft.com/office/powerpoint/2010/main" xmlns="" val="1629754142"/>
+        <p14:creationId xmlns="" xmlns:p14="http://schemas.microsoft.com/office/powerpoint/2010/main" val="1629754142"/>
       </p:ext>
     </p:extLst>
   </p:cSld>
@@ -1839,7 +1839,7 @@
     </p:spTree>
     <p:extLst>
       <p:ext uri="{BB962C8B-B14F-4D97-AF65-F5344CB8AC3E}">
-        <p14:creationId xmlns:p14="http://schemas.microsoft.com/office/powerpoint/2010/main" xmlns="" val="3931682397"/>
+        <p14:creationId xmlns="" xmlns:p14="http://schemas.microsoft.com/office/powerpoint/2010/main" val="3931682397"/>
       </p:ext>
     </p:extLst>
   </p:cSld>
@@ -2138,7 +2138,7 @@
     </p:spTree>
     <p:extLst>
       <p:ext uri="{BB962C8B-B14F-4D97-AF65-F5344CB8AC3E}">
-        <p14:creationId xmlns:p14="http://schemas.microsoft.com/office/powerpoint/2010/main" xmlns="" val="517533983"/>
+        <p14:creationId xmlns="" xmlns:p14="http://schemas.microsoft.com/office/powerpoint/2010/main" val="517533983"/>
       </p:ext>
     </p:extLst>
   </p:cSld>
@@ -2263,7 +2263,7 @@
     </p:spTree>
     <p:extLst>
       <p:ext uri="{BB962C8B-B14F-4D97-AF65-F5344CB8AC3E}">
-        <p14:creationId xmlns:p14="http://schemas.microsoft.com/office/powerpoint/2010/main" xmlns="" val="3931682397"/>
+        <p14:creationId xmlns="" xmlns:p14="http://schemas.microsoft.com/office/powerpoint/2010/main" val="3931682397"/>
       </p:ext>
     </p:extLst>
   </p:cSld>
@@ -2622,7 +2622,7 @@
     </p:spTree>
     <p:extLst>
       <p:ext uri="{BB962C8B-B14F-4D97-AF65-F5344CB8AC3E}">
-        <p14:creationId xmlns:p14="http://schemas.microsoft.com/office/powerpoint/2010/main" xmlns="" val="1616458392"/>
+        <p14:creationId xmlns="" xmlns:p14="http://schemas.microsoft.com/office/powerpoint/2010/main" val="1616458392"/>
       </p:ext>
     </p:extLst>
   </p:cSld>
@@ -2707,7 +2707,7 @@
     </p:spTree>
     <p:extLst>
       <p:ext uri="{BB962C8B-B14F-4D97-AF65-F5344CB8AC3E}">
-        <p14:creationId xmlns:p14="http://schemas.microsoft.com/office/powerpoint/2010/main" xmlns="" val="1519036346"/>
+        <p14:creationId xmlns="" xmlns:p14="http://schemas.microsoft.com/office/powerpoint/2010/main" val="1519036346"/>
       </p:ext>
     </p:extLst>
   </p:cSld>
@@ -2792,7 +2792,7 @@
     </p:spTree>
     <p:extLst>
       <p:ext uri="{BB962C8B-B14F-4D97-AF65-F5344CB8AC3E}">
-        <p14:creationId xmlns:p14="http://schemas.microsoft.com/office/powerpoint/2010/main" xmlns="" val="2116472317"/>
+        <p14:creationId xmlns="" xmlns:p14="http://schemas.microsoft.com/office/powerpoint/2010/main" val="2116472317"/>
       </p:ext>
     </p:extLst>
   </p:cSld>
@@ -3117,7 +3117,7 @@
     </p:spTree>
     <p:extLst>
       <p:ext uri="{BB962C8B-B14F-4D97-AF65-F5344CB8AC3E}">
-        <p14:creationId xmlns:p14="http://schemas.microsoft.com/office/powerpoint/2010/main" xmlns="" val="517533983"/>
+        <p14:creationId xmlns="" xmlns:p14="http://schemas.microsoft.com/office/powerpoint/2010/main" val="517533983"/>
       </p:ext>
     </p:extLst>
   </p:cSld>
@@ -3289,7 +3289,7 @@
     </p:spTree>
     <p:extLst>
       <p:ext uri="{BB962C8B-B14F-4D97-AF65-F5344CB8AC3E}">
-        <p14:creationId xmlns:p14="http://schemas.microsoft.com/office/powerpoint/2010/main" xmlns="" val="2934279750"/>
+        <p14:creationId xmlns="" xmlns:p14="http://schemas.microsoft.com/office/powerpoint/2010/main" val="2934279750"/>
       </p:ext>
     </p:extLst>
   </p:cSld>
@@ -3386,7 +3386,7 @@
     </p:spTree>
     <p:extLst>
       <p:ext uri="{BB962C8B-B14F-4D97-AF65-F5344CB8AC3E}">
-        <p14:creationId xmlns:p14="http://schemas.microsoft.com/office/powerpoint/2010/main" xmlns="" val="2934279750"/>
+        <p14:creationId xmlns="" xmlns:p14="http://schemas.microsoft.com/office/powerpoint/2010/main" val="2934279750"/>
       </p:ext>
     </p:extLst>
   </p:cSld>
@@ -3490,7 +3490,7 @@
     </p:spTree>
     <p:extLst>
       <p:ext uri="{BB962C8B-B14F-4D97-AF65-F5344CB8AC3E}">
-        <p14:creationId xmlns:p14="http://schemas.microsoft.com/office/powerpoint/2010/main" xmlns="" val="2934279750"/>
+        <p14:creationId xmlns="" xmlns:p14="http://schemas.microsoft.com/office/powerpoint/2010/main" val="2934279750"/>
       </p:ext>
     </p:extLst>
   </p:cSld>
@@ -3575,7 +3575,7 @@
     </p:spTree>
     <p:extLst>
       <p:ext uri="{BB962C8B-B14F-4D97-AF65-F5344CB8AC3E}">
-        <p14:creationId xmlns:p14="http://schemas.microsoft.com/office/powerpoint/2010/main" xmlns="" val="3860513045"/>
+        <p14:creationId xmlns="" xmlns:p14="http://schemas.microsoft.com/office/powerpoint/2010/main" val="3860513045"/>
       </p:ext>
     </p:extLst>
   </p:cSld>
@@ -3629,331 +3629,6 @@
           <a:bodyPr/>
           <a:lstStyle/>
           <a:p>
-            <a:r>
-              <a:rPr lang="de-DE" dirty="0" smtClean="0"/>
-              <a:t>Funktionale Anforderung per </a:t>
-            </a:r>
-            <a:r>
-              <a:rPr lang="de-DE" dirty="0" err="1" smtClean="0"/>
-              <a:t>Mockup</a:t>
-            </a:r>
-            <a:r>
-              <a:rPr lang="de-DE" dirty="0" smtClean="0"/>
-              <a:t> dargestellt und textuell ergänzt:</a:t>
-            </a:r>
-          </a:p>
-          <a:p>
-            <a:r>
-              <a:rPr lang="de-DE" sz="1200" kern="1200" dirty="0" smtClean="0">
-                <a:solidFill>
-                  <a:schemeClr val="tx1"/>
-                </a:solidFill>
-                <a:effectLst/>
-                <a:latin typeface="+mn-lt"/>
-                <a:ea typeface="+mn-ea"/>
-                <a:cs typeface="+mn-cs"/>
-              </a:rPr>
-              <a:t>Der beliebiger Internetnutzer kann sich über </a:t>
-            </a:r>
-            <a:r>
-              <a:rPr lang="de-DE" sz="1200" kern="1200" dirty="0" err="1" smtClean="0">
-                <a:solidFill>
-                  <a:schemeClr val="tx1"/>
-                </a:solidFill>
-                <a:effectLst/>
-                <a:latin typeface="+mn-lt"/>
-                <a:ea typeface="+mn-ea"/>
-                <a:cs typeface="+mn-cs"/>
-              </a:rPr>
-              <a:t>oAuth</a:t>
-            </a:r>
-            <a:r>
-              <a:rPr lang="de-DE" sz="1200" kern="1200" dirty="0" smtClean="0">
-                <a:solidFill>
-                  <a:schemeClr val="tx1"/>
-                </a:solidFill>
-                <a:effectLst/>
-                <a:latin typeface="+mn-lt"/>
-                <a:ea typeface="+mn-ea"/>
-                <a:cs typeface="+mn-cs"/>
-              </a:rPr>
-              <a:t> (Google oder Facebook-Account) auf der folgenden Eingabemaske an der Internetplattform </a:t>
-            </a:r>
-            <a:r>
-              <a:rPr lang="de-DE" sz="1200" kern="1200" dirty="0" err="1" smtClean="0">
-                <a:solidFill>
-                  <a:schemeClr val="tx1"/>
-                </a:solidFill>
-                <a:effectLst/>
-                <a:latin typeface="+mn-lt"/>
-                <a:ea typeface="+mn-ea"/>
-                <a:cs typeface="+mn-cs"/>
-              </a:rPr>
-              <a:t>Eventalizer</a:t>
-            </a:r>
-            <a:r>
-              <a:rPr lang="de-DE" sz="1200" kern="1200" dirty="0" smtClean="0">
-                <a:solidFill>
-                  <a:schemeClr val="tx1"/>
-                </a:solidFill>
-                <a:effectLst/>
-                <a:latin typeface="+mn-lt"/>
-                <a:ea typeface="+mn-ea"/>
-                <a:cs typeface="+mn-cs"/>
-              </a:rPr>
-              <a:t> anmelden:</a:t>
-            </a:r>
-            <a:br>
-              <a:rPr lang="de-DE" sz="1200" kern="1200" dirty="0" smtClean="0">
-                <a:solidFill>
-                  <a:schemeClr val="tx1"/>
-                </a:solidFill>
-                <a:effectLst/>
-                <a:latin typeface="+mn-lt"/>
-                <a:ea typeface="+mn-ea"/>
-                <a:cs typeface="+mn-cs"/>
-              </a:rPr>
-            </a:br>
-            <a:r>
-              <a:rPr lang="de-DE" sz="1200" kern="1200" dirty="0" smtClean="0">
-                <a:solidFill>
-                  <a:schemeClr val="tx1"/>
-                </a:solidFill>
-                <a:effectLst/>
-                <a:latin typeface="+mn-lt"/>
-                <a:ea typeface="+mn-ea"/>
-                <a:cs typeface="+mn-cs"/>
-              </a:rPr>
-              <a:t> </a:t>
-            </a:r>
-            <a:br>
-              <a:rPr lang="de-DE" sz="1200" kern="1200" dirty="0" smtClean="0">
-                <a:solidFill>
-                  <a:schemeClr val="tx1"/>
-                </a:solidFill>
-                <a:effectLst/>
-                <a:latin typeface="+mn-lt"/>
-                <a:ea typeface="+mn-ea"/>
-                <a:cs typeface="+mn-cs"/>
-              </a:rPr>
-            </a:br>
-            <a:r>
-              <a:rPr lang="de-DE" sz="1200" kern="1200" dirty="0" smtClean="0">
-                <a:solidFill>
-                  <a:schemeClr val="tx1"/>
-                </a:solidFill>
-                <a:effectLst/>
-                <a:latin typeface="+mn-lt"/>
-                <a:ea typeface="+mn-ea"/>
-                <a:cs typeface="+mn-cs"/>
-              </a:rPr>
-              <a:t>Für eine erfolgreiche Anmeldung ist die Angabe der folgenden Informationen notwendig:</a:t>
-            </a:r>
-          </a:p>
-          <a:p>
-            <a:pPr lvl="0"/>
-            <a:r>
-              <a:rPr lang="de-DE" sz="1200" kern="1200" dirty="0" err="1" smtClean="0">
-                <a:solidFill>
-                  <a:schemeClr val="tx1"/>
-                </a:solidFill>
-                <a:effectLst/>
-                <a:latin typeface="+mn-lt"/>
-                <a:ea typeface="+mn-ea"/>
-                <a:cs typeface="+mn-cs"/>
-              </a:rPr>
-              <a:t>Social</a:t>
-            </a:r>
-            <a:r>
-              <a:rPr lang="de-DE" sz="1200" kern="1200" dirty="0" smtClean="0">
-                <a:solidFill>
-                  <a:schemeClr val="tx1"/>
-                </a:solidFill>
-                <a:effectLst/>
-                <a:latin typeface="+mn-lt"/>
-                <a:ea typeface="+mn-ea"/>
-                <a:cs typeface="+mn-cs"/>
-              </a:rPr>
-              <a:t>-Network-Anbieter</a:t>
-            </a:r>
-          </a:p>
-          <a:p>
-            <a:pPr lvl="0"/>
-            <a:r>
-              <a:rPr lang="de-DE" sz="1200" kern="1200" dirty="0" smtClean="0">
-                <a:solidFill>
-                  <a:schemeClr val="tx1"/>
-                </a:solidFill>
-                <a:effectLst/>
-                <a:latin typeface="+mn-lt"/>
-                <a:ea typeface="+mn-ea"/>
-                <a:cs typeface="+mn-cs"/>
-              </a:rPr>
-              <a:t>Der dort verwendete Benutzername</a:t>
-            </a:r>
-          </a:p>
-          <a:p>
-            <a:pPr lvl="0"/>
-            <a:r>
-              <a:rPr lang="de-DE" sz="1200" kern="1200" dirty="0" smtClean="0">
-                <a:solidFill>
-                  <a:schemeClr val="tx1"/>
-                </a:solidFill>
-                <a:effectLst/>
-                <a:latin typeface="+mn-lt"/>
-                <a:ea typeface="+mn-ea"/>
-                <a:cs typeface="+mn-cs"/>
-              </a:rPr>
-              <a:t>Das dort verwendete persönliche Passwort</a:t>
-            </a:r>
-          </a:p>
-          <a:p>
-            <a:r>
-              <a:rPr lang="de-DE" sz="1200" kern="1200" dirty="0" smtClean="0">
-                <a:solidFill>
-                  <a:schemeClr val="tx1"/>
-                </a:solidFill>
-                <a:effectLst/>
-                <a:latin typeface="+mn-lt"/>
-                <a:ea typeface="+mn-ea"/>
-                <a:cs typeface="+mn-cs"/>
-              </a:rPr>
-              <a:t>Die möglichen </a:t>
-            </a:r>
-            <a:r>
-              <a:rPr lang="de-DE" sz="1200" kern="1200" dirty="0" err="1" smtClean="0">
-                <a:solidFill>
-                  <a:schemeClr val="tx1"/>
-                </a:solidFill>
-                <a:effectLst/>
-                <a:latin typeface="+mn-lt"/>
-                <a:ea typeface="+mn-ea"/>
-                <a:cs typeface="+mn-cs"/>
-              </a:rPr>
-              <a:t>Social</a:t>
-            </a:r>
-            <a:r>
-              <a:rPr lang="de-DE" sz="1200" kern="1200" dirty="0" smtClean="0">
-                <a:solidFill>
-                  <a:schemeClr val="tx1"/>
-                </a:solidFill>
-                <a:effectLst/>
-                <a:latin typeface="+mn-lt"/>
-                <a:ea typeface="+mn-ea"/>
-                <a:cs typeface="+mn-cs"/>
-              </a:rPr>
-              <a:t>-Network-Anbieter werden auf der Eingabemaske aufgeführt. </a:t>
-            </a:r>
-            <a:br>
-              <a:rPr lang="de-DE" sz="1200" kern="1200" dirty="0" smtClean="0">
-                <a:solidFill>
-                  <a:schemeClr val="tx1"/>
-                </a:solidFill>
-                <a:effectLst/>
-                <a:latin typeface="+mn-lt"/>
-                <a:ea typeface="+mn-ea"/>
-                <a:cs typeface="+mn-cs"/>
-              </a:rPr>
-            </a:br>
-            <a:r>
-              <a:rPr lang="de-DE" sz="1200" kern="1200" dirty="0" smtClean="0">
-                <a:solidFill>
-                  <a:schemeClr val="tx1"/>
-                </a:solidFill>
-                <a:effectLst/>
-                <a:latin typeface="+mn-lt"/>
-                <a:ea typeface="+mn-ea"/>
-                <a:cs typeface="+mn-cs"/>
-              </a:rPr>
-              <a:t>Die Anmeldung an der Internetplattform ist erfolgreich, wenn die Antwort des </a:t>
-            </a:r>
-            <a:r>
-              <a:rPr lang="de-DE" sz="1200" kern="1200" dirty="0" err="1" smtClean="0">
-                <a:solidFill>
-                  <a:schemeClr val="tx1"/>
-                </a:solidFill>
-                <a:effectLst/>
-                <a:latin typeface="+mn-lt"/>
-                <a:ea typeface="+mn-ea"/>
-                <a:cs typeface="+mn-cs"/>
-              </a:rPr>
-              <a:t>Social</a:t>
-            </a:r>
-            <a:r>
-              <a:rPr lang="de-DE" sz="1200" kern="1200" dirty="0" smtClean="0">
-                <a:solidFill>
-                  <a:schemeClr val="tx1"/>
-                </a:solidFill>
-                <a:effectLst/>
-                <a:latin typeface="+mn-lt"/>
-                <a:ea typeface="+mn-ea"/>
-                <a:cs typeface="+mn-cs"/>
-              </a:rPr>
-              <a:t>-Network-Anbieters positiv ist, d.h. ist der Benutzer dort authentifiziert wurde und die Benutzerdaten übermittelt worden sind. Kann der Benutzer nicht über den </a:t>
-            </a:r>
-            <a:r>
-              <a:rPr lang="de-DE" sz="1200" kern="1200" dirty="0" err="1" smtClean="0">
-                <a:solidFill>
-                  <a:schemeClr val="tx1"/>
-                </a:solidFill>
-                <a:effectLst/>
-                <a:latin typeface="+mn-lt"/>
-                <a:ea typeface="+mn-ea"/>
-                <a:cs typeface="+mn-cs"/>
-              </a:rPr>
-              <a:t>Social</a:t>
-            </a:r>
-            <a:r>
-              <a:rPr lang="de-DE" sz="1200" kern="1200" dirty="0" smtClean="0">
-                <a:solidFill>
-                  <a:schemeClr val="tx1"/>
-                </a:solidFill>
-                <a:effectLst/>
-                <a:latin typeface="+mn-lt"/>
-                <a:ea typeface="+mn-ea"/>
-                <a:cs typeface="+mn-cs"/>
-              </a:rPr>
-              <a:t>-Network-Anbieter authentifiziert werden, erfolgt auch keine Anmeldung.</a:t>
-            </a:r>
-          </a:p>
-          <a:p>
-            <a:r>
-              <a:rPr lang="de-DE" sz="1200" kern="1200" dirty="0" smtClean="0">
-                <a:solidFill>
-                  <a:schemeClr val="tx1"/>
-                </a:solidFill>
-                <a:effectLst/>
-                <a:latin typeface="+mn-lt"/>
-                <a:ea typeface="+mn-ea"/>
-                <a:cs typeface="+mn-cs"/>
-              </a:rPr>
-              <a:t/>
-            </a:r>
-            <a:br>
-              <a:rPr lang="de-DE" sz="1200" kern="1200" dirty="0" smtClean="0">
-                <a:solidFill>
-                  <a:schemeClr val="tx1"/>
-                </a:solidFill>
-                <a:effectLst/>
-                <a:latin typeface="+mn-lt"/>
-                <a:ea typeface="+mn-ea"/>
-                <a:cs typeface="+mn-cs"/>
-              </a:rPr>
-            </a:br>
-            <a:r>
-              <a:rPr lang="de-DE" sz="1200" kern="1200" dirty="0" smtClean="0">
-                <a:solidFill>
-                  <a:schemeClr val="tx1"/>
-                </a:solidFill>
-                <a:effectLst/>
-                <a:latin typeface="+mn-lt"/>
-                <a:ea typeface="+mn-ea"/>
-                <a:cs typeface="+mn-cs"/>
-              </a:rPr>
-              <a:t>@FSM:  Updaten</a:t>
-            </a:r>
-          </a:p>
-          <a:p>
             <a:endParaRPr lang="de-DE" dirty="0"/>
           </a:p>
         </p:txBody>
@@ -3973,19 +3648,19 @@
           <a:bodyPr/>
           <a:lstStyle/>
           <a:p>
-            <a:fld id="{F7EBFB8C-BBFF-4397-A51C-1E92596422A9}" type="slidenum">
-              <a:rPr lang="en-US" smtClean="0"/>
+            <a:fld id="{1EBFF01C-F984-4A51-AF10-254043F7C542}" type="slidenum">
+              <a:rPr lang="de-DE" smtClean="0"/>
               <a:pPr/>
               <a:t>8</a:t>
             </a:fld>
-            <a:endParaRPr lang="en-US" dirty="0"/>
+            <a:endParaRPr lang="de-DE"/>
           </a:p>
         </p:txBody>
       </p:sp>
     </p:spTree>
     <p:extLst>
       <p:ext uri="{BB962C8B-B14F-4D97-AF65-F5344CB8AC3E}">
-        <p14:creationId xmlns:p14="http://schemas.microsoft.com/office/powerpoint/2010/main" xmlns="" val="2934279750"/>
+        <p14:creationId xmlns="" xmlns:p14="http://schemas.microsoft.com/office/powerpoint/2010/main" val="3860513045"/>
       </p:ext>
     </p:extLst>
   </p:cSld>
@@ -4039,6 +3714,331 @@
           <a:bodyPr/>
           <a:lstStyle/>
           <a:p>
+            <a:r>
+              <a:rPr lang="de-DE" dirty="0" smtClean="0"/>
+              <a:t>Funktionale Anforderung per </a:t>
+            </a:r>
+            <a:r>
+              <a:rPr lang="de-DE" dirty="0" err="1" smtClean="0"/>
+              <a:t>Mockup</a:t>
+            </a:r>
+            <a:r>
+              <a:rPr lang="de-DE" dirty="0" smtClean="0"/>
+              <a:t> dargestellt und textuell ergänzt:</a:t>
+            </a:r>
+          </a:p>
+          <a:p>
+            <a:r>
+              <a:rPr lang="de-DE" sz="1200" kern="1200" dirty="0" smtClean="0">
+                <a:solidFill>
+                  <a:schemeClr val="tx1"/>
+                </a:solidFill>
+                <a:effectLst/>
+                <a:latin typeface="+mn-lt"/>
+                <a:ea typeface="+mn-ea"/>
+                <a:cs typeface="+mn-cs"/>
+              </a:rPr>
+              <a:t>Der beliebiger Internetnutzer kann sich über </a:t>
+            </a:r>
+            <a:r>
+              <a:rPr lang="de-DE" sz="1200" kern="1200" dirty="0" err="1" smtClean="0">
+                <a:solidFill>
+                  <a:schemeClr val="tx1"/>
+                </a:solidFill>
+                <a:effectLst/>
+                <a:latin typeface="+mn-lt"/>
+                <a:ea typeface="+mn-ea"/>
+                <a:cs typeface="+mn-cs"/>
+              </a:rPr>
+              <a:t>oAuth</a:t>
+            </a:r>
+            <a:r>
+              <a:rPr lang="de-DE" sz="1200" kern="1200" dirty="0" smtClean="0">
+                <a:solidFill>
+                  <a:schemeClr val="tx1"/>
+                </a:solidFill>
+                <a:effectLst/>
+                <a:latin typeface="+mn-lt"/>
+                <a:ea typeface="+mn-ea"/>
+                <a:cs typeface="+mn-cs"/>
+              </a:rPr>
+              <a:t> (Google oder Facebook-Account) auf der folgenden Eingabemaske an der Internetplattform </a:t>
+            </a:r>
+            <a:r>
+              <a:rPr lang="de-DE" sz="1200" kern="1200" dirty="0" err="1" smtClean="0">
+                <a:solidFill>
+                  <a:schemeClr val="tx1"/>
+                </a:solidFill>
+                <a:effectLst/>
+                <a:latin typeface="+mn-lt"/>
+                <a:ea typeface="+mn-ea"/>
+                <a:cs typeface="+mn-cs"/>
+              </a:rPr>
+              <a:t>Eventalizer</a:t>
+            </a:r>
+            <a:r>
+              <a:rPr lang="de-DE" sz="1200" kern="1200" dirty="0" smtClean="0">
+                <a:solidFill>
+                  <a:schemeClr val="tx1"/>
+                </a:solidFill>
+                <a:effectLst/>
+                <a:latin typeface="+mn-lt"/>
+                <a:ea typeface="+mn-ea"/>
+                <a:cs typeface="+mn-cs"/>
+              </a:rPr>
+              <a:t> anmelden:</a:t>
+            </a:r>
+            <a:br>
+              <a:rPr lang="de-DE" sz="1200" kern="1200" dirty="0" smtClean="0">
+                <a:solidFill>
+                  <a:schemeClr val="tx1"/>
+                </a:solidFill>
+                <a:effectLst/>
+                <a:latin typeface="+mn-lt"/>
+                <a:ea typeface="+mn-ea"/>
+                <a:cs typeface="+mn-cs"/>
+              </a:rPr>
+            </a:br>
+            <a:r>
+              <a:rPr lang="de-DE" sz="1200" kern="1200" dirty="0" smtClean="0">
+                <a:solidFill>
+                  <a:schemeClr val="tx1"/>
+                </a:solidFill>
+                <a:effectLst/>
+                <a:latin typeface="+mn-lt"/>
+                <a:ea typeface="+mn-ea"/>
+                <a:cs typeface="+mn-cs"/>
+              </a:rPr>
+              <a:t> </a:t>
+            </a:r>
+            <a:br>
+              <a:rPr lang="de-DE" sz="1200" kern="1200" dirty="0" smtClean="0">
+                <a:solidFill>
+                  <a:schemeClr val="tx1"/>
+                </a:solidFill>
+                <a:effectLst/>
+                <a:latin typeface="+mn-lt"/>
+                <a:ea typeface="+mn-ea"/>
+                <a:cs typeface="+mn-cs"/>
+              </a:rPr>
+            </a:br>
+            <a:r>
+              <a:rPr lang="de-DE" sz="1200" kern="1200" dirty="0" smtClean="0">
+                <a:solidFill>
+                  <a:schemeClr val="tx1"/>
+                </a:solidFill>
+                <a:effectLst/>
+                <a:latin typeface="+mn-lt"/>
+                <a:ea typeface="+mn-ea"/>
+                <a:cs typeface="+mn-cs"/>
+              </a:rPr>
+              <a:t>Für eine erfolgreiche Anmeldung ist die Angabe der folgenden Informationen notwendig:</a:t>
+            </a:r>
+          </a:p>
+          <a:p>
+            <a:pPr lvl="0"/>
+            <a:r>
+              <a:rPr lang="de-DE" sz="1200" kern="1200" dirty="0" err="1" smtClean="0">
+                <a:solidFill>
+                  <a:schemeClr val="tx1"/>
+                </a:solidFill>
+                <a:effectLst/>
+                <a:latin typeface="+mn-lt"/>
+                <a:ea typeface="+mn-ea"/>
+                <a:cs typeface="+mn-cs"/>
+              </a:rPr>
+              <a:t>Social</a:t>
+            </a:r>
+            <a:r>
+              <a:rPr lang="de-DE" sz="1200" kern="1200" dirty="0" smtClean="0">
+                <a:solidFill>
+                  <a:schemeClr val="tx1"/>
+                </a:solidFill>
+                <a:effectLst/>
+                <a:latin typeface="+mn-lt"/>
+                <a:ea typeface="+mn-ea"/>
+                <a:cs typeface="+mn-cs"/>
+              </a:rPr>
+              <a:t>-Network-Anbieter</a:t>
+            </a:r>
+          </a:p>
+          <a:p>
+            <a:pPr lvl="0"/>
+            <a:r>
+              <a:rPr lang="de-DE" sz="1200" kern="1200" dirty="0" smtClean="0">
+                <a:solidFill>
+                  <a:schemeClr val="tx1"/>
+                </a:solidFill>
+                <a:effectLst/>
+                <a:latin typeface="+mn-lt"/>
+                <a:ea typeface="+mn-ea"/>
+                <a:cs typeface="+mn-cs"/>
+              </a:rPr>
+              <a:t>Der dort verwendete Benutzername</a:t>
+            </a:r>
+          </a:p>
+          <a:p>
+            <a:pPr lvl="0"/>
+            <a:r>
+              <a:rPr lang="de-DE" sz="1200" kern="1200" dirty="0" smtClean="0">
+                <a:solidFill>
+                  <a:schemeClr val="tx1"/>
+                </a:solidFill>
+                <a:effectLst/>
+                <a:latin typeface="+mn-lt"/>
+                <a:ea typeface="+mn-ea"/>
+                <a:cs typeface="+mn-cs"/>
+              </a:rPr>
+              <a:t>Das dort verwendete persönliche Passwort</a:t>
+            </a:r>
+          </a:p>
+          <a:p>
+            <a:r>
+              <a:rPr lang="de-DE" sz="1200" kern="1200" dirty="0" smtClean="0">
+                <a:solidFill>
+                  <a:schemeClr val="tx1"/>
+                </a:solidFill>
+                <a:effectLst/>
+                <a:latin typeface="+mn-lt"/>
+                <a:ea typeface="+mn-ea"/>
+                <a:cs typeface="+mn-cs"/>
+              </a:rPr>
+              <a:t>Die möglichen </a:t>
+            </a:r>
+            <a:r>
+              <a:rPr lang="de-DE" sz="1200" kern="1200" dirty="0" err="1" smtClean="0">
+                <a:solidFill>
+                  <a:schemeClr val="tx1"/>
+                </a:solidFill>
+                <a:effectLst/>
+                <a:latin typeface="+mn-lt"/>
+                <a:ea typeface="+mn-ea"/>
+                <a:cs typeface="+mn-cs"/>
+              </a:rPr>
+              <a:t>Social</a:t>
+            </a:r>
+            <a:r>
+              <a:rPr lang="de-DE" sz="1200" kern="1200" dirty="0" smtClean="0">
+                <a:solidFill>
+                  <a:schemeClr val="tx1"/>
+                </a:solidFill>
+                <a:effectLst/>
+                <a:latin typeface="+mn-lt"/>
+                <a:ea typeface="+mn-ea"/>
+                <a:cs typeface="+mn-cs"/>
+              </a:rPr>
+              <a:t>-Network-Anbieter werden auf der Eingabemaske aufgeführt. </a:t>
+            </a:r>
+            <a:br>
+              <a:rPr lang="de-DE" sz="1200" kern="1200" dirty="0" smtClean="0">
+                <a:solidFill>
+                  <a:schemeClr val="tx1"/>
+                </a:solidFill>
+                <a:effectLst/>
+                <a:latin typeface="+mn-lt"/>
+                <a:ea typeface="+mn-ea"/>
+                <a:cs typeface="+mn-cs"/>
+              </a:rPr>
+            </a:br>
+            <a:r>
+              <a:rPr lang="de-DE" sz="1200" kern="1200" dirty="0" smtClean="0">
+                <a:solidFill>
+                  <a:schemeClr val="tx1"/>
+                </a:solidFill>
+                <a:effectLst/>
+                <a:latin typeface="+mn-lt"/>
+                <a:ea typeface="+mn-ea"/>
+                <a:cs typeface="+mn-cs"/>
+              </a:rPr>
+              <a:t>Die Anmeldung an der Internetplattform ist erfolgreich, wenn die Antwort des </a:t>
+            </a:r>
+            <a:r>
+              <a:rPr lang="de-DE" sz="1200" kern="1200" dirty="0" err="1" smtClean="0">
+                <a:solidFill>
+                  <a:schemeClr val="tx1"/>
+                </a:solidFill>
+                <a:effectLst/>
+                <a:latin typeface="+mn-lt"/>
+                <a:ea typeface="+mn-ea"/>
+                <a:cs typeface="+mn-cs"/>
+              </a:rPr>
+              <a:t>Social</a:t>
+            </a:r>
+            <a:r>
+              <a:rPr lang="de-DE" sz="1200" kern="1200" dirty="0" smtClean="0">
+                <a:solidFill>
+                  <a:schemeClr val="tx1"/>
+                </a:solidFill>
+                <a:effectLst/>
+                <a:latin typeface="+mn-lt"/>
+                <a:ea typeface="+mn-ea"/>
+                <a:cs typeface="+mn-cs"/>
+              </a:rPr>
+              <a:t>-Network-Anbieters positiv ist, d.h. ist der Benutzer dort authentifiziert wurde und die Benutzerdaten übermittelt worden sind. Kann der Benutzer nicht über den </a:t>
+            </a:r>
+            <a:r>
+              <a:rPr lang="de-DE" sz="1200" kern="1200" dirty="0" err="1" smtClean="0">
+                <a:solidFill>
+                  <a:schemeClr val="tx1"/>
+                </a:solidFill>
+                <a:effectLst/>
+                <a:latin typeface="+mn-lt"/>
+                <a:ea typeface="+mn-ea"/>
+                <a:cs typeface="+mn-cs"/>
+              </a:rPr>
+              <a:t>Social</a:t>
+            </a:r>
+            <a:r>
+              <a:rPr lang="de-DE" sz="1200" kern="1200" dirty="0" smtClean="0">
+                <a:solidFill>
+                  <a:schemeClr val="tx1"/>
+                </a:solidFill>
+                <a:effectLst/>
+                <a:latin typeface="+mn-lt"/>
+                <a:ea typeface="+mn-ea"/>
+                <a:cs typeface="+mn-cs"/>
+              </a:rPr>
+              <a:t>-Network-Anbieter authentifiziert werden, erfolgt auch keine Anmeldung.</a:t>
+            </a:r>
+          </a:p>
+          <a:p>
+            <a:r>
+              <a:rPr lang="de-DE" sz="1200" kern="1200" dirty="0" smtClean="0">
+                <a:solidFill>
+                  <a:schemeClr val="tx1"/>
+                </a:solidFill>
+                <a:effectLst/>
+                <a:latin typeface="+mn-lt"/>
+                <a:ea typeface="+mn-ea"/>
+                <a:cs typeface="+mn-cs"/>
+              </a:rPr>
+              <a:t/>
+            </a:r>
+            <a:br>
+              <a:rPr lang="de-DE" sz="1200" kern="1200" dirty="0" smtClean="0">
+                <a:solidFill>
+                  <a:schemeClr val="tx1"/>
+                </a:solidFill>
+                <a:effectLst/>
+                <a:latin typeface="+mn-lt"/>
+                <a:ea typeface="+mn-ea"/>
+                <a:cs typeface="+mn-cs"/>
+              </a:rPr>
+            </a:br>
+            <a:r>
+              <a:rPr lang="de-DE" sz="1200" kern="1200" dirty="0" smtClean="0">
+                <a:solidFill>
+                  <a:schemeClr val="tx1"/>
+                </a:solidFill>
+                <a:effectLst/>
+                <a:latin typeface="+mn-lt"/>
+                <a:ea typeface="+mn-ea"/>
+                <a:cs typeface="+mn-cs"/>
+              </a:rPr>
+              <a:t>@FSM:  Updaten</a:t>
+            </a:r>
+          </a:p>
+          <a:p>
             <a:endParaRPr lang="de-DE" dirty="0"/>
           </a:p>
         </p:txBody>
@@ -4058,19 +4058,19 @@
           <a:bodyPr/>
           <a:lstStyle/>
           <a:p>
-            <a:fld id="{1EBFF01C-F984-4A51-AF10-254043F7C542}" type="slidenum">
-              <a:rPr lang="de-DE" smtClean="0"/>
+            <a:fld id="{F7EBFB8C-BBFF-4397-A51C-1E92596422A9}" type="slidenum">
+              <a:rPr lang="en-US" smtClean="0"/>
               <a:pPr/>
               <a:t>9</a:t>
             </a:fld>
-            <a:endParaRPr lang="de-DE"/>
+            <a:endParaRPr lang="en-US" dirty="0"/>
           </a:p>
         </p:txBody>
       </p:sp>
     </p:spTree>
     <p:extLst>
       <p:ext uri="{BB962C8B-B14F-4D97-AF65-F5344CB8AC3E}">
-        <p14:creationId xmlns:p14="http://schemas.microsoft.com/office/powerpoint/2010/main" xmlns="" val="3860513045"/>
+        <p14:creationId xmlns="" xmlns:p14="http://schemas.microsoft.com/office/powerpoint/2010/main" val="2934279750"/>
       </p:ext>
     </p:extLst>
   </p:cSld>
@@ -8343,7 +8343,7 @@
           <a:blip r:embed="rId13" cstate="print">
             <a:extLst>
               <a:ext uri="{28A0092B-C50C-407E-A947-70E740481C1C}">
-                <a14:useLocalDpi xmlns:a14="http://schemas.microsoft.com/office/drawing/2010/main" xmlns="" val="0"/>
+                <a14:useLocalDpi xmlns="" xmlns:a14="http://schemas.microsoft.com/office/drawing/2010/main" val="0"/>
               </a:ext>
             </a:extLst>
           </a:blip>
@@ -8844,7 +8844,7 @@
           <a:blip r:embed="rId3" cstate="print">
             <a:extLst>
               <a:ext uri="{28A0092B-C50C-407E-A947-70E740481C1C}">
-                <a14:useLocalDpi xmlns:a14="http://schemas.microsoft.com/office/drawing/2010/main" xmlns="" val="0"/>
+                <a14:useLocalDpi xmlns="" xmlns:a14="http://schemas.microsoft.com/office/drawing/2010/main" val="0"/>
               </a:ext>
             </a:extLst>
           </a:blip>
@@ -8874,7 +8874,7 @@
           <a:blip r:embed="rId4" cstate="print">
             <a:extLst>
               <a:ext uri="{28A0092B-C50C-407E-A947-70E740481C1C}">
-                <a14:useLocalDpi xmlns:a14="http://schemas.microsoft.com/office/drawing/2010/main" xmlns="" val="0"/>
+                <a14:useLocalDpi xmlns="" xmlns:a14="http://schemas.microsoft.com/office/drawing/2010/main" val="0"/>
               </a:ext>
             </a:extLst>
           </a:blip>
@@ -9350,7 +9350,7 @@
           <a:blip r:embed="rId3" cstate="print">
             <a:extLst>
               <a:ext uri="{28A0092B-C50C-407E-A947-70E740481C1C}">
-                <a14:useLocalDpi xmlns:a14="http://schemas.microsoft.com/office/drawing/2010/main" xmlns="" val="0"/>
+                <a14:useLocalDpi xmlns="" xmlns:a14="http://schemas.microsoft.com/office/drawing/2010/main" val="0"/>
               </a:ext>
             </a:extLst>
           </a:blip>
@@ -9371,7 +9371,7 @@
     </p:spTree>
     <p:extLst>
       <p:ext uri="{BB962C8B-B14F-4D97-AF65-F5344CB8AC3E}">
-        <p14:creationId xmlns:p14="http://schemas.microsoft.com/office/powerpoint/2010/main" xmlns="" val="3542583579"/>
+        <p14:creationId xmlns="" xmlns:p14="http://schemas.microsoft.com/office/powerpoint/2010/main" val="3542583579"/>
       </p:ext>
     </p:extLst>
   </p:cSld>
@@ -9913,7 +9913,7 @@
     </p:spTree>
     <p:extLst>
       <p:ext uri="{BB962C8B-B14F-4D97-AF65-F5344CB8AC3E}">
-        <p14:creationId xmlns:p14="http://schemas.microsoft.com/office/powerpoint/2010/main" xmlns="" val="351671181"/>
+        <p14:creationId xmlns="" xmlns:p14="http://schemas.microsoft.com/office/powerpoint/2010/main" val="351671181"/>
       </p:ext>
     </p:extLst>
   </p:cSld>
@@ -10978,7 +10978,7 @@
     </p:spTree>
     <p:extLst>
       <p:ext uri="{BB962C8B-B14F-4D97-AF65-F5344CB8AC3E}">
-        <p14:creationId xmlns:p14="http://schemas.microsoft.com/office/powerpoint/2010/main" xmlns="" val="39477268"/>
+        <p14:creationId xmlns="" xmlns:p14="http://schemas.microsoft.com/office/powerpoint/2010/main" val="39477268"/>
       </p:ext>
     </p:extLst>
   </p:cSld>
@@ -12467,7 +12467,7 @@
           <a:blip r:embed="rId3" cstate="print">
             <a:extLst>
               <a:ext uri="{28A0092B-C50C-407E-A947-70E740481C1C}">
-                <a14:useLocalDpi xmlns:a14="http://schemas.microsoft.com/office/drawing/2010/main" xmlns="" val="0"/>
+                <a14:useLocalDpi xmlns="" xmlns:a14="http://schemas.microsoft.com/office/drawing/2010/main" val="0"/>
               </a:ext>
             </a:extLst>
           </a:blip>
@@ -12834,7 +12834,7 @@
     </p:spTree>
     <p:extLst>
       <p:ext uri="{BB962C8B-B14F-4D97-AF65-F5344CB8AC3E}">
-        <p14:creationId xmlns:p14="http://schemas.microsoft.com/office/powerpoint/2010/main" xmlns="" val="141785747"/>
+        <p14:creationId xmlns="" xmlns:p14="http://schemas.microsoft.com/office/powerpoint/2010/main" val="141785747"/>
       </p:ext>
     </p:extLst>
   </p:cSld>
@@ -12902,6 +12902,101 @@
       </p:sp>
       <p:sp>
         <p:nvSpPr>
+          <p:cNvPr id="7" name="Datumsplatzhalter 6"/>
+          <p:cNvSpPr>
+            <a:spLocks noGrp="1"/>
+          </p:cNvSpPr>
+          <p:nvPr>
+            <p:ph type="dt" sz="half" idx="10"/>
+          </p:nvPr>
+        </p:nvSpPr>
+        <p:spPr/>
+        <p:txBody>
+          <a:bodyPr/>
+          <a:lstStyle/>
+          <a:p>
+            <a:r>
+              <a:rPr lang="de-DE" smtClean="0"/>
+              <a:t>21.04.2012</a:t>
+            </a:r>
+            <a:endParaRPr lang="en-US"/>
+          </a:p>
+        </p:txBody>
+      </p:sp>
+      <p:sp>
+        <p:nvSpPr>
+          <p:cNvPr id="8" name="Fußzeilenplatzhalter 7"/>
+          <p:cNvSpPr>
+            <a:spLocks noGrp="1"/>
+          </p:cNvSpPr>
+          <p:nvPr>
+            <p:ph type="ftr" sz="quarter" idx="11"/>
+          </p:nvPr>
+        </p:nvSpPr>
+        <p:spPr/>
+        <p:txBody>
+          <a:bodyPr/>
+          <a:lstStyle/>
+          <a:p>
+            <a:r>
+              <a:rPr lang="de-DE" smtClean="0"/>
+              <a:t>FST Projekt "Eventalizer" (SS 2012) Team 5</a:t>
+            </a:r>
+            <a:endParaRPr lang="de-DE" dirty="0"/>
+          </a:p>
+        </p:txBody>
+      </p:sp>
+      <p:sp>
+        <p:nvSpPr>
+          <p:cNvPr id="9" name="Foliennummernplatzhalter 8"/>
+          <p:cNvSpPr>
+            <a:spLocks noGrp="1"/>
+          </p:cNvSpPr>
+          <p:nvPr>
+            <p:ph type="sldNum" sz="quarter" idx="12"/>
+          </p:nvPr>
+        </p:nvSpPr>
+        <p:spPr/>
+        <p:txBody>
+          <a:bodyPr/>
+          <a:lstStyle/>
+          <a:p>
+            <a:fld id="{990B41CA-569D-40E7-8E58-026C0338B2C8}" type="slidenum">
+              <a:rPr lang="en-US" smtClean="0"/>
+              <a:pPr/>
+              <a:t>19</a:t>
+            </a:fld>
+            <a:endParaRPr lang="en-US"/>
+          </a:p>
+        </p:txBody>
+      </p:sp>
+      <p:pic>
+        <p:nvPicPr>
+          <p:cNvPr id="11" name="Picture 2" descr="C:\Users\MSGxxxxx\Desktop\Studium FSW\Eventalizer\Dokumente\UML Diagramme\Sequenz-Diagramm oAuth.png"/>
+          <p:cNvPicPr>
+            <a:picLocks noChangeAspect="1" noChangeArrowheads="1"/>
+          </p:cNvPicPr>
+          <p:nvPr/>
+        </p:nvPicPr>
+        <p:blipFill>
+          <a:blip r:embed="rId3" cstate="print"/>
+          <a:stretch>
+            <a:fillRect/>
+          </a:stretch>
+        </p:blipFill>
+        <p:spPr bwMode="auto">
+          <a:xfrm>
+            <a:off x="1187624" y="1791483"/>
+            <a:ext cx="7704856" cy="4707146"/>
+          </a:xfrm>
+          <a:prstGeom prst="rect">
+            <a:avLst/>
+          </a:prstGeom>
+          <a:noFill/>
+        </p:spPr>
+      </p:pic>
+      <p:sp>
+        <p:nvSpPr>
           <p:cNvPr id="10" name="Inhaltsplatzhalter 9"/>
           <p:cNvSpPr>
             <a:spLocks noGrp="1"/>
@@ -12917,90 +13012,13 @@
           <a:p>
             <a:r>
               <a:rPr lang="de-DE" dirty="0" smtClean="0"/>
-              <a:t>Für den Login</a:t>
-            </a:r>
-          </a:p>
-          <a:p>
-            <a:pPr lvl="1"/>
+              <a:t>Für den </a:t>
+            </a:r>
             <a:r>
               <a:rPr lang="de-DE" dirty="0" smtClean="0"/>
-              <a:t>Durchgriff auf </a:t>
-            </a:r>
-            <a:r>
-              <a:rPr lang="de-DE" dirty="0" err="1" smtClean="0"/>
-              <a:t>Twitter</a:t>
+              <a:t>Login</a:t>
             </a:r>
             <a:endParaRPr lang="de-DE" dirty="0"/>
-          </a:p>
-        </p:txBody>
-      </p:sp>
-      <p:sp>
-        <p:nvSpPr>
-          <p:cNvPr id="7" name="Datumsplatzhalter 6"/>
-          <p:cNvSpPr>
-            <a:spLocks noGrp="1"/>
-          </p:cNvSpPr>
-          <p:nvPr>
-            <p:ph type="dt" sz="half" idx="10"/>
-          </p:nvPr>
-        </p:nvSpPr>
-        <p:spPr/>
-        <p:txBody>
-          <a:bodyPr/>
-          <a:lstStyle/>
-          <a:p>
-            <a:r>
-              <a:rPr lang="de-DE" smtClean="0"/>
-              <a:t>21.04.2012</a:t>
-            </a:r>
-            <a:endParaRPr lang="en-US"/>
-          </a:p>
-        </p:txBody>
-      </p:sp>
-      <p:sp>
-        <p:nvSpPr>
-          <p:cNvPr id="8" name="Fußzeilenplatzhalter 7"/>
-          <p:cNvSpPr>
-            <a:spLocks noGrp="1"/>
-          </p:cNvSpPr>
-          <p:nvPr>
-            <p:ph type="ftr" sz="quarter" idx="11"/>
-          </p:nvPr>
-        </p:nvSpPr>
-        <p:spPr/>
-        <p:txBody>
-          <a:bodyPr/>
-          <a:lstStyle/>
-          <a:p>
-            <a:r>
-              <a:rPr lang="de-DE" smtClean="0"/>
-              <a:t>FST Projekt "Eventalizer" (SS 2012) Team 5</a:t>
-            </a:r>
-            <a:endParaRPr lang="de-DE" dirty="0"/>
-          </a:p>
-        </p:txBody>
-      </p:sp>
-      <p:sp>
-        <p:nvSpPr>
-          <p:cNvPr id="9" name="Foliennummernplatzhalter 8"/>
-          <p:cNvSpPr>
-            <a:spLocks noGrp="1"/>
-          </p:cNvSpPr>
-          <p:nvPr>
-            <p:ph type="sldNum" sz="quarter" idx="12"/>
-          </p:nvPr>
-        </p:nvSpPr>
-        <p:spPr/>
-        <p:txBody>
-          <a:bodyPr/>
-          <a:lstStyle/>
-          <a:p>
-            <a:fld id="{990B41CA-569D-40E7-8E58-026C0338B2C8}" type="slidenum">
-              <a:rPr lang="en-US" smtClean="0"/>
-              <a:pPr/>
-              <a:t>19</a:t>
-            </a:fld>
-            <a:endParaRPr lang="en-US"/>
           </a:p>
         </p:txBody>
       </p:sp>
@@ -13281,7 +13299,7 @@
     </p:spTree>
     <p:extLst>
       <p:ext uri="{BB962C8B-B14F-4D97-AF65-F5344CB8AC3E}">
-        <p14:creationId xmlns:p14="http://schemas.microsoft.com/office/powerpoint/2010/main" xmlns="" val="3630298673"/>
+        <p14:creationId xmlns="" xmlns:p14="http://schemas.microsoft.com/office/powerpoint/2010/main" val="3630298673"/>
       </p:ext>
     </p:extLst>
   </p:cSld>
@@ -13448,7 +13466,7 @@
     </p:spTree>
     <p:extLst>
       <p:ext uri="{BB962C8B-B14F-4D97-AF65-F5344CB8AC3E}">
-        <p14:creationId xmlns:p14="http://schemas.microsoft.com/office/powerpoint/2010/main" xmlns="" val="2634211947"/>
+        <p14:creationId xmlns="" xmlns:p14="http://schemas.microsoft.com/office/powerpoint/2010/main" val="2634211947"/>
       </p:ext>
     </p:extLst>
   </p:cSld>
@@ -15918,7 +15936,7 @@
           <a:blip r:embed="rId3" cstate="print">
             <a:extLst>
               <a:ext uri="{28A0092B-C50C-407E-A947-70E740481C1C}">
-                <a14:useLocalDpi xmlns:a14="http://schemas.microsoft.com/office/drawing/2010/main" xmlns="" val="0"/>
+                <a14:useLocalDpi xmlns="" xmlns:a14="http://schemas.microsoft.com/office/drawing/2010/main" val="0"/>
               </a:ext>
             </a:extLst>
           </a:blip>
@@ -15937,7 +15955,7 @@
           </a:prstGeom>
           <a:extLst>
             <a:ext uri="{909E8E84-426E-40DD-AFC4-6F175D3DCCD1}">
-              <a14:hiddenFill xmlns:a14="http://schemas.microsoft.com/office/drawing/2010/main" xmlns="">
+              <a14:hiddenFill xmlns="" xmlns:a14="http://schemas.microsoft.com/office/drawing/2010/main">
                 <a:solidFill>
                   <a:srgbClr val="FFFFFF"/>
                 </a:solidFill>
@@ -16663,7 +16681,7 @@
     </p:spTree>
     <p:extLst>
       <p:ext uri="{BB962C8B-B14F-4D97-AF65-F5344CB8AC3E}">
-        <p14:creationId xmlns:p14="http://schemas.microsoft.com/office/powerpoint/2010/main" xmlns="" val="3243626544"/>
+        <p14:creationId xmlns="" xmlns:p14="http://schemas.microsoft.com/office/powerpoint/2010/main" val="3243626544"/>
       </p:ext>
     </p:extLst>
   </p:cSld>
@@ -18040,7 +18058,7 @@
           <a:blip r:embed="rId7" cstate="print">
             <a:extLst>
               <a:ext uri="{28A0092B-C50C-407E-A947-70E740481C1C}">
-                <a14:useLocalDpi xmlns:a14="http://schemas.microsoft.com/office/drawing/2010/main" xmlns="" val="0"/>
+                <a14:useLocalDpi xmlns="" xmlns:a14="http://schemas.microsoft.com/office/drawing/2010/main" val="0"/>
               </a:ext>
             </a:extLst>
           </a:blip>
@@ -18059,14 +18077,14 @@
           </a:prstGeom>
           <a:extLst>
             <a:ext uri="{909E8E84-426E-40DD-AFC4-6F175D3DCCD1}">
-              <a14:hiddenFill xmlns:a14="http://schemas.microsoft.com/office/drawing/2010/main" xmlns="">
+              <a14:hiddenFill xmlns="" xmlns:a14="http://schemas.microsoft.com/office/drawing/2010/main">
                 <a:solidFill>
                   <a:schemeClr val="accent1"/>
                 </a:solidFill>
               </a14:hiddenFill>
             </a:ext>
             <a:ext uri="{91240B29-F687-4F45-9708-019B960494DF}">
-              <a14:hiddenLine xmlns:a14="http://schemas.microsoft.com/office/drawing/2010/main" xmlns="" w="9525">
+              <a14:hiddenLine xmlns="" xmlns:a14="http://schemas.microsoft.com/office/drawing/2010/main" w="9525">
                 <a:solidFill>
                   <a:schemeClr val="tx1"/>
                 </a:solidFill>
@@ -18076,7 +18094,7 @@
               </a14:hiddenLine>
             </a:ext>
             <a:ext uri="{AF507438-7753-43E0-B8FC-AC1667EBCBE1}">
-              <a14:hiddenEffects xmlns:a14="http://schemas.microsoft.com/office/drawing/2010/main" xmlns="">
+              <a14:hiddenEffects xmlns="" xmlns:a14="http://schemas.microsoft.com/office/drawing/2010/main">
                 <a:effectLst>
                   <a:outerShdw dist="35921" dir="2700000" algn="ctr" rotWithShape="0">
                     <a:schemeClr val="bg2"/>
@@ -18090,7 +18108,7 @@
     </p:spTree>
     <p:extLst>
       <p:ext uri="{BB962C8B-B14F-4D97-AF65-F5344CB8AC3E}">
-        <p14:creationId xmlns:p14="http://schemas.microsoft.com/office/powerpoint/2010/main" xmlns="" val="3243626544"/>
+        <p14:creationId xmlns="" xmlns:p14="http://schemas.microsoft.com/office/powerpoint/2010/main" val="3243626544"/>
       </p:ext>
     </p:extLst>
   </p:cSld>
@@ -19103,7 +19121,7 @@
     </p:spTree>
     <p:extLst>
       <p:ext uri="{BB962C8B-B14F-4D97-AF65-F5344CB8AC3E}">
-        <p14:creationId xmlns:p14="http://schemas.microsoft.com/office/powerpoint/2010/main" xmlns="" val="3243626544"/>
+        <p14:creationId xmlns="" xmlns:p14="http://schemas.microsoft.com/office/powerpoint/2010/main" val="3243626544"/>
       </p:ext>
     </p:extLst>
   </p:cSld>
@@ -19378,7 +19396,7 @@
           <a:blip r:embed="rId3" cstate="print">
             <a:extLst>
               <a:ext uri="{28A0092B-C50C-407E-A947-70E740481C1C}">
-                <a14:useLocalDpi xmlns:a14="http://schemas.microsoft.com/office/drawing/2010/main" xmlns="" val="0"/>
+                <a14:useLocalDpi xmlns="" xmlns:a14="http://schemas.microsoft.com/office/drawing/2010/main" val="0"/>
               </a:ext>
             </a:extLst>
           </a:blip>
@@ -19607,7 +19625,7 @@
           <a:blip r:embed="rId4" cstate="print">
             <a:extLst>
               <a:ext uri="{28A0092B-C50C-407E-A947-70E740481C1C}">
-                <a14:useLocalDpi xmlns:a14="http://schemas.microsoft.com/office/drawing/2010/main" xmlns="" val="0"/>
+                <a14:useLocalDpi xmlns="" xmlns:a14="http://schemas.microsoft.com/office/drawing/2010/main" val="0"/>
               </a:ext>
             </a:extLst>
           </a:blip>
@@ -19671,7 +19689,7 @@
           <a:blip r:embed="rId5" cstate="print">
             <a:extLst>
               <a:ext uri="{28A0092B-C50C-407E-A947-70E740481C1C}">
-                <a14:useLocalDpi xmlns:a14="http://schemas.microsoft.com/office/drawing/2010/main" xmlns="" val="0"/>
+                <a14:useLocalDpi xmlns="" xmlns:a14="http://schemas.microsoft.com/office/drawing/2010/main" val="0"/>
               </a:ext>
             </a:extLst>
           </a:blip>
@@ -19960,7 +19978,7 @@
           <a:blip r:embed="rId6" cstate="print">
             <a:extLst>
               <a:ext uri="{28A0092B-C50C-407E-A947-70E740481C1C}">
-                <a14:useLocalDpi xmlns:a14="http://schemas.microsoft.com/office/drawing/2010/main" xmlns="" val="0"/>
+                <a14:useLocalDpi xmlns="" xmlns:a14="http://schemas.microsoft.com/office/drawing/2010/main" val="0"/>
               </a:ext>
             </a:extLst>
           </a:blip>
@@ -21126,7 +21144,7 @@
     </p:spTree>
     <p:extLst>
       <p:ext uri="{BB962C8B-B14F-4D97-AF65-F5344CB8AC3E}">
-        <p14:creationId xmlns:p14="http://schemas.microsoft.com/office/powerpoint/2010/main" xmlns="" val="2653926061"/>
+        <p14:creationId xmlns="" xmlns:p14="http://schemas.microsoft.com/office/powerpoint/2010/main" val="2653926061"/>
       </p:ext>
     </p:extLst>
   </p:cSld>
@@ -22659,7 +22677,7 @@
           <a:blip r:embed="rId2" cstate="print">
             <a:extLst>
               <a:ext uri="{28A0092B-C50C-407E-A947-70E740481C1C}">
-                <a14:useLocalDpi xmlns:a14="http://schemas.microsoft.com/office/drawing/2010/main" xmlns="" val="0"/>
+                <a14:useLocalDpi xmlns="" xmlns:a14="http://schemas.microsoft.com/office/drawing/2010/main" val="0"/>
               </a:ext>
             </a:extLst>
           </a:blip>
@@ -22714,7 +22732,7 @@
     </p:spTree>
     <p:extLst>
       <p:ext uri="{BB962C8B-B14F-4D97-AF65-F5344CB8AC3E}">
-        <p14:creationId xmlns:p14="http://schemas.microsoft.com/office/powerpoint/2010/main" xmlns="" val="3309636493"/>
+        <p14:creationId xmlns="" xmlns:p14="http://schemas.microsoft.com/office/powerpoint/2010/main" val="3309636493"/>
       </p:ext>
     </p:extLst>
   </p:cSld>
@@ -23132,7 +23150,7 @@
     </p:spTree>
     <p:extLst>
       <p:ext uri="{BB962C8B-B14F-4D97-AF65-F5344CB8AC3E}">
-        <p14:creationId xmlns:p14="http://schemas.microsoft.com/office/powerpoint/2010/main" xmlns="" val="1012322072"/>
+        <p14:creationId xmlns="" xmlns:p14="http://schemas.microsoft.com/office/powerpoint/2010/main" val="1012322072"/>
       </p:ext>
     </p:extLst>
   </p:cSld>
@@ -23351,7 +23369,7 @@
     </p:spTree>
     <p:extLst>
       <p:ext uri="{BB962C8B-B14F-4D97-AF65-F5344CB8AC3E}">
-        <p14:creationId xmlns:p14="http://schemas.microsoft.com/office/powerpoint/2010/main" xmlns="" val="1012322072"/>
+        <p14:creationId xmlns="" xmlns:p14="http://schemas.microsoft.com/office/powerpoint/2010/main" val="1012322072"/>
       </p:ext>
     </p:extLst>
   </p:cSld>
@@ -23743,7 +23761,7 @@
           <a:blip r:embed="rId2" cstate="print">
             <a:extLst>
               <a:ext uri="{BEBA8EAE-BF5A-486C-A8C5-ECC9F3942E4B}">
-                <a14:imgProps xmlns:a14="http://schemas.microsoft.com/office/drawing/2010/main" xmlns="">
+                <a14:imgProps xmlns="" xmlns:a14="http://schemas.microsoft.com/office/drawing/2010/main">
                   <a14:imgLayer r:embed="rId3">
                     <a14:imgEffect>
                       <a14:backgroundRemoval t="6057" b="22942" l="7000" r="29162"/>
@@ -23752,7 +23770,7 @@
                 </a14:imgProps>
               </a:ext>
               <a:ext uri="{28A0092B-C50C-407E-A947-70E740481C1C}">
-                <a14:useLocalDpi xmlns:a14="http://schemas.microsoft.com/office/drawing/2010/main" xmlns="" val="0"/>
+                <a14:useLocalDpi xmlns="" xmlns:a14="http://schemas.microsoft.com/office/drawing/2010/main" val="0"/>
               </a:ext>
             </a:extLst>
           </a:blip>
@@ -23770,7 +23788,7 @@
           <a:noFill/>
           <a:extLst>
             <a:ext uri="{909E8E84-426E-40DD-AFC4-6F175D3DCCD1}">
-              <a14:hiddenFill xmlns:a14="http://schemas.microsoft.com/office/drawing/2010/main" xmlns="">
+              <a14:hiddenFill xmlns="" xmlns:a14="http://schemas.microsoft.com/office/drawing/2010/main">
                 <a:solidFill>
                   <a:srgbClr val="FFFFFF"/>
                 </a:solidFill>
@@ -23791,7 +23809,7 @@
           <a:blip r:embed="rId2" cstate="print">
             <a:extLst>
               <a:ext uri="{BEBA8EAE-BF5A-486C-A8C5-ECC9F3942E4B}">
-                <a14:imgProps xmlns:a14="http://schemas.microsoft.com/office/drawing/2010/main" xmlns="">
+                <a14:imgProps xmlns="" xmlns:a14="http://schemas.microsoft.com/office/drawing/2010/main">
                   <a14:imgLayer r:embed="rId3">
                     <a14:imgEffect>
                       <a14:backgroundRemoval t="6057" b="22942" l="7000" r="29162"/>
@@ -23800,7 +23818,7 @@
                 </a14:imgProps>
               </a:ext>
               <a:ext uri="{28A0092B-C50C-407E-A947-70E740481C1C}">
-                <a14:useLocalDpi xmlns:a14="http://schemas.microsoft.com/office/drawing/2010/main" xmlns="" val="0"/>
+                <a14:useLocalDpi xmlns="" xmlns:a14="http://schemas.microsoft.com/office/drawing/2010/main" val="0"/>
               </a:ext>
             </a:extLst>
           </a:blip>
@@ -23818,7 +23836,7 @@
           <a:noFill/>
           <a:extLst>
             <a:ext uri="{909E8E84-426E-40DD-AFC4-6F175D3DCCD1}">
-              <a14:hiddenFill xmlns:a14="http://schemas.microsoft.com/office/drawing/2010/main" xmlns="">
+              <a14:hiddenFill xmlns="" xmlns:a14="http://schemas.microsoft.com/office/drawing/2010/main">
                 <a:solidFill>
                   <a:srgbClr val="FFFFFF"/>
                 </a:solidFill>
@@ -23868,7 +23886,7 @@
     </p:spTree>
     <p:extLst>
       <p:ext uri="{BB962C8B-B14F-4D97-AF65-F5344CB8AC3E}">
-        <p14:creationId xmlns:p14="http://schemas.microsoft.com/office/powerpoint/2010/main" xmlns="" val="2645794681"/>
+        <p14:creationId xmlns="" xmlns:p14="http://schemas.microsoft.com/office/powerpoint/2010/main" val="2645794681"/>
       </p:ext>
     </p:extLst>
   </p:cSld>
@@ -24267,7 +24285,7 @@
     </p:spTree>
     <p:extLst>
       <p:ext uri="{BB962C8B-B14F-4D97-AF65-F5344CB8AC3E}">
-        <p14:creationId xmlns:p14="http://schemas.microsoft.com/office/powerpoint/2010/main" xmlns="" val="2868797759"/>
+        <p14:creationId xmlns="" xmlns:p14="http://schemas.microsoft.com/office/powerpoint/2010/main" val="2868797759"/>
       </p:ext>
     </p:extLst>
   </p:cSld>
@@ -24500,7 +24518,7 @@
           <a:blip r:embed="rId3" cstate="print">
             <a:extLst>
               <a:ext uri="{28A0092B-C50C-407E-A947-70E740481C1C}">
-                <a14:useLocalDpi xmlns:a14="http://schemas.microsoft.com/office/drawing/2010/main" xmlns="" val="0"/>
+                <a14:useLocalDpi xmlns="" xmlns:a14="http://schemas.microsoft.com/office/drawing/2010/main" val="0"/>
               </a:ext>
             </a:extLst>
           </a:blip>
@@ -24532,7 +24550,7 @@
           </a:effectLst>
           <a:extLst>
             <a:ext uri="{91240B29-F687-4F45-9708-019B960494DF}">
-              <a14:hiddenLine xmlns:a14="http://schemas.microsoft.com/office/drawing/2010/main" xmlns="" w="9525">
+              <a14:hiddenLine xmlns="" xmlns:a14="http://schemas.microsoft.com/office/drawing/2010/main" w="9525">
                 <a:solidFill>
                   <a:schemeClr val="tx1"/>
                 </a:solidFill>
@@ -24547,7 +24565,7 @@
     </p:spTree>
     <p:extLst>
       <p:ext uri="{BB962C8B-B14F-4D97-AF65-F5344CB8AC3E}">
-        <p14:creationId xmlns:p14="http://schemas.microsoft.com/office/powerpoint/2010/main" xmlns="" val="313312729"/>
+        <p14:creationId xmlns="" xmlns:p14="http://schemas.microsoft.com/office/powerpoint/2010/main" val="313312729"/>
       </p:ext>
     </p:extLst>
   </p:cSld>
@@ -24779,7 +24797,7 @@
           <a:blip r:embed="rId3" cstate="print">
             <a:extLst>
               <a:ext uri="{28A0092B-C50C-407E-A947-70E740481C1C}">
-                <a14:useLocalDpi xmlns:a14="http://schemas.microsoft.com/office/drawing/2010/main" xmlns="" val="0"/>
+                <a14:useLocalDpi xmlns="" xmlns:a14="http://schemas.microsoft.com/office/drawing/2010/main" val="0"/>
               </a:ext>
             </a:extLst>
           </a:blip>
@@ -24813,7 +24831,7 @@
     </p:spTree>
     <p:extLst>
       <p:ext uri="{BB962C8B-B14F-4D97-AF65-F5344CB8AC3E}">
-        <p14:creationId xmlns:p14="http://schemas.microsoft.com/office/powerpoint/2010/main" xmlns="" val="1344880779"/>
+        <p14:creationId xmlns="" xmlns:p14="http://schemas.microsoft.com/office/powerpoint/2010/main" val="1344880779"/>
       </p:ext>
     </p:extLst>
   </p:cSld>
@@ -25081,7 +25099,7 @@
           <a:blip r:embed="rId3" cstate="print">
             <a:extLst>
               <a:ext uri="{28A0092B-C50C-407E-A947-70E740481C1C}">
-                <a14:useLocalDpi xmlns:a14="http://schemas.microsoft.com/office/drawing/2010/main" xmlns="" val="0"/>
+                <a14:useLocalDpi xmlns="" xmlns:a14="http://schemas.microsoft.com/office/drawing/2010/main" val="0"/>
               </a:ext>
             </a:extLst>
           </a:blip>
@@ -25101,7 +25119,7 @@
           <a:noFill/>
           <a:extLst>
             <a:ext uri="{909E8E84-426E-40DD-AFC4-6F175D3DCCD1}">
-              <a14:hiddenFill xmlns:a14="http://schemas.microsoft.com/office/drawing/2010/main" xmlns="">
+              <a14:hiddenFill xmlns="" xmlns:a14="http://schemas.microsoft.com/office/drawing/2010/main">
                 <a:solidFill>
                   <a:srgbClr val="FFFFFF"/>
                 </a:solidFill>
@@ -25113,7 +25131,7 @@
     </p:spTree>
     <p:extLst>
       <p:ext uri="{BB962C8B-B14F-4D97-AF65-F5344CB8AC3E}">
-        <p14:creationId xmlns:p14="http://schemas.microsoft.com/office/powerpoint/2010/main" xmlns="" val="3661383713"/>
+        <p14:creationId xmlns="" xmlns:p14="http://schemas.microsoft.com/office/powerpoint/2010/main" val="3661383713"/>
       </p:ext>
     </p:extLst>
   </p:cSld>
@@ -25216,7 +25234,7 @@
           <a:blip r:embed="rId3" cstate="print">
             <a:extLst>
               <a:ext uri="{28A0092B-C50C-407E-A947-70E740481C1C}">
-                <a14:useLocalDpi xmlns:a14="http://schemas.microsoft.com/office/drawing/2010/main" xmlns="" val="0"/>
+                <a14:useLocalDpi xmlns="" xmlns:a14="http://schemas.microsoft.com/office/drawing/2010/main" val="0"/>
               </a:ext>
             </a:extLst>
           </a:blip>
@@ -25246,7 +25264,7 @@
           <a:blip r:embed="rId4" cstate="print">
             <a:extLst>
               <a:ext uri="{28A0092B-C50C-407E-A947-70E740481C1C}">
-                <a14:useLocalDpi xmlns:a14="http://schemas.microsoft.com/office/drawing/2010/main" xmlns="" val="0"/>
+                <a14:useLocalDpi xmlns="" xmlns:a14="http://schemas.microsoft.com/office/drawing/2010/main" val="0"/>
               </a:ext>
             </a:extLst>
           </a:blip>
@@ -25267,7 +25285,7 @@
     </p:spTree>
     <p:extLst>
       <p:ext uri="{BB962C8B-B14F-4D97-AF65-F5344CB8AC3E}">
-        <p14:creationId xmlns:p14="http://schemas.microsoft.com/office/powerpoint/2010/main" xmlns="" val="2565098391"/>
+        <p14:creationId xmlns="" xmlns:p14="http://schemas.microsoft.com/office/powerpoint/2010/main" val="2565098391"/>
       </p:ext>
     </p:extLst>
   </p:cSld>
@@ -25707,7 +25725,7 @@
     </p:spTree>
     <p:extLst>
       <p:ext uri="{BB962C8B-B14F-4D97-AF65-F5344CB8AC3E}">
-        <p14:creationId xmlns:p14="http://schemas.microsoft.com/office/powerpoint/2010/main" xmlns="" val="3060759240"/>
+        <p14:creationId xmlns="" xmlns:p14="http://schemas.microsoft.com/office/powerpoint/2010/main" val="3060759240"/>
       </p:ext>
     </p:extLst>
   </p:cSld>
@@ -26447,7 +26465,7 @@
     </p:spTree>
     <p:extLst>
       <p:ext uri="{BB962C8B-B14F-4D97-AF65-F5344CB8AC3E}">
-        <p14:creationId xmlns:p14="http://schemas.microsoft.com/office/powerpoint/2010/main" xmlns="" val="351671181"/>
+        <p14:creationId xmlns="" xmlns:p14="http://schemas.microsoft.com/office/powerpoint/2010/main" val="351671181"/>
       </p:ext>
     </p:extLst>
   </p:cSld>
@@ -26975,7 +26993,7 @@
           <a:blip r:embed="rId3" cstate="print">
             <a:extLst>
               <a:ext uri="{28A0092B-C50C-407E-A947-70E740481C1C}">
-                <a14:useLocalDpi xmlns:a14="http://schemas.microsoft.com/office/drawing/2010/main" xmlns="" val="0"/>
+                <a14:useLocalDpi xmlns="" xmlns:a14="http://schemas.microsoft.com/office/drawing/2010/main" val="0"/>
               </a:ext>
             </a:extLst>
           </a:blip>
@@ -27282,7 +27300,7 @@
     </p:spTree>
     <p:extLst>
       <p:ext uri="{BB962C8B-B14F-4D97-AF65-F5344CB8AC3E}">
-        <p14:creationId xmlns:p14="http://schemas.microsoft.com/office/powerpoint/2010/main" xmlns="" val="2372600146"/>
+        <p14:creationId xmlns="" xmlns:p14="http://schemas.microsoft.com/office/powerpoint/2010/main" val="2372600146"/>
       </p:ext>
     </p:extLst>
   </p:cSld>
@@ -27708,104 +27726,6 @@
       </p:sp>
       <p:pic>
         <p:nvPicPr>
-          <p:cNvPr id="21" name="Picture 2"/>
-          <p:cNvPicPr>
-            <a:picLocks noChangeAspect="1" noChangeArrowheads="1"/>
-          </p:cNvPicPr>
-          <p:nvPr>
-            <p:custDataLst>
-              <p:tags r:id="rId1"/>
-            </p:custDataLst>
-          </p:nvPr>
-        </p:nvPicPr>
-        <p:blipFill>
-          <a:blip r:embed="rId5" cstate="print"/>
-          <a:srcRect/>
-          <a:stretch>
-            <a:fillRect/>
-          </a:stretch>
-        </p:blipFill>
-        <p:spPr bwMode="auto">
-          <a:xfrm>
-            <a:off x="8028384" y="3861048"/>
-            <a:ext cx="864096" cy="866418"/>
-          </a:xfrm>
-          <a:prstGeom prst="rect">
-            <a:avLst/>
-          </a:prstGeom>
-          <a:noFill/>
-          <a:ln w="9525">
-            <a:noFill/>
-            <a:miter lim="800000"/>
-            <a:headEnd/>
-            <a:tailEnd/>
-          </a:ln>
-        </p:spPr>
-      </p:pic>
-      <p:pic>
-        <p:nvPicPr>
-          <p:cNvPr id="25" name="Picture 2"/>
-          <p:cNvPicPr>
-            <a:picLocks noChangeAspect="1" noChangeArrowheads="1"/>
-          </p:cNvPicPr>
-          <p:nvPr>
-            <p:custDataLst>
-              <p:tags r:id="rId2"/>
-            </p:custDataLst>
-          </p:nvPr>
-        </p:nvPicPr>
-        <p:blipFill>
-          <a:blip r:embed="rId6" cstate="print"/>
-          <a:srcRect/>
-          <a:stretch>
-            <a:fillRect/>
-          </a:stretch>
-        </p:blipFill>
-        <p:spPr bwMode="auto">
-          <a:xfrm>
-            <a:off x="8028384" y="2780928"/>
-            <a:ext cx="875774" cy="864096"/>
-          </a:xfrm>
-          <a:prstGeom prst="rect">
-            <a:avLst/>
-          </a:prstGeom>
-          <a:noFill/>
-          <a:ln w="9525">
-            <a:noFill/>
-            <a:miter lim="800000"/>
-            <a:headEnd/>
-            <a:tailEnd/>
-          </a:ln>
-        </p:spPr>
-      </p:pic>
-      <p:pic>
-        <p:nvPicPr>
-          <p:cNvPr id="41988" name="Picture 4" descr="Datei:OpenID logo.svg"/>
-          <p:cNvPicPr>
-            <a:picLocks noChangeAspect="1" noChangeArrowheads="1"/>
-          </p:cNvPicPr>
-          <p:nvPr/>
-        </p:nvPicPr>
-        <p:blipFill>
-          <a:blip r:embed="rId7" cstate="print"/>
-          <a:srcRect l="35275"/>
-          <a:stretch>
-            <a:fillRect/>
-          </a:stretch>
-        </p:blipFill>
-        <p:spPr bwMode="auto">
-          <a:xfrm>
-            <a:off x="7596336" y="4725144"/>
-            <a:ext cx="1331640" cy="771529"/>
-          </a:xfrm>
-          <a:prstGeom prst="rect">
-            <a:avLst/>
-          </a:prstGeom>
-          <a:noFill/>
-        </p:spPr>
-      </p:pic>
-      <p:pic>
-        <p:nvPicPr>
           <p:cNvPr id="41992" name="Picture 8"/>
           <p:cNvPicPr>
             <a:picLocks noChangeAspect="1" noChangeArrowheads="1"/>
@@ -27813,7 +27733,7 @@
           <p:nvPr/>
         </p:nvPicPr>
         <p:blipFill>
-          <a:blip r:embed="rId8" cstate="print"/>
+          <a:blip r:embed="rId3" cstate="print"/>
           <a:srcRect l="2145" t="3139" r="3476" b="8956"/>
           <a:stretch>
             <a:fillRect/>
@@ -27859,43 +27779,6 @@
               <a:srgbClr val="969696"/>
             </a:contourClr>
           </a:sp3d>
-        </p:spPr>
-      </p:pic>
-      <p:pic>
-        <p:nvPicPr>
-          <p:cNvPr id="41986" name="Picture 2" descr="https://www.google.de/images/srpr/logo3w.png"/>
-          <p:cNvPicPr>
-            <a:picLocks noChangeAspect="1" noChangeArrowheads="1"/>
-          </p:cNvPicPr>
-          <p:nvPr/>
-        </p:nvPicPr>
-        <p:blipFill>
-          <a:blip r:embed="rId9" cstate="print">
-            <a:clrChange>
-              <a:clrFrom>
-                <a:srgbClr val="FFFFFF"/>
-              </a:clrFrom>
-              <a:clrTo>
-                <a:srgbClr val="FFFFFF">
-                  <a:alpha val="0"/>
-                </a:srgbClr>
-              </a:clrTo>
-            </a:clrChange>
-          </a:blip>
-          <a:srcRect/>
-          <a:stretch>
-            <a:fillRect/>
-          </a:stretch>
-        </p:blipFill>
-        <p:spPr bwMode="auto">
-          <a:xfrm>
-            <a:off x="7236296" y="2016334"/>
-            <a:ext cx="1683271" cy="581494"/>
-          </a:xfrm>
-          <a:prstGeom prst="rect">
-            <a:avLst/>
-          </a:prstGeom>
-          <a:noFill/>
         </p:spPr>
       </p:pic>
       <p:cxnSp>
@@ -28069,7 +27952,7 @@
     </p:spTree>
     <p:extLst>
       <p:ext uri="{BB962C8B-B14F-4D97-AF65-F5344CB8AC3E}">
-        <p14:creationId xmlns:p14="http://schemas.microsoft.com/office/powerpoint/2010/main" xmlns="" val="1976326652"/>
+        <p14:creationId xmlns="" xmlns:p14="http://schemas.microsoft.com/office/powerpoint/2010/main" val="1976326652"/>
       </p:ext>
     </p:extLst>
   </p:cSld>
@@ -28231,164 +28114,6 @@
                       </p:childTnLst>
                     </p:cTn>
                   </p:par>
-                  <p:par>
-                    <p:cTn id="15" fill="hold">
-                      <p:stCondLst>
-                        <p:cond delay="indefinite"/>
-                      </p:stCondLst>
-                      <p:childTnLst>
-                        <p:par>
-                          <p:cTn id="16" fill="hold">
-                            <p:stCondLst>
-                              <p:cond delay="0"/>
-                            </p:stCondLst>
-                            <p:childTnLst>
-                              <p:par>
-                                <p:cTn id="17" presetID="3" presetClass="entr" presetSubtype="10" fill="hold" nodeType="clickEffect">
-                                  <p:stCondLst>
-                                    <p:cond delay="0"/>
-                                  </p:stCondLst>
-                                  <p:childTnLst>
-                                    <p:set>
-                                      <p:cBhvr>
-                                        <p:cTn id="18" dur="1" fill="hold">
-                                          <p:stCondLst>
-                                            <p:cond delay="0"/>
-                                          </p:stCondLst>
-                                        </p:cTn>
-                                        <p:tgtEl>
-                                          <p:spTgt spid="41986"/>
-                                        </p:tgtEl>
-                                        <p:attrNameLst>
-                                          <p:attrName>style.visibility</p:attrName>
-                                        </p:attrNameLst>
-                                      </p:cBhvr>
-                                      <p:to>
-                                        <p:strVal val="visible"/>
-                                      </p:to>
-                                    </p:set>
-                                    <p:animEffect transition="in" filter="blinds(horizontal)">
-                                      <p:cBhvr>
-                                        <p:cTn id="19" dur="500"/>
-                                        <p:tgtEl>
-                                          <p:spTgt spid="41986"/>
-                                        </p:tgtEl>
-                                      </p:cBhvr>
-                                    </p:animEffect>
-                                  </p:childTnLst>
-                                </p:cTn>
-                              </p:par>
-                              <p:par>
-                                <p:cTn id="20" presetID="3" presetClass="entr" presetSubtype="10" fill="hold" nodeType="withEffect">
-                                  <p:stCondLst>
-                                    <p:cond delay="0"/>
-                                  </p:stCondLst>
-                                  <p:childTnLst>
-                                    <p:set>
-                                      <p:cBhvr>
-                                        <p:cTn id="21" dur="1" fill="hold">
-                                          <p:stCondLst>
-                                            <p:cond delay="0"/>
-                                          </p:stCondLst>
-                                        </p:cTn>
-                                        <p:tgtEl>
-                                          <p:spTgt spid="25"/>
-                                        </p:tgtEl>
-                                        <p:attrNameLst>
-                                          <p:attrName>style.visibility</p:attrName>
-                                        </p:attrNameLst>
-                                      </p:cBhvr>
-                                      <p:to>
-                                        <p:strVal val="visible"/>
-                                      </p:to>
-                                    </p:set>
-                                    <p:animEffect transition="in" filter="blinds(horizontal)">
-                                      <p:cBhvr>
-                                        <p:cTn id="22" dur="500"/>
-                                        <p:tgtEl>
-                                          <p:spTgt spid="25"/>
-                                        </p:tgtEl>
-                                      </p:cBhvr>
-                                    </p:animEffect>
-                                  </p:childTnLst>
-                                </p:cTn>
-                              </p:par>
-                              <p:par>
-                                <p:cTn id="23" presetID="3" presetClass="entr" presetSubtype="10" fill="hold" nodeType="withEffect">
-                                  <p:stCondLst>
-                                    <p:cond delay="0"/>
-                                  </p:stCondLst>
-                                  <p:childTnLst>
-                                    <p:set>
-                                      <p:cBhvr>
-                                        <p:cTn id="24" dur="1" fill="hold">
-                                          <p:stCondLst>
-                                            <p:cond delay="0"/>
-                                          </p:stCondLst>
-                                        </p:cTn>
-                                        <p:tgtEl>
-                                          <p:spTgt spid="21"/>
-                                        </p:tgtEl>
-                                        <p:attrNameLst>
-                                          <p:attrName>style.visibility</p:attrName>
-                                        </p:attrNameLst>
-                                      </p:cBhvr>
-                                      <p:to>
-                                        <p:strVal val="visible"/>
-                                      </p:to>
-                                    </p:set>
-                                    <p:animEffect transition="in" filter="blinds(horizontal)">
-                                      <p:cBhvr>
-                                        <p:cTn id="25" dur="500"/>
-                                        <p:tgtEl>
-                                          <p:spTgt spid="21"/>
-                                        </p:tgtEl>
-                                      </p:cBhvr>
-                                    </p:animEffect>
-                                  </p:childTnLst>
-                                </p:cTn>
-                              </p:par>
-                              <p:par>
-                                <p:cTn id="26" presetID="3" presetClass="entr" presetSubtype="10" fill="hold" nodeType="withEffect">
-                                  <p:stCondLst>
-                                    <p:cond delay="0"/>
-                                  </p:stCondLst>
-                                  <p:childTnLst>
-                                    <p:set>
-                                      <p:cBhvr>
-                                        <p:cTn id="27" dur="1" fill="hold">
-                                          <p:stCondLst>
-                                            <p:cond delay="0"/>
-                                          </p:stCondLst>
-                                        </p:cTn>
-                                        <p:tgtEl>
-                                          <p:spTgt spid="41988"/>
-                                        </p:tgtEl>
-                                        <p:attrNameLst>
-                                          <p:attrName>style.visibility</p:attrName>
-                                        </p:attrNameLst>
-                                      </p:cBhvr>
-                                      <p:to>
-                                        <p:strVal val="visible"/>
-                                      </p:to>
-                                    </p:set>
-                                    <p:animEffect transition="in" filter="blinds(horizontal)">
-                                      <p:cBhvr>
-                                        <p:cTn id="28" dur="500"/>
-                                        <p:tgtEl>
-                                          <p:spTgt spid="41988"/>
-                                        </p:tgtEl>
-                                      </p:cBhvr>
-                                    </p:animEffect>
-                                  </p:childTnLst>
-                                </p:cTn>
-                              </p:par>
-                            </p:childTnLst>
-                          </p:cTn>
-                        </p:par>
-                      </p:childTnLst>
-                    </p:cTn>
-                  </p:par>
                 </p:childTnLst>
               </p:cTn>
               <p:prevCondLst>
@@ -28431,6 +28156,1088 @@
           <a:chExt cx="0" cy="0"/>
         </a:xfrm>
       </p:grpSpPr>
+      <p:sp>
+        <p:nvSpPr>
+          <p:cNvPr id="2" name="Titel 1"/>
+          <p:cNvSpPr>
+            <a:spLocks noGrp="1"/>
+          </p:cNvSpPr>
+          <p:nvPr>
+            <p:ph type="title"/>
+          </p:nvPr>
+        </p:nvSpPr>
+        <p:spPr/>
+        <p:txBody>
+          <a:bodyPr>
+            <a:normAutofit fontScale="90000"/>
+          </a:bodyPr>
+          <a:lstStyle/>
+          <a:p>
+            <a:r>
+              <a:rPr lang="de-DE" dirty="0" smtClean="0"/>
+              <a:t>„Anmelden (Login)“ </a:t>
+            </a:r>
+            <a:br>
+              <a:rPr lang="de-DE" dirty="0" smtClean="0"/>
+            </a:br>
+            <a:r>
+              <a:rPr lang="de-DE" dirty="0" smtClean="0"/>
+              <a:t>Pflichtenheft</a:t>
+            </a:r>
+            <a:endParaRPr lang="de-DE" dirty="0"/>
+          </a:p>
+        </p:txBody>
+      </p:sp>
+      <p:sp>
+        <p:nvSpPr>
+          <p:cNvPr id="11" name="Datumsplatzhalter 10"/>
+          <p:cNvSpPr>
+            <a:spLocks noGrp="1"/>
+          </p:cNvSpPr>
+          <p:nvPr>
+            <p:ph type="dt" sz="half" idx="10"/>
+          </p:nvPr>
+        </p:nvSpPr>
+        <p:spPr/>
+        <p:txBody>
+          <a:bodyPr/>
+          <a:lstStyle/>
+          <a:p>
+            <a:r>
+              <a:rPr lang="de-DE" smtClean="0"/>
+              <a:t>21.04.2012</a:t>
+            </a:r>
+            <a:endParaRPr lang="de-DE" dirty="0"/>
+          </a:p>
+        </p:txBody>
+      </p:sp>
+      <p:sp>
+        <p:nvSpPr>
+          <p:cNvPr id="12" name="Foliennummernplatzhalter 11"/>
+          <p:cNvSpPr>
+            <a:spLocks noGrp="1"/>
+          </p:cNvSpPr>
+          <p:nvPr>
+            <p:ph type="sldNum" sz="quarter" idx="12"/>
+          </p:nvPr>
+        </p:nvSpPr>
+        <p:spPr/>
+        <p:txBody>
+          <a:bodyPr/>
+          <a:lstStyle/>
+          <a:p>
+            <a:fld id="{6C6AE60A-B69C-4790-82F7-3882EDF23186}" type="slidenum">
+              <a:rPr lang="de-DE" smtClean="0"/>
+              <a:pPr/>
+              <a:t>8</a:t>
+            </a:fld>
+            <a:endParaRPr lang="de-DE" dirty="0"/>
+          </a:p>
+        </p:txBody>
+      </p:sp>
+      <p:sp>
+        <p:nvSpPr>
+          <p:cNvPr id="13" name="Fußzeilenplatzhalter 12"/>
+          <p:cNvSpPr>
+            <a:spLocks noGrp="1"/>
+          </p:cNvSpPr>
+          <p:nvPr>
+            <p:ph type="ftr" sz="quarter" idx="11"/>
+          </p:nvPr>
+        </p:nvSpPr>
+        <p:spPr/>
+        <p:txBody>
+          <a:bodyPr/>
+          <a:lstStyle/>
+          <a:p>
+            <a:r>
+              <a:rPr lang="de-DE" smtClean="0"/>
+              <a:t>FST Projekt "Eventalizer" (SS 2012) Team 5</a:t>
+            </a:r>
+            <a:endParaRPr lang="de-DE" dirty="0"/>
+          </a:p>
+        </p:txBody>
+      </p:sp>
+      <p:sp>
+        <p:nvSpPr>
+          <p:cNvPr id="5" name="Inhaltsplatzhalter 4"/>
+          <p:cNvSpPr>
+            <a:spLocks noGrp="1"/>
+          </p:cNvSpPr>
+          <p:nvPr>
+            <p:ph idx="1"/>
+          </p:nvPr>
+        </p:nvSpPr>
+        <p:spPr/>
+        <p:txBody>
+          <a:bodyPr/>
+          <a:lstStyle/>
+          <a:p>
+            <a:pPr lvl="1"/>
+            <a:endParaRPr lang="de-DE" dirty="0"/>
+          </a:p>
+        </p:txBody>
+      </p:sp>
+      <p:pic>
+        <p:nvPicPr>
+          <p:cNvPr id="21" name="Picture 2"/>
+          <p:cNvPicPr>
+            <a:picLocks noChangeAspect="1" noChangeArrowheads="1"/>
+          </p:cNvPicPr>
+          <p:nvPr>
+            <p:custDataLst>
+              <p:tags r:id="rId1"/>
+            </p:custDataLst>
+          </p:nvPr>
+        </p:nvPicPr>
+        <p:blipFill>
+          <a:blip r:embed="rId5" cstate="print"/>
+          <a:srcRect/>
+          <a:stretch>
+            <a:fillRect/>
+          </a:stretch>
+        </p:blipFill>
+        <p:spPr bwMode="auto">
+          <a:xfrm>
+            <a:off x="2771800" y="5157192"/>
+            <a:ext cx="864096" cy="866418"/>
+          </a:xfrm>
+          <a:prstGeom prst="rect">
+            <a:avLst/>
+          </a:prstGeom>
+          <a:noFill/>
+          <a:ln w="9525">
+            <a:noFill/>
+            <a:miter lim="800000"/>
+            <a:headEnd/>
+            <a:tailEnd/>
+          </a:ln>
+        </p:spPr>
+      </p:pic>
+      <p:pic>
+        <p:nvPicPr>
+          <p:cNvPr id="25" name="Picture 2"/>
+          <p:cNvPicPr>
+            <a:picLocks noChangeAspect="1" noChangeArrowheads="1"/>
+          </p:cNvPicPr>
+          <p:nvPr>
+            <p:custDataLst>
+              <p:tags r:id="rId2"/>
+            </p:custDataLst>
+          </p:nvPr>
+        </p:nvPicPr>
+        <p:blipFill>
+          <a:blip r:embed="rId6" cstate="print"/>
+          <a:srcRect/>
+          <a:stretch>
+            <a:fillRect/>
+          </a:stretch>
+        </p:blipFill>
+        <p:spPr bwMode="auto">
+          <a:xfrm>
+            <a:off x="1403648" y="5157192"/>
+            <a:ext cx="875774" cy="864096"/>
+          </a:xfrm>
+          <a:prstGeom prst="rect">
+            <a:avLst/>
+          </a:prstGeom>
+          <a:noFill/>
+          <a:ln w="9525">
+            <a:noFill/>
+            <a:miter lim="800000"/>
+            <a:headEnd/>
+            <a:tailEnd/>
+          </a:ln>
+        </p:spPr>
+      </p:pic>
+      <p:pic>
+        <p:nvPicPr>
+          <p:cNvPr id="41986" name="Picture 2" descr="https://www.google.de/images/srpr/logo3w.png"/>
+          <p:cNvPicPr>
+            <a:picLocks noChangeAspect="1" noChangeArrowheads="1"/>
+          </p:cNvPicPr>
+          <p:nvPr/>
+        </p:nvPicPr>
+        <p:blipFill>
+          <a:blip r:embed="rId7" cstate="print">
+            <a:clrChange>
+              <a:clrFrom>
+                <a:srgbClr val="FFFFFF"/>
+              </a:clrFrom>
+              <a:clrTo>
+                <a:srgbClr val="FFFFFF">
+                  <a:alpha val="0"/>
+                </a:srgbClr>
+              </a:clrTo>
+            </a:clrChange>
+          </a:blip>
+          <a:srcRect/>
+          <a:stretch>
+            <a:fillRect/>
+          </a:stretch>
+        </p:blipFill>
+        <p:spPr bwMode="auto">
+          <a:xfrm>
+            <a:off x="3851920" y="5301208"/>
+            <a:ext cx="1683271" cy="581494"/>
+          </a:xfrm>
+          <a:prstGeom prst="rect">
+            <a:avLst/>
+          </a:prstGeom>
+          <a:noFill/>
+        </p:spPr>
+      </p:pic>
+      <p:pic>
+        <p:nvPicPr>
+          <p:cNvPr id="2050" name="Picture 2" descr="http://hueniverse.com/wp-content/uploads/2009/09/OAuth-Shine-300x298.png"/>
+          <p:cNvPicPr>
+            <a:picLocks noChangeAspect="1" noChangeArrowheads="1"/>
+          </p:cNvPicPr>
+          <p:nvPr/>
+        </p:nvPicPr>
+        <p:blipFill>
+          <a:blip r:embed="rId8" cstate="print"/>
+          <a:srcRect/>
+          <a:stretch>
+            <a:fillRect/>
+          </a:stretch>
+        </p:blipFill>
+        <p:spPr bwMode="auto">
+          <a:xfrm>
+            <a:off x="2627784" y="3212976"/>
+            <a:ext cx="1190201" cy="1182266"/>
+          </a:xfrm>
+          <a:prstGeom prst="rect">
+            <a:avLst/>
+          </a:prstGeom>
+          <a:noFill/>
+        </p:spPr>
+      </p:pic>
+      <p:pic>
+        <p:nvPicPr>
+          <p:cNvPr id="17" name="Grafik 16"/>
+          <p:cNvPicPr>
+            <a:picLocks noChangeAspect="1"/>
+          </p:cNvPicPr>
+          <p:nvPr/>
+        </p:nvPicPr>
+        <p:blipFill>
+          <a:blip r:embed="rId9" cstate="print">
+            <a:extLst>
+              <a:ext uri="{28A0092B-C50C-407E-A947-70E740481C1C}">
+                <a14:useLocalDpi xmlns="" xmlns:a14="http://schemas.microsoft.com/office/drawing/2010/main" val="0"/>
+              </a:ext>
+            </a:extLst>
+          </a:blip>
+          <a:stretch>
+            <a:fillRect/>
+          </a:stretch>
+        </p:blipFill>
+        <p:spPr>
+          <a:xfrm>
+            <a:off x="3851920" y="1844824"/>
+            <a:ext cx="1236003" cy="1000125"/>
+          </a:xfrm>
+          <a:prstGeom prst="rect">
+            <a:avLst/>
+          </a:prstGeom>
+        </p:spPr>
+      </p:pic>
+      <p:sp>
+        <p:nvSpPr>
+          <p:cNvPr id="2052" name="AutoShape 4" descr="data:image/jpeg;base64,/9j/4AAQSkZJRgABAQAAAQABAAD/2wCEAAkGBhIQDxISDxAPEBIQEA8SEhQQDxAPEBAPFBAVFBQQFRcXHCceFxkjGRQUHy8gIycpLCwsFR4xNTAqNSYrLCkBCQoKDgwOGg8PGikkHyQpKSwsLywpLCkpKSwpLCwpLCoqLCkpMCwqLSksLSkpKSksLCwsLCkpKikpLCksLCkpLP/AABEIAOEA4QMBIgACEQEDEQH/xAAbAAACAwEBAQAAAAAAAAAAAAAABAMFBgIBB//EAEIQAAIBAQMIBgcGBQMFAAAAAAABAgMEBREGEiExQVFxwTJhgZGx0RMzQ1JyssJCYoKSofAHIiM04RQW0hUkRGNz/8QAGwEBAAIDAQEAAAAAAAAAAAAAAAECAwQFBgf/xAAxEQACAgEDAgQFAwMFAAAAAAAAAQIDEQQFMRIhQVFhsRMyweHwIpGhFHHRBiM0gbL/2gAMAwEAAhEDEQA/APuIAAAAAAAAAAAAAAAAAAAAAAAAAAAAAAAAAAAAAAAAAAAAAAAAAAAAAAAAABDO0YPDD9SOrb81Y5rfDA5q9JkUwDn/AK9DbGfdHzPP9xUtuevw+TK23WbDTHtW7rKuoUyyTTrKOhtm1xhPkiaF9UHqqR7cV4ox8LPjperxOqhZEGzjeFJ6qtN/jj5k8Zp6mnweJ8+kK2y2xoxc5PDDVhobe5E8A+lyklpbS46BWre1GOurDslnP9D55ZbynXpQlNt6HgsW0lnPfrfWMRNd3eRlVfmbGplLRWpylwi+eBNC9lJJxWKfWYxDVitjpvfF61zXWc/Wz1Mq86eWGvRd/wBy8YR8TUO8Zbl+pxK8J9XcKwqKSxTxTBnjJ7nrc4lY/b2M6rj5DKt8ntXcjmVun736LyFWzqn/ADPBa/3pPT7Tu39QlVa/1/8Ar7mCyvp7oTvbKOvRdPMzJZ2fjnx2LN3NYazqhlp79HtjPk1zFMqaSiqWG+p9JSRPRo1zaUsq6L1qpHjFPwY1C/qD9phxjJcjDwOatox0LVte8N4Bv4XvQeqtS/PFeJLG2U3qqQfCcXzPnUCeCI6icH0JVFvXej3OW8wcETxHUMG2xArMn/VP438sSzLEAAAAAAAAlOacpYbHpI5ilqqONaTW/kieFZSWjtW4hMEVUrK1kWdjs3FnVFKpIE6iFag3VELdao0ouU3gl3t7kAK261xpQcpvQtS2t7kYy8bfKtPOlq+ytkUM3jbZVp50tCXRjsivMSdI1Zycuy4MscI1Fyf29Pg/nZZREblh/Qp8H8zLBRMWDJk6R0jxI9RAGbHbHTe+L1rmusuI1FJJp4pmfJrJbHTe+L1rmus4m5bar18Sv5vf7mSMsFzIjzmnitDR0qiksU8UziR4/wDVCXk1/BlK7KS0qapbGvSYr8ukp4k+VEsPRNb6n0lW7U2sNW/rPe7Vuf8AUQULfm9/uadleHlDNW0Y6Fq29Z5AXgMQO02YxiBPAggTwAGIE0SGBNEA0eT/AKp/G/liWZV5P+rfxv5YloXXBUAACQAAABQW71s+PILNReOdqXj/AIGalmzqsm9Wd36CSSKpEi9UUqjdUVqFiBSojO5Q3bOeE4tyUVpj7v3lzNJNEbgS4dSwUcsGAVnPf9Kam3XKsc+C4peKEZWeK6Uori0hGhs1bNRh4G7po4UYcH8zHPRhd1SnmRiqlNtJ6M+OOt7ByVApOlo2YXZSE8w8wGZUyOUTWlHBsxlkhZyySSI2YzIiSy2x03vi9a5rrLZVFJYp4plDI7s1sdN74vWua6zh7ltqvXxK/m9/uZIywQ5Vey41PpKOJdZTVFJUmnin6T6SliefpzGK8Gv8l2MU2MwFIDVKR6zbtyV3+3Z83v8Ac1pwx3QzAngQQJ4HbMQxAmiQwJM7Aw33wog7LHhIlJt4RpMn/Vv434ItCoybf9OXxv5UW5bS3q+mNqWMkSWHgAADYKgAAAJ1Nb4kUyWprfESvC2wowc5vBLvk9iXWG8AgvG2RpQc5vBLvb3LrMXXvqrOr6RPNw0Rj9lR3PficXpec7RPOloS6MVqivPrFoRNZ2dT7F2ulGtsNtjWjitDXSW5+RNVmoRcpPBL94cTOWGTjJOLwf70FzQl/qKqTWEaeGK2OptfYuZ0aY9XJoSnl9JLZ7FVtGl404bIp4Sa+814L9RxZOU4LUi1jUUI4Iq7feXWbEXOTxHsik5wrRU3ldVPB6EZ6d6VbLL+SWfBa6c23HD7r1xfDuLW3WxyM5eVJtM6tWm6liZoS1kc9jZXXedO1UvSUnoxwlF9KEtsZfvSSzgfM8n71lY7ZFt/0qrVOqtma3onxi3jwx3n1GrE42u0vwZYXD4Onpr+tCc0QyGaiF5nGkjpRZDIikSyIpFC5R5QW103S2xbqYr8mldZ5QqqSTi8UxfK32XGp9JU2C2um98XrXNdZzNbolauuHze5ZPBp4E8BWz1VJJxeKY1A8vLMX5NGQapSGYCdMahM9Lot4g4NXvDS58/v7mvOp57DClgdIhiSxPNbjuE9ZPL7RXC/PE2IQUUaXJv1cvj5IuCmya6Evi5IuT3O1f8Ov8AsadnzMAADpGMAAACrvG3QoxlOo8En2ye5dZgL2vSdonnS0JdGOyK8+scyotUp2qpGTxjTlmxWxLBPvKaRo22OTwbEI4WTklpkRJBk18mO3gsLKh7J+1LBva5Sfeyus9QSsNu9HOcH9mcl2Y6P0wPRaKvri0cOyzom2bK02/QU9eq5M4haM4mhTN6NarOHqtU2xb0IpbLPoLdwErbqMis7mhG15MNfdm1n027rQ6lnozeudGlJ8XBNnzq+njilrehdbPodkp+jpU4e5ThD8sUuRrbo04R/wCz0e2ybbO5i0yeTIJnlpnpYEMiKRLIikYjKZrK32XGp9JQRL/K32XGp9JQRAH7vtrpvfF61zXWaWz1VJJxeKZkoFxccZ4trobcdTfV1nG3PSwlB2rs1/P3LxfgX8CeBBAngeTkZSeBNFEMBmiZ9FpVqr1W5YX52XqROXSsmhycWEJfFyRcFPk90ZceRcH0mmqNUFCC7JHPby8gAAZSAAAAPmeUX93W/wDp9KKuRu8oLhVfGUMFVWp6lNe6+TMNWpuLcZJpptNPQ09xz7IOMjZhJNETPVI5kcORMGVmsoap1RG+qLTVeGrBKot2GqfJ9h16Qno2rYztaLUOqSkjg6ulvg7uy3JpaS7pWpYGZqXdg86g0vuN4L8L5M8VsqQ6UJr8La70d9yru7xZ5i6iafBp6lrRUXjb1hrK7/W1J9GE3wjIasNwTrPGtLMitcYtOb6t0SjUK+8mVq08pPCR5kzdbtFoVWS/pUZZ2nVOqtMY9mt9m829qsbazodq5ogsVGMIqEIqMYrBJakXVkicbV3fGl6eB67RadVQwZ3OIpl9e1z6HUprrlFfMvIoJHGsTTOxDgjkRSJZEUjEZDNZW+y41PpKCJf5W+y41PpKu77C6j3RWt7+pGOyyNcXKT7Amu6wuo9OiK1vf1I0lGCikksEtRBRgopJLBLUMwPJa3Vy1EvTwRlSwTwJ4EFMahAwafQ3arqda4/Mf3EpqPJJAmiyGKJYnNl1Ql5NfujJyaPJyWMZcV4F0UmTWqfFeBdn0zb7JW6aE5vLaOfNYk0AABvFAAAAEpa3xKPKC4lXWdDBVUtD1Ka918mXktb4kcyJRUlhkp47o+W1qbi2pJpptNPQ09xBJm7v+41XWdHCNRLQ9Skvdl5mEr03GTjJNNPBp60zSlBwZnT6kQTkRurgdVGLVGZITwYLK+oahbcBiN5NbSnlI4dU243mhPSpmpo21uK0/vElpWlp4plbdyxpRfU/Fj9KmJXkw0qRqLqqqosVrWtbv8GhstIw9iqSpyUovBrufUzb3TbY1o4rRJdKO1PyKKzq7G6odKLCCM/flya6lJdcor5l5GhPGJRUlhkp4PnkiKRpL9uTXUpLrlFfNHyKSy2N1Huitb39SOdfZHTxcrHhI2Ivq4M3f9hdR0tkU6mL39DQjyjBRSSWCWovMp4JKkksEvSfSUsTyeo1ktV+rheCMyWCaBPAggNUoltHoZ6qeOIrl/niVlPpJ6URmBBAnge0qqhTBQgsJGq228smUcTpIIEubicbddqWpXxK+0/f7+T/AHMtdnT2fBd5Nap8V4F4UeTS6fYXh0tsi46SuLXdIxWfMwAAOgUAAAArFXWfKL0NN4dZ1MQtXrJfETULTnaHrX6lUyQqlBf9yqus6OCqJaHskvdfmX9UUqktJrDCeD5laKbi3GSaaeDT1piszc39cyrLOjgqiWh7JL3X5mIr03FtSTTTwaetM05wcGZ01IVkiKSJ5IjkiuR0o0tzU/6EOD+ZlnTpilyR/wC3p8H8zLKKGScHsIjdktMqclKDwa7mtz6heJ2hkYNpdt5RrRxWiS6UdqfkNMw9mtMqclKDwa7mtz6jT0L4jOnnJYS1NPY+O1GSeqrqrc7HhIxOt57E9rtKguvZ5lLJcFwWBPUk28XpbIZHgNx3Getnl9orhfV+ptwgoIzmVXsuNT6SjiXmVK9VxqeESlpo29t0ctSkuF4v88Ss5dJNTQzAXgMQPbVVRqioQWEjVbz3YxAngQQJ4GUgYgTRIYE0QC7yd1z/AA8y7KTJ3XPhHmXZdcFQAAJAAAAFDXpuVSSW9jMKKitHa95KoJNva28TyZCQFqopVG6ohOunJrHyZIIKpRX5c6rLOjgqiWh7JL3X5l7VFKhDSawyU8HzqtTcW1JNNPBp60yGRs74uhVlisFUS0PZL7r8zH1qbi3GSaaeDT1pmnODizPGWTV3H/b0+D+dllErbj/t6fB/OyyiULEiOkcobsVjdR7orW+SMVtsKoOc3hIJZCx2N1Huitb5IuYwSSSWCR7CCisEsEgZ4fX66ern5RXC+r9TPGODiRHmtvBaWyRocslNJfe2l9u26etnjiK5f0XqVnNRRncpLMoKltb9Ji/y6DO1rPtXauZqMrfZcan0lDE+iU0Qpgq61hI0XJt5YlAYgdVbPtj2rmcwLNYJGIE8CCBPAAYgTRIYFjZLNtl2LmEsgsbgg1KeO1RfiXRVXV6yfww8ZFqZCoAAAAAAAIvz8TiZ2+b8RC22rZHtfJENgXt1p2R7XyKqoNVBWqUzksdQtGOh6/E4qC1Q6p2jHQ9fiWTICRVXxdKrLFYKoloexr3WWsiKRLSawwngQuim40YRkmmk009aeeywiXlK6FWs1NrBVFF4PY1nS/lZW2a7pOTUk45rwljrx3I5+olHTxc5vCRni+o6sNjdR7orW+SL2nBRSSWCRxSgopJLBIlR4PX6+eqn5RXC+r9TZjHAHjR7gSKGBbb9vnrJ4XaK5f0XqVnNRRwoYHOc08USSIpH0GmmFEFXWsJGm228sqMqKykqW/8AqYr8pSxHcq5Neia31PoK6z1lJde1GymVGoHlWz7Y9q5nsBiAaIFIE8DqrZ9se1cxmx2bbLsXMrgkYsdm2y7FzLCJBAniWSIHLq9ZP4IeMi1Km6vWT+CHjItiQAAAAAAAFLbLTpcVveL5CExi1dOXFi8zGyyIKgrVGqgrVIArUFZjVQVqEgko2jHQ9fidyEZHbtmC06Xs/wAlbLoVQc5vCQUW32NndlpULNT2txeC/G9Jy5tvF6WyuueTdCDe5/MywifPdz3Gess79orhfV+pu1wUUSI7SOYRbeC0tjEaebr1lNv2+esnhdorl/ReonNRQQhgDOjln0GmmFEFXWsJGm228s4kRSJZEUjMQZnK32XGp9JRUpNPFF7lb7LjU+koYgFrZqykuvahyBTUpNPFFvQlik2sC6eSBqAxAXgMQJIGIHVWvmrr/ekjcmlilixTOx0shskucnpYzqN7ocy8KLJ3pVOEOZehEAAASAAAAM9aunLixeYnlJlHRsdVqsquLeKzKbnoKSX8QrM+jTtb4UYrxmY8FjQVBWqUzy2hLo2a1v8ABTX1nP8AuGpPo2Kv+KcI+GIwwWNQVqEcKlqn0bJh8VXyiNUrktk9dOlHtnLyJwyBGoyCRo6GRdaXTnBcIvmyys2Q9NdOcpdyOBq9Dq9XPu0orhZ/nsuTNGcYoUuX1FPg/mZZU4tvBaWx2ncMIRUYOUUtS1o7pWOdPoqE+LcXzOUv9O3u39Ul057tc/tgyfHWCeyWZQW9/vQSVqOdxFJ3hOHSoVH8EoT8WiB5UUY+sVan8VCo/lTPY0UV0VqutYSNVtt5ZNJYazhkFTKexT/8mlF/fbp9jzsCCN+2aXRtVmfCvS/5F2gNyIpHKt1J9GrSfCpB+DPJVY+9HvRBJnMrfZcan0lDEt8s7fTh6LPqU4+s0OcU/s7NZQ2W9qL0pzqPYoUqkv1ww/UJAt7JZ9r7FzLGBXWa0VZ+rstZ/HmQXiy0s912uXsacPiqSl+iSLoqSwGIEtHJ20PXOjHhCT+ocp5OVPtVl2U0SBaBxXs22PauZaQuBrXWn+Wn5EquX/2T7oeRDWQKZO9KpwhzL0VsVgjSxwbblrbw5DRKAAAAAAAAVl5XBSryzqkU2iGnkpZ4+zj3FyAAhTuOjHVCPcTwsEFqiu4YAA4VFLUkdYHoAAAAAAAAAEc7PF64p9hIABX17joz1wj3FdaMiLNPXTj3I0IAGOq/wysj9nH8qFZ/wosr+xHuRuwAMRZf4XWaDxzF3I0NiyaoUl/LCPcWwAEcLPGOpJdhJgAAAAAAAAAAAAAAAAAAAAAAAAAAAAAAAAAAAAAAAAAAAAAAAAAAAAAAAAAAAAAAAAAAAAAAAAf/2Q=="/>
+          <p:cNvSpPr>
+            <a:spLocks noChangeAspect="1" noChangeArrowheads="1"/>
+          </p:cNvSpPr>
+          <p:nvPr/>
+        </p:nvSpPr>
+        <p:spPr bwMode="auto">
+          <a:xfrm>
+            <a:off x="155575" y="-144463"/>
+            <a:ext cx="304800" cy="304801"/>
+          </a:xfrm>
+          <a:prstGeom prst="rect">
+            <a:avLst/>
+          </a:prstGeom>
+          <a:noFill/>
+        </p:spPr>
+        <p:txBody>
+          <a:bodyPr vert="horz" wrap="square" lIns="91440" tIns="45720" rIns="91440" bIns="45720" numCol="1" anchor="t" anchorCtr="0" compatLnSpc="1">
+            <a:prstTxWarp prst="textNoShape">
+              <a:avLst/>
+            </a:prstTxWarp>
+          </a:bodyPr>
+          <a:lstStyle/>
+          <a:p>
+            <a:endParaRPr lang="de-DE"/>
+          </a:p>
+        </p:txBody>
+      </p:sp>
+      <p:sp>
+        <p:nvSpPr>
+          <p:cNvPr id="2054" name="AutoShape 6" descr="data:image/jpeg;base64,/9j/4AAQSkZJRgABAQAAAQABAAD/2wCEAAkGBhIQDxISDxAPEBIQEA8SEhQQDxAPEBAPFBAVFBQQFRcXHCceFxkjGRQUHy8gIycpLCwsFR4xNTAqNSYrLCkBCQoKDgwOGg8PGikkHyQpKSwsLywpLCkpKSwpLCwpLCoqLCkpMCwqLSksLSkpKSksLCwsLCkpKikpLCksLCkpLP/AABEIAOEA4QMBIgACEQEDEQH/xAAbAAACAwEBAQAAAAAAAAAAAAAABAMFBgIBB//EAEIQAAIBAQMIBgcGBQMFAAAAAAABAgMEBREGEiExQVFxwTJhgZGx0RMzQ1JyssJCYoKSofAHIiM04RQW0hUkRGNz/8QAGwEBAAIDAQEAAAAAAAAAAAAAAAECAwQFBgf/xAAxEQACAgEDAgQFAwMFAAAAAAAAAQIDEQQFMRIhQVFhsRMyweHwIpGhFHHRBiM0gbL/2gAMAwEAAhEDEQA/APuIAAAAAAAAAAAAAAAAAAAAAAAAAAAAAAAAAAAAAAAAAAAAAAAAAAAAAAAAABDO0YPDD9SOrb81Y5rfDA5q9JkUwDn/AK9DbGfdHzPP9xUtuevw+TK23WbDTHtW7rKuoUyyTTrKOhtm1xhPkiaF9UHqqR7cV4ox8LPjperxOqhZEGzjeFJ6qtN/jj5k8Zp6mnweJ8+kK2y2xoxc5PDDVhobe5E8A+lyklpbS46BWre1GOurDslnP9D55ZbynXpQlNt6HgsW0lnPfrfWMRNd3eRlVfmbGplLRWpylwi+eBNC9lJJxWKfWYxDVitjpvfF61zXWc/Wz1Mq86eWGvRd/wBy8YR8TUO8Zbl+pxK8J9XcKwqKSxTxTBnjJ7nrc4lY/b2M6rj5DKt8ntXcjmVun736LyFWzqn/ADPBa/3pPT7Tu39QlVa/1/8Ar7mCyvp7oTvbKOvRdPMzJZ2fjnx2LN3NYazqhlp79HtjPk1zFMqaSiqWG+p9JSRPRo1zaUsq6L1qpHjFPwY1C/qD9phxjJcjDwOatox0LVte8N4Bv4XvQeqtS/PFeJLG2U3qqQfCcXzPnUCeCI6icH0JVFvXej3OW8wcETxHUMG2xArMn/VP438sSzLEAAAAAAAAlOacpYbHpI5ilqqONaTW/kieFZSWjtW4hMEVUrK1kWdjs3FnVFKpIE6iFag3VELdao0ouU3gl3t7kAK261xpQcpvQtS2t7kYy8bfKtPOlq+ytkUM3jbZVp50tCXRjsivMSdI1Zycuy4MscI1Fyf29Pg/nZZREblh/Qp8H8zLBRMWDJk6R0jxI9RAGbHbHTe+L1rmusuI1FJJp4pmfJrJbHTe+L1rmus4m5bar18Sv5vf7mSMsFzIjzmnitDR0qiksU8UziR4/wDVCXk1/BlK7KS0qapbGvSYr8ukp4k+VEsPRNb6n0lW7U2sNW/rPe7Vuf8AUQULfm9/uadleHlDNW0Y6Fq29Z5AXgMQO02YxiBPAggTwAGIE0SGBNEA0eT/AKp/G/liWZV5P+rfxv5YloXXBUAACQAAABQW71s+PILNReOdqXj/AIGalmzqsm9Wd36CSSKpEi9UUqjdUVqFiBSojO5Q3bOeE4tyUVpj7v3lzNJNEbgS4dSwUcsGAVnPf9Kam3XKsc+C4peKEZWeK6Uori0hGhs1bNRh4G7po4UYcH8zHPRhd1SnmRiqlNtJ6M+OOt7ByVApOlo2YXZSE8w8wGZUyOUTWlHBsxlkhZyySSI2YzIiSy2x03vi9a5rrLZVFJYp4plDI7s1sdN74vWua6zh7ltqvXxK/m9/uZIywQ5Vey41PpKOJdZTVFJUmnin6T6SliefpzGK8Gv8l2MU2MwFIDVKR6zbtyV3+3Z83v8Ac1pwx3QzAngQQJ4HbMQxAmiQwJM7Aw33wog7LHhIlJt4RpMn/Vv434ItCoybf9OXxv5UW5bS3q+mNqWMkSWHgAADYKgAAAJ1Nb4kUyWprfESvC2wowc5vBLvk9iXWG8AgvG2RpQc5vBLvb3LrMXXvqrOr6RPNw0Rj9lR3PficXpec7RPOloS6MVqivPrFoRNZ2dT7F2ulGtsNtjWjitDXSW5+RNVmoRcpPBL94cTOWGTjJOLwf70FzQl/qKqTWEaeGK2OptfYuZ0aY9XJoSnl9JLZ7FVtGl404bIp4Sa+814L9RxZOU4LUi1jUUI4Iq7feXWbEXOTxHsik5wrRU3ldVPB6EZ6d6VbLL+SWfBa6c23HD7r1xfDuLW3WxyM5eVJtM6tWm6liZoS1kc9jZXXedO1UvSUnoxwlF9KEtsZfvSSzgfM8n71lY7ZFt/0qrVOqtma3onxi3jwx3n1GrE42u0vwZYXD4Onpr+tCc0QyGaiF5nGkjpRZDIikSyIpFC5R5QW103S2xbqYr8mldZ5QqqSTi8UxfK32XGp9JU2C2um98XrXNdZzNbolauuHze5ZPBp4E8BWz1VJJxeKY1A8vLMX5NGQapSGYCdMahM9Lot4g4NXvDS58/v7mvOp57DClgdIhiSxPNbjuE9ZPL7RXC/PE2IQUUaXJv1cvj5IuCmya6Evi5IuT3O1f8Ov8AsadnzMAADpGMAAACrvG3QoxlOo8En2ye5dZgL2vSdonnS0JdGOyK8+scyotUp2qpGTxjTlmxWxLBPvKaRo22OTwbEI4WTklpkRJBk18mO3gsLKh7J+1LBva5Sfeyus9QSsNu9HOcH9mcl2Y6P0wPRaKvri0cOyzom2bK02/QU9eq5M4haM4mhTN6NarOHqtU2xb0IpbLPoLdwErbqMis7mhG15MNfdm1n027rQ6lnozeudGlJ8XBNnzq+njilrehdbPodkp+jpU4e5ThD8sUuRrbo04R/wCz0e2ybbO5i0yeTIJnlpnpYEMiKRLIikYjKZrK32XGp9JQRL/K32XGp9JQRAH7vtrpvfF61zXWaWz1VJJxeKZkoFxccZ4trobcdTfV1nG3PSwlB2rs1/P3LxfgX8CeBBAngeTkZSeBNFEMBmiZ9FpVqr1W5YX52XqROXSsmhycWEJfFyRcFPk90ZceRcH0mmqNUFCC7JHPby8gAAZSAAAAPmeUX93W/wDp9KKuRu8oLhVfGUMFVWp6lNe6+TMNWpuLcZJpptNPQ09xz7IOMjZhJNETPVI5kcORMGVmsoap1RG+qLTVeGrBKot2GqfJ9h16Qno2rYztaLUOqSkjg6ulvg7uy3JpaS7pWpYGZqXdg86g0vuN4L8L5M8VsqQ6UJr8La70d9yru7xZ5i6iafBp6lrRUXjb1hrK7/W1J9GE3wjIasNwTrPGtLMitcYtOb6t0SjUK+8mVq08pPCR5kzdbtFoVWS/pUZZ2nVOqtMY9mt9m829qsbazodq5ogsVGMIqEIqMYrBJakXVkicbV3fGl6eB67RadVQwZ3OIpl9e1z6HUprrlFfMvIoJHGsTTOxDgjkRSJZEUjEZDNZW+y41PpKCJf5W+y41PpKu77C6j3RWt7+pGOyyNcXKT7Amu6wuo9OiK1vf1I0lGCikksEtRBRgopJLBLUMwPJa3Vy1EvTwRlSwTwJ4EFMahAwafQ3arqda4/Mf3EpqPJJAmiyGKJYnNl1Ql5NfujJyaPJyWMZcV4F0UmTWqfFeBdn0zb7JW6aE5vLaOfNYk0AABvFAAAAEpa3xKPKC4lXWdDBVUtD1Ka918mXktb4kcyJRUlhkp47o+W1qbi2pJpptNPQ09xBJm7v+41XWdHCNRLQ9Skvdl5mEr03GTjJNNPBp60zSlBwZnT6kQTkRurgdVGLVGZITwYLK+oahbcBiN5NbSnlI4dU243mhPSpmpo21uK0/vElpWlp4plbdyxpRfU/Fj9KmJXkw0qRqLqqqosVrWtbv8GhstIw9iqSpyUovBrufUzb3TbY1o4rRJdKO1PyKKzq7G6odKLCCM/flya6lJdcor5l5GhPGJRUlhkp4PnkiKRpL9uTXUpLrlFfNHyKSy2N1Huitb39SOdfZHTxcrHhI2Ivq4M3f9hdR0tkU6mL39DQjyjBRSSWCWovMp4JKkksEvSfSUsTyeo1ktV+rheCMyWCaBPAggNUoltHoZ6qeOIrl/niVlPpJ6URmBBAnge0qqhTBQgsJGq228smUcTpIIEubicbddqWpXxK+0/f7+T/AHMtdnT2fBd5Nap8V4F4UeTS6fYXh0tsi46SuLXdIxWfMwAAOgUAAAArFXWfKL0NN4dZ1MQtXrJfETULTnaHrX6lUyQqlBf9yqus6OCqJaHskvdfmX9UUqktJrDCeD5laKbi3GSaaeDT1piszc39cyrLOjgqiWh7JL3X5mIr03FtSTTTwaetM05wcGZ01IVkiKSJ5IjkiuR0o0tzU/6EOD+ZlnTpilyR/wC3p8H8zLKKGScHsIjdktMqclKDwa7mtz6heJ2hkYNpdt5RrRxWiS6UdqfkNMw9mtMqclKDwa7mtz6jT0L4jOnnJYS1NPY+O1GSeqrqrc7HhIxOt57E9rtKguvZ5lLJcFwWBPUk28XpbIZHgNx3Getnl9orhfV+ptwgoIzmVXsuNT6SjiXmVK9VxqeESlpo29t0ctSkuF4v88Ss5dJNTQzAXgMQPbVVRqioQWEjVbz3YxAngQQJ4GUgYgTRIYE0QC7yd1z/AA8y7KTJ3XPhHmXZdcFQAAJAAAAFDXpuVSSW9jMKKitHa95KoJNva28TyZCQFqopVG6ohOunJrHyZIIKpRX5c6rLOjgqiWh7JL3X5l7VFKhDSawyU8HzqtTcW1JNNPBp60yGRs74uhVlisFUS0PZL7r8zH1qbi3GSaaeDT1pmnODizPGWTV3H/b0+D+dllErbj/t6fB/OyyiULEiOkcobsVjdR7orW+SMVtsKoOc3hIJZCx2N1Huitb5IuYwSSSWCR7CCisEsEgZ4fX66ern5RXC+r9TPGODiRHmtvBaWyRocslNJfe2l9u26etnjiK5f0XqVnNRRncpLMoKltb9Ji/y6DO1rPtXauZqMrfZcan0lDE+iU0Qpgq61hI0XJt5YlAYgdVbPtj2rmcwLNYJGIE8CCBPAAYgTRIYFjZLNtl2LmEsgsbgg1KeO1RfiXRVXV6yfww8ZFqZCoAAAAAAAIvz8TiZ2+b8RC22rZHtfJENgXt1p2R7XyKqoNVBWqUzksdQtGOh6/E4qC1Q6p2jHQ9fiWTICRVXxdKrLFYKoloexr3WWsiKRLSawwngQuim40YRkmmk009aeeywiXlK6FWs1NrBVFF4PY1nS/lZW2a7pOTUk45rwljrx3I5+olHTxc5vCRni+o6sNjdR7orW+SL2nBRSSWCRxSgopJLBIlR4PX6+eqn5RXC+r9TZjHAHjR7gSKGBbb9vnrJ4XaK5f0XqVnNRRwoYHOc08USSIpH0GmmFEFXWsJGm228sqMqKykqW/8AqYr8pSxHcq5Neia31PoK6z1lJde1GymVGoHlWz7Y9q5nsBiAaIFIE8DqrZ9se1cxmx2bbLsXMrgkYsdm2y7FzLCJBAniWSIHLq9ZP4IeMi1Km6vWT+CHjItiQAAAAAAAFLbLTpcVveL5CExi1dOXFi8zGyyIKgrVGqgrVIArUFZjVQVqEgko2jHQ9fidyEZHbtmC06Xs/wAlbLoVQc5vCQUW32NndlpULNT2txeC/G9Jy5tvF6WyuueTdCDe5/MywifPdz3Gess79orhfV+pu1wUUSI7SOYRbeC0tjEaebr1lNv2+esnhdorl/ReonNRQQhgDOjln0GmmFEFXWsJGm228s4kRSJZEUjMQZnK32XGp9JRUpNPFF7lb7LjU+koYgFrZqykuvahyBTUpNPFFvQlik2sC6eSBqAxAXgMQJIGIHVWvmrr/ekjcmlilixTOx0shskucnpYzqN7ocy8KLJ3pVOEOZehEAAASAAAAM9aunLixeYnlJlHRsdVqsquLeKzKbnoKSX8QrM+jTtb4UYrxmY8FjQVBWqUzy2hLo2a1v8ABTX1nP8AuGpPo2Kv+KcI+GIwwWNQVqEcKlqn0bJh8VXyiNUrktk9dOlHtnLyJwyBGoyCRo6GRdaXTnBcIvmyys2Q9NdOcpdyOBq9Dq9XPu0orhZ/nsuTNGcYoUuX1FPg/mZZU4tvBaWx2ncMIRUYOUUtS1o7pWOdPoqE+LcXzOUv9O3u39Ul057tc/tgyfHWCeyWZQW9/vQSVqOdxFJ3hOHSoVH8EoT8WiB5UUY+sVan8VCo/lTPY0UV0VqutYSNVtt5ZNJYazhkFTKexT/8mlF/fbp9jzsCCN+2aXRtVmfCvS/5F2gNyIpHKt1J9GrSfCpB+DPJVY+9HvRBJnMrfZcan0lDEt8s7fTh6LPqU4+s0OcU/s7NZQ2W9qL0pzqPYoUqkv1ww/UJAt7JZ9r7FzLGBXWa0VZ+rstZ/HmQXiy0s912uXsacPiqSl+iSLoqSwGIEtHJ20PXOjHhCT+ocp5OVPtVl2U0SBaBxXs22PauZaQuBrXWn+Wn5EquX/2T7oeRDWQKZO9KpwhzL0VsVgjSxwbblrbw5DRKAAAAAAAAVl5XBSryzqkU2iGnkpZ4+zj3FyAAhTuOjHVCPcTwsEFqiu4YAA4VFLUkdYHoAAAAAAAAAEc7PF64p9hIABX17joz1wj3FdaMiLNPXTj3I0IAGOq/wysj9nH8qFZ/wosr+xHuRuwAMRZf4XWaDxzF3I0NiyaoUl/LCPcWwAEcLPGOpJdhJgAAAAAAAAAAAAAAAAAAAAAAAAAAAAAAAAAAAAAAAAAAAAAAAAAAAAAAAAAAAAAAAAAAAAAAAAf/2Q=="/>
+          <p:cNvSpPr>
+            <a:spLocks noChangeAspect="1" noChangeArrowheads="1"/>
+          </p:cNvSpPr>
+          <p:nvPr/>
+        </p:nvSpPr>
+        <p:spPr bwMode="auto">
+          <a:xfrm>
+            <a:off x="155575" y="-144463"/>
+            <a:ext cx="304800" cy="304801"/>
+          </a:xfrm>
+          <a:prstGeom prst="rect">
+            <a:avLst/>
+          </a:prstGeom>
+          <a:noFill/>
+        </p:spPr>
+        <p:txBody>
+          <a:bodyPr vert="horz" wrap="square" lIns="91440" tIns="45720" rIns="91440" bIns="45720" numCol="1" anchor="t" anchorCtr="0" compatLnSpc="1">
+            <a:prstTxWarp prst="textNoShape">
+              <a:avLst/>
+            </a:prstTxWarp>
+          </a:bodyPr>
+          <a:lstStyle/>
+          <a:p>
+            <a:endParaRPr lang="de-DE"/>
+          </a:p>
+        </p:txBody>
+      </p:sp>
+      <p:sp>
+        <p:nvSpPr>
+          <p:cNvPr id="2056" name="AutoShape 8" descr="data:image/jpeg;base64,/9j/4AAQSkZJRgABAQAAAQABAAD/2wCEAAkGBhIQDxISDxAPEBIQEA8SEhQQDxAPEBAPFBAVFBQQFRcXHCceFxkjGRQUHy8gIycpLCwsFR4xNTAqNSYrLCkBCQoKDgwOGg8PGikkHyQpKSwsLywpLCkpKSwpLCwpLCoqLCkpMCwqLSksLSkpKSksLCwsLCkpKikpLCksLCkpLP/AABEIAOEA4QMBIgACEQEDEQH/xAAbAAACAwEBAQAAAAAAAAAAAAAABAMFBgIBB//EAEIQAAIBAQMIBgcGBQMFAAAAAAABAgMEBREGEiExQVFxwTJhgZGx0RMzQ1JyssJCYoKSofAHIiM04RQW0hUkRGNz/8QAGwEBAAIDAQEAAAAAAAAAAAAAAAECAwQFBgf/xAAxEQACAgEDAgQFAwMFAAAAAAAAAQIDEQQFMRIhQVFhsRMyweHwIpGhFHHRBiM0gbL/2gAMAwEAAhEDEQA/APuIAAAAAAAAAAAAAAAAAAAAAAAAAAAAAAAAAAAAAAAAAAAAAAAAAAAAAAAAABDO0YPDD9SOrb81Y5rfDA5q9JkUwDn/AK9DbGfdHzPP9xUtuevw+TK23WbDTHtW7rKuoUyyTTrKOhtm1xhPkiaF9UHqqR7cV4ox8LPjperxOqhZEGzjeFJ6qtN/jj5k8Zp6mnweJ8+kK2y2xoxc5PDDVhobe5E8A+lyklpbS46BWre1GOurDslnP9D55ZbynXpQlNt6HgsW0lnPfrfWMRNd3eRlVfmbGplLRWpylwi+eBNC9lJJxWKfWYxDVitjpvfF61zXWc/Wz1Mq86eWGvRd/wBy8YR8TUO8Zbl+pxK8J9XcKwqKSxTxTBnjJ7nrc4lY/b2M6rj5DKt8ntXcjmVun736LyFWzqn/ADPBa/3pPT7Tu39QlVa/1/8Ar7mCyvp7oTvbKOvRdPMzJZ2fjnx2LN3NYazqhlp79HtjPk1zFMqaSiqWG+p9JSRPRo1zaUsq6L1qpHjFPwY1C/qD9phxjJcjDwOatox0LVte8N4Bv4XvQeqtS/PFeJLG2U3qqQfCcXzPnUCeCI6icH0JVFvXej3OW8wcETxHUMG2xArMn/VP438sSzLEAAAAAAAAlOacpYbHpI5ilqqONaTW/kieFZSWjtW4hMEVUrK1kWdjs3FnVFKpIE6iFag3VELdao0ouU3gl3t7kAK261xpQcpvQtS2t7kYy8bfKtPOlq+ytkUM3jbZVp50tCXRjsivMSdI1Zycuy4MscI1Fyf29Pg/nZZREblh/Qp8H8zLBRMWDJk6R0jxI9RAGbHbHTe+L1rmusuI1FJJp4pmfJrJbHTe+L1rmus4m5bar18Sv5vf7mSMsFzIjzmnitDR0qiksU8UziR4/wDVCXk1/BlK7KS0qapbGvSYr8ukp4k+VEsPRNb6n0lW7U2sNW/rPe7Vuf8AUQULfm9/uadleHlDNW0Y6Fq29Z5AXgMQO02YxiBPAggTwAGIE0SGBNEA0eT/AKp/G/liWZV5P+rfxv5YloXXBUAACQAAABQW71s+PILNReOdqXj/AIGalmzqsm9Wd36CSSKpEi9UUqjdUVqFiBSojO5Q3bOeE4tyUVpj7v3lzNJNEbgS4dSwUcsGAVnPf9Kam3XKsc+C4peKEZWeK6Uori0hGhs1bNRh4G7po4UYcH8zHPRhd1SnmRiqlNtJ6M+OOt7ByVApOlo2YXZSE8w8wGZUyOUTWlHBsxlkhZyySSI2YzIiSy2x03vi9a5rrLZVFJYp4plDI7s1sdN74vWua6zh7ltqvXxK/m9/uZIywQ5Vey41PpKOJdZTVFJUmnin6T6SliefpzGK8Gv8l2MU2MwFIDVKR6zbtyV3+3Z83v8Ac1pwx3QzAngQQJ4HbMQxAmiQwJM7Aw33wog7LHhIlJt4RpMn/Vv434ItCoybf9OXxv5UW5bS3q+mNqWMkSWHgAADYKgAAAJ1Nb4kUyWprfESvC2wowc5vBLvk9iXWG8AgvG2RpQc5vBLvb3LrMXXvqrOr6RPNw0Rj9lR3PficXpec7RPOloS6MVqivPrFoRNZ2dT7F2ulGtsNtjWjitDXSW5+RNVmoRcpPBL94cTOWGTjJOLwf70FzQl/qKqTWEaeGK2OptfYuZ0aY9XJoSnl9JLZ7FVtGl404bIp4Sa+814L9RxZOU4LUi1jUUI4Iq7feXWbEXOTxHsik5wrRU3ldVPB6EZ6d6VbLL+SWfBa6c23HD7r1xfDuLW3WxyM5eVJtM6tWm6liZoS1kc9jZXXedO1UvSUnoxwlF9KEtsZfvSSzgfM8n71lY7ZFt/0qrVOqtma3onxi3jwx3n1GrE42u0vwZYXD4Onpr+tCc0QyGaiF5nGkjpRZDIikSyIpFC5R5QW103S2xbqYr8mldZ5QqqSTi8UxfK32XGp9JU2C2um98XrXNdZzNbolauuHze5ZPBp4E8BWz1VJJxeKY1A8vLMX5NGQapSGYCdMahM9Lot4g4NXvDS58/v7mvOp57DClgdIhiSxPNbjuE9ZPL7RXC/PE2IQUUaXJv1cvj5IuCmya6Evi5IuT3O1f8Ov8AsadnzMAADpGMAAACrvG3QoxlOo8En2ye5dZgL2vSdonnS0JdGOyK8+scyotUp2qpGTxjTlmxWxLBPvKaRo22OTwbEI4WTklpkRJBk18mO3gsLKh7J+1LBva5Sfeyus9QSsNu9HOcH9mcl2Y6P0wPRaKvri0cOyzom2bK02/QU9eq5M4haM4mhTN6NarOHqtU2xb0IpbLPoLdwErbqMis7mhG15MNfdm1n027rQ6lnozeudGlJ8XBNnzq+njilrehdbPodkp+jpU4e5ThD8sUuRrbo04R/wCz0e2ybbO5i0yeTIJnlpnpYEMiKRLIikYjKZrK32XGp9JQRL/K32XGp9JQRAH7vtrpvfF61zXWaWz1VJJxeKZkoFxccZ4trobcdTfV1nG3PSwlB2rs1/P3LxfgX8CeBBAngeTkZSeBNFEMBmiZ9FpVqr1W5YX52XqROXSsmhycWEJfFyRcFPk90ZceRcH0mmqNUFCC7JHPby8gAAZSAAAAPmeUX93W/wDp9KKuRu8oLhVfGUMFVWp6lNe6+TMNWpuLcZJpptNPQ09xz7IOMjZhJNETPVI5kcORMGVmsoap1RG+qLTVeGrBKot2GqfJ9h16Qno2rYztaLUOqSkjg6ulvg7uy3JpaS7pWpYGZqXdg86g0vuN4L8L5M8VsqQ6UJr8La70d9yru7xZ5i6iafBp6lrRUXjb1hrK7/W1J9GE3wjIasNwTrPGtLMitcYtOb6t0SjUK+8mVq08pPCR5kzdbtFoVWS/pUZZ2nVOqtMY9mt9m829qsbazodq5ogsVGMIqEIqMYrBJakXVkicbV3fGl6eB67RadVQwZ3OIpl9e1z6HUprrlFfMvIoJHGsTTOxDgjkRSJZEUjEZDNZW+y41PpKCJf5W+y41PpKu77C6j3RWt7+pGOyyNcXKT7Amu6wuo9OiK1vf1I0lGCikksEtRBRgopJLBLUMwPJa3Vy1EvTwRlSwTwJ4EFMahAwafQ3arqda4/Mf3EpqPJJAmiyGKJYnNl1Ql5NfujJyaPJyWMZcV4F0UmTWqfFeBdn0zb7JW6aE5vLaOfNYk0AABvFAAAAEpa3xKPKC4lXWdDBVUtD1Ka918mXktb4kcyJRUlhkp47o+W1qbi2pJpptNPQ09xBJm7v+41XWdHCNRLQ9Skvdl5mEr03GTjJNNPBp60zSlBwZnT6kQTkRurgdVGLVGZITwYLK+oahbcBiN5NbSnlI4dU243mhPSpmpo21uK0/vElpWlp4plbdyxpRfU/Fj9KmJXkw0qRqLqqqosVrWtbv8GhstIw9iqSpyUovBrufUzb3TbY1o4rRJdKO1PyKKzq7G6odKLCCM/flya6lJdcor5l5GhPGJRUlhkp4PnkiKRpL9uTXUpLrlFfNHyKSy2N1Huitb39SOdfZHTxcrHhI2Ivq4M3f9hdR0tkU6mL39DQjyjBRSSWCWovMp4JKkksEvSfSUsTyeo1ktV+rheCMyWCaBPAggNUoltHoZ6qeOIrl/niVlPpJ6URmBBAnge0qqhTBQgsJGq228smUcTpIIEubicbddqWpXxK+0/f7+T/AHMtdnT2fBd5Nap8V4F4UeTS6fYXh0tsi46SuLXdIxWfMwAAOgUAAAArFXWfKL0NN4dZ1MQtXrJfETULTnaHrX6lUyQqlBf9yqus6OCqJaHskvdfmX9UUqktJrDCeD5laKbi3GSaaeDT1piszc39cyrLOjgqiWh7JL3X5mIr03FtSTTTwaetM05wcGZ01IVkiKSJ5IjkiuR0o0tzU/6EOD+ZlnTpilyR/wC3p8H8zLKKGScHsIjdktMqclKDwa7mtz6heJ2hkYNpdt5RrRxWiS6UdqfkNMw9mtMqclKDwa7mtz6jT0L4jOnnJYS1NPY+O1GSeqrqrc7HhIxOt57E9rtKguvZ5lLJcFwWBPUk28XpbIZHgNx3Getnl9orhfV+ptwgoIzmVXsuNT6SjiXmVK9VxqeESlpo29t0ctSkuF4v88Ss5dJNTQzAXgMQPbVVRqioQWEjVbz3YxAngQQJ4GUgYgTRIYE0QC7yd1z/AA8y7KTJ3XPhHmXZdcFQAAJAAAAFDXpuVSSW9jMKKitHa95KoJNva28TyZCQFqopVG6ohOunJrHyZIIKpRX5c6rLOjgqiWh7JL3X5l7VFKhDSawyU8HzqtTcW1JNNPBp60yGRs74uhVlisFUS0PZL7r8zH1qbi3GSaaeDT1pmnODizPGWTV3H/b0+D+dllErbj/t6fB/OyyiULEiOkcobsVjdR7orW+SMVtsKoOc3hIJZCx2N1Huitb5IuYwSSSWCR7CCisEsEgZ4fX66ern5RXC+r9TPGODiRHmtvBaWyRocslNJfe2l9u26etnjiK5f0XqVnNRRncpLMoKltb9Ji/y6DO1rPtXauZqMrfZcan0lDE+iU0Qpgq61hI0XJt5YlAYgdVbPtj2rmcwLNYJGIE8CCBPAAYgTRIYFjZLNtl2LmEsgsbgg1KeO1RfiXRVXV6yfww8ZFqZCoAAAAAAAIvz8TiZ2+b8RC22rZHtfJENgXt1p2R7XyKqoNVBWqUzksdQtGOh6/E4qC1Q6p2jHQ9fiWTICRVXxdKrLFYKoloexr3WWsiKRLSawwngQuim40YRkmmk009aeeywiXlK6FWs1NrBVFF4PY1nS/lZW2a7pOTUk45rwljrx3I5+olHTxc5vCRni+o6sNjdR7orW+SL2nBRSSWCRxSgopJLBIlR4PX6+eqn5RXC+r9TZjHAHjR7gSKGBbb9vnrJ4XaK5f0XqVnNRRwoYHOc08USSIpH0GmmFEFXWsJGm228sqMqKykqW/8AqYr8pSxHcq5Neia31PoK6z1lJde1GymVGoHlWz7Y9q5nsBiAaIFIE8DqrZ9se1cxmx2bbLsXMrgkYsdm2y7FzLCJBAniWSIHLq9ZP4IeMi1Km6vWT+CHjItiQAAAAAAAFLbLTpcVveL5CExi1dOXFi8zGyyIKgrVGqgrVIArUFZjVQVqEgko2jHQ9fidyEZHbtmC06Xs/wAlbLoVQc5vCQUW32NndlpULNT2txeC/G9Jy5tvF6WyuueTdCDe5/MywifPdz3Gess79orhfV+pu1wUUSI7SOYRbeC0tjEaebr1lNv2+esnhdorl/ReonNRQQhgDOjln0GmmFEFXWsJGm228s4kRSJZEUjMQZnK32XGp9JRUpNPFF7lb7LjU+koYgFrZqykuvahyBTUpNPFFvQlik2sC6eSBqAxAXgMQJIGIHVWvmrr/ekjcmlilixTOx0shskucnpYzqN7ocy8KLJ3pVOEOZehEAAASAAAAM9aunLixeYnlJlHRsdVqsquLeKzKbnoKSX8QrM+jTtb4UYrxmY8FjQVBWqUzy2hLo2a1v8ABTX1nP8AuGpPo2Kv+KcI+GIwwWNQVqEcKlqn0bJh8VXyiNUrktk9dOlHtnLyJwyBGoyCRo6GRdaXTnBcIvmyys2Q9NdOcpdyOBq9Dq9XPu0orhZ/nsuTNGcYoUuX1FPg/mZZU4tvBaWx2ncMIRUYOUUtS1o7pWOdPoqE+LcXzOUv9O3u39Ul057tc/tgyfHWCeyWZQW9/vQSVqOdxFJ3hOHSoVH8EoT8WiB5UUY+sVan8VCo/lTPY0UV0VqutYSNVtt5ZNJYazhkFTKexT/8mlF/fbp9jzsCCN+2aXRtVmfCvS/5F2gNyIpHKt1J9GrSfCpB+DPJVY+9HvRBJnMrfZcan0lDEt8s7fTh6LPqU4+s0OcU/s7NZQ2W9qL0pzqPYoUqkv1ww/UJAt7JZ9r7FzLGBXWa0VZ+rstZ/HmQXiy0s912uXsacPiqSl+iSLoqSwGIEtHJ20PXOjHhCT+ocp5OVPtVl2U0SBaBxXs22PauZaQuBrXWn+Wn5EquX/2T7oeRDWQKZO9KpwhzL0VsVgjSxwbblrbw5DRKAAAAAAAAVl5XBSryzqkU2iGnkpZ4+zj3FyAAhTuOjHVCPcTwsEFqiu4YAA4VFLUkdYHoAAAAAAAAAEc7PF64p9hIABX17joz1wj3FdaMiLNPXTj3I0IAGOq/wysj9nH8qFZ/wosr+xHuRuwAMRZf4XWaDxzF3I0NiyaoUl/LCPcWwAEcLPGOpJdhJgAAAAAAAAAAAAAAAAAAAAAAAAAAAAAAAAAAAAAAAAAAAAAAAAAAAAAAAAAAAAAAAAAAAAAAAAf/2Q=="/>
+          <p:cNvSpPr>
+            <a:spLocks noChangeAspect="1" noChangeArrowheads="1"/>
+          </p:cNvSpPr>
+          <p:nvPr/>
+        </p:nvSpPr>
+        <p:spPr bwMode="auto">
+          <a:xfrm>
+            <a:off x="155575" y="-144463"/>
+            <a:ext cx="304800" cy="304801"/>
+          </a:xfrm>
+          <a:prstGeom prst="rect">
+            <a:avLst/>
+          </a:prstGeom>
+          <a:noFill/>
+        </p:spPr>
+        <p:txBody>
+          <a:bodyPr vert="horz" wrap="square" lIns="91440" tIns="45720" rIns="91440" bIns="45720" numCol="1" anchor="t" anchorCtr="0" compatLnSpc="1">
+            <a:prstTxWarp prst="textNoShape">
+              <a:avLst/>
+            </a:prstTxWarp>
+          </a:bodyPr>
+          <a:lstStyle/>
+          <a:p>
+            <a:endParaRPr lang="de-DE"/>
+          </a:p>
+        </p:txBody>
+      </p:sp>
+      <p:sp>
+        <p:nvSpPr>
+          <p:cNvPr id="2058" name="AutoShape 10" descr="data:image/jpeg;base64,/9j/4AAQSkZJRgABAQAAAQABAAD/2wCEAAkGBhIQDxISDxAPEBIQEA8SEhQQDxAPEBAPFBAVFBQQFRcXHCceFxkjGRQUHy8gIycpLCwsFR4xNTAqNSYrLCkBCQoKDgwOGg8PGikkHyQpKSwsLywpLCkpKSwpLCwpLCoqLCkpMCwqLSksLSkpKSksLCwsLCkpKikpLCksLCkpLP/AABEIAOEA4QMBIgACEQEDEQH/xAAbAAACAwEBAQAAAAAAAAAAAAAABAMFBgIBB//EAEIQAAIBAQMIBgcGBQMFAAAAAAABAgMEBREGEiExQVFxwTJhgZGx0RMzQ1JyssJCYoKSofAHIiM04RQW0hUkRGNz/8QAGwEBAAIDAQEAAAAAAAAAAAAAAAECAwQFBgf/xAAxEQACAgEDAgQFAwMFAAAAAAAAAQIDEQQFMRIhQVFhsRMyweHwIpGhFHHRBiM0gbL/2gAMAwEAAhEDEQA/APuIAAAAAAAAAAAAAAAAAAAAAAAAAAAAAAAAAAAAAAAAAAAAAAAAAAAAAAAAABDO0YPDD9SOrb81Y5rfDA5q9JkUwDn/AK9DbGfdHzPP9xUtuevw+TK23WbDTHtW7rKuoUyyTTrKOhtm1xhPkiaF9UHqqR7cV4ox8LPjperxOqhZEGzjeFJ6qtN/jj5k8Zp6mnweJ8+kK2y2xoxc5PDDVhobe5E8A+lyklpbS46BWre1GOurDslnP9D55ZbynXpQlNt6HgsW0lnPfrfWMRNd3eRlVfmbGplLRWpylwi+eBNC9lJJxWKfWYxDVitjpvfF61zXWc/Wz1Mq86eWGvRd/wBy8YR8TUO8Zbl+pxK8J9XcKwqKSxTxTBnjJ7nrc4lY/b2M6rj5DKt8ntXcjmVun736LyFWzqn/ADPBa/3pPT7Tu39QlVa/1/8Ar7mCyvp7oTvbKOvRdPMzJZ2fjnx2LN3NYazqhlp79HtjPk1zFMqaSiqWG+p9JSRPRo1zaUsq6L1qpHjFPwY1C/qD9phxjJcjDwOatox0LVte8N4Bv4XvQeqtS/PFeJLG2U3qqQfCcXzPnUCeCI6icH0JVFvXej3OW8wcETxHUMG2xArMn/VP438sSzLEAAAAAAAAlOacpYbHpI5ilqqONaTW/kieFZSWjtW4hMEVUrK1kWdjs3FnVFKpIE6iFag3VELdao0ouU3gl3t7kAK261xpQcpvQtS2t7kYy8bfKtPOlq+ytkUM3jbZVp50tCXRjsivMSdI1Zycuy4MscI1Fyf29Pg/nZZREblh/Qp8H8zLBRMWDJk6R0jxI9RAGbHbHTe+L1rmusuI1FJJp4pmfJrJbHTe+L1rmus4m5bar18Sv5vf7mSMsFzIjzmnitDR0qiksU8UziR4/wDVCXk1/BlK7KS0qapbGvSYr8ukp4k+VEsPRNb6n0lW7U2sNW/rPe7Vuf8AUQULfm9/uadleHlDNW0Y6Fq29Z5AXgMQO02YxiBPAggTwAGIE0SGBNEA0eT/AKp/G/liWZV5P+rfxv5YloXXBUAACQAAABQW71s+PILNReOdqXj/AIGalmzqsm9Wd36CSSKpEi9UUqjdUVqFiBSojO5Q3bOeE4tyUVpj7v3lzNJNEbgS4dSwUcsGAVnPf9Kam3XKsc+C4peKEZWeK6Uori0hGhs1bNRh4G7po4UYcH8zHPRhd1SnmRiqlNtJ6M+OOt7ByVApOlo2YXZSE8w8wGZUyOUTWlHBsxlkhZyySSI2YzIiSy2x03vi9a5rrLZVFJYp4plDI7s1sdN74vWua6zh7ltqvXxK/m9/uZIywQ5Vey41PpKOJdZTVFJUmnin6T6SliefpzGK8Gv8l2MU2MwFIDVKR6zbtyV3+3Z83v8Ac1pwx3QzAngQQJ4HbMQxAmiQwJM7Aw33wog7LHhIlJt4RpMn/Vv434ItCoybf9OXxv5UW5bS3q+mNqWMkSWHgAADYKgAAAJ1Nb4kUyWprfESvC2wowc5vBLvk9iXWG8AgvG2RpQc5vBLvb3LrMXXvqrOr6RPNw0Rj9lR3PficXpec7RPOloS6MVqivPrFoRNZ2dT7F2ulGtsNtjWjitDXSW5+RNVmoRcpPBL94cTOWGTjJOLwf70FzQl/qKqTWEaeGK2OptfYuZ0aY9XJoSnl9JLZ7FVtGl404bIp4Sa+814L9RxZOU4LUi1jUUI4Iq7feXWbEXOTxHsik5wrRU3ldVPB6EZ6d6VbLL+SWfBa6c23HD7r1xfDuLW3WxyM5eVJtM6tWm6liZoS1kc9jZXXedO1UvSUnoxwlF9KEtsZfvSSzgfM8n71lY7ZFt/0qrVOqtma3onxi3jwx3n1GrE42u0vwZYXD4Onpr+tCc0QyGaiF5nGkjpRZDIikSyIpFC5R5QW103S2xbqYr8mldZ5QqqSTi8UxfK32XGp9JU2C2um98XrXNdZzNbolauuHze5ZPBp4E8BWz1VJJxeKY1A8vLMX5NGQapSGYCdMahM9Lot4g4NXvDS58/v7mvOp57DClgdIhiSxPNbjuE9ZPL7RXC/PE2IQUUaXJv1cvj5IuCmya6Evi5IuT3O1f8Ov8AsadnzMAADpGMAAACrvG3QoxlOo8En2ye5dZgL2vSdonnS0JdGOyK8+scyotUp2qpGTxjTlmxWxLBPvKaRo22OTwbEI4WTklpkRJBk18mO3gsLKh7J+1LBva5Sfeyus9QSsNu9HOcH9mcl2Y6P0wPRaKvri0cOyzom2bK02/QU9eq5M4haM4mhTN6NarOHqtU2xb0IpbLPoLdwErbqMis7mhG15MNfdm1n027rQ6lnozeudGlJ8XBNnzq+njilrehdbPodkp+jpU4e5ThD8sUuRrbo04R/wCz0e2ybbO5i0yeTIJnlpnpYEMiKRLIikYjKZrK32XGp9JQRL/K32XGp9JQRAH7vtrpvfF61zXWaWz1VJJxeKZkoFxccZ4trobcdTfV1nG3PSwlB2rs1/P3LxfgX8CeBBAngeTkZSeBNFEMBmiZ9FpVqr1W5YX52XqROXSsmhycWEJfFyRcFPk90ZceRcH0mmqNUFCC7JHPby8gAAZSAAAAPmeUX93W/wDp9KKuRu8oLhVfGUMFVWp6lNe6+TMNWpuLcZJpptNPQ09xz7IOMjZhJNETPVI5kcORMGVmsoap1RG+qLTVeGrBKot2GqfJ9h16Qno2rYztaLUOqSkjg6ulvg7uy3JpaS7pWpYGZqXdg86g0vuN4L8L5M8VsqQ6UJr8La70d9yru7xZ5i6iafBp6lrRUXjb1hrK7/W1J9GE3wjIasNwTrPGtLMitcYtOb6t0SjUK+8mVq08pPCR5kzdbtFoVWS/pUZZ2nVOqtMY9mt9m829qsbazodq5ogsVGMIqEIqMYrBJakXVkicbV3fGl6eB67RadVQwZ3OIpl9e1z6HUprrlFfMvIoJHGsTTOxDgjkRSJZEUjEZDNZW+y41PpKCJf5W+y41PpKu77C6j3RWt7+pGOyyNcXKT7Amu6wuo9OiK1vf1I0lGCikksEtRBRgopJLBLUMwPJa3Vy1EvTwRlSwTwJ4EFMahAwafQ3arqda4/Mf3EpqPJJAmiyGKJYnNl1Ql5NfujJyaPJyWMZcV4F0UmTWqfFeBdn0zb7JW6aE5vLaOfNYk0AABvFAAAAEpa3xKPKC4lXWdDBVUtD1Ka918mXktb4kcyJRUlhkp47o+W1qbi2pJpptNPQ09xBJm7v+41XWdHCNRLQ9Skvdl5mEr03GTjJNNPBp60zSlBwZnT6kQTkRurgdVGLVGZITwYLK+oahbcBiN5NbSnlI4dU243mhPSpmpo21uK0/vElpWlp4plbdyxpRfU/Fj9KmJXkw0qRqLqqqosVrWtbv8GhstIw9iqSpyUovBrufUzb3TbY1o4rRJdKO1PyKKzq7G6odKLCCM/flya6lJdcor5l5GhPGJRUlhkp4PnkiKRpL9uTXUpLrlFfNHyKSy2N1Huitb39SOdfZHTxcrHhI2Ivq4M3f9hdR0tkU6mL39DQjyjBRSSWCWovMp4JKkksEvSfSUsTyeo1ktV+rheCMyWCaBPAggNUoltHoZ6qeOIrl/niVlPpJ6URmBBAnge0qqhTBQgsJGq228smUcTpIIEubicbddqWpXxK+0/f7+T/AHMtdnT2fBd5Nap8V4F4UeTS6fYXh0tsi46SuLXdIxWfMwAAOgUAAAArFXWfKL0NN4dZ1MQtXrJfETULTnaHrX6lUyQqlBf9yqus6OCqJaHskvdfmX9UUqktJrDCeD5laKbi3GSaaeDT1piszc39cyrLOjgqiWh7JL3X5mIr03FtSTTTwaetM05wcGZ01IVkiKSJ5IjkiuR0o0tzU/6EOD+ZlnTpilyR/wC3p8H8zLKKGScHsIjdktMqclKDwa7mtz6heJ2hkYNpdt5RrRxWiS6UdqfkNMw9mtMqclKDwa7mtz6jT0L4jOnnJYS1NPY+O1GSeqrqrc7HhIxOt57E9rtKguvZ5lLJcFwWBPUk28XpbIZHgNx3Getnl9orhfV+ptwgoIzmVXsuNT6SjiXmVK9VxqeESlpo29t0ctSkuF4v88Ss5dJNTQzAXgMQPbVVRqioQWEjVbz3YxAngQQJ4GUgYgTRIYE0QC7yd1z/AA8y7KTJ3XPhHmXZdcFQAAJAAAAFDXpuVSSW9jMKKitHa95KoJNva28TyZCQFqopVG6ohOunJrHyZIIKpRX5c6rLOjgqiWh7JL3X5l7VFKhDSawyU8HzqtTcW1JNNPBp60yGRs74uhVlisFUS0PZL7r8zH1qbi3GSaaeDT1pmnODizPGWTV3H/b0+D+dllErbj/t6fB/OyyiULEiOkcobsVjdR7orW+SMVtsKoOc3hIJZCx2N1Huitb5IuYwSSSWCR7CCisEsEgZ4fX66ern5RXC+r9TPGODiRHmtvBaWyRocslNJfe2l9u26etnjiK5f0XqVnNRRncpLMoKltb9Ji/y6DO1rPtXauZqMrfZcan0lDE+iU0Qpgq61hI0XJt5YlAYgdVbPtj2rmcwLNYJGIE8CCBPAAYgTRIYFjZLNtl2LmEsgsbgg1KeO1RfiXRVXV6yfww8ZFqZCoAAAAAAAIvz8TiZ2+b8RC22rZHtfJENgXt1p2R7XyKqoNVBWqUzksdQtGOh6/E4qC1Q6p2jHQ9fiWTICRVXxdKrLFYKoloexr3WWsiKRLSawwngQuim40YRkmmk009aeeywiXlK6FWs1NrBVFF4PY1nS/lZW2a7pOTUk45rwljrx3I5+olHTxc5vCRni+o6sNjdR7orW+SL2nBRSSWCRxSgopJLBIlR4PX6+eqn5RXC+r9TZjHAHjR7gSKGBbb9vnrJ4XaK5f0XqVnNRRwoYHOc08USSIpH0GmmFEFXWsJGm228sqMqKykqW/8AqYr8pSxHcq5Neia31PoK6z1lJde1GymVGoHlWz7Y9q5nsBiAaIFIE8DqrZ9se1cxmx2bbLsXMrgkYsdm2y7FzLCJBAniWSIHLq9ZP4IeMi1Km6vWT+CHjItiQAAAAAAAFLbLTpcVveL5CExi1dOXFi8zGyyIKgrVGqgrVIArUFZjVQVqEgko2jHQ9fidyEZHbtmC06Xs/wAlbLoVQc5vCQUW32NndlpULNT2txeC/G9Jy5tvF6WyuueTdCDe5/MywifPdz3Gess79orhfV+pu1wUUSI7SOYRbeC0tjEaebr1lNv2+esnhdorl/ReonNRQQhgDOjln0GmmFEFXWsJGm228s4kRSJZEUjMQZnK32XGp9JRUpNPFF7lb7LjU+koYgFrZqykuvahyBTUpNPFFvQlik2sC6eSBqAxAXgMQJIGIHVWvmrr/ekjcmlilixTOx0shskucnpYzqN7ocy8KLJ3pVOEOZehEAAASAAAAM9aunLixeYnlJlHRsdVqsquLeKzKbnoKSX8QrM+jTtb4UYrxmY8FjQVBWqUzy2hLo2a1v8ABTX1nP8AuGpPo2Kv+KcI+GIwwWNQVqEcKlqn0bJh8VXyiNUrktk9dOlHtnLyJwyBGoyCRo6GRdaXTnBcIvmyys2Q9NdOcpdyOBq9Dq9XPu0orhZ/nsuTNGcYoUuX1FPg/mZZU4tvBaWx2ncMIRUYOUUtS1o7pWOdPoqE+LcXzOUv9O3u39Ul057tc/tgyfHWCeyWZQW9/vQSVqOdxFJ3hOHSoVH8EoT8WiB5UUY+sVan8VCo/lTPY0UV0VqutYSNVtt5ZNJYazhkFTKexT/8mlF/fbp9jzsCCN+2aXRtVmfCvS/5F2gNyIpHKt1J9GrSfCpB+DPJVY+9HvRBJnMrfZcan0lDEt8s7fTh6LPqU4+s0OcU/s7NZQ2W9qL0pzqPYoUqkv1ww/UJAt7JZ9r7FzLGBXWa0VZ+rstZ/HmQXiy0s912uXsacPiqSl+iSLoqSwGIEtHJ20PXOjHhCT+ocp5OVPtVl2U0SBaBxXs22PauZaQuBrXWn+Wn5EquX/2T7oeRDWQKZO9KpwhzL0VsVgjSxwbblrbw5DRKAAAAAAAAVl5XBSryzqkU2iGnkpZ4+zj3FyAAhTuOjHVCPcTwsEFqiu4YAA4VFLUkdYHoAAAAAAAAAEc7PF64p9hIABX17joz1wj3FdaMiLNPXTj3I0IAGOq/wysj9nH8qFZ/wosr+xHuRuwAMRZf4XWaDxzF3I0NiyaoUl/LCPcWwAEcLPGOpJdhJgAAAAAAAAAAAAAAAAAAAAAAAAAAAAAAAAAAAAAAAAAAAAAAAAAAAAAAAAAAAAAAAAAAAAAAAAf/2Q=="/>
+          <p:cNvSpPr>
+            <a:spLocks noChangeAspect="1" noChangeArrowheads="1"/>
+          </p:cNvSpPr>
+          <p:nvPr/>
+        </p:nvSpPr>
+        <p:spPr bwMode="auto">
+          <a:xfrm>
+            <a:off x="155575" y="-144463"/>
+            <a:ext cx="304800" cy="304801"/>
+          </a:xfrm>
+          <a:prstGeom prst="rect">
+            <a:avLst/>
+          </a:prstGeom>
+          <a:noFill/>
+        </p:spPr>
+        <p:txBody>
+          <a:bodyPr vert="horz" wrap="square" lIns="91440" tIns="45720" rIns="91440" bIns="45720" numCol="1" anchor="t" anchorCtr="0" compatLnSpc="1">
+            <a:prstTxWarp prst="textNoShape">
+              <a:avLst/>
+            </a:prstTxWarp>
+          </a:bodyPr>
+          <a:lstStyle/>
+          <a:p>
+            <a:endParaRPr lang="de-DE"/>
+          </a:p>
+        </p:txBody>
+      </p:sp>
+      <p:pic>
+        <p:nvPicPr>
+          <p:cNvPr id="2059" name="Picture 11"/>
+          <p:cNvPicPr>
+            <a:picLocks noChangeAspect="1" noChangeArrowheads="1"/>
+          </p:cNvPicPr>
+          <p:nvPr/>
+        </p:nvPicPr>
+        <p:blipFill>
+          <a:blip r:embed="rId10" cstate="print">
+            <a:clrChange>
+              <a:clrFrom>
+                <a:srgbClr val="FFFFFF"/>
+              </a:clrFrom>
+              <a:clrTo>
+                <a:srgbClr val="FFFFFF">
+                  <a:alpha val="0"/>
+                </a:srgbClr>
+              </a:clrTo>
+            </a:clrChange>
+          </a:blip>
+          <a:srcRect/>
+          <a:stretch>
+            <a:fillRect/>
+          </a:stretch>
+        </p:blipFill>
+        <p:spPr bwMode="auto">
+          <a:xfrm>
+            <a:off x="7020272" y="4941168"/>
+            <a:ext cx="1135013" cy="1135013"/>
+          </a:xfrm>
+          <a:prstGeom prst="rect">
+            <a:avLst/>
+          </a:prstGeom>
+          <a:noFill/>
+          <a:ln w="9525">
+            <a:noFill/>
+            <a:miter lim="800000"/>
+            <a:headEnd/>
+            <a:tailEnd/>
+          </a:ln>
+        </p:spPr>
+      </p:pic>
+      <p:cxnSp>
+        <p:nvCxnSpPr>
+          <p:cNvPr id="26" name="Gerade Verbindung 25"/>
+          <p:cNvCxnSpPr>
+            <a:stCxn id="17" idx="2"/>
+            <a:endCxn id="2050" idx="0"/>
+          </p:cNvCxnSpPr>
+          <p:nvPr/>
+        </p:nvCxnSpPr>
+        <p:spPr>
+          <a:xfrm flipH="1">
+            <a:off x="3222885" y="2844949"/>
+            <a:ext cx="1247037" cy="368027"/>
+          </a:xfrm>
+          <a:prstGeom prst="line">
+            <a:avLst/>
+          </a:prstGeom>
+        </p:spPr>
+        <p:style>
+          <a:lnRef idx="1">
+            <a:schemeClr val="accent1"/>
+          </a:lnRef>
+          <a:fillRef idx="0">
+            <a:schemeClr val="accent1"/>
+          </a:fillRef>
+          <a:effectRef idx="0">
+            <a:schemeClr val="accent1"/>
+          </a:effectRef>
+          <a:fontRef idx="minor">
+            <a:schemeClr val="tx1"/>
+          </a:fontRef>
+        </p:style>
+      </p:cxnSp>
+      <p:cxnSp>
+        <p:nvCxnSpPr>
+          <p:cNvPr id="27" name="Gerade Verbindung 26"/>
+          <p:cNvCxnSpPr>
+            <a:stCxn id="2050" idx="2"/>
+            <a:endCxn id="25" idx="0"/>
+          </p:cNvCxnSpPr>
+          <p:nvPr/>
+        </p:nvCxnSpPr>
+        <p:spPr>
+          <a:xfrm flipH="1">
+            <a:off x="1841535" y="4395242"/>
+            <a:ext cx="1381350" cy="761950"/>
+          </a:xfrm>
+          <a:prstGeom prst="line">
+            <a:avLst/>
+          </a:prstGeom>
+        </p:spPr>
+        <p:style>
+          <a:lnRef idx="1">
+            <a:schemeClr val="accent1"/>
+          </a:lnRef>
+          <a:fillRef idx="0">
+            <a:schemeClr val="accent1"/>
+          </a:fillRef>
+          <a:effectRef idx="0">
+            <a:schemeClr val="accent1"/>
+          </a:effectRef>
+          <a:fontRef idx="minor">
+            <a:schemeClr val="tx1"/>
+          </a:fontRef>
+        </p:style>
+      </p:cxnSp>
+      <p:cxnSp>
+        <p:nvCxnSpPr>
+          <p:cNvPr id="33" name="Gerade Verbindung 32"/>
+          <p:cNvCxnSpPr>
+            <a:stCxn id="2050" idx="2"/>
+            <a:endCxn id="21" idx="0"/>
+          </p:cNvCxnSpPr>
+          <p:nvPr/>
+        </p:nvCxnSpPr>
+        <p:spPr>
+          <a:xfrm flipH="1">
+            <a:off x="3203848" y="4395242"/>
+            <a:ext cx="19037" cy="761950"/>
+          </a:xfrm>
+          <a:prstGeom prst="line">
+            <a:avLst/>
+          </a:prstGeom>
+        </p:spPr>
+        <p:style>
+          <a:lnRef idx="1">
+            <a:schemeClr val="accent1"/>
+          </a:lnRef>
+          <a:fillRef idx="0">
+            <a:schemeClr val="accent1"/>
+          </a:fillRef>
+          <a:effectRef idx="0">
+            <a:schemeClr val="accent1"/>
+          </a:effectRef>
+          <a:fontRef idx="minor">
+            <a:schemeClr val="tx1"/>
+          </a:fontRef>
+        </p:style>
+      </p:cxnSp>
+      <p:cxnSp>
+        <p:nvCxnSpPr>
+          <p:cNvPr id="38" name="Gerade Verbindung 37"/>
+          <p:cNvCxnSpPr>
+            <a:stCxn id="2050" idx="2"/>
+            <a:endCxn id="41986" idx="0"/>
+          </p:cNvCxnSpPr>
+          <p:nvPr/>
+        </p:nvCxnSpPr>
+        <p:spPr>
+          <a:xfrm>
+            <a:off x="3222885" y="4395242"/>
+            <a:ext cx="1470671" cy="905966"/>
+          </a:xfrm>
+          <a:prstGeom prst="line">
+            <a:avLst/>
+          </a:prstGeom>
+        </p:spPr>
+        <p:style>
+          <a:lnRef idx="1">
+            <a:schemeClr val="accent1"/>
+          </a:lnRef>
+          <a:fillRef idx="0">
+            <a:schemeClr val="accent1"/>
+          </a:fillRef>
+          <a:effectRef idx="0">
+            <a:schemeClr val="accent1"/>
+          </a:effectRef>
+          <a:fontRef idx="minor">
+            <a:schemeClr val="tx1"/>
+          </a:fontRef>
+        </p:style>
+      </p:cxnSp>
+      <p:cxnSp>
+        <p:nvCxnSpPr>
+          <p:cNvPr id="41" name="Gerade Verbindung 40"/>
+          <p:cNvCxnSpPr>
+            <a:stCxn id="17" idx="2"/>
+            <a:endCxn id="2059" idx="0"/>
+          </p:cNvCxnSpPr>
+          <p:nvPr/>
+        </p:nvCxnSpPr>
+        <p:spPr>
+          <a:xfrm>
+            <a:off x="4469922" y="2844949"/>
+            <a:ext cx="3117857" cy="2096219"/>
+          </a:xfrm>
+          <a:prstGeom prst="line">
+            <a:avLst/>
+          </a:prstGeom>
+        </p:spPr>
+        <p:style>
+          <a:lnRef idx="1">
+            <a:schemeClr val="accent1"/>
+          </a:lnRef>
+          <a:fillRef idx="0">
+            <a:schemeClr val="accent1"/>
+          </a:fillRef>
+          <a:effectRef idx="0">
+            <a:schemeClr val="accent1"/>
+          </a:effectRef>
+          <a:fontRef idx="minor">
+            <a:schemeClr val="tx1"/>
+          </a:fontRef>
+        </p:style>
+      </p:cxnSp>
+    </p:spTree>
+    <p:extLst>
+      <p:ext uri="{BB962C8B-B14F-4D97-AF65-F5344CB8AC3E}">
+        <p14:creationId xmlns="" xmlns:p14="http://schemas.microsoft.com/office/powerpoint/2010/main" val="1976326652"/>
+      </p:ext>
+    </p:extLst>
+  </p:cSld>
+  <p:clrMapOvr>
+    <a:masterClrMapping/>
+  </p:clrMapOvr>
+  <p:transition spd="slow">
+    <p:strips dir="ru"/>
+  </p:transition>
+  <p:timing>
+    <p:tnLst>
+      <p:par>
+        <p:cTn id="1" dur="indefinite" restart="never" nodeType="tmRoot">
+          <p:childTnLst>
+            <p:seq concurrent="1" nextAc="seek">
+              <p:cTn id="2" dur="indefinite" nodeType="mainSeq">
+                <p:childTnLst>
+                  <p:par>
+                    <p:cTn id="3" fill="hold">
+                      <p:stCondLst>
+                        <p:cond delay="indefinite"/>
+                      </p:stCondLst>
+                      <p:childTnLst>
+                        <p:par>
+                          <p:cTn id="4" fill="hold">
+                            <p:stCondLst>
+                              <p:cond delay="0"/>
+                            </p:stCondLst>
+                            <p:childTnLst>
+                              <p:par>
+                                <p:cTn id="5" presetID="3" presetClass="entr" presetSubtype="10" fill="hold" nodeType="clickEffect">
+                                  <p:stCondLst>
+                                    <p:cond delay="0"/>
+                                  </p:stCondLst>
+                                  <p:childTnLst>
+                                    <p:set>
+                                      <p:cBhvr>
+                                        <p:cTn id="6" dur="1" fill="hold">
+                                          <p:stCondLst>
+                                            <p:cond delay="0"/>
+                                          </p:stCondLst>
+                                        </p:cTn>
+                                        <p:tgtEl>
+                                          <p:spTgt spid="26"/>
+                                        </p:tgtEl>
+                                        <p:attrNameLst>
+                                          <p:attrName>style.visibility</p:attrName>
+                                        </p:attrNameLst>
+                                      </p:cBhvr>
+                                      <p:to>
+                                        <p:strVal val="visible"/>
+                                      </p:to>
+                                    </p:set>
+                                    <p:animEffect transition="in" filter="blinds(horizontal)">
+                                      <p:cBhvr>
+                                        <p:cTn id="7" dur="500"/>
+                                        <p:tgtEl>
+                                          <p:spTgt spid="26"/>
+                                        </p:tgtEl>
+                                      </p:cBhvr>
+                                    </p:animEffect>
+                                  </p:childTnLst>
+                                </p:cTn>
+                              </p:par>
+                              <p:par>
+                                <p:cTn id="8" presetID="3" presetClass="entr" presetSubtype="10" fill="hold" nodeType="withEffect">
+                                  <p:stCondLst>
+                                    <p:cond delay="0"/>
+                                  </p:stCondLst>
+                                  <p:childTnLst>
+                                    <p:set>
+                                      <p:cBhvr>
+                                        <p:cTn id="9" dur="1" fill="hold">
+                                          <p:stCondLst>
+                                            <p:cond delay="0"/>
+                                          </p:stCondLst>
+                                        </p:cTn>
+                                        <p:tgtEl>
+                                          <p:spTgt spid="2050"/>
+                                        </p:tgtEl>
+                                        <p:attrNameLst>
+                                          <p:attrName>style.visibility</p:attrName>
+                                        </p:attrNameLst>
+                                      </p:cBhvr>
+                                      <p:to>
+                                        <p:strVal val="visible"/>
+                                      </p:to>
+                                    </p:set>
+                                    <p:animEffect transition="in" filter="blinds(horizontal)">
+                                      <p:cBhvr>
+                                        <p:cTn id="10" dur="500"/>
+                                        <p:tgtEl>
+                                          <p:spTgt spid="2050"/>
+                                        </p:tgtEl>
+                                      </p:cBhvr>
+                                    </p:animEffect>
+                                  </p:childTnLst>
+                                </p:cTn>
+                              </p:par>
+                            </p:childTnLst>
+                          </p:cTn>
+                        </p:par>
+                      </p:childTnLst>
+                    </p:cTn>
+                  </p:par>
+                  <p:par>
+                    <p:cTn id="11" fill="hold">
+                      <p:stCondLst>
+                        <p:cond delay="indefinite"/>
+                      </p:stCondLst>
+                      <p:childTnLst>
+                        <p:par>
+                          <p:cTn id="12" fill="hold">
+                            <p:stCondLst>
+                              <p:cond delay="0"/>
+                            </p:stCondLst>
+                            <p:childTnLst>
+                              <p:par>
+                                <p:cTn id="13" presetID="3" presetClass="entr" presetSubtype="10" fill="hold" nodeType="clickEffect">
+                                  <p:stCondLst>
+                                    <p:cond delay="0"/>
+                                  </p:stCondLst>
+                                  <p:childTnLst>
+                                    <p:set>
+                                      <p:cBhvr>
+                                        <p:cTn id="14" dur="1" fill="hold">
+                                          <p:stCondLst>
+                                            <p:cond delay="0"/>
+                                          </p:stCondLst>
+                                        </p:cTn>
+                                        <p:tgtEl>
+                                          <p:spTgt spid="41986"/>
+                                        </p:tgtEl>
+                                        <p:attrNameLst>
+                                          <p:attrName>style.visibility</p:attrName>
+                                        </p:attrNameLst>
+                                      </p:cBhvr>
+                                      <p:to>
+                                        <p:strVal val="visible"/>
+                                      </p:to>
+                                    </p:set>
+                                    <p:animEffect transition="in" filter="blinds(horizontal)">
+                                      <p:cBhvr>
+                                        <p:cTn id="15" dur="500"/>
+                                        <p:tgtEl>
+                                          <p:spTgt spid="41986"/>
+                                        </p:tgtEl>
+                                      </p:cBhvr>
+                                    </p:animEffect>
+                                  </p:childTnLst>
+                                </p:cTn>
+                              </p:par>
+                              <p:par>
+                                <p:cTn id="16" presetID="3" presetClass="entr" presetSubtype="10" fill="hold" nodeType="withEffect">
+                                  <p:stCondLst>
+                                    <p:cond delay="0"/>
+                                  </p:stCondLst>
+                                  <p:childTnLst>
+                                    <p:set>
+                                      <p:cBhvr>
+                                        <p:cTn id="17" dur="1" fill="hold">
+                                          <p:stCondLst>
+                                            <p:cond delay="0"/>
+                                          </p:stCondLst>
+                                        </p:cTn>
+                                        <p:tgtEl>
+                                          <p:spTgt spid="25"/>
+                                        </p:tgtEl>
+                                        <p:attrNameLst>
+                                          <p:attrName>style.visibility</p:attrName>
+                                        </p:attrNameLst>
+                                      </p:cBhvr>
+                                      <p:to>
+                                        <p:strVal val="visible"/>
+                                      </p:to>
+                                    </p:set>
+                                    <p:animEffect transition="in" filter="blinds(horizontal)">
+                                      <p:cBhvr>
+                                        <p:cTn id="18" dur="500"/>
+                                        <p:tgtEl>
+                                          <p:spTgt spid="25"/>
+                                        </p:tgtEl>
+                                      </p:cBhvr>
+                                    </p:animEffect>
+                                  </p:childTnLst>
+                                </p:cTn>
+                              </p:par>
+                              <p:par>
+                                <p:cTn id="19" presetID="3" presetClass="entr" presetSubtype="10" fill="hold" nodeType="withEffect">
+                                  <p:stCondLst>
+                                    <p:cond delay="0"/>
+                                  </p:stCondLst>
+                                  <p:childTnLst>
+                                    <p:set>
+                                      <p:cBhvr>
+                                        <p:cTn id="20" dur="1" fill="hold">
+                                          <p:stCondLst>
+                                            <p:cond delay="0"/>
+                                          </p:stCondLst>
+                                        </p:cTn>
+                                        <p:tgtEl>
+                                          <p:spTgt spid="21"/>
+                                        </p:tgtEl>
+                                        <p:attrNameLst>
+                                          <p:attrName>style.visibility</p:attrName>
+                                        </p:attrNameLst>
+                                      </p:cBhvr>
+                                      <p:to>
+                                        <p:strVal val="visible"/>
+                                      </p:to>
+                                    </p:set>
+                                    <p:animEffect transition="in" filter="blinds(horizontal)">
+                                      <p:cBhvr>
+                                        <p:cTn id="21" dur="500"/>
+                                        <p:tgtEl>
+                                          <p:spTgt spid="21"/>
+                                        </p:tgtEl>
+                                      </p:cBhvr>
+                                    </p:animEffect>
+                                  </p:childTnLst>
+                                </p:cTn>
+                              </p:par>
+                              <p:par>
+                                <p:cTn id="22" presetID="3" presetClass="entr" presetSubtype="10" fill="hold" nodeType="withEffect">
+                                  <p:stCondLst>
+                                    <p:cond delay="0"/>
+                                  </p:stCondLst>
+                                  <p:childTnLst>
+                                    <p:set>
+                                      <p:cBhvr>
+                                        <p:cTn id="23" dur="1" fill="hold">
+                                          <p:stCondLst>
+                                            <p:cond delay="0"/>
+                                          </p:stCondLst>
+                                        </p:cTn>
+                                        <p:tgtEl>
+                                          <p:spTgt spid="27"/>
+                                        </p:tgtEl>
+                                        <p:attrNameLst>
+                                          <p:attrName>style.visibility</p:attrName>
+                                        </p:attrNameLst>
+                                      </p:cBhvr>
+                                      <p:to>
+                                        <p:strVal val="visible"/>
+                                      </p:to>
+                                    </p:set>
+                                    <p:animEffect transition="in" filter="blinds(horizontal)">
+                                      <p:cBhvr>
+                                        <p:cTn id="24" dur="500"/>
+                                        <p:tgtEl>
+                                          <p:spTgt spid="27"/>
+                                        </p:tgtEl>
+                                      </p:cBhvr>
+                                    </p:animEffect>
+                                  </p:childTnLst>
+                                </p:cTn>
+                              </p:par>
+                              <p:par>
+                                <p:cTn id="25" presetID="3" presetClass="entr" presetSubtype="10" fill="hold" nodeType="withEffect">
+                                  <p:stCondLst>
+                                    <p:cond delay="0"/>
+                                  </p:stCondLst>
+                                  <p:childTnLst>
+                                    <p:set>
+                                      <p:cBhvr>
+                                        <p:cTn id="26" dur="1" fill="hold">
+                                          <p:stCondLst>
+                                            <p:cond delay="0"/>
+                                          </p:stCondLst>
+                                        </p:cTn>
+                                        <p:tgtEl>
+                                          <p:spTgt spid="33"/>
+                                        </p:tgtEl>
+                                        <p:attrNameLst>
+                                          <p:attrName>style.visibility</p:attrName>
+                                        </p:attrNameLst>
+                                      </p:cBhvr>
+                                      <p:to>
+                                        <p:strVal val="visible"/>
+                                      </p:to>
+                                    </p:set>
+                                    <p:animEffect transition="in" filter="blinds(horizontal)">
+                                      <p:cBhvr>
+                                        <p:cTn id="27" dur="500"/>
+                                        <p:tgtEl>
+                                          <p:spTgt spid="33"/>
+                                        </p:tgtEl>
+                                      </p:cBhvr>
+                                    </p:animEffect>
+                                  </p:childTnLst>
+                                </p:cTn>
+                              </p:par>
+                              <p:par>
+                                <p:cTn id="28" presetID="3" presetClass="entr" presetSubtype="10" fill="hold" nodeType="withEffect">
+                                  <p:stCondLst>
+                                    <p:cond delay="0"/>
+                                  </p:stCondLst>
+                                  <p:childTnLst>
+                                    <p:set>
+                                      <p:cBhvr>
+                                        <p:cTn id="29" dur="1" fill="hold">
+                                          <p:stCondLst>
+                                            <p:cond delay="0"/>
+                                          </p:stCondLst>
+                                        </p:cTn>
+                                        <p:tgtEl>
+                                          <p:spTgt spid="38"/>
+                                        </p:tgtEl>
+                                        <p:attrNameLst>
+                                          <p:attrName>style.visibility</p:attrName>
+                                        </p:attrNameLst>
+                                      </p:cBhvr>
+                                      <p:to>
+                                        <p:strVal val="visible"/>
+                                      </p:to>
+                                    </p:set>
+                                    <p:animEffect transition="in" filter="blinds(horizontal)">
+                                      <p:cBhvr>
+                                        <p:cTn id="30" dur="500"/>
+                                        <p:tgtEl>
+                                          <p:spTgt spid="38"/>
+                                        </p:tgtEl>
+                                      </p:cBhvr>
+                                    </p:animEffect>
+                                  </p:childTnLst>
+                                </p:cTn>
+                              </p:par>
+                            </p:childTnLst>
+                          </p:cTn>
+                        </p:par>
+                      </p:childTnLst>
+                    </p:cTn>
+                  </p:par>
+                  <p:par>
+                    <p:cTn id="31" fill="hold">
+                      <p:stCondLst>
+                        <p:cond delay="indefinite"/>
+                      </p:stCondLst>
+                      <p:childTnLst>
+                        <p:par>
+                          <p:cTn id="32" fill="hold">
+                            <p:stCondLst>
+                              <p:cond delay="0"/>
+                            </p:stCondLst>
+                            <p:childTnLst>
+                              <p:par>
+                                <p:cTn id="33" presetID="3" presetClass="entr" presetSubtype="10" fill="hold" nodeType="clickEffect">
+                                  <p:stCondLst>
+                                    <p:cond delay="0"/>
+                                  </p:stCondLst>
+                                  <p:childTnLst>
+                                    <p:set>
+                                      <p:cBhvr>
+                                        <p:cTn id="34" dur="1" fill="hold">
+                                          <p:stCondLst>
+                                            <p:cond delay="0"/>
+                                          </p:stCondLst>
+                                        </p:cTn>
+                                        <p:tgtEl>
+                                          <p:spTgt spid="41"/>
+                                        </p:tgtEl>
+                                        <p:attrNameLst>
+                                          <p:attrName>style.visibility</p:attrName>
+                                        </p:attrNameLst>
+                                      </p:cBhvr>
+                                      <p:to>
+                                        <p:strVal val="visible"/>
+                                      </p:to>
+                                    </p:set>
+                                    <p:animEffect transition="in" filter="blinds(horizontal)">
+                                      <p:cBhvr>
+                                        <p:cTn id="35" dur="500"/>
+                                        <p:tgtEl>
+                                          <p:spTgt spid="41"/>
+                                        </p:tgtEl>
+                                      </p:cBhvr>
+                                    </p:animEffect>
+                                  </p:childTnLst>
+                                </p:cTn>
+                              </p:par>
+                              <p:par>
+                                <p:cTn id="36" presetID="3" presetClass="entr" presetSubtype="10" fill="hold" nodeType="withEffect">
+                                  <p:stCondLst>
+                                    <p:cond delay="0"/>
+                                  </p:stCondLst>
+                                  <p:childTnLst>
+                                    <p:set>
+                                      <p:cBhvr>
+                                        <p:cTn id="37" dur="1" fill="hold">
+                                          <p:stCondLst>
+                                            <p:cond delay="0"/>
+                                          </p:stCondLst>
+                                        </p:cTn>
+                                        <p:tgtEl>
+                                          <p:spTgt spid="2059"/>
+                                        </p:tgtEl>
+                                        <p:attrNameLst>
+                                          <p:attrName>style.visibility</p:attrName>
+                                        </p:attrNameLst>
+                                      </p:cBhvr>
+                                      <p:to>
+                                        <p:strVal val="visible"/>
+                                      </p:to>
+                                    </p:set>
+                                    <p:animEffect transition="in" filter="blinds(horizontal)">
+                                      <p:cBhvr>
+                                        <p:cTn id="38" dur="500"/>
+                                        <p:tgtEl>
+                                          <p:spTgt spid="2059"/>
+                                        </p:tgtEl>
+                                      </p:cBhvr>
+                                    </p:animEffect>
+                                  </p:childTnLst>
+                                </p:cTn>
+                              </p:par>
+                            </p:childTnLst>
+                          </p:cTn>
+                        </p:par>
+                      </p:childTnLst>
+                    </p:cTn>
+                  </p:par>
+                </p:childTnLst>
+              </p:cTn>
+              <p:prevCondLst>
+                <p:cond evt="onPrev" delay="0">
+                  <p:tgtEl>
+                    <p:sldTgt/>
+                  </p:tgtEl>
+                </p:cond>
+              </p:prevCondLst>
+              <p:nextCondLst>
+                <p:cond evt="onNext" delay="0">
+                  <p:tgtEl>
+                    <p:sldTgt/>
+                  </p:tgtEl>
+                </p:cond>
+              </p:nextCondLst>
+            </p:seq>
+          </p:childTnLst>
+        </p:cTn>
+      </p:par>
+    </p:tnLst>
+  </p:timing>
+</p:sld>
+</file>
+
+<file path=ppt/slides/slide9.xml><?xml version="1.0" encoding="utf-8"?>
+<p:sld xmlns:a="http://schemas.openxmlformats.org/drawingml/2006/main" xmlns:r="http://schemas.openxmlformats.org/officeDocument/2006/relationships" xmlns:p="http://schemas.openxmlformats.org/presentationml/2006/main">
+  <p:cSld>
+    <p:spTree>
+      <p:nvGrpSpPr>
+        <p:cNvPr id="1" name=""/>
+        <p:cNvGrpSpPr/>
+        <p:nvPr/>
+      </p:nvGrpSpPr>
+      <p:grpSpPr>
+        <a:xfrm>
+          <a:off x="0" y="0"/>
+          <a:ext cx="0" cy="0"/>
+          <a:chOff x="0" y="0"/>
+          <a:chExt cx="0" cy="0"/>
+        </a:xfrm>
+      </p:grpSpPr>
       <p:pic>
         <p:nvPicPr>
           <p:cNvPr id="1026" name="Picture 2" descr="C:\Users\Alexander\Desktop\eventalizer\Eventalizer\Dokumente\Mock Ups\Mockup - Anmelden.png"/>
@@ -28586,7 +29393,7 @@
             <a:fld id="{990B41CA-569D-40E7-8E58-026C0338B2C8}" type="slidenum">
               <a:rPr lang="en-US" smtClean="0"/>
               <a:pPr/>
-              <a:t>8</a:t>
+              <a:t>9</a:t>
             </a:fld>
             <a:endParaRPr lang="en-US"/>
           </a:p>
@@ -28595,198 +29402,7 @@
     </p:spTree>
     <p:extLst>
       <p:ext uri="{BB962C8B-B14F-4D97-AF65-F5344CB8AC3E}">
-        <p14:creationId xmlns:p14="http://schemas.microsoft.com/office/powerpoint/2010/main" xmlns="" val="2681693288"/>
-      </p:ext>
-    </p:extLst>
-  </p:cSld>
-  <p:clrMapOvr>
-    <a:masterClrMapping/>
-  </p:clrMapOvr>
-  <p:transition spd="slow">
-    <p:strips dir="ru"/>
-  </p:transition>
-  <p:timing>
-    <p:tnLst>
-      <p:par>
-        <p:cTn id="1" dur="indefinite" restart="never" nodeType="tmRoot"/>
-      </p:par>
-    </p:tnLst>
-  </p:timing>
-</p:sld>
-</file>
-
-<file path=ppt/slides/slide9.xml><?xml version="1.0" encoding="utf-8"?>
-<p:sld xmlns:a="http://schemas.openxmlformats.org/drawingml/2006/main" xmlns:r="http://schemas.openxmlformats.org/officeDocument/2006/relationships" xmlns:p="http://schemas.openxmlformats.org/presentationml/2006/main">
-  <p:cSld>
-    <p:spTree>
-      <p:nvGrpSpPr>
-        <p:cNvPr id="1" name=""/>
-        <p:cNvGrpSpPr/>
-        <p:nvPr/>
-      </p:nvGrpSpPr>
-      <p:grpSpPr>
-        <a:xfrm>
-          <a:off x="0" y="0"/>
-          <a:ext cx="0" cy="0"/>
-          <a:chOff x="0" y="0"/>
-          <a:chExt cx="0" cy="0"/>
-        </a:xfrm>
-      </p:grpSpPr>
-      <p:sp>
-        <p:nvSpPr>
-          <p:cNvPr id="2" name="Titel 1"/>
-          <p:cNvSpPr>
-            <a:spLocks noGrp="1"/>
-          </p:cNvSpPr>
-          <p:nvPr>
-            <p:ph type="title"/>
-          </p:nvPr>
-        </p:nvSpPr>
-        <p:spPr/>
-        <p:txBody>
-          <a:bodyPr>
-            <a:normAutofit fontScale="90000"/>
-          </a:bodyPr>
-          <a:lstStyle/>
-          <a:p>
-            <a:r>
-              <a:rPr lang="de-DE" dirty="0" smtClean="0"/>
-              <a:t>„Anmelden (Login)“ </a:t>
-            </a:r>
-            <a:br>
-              <a:rPr lang="de-DE" dirty="0" smtClean="0"/>
-            </a:br>
-            <a:r>
-              <a:rPr lang="de-DE" dirty="0" smtClean="0"/>
-              <a:t>Pflichtenheft</a:t>
-            </a:r>
-            <a:endParaRPr lang="de-DE" dirty="0"/>
-          </a:p>
-        </p:txBody>
-      </p:sp>
-      <p:sp>
-        <p:nvSpPr>
-          <p:cNvPr id="11" name="Datumsplatzhalter 10"/>
-          <p:cNvSpPr>
-            <a:spLocks noGrp="1"/>
-          </p:cNvSpPr>
-          <p:nvPr>
-            <p:ph type="dt" sz="half" idx="10"/>
-          </p:nvPr>
-        </p:nvSpPr>
-        <p:spPr/>
-        <p:txBody>
-          <a:bodyPr/>
-          <a:lstStyle/>
-          <a:p>
-            <a:r>
-              <a:rPr lang="de-DE" smtClean="0"/>
-              <a:t>21.04.2012</a:t>
-            </a:r>
-            <a:endParaRPr lang="de-DE" dirty="0"/>
-          </a:p>
-        </p:txBody>
-      </p:sp>
-      <p:sp>
-        <p:nvSpPr>
-          <p:cNvPr id="12" name="Foliennummernplatzhalter 11"/>
-          <p:cNvSpPr>
-            <a:spLocks noGrp="1"/>
-          </p:cNvSpPr>
-          <p:nvPr>
-            <p:ph type="sldNum" sz="quarter" idx="12"/>
-          </p:nvPr>
-        </p:nvSpPr>
-        <p:spPr/>
-        <p:txBody>
-          <a:bodyPr/>
-          <a:lstStyle/>
-          <a:p>
-            <a:fld id="{6C6AE60A-B69C-4790-82F7-3882EDF23186}" type="slidenum">
-              <a:rPr lang="de-DE" smtClean="0"/>
-              <a:pPr/>
-              <a:t>9</a:t>
-            </a:fld>
-            <a:endParaRPr lang="de-DE" dirty="0"/>
-          </a:p>
-        </p:txBody>
-      </p:sp>
-      <p:sp>
-        <p:nvSpPr>
-          <p:cNvPr id="13" name="Fußzeilenplatzhalter 12"/>
-          <p:cNvSpPr>
-            <a:spLocks noGrp="1"/>
-          </p:cNvSpPr>
-          <p:nvPr>
-            <p:ph type="ftr" sz="quarter" idx="11"/>
-          </p:nvPr>
-        </p:nvSpPr>
-        <p:spPr/>
-        <p:txBody>
-          <a:bodyPr/>
-          <a:lstStyle/>
-          <a:p>
-            <a:r>
-              <a:rPr lang="de-DE" smtClean="0"/>
-              <a:t>FST Projekt "Eventalizer" (SS 2012) Team 5</a:t>
-            </a:r>
-            <a:endParaRPr lang="de-DE" dirty="0"/>
-          </a:p>
-        </p:txBody>
-      </p:sp>
-      <p:sp>
-        <p:nvSpPr>
-          <p:cNvPr id="5" name="Inhaltsplatzhalter 4"/>
-          <p:cNvSpPr>
-            <a:spLocks noGrp="1"/>
-          </p:cNvSpPr>
-          <p:nvPr>
-            <p:ph idx="1"/>
-          </p:nvPr>
-        </p:nvSpPr>
-        <p:spPr/>
-        <p:txBody>
-          <a:bodyPr/>
-          <a:lstStyle/>
-          <a:p>
-            <a:r>
-              <a:rPr lang="de-DE" dirty="0" smtClean="0"/>
-              <a:t>Grobablauf Anmeldung</a:t>
-            </a:r>
-            <a:endParaRPr lang="de-DE" dirty="0"/>
-          </a:p>
-        </p:txBody>
-      </p:sp>
-      <p:pic>
-        <p:nvPicPr>
-          <p:cNvPr id="1026" name="Picture 2" descr="C:\Users\MSGxxxxx\Desktop\Studium FSW\Eventalizer\Dokumente\UML Diagramme\Sequenz-Diagramm oAuth.png"/>
-          <p:cNvPicPr>
-            <a:picLocks noChangeAspect="1" noChangeArrowheads="1"/>
-          </p:cNvPicPr>
-          <p:nvPr/>
-        </p:nvPicPr>
-        <p:blipFill>
-          <a:blip r:embed="rId3" cstate="print"/>
-          <a:srcRect b="4604"/>
-          <a:stretch>
-            <a:fillRect/>
-          </a:stretch>
-        </p:blipFill>
-        <p:spPr bwMode="auto">
-          <a:xfrm>
-            <a:off x="1396521" y="1905076"/>
-            <a:ext cx="7135919" cy="4563800"/>
-          </a:xfrm>
-          <a:prstGeom prst="rect">
-            <a:avLst/>
-          </a:prstGeom>
-          <a:noFill/>
-        </p:spPr>
-      </p:pic>
-    </p:spTree>
-    <p:extLst>
-      <p:ext uri="{BB962C8B-B14F-4D97-AF65-F5344CB8AC3E}">
-        <p14:creationId xmlns:p14="http://schemas.microsoft.com/office/powerpoint/2010/main" xmlns="" val="2857272158"/>
+        <p14:creationId xmlns="" xmlns:p14="http://schemas.microsoft.com/office/powerpoint/2010/main" val="2681693288"/>
       </p:ext>
     </p:extLst>
   </p:cSld>

</xml_diff>